<commit_message>
Added demo of basic pointer operations
</commit_message>
<xml_diff>
--- a/doc/Introduction to unsafe C#.pptx
+++ b/doc/Introduction to unsafe C#.pptx
@@ -12,6 +12,8 @@
     <p:sldId id="260" r:id="rId6"/>
     <p:sldId id="261" r:id="rId7"/>
     <p:sldId id="262" r:id="rId8"/>
+    <p:sldId id="263" r:id="rId9"/>
+    <p:sldId id="264" r:id="rId10"/>
   </p:sldIdLst>
   <p:sldSz cx="12192000" cy="6858000"/>
   <p:notesSz cx="6858000" cy="9144000"/>
@@ -110,6 +112,11 @@
       </a:defRPr>
     </a:lvl9pPr>
   </p:defaultTextStyle>
+  <p:extLst>
+    <p:ext uri="{EFAFB233-063F-42B5-8137-9DF3F51BA10A}">
+      <p15:sldGuideLst xmlns:p15="http://schemas.microsoft.com/office/powerpoint/2012/main"/>
+    </p:ext>
+  </p:extLst>
 </p:presentation>
 </file>
 
@@ -299,7 +306,7 @@
           <a:p>
             <a:fld id="{F9BC75CE-03FF-4667-898C-4C70B4392062}" type="datetimeFigureOut">
               <a:rPr lang="en-US" smtClean="0"/>
-              <a:t>6/17/2022</a:t>
+              <a:t>6/20/2022</a:t>
             </a:fld>
             <a:endParaRPr lang="en-US"/>
           </a:p>
@@ -574,7 +581,7 @@
           <a:p>
             <a:fld id="{F9BC75CE-03FF-4667-898C-4C70B4392062}" type="datetimeFigureOut">
               <a:rPr lang="en-US" smtClean="0"/>
-              <a:t>6/17/2022</a:t>
+              <a:t>6/20/2022</a:t>
             </a:fld>
             <a:endParaRPr lang="en-US"/>
           </a:p>
@@ -768,7 +775,7 @@
           <a:p>
             <a:fld id="{F9BC75CE-03FF-4667-898C-4C70B4392062}" type="datetimeFigureOut">
               <a:rPr lang="en-US" smtClean="0"/>
-              <a:t>6/17/2022</a:t>
+              <a:t>6/20/2022</a:t>
             </a:fld>
             <a:endParaRPr lang="en-US"/>
           </a:p>
@@ -1041,7 +1048,7 @@
           <a:p>
             <a:fld id="{F9BC75CE-03FF-4667-898C-4C70B4392062}" type="datetimeFigureOut">
               <a:rPr lang="en-US" smtClean="0"/>
-              <a:t>6/17/2022</a:t>
+              <a:t>6/20/2022</a:t>
             </a:fld>
             <a:endParaRPr lang="en-US"/>
           </a:p>
@@ -1382,7 +1389,7 @@
           <a:p>
             <a:fld id="{F9BC75CE-03FF-4667-898C-4C70B4392062}" type="datetimeFigureOut">
               <a:rPr lang="en-US" smtClean="0"/>
-              <a:t>6/17/2022</a:t>
+              <a:t>6/20/2022</a:t>
             </a:fld>
             <a:endParaRPr lang="en-US"/>
           </a:p>
@@ -2005,7 +2012,7 @@
           <a:p>
             <a:fld id="{F9BC75CE-03FF-4667-898C-4C70B4392062}" type="datetimeFigureOut">
               <a:rPr lang="en-US" smtClean="0"/>
-              <a:t>6/17/2022</a:t>
+              <a:t>6/20/2022</a:t>
             </a:fld>
             <a:endParaRPr lang="en-US"/>
           </a:p>
@@ -2865,7 +2872,7 @@
           <a:p>
             <a:fld id="{F9BC75CE-03FF-4667-898C-4C70B4392062}" type="datetimeFigureOut">
               <a:rPr lang="en-US" smtClean="0"/>
-              <a:t>6/17/2022</a:t>
+              <a:t>6/20/2022</a:t>
             </a:fld>
             <a:endParaRPr lang="en-US"/>
           </a:p>
@@ -3035,7 +3042,7 @@
           <a:p>
             <a:fld id="{F9BC75CE-03FF-4667-898C-4C70B4392062}" type="datetimeFigureOut">
               <a:rPr lang="en-US" smtClean="0"/>
-              <a:t>6/17/2022</a:t>
+              <a:t>6/20/2022</a:t>
             </a:fld>
             <a:endParaRPr lang="en-US"/>
           </a:p>
@@ -3215,7 +3222,7 @@
           <a:p>
             <a:fld id="{F9BC75CE-03FF-4667-898C-4C70B4392062}" type="datetimeFigureOut">
               <a:rPr lang="en-US" smtClean="0"/>
-              <a:t>6/17/2022</a:t>
+              <a:t>6/20/2022</a:t>
             </a:fld>
             <a:endParaRPr lang="en-US"/>
           </a:p>
@@ -3385,7 +3392,7 @@
           <a:p>
             <a:fld id="{F9BC75CE-03FF-4667-898C-4C70B4392062}" type="datetimeFigureOut">
               <a:rPr lang="en-US" smtClean="0"/>
-              <a:t>6/17/2022</a:t>
+              <a:t>6/20/2022</a:t>
             </a:fld>
             <a:endParaRPr lang="en-US"/>
           </a:p>
@@ -3632,7 +3639,7 @@
           <a:p>
             <a:fld id="{F9BC75CE-03FF-4667-898C-4C70B4392062}" type="datetimeFigureOut">
               <a:rPr lang="en-US" smtClean="0"/>
-              <a:t>6/17/2022</a:t>
+              <a:t>6/20/2022</a:t>
             </a:fld>
             <a:endParaRPr lang="en-US"/>
           </a:p>
@@ -3924,7 +3931,7 @@
           <a:p>
             <a:fld id="{F9BC75CE-03FF-4667-898C-4C70B4392062}" type="datetimeFigureOut">
               <a:rPr lang="en-US" smtClean="0"/>
-              <a:t>6/17/2022</a:t>
+              <a:t>6/20/2022</a:t>
             </a:fld>
             <a:endParaRPr lang="en-US"/>
           </a:p>
@@ -4368,7 +4375,7 @@
           <a:p>
             <a:fld id="{F9BC75CE-03FF-4667-898C-4C70B4392062}" type="datetimeFigureOut">
               <a:rPr lang="en-US" smtClean="0"/>
-              <a:t>6/17/2022</a:t>
+              <a:t>6/20/2022</a:t>
             </a:fld>
             <a:endParaRPr lang="en-US"/>
           </a:p>
@@ -4486,7 +4493,7 @@
           <a:p>
             <a:fld id="{F9BC75CE-03FF-4667-898C-4C70B4392062}" type="datetimeFigureOut">
               <a:rPr lang="en-US" smtClean="0"/>
-              <a:t>6/17/2022</a:t>
+              <a:t>6/20/2022</a:t>
             </a:fld>
             <a:endParaRPr lang="en-US"/>
           </a:p>
@@ -4581,7 +4588,7 @@
           <a:p>
             <a:fld id="{F9BC75CE-03FF-4667-898C-4C70B4392062}" type="datetimeFigureOut">
               <a:rPr lang="en-US" smtClean="0"/>
-              <a:t>6/17/2022</a:t>
+              <a:t>6/20/2022</a:t>
             </a:fld>
             <a:endParaRPr lang="en-US"/>
           </a:p>
@@ -4860,7 +4867,7 @@
           <a:p>
             <a:fld id="{F9BC75CE-03FF-4667-898C-4C70B4392062}" type="datetimeFigureOut">
               <a:rPr lang="en-US" smtClean="0"/>
-              <a:t>6/17/2022</a:t>
+              <a:t>6/20/2022</a:t>
             </a:fld>
             <a:endParaRPr lang="en-US"/>
           </a:p>
@@ -5135,7 +5142,7 @@
           <a:p>
             <a:fld id="{F9BC75CE-03FF-4667-898C-4C70B4392062}" type="datetimeFigureOut">
               <a:rPr lang="en-US" smtClean="0"/>
-              <a:t>6/17/2022</a:t>
+              <a:t>6/20/2022</a:t>
             </a:fld>
             <a:endParaRPr lang="en-US"/>
           </a:p>
@@ -5564,7 +5571,7 @@
           <a:p>
             <a:fld id="{F9BC75CE-03FF-4667-898C-4C70B4392062}" type="datetimeFigureOut">
               <a:rPr lang="en-US" smtClean="0"/>
-              <a:t>6/17/2022</a:t>
+              <a:t>6/20/2022</a:t>
             </a:fld>
             <a:endParaRPr lang="en-US"/>
           </a:p>
@@ -6811,6 +6818,12 @@
           <a:p>
             <a:r>
               <a:rPr lang="en-US" dirty="0"/>
+              <a:t>Unsafe C# features</a:t>
+            </a:r>
+          </a:p>
+          <a:p>
+            <a:r>
+              <a:rPr lang="en-US" dirty="0"/>
               <a:t>Managing unmanaged memory</a:t>
             </a:r>
           </a:p>
@@ -7929,14 +7942,14 @@
           <a:lstStyle/>
           <a:p>
             <a:r>
-              <a:rPr lang="en-US"/>
-              <a:t>What is unsafe code?</a:t>
+              <a:rPr lang="en-US" dirty="0"/>
+              <a:t>Unsafe C# features</a:t>
             </a:r>
             <a:br>
-              <a:rPr lang="en-US"/>
+              <a:rPr lang="en-US" dirty="0"/>
             </a:br>
             <a:r>
-              <a:rPr lang="en-US"/>
+              <a:rPr lang="en-US" dirty="0"/>
               <a:t>Breaking down the example</a:t>
             </a:r>
           </a:p>
@@ -8660,6 +8673,573 @@
     <p:extLst>
       <p:ext uri="{BB962C8B-B14F-4D97-AF65-F5344CB8AC3E}">
         <p14:creationId xmlns:p14="http://schemas.microsoft.com/office/powerpoint/2010/main" val="3599577177"/>
+      </p:ext>
+    </p:extLst>
+  </p:cSld>
+  <p:clrMapOvr>
+    <a:masterClrMapping/>
+  </p:clrMapOvr>
+</p:sld>
+</file>
+
+<file path=ppt/slides/slide8.xml><?xml version="1.0" encoding="utf-8"?>
+<p:sld xmlns:a="http://schemas.openxmlformats.org/drawingml/2006/main" xmlns:r="http://schemas.openxmlformats.org/officeDocument/2006/relationships" xmlns:p="http://schemas.openxmlformats.org/presentationml/2006/main">
+  <p:cSld>
+    <p:spTree>
+      <p:nvGrpSpPr>
+        <p:cNvPr id="1" name=""/>
+        <p:cNvGrpSpPr/>
+        <p:nvPr/>
+      </p:nvGrpSpPr>
+      <p:grpSpPr>
+        <a:xfrm>
+          <a:off x="0" y="0"/>
+          <a:ext cx="0" cy="0"/>
+          <a:chOff x="0" y="0"/>
+          <a:chExt cx="0" cy="0"/>
+        </a:xfrm>
+      </p:grpSpPr>
+      <p:sp>
+        <p:nvSpPr>
+          <p:cNvPr id="2" name="Title 1">
+            <a:extLst>
+              <a:ext uri="{FF2B5EF4-FFF2-40B4-BE49-F238E27FC236}">
+                <a16:creationId xmlns:a16="http://schemas.microsoft.com/office/drawing/2014/main" id="{80FF7FDC-4548-4EDE-886C-4C59FBA835FA}"/>
+              </a:ext>
+            </a:extLst>
+          </p:cNvPr>
+          <p:cNvSpPr>
+            <a:spLocks noGrp="1"/>
+          </p:cNvSpPr>
+          <p:nvPr>
+            <p:ph type="title"/>
+          </p:nvPr>
+        </p:nvSpPr>
+        <p:spPr/>
+        <p:txBody>
+          <a:bodyPr/>
+          <a:lstStyle/>
+          <a:p>
+            <a:r>
+              <a:rPr lang="en-US"/>
+              <a:t>Unsafe C# features</a:t>
+            </a:r>
+            <a:br>
+              <a:rPr lang="en-US"/>
+            </a:br>
+            <a:r>
+              <a:rPr lang="en-US"/>
+              <a:t>Pointer operations I</a:t>
+            </a:r>
+          </a:p>
+        </p:txBody>
+      </p:sp>
+      <p:sp>
+        <p:nvSpPr>
+          <p:cNvPr id="3" name="Content Placeholder 2">
+            <a:extLst>
+              <a:ext uri="{FF2B5EF4-FFF2-40B4-BE49-F238E27FC236}">
+                <a16:creationId xmlns:a16="http://schemas.microsoft.com/office/drawing/2014/main" id="{0075CCD4-5221-AD75-FC8F-98741FE39B74}"/>
+              </a:ext>
+            </a:extLst>
+          </p:cNvPr>
+          <p:cNvSpPr>
+            <a:spLocks noGrp="1"/>
+          </p:cNvSpPr>
+          <p:nvPr>
+            <p:ph idx="1"/>
+          </p:nvPr>
+        </p:nvSpPr>
+        <p:spPr/>
+        <p:txBody>
+          <a:bodyPr/>
+          <a:lstStyle/>
+          <a:p>
+            <a:endParaRPr lang="en-US"/>
+          </a:p>
+        </p:txBody>
+      </p:sp>
+      <p:sp>
+        <p:nvSpPr>
+          <p:cNvPr id="6" name="TextBox 5">
+            <a:extLst>
+              <a:ext uri="{FF2B5EF4-FFF2-40B4-BE49-F238E27FC236}">
+                <a16:creationId xmlns:a16="http://schemas.microsoft.com/office/drawing/2014/main" id="{A5E9236D-3173-F421-D453-526585C282D5}"/>
+              </a:ext>
+            </a:extLst>
+          </p:cNvPr>
+          <p:cNvSpPr txBox="1"/>
+          <p:nvPr/>
+        </p:nvSpPr>
+        <p:spPr>
+          <a:xfrm>
+            <a:off x="1103312" y="2052918"/>
+            <a:ext cx="8946540" cy="4195480"/>
+          </a:xfrm>
+          <a:prstGeom prst="rect">
+            <a:avLst/>
+          </a:prstGeom>
+          <a:solidFill>
+            <a:schemeClr val="tx1"/>
+          </a:solidFill>
+          <a:ln w="15875">
+            <a:solidFill>
+              <a:schemeClr val="accent1"/>
+            </a:solidFill>
+          </a:ln>
+        </p:spPr>
+        <p:txBody>
+          <a:bodyPr wrap="square" rtlCol="0">
+            <a:noAutofit/>
+          </a:bodyPr>
+          <a:lstStyle/>
+          <a:p>
+            <a:r>
+              <a:rPr lang="en-US" sz="1800">
+                <a:solidFill>
+                  <a:srgbClr val="008000"/>
+                </a:solidFill>
+                <a:latin typeface="Cascadia Mono" panose="020B0609020000020004" pitchFamily="49" charset="0"/>
+              </a:rPr>
+              <a:t>// Pin array and get pointer to first element</a:t>
+            </a:r>
+            <a:endParaRPr lang="en-US" sz="1800">
+              <a:solidFill>
+                <a:srgbClr val="000000"/>
+              </a:solidFill>
+              <a:latin typeface="Cascadia Mono" panose="020B0609020000020004" pitchFamily="49" charset="0"/>
+            </a:endParaRPr>
+          </a:p>
+          <a:p>
+            <a:r>
+              <a:rPr lang="en-US" sz="1800">
+                <a:solidFill>
+                  <a:srgbClr val="0000FF"/>
+                </a:solidFill>
+                <a:latin typeface="Cascadia Mono" panose="020B0609020000020004" pitchFamily="49" charset="0"/>
+              </a:rPr>
+              <a:t>fixed</a:t>
+            </a:r>
+            <a:r>
+              <a:rPr lang="en-US" sz="1800">
+                <a:solidFill>
+                  <a:srgbClr val="000000"/>
+                </a:solidFill>
+                <a:latin typeface="Cascadia Mono" panose="020B0609020000020004" pitchFamily="49" charset="0"/>
+              </a:rPr>
+              <a:t> (</a:t>
+            </a:r>
+            <a:r>
+              <a:rPr lang="en-US" sz="1800">
+                <a:solidFill>
+                  <a:srgbClr val="0000FF"/>
+                </a:solidFill>
+                <a:latin typeface="Cascadia Mono" panose="020B0609020000020004" pitchFamily="49" charset="0"/>
+              </a:rPr>
+              <a:t>byte</a:t>
+            </a:r>
+            <a:r>
+              <a:rPr lang="en-US" sz="1800">
+                <a:solidFill>
+                  <a:srgbClr val="000000"/>
+                </a:solidFill>
+                <a:latin typeface="Cascadia Mono" panose="020B0609020000020004" pitchFamily="49" charset="0"/>
+              </a:rPr>
+              <a:t>* bytePtr = managedByteArray)</a:t>
+            </a:r>
+          </a:p>
+          <a:p>
+            <a:r>
+              <a:rPr lang="en-US" sz="1800">
+                <a:solidFill>
+                  <a:srgbClr val="008000"/>
+                </a:solidFill>
+                <a:latin typeface="Cascadia Mono" panose="020B0609020000020004" pitchFamily="49" charset="0"/>
+              </a:rPr>
+              <a:t>// Pin object and get pointer to field</a:t>
+            </a:r>
+            <a:endParaRPr lang="en-US" sz="1800">
+              <a:solidFill>
+                <a:srgbClr val="000000"/>
+              </a:solidFill>
+              <a:latin typeface="Cascadia Mono" panose="020B0609020000020004" pitchFamily="49" charset="0"/>
+            </a:endParaRPr>
+          </a:p>
+          <a:p>
+            <a:r>
+              <a:rPr lang="en-US" sz="1800">
+                <a:solidFill>
+                  <a:srgbClr val="0000FF"/>
+                </a:solidFill>
+                <a:latin typeface="Cascadia Mono" panose="020B0609020000020004" pitchFamily="49" charset="0"/>
+              </a:rPr>
+              <a:t>fixed</a:t>
+            </a:r>
+            <a:r>
+              <a:rPr lang="en-US" sz="1800">
+                <a:solidFill>
+                  <a:srgbClr val="000000"/>
+                </a:solidFill>
+                <a:latin typeface="Cascadia Mono" panose="020B0609020000020004" pitchFamily="49" charset="0"/>
+              </a:rPr>
+              <a:t> (</a:t>
+            </a:r>
+            <a:r>
+              <a:rPr lang="en-US" sz="1800">
+                <a:solidFill>
+                  <a:srgbClr val="0000FF"/>
+                </a:solidFill>
+                <a:latin typeface="Cascadia Mono" panose="020B0609020000020004" pitchFamily="49" charset="0"/>
+              </a:rPr>
+              <a:t>int</a:t>
+            </a:r>
+            <a:r>
+              <a:rPr lang="en-US" sz="1800">
+                <a:solidFill>
+                  <a:srgbClr val="000000"/>
+                </a:solidFill>
+                <a:latin typeface="Cascadia Mono" panose="020B0609020000020004" pitchFamily="49" charset="0"/>
+              </a:rPr>
+              <a:t>* intPtr = &amp;_integer)</a:t>
+            </a:r>
+          </a:p>
+          <a:p>
+            <a:endParaRPr lang="en-US" sz="1800">
+              <a:solidFill>
+                <a:srgbClr val="000000"/>
+              </a:solidFill>
+              <a:latin typeface="Cascadia Mono" panose="020B0609020000020004" pitchFamily="49" charset="0"/>
+            </a:endParaRPr>
+          </a:p>
+          <a:p>
+            <a:r>
+              <a:rPr lang="en-US" sz="1800">
+                <a:solidFill>
+                  <a:srgbClr val="008000"/>
+                </a:solidFill>
+                <a:latin typeface="Cascadia Mono" panose="020B0609020000020004" pitchFamily="49" charset="0"/>
+              </a:rPr>
+              <a:t>// Get address of argument</a:t>
+            </a:r>
+            <a:endParaRPr lang="en-US" sz="1800">
+              <a:solidFill>
+                <a:srgbClr val="000000"/>
+              </a:solidFill>
+              <a:latin typeface="Cascadia Mono" panose="020B0609020000020004" pitchFamily="49" charset="0"/>
+            </a:endParaRPr>
+          </a:p>
+          <a:p>
+            <a:r>
+              <a:rPr lang="en-US" sz="1800">
+                <a:solidFill>
+                  <a:srgbClr val="0000FF"/>
+                </a:solidFill>
+                <a:latin typeface="Cascadia Mono" panose="020B0609020000020004" pitchFamily="49" charset="0"/>
+              </a:rPr>
+              <a:t>double</a:t>
+            </a:r>
+            <a:r>
+              <a:rPr lang="en-US" sz="1800">
+                <a:solidFill>
+                  <a:srgbClr val="000000"/>
+                </a:solidFill>
+                <a:latin typeface="Cascadia Mono" panose="020B0609020000020004" pitchFamily="49" charset="0"/>
+              </a:rPr>
+              <a:t>* doublePtr = &amp;doubleParameter;</a:t>
+            </a:r>
+          </a:p>
+          <a:p>
+            <a:r>
+              <a:rPr lang="en-US" sz="1800">
+                <a:solidFill>
+                  <a:srgbClr val="008000"/>
+                </a:solidFill>
+                <a:latin typeface="Cascadia Mono" panose="020B0609020000020004" pitchFamily="49" charset="0"/>
+              </a:rPr>
+              <a:t>// Get address of local</a:t>
+            </a:r>
+            <a:endParaRPr lang="en-US" sz="1800">
+              <a:solidFill>
+                <a:srgbClr val="000000"/>
+              </a:solidFill>
+              <a:latin typeface="Cascadia Mono" panose="020B0609020000020004" pitchFamily="49" charset="0"/>
+            </a:endParaRPr>
+          </a:p>
+          <a:p>
+            <a:r>
+              <a:rPr lang="en-US" sz="1800">
+                <a:solidFill>
+                  <a:srgbClr val="0000FF"/>
+                </a:solidFill>
+                <a:latin typeface="Cascadia Mono" panose="020B0609020000020004" pitchFamily="49" charset="0"/>
+              </a:rPr>
+              <a:t>char</a:t>
+            </a:r>
+            <a:r>
+              <a:rPr lang="en-US" sz="1800">
+                <a:solidFill>
+                  <a:srgbClr val="000000"/>
+                </a:solidFill>
+                <a:latin typeface="Cascadia Mono" panose="020B0609020000020004" pitchFamily="49" charset="0"/>
+              </a:rPr>
+              <a:t>* charPtr = &amp;character;</a:t>
+            </a:r>
+          </a:p>
+          <a:p>
+            <a:endParaRPr lang="en-US" sz="1800">
+              <a:solidFill>
+                <a:srgbClr val="000000"/>
+              </a:solidFill>
+              <a:latin typeface="Cascadia Mono" panose="020B0609020000020004" pitchFamily="49" charset="0"/>
+            </a:endParaRPr>
+          </a:p>
+          <a:p>
+            <a:r>
+              <a:rPr lang="en-US" sz="1800">
+                <a:solidFill>
+                  <a:srgbClr val="008000"/>
+                </a:solidFill>
+                <a:latin typeface="Cascadia Mono" panose="020B0609020000020004" pitchFamily="49" charset="0"/>
+              </a:rPr>
+              <a:t>// Dereference pointer</a:t>
+            </a:r>
+            <a:endParaRPr lang="en-US" sz="1800">
+              <a:solidFill>
+                <a:srgbClr val="000000"/>
+              </a:solidFill>
+              <a:latin typeface="Cascadia Mono" panose="020B0609020000020004" pitchFamily="49" charset="0"/>
+            </a:endParaRPr>
+          </a:p>
+          <a:p>
+            <a:r>
+              <a:rPr lang="en-US" sz="1800">
+                <a:solidFill>
+                  <a:srgbClr val="000000"/>
+                </a:solidFill>
+                <a:latin typeface="Cascadia Mono" panose="020B0609020000020004" pitchFamily="49" charset="0"/>
+              </a:rPr>
+              <a:t>Console.WriteLine(*doublePtr);</a:t>
+            </a:r>
+          </a:p>
+        </p:txBody>
+      </p:sp>
+    </p:spTree>
+    <p:extLst>
+      <p:ext uri="{BB962C8B-B14F-4D97-AF65-F5344CB8AC3E}">
+        <p14:creationId xmlns:p14="http://schemas.microsoft.com/office/powerpoint/2010/main" val="1594199948"/>
+      </p:ext>
+    </p:extLst>
+  </p:cSld>
+  <p:clrMapOvr>
+    <a:masterClrMapping/>
+  </p:clrMapOvr>
+</p:sld>
+</file>
+
+<file path=ppt/slides/slide9.xml><?xml version="1.0" encoding="utf-8"?>
+<p:sld xmlns:a="http://schemas.openxmlformats.org/drawingml/2006/main" xmlns:r="http://schemas.openxmlformats.org/officeDocument/2006/relationships" xmlns:p="http://schemas.openxmlformats.org/presentationml/2006/main">
+  <p:cSld>
+    <p:spTree>
+      <p:nvGrpSpPr>
+        <p:cNvPr id="1" name=""/>
+        <p:cNvGrpSpPr/>
+        <p:nvPr/>
+      </p:nvGrpSpPr>
+      <p:grpSpPr>
+        <a:xfrm>
+          <a:off x="0" y="0"/>
+          <a:ext cx="0" cy="0"/>
+          <a:chOff x="0" y="0"/>
+          <a:chExt cx="0" cy="0"/>
+        </a:xfrm>
+      </p:grpSpPr>
+      <p:sp>
+        <p:nvSpPr>
+          <p:cNvPr id="2" name="Title 1">
+            <a:extLst>
+              <a:ext uri="{FF2B5EF4-FFF2-40B4-BE49-F238E27FC236}">
+                <a16:creationId xmlns:a16="http://schemas.microsoft.com/office/drawing/2014/main" id="{76675954-C7B6-23E7-CBDA-6E9BC481AA10}"/>
+              </a:ext>
+            </a:extLst>
+          </p:cNvPr>
+          <p:cNvSpPr>
+            <a:spLocks noGrp="1"/>
+          </p:cNvSpPr>
+          <p:nvPr>
+            <p:ph type="title"/>
+          </p:nvPr>
+        </p:nvSpPr>
+        <p:spPr/>
+        <p:txBody>
+          <a:bodyPr/>
+          <a:lstStyle/>
+          <a:p>
+            <a:r>
+              <a:rPr lang="en-US"/>
+              <a:t>Unsafe C# features</a:t>
+            </a:r>
+            <a:br>
+              <a:rPr lang="en-US"/>
+            </a:br>
+            <a:r>
+              <a:rPr lang="en-US"/>
+              <a:t>Pointer operations II</a:t>
+            </a:r>
+          </a:p>
+        </p:txBody>
+      </p:sp>
+      <p:sp>
+        <p:nvSpPr>
+          <p:cNvPr id="3" name="Content Placeholder 2">
+            <a:extLst>
+              <a:ext uri="{FF2B5EF4-FFF2-40B4-BE49-F238E27FC236}">
+                <a16:creationId xmlns:a16="http://schemas.microsoft.com/office/drawing/2014/main" id="{1F7CC20D-4401-3B3D-6CC2-8576753EA120}"/>
+              </a:ext>
+            </a:extLst>
+          </p:cNvPr>
+          <p:cNvSpPr>
+            <a:spLocks noGrp="1"/>
+          </p:cNvSpPr>
+          <p:nvPr>
+            <p:ph idx="1"/>
+          </p:nvPr>
+        </p:nvSpPr>
+        <p:spPr/>
+        <p:txBody>
+          <a:bodyPr/>
+          <a:lstStyle/>
+          <a:p>
+            <a:endParaRPr lang="en-US"/>
+          </a:p>
+        </p:txBody>
+      </p:sp>
+      <p:sp>
+        <p:nvSpPr>
+          <p:cNvPr id="4" name="TextBox 3">
+            <a:extLst>
+              <a:ext uri="{FF2B5EF4-FFF2-40B4-BE49-F238E27FC236}">
+                <a16:creationId xmlns:a16="http://schemas.microsoft.com/office/drawing/2014/main" id="{CBF605D8-023C-40F0-FA22-DCD38C6871CA}"/>
+              </a:ext>
+            </a:extLst>
+          </p:cNvPr>
+          <p:cNvSpPr txBox="1"/>
+          <p:nvPr/>
+        </p:nvSpPr>
+        <p:spPr>
+          <a:xfrm>
+            <a:off x="1103312" y="2052919"/>
+            <a:ext cx="8946541" cy="4195480"/>
+          </a:xfrm>
+          <a:prstGeom prst="rect">
+            <a:avLst/>
+          </a:prstGeom>
+          <a:solidFill>
+            <a:schemeClr val="tx1"/>
+          </a:solidFill>
+          <a:ln w="15875">
+            <a:solidFill>
+              <a:schemeClr val="accent1"/>
+            </a:solidFill>
+          </a:ln>
+        </p:spPr>
+        <p:txBody>
+          <a:bodyPr wrap="square" rtlCol="0">
+            <a:noAutofit/>
+          </a:bodyPr>
+          <a:lstStyle/>
+          <a:p>
+            <a:r>
+              <a:rPr lang="en-US" sz="1800">
+                <a:solidFill>
+                  <a:srgbClr val="000000"/>
+                </a:solidFill>
+                <a:latin typeface="Cascadia Mono" panose="020B0609020000020004" pitchFamily="49" charset="0"/>
+              </a:rPr>
+              <a:t>Struct s = </a:t>
+            </a:r>
+            <a:r>
+              <a:rPr lang="en-US" sz="1800">
+                <a:solidFill>
+                  <a:srgbClr val="0000FF"/>
+                </a:solidFill>
+                <a:latin typeface="Cascadia Mono" panose="020B0609020000020004" pitchFamily="49" charset="0"/>
+              </a:rPr>
+              <a:t>new</a:t>
+            </a:r>
+            <a:r>
+              <a:rPr lang="en-US" sz="1800">
+                <a:solidFill>
+                  <a:srgbClr val="000000"/>
+                </a:solidFill>
+                <a:latin typeface="Cascadia Mono" panose="020B0609020000020004" pitchFamily="49" charset="0"/>
+              </a:rPr>
+              <a:t> Struct { Integer = 47, Double = 4.77 };</a:t>
+            </a:r>
+          </a:p>
+          <a:p>
+            <a:r>
+              <a:rPr lang="en-US" sz="1800">
+                <a:solidFill>
+                  <a:srgbClr val="000000"/>
+                </a:solidFill>
+                <a:latin typeface="Cascadia Mono" panose="020B0609020000020004" pitchFamily="49" charset="0"/>
+              </a:rPr>
+              <a:t>Struct* sPtr = &amp;s;</a:t>
+            </a:r>
+          </a:p>
+          <a:p>
+            <a:endParaRPr lang="en-US" sz="1800">
+              <a:solidFill>
+                <a:srgbClr val="000000"/>
+              </a:solidFill>
+              <a:latin typeface="Cascadia Mono" panose="020B0609020000020004" pitchFamily="49" charset="0"/>
+            </a:endParaRPr>
+          </a:p>
+          <a:p>
+            <a:r>
+              <a:rPr lang="en-US" sz="1800">
+                <a:solidFill>
+                  <a:srgbClr val="008000"/>
+                </a:solidFill>
+                <a:latin typeface="Cascadia Mono" panose="020B0609020000020004" pitchFamily="49" charset="0"/>
+              </a:rPr>
+              <a:t>// Dereference pointer and access member</a:t>
+            </a:r>
+            <a:endParaRPr lang="en-US" sz="1800">
+              <a:solidFill>
+                <a:srgbClr val="000000"/>
+              </a:solidFill>
+              <a:latin typeface="Cascadia Mono" panose="020B0609020000020004" pitchFamily="49" charset="0"/>
+            </a:endParaRPr>
+          </a:p>
+          <a:p>
+            <a:r>
+              <a:rPr lang="en-US" sz="1800">
+                <a:solidFill>
+                  <a:srgbClr val="000000"/>
+                </a:solidFill>
+                <a:latin typeface="Cascadia Mono" panose="020B0609020000020004" pitchFamily="49" charset="0"/>
+              </a:rPr>
+              <a:t>sPtr-&gt;Integer = 42;</a:t>
+            </a:r>
+          </a:p>
+          <a:p>
+            <a:r>
+              <a:rPr lang="en-US" sz="1800">
+                <a:solidFill>
+                  <a:srgbClr val="000000"/>
+                </a:solidFill>
+                <a:latin typeface="Cascadia Mono" panose="020B0609020000020004" pitchFamily="49" charset="0"/>
+              </a:rPr>
+              <a:t>Console.WriteLine(sPtr-&gt;Integer);</a:t>
+            </a:r>
+          </a:p>
+        </p:txBody>
+      </p:sp>
+    </p:spTree>
+    <p:extLst>
+      <p:ext uri="{BB962C8B-B14F-4D97-AF65-F5344CB8AC3E}">
+        <p14:creationId xmlns:p14="http://schemas.microsoft.com/office/powerpoint/2010/main" val="3080254063"/>
       </p:ext>
     </p:extLst>
   </p:cSld>

</xml_diff>

<commit_message>
Completed section on unsafe C# features
</commit_message>
<xml_diff>
--- a/doc/Introduction to unsafe C#.pptx
+++ b/doc/Introduction to unsafe C#.pptx
@@ -14,6 +14,9 @@
     <p:sldId id="262" r:id="rId8"/>
     <p:sldId id="263" r:id="rId9"/>
     <p:sldId id="264" r:id="rId10"/>
+    <p:sldId id="265" r:id="rId11"/>
+    <p:sldId id="266" r:id="rId12"/>
+    <p:sldId id="267" r:id="rId13"/>
   </p:sldIdLst>
   <p:sldSz cx="12192000" cy="6858000"/>
   <p:notesSz cx="6858000" cy="9144000"/>
@@ -6744,6 +6747,1627 @@
 </p:sld>
 </file>
 
+<file path=ppt/slides/slide10.xml><?xml version="1.0" encoding="utf-8"?>
+<p:sld xmlns:a="http://schemas.openxmlformats.org/drawingml/2006/main" xmlns:r="http://schemas.openxmlformats.org/officeDocument/2006/relationships" xmlns:p="http://schemas.openxmlformats.org/presentationml/2006/main">
+  <p:cSld>
+    <p:spTree>
+      <p:nvGrpSpPr>
+        <p:cNvPr id="1" name=""/>
+        <p:cNvGrpSpPr/>
+        <p:nvPr/>
+      </p:nvGrpSpPr>
+      <p:grpSpPr>
+        <a:xfrm>
+          <a:off x="0" y="0"/>
+          <a:ext cx="0" cy="0"/>
+          <a:chOff x="0" y="0"/>
+          <a:chExt cx="0" cy="0"/>
+        </a:xfrm>
+      </p:grpSpPr>
+      <p:sp>
+        <p:nvSpPr>
+          <p:cNvPr id="2" name="Title 1">
+            <a:extLst>
+              <a:ext uri="{FF2B5EF4-FFF2-40B4-BE49-F238E27FC236}">
+                <a16:creationId xmlns:a16="http://schemas.microsoft.com/office/drawing/2014/main" id="{D62F61EF-C8F0-CDD0-49C4-8F5F97FFB8BE}"/>
+              </a:ext>
+            </a:extLst>
+          </p:cNvPr>
+          <p:cNvSpPr>
+            <a:spLocks noGrp="1"/>
+          </p:cNvSpPr>
+          <p:nvPr>
+            <p:ph type="title"/>
+          </p:nvPr>
+        </p:nvSpPr>
+        <p:spPr/>
+        <p:txBody>
+          <a:bodyPr/>
+          <a:lstStyle/>
+          <a:p>
+            <a:r>
+              <a:rPr lang="en-US"/>
+              <a:t>Unsafe C# features</a:t>
+            </a:r>
+            <a:br>
+              <a:rPr lang="en-US"/>
+            </a:br>
+            <a:r>
+              <a:rPr lang="en-US"/>
+              <a:t>Pointer operations III</a:t>
+            </a:r>
+          </a:p>
+        </p:txBody>
+      </p:sp>
+      <p:sp>
+        <p:nvSpPr>
+          <p:cNvPr id="3" name="Content Placeholder 2">
+            <a:extLst>
+              <a:ext uri="{FF2B5EF4-FFF2-40B4-BE49-F238E27FC236}">
+                <a16:creationId xmlns:a16="http://schemas.microsoft.com/office/drawing/2014/main" id="{7CA10E1D-6BE6-B9EE-FBF1-E5F05F981322}"/>
+              </a:ext>
+            </a:extLst>
+          </p:cNvPr>
+          <p:cNvSpPr>
+            <a:spLocks noGrp="1"/>
+          </p:cNvSpPr>
+          <p:nvPr>
+            <p:ph idx="1"/>
+          </p:nvPr>
+        </p:nvSpPr>
+        <p:spPr/>
+        <p:txBody>
+          <a:bodyPr/>
+          <a:lstStyle/>
+          <a:p>
+            <a:endParaRPr lang="en-US"/>
+          </a:p>
+        </p:txBody>
+      </p:sp>
+      <p:sp>
+        <p:nvSpPr>
+          <p:cNvPr id="4" name="TextBox 3">
+            <a:extLst>
+              <a:ext uri="{FF2B5EF4-FFF2-40B4-BE49-F238E27FC236}">
+                <a16:creationId xmlns:a16="http://schemas.microsoft.com/office/drawing/2014/main" id="{D6028146-11ED-D055-5370-3C2A9897933F}"/>
+              </a:ext>
+            </a:extLst>
+          </p:cNvPr>
+          <p:cNvSpPr txBox="1"/>
+          <p:nvPr/>
+        </p:nvSpPr>
+        <p:spPr>
+          <a:xfrm>
+            <a:off x="1103312" y="2052917"/>
+            <a:ext cx="8946541" cy="4195481"/>
+          </a:xfrm>
+          <a:prstGeom prst="rect">
+            <a:avLst/>
+          </a:prstGeom>
+          <a:solidFill>
+            <a:schemeClr val="tx1"/>
+          </a:solidFill>
+          <a:ln w="15875">
+            <a:solidFill>
+              <a:schemeClr val="accent1"/>
+            </a:solidFill>
+          </a:ln>
+        </p:spPr>
+        <p:txBody>
+          <a:bodyPr wrap="square" rtlCol="0">
+            <a:noAutofit/>
+          </a:bodyPr>
+          <a:lstStyle/>
+          <a:p>
+            <a:r>
+              <a:rPr lang="en-US" sz="1800" dirty="0">
+                <a:solidFill>
+                  <a:srgbClr val="0000FF"/>
+                </a:solidFill>
+                <a:latin typeface="Cascadia Mono" panose="020B0609020000020004" pitchFamily="49" charset="0"/>
+              </a:rPr>
+              <a:t>public</a:t>
+            </a:r>
+            <a:r>
+              <a:rPr lang="en-US" sz="1800" dirty="0">
+                <a:solidFill>
+                  <a:srgbClr val="000000"/>
+                </a:solidFill>
+                <a:latin typeface="Cascadia Mono" panose="020B0609020000020004" pitchFamily="49" charset="0"/>
+              </a:rPr>
+              <a:t> </a:t>
+            </a:r>
+            <a:r>
+              <a:rPr lang="en-US" sz="1800" dirty="0">
+                <a:solidFill>
+                  <a:srgbClr val="0000FF"/>
+                </a:solidFill>
+                <a:latin typeface="Cascadia Mono" panose="020B0609020000020004" pitchFamily="49" charset="0"/>
+              </a:rPr>
+              <a:t>unsafe</a:t>
+            </a:r>
+            <a:r>
+              <a:rPr lang="en-US" sz="1800" dirty="0">
+                <a:solidFill>
+                  <a:srgbClr val="000000"/>
+                </a:solidFill>
+                <a:latin typeface="Cascadia Mono" panose="020B0609020000020004" pitchFamily="49" charset="0"/>
+              </a:rPr>
+              <a:t> </a:t>
+            </a:r>
+            <a:r>
+              <a:rPr lang="en-US" sz="1800" dirty="0">
+                <a:solidFill>
+                  <a:srgbClr val="0000FF"/>
+                </a:solidFill>
+                <a:latin typeface="Cascadia Mono" panose="020B0609020000020004" pitchFamily="49" charset="0"/>
+              </a:rPr>
+              <a:t>static</a:t>
+            </a:r>
+            <a:r>
+              <a:rPr lang="en-US" sz="1800" dirty="0">
+                <a:solidFill>
+                  <a:srgbClr val="000000"/>
+                </a:solidFill>
+                <a:latin typeface="Cascadia Mono" panose="020B0609020000020004" pitchFamily="49" charset="0"/>
+              </a:rPr>
+              <a:t> </a:t>
+            </a:r>
+            <a:r>
+              <a:rPr lang="en-US" sz="1800" dirty="0">
+                <a:solidFill>
+                  <a:srgbClr val="0000FF"/>
+                </a:solidFill>
+                <a:latin typeface="Cascadia Mono" panose="020B0609020000020004" pitchFamily="49" charset="0"/>
+              </a:rPr>
+              <a:t>void</a:t>
+            </a:r>
+            <a:r>
+              <a:rPr lang="en-US" sz="1800" dirty="0">
+                <a:solidFill>
+                  <a:srgbClr val="000000"/>
+                </a:solidFill>
+                <a:latin typeface="Cascadia Mono" panose="020B0609020000020004" pitchFamily="49" charset="0"/>
+              </a:rPr>
+              <a:t> </a:t>
+            </a:r>
+            <a:r>
+              <a:rPr lang="en-US" sz="1800" dirty="0" err="1">
+                <a:solidFill>
+                  <a:srgbClr val="000000"/>
+                </a:solidFill>
+                <a:latin typeface="Cascadia Mono" panose="020B0609020000020004" pitchFamily="49" charset="0"/>
+              </a:rPr>
+              <a:t>AsciiToUpper</a:t>
+            </a:r>
+            <a:r>
+              <a:rPr lang="en-US" sz="1800" dirty="0">
+                <a:solidFill>
+                  <a:srgbClr val="000000"/>
+                </a:solidFill>
+                <a:latin typeface="Cascadia Mono" panose="020B0609020000020004" pitchFamily="49" charset="0"/>
+              </a:rPr>
+              <a:t>(</a:t>
+            </a:r>
+            <a:r>
+              <a:rPr lang="en-US" sz="1800" dirty="0">
+                <a:solidFill>
+                  <a:srgbClr val="0000FF"/>
+                </a:solidFill>
+                <a:latin typeface="Cascadia Mono" panose="020B0609020000020004" pitchFamily="49" charset="0"/>
+              </a:rPr>
+              <a:t>this</a:t>
+            </a:r>
+            <a:r>
+              <a:rPr lang="en-US" sz="1800" dirty="0">
+                <a:solidFill>
+                  <a:srgbClr val="000000"/>
+                </a:solidFill>
+                <a:latin typeface="Cascadia Mono" panose="020B0609020000020004" pitchFamily="49" charset="0"/>
+              </a:rPr>
+              <a:t> </a:t>
+            </a:r>
+            <a:r>
+              <a:rPr lang="en-US" sz="1800" dirty="0">
+                <a:solidFill>
+                  <a:srgbClr val="0000FF"/>
+                </a:solidFill>
+                <a:latin typeface="Cascadia Mono" panose="020B0609020000020004" pitchFamily="49" charset="0"/>
+              </a:rPr>
+              <a:t>string</a:t>
+            </a:r>
+            <a:r>
+              <a:rPr lang="en-US" sz="1800" dirty="0">
+                <a:solidFill>
+                  <a:srgbClr val="000000"/>
+                </a:solidFill>
+                <a:latin typeface="Cascadia Mono" panose="020B0609020000020004" pitchFamily="49" charset="0"/>
+              </a:rPr>
+              <a:t> s) {</a:t>
+            </a:r>
+          </a:p>
+          <a:p>
+            <a:r>
+              <a:rPr lang="en-US" sz="1800" dirty="0">
+                <a:solidFill>
+                  <a:srgbClr val="000000"/>
+                </a:solidFill>
+                <a:latin typeface="Cascadia Mono" panose="020B0609020000020004" pitchFamily="49" charset="0"/>
+              </a:rPr>
+              <a:t>    </a:t>
+            </a:r>
+            <a:r>
+              <a:rPr lang="en-US" sz="1800" dirty="0">
+                <a:solidFill>
+                  <a:srgbClr val="0000FF"/>
+                </a:solidFill>
+                <a:latin typeface="Cascadia Mono" panose="020B0609020000020004" pitchFamily="49" charset="0"/>
+              </a:rPr>
+              <a:t>fixed</a:t>
+            </a:r>
+            <a:r>
+              <a:rPr lang="en-US" sz="1800" dirty="0">
+                <a:solidFill>
+                  <a:srgbClr val="000000"/>
+                </a:solidFill>
+                <a:latin typeface="Cascadia Mono" panose="020B0609020000020004" pitchFamily="49" charset="0"/>
+              </a:rPr>
+              <a:t> (</a:t>
+            </a:r>
+            <a:r>
+              <a:rPr lang="en-US" sz="1800" dirty="0">
+                <a:solidFill>
+                  <a:srgbClr val="0000FF"/>
+                </a:solidFill>
+                <a:latin typeface="Cascadia Mono" panose="020B0609020000020004" pitchFamily="49" charset="0"/>
+              </a:rPr>
+              <a:t>char</a:t>
+            </a:r>
+            <a:r>
+              <a:rPr lang="en-US" sz="1800" dirty="0">
+                <a:solidFill>
+                  <a:srgbClr val="000000"/>
+                </a:solidFill>
+                <a:latin typeface="Cascadia Mono" panose="020B0609020000020004" pitchFamily="49" charset="0"/>
+              </a:rPr>
+              <a:t>* p = s) {</a:t>
+            </a:r>
+          </a:p>
+          <a:p>
+            <a:r>
+              <a:rPr lang="en-US" sz="1800" dirty="0">
+                <a:solidFill>
+                  <a:srgbClr val="000000"/>
+                </a:solidFill>
+                <a:latin typeface="Cascadia Mono" panose="020B0609020000020004" pitchFamily="49" charset="0"/>
+              </a:rPr>
+              <a:t>        </a:t>
+            </a:r>
+            <a:r>
+              <a:rPr lang="en-US" sz="1800" dirty="0">
+                <a:solidFill>
+                  <a:srgbClr val="0000FF"/>
+                </a:solidFill>
+                <a:latin typeface="Cascadia Mono" panose="020B0609020000020004" pitchFamily="49" charset="0"/>
+              </a:rPr>
+              <a:t>char</a:t>
+            </a:r>
+            <a:r>
+              <a:rPr lang="en-US" sz="1800" dirty="0">
+                <a:solidFill>
+                  <a:srgbClr val="000000"/>
+                </a:solidFill>
+                <a:latin typeface="Cascadia Mono" panose="020B0609020000020004" pitchFamily="49" charset="0"/>
+              </a:rPr>
+              <a:t>* </a:t>
+            </a:r>
+            <a:r>
+              <a:rPr lang="en-US" sz="1800" dirty="0" err="1">
+                <a:solidFill>
+                  <a:srgbClr val="000000"/>
+                </a:solidFill>
+                <a:latin typeface="Cascadia Mono" panose="020B0609020000020004" pitchFamily="49" charset="0"/>
+              </a:rPr>
+              <a:t>ptr</a:t>
+            </a:r>
+            <a:r>
+              <a:rPr lang="en-US" sz="1800" dirty="0">
+                <a:solidFill>
+                  <a:srgbClr val="000000"/>
+                </a:solidFill>
+                <a:latin typeface="Cascadia Mono" panose="020B0609020000020004" pitchFamily="49" charset="0"/>
+              </a:rPr>
+              <a:t> = p;</a:t>
+            </a:r>
+          </a:p>
+          <a:p>
+            <a:r>
+              <a:rPr lang="en-US" sz="1800" dirty="0">
+                <a:solidFill>
+                  <a:srgbClr val="000000"/>
+                </a:solidFill>
+                <a:latin typeface="Cascadia Mono" panose="020B0609020000020004" pitchFamily="49" charset="0"/>
+              </a:rPr>
+              <a:t>        </a:t>
+            </a:r>
+            <a:r>
+              <a:rPr lang="en-US" sz="1800" dirty="0">
+                <a:solidFill>
+                  <a:srgbClr val="0000FF"/>
+                </a:solidFill>
+                <a:latin typeface="Cascadia Mono" panose="020B0609020000020004" pitchFamily="49" charset="0"/>
+              </a:rPr>
+              <a:t>char</a:t>
+            </a:r>
+            <a:r>
+              <a:rPr lang="en-US" sz="1800" dirty="0">
+                <a:solidFill>
+                  <a:srgbClr val="000000"/>
+                </a:solidFill>
+                <a:latin typeface="Cascadia Mono" panose="020B0609020000020004" pitchFamily="49" charset="0"/>
+              </a:rPr>
+              <a:t>* end = </a:t>
+            </a:r>
+            <a:r>
+              <a:rPr lang="en-US" sz="1800" dirty="0" err="1">
+                <a:solidFill>
+                  <a:srgbClr val="000000"/>
+                </a:solidFill>
+                <a:latin typeface="Cascadia Mono" panose="020B0609020000020004" pitchFamily="49" charset="0"/>
+              </a:rPr>
+              <a:t>ptr</a:t>
+            </a:r>
+            <a:r>
+              <a:rPr lang="en-US" sz="1800" dirty="0">
+                <a:solidFill>
+                  <a:srgbClr val="000000"/>
+                </a:solidFill>
+                <a:latin typeface="Cascadia Mono" panose="020B0609020000020004" pitchFamily="49" charset="0"/>
+              </a:rPr>
+              <a:t> + </a:t>
+            </a:r>
+            <a:r>
+              <a:rPr lang="en-US" sz="1800" dirty="0" err="1">
+                <a:solidFill>
+                  <a:srgbClr val="000000"/>
+                </a:solidFill>
+                <a:latin typeface="Cascadia Mono" panose="020B0609020000020004" pitchFamily="49" charset="0"/>
+              </a:rPr>
+              <a:t>s.Length</a:t>
+            </a:r>
+            <a:r>
+              <a:rPr lang="en-US" sz="1800" dirty="0">
+                <a:solidFill>
+                  <a:srgbClr val="000000"/>
+                </a:solidFill>
+                <a:latin typeface="Cascadia Mono" panose="020B0609020000020004" pitchFamily="49" charset="0"/>
+              </a:rPr>
+              <a:t>; </a:t>
+            </a:r>
+            <a:r>
+              <a:rPr lang="en-US" sz="1800" dirty="0">
+                <a:solidFill>
+                  <a:srgbClr val="008000"/>
+                </a:solidFill>
+                <a:latin typeface="Cascadia Mono" panose="020B0609020000020004" pitchFamily="49" charset="0"/>
+              </a:rPr>
+              <a:t>// Pointer arithmetic</a:t>
+            </a:r>
+            <a:endParaRPr lang="en-US" sz="1800" dirty="0">
+              <a:solidFill>
+                <a:srgbClr val="000000"/>
+              </a:solidFill>
+              <a:latin typeface="Cascadia Mono" panose="020B0609020000020004" pitchFamily="49" charset="0"/>
+            </a:endParaRPr>
+          </a:p>
+          <a:p>
+            <a:endParaRPr lang="en-US" sz="1800" dirty="0">
+              <a:solidFill>
+                <a:srgbClr val="000000"/>
+              </a:solidFill>
+              <a:latin typeface="Cascadia Mono" panose="020B0609020000020004" pitchFamily="49" charset="0"/>
+            </a:endParaRPr>
+          </a:p>
+          <a:p>
+            <a:r>
+              <a:rPr lang="en-US" sz="1800" dirty="0">
+                <a:solidFill>
+                  <a:srgbClr val="000000"/>
+                </a:solidFill>
+                <a:latin typeface="Cascadia Mono" panose="020B0609020000020004" pitchFamily="49" charset="0"/>
+              </a:rPr>
+              <a:t>        </a:t>
+            </a:r>
+            <a:r>
+              <a:rPr lang="en-US" sz="1800" dirty="0">
+                <a:solidFill>
+                  <a:srgbClr val="0000FF"/>
+                </a:solidFill>
+                <a:latin typeface="Cascadia Mono" panose="020B0609020000020004" pitchFamily="49" charset="0"/>
+              </a:rPr>
+              <a:t>while</a:t>
+            </a:r>
+            <a:r>
+              <a:rPr lang="en-US" sz="1800" dirty="0">
+                <a:solidFill>
+                  <a:srgbClr val="000000"/>
+                </a:solidFill>
+                <a:latin typeface="Cascadia Mono" panose="020B0609020000020004" pitchFamily="49" charset="0"/>
+              </a:rPr>
+              <a:t> (</a:t>
+            </a:r>
+            <a:r>
+              <a:rPr lang="en-US" sz="1800" dirty="0" err="1">
+                <a:solidFill>
+                  <a:srgbClr val="000000"/>
+                </a:solidFill>
+                <a:latin typeface="Cascadia Mono" panose="020B0609020000020004" pitchFamily="49" charset="0"/>
+              </a:rPr>
+              <a:t>ptr</a:t>
+            </a:r>
+            <a:r>
+              <a:rPr lang="en-US" sz="1800" dirty="0">
+                <a:solidFill>
+                  <a:srgbClr val="000000"/>
+                </a:solidFill>
+                <a:latin typeface="Cascadia Mono" panose="020B0609020000020004" pitchFamily="49" charset="0"/>
+              </a:rPr>
+              <a:t> &lt; end) { </a:t>
+            </a:r>
+            <a:r>
+              <a:rPr lang="en-US" sz="1800" dirty="0">
+                <a:solidFill>
+                  <a:srgbClr val="008000"/>
+                </a:solidFill>
+                <a:latin typeface="Cascadia Mono" panose="020B0609020000020004" pitchFamily="49" charset="0"/>
+              </a:rPr>
+              <a:t>// Pointer comparison</a:t>
+            </a:r>
+            <a:endParaRPr lang="en-US" sz="1800" dirty="0">
+              <a:solidFill>
+                <a:srgbClr val="000000"/>
+              </a:solidFill>
+              <a:latin typeface="Cascadia Mono" panose="020B0609020000020004" pitchFamily="49" charset="0"/>
+            </a:endParaRPr>
+          </a:p>
+          <a:p>
+            <a:r>
+              <a:rPr lang="en-US" sz="1800" dirty="0">
+                <a:solidFill>
+                  <a:srgbClr val="000000"/>
+                </a:solidFill>
+                <a:latin typeface="Cascadia Mono" panose="020B0609020000020004" pitchFamily="49" charset="0"/>
+              </a:rPr>
+              <a:t>            </a:t>
+            </a:r>
+            <a:r>
+              <a:rPr lang="en-US" sz="1800" dirty="0">
+                <a:solidFill>
+                  <a:srgbClr val="0000FF"/>
+                </a:solidFill>
+                <a:latin typeface="Cascadia Mono" panose="020B0609020000020004" pitchFamily="49" charset="0"/>
+              </a:rPr>
+              <a:t>if</a:t>
+            </a:r>
+            <a:r>
+              <a:rPr lang="en-US" sz="1800" dirty="0">
+                <a:solidFill>
+                  <a:srgbClr val="000000"/>
+                </a:solidFill>
+                <a:latin typeface="Cascadia Mono" panose="020B0609020000020004" pitchFamily="49" charset="0"/>
+              </a:rPr>
+              <a:t> (*</a:t>
+            </a:r>
+            <a:r>
+              <a:rPr lang="en-US" sz="1800" dirty="0" err="1">
+                <a:solidFill>
+                  <a:srgbClr val="000000"/>
+                </a:solidFill>
+                <a:latin typeface="Cascadia Mono" panose="020B0609020000020004" pitchFamily="49" charset="0"/>
+              </a:rPr>
+              <a:t>ptr</a:t>
+            </a:r>
+            <a:r>
+              <a:rPr lang="en-US" sz="1800" dirty="0">
+                <a:solidFill>
+                  <a:srgbClr val="000000"/>
+                </a:solidFill>
+                <a:latin typeface="Cascadia Mono" panose="020B0609020000020004" pitchFamily="49" charset="0"/>
+              </a:rPr>
+              <a:t> &gt;= </a:t>
+            </a:r>
+            <a:r>
+              <a:rPr lang="en-US" sz="1800" dirty="0">
+                <a:solidFill>
+                  <a:srgbClr val="A31515"/>
+                </a:solidFill>
+                <a:latin typeface="Cascadia Mono" panose="020B0609020000020004" pitchFamily="49" charset="0"/>
+              </a:rPr>
+              <a:t>'a'</a:t>
+            </a:r>
+            <a:r>
+              <a:rPr lang="en-US" sz="1800" dirty="0">
+                <a:solidFill>
+                  <a:srgbClr val="000000"/>
+                </a:solidFill>
+                <a:latin typeface="Cascadia Mono" panose="020B0609020000020004" pitchFamily="49" charset="0"/>
+              </a:rPr>
+              <a:t> &amp;&amp; *</a:t>
+            </a:r>
+            <a:r>
+              <a:rPr lang="en-US" sz="1800" dirty="0" err="1">
+                <a:solidFill>
+                  <a:srgbClr val="000000"/>
+                </a:solidFill>
+                <a:latin typeface="Cascadia Mono" panose="020B0609020000020004" pitchFamily="49" charset="0"/>
+              </a:rPr>
+              <a:t>ptr</a:t>
+            </a:r>
+            <a:r>
+              <a:rPr lang="en-US" sz="1800" dirty="0">
+                <a:solidFill>
+                  <a:srgbClr val="000000"/>
+                </a:solidFill>
+                <a:latin typeface="Cascadia Mono" panose="020B0609020000020004" pitchFamily="49" charset="0"/>
+              </a:rPr>
+              <a:t> &lt;= </a:t>
+            </a:r>
+            <a:r>
+              <a:rPr lang="en-US" sz="1800" dirty="0">
+                <a:solidFill>
+                  <a:srgbClr val="A31515"/>
+                </a:solidFill>
+                <a:latin typeface="Cascadia Mono" panose="020B0609020000020004" pitchFamily="49" charset="0"/>
+              </a:rPr>
+              <a:t>'z'</a:t>
+            </a:r>
+            <a:r>
+              <a:rPr lang="en-US" sz="1800" dirty="0">
+                <a:solidFill>
+                  <a:srgbClr val="000000"/>
+                </a:solidFill>
+                <a:latin typeface="Cascadia Mono" panose="020B0609020000020004" pitchFamily="49" charset="0"/>
+              </a:rPr>
+              <a:t>)</a:t>
+            </a:r>
+          </a:p>
+          <a:p>
+            <a:r>
+              <a:rPr lang="en-US" sz="1800" dirty="0">
+                <a:solidFill>
+                  <a:srgbClr val="000000"/>
+                </a:solidFill>
+                <a:latin typeface="Cascadia Mono" panose="020B0609020000020004" pitchFamily="49" charset="0"/>
+              </a:rPr>
+              <a:t>                *</a:t>
+            </a:r>
+            <a:r>
+              <a:rPr lang="en-US" sz="1800" dirty="0" err="1">
+                <a:solidFill>
+                  <a:srgbClr val="000000"/>
+                </a:solidFill>
+                <a:latin typeface="Cascadia Mono" panose="020B0609020000020004" pitchFamily="49" charset="0"/>
+              </a:rPr>
+              <a:t>ptr</a:t>
+            </a:r>
+            <a:r>
+              <a:rPr lang="en-US" sz="1800" dirty="0">
+                <a:solidFill>
+                  <a:srgbClr val="000000"/>
+                </a:solidFill>
+                <a:latin typeface="Cascadia Mono" panose="020B0609020000020004" pitchFamily="49" charset="0"/>
+              </a:rPr>
+              <a:t> -= (</a:t>
+            </a:r>
+            <a:r>
+              <a:rPr lang="en-US" sz="1800" dirty="0">
+                <a:solidFill>
+                  <a:srgbClr val="0000FF"/>
+                </a:solidFill>
+                <a:latin typeface="Cascadia Mono" panose="020B0609020000020004" pitchFamily="49" charset="0"/>
+              </a:rPr>
+              <a:t>char</a:t>
+            </a:r>
+            <a:r>
+              <a:rPr lang="en-US" sz="1800" dirty="0">
+                <a:solidFill>
+                  <a:srgbClr val="000000"/>
+                </a:solidFill>
+                <a:latin typeface="Cascadia Mono" panose="020B0609020000020004" pitchFamily="49" charset="0"/>
+              </a:rPr>
+              <a:t>)(</a:t>
+            </a:r>
+            <a:r>
+              <a:rPr lang="en-US" sz="1800" dirty="0">
+                <a:solidFill>
+                  <a:srgbClr val="A31515"/>
+                </a:solidFill>
+                <a:latin typeface="Cascadia Mono" panose="020B0609020000020004" pitchFamily="49" charset="0"/>
+              </a:rPr>
+              <a:t>'a'</a:t>
+            </a:r>
+            <a:r>
+              <a:rPr lang="en-US" sz="1800" dirty="0">
+                <a:solidFill>
+                  <a:srgbClr val="000000"/>
+                </a:solidFill>
+                <a:latin typeface="Cascadia Mono" panose="020B0609020000020004" pitchFamily="49" charset="0"/>
+              </a:rPr>
+              <a:t> - </a:t>
+            </a:r>
+            <a:r>
+              <a:rPr lang="en-US" sz="1800" dirty="0">
+                <a:solidFill>
+                  <a:srgbClr val="A31515"/>
+                </a:solidFill>
+                <a:latin typeface="Cascadia Mono" panose="020B0609020000020004" pitchFamily="49" charset="0"/>
+              </a:rPr>
+              <a:t>'A'</a:t>
+            </a:r>
+            <a:r>
+              <a:rPr lang="en-US" sz="1800" dirty="0">
+                <a:solidFill>
+                  <a:srgbClr val="000000"/>
+                </a:solidFill>
+                <a:latin typeface="Cascadia Mono" panose="020B0609020000020004" pitchFamily="49" charset="0"/>
+              </a:rPr>
+              <a:t>);</a:t>
+            </a:r>
+          </a:p>
+          <a:p>
+            <a:endParaRPr lang="en-US" sz="1800" dirty="0">
+              <a:solidFill>
+                <a:srgbClr val="000000"/>
+              </a:solidFill>
+              <a:latin typeface="Cascadia Mono" panose="020B0609020000020004" pitchFamily="49" charset="0"/>
+            </a:endParaRPr>
+          </a:p>
+          <a:p>
+            <a:r>
+              <a:rPr lang="en-US" sz="1800" dirty="0">
+                <a:solidFill>
+                  <a:srgbClr val="000000"/>
+                </a:solidFill>
+                <a:latin typeface="Cascadia Mono" panose="020B0609020000020004" pitchFamily="49" charset="0"/>
+              </a:rPr>
+              <a:t>            </a:t>
+            </a:r>
+            <a:r>
+              <a:rPr lang="en-US" sz="1800" dirty="0" err="1">
+                <a:solidFill>
+                  <a:srgbClr val="000000"/>
+                </a:solidFill>
+                <a:latin typeface="Cascadia Mono" panose="020B0609020000020004" pitchFamily="49" charset="0"/>
+              </a:rPr>
+              <a:t>ptr</a:t>
+            </a:r>
+            <a:r>
+              <a:rPr lang="en-US" sz="1800" dirty="0">
+                <a:solidFill>
+                  <a:srgbClr val="000000"/>
+                </a:solidFill>
+                <a:latin typeface="Cascadia Mono" panose="020B0609020000020004" pitchFamily="49" charset="0"/>
+              </a:rPr>
+              <a:t>++; </a:t>
+            </a:r>
+            <a:r>
+              <a:rPr lang="en-US" sz="1800" dirty="0">
+                <a:solidFill>
+                  <a:srgbClr val="008000"/>
+                </a:solidFill>
+                <a:latin typeface="Cascadia Mono" panose="020B0609020000020004" pitchFamily="49" charset="0"/>
+              </a:rPr>
+              <a:t>// Pointer increment</a:t>
+            </a:r>
+            <a:endParaRPr lang="en-US" sz="1800" dirty="0">
+              <a:solidFill>
+                <a:srgbClr val="000000"/>
+              </a:solidFill>
+              <a:latin typeface="Cascadia Mono" panose="020B0609020000020004" pitchFamily="49" charset="0"/>
+            </a:endParaRPr>
+          </a:p>
+          <a:p>
+            <a:r>
+              <a:rPr lang="en-US" sz="1800" dirty="0">
+                <a:solidFill>
+                  <a:srgbClr val="000000"/>
+                </a:solidFill>
+                <a:latin typeface="Cascadia Mono" panose="020B0609020000020004" pitchFamily="49" charset="0"/>
+              </a:rPr>
+              <a:t>        }</a:t>
+            </a:r>
+          </a:p>
+          <a:p>
+            <a:r>
+              <a:rPr lang="en-US" sz="1800" dirty="0">
+                <a:solidFill>
+                  <a:srgbClr val="000000"/>
+                </a:solidFill>
+                <a:latin typeface="Cascadia Mono" panose="020B0609020000020004" pitchFamily="49" charset="0"/>
+              </a:rPr>
+              <a:t>    }</a:t>
+            </a:r>
+          </a:p>
+          <a:p>
+            <a:r>
+              <a:rPr lang="en-US" sz="1800" dirty="0">
+                <a:solidFill>
+                  <a:srgbClr val="000000"/>
+                </a:solidFill>
+                <a:latin typeface="Cascadia Mono" panose="020B0609020000020004" pitchFamily="49" charset="0"/>
+              </a:rPr>
+              <a:t>}</a:t>
+            </a:r>
+            <a:endParaRPr lang="en-US" dirty="0"/>
+          </a:p>
+        </p:txBody>
+      </p:sp>
+    </p:spTree>
+    <p:extLst>
+      <p:ext uri="{BB962C8B-B14F-4D97-AF65-F5344CB8AC3E}">
+        <p14:creationId xmlns:p14="http://schemas.microsoft.com/office/powerpoint/2010/main" val="4289468398"/>
+      </p:ext>
+    </p:extLst>
+  </p:cSld>
+  <p:clrMapOvr>
+    <a:masterClrMapping/>
+  </p:clrMapOvr>
+</p:sld>
+</file>
+
+<file path=ppt/slides/slide11.xml><?xml version="1.0" encoding="utf-8"?>
+<p:sld xmlns:a="http://schemas.openxmlformats.org/drawingml/2006/main" xmlns:r="http://schemas.openxmlformats.org/officeDocument/2006/relationships" xmlns:p="http://schemas.openxmlformats.org/presentationml/2006/main">
+  <p:cSld>
+    <p:spTree>
+      <p:nvGrpSpPr>
+        <p:cNvPr id="1" name=""/>
+        <p:cNvGrpSpPr/>
+        <p:nvPr/>
+      </p:nvGrpSpPr>
+      <p:grpSpPr>
+        <a:xfrm>
+          <a:off x="0" y="0"/>
+          <a:ext cx="0" cy="0"/>
+          <a:chOff x="0" y="0"/>
+          <a:chExt cx="0" cy="0"/>
+        </a:xfrm>
+      </p:grpSpPr>
+      <p:sp>
+        <p:nvSpPr>
+          <p:cNvPr id="2" name="Title 1">
+            <a:extLst>
+              <a:ext uri="{FF2B5EF4-FFF2-40B4-BE49-F238E27FC236}">
+                <a16:creationId xmlns:a16="http://schemas.microsoft.com/office/drawing/2014/main" id="{DE579688-4DFB-7A8E-4A9A-41DCBAD6D775}"/>
+              </a:ext>
+            </a:extLst>
+          </p:cNvPr>
+          <p:cNvSpPr>
+            <a:spLocks noGrp="1"/>
+          </p:cNvSpPr>
+          <p:nvPr>
+            <p:ph type="title"/>
+          </p:nvPr>
+        </p:nvSpPr>
+        <p:spPr/>
+        <p:txBody>
+          <a:bodyPr/>
+          <a:lstStyle/>
+          <a:p>
+            <a:r>
+              <a:rPr lang="en-US"/>
+              <a:t>Unsafe C# features</a:t>
+            </a:r>
+            <a:br>
+              <a:rPr lang="en-US"/>
+            </a:br>
+            <a:r>
+              <a:rPr lang="en-US"/>
+              <a:t>What can you get the address of?</a:t>
+            </a:r>
+          </a:p>
+        </p:txBody>
+      </p:sp>
+      <p:sp>
+        <p:nvSpPr>
+          <p:cNvPr id="3" name="Content Placeholder 2">
+            <a:extLst>
+              <a:ext uri="{FF2B5EF4-FFF2-40B4-BE49-F238E27FC236}">
+                <a16:creationId xmlns:a16="http://schemas.microsoft.com/office/drawing/2014/main" id="{A146F658-8E2E-2518-51C9-71F1D8687B5E}"/>
+              </a:ext>
+            </a:extLst>
+          </p:cNvPr>
+          <p:cNvSpPr>
+            <a:spLocks noGrp="1"/>
+          </p:cNvSpPr>
+          <p:nvPr>
+            <p:ph idx="1"/>
+          </p:nvPr>
+        </p:nvSpPr>
+        <p:spPr/>
+        <p:txBody>
+          <a:bodyPr/>
+          <a:lstStyle/>
+          <a:p>
+            <a:r>
+              <a:rPr lang="en-US" dirty="0"/>
+              <a:t>All value types including (generic) structs…</a:t>
+            </a:r>
+          </a:p>
+          <a:p>
+            <a:r>
+              <a:rPr lang="en-US" dirty="0"/>
+              <a:t>…as long as they don‘t contain any object references</a:t>
+            </a:r>
+          </a:p>
+          <a:p>
+            <a:r>
+              <a:rPr lang="en-US" dirty="0"/>
+              <a:t>Arrays of value types</a:t>
+            </a:r>
+          </a:p>
+          <a:p>
+            <a:r>
+              <a:rPr lang="en-US" dirty="0"/>
+              <a:t>Strings (which are arrays of char)</a:t>
+            </a:r>
+          </a:p>
+        </p:txBody>
+      </p:sp>
+    </p:spTree>
+    <p:extLst>
+      <p:ext uri="{BB962C8B-B14F-4D97-AF65-F5344CB8AC3E}">
+        <p14:creationId xmlns:p14="http://schemas.microsoft.com/office/powerpoint/2010/main" val="3710743643"/>
+      </p:ext>
+    </p:extLst>
+  </p:cSld>
+  <p:clrMapOvr>
+    <a:masterClrMapping/>
+  </p:clrMapOvr>
+  <p:timing>
+    <p:tnLst>
+      <p:par>
+        <p:cTn id="1" dur="indefinite" restart="never" nodeType="tmRoot">
+          <p:childTnLst>
+            <p:seq concurrent="1" nextAc="seek">
+              <p:cTn id="2" dur="indefinite" nodeType="mainSeq">
+                <p:childTnLst>
+                  <p:par>
+                    <p:cTn id="3" fill="hold">
+                      <p:stCondLst>
+                        <p:cond delay="indefinite"/>
+                      </p:stCondLst>
+                      <p:childTnLst>
+                        <p:par>
+                          <p:cTn id="4" fill="hold">
+                            <p:stCondLst>
+                              <p:cond delay="0"/>
+                            </p:stCondLst>
+                            <p:childTnLst>
+                              <p:par>
+                                <p:cTn id="5" presetID="1" presetClass="entr" presetSubtype="0" fill="hold" grpId="0" nodeType="clickEffect">
+                                  <p:stCondLst>
+                                    <p:cond delay="0"/>
+                                  </p:stCondLst>
+                                  <p:childTnLst>
+                                    <p:set>
+                                      <p:cBhvr>
+                                        <p:cTn id="6" dur="1" fill="hold">
+                                          <p:stCondLst>
+                                            <p:cond delay="0"/>
+                                          </p:stCondLst>
+                                        </p:cTn>
+                                        <p:tgtEl>
+                                          <p:spTgt spid="3">
+                                            <p:txEl>
+                                              <p:pRg st="0" end="0"/>
+                                            </p:txEl>
+                                          </p:spTgt>
+                                        </p:tgtEl>
+                                        <p:attrNameLst>
+                                          <p:attrName>style.visibility</p:attrName>
+                                        </p:attrNameLst>
+                                      </p:cBhvr>
+                                      <p:to>
+                                        <p:strVal val="visible"/>
+                                      </p:to>
+                                    </p:set>
+                                  </p:childTnLst>
+                                </p:cTn>
+                              </p:par>
+                            </p:childTnLst>
+                          </p:cTn>
+                        </p:par>
+                      </p:childTnLst>
+                    </p:cTn>
+                  </p:par>
+                  <p:par>
+                    <p:cTn id="7" fill="hold">
+                      <p:stCondLst>
+                        <p:cond delay="indefinite"/>
+                      </p:stCondLst>
+                      <p:childTnLst>
+                        <p:par>
+                          <p:cTn id="8" fill="hold">
+                            <p:stCondLst>
+                              <p:cond delay="0"/>
+                            </p:stCondLst>
+                            <p:childTnLst>
+                              <p:par>
+                                <p:cTn id="9" presetID="1" presetClass="entr" presetSubtype="0" fill="hold" grpId="0" nodeType="clickEffect">
+                                  <p:stCondLst>
+                                    <p:cond delay="0"/>
+                                  </p:stCondLst>
+                                  <p:childTnLst>
+                                    <p:set>
+                                      <p:cBhvr>
+                                        <p:cTn id="10" dur="1" fill="hold">
+                                          <p:stCondLst>
+                                            <p:cond delay="0"/>
+                                          </p:stCondLst>
+                                        </p:cTn>
+                                        <p:tgtEl>
+                                          <p:spTgt spid="3">
+                                            <p:txEl>
+                                              <p:pRg st="1" end="1"/>
+                                            </p:txEl>
+                                          </p:spTgt>
+                                        </p:tgtEl>
+                                        <p:attrNameLst>
+                                          <p:attrName>style.visibility</p:attrName>
+                                        </p:attrNameLst>
+                                      </p:cBhvr>
+                                      <p:to>
+                                        <p:strVal val="visible"/>
+                                      </p:to>
+                                    </p:set>
+                                  </p:childTnLst>
+                                </p:cTn>
+                              </p:par>
+                            </p:childTnLst>
+                          </p:cTn>
+                        </p:par>
+                      </p:childTnLst>
+                    </p:cTn>
+                  </p:par>
+                  <p:par>
+                    <p:cTn id="11" fill="hold">
+                      <p:stCondLst>
+                        <p:cond delay="indefinite"/>
+                      </p:stCondLst>
+                      <p:childTnLst>
+                        <p:par>
+                          <p:cTn id="12" fill="hold">
+                            <p:stCondLst>
+                              <p:cond delay="0"/>
+                            </p:stCondLst>
+                            <p:childTnLst>
+                              <p:par>
+                                <p:cTn id="13" presetID="1" presetClass="entr" presetSubtype="0" fill="hold" grpId="0" nodeType="clickEffect">
+                                  <p:stCondLst>
+                                    <p:cond delay="0"/>
+                                  </p:stCondLst>
+                                  <p:childTnLst>
+                                    <p:set>
+                                      <p:cBhvr>
+                                        <p:cTn id="14" dur="1" fill="hold">
+                                          <p:stCondLst>
+                                            <p:cond delay="0"/>
+                                          </p:stCondLst>
+                                        </p:cTn>
+                                        <p:tgtEl>
+                                          <p:spTgt spid="3">
+                                            <p:txEl>
+                                              <p:pRg st="2" end="2"/>
+                                            </p:txEl>
+                                          </p:spTgt>
+                                        </p:tgtEl>
+                                        <p:attrNameLst>
+                                          <p:attrName>style.visibility</p:attrName>
+                                        </p:attrNameLst>
+                                      </p:cBhvr>
+                                      <p:to>
+                                        <p:strVal val="visible"/>
+                                      </p:to>
+                                    </p:set>
+                                  </p:childTnLst>
+                                </p:cTn>
+                              </p:par>
+                            </p:childTnLst>
+                          </p:cTn>
+                        </p:par>
+                      </p:childTnLst>
+                    </p:cTn>
+                  </p:par>
+                  <p:par>
+                    <p:cTn id="15" fill="hold">
+                      <p:stCondLst>
+                        <p:cond delay="indefinite"/>
+                      </p:stCondLst>
+                      <p:childTnLst>
+                        <p:par>
+                          <p:cTn id="16" fill="hold">
+                            <p:stCondLst>
+                              <p:cond delay="0"/>
+                            </p:stCondLst>
+                            <p:childTnLst>
+                              <p:par>
+                                <p:cTn id="17" presetID="1" presetClass="entr" presetSubtype="0" fill="hold" grpId="0" nodeType="clickEffect">
+                                  <p:stCondLst>
+                                    <p:cond delay="0"/>
+                                  </p:stCondLst>
+                                  <p:childTnLst>
+                                    <p:set>
+                                      <p:cBhvr>
+                                        <p:cTn id="18" dur="1" fill="hold">
+                                          <p:stCondLst>
+                                            <p:cond delay="0"/>
+                                          </p:stCondLst>
+                                        </p:cTn>
+                                        <p:tgtEl>
+                                          <p:spTgt spid="3">
+                                            <p:txEl>
+                                              <p:pRg st="3" end="3"/>
+                                            </p:txEl>
+                                          </p:spTgt>
+                                        </p:tgtEl>
+                                        <p:attrNameLst>
+                                          <p:attrName>style.visibility</p:attrName>
+                                        </p:attrNameLst>
+                                      </p:cBhvr>
+                                      <p:to>
+                                        <p:strVal val="visible"/>
+                                      </p:to>
+                                    </p:set>
+                                  </p:childTnLst>
+                                </p:cTn>
+                              </p:par>
+                            </p:childTnLst>
+                          </p:cTn>
+                        </p:par>
+                      </p:childTnLst>
+                    </p:cTn>
+                  </p:par>
+                </p:childTnLst>
+              </p:cTn>
+              <p:prevCondLst>
+                <p:cond evt="onPrev" delay="0">
+                  <p:tgtEl>
+                    <p:sldTgt/>
+                  </p:tgtEl>
+                </p:cond>
+              </p:prevCondLst>
+              <p:nextCondLst>
+                <p:cond evt="onNext" delay="0">
+                  <p:tgtEl>
+                    <p:sldTgt/>
+                  </p:tgtEl>
+                </p:cond>
+              </p:nextCondLst>
+            </p:seq>
+          </p:childTnLst>
+        </p:cTn>
+      </p:par>
+    </p:tnLst>
+    <p:bldLst>
+      <p:bldP spid="3" grpId="0" build="p"/>
+    </p:bldLst>
+  </p:timing>
+</p:sld>
+</file>
+
+<file path=ppt/slides/slide12.xml><?xml version="1.0" encoding="utf-8"?>
+<p:sld xmlns:a="http://schemas.openxmlformats.org/drawingml/2006/main" xmlns:r="http://schemas.openxmlformats.org/officeDocument/2006/relationships" xmlns:p="http://schemas.openxmlformats.org/presentationml/2006/main">
+  <p:cSld>
+    <p:spTree>
+      <p:nvGrpSpPr>
+        <p:cNvPr id="1" name=""/>
+        <p:cNvGrpSpPr/>
+        <p:nvPr/>
+      </p:nvGrpSpPr>
+      <p:grpSpPr>
+        <a:xfrm>
+          <a:off x="0" y="0"/>
+          <a:ext cx="0" cy="0"/>
+          <a:chOff x="0" y="0"/>
+          <a:chExt cx="0" cy="0"/>
+        </a:xfrm>
+      </p:grpSpPr>
+      <p:sp>
+        <p:nvSpPr>
+          <p:cNvPr id="2" name="Title 1">
+            <a:extLst>
+              <a:ext uri="{FF2B5EF4-FFF2-40B4-BE49-F238E27FC236}">
+                <a16:creationId xmlns:a16="http://schemas.microsoft.com/office/drawing/2014/main" id="{8B51246F-63D4-31AC-0467-0493E8B5B6C8}"/>
+              </a:ext>
+            </a:extLst>
+          </p:cNvPr>
+          <p:cNvSpPr>
+            <a:spLocks noGrp="1"/>
+          </p:cNvSpPr>
+          <p:nvPr>
+            <p:ph type="title"/>
+          </p:nvPr>
+        </p:nvSpPr>
+        <p:spPr/>
+        <p:txBody>
+          <a:bodyPr/>
+          <a:lstStyle/>
+          <a:p>
+            <a:r>
+              <a:rPr lang="en-US"/>
+              <a:t>Unsafe C# features</a:t>
+            </a:r>
+            <a:br>
+              <a:rPr lang="en-US"/>
+            </a:br>
+            <a:r>
+              <a:rPr lang="en-US"/>
+              <a:t>Fixed-sized buffers</a:t>
+            </a:r>
+          </a:p>
+        </p:txBody>
+      </p:sp>
+      <p:sp>
+        <p:nvSpPr>
+          <p:cNvPr id="3" name="Content Placeholder 2">
+            <a:extLst>
+              <a:ext uri="{FF2B5EF4-FFF2-40B4-BE49-F238E27FC236}">
+                <a16:creationId xmlns:a16="http://schemas.microsoft.com/office/drawing/2014/main" id="{11A4F7B0-BCCF-C1EE-997A-2D1B75E9B2C9}"/>
+              </a:ext>
+            </a:extLst>
+          </p:cNvPr>
+          <p:cNvSpPr>
+            <a:spLocks noGrp="1"/>
+          </p:cNvSpPr>
+          <p:nvPr>
+            <p:ph idx="1"/>
+          </p:nvPr>
+        </p:nvSpPr>
+        <p:spPr/>
+        <p:txBody>
+          <a:bodyPr/>
+          <a:lstStyle/>
+          <a:p>
+            <a:endParaRPr lang="en-US"/>
+          </a:p>
+        </p:txBody>
+      </p:sp>
+      <p:sp>
+        <p:nvSpPr>
+          <p:cNvPr id="4" name="TextBox 3">
+            <a:extLst>
+              <a:ext uri="{FF2B5EF4-FFF2-40B4-BE49-F238E27FC236}">
+                <a16:creationId xmlns:a16="http://schemas.microsoft.com/office/drawing/2014/main" id="{8439673F-024B-2FD5-81E5-7DD873A12ED5}"/>
+              </a:ext>
+            </a:extLst>
+          </p:cNvPr>
+          <p:cNvSpPr txBox="1"/>
+          <p:nvPr/>
+        </p:nvSpPr>
+        <p:spPr>
+          <a:xfrm>
+            <a:off x="1103313" y="2052917"/>
+            <a:ext cx="8946540" cy="4195481"/>
+          </a:xfrm>
+          <a:prstGeom prst="rect">
+            <a:avLst/>
+          </a:prstGeom>
+          <a:solidFill>
+            <a:schemeClr val="tx1"/>
+          </a:solidFill>
+          <a:ln w="15875">
+            <a:solidFill>
+              <a:schemeClr val="accent1"/>
+            </a:solidFill>
+          </a:ln>
+        </p:spPr>
+        <p:txBody>
+          <a:bodyPr wrap="square" rtlCol="0">
+            <a:noAutofit/>
+          </a:bodyPr>
+          <a:lstStyle/>
+          <a:p>
+            <a:r>
+              <a:rPr lang="en-US" sz="1800">
+                <a:solidFill>
+                  <a:srgbClr val="008000"/>
+                </a:solidFill>
+                <a:latin typeface="Cascadia Mono" panose="020B0609020000020004" pitchFamily="49" charset="0"/>
+              </a:rPr>
+              <a:t>// Fixed size buffer type must be one of the following:</a:t>
+            </a:r>
+            <a:endParaRPr lang="en-US" sz="1800">
+              <a:solidFill>
+                <a:srgbClr val="000000"/>
+              </a:solidFill>
+              <a:latin typeface="Cascadia Mono" panose="020B0609020000020004" pitchFamily="49" charset="0"/>
+            </a:endParaRPr>
+          </a:p>
+          <a:p>
+            <a:r>
+              <a:rPr lang="en-US" sz="1800">
+                <a:solidFill>
+                  <a:srgbClr val="008000"/>
+                </a:solidFill>
+                <a:latin typeface="Cascadia Mono" panose="020B0609020000020004" pitchFamily="49" charset="0"/>
+              </a:rPr>
+              <a:t>// bool, byte, short, int, long, char, sbyte</a:t>
+            </a:r>
+          </a:p>
+          <a:p>
+            <a:r>
+              <a:rPr lang="en-US">
+                <a:solidFill>
+                  <a:srgbClr val="008000"/>
+                </a:solidFill>
+                <a:latin typeface="Cascadia Mono" panose="020B0609020000020004" pitchFamily="49" charset="0"/>
+              </a:rPr>
+              <a:t>//</a:t>
+            </a:r>
+            <a:r>
+              <a:rPr lang="en-US" sz="1800">
+                <a:solidFill>
+                  <a:srgbClr val="008000"/>
+                </a:solidFill>
+                <a:latin typeface="Cascadia Mono" panose="020B0609020000020004" pitchFamily="49" charset="0"/>
+              </a:rPr>
+              <a:t> ushort, uint, ulong, float, double</a:t>
+            </a:r>
+            <a:endParaRPr lang="en-US" sz="1800">
+              <a:solidFill>
+                <a:srgbClr val="000000"/>
+              </a:solidFill>
+              <a:latin typeface="Cascadia Mono" panose="020B0609020000020004" pitchFamily="49" charset="0"/>
+            </a:endParaRPr>
+          </a:p>
+          <a:p>
+            <a:r>
+              <a:rPr lang="en-US" sz="1800">
+                <a:solidFill>
+                  <a:srgbClr val="0000FF"/>
+                </a:solidFill>
+                <a:latin typeface="Cascadia Mono" panose="020B0609020000020004" pitchFamily="49" charset="0"/>
+              </a:rPr>
+              <a:t>public</a:t>
+            </a:r>
+            <a:r>
+              <a:rPr lang="en-US" sz="1800">
+                <a:solidFill>
+                  <a:srgbClr val="000000"/>
+                </a:solidFill>
+                <a:latin typeface="Cascadia Mono" panose="020B0609020000020004" pitchFamily="49" charset="0"/>
+              </a:rPr>
+              <a:t> </a:t>
+            </a:r>
+            <a:r>
+              <a:rPr lang="en-US" sz="1800">
+                <a:solidFill>
+                  <a:srgbClr val="0000FF"/>
+                </a:solidFill>
+                <a:latin typeface="Cascadia Mono" panose="020B0609020000020004" pitchFamily="49" charset="0"/>
+              </a:rPr>
+              <a:t>unsafe</a:t>
+            </a:r>
+            <a:r>
+              <a:rPr lang="en-US" sz="1800">
+                <a:solidFill>
+                  <a:srgbClr val="000000"/>
+                </a:solidFill>
+                <a:latin typeface="Cascadia Mono" panose="020B0609020000020004" pitchFamily="49" charset="0"/>
+              </a:rPr>
+              <a:t> </a:t>
+            </a:r>
+            <a:r>
+              <a:rPr lang="en-US" sz="1800">
+                <a:solidFill>
+                  <a:srgbClr val="0000FF"/>
+                </a:solidFill>
+                <a:latin typeface="Cascadia Mono" panose="020B0609020000020004" pitchFamily="49" charset="0"/>
+              </a:rPr>
+              <a:t>struct</a:t>
+            </a:r>
+            <a:r>
+              <a:rPr lang="en-US" sz="1800">
+                <a:solidFill>
+                  <a:srgbClr val="000000"/>
+                </a:solidFill>
+                <a:latin typeface="Cascadia Mono" panose="020B0609020000020004" pitchFamily="49" charset="0"/>
+              </a:rPr>
+              <a:t> </a:t>
+            </a:r>
+            <a:r>
+              <a:rPr lang="en-US" sz="1800">
+                <a:solidFill>
+                  <a:srgbClr val="2B91AF"/>
+                </a:solidFill>
+                <a:latin typeface="Cascadia Mono" panose="020B0609020000020004" pitchFamily="49" charset="0"/>
+              </a:rPr>
+              <a:t>FixedBuffer</a:t>
+            </a:r>
+            <a:endParaRPr lang="en-US" sz="1800">
+              <a:solidFill>
+                <a:srgbClr val="000000"/>
+              </a:solidFill>
+              <a:latin typeface="Cascadia Mono" panose="020B0609020000020004" pitchFamily="49" charset="0"/>
+            </a:endParaRPr>
+          </a:p>
+          <a:p>
+            <a:r>
+              <a:rPr lang="en-US" sz="1800">
+                <a:solidFill>
+                  <a:srgbClr val="000000"/>
+                </a:solidFill>
+                <a:latin typeface="Cascadia Mono" panose="020B0609020000020004" pitchFamily="49" charset="0"/>
+              </a:rPr>
+              <a:t>{</a:t>
+            </a:r>
+          </a:p>
+          <a:p>
+            <a:r>
+              <a:rPr lang="en-US" sz="1800">
+                <a:solidFill>
+                  <a:srgbClr val="000000"/>
+                </a:solidFill>
+                <a:latin typeface="Cascadia Mono" panose="020B0609020000020004" pitchFamily="49" charset="0"/>
+              </a:rPr>
+              <a:t>    </a:t>
+            </a:r>
+            <a:r>
+              <a:rPr lang="en-US" sz="1800">
+                <a:solidFill>
+                  <a:srgbClr val="0000FF"/>
+                </a:solidFill>
+                <a:latin typeface="Cascadia Mono" panose="020B0609020000020004" pitchFamily="49" charset="0"/>
+              </a:rPr>
+              <a:t>public</a:t>
+            </a:r>
+            <a:r>
+              <a:rPr lang="en-US" sz="1800">
+                <a:solidFill>
+                  <a:srgbClr val="000000"/>
+                </a:solidFill>
+                <a:latin typeface="Cascadia Mono" panose="020B0609020000020004" pitchFamily="49" charset="0"/>
+              </a:rPr>
+              <a:t> </a:t>
+            </a:r>
+            <a:r>
+              <a:rPr lang="en-US" sz="1800">
+                <a:solidFill>
+                  <a:srgbClr val="0000FF"/>
+                </a:solidFill>
+                <a:latin typeface="Cascadia Mono" panose="020B0609020000020004" pitchFamily="49" charset="0"/>
+              </a:rPr>
+              <a:t>int</a:t>
+            </a:r>
+            <a:r>
+              <a:rPr lang="en-US" sz="1800">
+                <a:solidFill>
+                  <a:srgbClr val="000000"/>
+                </a:solidFill>
+                <a:latin typeface="Cascadia Mono" panose="020B0609020000020004" pitchFamily="49" charset="0"/>
+              </a:rPr>
+              <a:t> Integer;</a:t>
+            </a:r>
+          </a:p>
+          <a:p>
+            <a:r>
+              <a:rPr lang="en-US" sz="1800">
+                <a:solidFill>
+                  <a:srgbClr val="008000"/>
+                </a:solidFill>
+                <a:latin typeface="Cascadia Mono" panose="020B0609020000020004" pitchFamily="49" charset="0"/>
+              </a:rPr>
+              <a:t>    // Type of ByteBuffer is byte*</a:t>
+            </a:r>
+            <a:endParaRPr lang="en-US" sz="1800">
+              <a:solidFill>
+                <a:srgbClr val="000000"/>
+              </a:solidFill>
+              <a:latin typeface="Cascadia Mono" panose="020B0609020000020004" pitchFamily="49" charset="0"/>
+            </a:endParaRPr>
+          </a:p>
+          <a:p>
+            <a:r>
+              <a:rPr lang="en-US" sz="1800">
+                <a:solidFill>
+                  <a:srgbClr val="000000"/>
+                </a:solidFill>
+                <a:latin typeface="Cascadia Mono" panose="020B0609020000020004" pitchFamily="49" charset="0"/>
+              </a:rPr>
+              <a:t>    </a:t>
+            </a:r>
+            <a:r>
+              <a:rPr lang="en-US" sz="1800">
+                <a:solidFill>
+                  <a:srgbClr val="0000FF"/>
+                </a:solidFill>
+                <a:latin typeface="Cascadia Mono" panose="020B0609020000020004" pitchFamily="49" charset="0"/>
+              </a:rPr>
+              <a:t>public</a:t>
+            </a:r>
+            <a:r>
+              <a:rPr lang="en-US" sz="1800">
+                <a:solidFill>
+                  <a:srgbClr val="000000"/>
+                </a:solidFill>
+                <a:latin typeface="Cascadia Mono" panose="020B0609020000020004" pitchFamily="49" charset="0"/>
+              </a:rPr>
+              <a:t> </a:t>
+            </a:r>
+            <a:r>
+              <a:rPr lang="en-US" sz="1800">
+                <a:solidFill>
+                  <a:srgbClr val="0000FF"/>
+                </a:solidFill>
+                <a:latin typeface="Cascadia Mono" panose="020B0609020000020004" pitchFamily="49" charset="0"/>
+              </a:rPr>
+              <a:t>fixed</a:t>
+            </a:r>
+            <a:r>
+              <a:rPr lang="en-US" sz="1800">
+                <a:solidFill>
+                  <a:srgbClr val="000000"/>
+                </a:solidFill>
+                <a:latin typeface="Cascadia Mono" panose="020B0609020000020004" pitchFamily="49" charset="0"/>
+              </a:rPr>
+              <a:t> </a:t>
+            </a:r>
+            <a:r>
+              <a:rPr lang="en-US" sz="1800">
+                <a:solidFill>
+                  <a:srgbClr val="0000FF"/>
+                </a:solidFill>
+                <a:latin typeface="Cascadia Mono" panose="020B0609020000020004" pitchFamily="49" charset="0"/>
+              </a:rPr>
+              <a:t>byte</a:t>
+            </a:r>
+            <a:r>
+              <a:rPr lang="en-US" sz="1800">
+                <a:solidFill>
+                  <a:srgbClr val="000000"/>
+                </a:solidFill>
+                <a:latin typeface="Cascadia Mono" panose="020B0609020000020004" pitchFamily="49" charset="0"/>
+              </a:rPr>
+              <a:t> ByteBuffer[128];</a:t>
+            </a:r>
+          </a:p>
+          <a:p>
+            <a:r>
+              <a:rPr lang="en-US" sz="1800">
+                <a:solidFill>
+                  <a:srgbClr val="000000"/>
+                </a:solidFill>
+                <a:latin typeface="Cascadia Mono" panose="020B0609020000020004" pitchFamily="49" charset="0"/>
+              </a:rPr>
+              <a:t>}</a:t>
+            </a:r>
+          </a:p>
+          <a:p>
+            <a:endParaRPr lang="en-US">
+              <a:solidFill>
+                <a:srgbClr val="000000"/>
+              </a:solidFill>
+              <a:latin typeface="Cascadia Mono" panose="020B0609020000020004" pitchFamily="49" charset="0"/>
+            </a:endParaRPr>
+          </a:p>
+          <a:p>
+            <a:r>
+              <a:rPr lang="en-US" sz="1800">
+                <a:solidFill>
+                  <a:srgbClr val="008000"/>
+                </a:solidFill>
+                <a:latin typeface="Cascadia Mono" panose="020B0609020000020004" pitchFamily="49" charset="0"/>
+              </a:rPr>
+              <a:t>// Allocate memory from call stack and return address</a:t>
+            </a:r>
+            <a:endParaRPr lang="en-US" sz="1800">
+              <a:solidFill>
+                <a:srgbClr val="000000"/>
+              </a:solidFill>
+              <a:latin typeface="Cascadia Mono" panose="020B0609020000020004" pitchFamily="49" charset="0"/>
+            </a:endParaRPr>
+          </a:p>
+          <a:p>
+            <a:r>
+              <a:rPr lang="en-US" sz="1800">
+                <a:solidFill>
+                  <a:srgbClr val="0000FF"/>
+                </a:solidFill>
+                <a:latin typeface="Cascadia Mono" panose="020B0609020000020004" pitchFamily="49" charset="0"/>
+              </a:rPr>
+              <a:t>byte</a:t>
+            </a:r>
+            <a:r>
+              <a:rPr lang="en-US" sz="1800">
+                <a:solidFill>
+                  <a:srgbClr val="000000"/>
+                </a:solidFill>
+                <a:latin typeface="Cascadia Mono" panose="020B0609020000020004" pitchFamily="49" charset="0"/>
+              </a:rPr>
+              <a:t>* byteArray = </a:t>
+            </a:r>
+            <a:r>
+              <a:rPr lang="en-US" sz="1800">
+                <a:solidFill>
+                  <a:srgbClr val="0000FF"/>
+                </a:solidFill>
+                <a:latin typeface="Cascadia Mono" panose="020B0609020000020004" pitchFamily="49" charset="0"/>
+              </a:rPr>
+              <a:t>stackalloc</a:t>
+            </a:r>
+            <a:r>
+              <a:rPr lang="en-US" sz="1800">
+                <a:solidFill>
+                  <a:srgbClr val="000000"/>
+                </a:solidFill>
+                <a:latin typeface="Cascadia Mono" panose="020B0609020000020004" pitchFamily="49" charset="0"/>
+              </a:rPr>
+              <a:t> </a:t>
+            </a:r>
+            <a:r>
+              <a:rPr lang="en-US" sz="1800">
+                <a:solidFill>
+                  <a:srgbClr val="0000FF"/>
+                </a:solidFill>
+                <a:latin typeface="Cascadia Mono" panose="020B0609020000020004" pitchFamily="49" charset="0"/>
+              </a:rPr>
+              <a:t>byte</a:t>
+            </a:r>
+            <a:r>
+              <a:rPr lang="en-US" sz="1800">
+                <a:solidFill>
+                  <a:srgbClr val="000000"/>
+                </a:solidFill>
+                <a:latin typeface="Cascadia Mono" panose="020B0609020000020004" pitchFamily="49" charset="0"/>
+              </a:rPr>
+              <a:t>[1024];</a:t>
+            </a:r>
+          </a:p>
+          <a:p>
+            <a:r>
+              <a:rPr lang="en-US" sz="1800">
+                <a:solidFill>
+                  <a:srgbClr val="000000"/>
+                </a:solidFill>
+                <a:latin typeface="Cascadia Mono" panose="020B0609020000020004" pitchFamily="49" charset="0"/>
+              </a:rPr>
+              <a:t>Guid* guidArray = </a:t>
+            </a:r>
+            <a:r>
+              <a:rPr lang="en-US" sz="1800">
+                <a:solidFill>
+                  <a:srgbClr val="0000FF"/>
+                </a:solidFill>
+                <a:latin typeface="Cascadia Mono" panose="020B0609020000020004" pitchFamily="49" charset="0"/>
+              </a:rPr>
+              <a:t>stackalloc</a:t>
+            </a:r>
+            <a:r>
+              <a:rPr lang="en-US" sz="1800">
+                <a:solidFill>
+                  <a:srgbClr val="000000"/>
+                </a:solidFill>
+                <a:latin typeface="Cascadia Mono" panose="020B0609020000020004" pitchFamily="49" charset="0"/>
+              </a:rPr>
+              <a:t> Guid[128];</a:t>
+            </a:r>
+            <a:endParaRPr lang="en-US"/>
+          </a:p>
+        </p:txBody>
+      </p:sp>
+    </p:spTree>
+    <p:extLst>
+      <p:ext uri="{BB962C8B-B14F-4D97-AF65-F5344CB8AC3E}">
+        <p14:creationId xmlns:p14="http://schemas.microsoft.com/office/powerpoint/2010/main" val="14518289"/>
+      </p:ext>
+    </p:extLst>
+  </p:cSld>
+  <p:clrMapOvr>
+    <a:masterClrMapping/>
+  </p:clrMapOvr>
+</p:sld>
+</file>
+
 <file path=ppt/slides/slide2.xml><?xml version="1.0" encoding="utf-8"?>
 <p:sld xmlns:a="http://schemas.openxmlformats.org/drawingml/2006/main" xmlns:r="http://schemas.openxmlformats.org/officeDocument/2006/relationships" xmlns:p="http://schemas.openxmlformats.org/presentationml/2006/main">
   <p:cSld>
@@ -6829,6 +8453,12 @@
           </a:p>
           <a:p>
             <a:r>
+              <a:rPr lang="en-US" dirty="0"/>
+              <a:t>Platform Invoke (P/Invoke)</a:t>
+            </a:r>
+          </a:p>
+          <a:p>
+            <a:r>
               <a:rPr lang="en-US" dirty="0" err="1">
                 <a:latin typeface="Consolas" panose="020B0609020204030204" pitchFamily="49" charset="0"/>
               </a:rPr>
@@ -6837,6 +8467,12 @@
             <a:r>
               <a:rPr lang="en-US" dirty="0"/>
               <a:t> and finalization</a:t>
+            </a:r>
+          </a:p>
+          <a:p>
+            <a:r>
+              <a:rPr lang="en-US" dirty="0"/>
+              <a:t>An alternative for Windows</a:t>
             </a:r>
           </a:p>
         </p:txBody>
@@ -6851,6 +8487,333 @@
   <p:clrMapOvr>
     <a:masterClrMapping/>
   </p:clrMapOvr>
+  <p:timing>
+    <p:tnLst>
+      <p:par>
+        <p:cTn id="1" dur="indefinite" restart="never" nodeType="tmRoot">
+          <p:childTnLst>
+            <p:seq concurrent="1" nextAc="seek">
+              <p:cTn id="2" dur="indefinite" nodeType="mainSeq">
+                <p:childTnLst>
+                  <p:par>
+                    <p:cTn id="3" fill="hold">
+                      <p:stCondLst>
+                        <p:cond delay="indefinite"/>
+                      </p:stCondLst>
+                      <p:childTnLst>
+                        <p:par>
+                          <p:cTn id="4" fill="hold">
+                            <p:stCondLst>
+                              <p:cond delay="0"/>
+                            </p:stCondLst>
+                            <p:childTnLst>
+                              <p:par>
+                                <p:cTn id="5" presetID="1" presetClass="entr" presetSubtype="0" fill="hold" grpId="0" nodeType="clickEffect">
+                                  <p:stCondLst>
+                                    <p:cond delay="0"/>
+                                  </p:stCondLst>
+                                  <p:childTnLst>
+                                    <p:set>
+                                      <p:cBhvr>
+                                        <p:cTn id="6" dur="1" fill="hold">
+                                          <p:stCondLst>
+                                            <p:cond delay="0"/>
+                                          </p:stCondLst>
+                                        </p:cTn>
+                                        <p:tgtEl>
+                                          <p:spTgt spid="3">
+                                            <p:txEl>
+                                              <p:pRg st="0" end="0"/>
+                                            </p:txEl>
+                                          </p:spTgt>
+                                        </p:tgtEl>
+                                        <p:attrNameLst>
+                                          <p:attrName>style.visibility</p:attrName>
+                                        </p:attrNameLst>
+                                      </p:cBhvr>
+                                      <p:to>
+                                        <p:strVal val="visible"/>
+                                      </p:to>
+                                    </p:set>
+                                  </p:childTnLst>
+                                </p:cTn>
+                              </p:par>
+                            </p:childTnLst>
+                          </p:cTn>
+                        </p:par>
+                      </p:childTnLst>
+                    </p:cTn>
+                  </p:par>
+                  <p:par>
+                    <p:cTn id="7" fill="hold">
+                      <p:stCondLst>
+                        <p:cond delay="indefinite"/>
+                      </p:stCondLst>
+                      <p:childTnLst>
+                        <p:par>
+                          <p:cTn id="8" fill="hold">
+                            <p:stCondLst>
+                              <p:cond delay="0"/>
+                            </p:stCondLst>
+                            <p:childTnLst>
+                              <p:par>
+                                <p:cTn id="9" presetID="1" presetClass="entr" presetSubtype="0" fill="hold" grpId="0" nodeType="clickEffect">
+                                  <p:stCondLst>
+                                    <p:cond delay="0"/>
+                                  </p:stCondLst>
+                                  <p:childTnLst>
+                                    <p:set>
+                                      <p:cBhvr>
+                                        <p:cTn id="10" dur="1" fill="hold">
+                                          <p:stCondLst>
+                                            <p:cond delay="0"/>
+                                          </p:stCondLst>
+                                        </p:cTn>
+                                        <p:tgtEl>
+                                          <p:spTgt spid="3">
+                                            <p:txEl>
+                                              <p:pRg st="1" end="1"/>
+                                            </p:txEl>
+                                          </p:spTgt>
+                                        </p:tgtEl>
+                                        <p:attrNameLst>
+                                          <p:attrName>style.visibility</p:attrName>
+                                        </p:attrNameLst>
+                                      </p:cBhvr>
+                                      <p:to>
+                                        <p:strVal val="visible"/>
+                                      </p:to>
+                                    </p:set>
+                                  </p:childTnLst>
+                                </p:cTn>
+                              </p:par>
+                            </p:childTnLst>
+                          </p:cTn>
+                        </p:par>
+                      </p:childTnLst>
+                    </p:cTn>
+                  </p:par>
+                  <p:par>
+                    <p:cTn id="11" fill="hold">
+                      <p:stCondLst>
+                        <p:cond delay="indefinite"/>
+                      </p:stCondLst>
+                      <p:childTnLst>
+                        <p:par>
+                          <p:cTn id="12" fill="hold">
+                            <p:stCondLst>
+                              <p:cond delay="0"/>
+                            </p:stCondLst>
+                            <p:childTnLst>
+                              <p:par>
+                                <p:cTn id="13" presetID="1" presetClass="entr" presetSubtype="0" fill="hold" grpId="0" nodeType="clickEffect">
+                                  <p:stCondLst>
+                                    <p:cond delay="0"/>
+                                  </p:stCondLst>
+                                  <p:childTnLst>
+                                    <p:set>
+                                      <p:cBhvr>
+                                        <p:cTn id="14" dur="1" fill="hold">
+                                          <p:stCondLst>
+                                            <p:cond delay="0"/>
+                                          </p:stCondLst>
+                                        </p:cTn>
+                                        <p:tgtEl>
+                                          <p:spTgt spid="3">
+                                            <p:txEl>
+                                              <p:pRg st="2" end="2"/>
+                                            </p:txEl>
+                                          </p:spTgt>
+                                        </p:tgtEl>
+                                        <p:attrNameLst>
+                                          <p:attrName>style.visibility</p:attrName>
+                                        </p:attrNameLst>
+                                      </p:cBhvr>
+                                      <p:to>
+                                        <p:strVal val="visible"/>
+                                      </p:to>
+                                    </p:set>
+                                  </p:childTnLst>
+                                </p:cTn>
+                              </p:par>
+                            </p:childTnLst>
+                          </p:cTn>
+                        </p:par>
+                      </p:childTnLst>
+                    </p:cTn>
+                  </p:par>
+                  <p:par>
+                    <p:cTn id="15" fill="hold">
+                      <p:stCondLst>
+                        <p:cond delay="indefinite"/>
+                      </p:stCondLst>
+                      <p:childTnLst>
+                        <p:par>
+                          <p:cTn id="16" fill="hold">
+                            <p:stCondLst>
+                              <p:cond delay="0"/>
+                            </p:stCondLst>
+                            <p:childTnLst>
+                              <p:par>
+                                <p:cTn id="17" presetID="1" presetClass="entr" presetSubtype="0" fill="hold" grpId="0" nodeType="clickEffect">
+                                  <p:stCondLst>
+                                    <p:cond delay="0"/>
+                                  </p:stCondLst>
+                                  <p:childTnLst>
+                                    <p:set>
+                                      <p:cBhvr>
+                                        <p:cTn id="18" dur="1" fill="hold">
+                                          <p:stCondLst>
+                                            <p:cond delay="0"/>
+                                          </p:stCondLst>
+                                        </p:cTn>
+                                        <p:tgtEl>
+                                          <p:spTgt spid="3">
+                                            <p:txEl>
+                                              <p:pRg st="3" end="3"/>
+                                            </p:txEl>
+                                          </p:spTgt>
+                                        </p:tgtEl>
+                                        <p:attrNameLst>
+                                          <p:attrName>style.visibility</p:attrName>
+                                        </p:attrNameLst>
+                                      </p:cBhvr>
+                                      <p:to>
+                                        <p:strVal val="visible"/>
+                                      </p:to>
+                                    </p:set>
+                                  </p:childTnLst>
+                                </p:cTn>
+                              </p:par>
+                            </p:childTnLst>
+                          </p:cTn>
+                        </p:par>
+                      </p:childTnLst>
+                    </p:cTn>
+                  </p:par>
+                  <p:par>
+                    <p:cTn id="19" fill="hold">
+                      <p:stCondLst>
+                        <p:cond delay="indefinite"/>
+                      </p:stCondLst>
+                      <p:childTnLst>
+                        <p:par>
+                          <p:cTn id="20" fill="hold">
+                            <p:stCondLst>
+                              <p:cond delay="0"/>
+                            </p:stCondLst>
+                            <p:childTnLst>
+                              <p:par>
+                                <p:cTn id="21" presetID="1" presetClass="entr" presetSubtype="0" fill="hold" grpId="0" nodeType="clickEffect">
+                                  <p:stCondLst>
+                                    <p:cond delay="0"/>
+                                  </p:stCondLst>
+                                  <p:childTnLst>
+                                    <p:set>
+                                      <p:cBhvr>
+                                        <p:cTn id="22" dur="1" fill="hold">
+                                          <p:stCondLst>
+                                            <p:cond delay="0"/>
+                                          </p:stCondLst>
+                                        </p:cTn>
+                                        <p:tgtEl>
+                                          <p:spTgt spid="3">
+                                            <p:txEl>
+                                              <p:pRg st="4" end="4"/>
+                                            </p:txEl>
+                                          </p:spTgt>
+                                        </p:tgtEl>
+                                        <p:attrNameLst>
+                                          <p:attrName>style.visibility</p:attrName>
+                                        </p:attrNameLst>
+                                      </p:cBhvr>
+                                      <p:to>
+                                        <p:strVal val="visible"/>
+                                      </p:to>
+                                    </p:set>
+                                  </p:childTnLst>
+                                </p:cTn>
+                              </p:par>
+                            </p:childTnLst>
+                          </p:cTn>
+                        </p:par>
+                      </p:childTnLst>
+                    </p:cTn>
+                  </p:par>
+                  <p:par>
+                    <p:cTn id="23" fill="hold">
+                      <p:stCondLst>
+                        <p:cond delay="indefinite"/>
+                      </p:stCondLst>
+                      <p:childTnLst>
+                        <p:par>
+                          <p:cTn id="24" fill="hold">
+                            <p:stCondLst>
+                              <p:cond delay="0"/>
+                            </p:stCondLst>
+                            <p:childTnLst>
+                              <p:par>
+                                <p:cTn id="25" presetID="1" presetClass="entr" presetSubtype="0" fill="hold" grpId="0" nodeType="clickEffect">
+                                  <p:stCondLst>
+                                    <p:cond delay="0"/>
+                                  </p:stCondLst>
+                                  <p:childTnLst>
+                                    <p:set>
+                                      <p:cBhvr>
+                                        <p:cTn id="26" dur="1" fill="hold">
+                                          <p:stCondLst>
+                                            <p:cond delay="0"/>
+                                          </p:stCondLst>
+                                        </p:cTn>
+                                        <p:tgtEl>
+                                          <p:spTgt spid="3">
+                                            <p:txEl>
+                                              <p:pRg st="5" end="5"/>
+                                            </p:txEl>
+                                          </p:spTgt>
+                                        </p:tgtEl>
+                                        <p:attrNameLst>
+                                          <p:attrName>style.visibility</p:attrName>
+                                        </p:attrNameLst>
+                                      </p:cBhvr>
+                                      <p:to>
+                                        <p:strVal val="visible"/>
+                                      </p:to>
+                                    </p:set>
+                                  </p:childTnLst>
+                                </p:cTn>
+                              </p:par>
+                            </p:childTnLst>
+                          </p:cTn>
+                        </p:par>
+                      </p:childTnLst>
+                    </p:cTn>
+                  </p:par>
+                </p:childTnLst>
+              </p:cTn>
+              <p:prevCondLst>
+                <p:cond evt="onPrev" delay="0">
+                  <p:tgtEl>
+                    <p:sldTgt/>
+                  </p:tgtEl>
+                </p:cond>
+              </p:prevCondLst>
+              <p:nextCondLst>
+                <p:cond evt="onNext" delay="0">
+                  <p:tgtEl>
+                    <p:sldTgt/>
+                  </p:tgtEl>
+                </p:cond>
+              </p:nextCondLst>
+            </p:seq>
+          </p:childTnLst>
+        </p:cTn>
+      </p:par>
+    </p:tnLst>
+    <p:bldLst>
+      <p:bldP spid="3" grpId="0" build="p"/>
+    </p:bldLst>
+  </p:timing>
 </p:sld>
 </file>
 
@@ -7900,6 +9863,346 @@
   <p:clrMapOvr>
     <a:masterClrMapping/>
   </p:clrMapOvr>
+  <p:timing>
+    <p:tnLst>
+      <p:par>
+        <p:cTn id="1" dur="indefinite" restart="never" nodeType="tmRoot">
+          <p:childTnLst>
+            <p:seq concurrent="1" nextAc="seek">
+              <p:cTn id="2" dur="indefinite" nodeType="mainSeq">
+                <p:childTnLst>
+                  <p:par>
+                    <p:cTn id="3" fill="hold">
+                      <p:stCondLst>
+                        <p:cond delay="indefinite"/>
+                      </p:stCondLst>
+                      <p:childTnLst>
+                        <p:par>
+                          <p:cTn id="4" fill="hold">
+                            <p:stCondLst>
+                              <p:cond delay="0"/>
+                            </p:stCondLst>
+                            <p:childTnLst>
+                              <p:par>
+                                <p:cTn id="5" presetID="1" presetClass="entr" presetSubtype="0" fill="hold" grpId="0" nodeType="clickEffect">
+                                  <p:stCondLst>
+                                    <p:cond delay="0"/>
+                                  </p:stCondLst>
+                                  <p:childTnLst>
+                                    <p:set>
+                                      <p:cBhvr>
+                                        <p:cTn id="6" dur="1" fill="hold">
+                                          <p:stCondLst>
+                                            <p:cond delay="0"/>
+                                          </p:stCondLst>
+                                        </p:cTn>
+                                        <p:tgtEl>
+                                          <p:spTgt spid="3">
+                                            <p:txEl>
+                                              <p:pRg st="0" end="0"/>
+                                            </p:txEl>
+                                          </p:spTgt>
+                                        </p:tgtEl>
+                                        <p:attrNameLst>
+                                          <p:attrName>style.visibility</p:attrName>
+                                        </p:attrNameLst>
+                                      </p:cBhvr>
+                                      <p:to>
+                                        <p:strVal val="visible"/>
+                                      </p:to>
+                                    </p:set>
+                                  </p:childTnLst>
+                                </p:cTn>
+                              </p:par>
+                            </p:childTnLst>
+                          </p:cTn>
+                        </p:par>
+                      </p:childTnLst>
+                    </p:cTn>
+                  </p:par>
+                  <p:par>
+                    <p:cTn id="7" fill="hold">
+                      <p:stCondLst>
+                        <p:cond delay="indefinite"/>
+                      </p:stCondLst>
+                      <p:childTnLst>
+                        <p:par>
+                          <p:cTn id="8" fill="hold">
+                            <p:stCondLst>
+                              <p:cond delay="0"/>
+                            </p:stCondLst>
+                            <p:childTnLst>
+                              <p:par>
+                                <p:cTn id="9" presetID="1" presetClass="entr" presetSubtype="0" fill="hold" grpId="0" nodeType="clickEffect">
+                                  <p:stCondLst>
+                                    <p:cond delay="0"/>
+                                  </p:stCondLst>
+                                  <p:childTnLst>
+                                    <p:set>
+                                      <p:cBhvr>
+                                        <p:cTn id="10" dur="1" fill="hold">
+                                          <p:stCondLst>
+                                            <p:cond delay="0"/>
+                                          </p:stCondLst>
+                                        </p:cTn>
+                                        <p:tgtEl>
+                                          <p:spTgt spid="3">
+                                            <p:txEl>
+                                              <p:pRg st="1" end="1"/>
+                                            </p:txEl>
+                                          </p:spTgt>
+                                        </p:tgtEl>
+                                        <p:attrNameLst>
+                                          <p:attrName>style.visibility</p:attrName>
+                                        </p:attrNameLst>
+                                      </p:cBhvr>
+                                      <p:to>
+                                        <p:strVal val="visible"/>
+                                      </p:to>
+                                    </p:set>
+                                  </p:childTnLst>
+                                </p:cTn>
+                              </p:par>
+                            </p:childTnLst>
+                          </p:cTn>
+                        </p:par>
+                      </p:childTnLst>
+                    </p:cTn>
+                  </p:par>
+                  <p:par>
+                    <p:cTn id="11" fill="hold">
+                      <p:stCondLst>
+                        <p:cond delay="indefinite"/>
+                      </p:stCondLst>
+                      <p:childTnLst>
+                        <p:par>
+                          <p:cTn id="12" fill="hold">
+                            <p:stCondLst>
+                              <p:cond delay="0"/>
+                            </p:stCondLst>
+                            <p:childTnLst>
+                              <p:par>
+                                <p:cTn id="13" presetID="1" presetClass="entr" presetSubtype="0" fill="hold" grpId="0" nodeType="clickEffect">
+                                  <p:stCondLst>
+                                    <p:cond delay="0"/>
+                                  </p:stCondLst>
+                                  <p:childTnLst>
+                                    <p:set>
+                                      <p:cBhvr>
+                                        <p:cTn id="14" dur="1" fill="hold">
+                                          <p:stCondLst>
+                                            <p:cond delay="0"/>
+                                          </p:stCondLst>
+                                        </p:cTn>
+                                        <p:tgtEl>
+                                          <p:spTgt spid="3">
+                                            <p:txEl>
+                                              <p:pRg st="2" end="2"/>
+                                            </p:txEl>
+                                          </p:spTgt>
+                                        </p:tgtEl>
+                                        <p:attrNameLst>
+                                          <p:attrName>style.visibility</p:attrName>
+                                        </p:attrNameLst>
+                                      </p:cBhvr>
+                                      <p:to>
+                                        <p:strVal val="visible"/>
+                                      </p:to>
+                                    </p:set>
+                                  </p:childTnLst>
+                                </p:cTn>
+                              </p:par>
+                            </p:childTnLst>
+                          </p:cTn>
+                        </p:par>
+                      </p:childTnLst>
+                    </p:cTn>
+                  </p:par>
+                  <p:par>
+                    <p:cTn id="15" fill="hold">
+                      <p:stCondLst>
+                        <p:cond delay="indefinite"/>
+                      </p:stCondLst>
+                      <p:childTnLst>
+                        <p:par>
+                          <p:cTn id="16" fill="hold">
+                            <p:stCondLst>
+                              <p:cond delay="0"/>
+                            </p:stCondLst>
+                            <p:childTnLst>
+                              <p:par>
+                                <p:cTn id="17" presetID="1" presetClass="entr" presetSubtype="0" fill="hold" grpId="0" nodeType="clickEffect">
+                                  <p:stCondLst>
+                                    <p:cond delay="0"/>
+                                  </p:stCondLst>
+                                  <p:childTnLst>
+                                    <p:set>
+                                      <p:cBhvr>
+                                        <p:cTn id="18" dur="1" fill="hold">
+                                          <p:stCondLst>
+                                            <p:cond delay="0"/>
+                                          </p:stCondLst>
+                                        </p:cTn>
+                                        <p:tgtEl>
+                                          <p:spTgt spid="3">
+                                            <p:txEl>
+                                              <p:pRg st="3" end="3"/>
+                                            </p:txEl>
+                                          </p:spTgt>
+                                        </p:tgtEl>
+                                        <p:attrNameLst>
+                                          <p:attrName>style.visibility</p:attrName>
+                                        </p:attrNameLst>
+                                      </p:cBhvr>
+                                      <p:to>
+                                        <p:strVal val="visible"/>
+                                      </p:to>
+                                    </p:set>
+                                  </p:childTnLst>
+                                </p:cTn>
+                              </p:par>
+                              <p:par>
+                                <p:cTn id="19" presetID="1" presetClass="entr" presetSubtype="0" fill="hold" grpId="0" nodeType="withEffect">
+                                  <p:stCondLst>
+                                    <p:cond delay="0"/>
+                                  </p:stCondLst>
+                                  <p:childTnLst>
+                                    <p:set>
+                                      <p:cBhvr>
+                                        <p:cTn id="20" dur="1" fill="hold">
+                                          <p:stCondLst>
+                                            <p:cond delay="0"/>
+                                          </p:stCondLst>
+                                        </p:cTn>
+                                        <p:tgtEl>
+                                          <p:spTgt spid="3">
+                                            <p:txEl>
+                                              <p:pRg st="4" end="4"/>
+                                            </p:txEl>
+                                          </p:spTgt>
+                                        </p:tgtEl>
+                                        <p:attrNameLst>
+                                          <p:attrName>style.visibility</p:attrName>
+                                        </p:attrNameLst>
+                                      </p:cBhvr>
+                                      <p:to>
+                                        <p:strVal val="visible"/>
+                                      </p:to>
+                                    </p:set>
+                                  </p:childTnLst>
+                                </p:cTn>
+                              </p:par>
+                              <p:par>
+                                <p:cTn id="21" presetID="1" presetClass="entr" presetSubtype="0" fill="hold" grpId="0" nodeType="withEffect">
+                                  <p:stCondLst>
+                                    <p:cond delay="0"/>
+                                  </p:stCondLst>
+                                  <p:childTnLst>
+                                    <p:set>
+                                      <p:cBhvr>
+                                        <p:cTn id="22" dur="1" fill="hold">
+                                          <p:stCondLst>
+                                            <p:cond delay="0"/>
+                                          </p:stCondLst>
+                                        </p:cTn>
+                                        <p:tgtEl>
+                                          <p:spTgt spid="3">
+                                            <p:txEl>
+                                              <p:pRg st="5" end="5"/>
+                                            </p:txEl>
+                                          </p:spTgt>
+                                        </p:tgtEl>
+                                        <p:attrNameLst>
+                                          <p:attrName>style.visibility</p:attrName>
+                                        </p:attrNameLst>
+                                      </p:cBhvr>
+                                      <p:to>
+                                        <p:strVal val="visible"/>
+                                      </p:to>
+                                    </p:set>
+                                  </p:childTnLst>
+                                </p:cTn>
+                              </p:par>
+                            </p:childTnLst>
+                          </p:cTn>
+                        </p:par>
+                      </p:childTnLst>
+                    </p:cTn>
+                  </p:par>
+                  <p:par>
+                    <p:cTn id="23" fill="hold">
+                      <p:stCondLst>
+                        <p:cond delay="indefinite"/>
+                      </p:stCondLst>
+                      <p:childTnLst>
+                        <p:par>
+                          <p:cTn id="24" fill="hold">
+                            <p:stCondLst>
+                              <p:cond delay="0"/>
+                            </p:stCondLst>
+                            <p:childTnLst>
+                              <p:par>
+                                <p:cTn id="25" presetID="1" presetClass="entr" presetSubtype="0" fill="hold" grpId="0" nodeType="clickEffect">
+                                  <p:stCondLst>
+                                    <p:cond delay="0"/>
+                                  </p:stCondLst>
+                                  <p:childTnLst>
+                                    <p:set>
+                                      <p:cBhvr>
+                                        <p:cTn id="26" dur="1" fill="hold">
+                                          <p:stCondLst>
+                                            <p:cond delay="0"/>
+                                          </p:stCondLst>
+                                        </p:cTn>
+                                        <p:tgtEl>
+                                          <p:spTgt spid="3">
+                                            <p:txEl>
+                                              <p:pRg st="6" end="6"/>
+                                            </p:txEl>
+                                          </p:spTgt>
+                                        </p:tgtEl>
+                                        <p:attrNameLst>
+                                          <p:attrName>style.visibility</p:attrName>
+                                        </p:attrNameLst>
+                                      </p:cBhvr>
+                                      <p:to>
+                                        <p:strVal val="visible"/>
+                                      </p:to>
+                                    </p:set>
+                                  </p:childTnLst>
+                                </p:cTn>
+                              </p:par>
+                            </p:childTnLst>
+                          </p:cTn>
+                        </p:par>
+                      </p:childTnLst>
+                    </p:cTn>
+                  </p:par>
+                </p:childTnLst>
+              </p:cTn>
+              <p:prevCondLst>
+                <p:cond evt="onPrev" delay="0">
+                  <p:tgtEl>
+                    <p:sldTgt/>
+                  </p:tgtEl>
+                </p:cond>
+              </p:prevCondLst>
+              <p:nextCondLst>
+                <p:cond evt="onNext" delay="0">
+                  <p:tgtEl>
+                    <p:sldTgt/>
+                  </p:tgtEl>
+                </p:cond>
+              </p:nextCondLst>
+            </p:seq>
+          </p:childTnLst>
+        </p:cTn>
+      </p:par>
+    </p:tnLst>
+    <p:bldLst>
+      <p:bldP spid="3" grpId="0" build="p"/>
+    </p:bldLst>
+  </p:timing>
 </p:sld>
 </file>
 

</xml_diff>

<commit_message>
Added heap allocations with BCL classes
</commit_message>
<xml_diff>
--- a/doc/Introduction to unsafe C#.pptx
+++ b/doc/Introduction to unsafe C#.pptx
@@ -17,6 +17,8 @@
     <p:sldId id="265" r:id="rId11"/>
     <p:sldId id="266" r:id="rId12"/>
     <p:sldId id="267" r:id="rId13"/>
+    <p:sldId id="269" r:id="rId14"/>
+    <p:sldId id="268" r:id="rId15"/>
   </p:sldIdLst>
   <p:sldSz cx="12192000" cy="6858000"/>
   <p:notesSz cx="6858000" cy="9144000"/>
@@ -309,7 +311,7 @@
           <a:p>
             <a:fld id="{F9BC75CE-03FF-4667-898C-4C70B4392062}" type="datetimeFigureOut">
               <a:rPr lang="en-US" smtClean="0"/>
-              <a:t>6/20/2022</a:t>
+              <a:t>6/21/2022</a:t>
             </a:fld>
             <a:endParaRPr lang="en-US"/>
           </a:p>
@@ -584,7 +586,7 @@
           <a:p>
             <a:fld id="{F9BC75CE-03FF-4667-898C-4C70B4392062}" type="datetimeFigureOut">
               <a:rPr lang="en-US" smtClean="0"/>
-              <a:t>6/20/2022</a:t>
+              <a:t>6/21/2022</a:t>
             </a:fld>
             <a:endParaRPr lang="en-US"/>
           </a:p>
@@ -778,7 +780,7 @@
           <a:p>
             <a:fld id="{F9BC75CE-03FF-4667-898C-4C70B4392062}" type="datetimeFigureOut">
               <a:rPr lang="en-US" smtClean="0"/>
-              <a:t>6/20/2022</a:t>
+              <a:t>6/21/2022</a:t>
             </a:fld>
             <a:endParaRPr lang="en-US"/>
           </a:p>
@@ -1051,7 +1053,7 @@
           <a:p>
             <a:fld id="{F9BC75CE-03FF-4667-898C-4C70B4392062}" type="datetimeFigureOut">
               <a:rPr lang="en-US" smtClean="0"/>
-              <a:t>6/20/2022</a:t>
+              <a:t>6/21/2022</a:t>
             </a:fld>
             <a:endParaRPr lang="en-US"/>
           </a:p>
@@ -1392,7 +1394,7 @@
           <a:p>
             <a:fld id="{F9BC75CE-03FF-4667-898C-4C70B4392062}" type="datetimeFigureOut">
               <a:rPr lang="en-US" smtClean="0"/>
-              <a:t>6/20/2022</a:t>
+              <a:t>6/21/2022</a:t>
             </a:fld>
             <a:endParaRPr lang="en-US"/>
           </a:p>
@@ -2015,7 +2017,7 @@
           <a:p>
             <a:fld id="{F9BC75CE-03FF-4667-898C-4C70B4392062}" type="datetimeFigureOut">
               <a:rPr lang="en-US" smtClean="0"/>
-              <a:t>6/20/2022</a:t>
+              <a:t>6/21/2022</a:t>
             </a:fld>
             <a:endParaRPr lang="en-US"/>
           </a:p>
@@ -2875,7 +2877,7 @@
           <a:p>
             <a:fld id="{F9BC75CE-03FF-4667-898C-4C70B4392062}" type="datetimeFigureOut">
               <a:rPr lang="en-US" smtClean="0"/>
-              <a:t>6/20/2022</a:t>
+              <a:t>6/21/2022</a:t>
             </a:fld>
             <a:endParaRPr lang="en-US"/>
           </a:p>
@@ -3045,7 +3047,7 @@
           <a:p>
             <a:fld id="{F9BC75CE-03FF-4667-898C-4C70B4392062}" type="datetimeFigureOut">
               <a:rPr lang="en-US" smtClean="0"/>
-              <a:t>6/20/2022</a:t>
+              <a:t>6/21/2022</a:t>
             </a:fld>
             <a:endParaRPr lang="en-US"/>
           </a:p>
@@ -3225,7 +3227,7 @@
           <a:p>
             <a:fld id="{F9BC75CE-03FF-4667-898C-4C70B4392062}" type="datetimeFigureOut">
               <a:rPr lang="en-US" smtClean="0"/>
-              <a:t>6/20/2022</a:t>
+              <a:t>6/21/2022</a:t>
             </a:fld>
             <a:endParaRPr lang="en-US"/>
           </a:p>
@@ -3395,7 +3397,7 @@
           <a:p>
             <a:fld id="{F9BC75CE-03FF-4667-898C-4C70B4392062}" type="datetimeFigureOut">
               <a:rPr lang="en-US" smtClean="0"/>
-              <a:t>6/20/2022</a:t>
+              <a:t>6/21/2022</a:t>
             </a:fld>
             <a:endParaRPr lang="en-US"/>
           </a:p>
@@ -3642,7 +3644,7 @@
           <a:p>
             <a:fld id="{F9BC75CE-03FF-4667-898C-4C70B4392062}" type="datetimeFigureOut">
               <a:rPr lang="en-US" smtClean="0"/>
-              <a:t>6/20/2022</a:t>
+              <a:t>6/21/2022</a:t>
             </a:fld>
             <a:endParaRPr lang="en-US"/>
           </a:p>
@@ -3934,7 +3936,7 @@
           <a:p>
             <a:fld id="{F9BC75CE-03FF-4667-898C-4C70B4392062}" type="datetimeFigureOut">
               <a:rPr lang="en-US" smtClean="0"/>
-              <a:t>6/20/2022</a:t>
+              <a:t>6/21/2022</a:t>
             </a:fld>
             <a:endParaRPr lang="en-US"/>
           </a:p>
@@ -4378,7 +4380,7 @@
           <a:p>
             <a:fld id="{F9BC75CE-03FF-4667-898C-4C70B4392062}" type="datetimeFigureOut">
               <a:rPr lang="en-US" smtClean="0"/>
-              <a:t>6/20/2022</a:t>
+              <a:t>6/21/2022</a:t>
             </a:fld>
             <a:endParaRPr lang="en-US"/>
           </a:p>
@@ -4496,7 +4498,7 @@
           <a:p>
             <a:fld id="{F9BC75CE-03FF-4667-898C-4C70B4392062}" type="datetimeFigureOut">
               <a:rPr lang="en-US" smtClean="0"/>
-              <a:t>6/20/2022</a:t>
+              <a:t>6/21/2022</a:t>
             </a:fld>
             <a:endParaRPr lang="en-US"/>
           </a:p>
@@ -4591,7 +4593,7 @@
           <a:p>
             <a:fld id="{F9BC75CE-03FF-4667-898C-4C70B4392062}" type="datetimeFigureOut">
               <a:rPr lang="en-US" smtClean="0"/>
-              <a:t>6/20/2022</a:t>
+              <a:t>6/21/2022</a:t>
             </a:fld>
             <a:endParaRPr lang="en-US"/>
           </a:p>
@@ -4870,7 +4872,7 @@
           <a:p>
             <a:fld id="{F9BC75CE-03FF-4667-898C-4C70B4392062}" type="datetimeFigureOut">
               <a:rPr lang="en-US" smtClean="0"/>
-              <a:t>6/20/2022</a:t>
+              <a:t>6/21/2022</a:t>
             </a:fld>
             <a:endParaRPr lang="en-US"/>
           </a:p>
@@ -5145,7 +5147,7 @@
           <a:p>
             <a:fld id="{F9BC75CE-03FF-4667-898C-4C70B4392062}" type="datetimeFigureOut">
               <a:rPr lang="en-US" smtClean="0"/>
-              <a:t>6/20/2022</a:t>
+              <a:t>6/21/2022</a:t>
             </a:fld>
             <a:endParaRPr lang="en-US"/>
           </a:p>
@@ -5574,7 +5576,7 @@
           <a:p>
             <a:fld id="{F9BC75CE-03FF-4667-898C-4C70B4392062}" type="datetimeFigureOut">
               <a:rPr lang="en-US" smtClean="0"/>
-              <a:t>6/20/2022</a:t>
+              <a:t>6/21/2022</a:t>
             </a:fld>
             <a:endParaRPr lang="en-US"/>
           </a:p>
@@ -8368,6 +8370,847 @@
 </p:sld>
 </file>
 
+<file path=ppt/slides/slide13.xml><?xml version="1.0" encoding="utf-8"?>
+<p:sld xmlns:a="http://schemas.openxmlformats.org/drawingml/2006/main" xmlns:r="http://schemas.openxmlformats.org/officeDocument/2006/relationships" xmlns:p="http://schemas.openxmlformats.org/presentationml/2006/main">
+  <p:cSld>
+    <p:spTree>
+      <p:nvGrpSpPr>
+        <p:cNvPr id="1" name=""/>
+        <p:cNvGrpSpPr/>
+        <p:nvPr/>
+      </p:nvGrpSpPr>
+      <p:grpSpPr>
+        <a:xfrm>
+          <a:off x="0" y="0"/>
+          <a:ext cx="0" cy="0"/>
+          <a:chOff x="0" y="0"/>
+          <a:chExt cx="0" cy="0"/>
+        </a:xfrm>
+      </p:grpSpPr>
+      <p:sp>
+        <p:nvSpPr>
+          <p:cNvPr id="2" name="Title 1">
+            <a:extLst>
+              <a:ext uri="{FF2B5EF4-FFF2-40B4-BE49-F238E27FC236}">
+                <a16:creationId xmlns:a16="http://schemas.microsoft.com/office/drawing/2014/main" id="{384CFDA5-C923-7D81-0BCF-0BE825FB0E61}"/>
+              </a:ext>
+            </a:extLst>
+          </p:cNvPr>
+          <p:cNvSpPr>
+            <a:spLocks noGrp="1"/>
+          </p:cNvSpPr>
+          <p:nvPr>
+            <p:ph type="title"/>
+          </p:nvPr>
+        </p:nvSpPr>
+        <p:spPr/>
+        <p:txBody>
+          <a:bodyPr/>
+          <a:lstStyle/>
+          <a:p>
+            <a:r>
+              <a:rPr lang="de-DE" dirty="0"/>
+              <a:t>Managing </a:t>
+            </a:r>
+            <a:r>
+              <a:rPr lang="de-DE"/>
+              <a:t>unmanaged memory</a:t>
+            </a:r>
+            <a:br>
+              <a:rPr lang="de-DE" dirty="0"/>
+            </a:br>
+            <a:r>
+              <a:rPr lang="de-DE" dirty="0"/>
+              <a:t>The .</a:t>
+            </a:r>
+            <a:r>
+              <a:rPr lang="de-DE"/>
+              <a:t>NET </a:t>
+            </a:r>
+            <a:r>
+              <a:rPr lang="de-DE" dirty="0"/>
+              <a:t>6 </a:t>
+            </a:r>
+            <a:r>
+              <a:rPr lang="de-DE"/>
+              <a:t>way</a:t>
+            </a:r>
+            <a:endParaRPr lang="en-US" dirty="0"/>
+          </a:p>
+        </p:txBody>
+      </p:sp>
+      <p:sp>
+        <p:nvSpPr>
+          <p:cNvPr id="3" name="Content Placeholder 2">
+            <a:extLst>
+              <a:ext uri="{FF2B5EF4-FFF2-40B4-BE49-F238E27FC236}">
+                <a16:creationId xmlns:a16="http://schemas.microsoft.com/office/drawing/2014/main" id="{BEC839C9-E755-DC18-C714-E31A83E8C7FD}"/>
+              </a:ext>
+            </a:extLst>
+          </p:cNvPr>
+          <p:cNvSpPr>
+            <a:spLocks noGrp="1"/>
+          </p:cNvSpPr>
+          <p:nvPr>
+            <p:ph idx="1"/>
+          </p:nvPr>
+        </p:nvSpPr>
+        <p:spPr/>
+        <p:txBody>
+          <a:bodyPr/>
+          <a:lstStyle/>
+          <a:p>
+            <a:endParaRPr lang="en-US" dirty="0"/>
+          </a:p>
+        </p:txBody>
+      </p:sp>
+      <p:sp>
+        <p:nvSpPr>
+          <p:cNvPr id="4" name="TextBox 3">
+            <a:extLst>
+              <a:ext uri="{FF2B5EF4-FFF2-40B4-BE49-F238E27FC236}">
+                <a16:creationId xmlns:a16="http://schemas.microsoft.com/office/drawing/2014/main" id="{C12F704E-112A-68E2-1553-9A0821E6393C}"/>
+              </a:ext>
+            </a:extLst>
+          </p:cNvPr>
+          <p:cNvSpPr txBox="1"/>
+          <p:nvPr/>
+        </p:nvSpPr>
+        <p:spPr>
+          <a:xfrm>
+            <a:off x="1103313" y="2052918"/>
+            <a:ext cx="8946540" cy="4195480"/>
+          </a:xfrm>
+          <a:prstGeom prst="rect">
+            <a:avLst/>
+          </a:prstGeom>
+          <a:solidFill>
+            <a:schemeClr val="tx1"/>
+          </a:solidFill>
+          <a:ln w="15875">
+            <a:solidFill>
+              <a:schemeClr val="accent1"/>
+            </a:solidFill>
+          </a:ln>
+        </p:spPr>
+        <p:txBody>
+          <a:bodyPr wrap="square" rtlCol="0">
+            <a:noAutofit/>
+          </a:bodyPr>
+          <a:lstStyle/>
+          <a:p>
+            <a:r>
+              <a:rPr lang="en-US" sz="1800" dirty="0">
+                <a:solidFill>
+                  <a:srgbClr val="0000FF"/>
+                </a:solidFill>
+                <a:latin typeface="Cascadia Mono" panose="020B0609020000020004" pitchFamily="49" charset="0"/>
+              </a:rPr>
+              <a:t>unsafe</a:t>
+            </a:r>
+            <a:endParaRPr lang="en-US" sz="1800" dirty="0">
+              <a:solidFill>
+                <a:srgbClr val="000000"/>
+              </a:solidFill>
+              <a:latin typeface="Cascadia Mono" panose="020B0609020000020004" pitchFamily="49" charset="0"/>
+            </a:endParaRPr>
+          </a:p>
+          <a:p>
+            <a:r>
+              <a:rPr lang="en-US" sz="1800" dirty="0">
+                <a:solidFill>
+                  <a:srgbClr val="000000"/>
+                </a:solidFill>
+                <a:latin typeface="Cascadia Mono" panose="020B0609020000020004" pitchFamily="49" charset="0"/>
+              </a:rPr>
+              <a:t>{</a:t>
+            </a:r>
+          </a:p>
+          <a:p>
+            <a:r>
+              <a:rPr lang="en-US" sz="1800" dirty="0">
+                <a:solidFill>
+                  <a:srgbClr val="000000"/>
+                </a:solidFill>
+                <a:latin typeface="Cascadia Mono" panose="020B0609020000020004" pitchFamily="49" charset="0"/>
+              </a:rPr>
+              <a:t>    </a:t>
+            </a:r>
+            <a:r>
+              <a:rPr lang="en-US" sz="1800" dirty="0">
+                <a:solidFill>
+                  <a:srgbClr val="008000"/>
+                </a:solidFill>
+                <a:latin typeface="Cascadia Mono" panose="020B0609020000020004" pitchFamily="49" charset="0"/>
+              </a:rPr>
+              <a:t>// Allocate heap memory using</a:t>
+            </a:r>
+          </a:p>
+          <a:p>
+            <a:r>
+              <a:rPr lang="en-US" dirty="0">
+                <a:solidFill>
+                  <a:srgbClr val="008000"/>
+                </a:solidFill>
+                <a:latin typeface="Cascadia Mono" panose="020B0609020000020004" pitchFamily="49" charset="0"/>
+              </a:rPr>
+              <a:t>    //</a:t>
+            </a:r>
+            <a:r>
+              <a:rPr lang="en-US" sz="1800" dirty="0">
+                <a:solidFill>
+                  <a:srgbClr val="008000"/>
+                </a:solidFill>
+                <a:latin typeface="Cascadia Mono" panose="020B0609020000020004" pitchFamily="49" charset="0"/>
+              </a:rPr>
+              <a:t> C standard library function malloc()</a:t>
+            </a:r>
+            <a:endParaRPr lang="en-US" sz="1800" dirty="0">
+              <a:solidFill>
+                <a:srgbClr val="000000"/>
+              </a:solidFill>
+              <a:latin typeface="Cascadia Mono" panose="020B0609020000020004" pitchFamily="49" charset="0"/>
+            </a:endParaRPr>
+          </a:p>
+          <a:p>
+            <a:r>
+              <a:rPr lang="en-US" sz="1800" dirty="0">
+                <a:solidFill>
+                  <a:srgbClr val="000000"/>
+                </a:solidFill>
+                <a:latin typeface="Cascadia Mono" panose="020B0609020000020004" pitchFamily="49" charset="0"/>
+              </a:rPr>
+              <a:t>    </a:t>
+            </a:r>
+            <a:r>
+              <a:rPr lang="en-US" sz="1800" dirty="0">
+                <a:solidFill>
+                  <a:srgbClr val="0000FF"/>
+                </a:solidFill>
+                <a:latin typeface="Cascadia Mono" panose="020B0609020000020004" pitchFamily="49" charset="0"/>
+              </a:rPr>
+              <a:t>void</a:t>
+            </a:r>
+            <a:r>
+              <a:rPr lang="en-US" sz="1800" dirty="0">
+                <a:solidFill>
+                  <a:srgbClr val="000000"/>
+                </a:solidFill>
+                <a:latin typeface="Cascadia Mono" panose="020B0609020000020004" pitchFamily="49" charset="0"/>
+              </a:rPr>
+              <a:t>* </a:t>
+            </a:r>
+            <a:r>
+              <a:rPr lang="en-US" sz="1800" dirty="0" err="1">
+                <a:solidFill>
+                  <a:srgbClr val="000000"/>
+                </a:solidFill>
+                <a:latin typeface="Cascadia Mono" panose="020B0609020000020004" pitchFamily="49" charset="0"/>
+              </a:rPr>
+              <a:t>ptr</a:t>
+            </a:r>
+            <a:r>
+              <a:rPr lang="en-US" sz="1800" dirty="0">
+                <a:solidFill>
+                  <a:srgbClr val="000000"/>
+                </a:solidFill>
+                <a:latin typeface="Cascadia Mono" panose="020B0609020000020004" pitchFamily="49" charset="0"/>
+              </a:rPr>
+              <a:t> = </a:t>
+            </a:r>
+            <a:r>
+              <a:rPr lang="en-US" sz="1800" dirty="0" err="1">
+                <a:solidFill>
+                  <a:srgbClr val="000000"/>
+                </a:solidFill>
+                <a:latin typeface="Cascadia Mono" panose="020B0609020000020004" pitchFamily="49" charset="0"/>
+              </a:rPr>
+              <a:t>NativeMemory.Alloc</a:t>
+            </a:r>
+            <a:r>
+              <a:rPr lang="en-US" sz="1800" dirty="0">
+                <a:solidFill>
+                  <a:srgbClr val="000000"/>
+                </a:solidFill>
+                <a:latin typeface="Cascadia Mono" panose="020B0609020000020004" pitchFamily="49" charset="0"/>
+              </a:rPr>
+              <a:t>(1024);</a:t>
+            </a:r>
+          </a:p>
+          <a:p>
+            <a:r>
+              <a:rPr lang="en-US" sz="1800" dirty="0">
+                <a:solidFill>
+                  <a:srgbClr val="000000"/>
+                </a:solidFill>
+                <a:latin typeface="Cascadia Mono" panose="020B0609020000020004" pitchFamily="49" charset="0"/>
+              </a:rPr>
+              <a:t>    </a:t>
+            </a:r>
+            <a:r>
+              <a:rPr lang="en-US" sz="1800" dirty="0">
+                <a:solidFill>
+                  <a:srgbClr val="008000"/>
+                </a:solidFill>
+                <a:latin typeface="Cascadia Mono" panose="020B0609020000020004" pitchFamily="49" charset="0"/>
+              </a:rPr>
+              <a:t>// Free heap memory using C standard library function free()</a:t>
+            </a:r>
+            <a:endParaRPr lang="en-US" sz="1800" dirty="0">
+              <a:solidFill>
+                <a:srgbClr val="000000"/>
+              </a:solidFill>
+              <a:latin typeface="Cascadia Mono" panose="020B0609020000020004" pitchFamily="49" charset="0"/>
+            </a:endParaRPr>
+          </a:p>
+          <a:p>
+            <a:r>
+              <a:rPr lang="en-US" sz="1800" dirty="0">
+                <a:solidFill>
+                  <a:srgbClr val="000000"/>
+                </a:solidFill>
+                <a:latin typeface="Cascadia Mono" panose="020B0609020000020004" pitchFamily="49" charset="0"/>
+              </a:rPr>
+              <a:t>    </a:t>
+            </a:r>
+            <a:r>
+              <a:rPr lang="en-US" sz="1800" dirty="0" err="1">
+                <a:solidFill>
+                  <a:srgbClr val="000000"/>
+                </a:solidFill>
+                <a:latin typeface="Cascadia Mono" panose="020B0609020000020004" pitchFamily="49" charset="0"/>
+              </a:rPr>
+              <a:t>NativeMemory.Free</a:t>
+            </a:r>
+            <a:r>
+              <a:rPr lang="en-US" sz="1800" dirty="0">
+                <a:solidFill>
+                  <a:srgbClr val="000000"/>
+                </a:solidFill>
+                <a:latin typeface="Cascadia Mono" panose="020B0609020000020004" pitchFamily="49" charset="0"/>
+              </a:rPr>
+              <a:t>(</a:t>
+            </a:r>
+            <a:r>
+              <a:rPr lang="en-US" sz="1800" dirty="0" err="1">
+                <a:solidFill>
+                  <a:srgbClr val="000000"/>
+                </a:solidFill>
+                <a:latin typeface="Cascadia Mono" panose="020B0609020000020004" pitchFamily="49" charset="0"/>
+              </a:rPr>
+              <a:t>ptr</a:t>
+            </a:r>
+            <a:r>
+              <a:rPr lang="en-US" sz="1800" dirty="0">
+                <a:solidFill>
+                  <a:srgbClr val="000000"/>
+                </a:solidFill>
+                <a:latin typeface="Cascadia Mono" panose="020B0609020000020004" pitchFamily="49" charset="0"/>
+              </a:rPr>
+              <a:t>);</a:t>
+            </a:r>
+          </a:p>
+          <a:p>
+            <a:r>
+              <a:rPr lang="en-US" sz="1800" dirty="0">
+                <a:solidFill>
+                  <a:srgbClr val="000000"/>
+                </a:solidFill>
+                <a:latin typeface="Cascadia Mono" panose="020B0609020000020004" pitchFamily="49" charset="0"/>
+              </a:rPr>
+              <a:t>}</a:t>
+            </a:r>
+            <a:endParaRPr lang="en-US" dirty="0"/>
+          </a:p>
+        </p:txBody>
+      </p:sp>
+    </p:spTree>
+    <p:extLst>
+      <p:ext uri="{BB962C8B-B14F-4D97-AF65-F5344CB8AC3E}">
+        <p14:creationId xmlns:p14="http://schemas.microsoft.com/office/powerpoint/2010/main" val="1226350690"/>
+      </p:ext>
+    </p:extLst>
+  </p:cSld>
+  <p:clrMapOvr>
+    <a:masterClrMapping/>
+  </p:clrMapOvr>
+</p:sld>
+</file>
+
+<file path=ppt/slides/slide14.xml><?xml version="1.0" encoding="utf-8"?>
+<p:sld xmlns:a="http://schemas.openxmlformats.org/drawingml/2006/main" xmlns:r="http://schemas.openxmlformats.org/officeDocument/2006/relationships" xmlns:p="http://schemas.openxmlformats.org/presentationml/2006/main">
+  <p:cSld>
+    <p:spTree>
+      <p:nvGrpSpPr>
+        <p:cNvPr id="1" name=""/>
+        <p:cNvGrpSpPr/>
+        <p:nvPr/>
+      </p:nvGrpSpPr>
+      <p:grpSpPr>
+        <a:xfrm>
+          <a:off x="0" y="0"/>
+          <a:ext cx="0" cy="0"/>
+          <a:chOff x="0" y="0"/>
+          <a:chExt cx="0" cy="0"/>
+        </a:xfrm>
+      </p:grpSpPr>
+      <p:sp>
+        <p:nvSpPr>
+          <p:cNvPr id="2" name="Title 1">
+            <a:extLst>
+              <a:ext uri="{FF2B5EF4-FFF2-40B4-BE49-F238E27FC236}">
+                <a16:creationId xmlns:a16="http://schemas.microsoft.com/office/drawing/2014/main" id="{A28CBE7D-3E9A-9A7D-F68D-3063A6DB9F11}"/>
+              </a:ext>
+            </a:extLst>
+          </p:cNvPr>
+          <p:cNvSpPr>
+            <a:spLocks noGrp="1"/>
+          </p:cNvSpPr>
+          <p:nvPr>
+            <p:ph type="title"/>
+          </p:nvPr>
+        </p:nvSpPr>
+        <p:spPr/>
+        <p:txBody>
+          <a:bodyPr/>
+          <a:lstStyle/>
+          <a:p>
+            <a:r>
+              <a:rPr lang="en-US" dirty="0"/>
+              <a:t>Managing </a:t>
+            </a:r>
+            <a:r>
+              <a:rPr lang="en-US" dirty="0" err="1"/>
+              <a:t>unmanged</a:t>
+            </a:r>
+            <a:r>
+              <a:rPr lang="en-US" dirty="0"/>
+              <a:t> memory</a:t>
+            </a:r>
+            <a:br>
+              <a:rPr lang="en-US" dirty="0"/>
+            </a:br>
+            <a:r>
+              <a:rPr lang="en-US" dirty="0"/>
+              <a:t>The .NET Framework way</a:t>
+            </a:r>
+          </a:p>
+        </p:txBody>
+      </p:sp>
+      <p:sp>
+        <p:nvSpPr>
+          <p:cNvPr id="4" name="TextBox 3">
+            <a:extLst>
+              <a:ext uri="{FF2B5EF4-FFF2-40B4-BE49-F238E27FC236}">
+                <a16:creationId xmlns:a16="http://schemas.microsoft.com/office/drawing/2014/main" id="{A73131E7-10C0-6AB4-FF44-F96219C907E8}"/>
+              </a:ext>
+            </a:extLst>
+          </p:cNvPr>
+          <p:cNvSpPr txBox="1"/>
+          <p:nvPr/>
+        </p:nvSpPr>
+        <p:spPr>
+          <a:xfrm>
+            <a:off x="1103313" y="2052917"/>
+            <a:ext cx="8946540" cy="4195481"/>
+          </a:xfrm>
+          <a:prstGeom prst="rect">
+            <a:avLst/>
+          </a:prstGeom>
+          <a:solidFill>
+            <a:schemeClr val="tx1"/>
+          </a:solidFill>
+          <a:ln w="15875">
+            <a:solidFill>
+              <a:schemeClr val="accent1"/>
+            </a:solidFill>
+          </a:ln>
+        </p:spPr>
+        <p:txBody>
+          <a:bodyPr wrap="square" rtlCol="0">
+            <a:noAutofit/>
+          </a:bodyPr>
+          <a:lstStyle/>
+          <a:p>
+            <a:r>
+              <a:rPr lang="en-US" sz="1800" dirty="0">
+                <a:solidFill>
+                  <a:srgbClr val="008000"/>
+                </a:solidFill>
+                <a:latin typeface="Cascadia Mono" panose="020B0609020000020004" pitchFamily="49" charset="0"/>
+              </a:rPr>
+              <a:t>// The following code is not unsafe:</a:t>
+            </a:r>
+            <a:endParaRPr lang="en-US" sz="1800" dirty="0">
+              <a:solidFill>
+                <a:srgbClr val="000000"/>
+              </a:solidFill>
+              <a:latin typeface="Cascadia Mono" panose="020B0609020000020004" pitchFamily="49" charset="0"/>
+            </a:endParaRPr>
+          </a:p>
+          <a:p>
+            <a:r>
+              <a:rPr lang="en-US" sz="1800" dirty="0">
+                <a:solidFill>
+                  <a:srgbClr val="008000"/>
+                </a:solidFill>
+                <a:latin typeface="Cascadia Mono" panose="020B0609020000020004" pitchFamily="49" charset="0"/>
+              </a:rPr>
+              <a:t>// Allocate memory from default heap</a:t>
+            </a:r>
+            <a:endParaRPr lang="en-US" sz="1800" dirty="0">
+              <a:solidFill>
+                <a:srgbClr val="000000"/>
+              </a:solidFill>
+              <a:latin typeface="Cascadia Mono" panose="020B0609020000020004" pitchFamily="49" charset="0"/>
+            </a:endParaRPr>
+          </a:p>
+          <a:p>
+            <a:r>
+              <a:rPr lang="en-US" sz="1800" dirty="0" err="1">
+                <a:solidFill>
+                  <a:srgbClr val="000000"/>
+                </a:solidFill>
+                <a:latin typeface="Cascadia Mono" panose="020B0609020000020004" pitchFamily="49" charset="0"/>
+              </a:rPr>
+              <a:t>IntPtr</a:t>
+            </a:r>
+            <a:r>
+              <a:rPr lang="en-US" sz="1800" dirty="0">
+                <a:solidFill>
+                  <a:srgbClr val="000000"/>
+                </a:solidFill>
+                <a:latin typeface="Cascadia Mono" panose="020B0609020000020004" pitchFamily="49" charset="0"/>
+              </a:rPr>
+              <a:t> </a:t>
+            </a:r>
+            <a:r>
+              <a:rPr lang="en-US" sz="1800" dirty="0" err="1">
+                <a:solidFill>
+                  <a:srgbClr val="000000"/>
+                </a:solidFill>
+                <a:latin typeface="Cascadia Mono" panose="020B0609020000020004" pitchFamily="49" charset="0"/>
+              </a:rPr>
+              <a:t>ptr</a:t>
+            </a:r>
+            <a:r>
+              <a:rPr lang="en-US" sz="1800" dirty="0">
+                <a:solidFill>
+                  <a:srgbClr val="000000"/>
+                </a:solidFill>
+                <a:latin typeface="Cascadia Mono" panose="020B0609020000020004" pitchFamily="49" charset="0"/>
+              </a:rPr>
+              <a:t> = </a:t>
+            </a:r>
+            <a:r>
+              <a:rPr lang="en-US" sz="1800" dirty="0" err="1">
+                <a:solidFill>
+                  <a:srgbClr val="000000"/>
+                </a:solidFill>
+                <a:latin typeface="Cascadia Mono" panose="020B0609020000020004" pitchFamily="49" charset="0"/>
+              </a:rPr>
+              <a:t>Marshal.AllocHGlobal</a:t>
+            </a:r>
+            <a:r>
+              <a:rPr lang="en-US" sz="1800" dirty="0">
+                <a:solidFill>
+                  <a:srgbClr val="000000"/>
+                </a:solidFill>
+                <a:latin typeface="Cascadia Mono" panose="020B0609020000020004" pitchFamily="49" charset="0"/>
+              </a:rPr>
+              <a:t>(1024);</a:t>
+            </a:r>
+          </a:p>
+          <a:p>
+            <a:r>
+              <a:rPr lang="en-US" sz="1800" dirty="0">
+                <a:solidFill>
+                  <a:srgbClr val="008000"/>
+                </a:solidFill>
+                <a:latin typeface="Cascadia Mono" panose="020B0609020000020004" pitchFamily="49" charset="0"/>
+              </a:rPr>
+              <a:t>// Free memory</a:t>
+            </a:r>
+            <a:endParaRPr lang="en-US" sz="1800" dirty="0">
+              <a:solidFill>
+                <a:srgbClr val="000000"/>
+              </a:solidFill>
+              <a:latin typeface="Cascadia Mono" panose="020B0609020000020004" pitchFamily="49" charset="0"/>
+            </a:endParaRPr>
+          </a:p>
+          <a:p>
+            <a:r>
+              <a:rPr lang="en-US" sz="1800" dirty="0" err="1">
+                <a:solidFill>
+                  <a:srgbClr val="000000"/>
+                </a:solidFill>
+                <a:latin typeface="Cascadia Mono" panose="020B0609020000020004" pitchFamily="49" charset="0"/>
+              </a:rPr>
+              <a:t>Marshal.FreeHGlobal</a:t>
+            </a:r>
+            <a:r>
+              <a:rPr lang="en-US" sz="1800" dirty="0">
+                <a:solidFill>
+                  <a:srgbClr val="000000"/>
+                </a:solidFill>
+                <a:latin typeface="Cascadia Mono" panose="020B0609020000020004" pitchFamily="49" charset="0"/>
+              </a:rPr>
+              <a:t>(</a:t>
+            </a:r>
+            <a:r>
+              <a:rPr lang="en-US" sz="1800" dirty="0" err="1">
+                <a:solidFill>
+                  <a:srgbClr val="000000"/>
+                </a:solidFill>
+                <a:latin typeface="Cascadia Mono" panose="020B0609020000020004" pitchFamily="49" charset="0"/>
+              </a:rPr>
+              <a:t>ptr</a:t>
+            </a:r>
+            <a:r>
+              <a:rPr lang="en-US" sz="1800" dirty="0">
+                <a:solidFill>
+                  <a:srgbClr val="000000"/>
+                </a:solidFill>
+                <a:latin typeface="Cascadia Mono" panose="020B0609020000020004" pitchFamily="49" charset="0"/>
+              </a:rPr>
+              <a:t>);</a:t>
+            </a:r>
+            <a:endParaRPr lang="en-US" dirty="0"/>
+          </a:p>
+        </p:txBody>
+      </p:sp>
+      <p:pic>
+        <p:nvPicPr>
+          <p:cNvPr id="8" name="Content Placeholder 7" descr="Remarks&#10;AllocHGlobal is one of two memory allocation methods in the Marshal class. (Marshal.AllocCoTaskMem is the other.) This method exposes the Win32 LocalAlloc function from Kernel32.dll.">
+            <a:extLst>
+              <a:ext uri="{FF2B5EF4-FFF2-40B4-BE49-F238E27FC236}">
+                <a16:creationId xmlns:a16="http://schemas.microsoft.com/office/drawing/2014/main" id="{B7993E01-3CDA-1050-8125-BA251CC8940B}"/>
+              </a:ext>
+            </a:extLst>
+          </p:cNvPr>
+          <p:cNvPicPr>
+            <a:picLocks noGrp="1" noChangeAspect="1"/>
+          </p:cNvPicPr>
+          <p:nvPr>
+            <p:ph idx="1"/>
+          </p:nvPr>
+        </p:nvPicPr>
+        <p:blipFill>
+          <a:blip r:embed="rId2">
+            <a:extLst>
+              <a:ext uri="{28A0092B-C50C-407E-A947-70E740481C1C}">
+                <a14:useLocalDpi xmlns:a14="http://schemas.microsoft.com/office/drawing/2010/main" val="0"/>
+              </a:ext>
+            </a:extLst>
+          </a:blip>
+          <a:stretch>
+            <a:fillRect/>
+          </a:stretch>
+        </p:blipFill>
+        <p:spPr>
+          <a:xfrm>
+            <a:off x="380977" y="2971575"/>
+            <a:ext cx="8947150" cy="1179082"/>
+          </a:xfrm>
+          <a:ln w="15875">
+            <a:solidFill>
+              <a:schemeClr val="accent1"/>
+            </a:solidFill>
+          </a:ln>
+          <a:effectLst>
+            <a:outerShdw blurRad="127000" dist="127000" dir="2700000" algn="tl" rotWithShape="0">
+              <a:schemeClr val="bg1">
+                <a:lumMod val="95000"/>
+                <a:lumOff val="5000"/>
+                <a:alpha val="80000"/>
+              </a:schemeClr>
+            </a:outerShdw>
+          </a:effectLst>
+        </p:spPr>
+      </p:pic>
+      <p:pic>
+        <p:nvPicPr>
+          <p:cNvPr id="10" name="Picture 9" descr="Note&#10;The local functions have greater overhead and provide fewer features than other memory management functions. New applications should use the heap functions unless documentation states that a local function should be used. For more information, see Global and Local Functions.">
+            <a:extLst>
+              <a:ext uri="{FF2B5EF4-FFF2-40B4-BE49-F238E27FC236}">
+                <a16:creationId xmlns:a16="http://schemas.microsoft.com/office/drawing/2014/main" id="{75B5B8C9-97F6-435C-F911-D380160600CF}"/>
+              </a:ext>
+            </a:extLst>
+          </p:cNvPr>
+          <p:cNvPicPr>
+            <a:picLocks noChangeAspect="1"/>
+          </p:cNvPicPr>
+          <p:nvPr/>
+        </p:nvPicPr>
+        <p:blipFill>
+          <a:blip r:embed="rId3">
+            <a:extLst>
+              <a:ext uri="{28A0092B-C50C-407E-A947-70E740481C1C}">
+                <a14:useLocalDpi xmlns:a14="http://schemas.microsoft.com/office/drawing/2010/main" val="0"/>
+              </a:ext>
+            </a:extLst>
+          </a:blip>
+          <a:stretch>
+            <a:fillRect/>
+          </a:stretch>
+        </p:blipFill>
+        <p:spPr>
+          <a:xfrm>
+            <a:off x="1638408" y="4532743"/>
+            <a:ext cx="10236726" cy="1333569"/>
+          </a:xfrm>
+          <a:prstGeom prst="rect">
+            <a:avLst/>
+          </a:prstGeom>
+          <a:ln w="15875">
+            <a:solidFill>
+              <a:schemeClr val="accent1"/>
+            </a:solidFill>
+          </a:ln>
+          <a:effectLst>
+            <a:outerShdw blurRad="127000" dist="127000" dir="2700000" algn="tl" rotWithShape="0">
+              <a:schemeClr val="bg1">
+                <a:lumMod val="95000"/>
+                <a:lumOff val="5000"/>
+                <a:alpha val="80000"/>
+              </a:schemeClr>
+            </a:outerShdw>
+          </a:effectLst>
+        </p:spPr>
+      </p:pic>
+    </p:spTree>
+    <p:extLst>
+      <p:ext uri="{BB962C8B-B14F-4D97-AF65-F5344CB8AC3E}">
+        <p14:creationId xmlns:p14="http://schemas.microsoft.com/office/powerpoint/2010/main" val="2269143129"/>
+      </p:ext>
+    </p:extLst>
+  </p:cSld>
+  <p:clrMapOvr>
+    <a:masterClrMapping/>
+  </p:clrMapOvr>
+  <p:timing>
+    <p:tnLst>
+      <p:par>
+        <p:cTn id="1" dur="indefinite" restart="never" nodeType="tmRoot">
+          <p:childTnLst>
+            <p:seq concurrent="1" nextAc="seek">
+              <p:cTn id="2" dur="indefinite" nodeType="mainSeq">
+                <p:childTnLst>
+                  <p:par>
+                    <p:cTn id="3" fill="hold">
+                      <p:stCondLst>
+                        <p:cond delay="indefinite"/>
+                      </p:stCondLst>
+                      <p:childTnLst>
+                        <p:par>
+                          <p:cTn id="4" fill="hold">
+                            <p:stCondLst>
+                              <p:cond delay="0"/>
+                            </p:stCondLst>
+                            <p:childTnLst>
+                              <p:par>
+                                <p:cTn id="5" presetID="1" presetClass="entr" presetSubtype="0" fill="hold" nodeType="clickEffect">
+                                  <p:stCondLst>
+                                    <p:cond delay="0"/>
+                                  </p:stCondLst>
+                                  <p:childTnLst>
+                                    <p:set>
+                                      <p:cBhvr>
+                                        <p:cTn id="6" dur="1" fill="hold">
+                                          <p:stCondLst>
+                                            <p:cond delay="0"/>
+                                          </p:stCondLst>
+                                        </p:cTn>
+                                        <p:tgtEl>
+                                          <p:spTgt spid="8"/>
+                                        </p:tgtEl>
+                                        <p:attrNameLst>
+                                          <p:attrName>style.visibility</p:attrName>
+                                        </p:attrNameLst>
+                                      </p:cBhvr>
+                                      <p:to>
+                                        <p:strVal val="visible"/>
+                                      </p:to>
+                                    </p:set>
+                                  </p:childTnLst>
+                                </p:cTn>
+                              </p:par>
+                            </p:childTnLst>
+                          </p:cTn>
+                        </p:par>
+                      </p:childTnLst>
+                    </p:cTn>
+                  </p:par>
+                  <p:par>
+                    <p:cTn id="7" fill="hold">
+                      <p:stCondLst>
+                        <p:cond delay="indefinite"/>
+                      </p:stCondLst>
+                      <p:childTnLst>
+                        <p:par>
+                          <p:cTn id="8" fill="hold">
+                            <p:stCondLst>
+                              <p:cond delay="0"/>
+                            </p:stCondLst>
+                            <p:childTnLst>
+                              <p:par>
+                                <p:cTn id="9" presetID="1" presetClass="entr" presetSubtype="0" fill="hold" nodeType="clickEffect">
+                                  <p:stCondLst>
+                                    <p:cond delay="0"/>
+                                  </p:stCondLst>
+                                  <p:childTnLst>
+                                    <p:set>
+                                      <p:cBhvr>
+                                        <p:cTn id="10" dur="1" fill="hold">
+                                          <p:stCondLst>
+                                            <p:cond delay="0"/>
+                                          </p:stCondLst>
+                                        </p:cTn>
+                                        <p:tgtEl>
+                                          <p:spTgt spid="10"/>
+                                        </p:tgtEl>
+                                        <p:attrNameLst>
+                                          <p:attrName>style.visibility</p:attrName>
+                                        </p:attrNameLst>
+                                      </p:cBhvr>
+                                      <p:to>
+                                        <p:strVal val="visible"/>
+                                      </p:to>
+                                    </p:set>
+                                  </p:childTnLst>
+                                </p:cTn>
+                              </p:par>
+                            </p:childTnLst>
+                          </p:cTn>
+                        </p:par>
+                      </p:childTnLst>
+                    </p:cTn>
+                  </p:par>
+                </p:childTnLst>
+              </p:cTn>
+              <p:prevCondLst>
+                <p:cond evt="onPrev" delay="0">
+                  <p:tgtEl>
+                    <p:sldTgt/>
+                  </p:tgtEl>
+                </p:cond>
+              </p:prevCondLst>
+              <p:nextCondLst>
+                <p:cond evt="onNext" delay="0">
+                  <p:tgtEl>
+                    <p:sldTgt/>
+                  </p:tgtEl>
+                </p:cond>
+              </p:nextCondLst>
+            </p:seq>
+          </p:childTnLst>
+        </p:cTn>
+      </p:par>
+    </p:tnLst>
+  </p:timing>
+</p:sld>
+</file>
+
 <file path=ppt/slides/slide2.xml><?xml version="1.0" encoding="utf-8"?>
 <p:sld xmlns:a="http://schemas.openxmlformats.org/drawingml/2006/main" xmlns:r="http://schemas.openxmlformats.org/officeDocument/2006/relationships" xmlns:p="http://schemas.openxmlformats.org/presentationml/2006/main">
   <p:cSld>

</xml_diff>

<commit_message>
Added slides about unions/explicit struct layout
</commit_message>
<xml_diff>
--- a/doc/Introduction to unsafe C#.pptx
+++ b/doc/Introduction to unsafe C#.pptx
@@ -17,11 +17,14 @@
     <p:sldId id="265" r:id="rId11"/>
     <p:sldId id="266" r:id="rId12"/>
     <p:sldId id="267" r:id="rId13"/>
-    <p:sldId id="269" r:id="rId14"/>
-    <p:sldId id="268" r:id="rId15"/>
-    <p:sldId id="270" r:id="rId16"/>
-    <p:sldId id="271" r:id="rId17"/>
-    <p:sldId id="272" r:id="rId18"/>
+    <p:sldId id="274" r:id="rId14"/>
+    <p:sldId id="275" r:id="rId15"/>
+    <p:sldId id="269" r:id="rId16"/>
+    <p:sldId id="268" r:id="rId17"/>
+    <p:sldId id="270" r:id="rId18"/>
+    <p:sldId id="271" r:id="rId19"/>
+    <p:sldId id="272" r:id="rId20"/>
+    <p:sldId id="273" r:id="rId21"/>
   </p:sldIdLst>
   <p:sldSz cx="12192000" cy="6858000"/>
   <p:notesSz cx="6858000" cy="9144000"/>
@@ -8395,6 +8398,1208 @@
           <p:cNvPr id="2" name="Title 1">
             <a:extLst>
               <a:ext uri="{FF2B5EF4-FFF2-40B4-BE49-F238E27FC236}">
+                <a16:creationId xmlns:a16="http://schemas.microsoft.com/office/drawing/2014/main" id="{5ACB26A2-9BBB-2257-FBA1-F5114C9A428F}"/>
+              </a:ext>
+            </a:extLst>
+          </p:cNvPr>
+          <p:cNvSpPr>
+            <a:spLocks noGrp="1"/>
+          </p:cNvSpPr>
+          <p:nvPr>
+            <p:ph type="title"/>
+          </p:nvPr>
+        </p:nvSpPr>
+        <p:spPr/>
+        <p:txBody>
+          <a:bodyPr/>
+          <a:lstStyle/>
+          <a:p>
+            <a:r>
+              <a:rPr lang="en-US"/>
+              <a:t>Unsafe C# features</a:t>
+            </a:r>
+            <a:br>
+              <a:rPr lang="en-US"/>
+            </a:br>
+            <a:r>
+              <a:rPr lang="en-US"/>
+              <a:t>Explicit struct layout I</a:t>
+            </a:r>
+          </a:p>
+        </p:txBody>
+      </p:sp>
+      <p:sp>
+        <p:nvSpPr>
+          <p:cNvPr id="3" name="Content Placeholder 2">
+            <a:extLst>
+              <a:ext uri="{FF2B5EF4-FFF2-40B4-BE49-F238E27FC236}">
+                <a16:creationId xmlns:a16="http://schemas.microsoft.com/office/drawing/2014/main" id="{A6519404-09A2-EF2F-2AD5-9F7A2DA4724C}"/>
+              </a:ext>
+            </a:extLst>
+          </p:cNvPr>
+          <p:cNvSpPr>
+            <a:spLocks noGrp="1"/>
+          </p:cNvSpPr>
+          <p:nvPr>
+            <p:ph idx="1"/>
+          </p:nvPr>
+        </p:nvSpPr>
+        <p:spPr/>
+        <p:txBody>
+          <a:bodyPr/>
+          <a:lstStyle/>
+          <a:p>
+            <a:endParaRPr lang="en-US"/>
+          </a:p>
+        </p:txBody>
+      </p:sp>
+      <p:sp>
+        <p:nvSpPr>
+          <p:cNvPr id="4" name="TextBox 3">
+            <a:extLst>
+              <a:ext uri="{FF2B5EF4-FFF2-40B4-BE49-F238E27FC236}">
+                <a16:creationId xmlns:a16="http://schemas.microsoft.com/office/drawing/2014/main" id="{06D4E43A-5942-D540-7BE3-4A2F1DC936AD}"/>
+              </a:ext>
+            </a:extLst>
+          </p:cNvPr>
+          <p:cNvSpPr txBox="1"/>
+          <p:nvPr/>
+        </p:nvSpPr>
+        <p:spPr>
+          <a:xfrm>
+            <a:off x="1103312" y="2052918"/>
+            <a:ext cx="8946541" cy="4195480"/>
+          </a:xfrm>
+          <a:prstGeom prst="rect">
+            <a:avLst/>
+          </a:prstGeom>
+          <a:solidFill>
+            <a:schemeClr val="tx1"/>
+          </a:solidFill>
+          <a:ln w="15875">
+            <a:solidFill>
+              <a:schemeClr val="accent1"/>
+            </a:solidFill>
+          </a:ln>
+        </p:spPr>
+        <p:txBody>
+          <a:bodyPr wrap="square" rtlCol="0">
+            <a:noAutofit/>
+          </a:bodyPr>
+          <a:lstStyle/>
+          <a:p>
+            <a:r>
+              <a:rPr lang="en-US" sz="1800" dirty="0">
+                <a:solidFill>
+                  <a:srgbClr val="008000"/>
+                </a:solidFill>
+                <a:latin typeface="Cascadia Mono" panose="020B0609020000020004" pitchFamily="49" charset="0"/>
+              </a:rPr>
+              <a:t>// Assuming a little-endian system</a:t>
+            </a:r>
+            <a:endParaRPr lang="en-US" sz="1800" dirty="0">
+              <a:solidFill>
+                <a:srgbClr val="000000"/>
+              </a:solidFill>
+              <a:latin typeface="Cascadia Mono" panose="020B0609020000020004" pitchFamily="49" charset="0"/>
+            </a:endParaRPr>
+          </a:p>
+          <a:p>
+            <a:r>
+              <a:rPr lang="en-US" sz="1800" dirty="0">
+                <a:solidFill>
+                  <a:srgbClr val="000000"/>
+                </a:solidFill>
+                <a:latin typeface="Cascadia Mono" panose="020B0609020000020004" pitchFamily="49" charset="0"/>
+              </a:rPr>
+              <a:t>[</a:t>
+            </a:r>
+            <a:r>
+              <a:rPr lang="en-US" sz="1800" dirty="0" err="1">
+                <a:solidFill>
+                  <a:srgbClr val="000000"/>
+                </a:solidFill>
+                <a:latin typeface="Cascadia Mono" panose="020B0609020000020004" pitchFamily="49" charset="0"/>
+              </a:rPr>
+              <a:t>StructLayout</a:t>
+            </a:r>
+            <a:r>
+              <a:rPr lang="en-US" sz="1800" dirty="0">
+                <a:solidFill>
+                  <a:srgbClr val="000000"/>
+                </a:solidFill>
+                <a:latin typeface="Cascadia Mono" panose="020B0609020000020004" pitchFamily="49" charset="0"/>
+              </a:rPr>
+              <a:t>(</a:t>
+            </a:r>
+            <a:r>
+              <a:rPr lang="en-US" sz="1800" dirty="0" err="1">
+                <a:solidFill>
+                  <a:srgbClr val="000000"/>
+                </a:solidFill>
+                <a:latin typeface="Cascadia Mono" panose="020B0609020000020004" pitchFamily="49" charset="0"/>
+              </a:rPr>
+              <a:t>LayoutKind.Explicit</a:t>
+            </a:r>
+            <a:r>
+              <a:rPr lang="en-US" sz="1800" dirty="0">
+                <a:solidFill>
+                  <a:srgbClr val="000000"/>
+                </a:solidFill>
+                <a:latin typeface="Cascadia Mono" panose="020B0609020000020004" pitchFamily="49" charset="0"/>
+              </a:rPr>
+              <a:t>)]</a:t>
+            </a:r>
+          </a:p>
+          <a:p>
+            <a:r>
+              <a:rPr lang="en-US" sz="1800" dirty="0">
+                <a:solidFill>
+                  <a:srgbClr val="0000FF"/>
+                </a:solidFill>
+                <a:latin typeface="Cascadia Mono" panose="020B0609020000020004" pitchFamily="49" charset="0"/>
+              </a:rPr>
+              <a:t>public</a:t>
+            </a:r>
+            <a:r>
+              <a:rPr lang="en-US" sz="1800" dirty="0">
+                <a:solidFill>
+                  <a:srgbClr val="000000"/>
+                </a:solidFill>
+                <a:latin typeface="Cascadia Mono" panose="020B0609020000020004" pitchFamily="49" charset="0"/>
+              </a:rPr>
+              <a:t> </a:t>
+            </a:r>
+            <a:r>
+              <a:rPr lang="en-US" sz="1800" dirty="0">
+                <a:solidFill>
+                  <a:srgbClr val="0000FF"/>
+                </a:solidFill>
+                <a:latin typeface="Cascadia Mono" panose="020B0609020000020004" pitchFamily="49" charset="0"/>
+              </a:rPr>
+              <a:t>struct</a:t>
+            </a:r>
+            <a:r>
+              <a:rPr lang="en-US" sz="1800" dirty="0">
+                <a:solidFill>
+                  <a:srgbClr val="000000"/>
+                </a:solidFill>
+                <a:latin typeface="Cascadia Mono" panose="020B0609020000020004" pitchFamily="49" charset="0"/>
+              </a:rPr>
+              <a:t> </a:t>
+            </a:r>
+            <a:r>
+              <a:rPr lang="en-US" sz="1800" dirty="0">
+                <a:solidFill>
+                  <a:srgbClr val="2B91AF"/>
+                </a:solidFill>
+                <a:latin typeface="Cascadia Mono" panose="020B0609020000020004" pitchFamily="49" charset="0"/>
+              </a:rPr>
+              <a:t>Union</a:t>
+            </a:r>
+            <a:endParaRPr lang="en-US" sz="1800" dirty="0">
+              <a:solidFill>
+                <a:srgbClr val="000000"/>
+              </a:solidFill>
+              <a:latin typeface="Cascadia Mono" panose="020B0609020000020004" pitchFamily="49" charset="0"/>
+            </a:endParaRPr>
+          </a:p>
+          <a:p>
+            <a:r>
+              <a:rPr lang="en-US" sz="1800" dirty="0">
+                <a:solidFill>
+                  <a:srgbClr val="000000"/>
+                </a:solidFill>
+                <a:latin typeface="Cascadia Mono" panose="020B0609020000020004" pitchFamily="49" charset="0"/>
+              </a:rPr>
+              <a:t>{</a:t>
+            </a:r>
+          </a:p>
+          <a:p>
+            <a:r>
+              <a:rPr lang="en-US" sz="1800" dirty="0">
+                <a:solidFill>
+                  <a:srgbClr val="000000"/>
+                </a:solidFill>
+                <a:latin typeface="Cascadia Mono" panose="020B0609020000020004" pitchFamily="49" charset="0"/>
+              </a:rPr>
+              <a:t>    [</a:t>
+            </a:r>
+            <a:r>
+              <a:rPr lang="en-US" sz="1800" dirty="0" err="1">
+                <a:solidFill>
+                  <a:srgbClr val="000000"/>
+                </a:solidFill>
+                <a:latin typeface="Cascadia Mono" panose="020B0609020000020004" pitchFamily="49" charset="0"/>
+              </a:rPr>
+              <a:t>FieldOffset</a:t>
+            </a:r>
+            <a:r>
+              <a:rPr lang="en-US" sz="1800" dirty="0">
+                <a:solidFill>
+                  <a:srgbClr val="000000"/>
+                </a:solidFill>
+                <a:latin typeface="Cascadia Mono" panose="020B0609020000020004" pitchFamily="49" charset="0"/>
+              </a:rPr>
+              <a:t>(0)] </a:t>
+            </a:r>
+            <a:r>
+              <a:rPr lang="en-US" sz="1800" dirty="0">
+                <a:solidFill>
+                  <a:srgbClr val="0000FF"/>
+                </a:solidFill>
+                <a:latin typeface="Cascadia Mono" panose="020B0609020000020004" pitchFamily="49" charset="0"/>
+              </a:rPr>
+              <a:t>public</a:t>
+            </a:r>
+            <a:r>
+              <a:rPr lang="en-US" sz="1800" dirty="0">
+                <a:solidFill>
+                  <a:srgbClr val="000000"/>
+                </a:solidFill>
+                <a:latin typeface="Cascadia Mono" panose="020B0609020000020004" pitchFamily="49" charset="0"/>
+              </a:rPr>
+              <a:t> </a:t>
+            </a:r>
+            <a:r>
+              <a:rPr lang="en-US" sz="1800" dirty="0" err="1">
+                <a:solidFill>
+                  <a:srgbClr val="0000FF"/>
+                </a:solidFill>
+                <a:latin typeface="Cascadia Mono" panose="020B0609020000020004" pitchFamily="49" charset="0"/>
+              </a:rPr>
+              <a:t>ushort</a:t>
+            </a:r>
+            <a:r>
+              <a:rPr lang="en-US" sz="1800" dirty="0">
+                <a:solidFill>
+                  <a:srgbClr val="000000"/>
+                </a:solidFill>
+                <a:latin typeface="Cascadia Mono" panose="020B0609020000020004" pitchFamily="49" charset="0"/>
+              </a:rPr>
+              <a:t> Value;</a:t>
+            </a:r>
+          </a:p>
+          <a:p>
+            <a:r>
+              <a:rPr lang="en-US" sz="1800" dirty="0">
+                <a:solidFill>
+                  <a:srgbClr val="000000"/>
+                </a:solidFill>
+                <a:latin typeface="Cascadia Mono" panose="020B0609020000020004" pitchFamily="49" charset="0"/>
+              </a:rPr>
+              <a:t>    [</a:t>
+            </a:r>
+            <a:r>
+              <a:rPr lang="en-US" sz="1800" dirty="0" err="1">
+                <a:solidFill>
+                  <a:srgbClr val="000000"/>
+                </a:solidFill>
+                <a:latin typeface="Cascadia Mono" panose="020B0609020000020004" pitchFamily="49" charset="0"/>
+              </a:rPr>
+              <a:t>FieldOffset</a:t>
+            </a:r>
+            <a:r>
+              <a:rPr lang="en-US" sz="1800" dirty="0">
+                <a:solidFill>
+                  <a:srgbClr val="000000"/>
+                </a:solidFill>
+                <a:latin typeface="Cascadia Mono" panose="020B0609020000020004" pitchFamily="49" charset="0"/>
+              </a:rPr>
+              <a:t>(0)] </a:t>
+            </a:r>
+            <a:r>
+              <a:rPr lang="en-US" sz="1800" dirty="0">
+                <a:solidFill>
+                  <a:srgbClr val="0000FF"/>
+                </a:solidFill>
+                <a:latin typeface="Cascadia Mono" panose="020B0609020000020004" pitchFamily="49" charset="0"/>
+              </a:rPr>
+              <a:t>public</a:t>
+            </a:r>
+            <a:r>
+              <a:rPr lang="en-US" sz="1800" dirty="0">
+                <a:solidFill>
+                  <a:srgbClr val="000000"/>
+                </a:solidFill>
+                <a:latin typeface="Cascadia Mono" panose="020B0609020000020004" pitchFamily="49" charset="0"/>
+              </a:rPr>
+              <a:t> </a:t>
+            </a:r>
+            <a:r>
+              <a:rPr lang="en-US" sz="1800" dirty="0">
+                <a:solidFill>
+                  <a:srgbClr val="0000FF"/>
+                </a:solidFill>
+                <a:latin typeface="Cascadia Mono" panose="020B0609020000020004" pitchFamily="49" charset="0"/>
+              </a:rPr>
+              <a:t>byte</a:t>
+            </a:r>
+            <a:r>
+              <a:rPr lang="en-US" sz="1800" dirty="0">
+                <a:solidFill>
+                  <a:srgbClr val="000000"/>
+                </a:solidFill>
+                <a:latin typeface="Cascadia Mono" panose="020B0609020000020004" pitchFamily="49" charset="0"/>
+              </a:rPr>
+              <a:t>   </a:t>
+            </a:r>
+            <a:r>
+              <a:rPr lang="en-US" sz="1800" dirty="0" err="1">
+                <a:solidFill>
+                  <a:srgbClr val="000000"/>
+                </a:solidFill>
+                <a:latin typeface="Cascadia Mono" panose="020B0609020000020004" pitchFamily="49" charset="0"/>
+              </a:rPr>
+              <a:t>LowByte</a:t>
+            </a:r>
+            <a:r>
+              <a:rPr lang="en-US" sz="1800" dirty="0">
+                <a:solidFill>
+                  <a:srgbClr val="000000"/>
+                </a:solidFill>
+                <a:latin typeface="Cascadia Mono" panose="020B0609020000020004" pitchFamily="49" charset="0"/>
+              </a:rPr>
+              <a:t>;</a:t>
+            </a:r>
+          </a:p>
+          <a:p>
+            <a:r>
+              <a:rPr lang="en-US" sz="1800" dirty="0">
+                <a:solidFill>
+                  <a:srgbClr val="000000"/>
+                </a:solidFill>
+                <a:latin typeface="Cascadia Mono" panose="020B0609020000020004" pitchFamily="49" charset="0"/>
+              </a:rPr>
+              <a:t>    [</a:t>
+            </a:r>
+            <a:r>
+              <a:rPr lang="en-US" sz="1800" dirty="0" err="1">
+                <a:solidFill>
+                  <a:srgbClr val="000000"/>
+                </a:solidFill>
+                <a:latin typeface="Cascadia Mono" panose="020B0609020000020004" pitchFamily="49" charset="0"/>
+              </a:rPr>
+              <a:t>FieldOffset</a:t>
+            </a:r>
+            <a:r>
+              <a:rPr lang="en-US" sz="1800" dirty="0">
+                <a:solidFill>
+                  <a:srgbClr val="000000"/>
+                </a:solidFill>
+                <a:latin typeface="Cascadia Mono" panose="020B0609020000020004" pitchFamily="49" charset="0"/>
+              </a:rPr>
+              <a:t>(1)] </a:t>
+            </a:r>
+            <a:r>
+              <a:rPr lang="en-US" sz="1800" dirty="0">
+                <a:solidFill>
+                  <a:srgbClr val="0000FF"/>
+                </a:solidFill>
+                <a:latin typeface="Cascadia Mono" panose="020B0609020000020004" pitchFamily="49" charset="0"/>
+              </a:rPr>
+              <a:t>public</a:t>
+            </a:r>
+            <a:r>
+              <a:rPr lang="en-US" sz="1800" dirty="0">
+                <a:solidFill>
+                  <a:srgbClr val="000000"/>
+                </a:solidFill>
+                <a:latin typeface="Cascadia Mono" panose="020B0609020000020004" pitchFamily="49" charset="0"/>
+              </a:rPr>
+              <a:t> </a:t>
+            </a:r>
+            <a:r>
+              <a:rPr lang="en-US" sz="1800" dirty="0">
+                <a:solidFill>
+                  <a:srgbClr val="0000FF"/>
+                </a:solidFill>
+                <a:latin typeface="Cascadia Mono" panose="020B0609020000020004" pitchFamily="49" charset="0"/>
+              </a:rPr>
+              <a:t>byte</a:t>
+            </a:r>
+            <a:r>
+              <a:rPr lang="en-US" sz="1800" dirty="0">
+                <a:solidFill>
+                  <a:srgbClr val="000000"/>
+                </a:solidFill>
+                <a:latin typeface="Cascadia Mono" panose="020B0609020000020004" pitchFamily="49" charset="0"/>
+              </a:rPr>
+              <a:t>   </a:t>
+            </a:r>
+            <a:r>
+              <a:rPr lang="en-US" sz="1800" dirty="0" err="1">
+                <a:solidFill>
+                  <a:srgbClr val="000000"/>
+                </a:solidFill>
+                <a:latin typeface="Cascadia Mono" panose="020B0609020000020004" pitchFamily="49" charset="0"/>
+              </a:rPr>
+              <a:t>HighByte</a:t>
+            </a:r>
+            <a:r>
+              <a:rPr lang="en-US" sz="1800" dirty="0">
+                <a:solidFill>
+                  <a:srgbClr val="000000"/>
+                </a:solidFill>
+                <a:latin typeface="Cascadia Mono" panose="020B0609020000020004" pitchFamily="49" charset="0"/>
+              </a:rPr>
+              <a:t>;</a:t>
+            </a:r>
+          </a:p>
+          <a:p>
+            <a:r>
+              <a:rPr lang="en-US" sz="1800" dirty="0">
+                <a:solidFill>
+                  <a:srgbClr val="000000"/>
+                </a:solidFill>
+                <a:latin typeface="Cascadia Mono" panose="020B0609020000020004" pitchFamily="49" charset="0"/>
+              </a:rPr>
+              <a:t>}</a:t>
+            </a:r>
+          </a:p>
+          <a:p>
+            <a:endParaRPr lang="en-US" sz="1800" dirty="0">
+              <a:solidFill>
+                <a:srgbClr val="000000"/>
+              </a:solidFill>
+              <a:latin typeface="Cascadia Mono" panose="020B0609020000020004" pitchFamily="49" charset="0"/>
+            </a:endParaRPr>
+          </a:p>
+          <a:p>
+            <a:r>
+              <a:rPr lang="en-US" sz="1800" dirty="0">
+                <a:solidFill>
+                  <a:srgbClr val="000000"/>
+                </a:solidFill>
+                <a:latin typeface="Cascadia Mono" panose="020B0609020000020004" pitchFamily="49" charset="0"/>
+              </a:rPr>
+              <a:t>Union u = </a:t>
+            </a:r>
+            <a:r>
+              <a:rPr lang="en-US" sz="1800" dirty="0">
+                <a:solidFill>
+                  <a:srgbClr val="0000FF"/>
+                </a:solidFill>
+                <a:latin typeface="Cascadia Mono" panose="020B0609020000020004" pitchFamily="49" charset="0"/>
+              </a:rPr>
+              <a:t>new</a:t>
+            </a:r>
+            <a:r>
+              <a:rPr lang="en-US" sz="1800" dirty="0">
+                <a:solidFill>
+                  <a:srgbClr val="000000"/>
+                </a:solidFill>
+                <a:latin typeface="Cascadia Mono" panose="020B0609020000020004" pitchFamily="49" charset="0"/>
+              </a:rPr>
+              <a:t>() { Value = 0xBEEF };</a:t>
+            </a:r>
+          </a:p>
+          <a:p>
+            <a:endParaRPr lang="en-US" sz="1800" dirty="0">
+              <a:solidFill>
+                <a:srgbClr val="000000"/>
+              </a:solidFill>
+              <a:latin typeface="Cascadia Mono" panose="020B0609020000020004" pitchFamily="49" charset="0"/>
+            </a:endParaRPr>
+          </a:p>
+          <a:p>
+            <a:r>
+              <a:rPr lang="en-US" sz="1800" dirty="0" err="1">
+                <a:solidFill>
+                  <a:srgbClr val="000000"/>
+                </a:solidFill>
+                <a:latin typeface="Cascadia Mono" panose="020B0609020000020004" pitchFamily="49" charset="0"/>
+              </a:rPr>
+              <a:t>Console.WriteLine</a:t>
+            </a:r>
+            <a:r>
+              <a:rPr lang="en-US" sz="1800" dirty="0">
+                <a:solidFill>
+                  <a:srgbClr val="000000"/>
+                </a:solidFill>
+                <a:latin typeface="Cascadia Mono" panose="020B0609020000020004" pitchFamily="49" charset="0"/>
+              </a:rPr>
+              <a:t>(</a:t>
+            </a:r>
+            <a:r>
+              <a:rPr lang="en-US" sz="1800" dirty="0">
+                <a:solidFill>
+                  <a:srgbClr val="A31515"/>
+                </a:solidFill>
+                <a:latin typeface="Cascadia Mono" panose="020B0609020000020004" pitchFamily="49" charset="0"/>
+              </a:rPr>
+              <a:t>$"</a:t>
+            </a:r>
+            <a:r>
+              <a:rPr lang="en-US" sz="1800" dirty="0">
+                <a:solidFill>
+                  <a:srgbClr val="000000"/>
+                </a:solidFill>
+                <a:latin typeface="Cascadia Mono" panose="020B0609020000020004" pitchFamily="49" charset="0"/>
+              </a:rPr>
+              <a:t>{u.HighByte:</a:t>
+            </a:r>
+            <a:r>
+              <a:rPr lang="en-US" sz="1800" dirty="0">
+                <a:solidFill>
+                  <a:srgbClr val="A31515"/>
+                </a:solidFill>
+                <a:latin typeface="Cascadia Mono" panose="020B0609020000020004" pitchFamily="49" charset="0"/>
+              </a:rPr>
+              <a:t>X2</a:t>
+            </a:r>
+            <a:r>
+              <a:rPr lang="en-US" sz="1800" dirty="0">
+                <a:solidFill>
+                  <a:srgbClr val="000000"/>
+                </a:solidFill>
+                <a:latin typeface="Cascadia Mono" panose="020B0609020000020004" pitchFamily="49" charset="0"/>
+              </a:rPr>
+              <a:t>}</a:t>
+            </a:r>
+            <a:r>
+              <a:rPr lang="en-US" sz="1800" dirty="0">
+                <a:solidFill>
+                  <a:srgbClr val="A31515"/>
+                </a:solidFill>
+                <a:latin typeface="Cascadia Mono" panose="020B0609020000020004" pitchFamily="49" charset="0"/>
+              </a:rPr>
+              <a:t>"</a:t>
+            </a:r>
+            <a:r>
+              <a:rPr lang="en-US" sz="1800" dirty="0">
+                <a:solidFill>
+                  <a:srgbClr val="000000"/>
+                </a:solidFill>
+                <a:latin typeface="Cascadia Mono" panose="020B0609020000020004" pitchFamily="49" charset="0"/>
+              </a:rPr>
+              <a:t>); </a:t>
+            </a:r>
+            <a:r>
+              <a:rPr lang="en-US" sz="1800" dirty="0">
+                <a:solidFill>
+                  <a:srgbClr val="008000"/>
+                </a:solidFill>
+                <a:latin typeface="Cascadia Mono" panose="020B0609020000020004" pitchFamily="49" charset="0"/>
+              </a:rPr>
+              <a:t>// Prints "BE"</a:t>
+            </a:r>
+            <a:endParaRPr lang="en-US" sz="1800" dirty="0">
+              <a:solidFill>
+                <a:srgbClr val="000000"/>
+              </a:solidFill>
+              <a:latin typeface="Cascadia Mono" panose="020B0609020000020004" pitchFamily="49" charset="0"/>
+            </a:endParaRPr>
+          </a:p>
+          <a:p>
+            <a:r>
+              <a:rPr lang="en-US" sz="1800" dirty="0" err="1">
+                <a:solidFill>
+                  <a:srgbClr val="000000"/>
+                </a:solidFill>
+                <a:latin typeface="Cascadia Mono" panose="020B0609020000020004" pitchFamily="49" charset="0"/>
+              </a:rPr>
+              <a:t>Console.WriteLine</a:t>
+            </a:r>
+            <a:r>
+              <a:rPr lang="en-US" sz="1800" dirty="0">
+                <a:solidFill>
+                  <a:srgbClr val="000000"/>
+                </a:solidFill>
+                <a:latin typeface="Cascadia Mono" panose="020B0609020000020004" pitchFamily="49" charset="0"/>
+              </a:rPr>
+              <a:t>(</a:t>
+            </a:r>
+            <a:r>
+              <a:rPr lang="en-US" sz="1800" dirty="0">
+                <a:solidFill>
+                  <a:srgbClr val="A31515"/>
+                </a:solidFill>
+                <a:latin typeface="Cascadia Mono" panose="020B0609020000020004" pitchFamily="49" charset="0"/>
+              </a:rPr>
+              <a:t>$"</a:t>
+            </a:r>
+            <a:r>
+              <a:rPr lang="en-US" sz="1800" dirty="0">
+                <a:solidFill>
+                  <a:srgbClr val="000000"/>
+                </a:solidFill>
+                <a:latin typeface="Cascadia Mono" panose="020B0609020000020004" pitchFamily="49" charset="0"/>
+              </a:rPr>
+              <a:t>{u.LowByte:</a:t>
+            </a:r>
+            <a:r>
+              <a:rPr lang="en-US" sz="1800" dirty="0">
+                <a:solidFill>
+                  <a:srgbClr val="A31515"/>
+                </a:solidFill>
+                <a:latin typeface="Cascadia Mono" panose="020B0609020000020004" pitchFamily="49" charset="0"/>
+              </a:rPr>
+              <a:t>X2</a:t>
+            </a:r>
+            <a:r>
+              <a:rPr lang="en-US" sz="1800" dirty="0">
+                <a:solidFill>
+                  <a:srgbClr val="000000"/>
+                </a:solidFill>
+                <a:latin typeface="Cascadia Mono" panose="020B0609020000020004" pitchFamily="49" charset="0"/>
+              </a:rPr>
+              <a:t>}</a:t>
+            </a:r>
+            <a:r>
+              <a:rPr lang="en-US" sz="1800" dirty="0">
+                <a:solidFill>
+                  <a:srgbClr val="A31515"/>
+                </a:solidFill>
+                <a:latin typeface="Cascadia Mono" panose="020B0609020000020004" pitchFamily="49" charset="0"/>
+              </a:rPr>
+              <a:t>"</a:t>
+            </a:r>
+            <a:r>
+              <a:rPr lang="en-US" sz="1800" dirty="0">
+                <a:solidFill>
+                  <a:srgbClr val="000000"/>
+                </a:solidFill>
+                <a:latin typeface="Cascadia Mono" panose="020B0609020000020004" pitchFamily="49" charset="0"/>
+              </a:rPr>
+              <a:t>);  </a:t>
+            </a:r>
+            <a:r>
+              <a:rPr lang="en-US" sz="1800" dirty="0">
+                <a:solidFill>
+                  <a:srgbClr val="008000"/>
+                </a:solidFill>
+                <a:latin typeface="Cascadia Mono" panose="020B0609020000020004" pitchFamily="49" charset="0"/>
+              </a:rPr>
+              <a:t>// Prints "EF"</a:t>
+            </a:r>
+            <a:endParaRPr lang="en-US" sz="1800" dirty="0">
+              <a:solidFill>
+                <a:srgbClr val="000000"/>
+              </a:solidFill>
+              <a:latin typeface="Cascadia Mono" panose="020B0609020000020004" pitchFamily="49" charset="0"/>
+            </a:endParaRPr>
+          </a:p>
+        </p:txBody>
+      </p:sp>
+    </p:spTree>
+    <p:extLst>
+      <p:ext uri="{BB962C8B-B14F-4D97-AF65-F5344CB8AC3E}">
+        <p14:creationId xmlns:p14="http://schemas.microsoft.com/office/powerpoint/2010/main" val="2065158101"/>
+      </p:ext>
+    </p:extLst>
+  </p:cSld>
+  <p:clrMapOvr>
+    <a:masterClrMapping/>
+  </p:clrMapOvr>
+</p:sld>
+</file>
+
+<file path=ppt/slides/slide14.xml><?xml version="1.0" encoding="utf-8"?>
+<p:sld xmlns:a="http://schemas.openxmlformats.org/drawingml/2006/main" xmlns:r="http://schemas.openxmlformats.org/officeDocument/2006/relationships" xmlns:p="http://schemas.openxmlformats.org/presentationml/2006/main">
+  <p:cSld>
+    <p:spTree>
+      <p:nvGrpSpPr>
+        <p:cNvPr id="1" name=""/>
+        <p:cNvGrpSpPr/>
+        <p:nvPr/>
+      </p:nvGrpSpPr>
+      <p:grpSpPr>
+        <a:xfrm>
+          <a:off x="0" y="0"/>
+          <a:ext cx="0" cy="0"/>
+          <a:chOff x="0" y="0"/>
+          <a:chExt cx="0" cy="0"/>
+        </a:xfrm>
+      </p:grpSpPr>
+      <p:sp>
+        <p:nvSpPr>
+          <p:cNvPr id="2" name="Title 1">
+            <a:extLst>
+              <a:ext uri="{FF2B5EF4-FFF2-40B4-BE49-F238E27FC236}">
+                <a16:creationId xmlns:a16="http://schemas.microsoft.com/office/drawing/2014/main" id="{52BDDA1D-BCED-F248-1B5A-D4CE504620E9}"/>
+              </a:ext>
+            </a:extLst>
+          </p:cNvPr>
+          <p:cNvSpPr>
+            <a:spLocks noGrp="1"/>
+          </p:cNvSpPr>
+          <p:nvPr>
+            <p:ph type="title"/>
+          </p:nvPr>
+        </p:nvSpPr>
+        <p:spPr/>
+        <p:txBody>
+          <a:bodyPr/>
+          <a:lstStyle/>
+          <a:p>
+            <a:r>
+              <a:rPr lang="en-US"/>
+              <a:t>Unsafe C# features</a:t>
+            </a:r>
+            <a:br>
+              <a:rPr lang="en-US"/>
+            </a:br>
+            <a:r>
+              <a:rPr lang="en-US"/>
+              <a:t>Explicit struct layout II</a:t>
+            </a:r>
+          </a:p>
+        </p:txBody>
+      </p:sp>
+      <p:sp>
+        <p:nvSpPr>
+          <p:cNvPr id="3" name="Content Placeholder 2">
+            <a:extLst>
+              <a:ext uri="{FF2B5EF4-FFF2-40B4-BE49-F238E27FC236}">
+                <a16:creationId xmlns:a16="http://schemas.microsoft.com/office/drawing/2014/main" id="{466F3FCC-7859-47E1-4CF9-D9416046558E}"/>
+              </a:ext>
+            </a:extLst>
+          </p:cNvPr>
+          <p:cNvSpPr>
+            <a:spLocks noGrp="1"/>
+          </p:cNvSpPr>
+          <p:nvPr>
+            <p:ph idx="1"/>
+          </p:nvPr>
+        </p:nvSpPr>
+        <p:spPr/>
+        <p:txBody>
+          <a:bodyPr/>
+          <a:lstStyle/>
+          <a:p>
+            <a:endParaRPr lang="en-US"/>
+          </a:p>
+        </p:txBody>
+      </p:sp>
+      <p:sp>
+        <p:nvSpPr>
+          <p:cNvPr id="4" name="TextBox 3">
+            <a:extLst>
+              <a:ext uri="{FF2B5EF4-FFF2-40B4-BE49-F238E27FC236}">
+                <a16:creationId xmlns:a16="http://schemas.microsoft.com/office/drawing/2014/main" id="{F9836759-86D4-1193-9384-B2E6CAE37E24}"/>
+              </a:ext>
+            </a:extLst>
+          </p:cNvPr>
+          <p:cNvSpPr txBox="1"/>
+          <p:nvPr/>
+        </p:nvSpPr>
+        <p:spPr>
+          <a:xfrm>
+            <a:off x="1103312" y="2052918"/>
+            <a:ext cx="8946541" cy="4195481"/>
+          </a:xfrm>
+          <a:prstGeom prst="rect">
+            <a:avLst/>
+          </a:prstGeom>
+          <a:solidFill>
+            <a:schemeClr val="tx1"/>
+          </a:solidFill>
+          <a:ln w="15875">
+            <a:solidFill>
+              <a:schemeClr val="accent1"/>
+            </a:solidFill>
+          </a:ln>
+        </p:spPr>
+        <p:txBody>
+          <a:bodyPr wrap="square" rtlCol="0">
+            <a:noAutofit/>
+          </a:bodyPr>
+          <a:lstStyle/>
+          <a:p>
+            <a:r>
+              <a:rPr lang="en-US" sz="1800">
+                <a:solidFill>
+                  <a:srgbClr val="000000"/>
+                </a:solidFill>
+                <a:latin typeface="Cascadia Mono" panose="020B0609020000020004" pitchFamily="49" charset="0"/>
+              </a:rPr>
+              <a:t>[StructLayout(LayoutKind.Explicit)]</a:t>
+            </a:r>
+          </a:p>
+          <a:p>
+            <a:r>
+              <a:rPr lang="en-US" sz="1800">
+                <a:solidFill>
+                  <a:srgbClr val="0000FF"/>
+                </a:solidFill>
+                <a:latin typeface="Cascadia Mono" panose="020B0609020000020004" pitchFamily="49" charset="0"/>
+              </a:rPr>
+              <a:t>public</a:t>
+            </a:r>
+            <a:r>
+              <a:rPr lang="en-US" sz="1800">
+                <a:solidFill>
+                  <a:srgbClr val="000000"/>
+                </a:solidFill>
+                <a:latin typeface="Cascadia Mono" panose="020B0609020000020004" pitchFamily="49" charset="0"/>
+              </a:rPr>
+              <a:t> </a:t>
+            </a:r>
+            <a:r>
+              <a:rPr lang="en-US" sz="1800">
+                <a:solidFill>
+                  <a:srgbClr val="0000FF"/>
+                </a:solidFill>
+                <a:latin typeface="Cascadia Mono" panose="020B0609020000020004" pitchFamily="49" charset="0"/>
+              </a:rPr>
+              <a:t>unsafe</a:t>
+            </a:r>
+            <a:r>
+              <a:rPr lang="en-US" sz="1800">
+                <a:solidFill>
+                  <a:srgbClr val="000000"/>
+                </a:solidFill>
+                <a:latin typeface="Cascadia Mono" panose="020B0609020000020004" pitchFamily="49" charset="0"/>
+              </a:rPr>
+              <a:t> </a:t>
+            </a:r>
+            <a:r>
+              <a:rPr lang="en-US" sz="1800">
+                <a:solidFill>
+                  <a:srgbClr val="0000FF"/>
+                </a:solidFill>
+                <a:latin typeface="Cascadia Mono" panose="020B0609020000020004" pitchFamily="49" charset="0"/>
+              </a:rPr>
+              <a:t>struct</a:t>
+            </a:r>
+            <a:r>
+              <a:rPr lang="en-US" sz="1800">
+                <a:solidFill>
+                  <a:srgbClr val="000000"/>
+                </a:solidFill>
+                <a:latin typeface="Cascadia Mono" panose="020B0609020000020004" pitchFamily="49" charset="0"/>
+              </a:rPr>
+              <a:t> </a:t>
+            </a:r>
+            <a:r>
+              <a:rPr lang="en-US" sz="1800">
+                <a:solidFill>
+                  <a:srgbClr val="2B91AF"/>
+                </a:solidFill>
+                <a:latin typeface="Cascadia Mono" panose="020B0609020000020004" pitchFamily="49" charset="0"/>
+              </a:rPr>
+              <a:t>ReinterpretCast</a:t>
+            </a:r>
+            <a:endParaRPr lang="en-US" sz="1800">
+              <a:solidFill>
+                <a:srgbClr val="000000"/>
+              </a:solidFill>
+              <a:latin typeface="Cascadia Mono" panose="020B0609020000020004" pitchFamily="49" charset="0"/>
+            </a:endParaRPr>
+          </a:p>
+          <a:p>
+            <a:r>
+              <a:rPr lang="en-US" sz="1800">
+                <a:solidFill>
+                  <a:srgbClr val="000000"/>
+                </a:solidFill>
+                <a:latin typeface="Cascadia Mono" panose="020B0609020000020004" pitchFamily="49" charset="0"/>
+              </a:rPr>
+              <a:t>{</a:t>
+            </a:r>
+          </a:p>
+          <a:p>
+            <a:r>
+              <a:rPr lang="en-US" sz="1800">
+                <a:solidFill>
+                  <a:srgbClr val="000000"/>
+                </a:solidFill>
+                <a:latin typeface="Cascadia Mono" panose="020B0609020000020004" pitchFamily="49" charset="0"/>
+              </a:rPr>
+              <a:t>    [FieldOffset(0)]</a:t>
+            </a:r>
+          </a:p>
+          <a:p>
+            <a:r>
+              <a:rPr lang="en-US" sz="1800">
+                <a:solidFill>
+                  <a:srgbClr val="000000"/>
+                </a:solidFill>
+                <a:latin typeface="Cascadia Mono" panose="020B0609020000020004" pitchFamily="49" charset="0"/>
+              </a:rPr>
+              <a:t>    </a:t>
+            </a:r>
+            <a:r>
+              <a:rPr lang="en-US" sz="1800">
+                <a:solidFill>
+                  <a:srgbClr val="0000FF"/>
+                </a:solidFill>
+                <a:latin typeface="Cascadia Mono" panose="020B0609020000020004" pitchFamily="49" charset="0"/>
+              </a:rPr>
+              <a:t>public</a:t>
+            </a:r>
+            <a:r>
+              <a:rPr lang="en-US" sz="1800">
+                <a:solidFill>
+                  <a:srgbClr val="000000"/>
+                </a:solidFill>
+                <a:latin typeface="Cascadia Mono" panose="020B0609020000020004" pitchFamily="49" charset="0"/>
+              </a:rPr>
+              <a:t> </a:t>
+            </a:r>
+            <a:r>
+              <a:rPr lang="en-US" sz="1800">
+                <a:solidFill>
+                  <a:srgbClr val="0000FF"/>
+                </a:solidFill>
+                <a:latin typeface="Cascadia Mono" panose="020B0609020000020004" pitchFamily="49" charset="0"/>
+              </a:rPr>
+              <a:t>long</a:t>
+            </a:r>
+            <a:r>
+              <a:rPr lang="en-US" sz="1800">
+                <a:solidFill>
+                  <a:srgbClr val="000000"/>
+                </a:solidFill>
+                <a:latin typeface="Cascadia Mono" panose="020B0609020000020004" pitchFamily="49" charset="0"/>
+              </a:rPr>
+              <a:t> Long;</a:t>
+            </a:r>
+          </a:p>
+          <a:p>
+            <a:r>
+              <a:rPr lang="en-US" sz="1800">
+                <a:solidFill>
+                  <a:srgbClr val="000000"/>
+                </a:solidFill>
+                <a:latin typeface="Cascadia Mono" panose="020B0609020000020004" pitchFamily="49" charset="0"/>
+              </a:rPr>
+              <a:t>    [FieldOffset(0)]</a:t>
+            </a:r>
+          </a:p>
+          <a:p>
+            <a:r>
+              <a:rPr lang="en-US" sz="1800">
+                <a:solidFill>
+                  <a:srgbClr val="000000"/>
+                </a:solidFill>
+                <a:latin typeface="Cascadia Mono" panose="020B0609020000020004" pitchFamily="49" charset="0"/>
+              </a:rPr>
+              <a:t>    </a:t>
+            </a:r>
+            <a:r>
+              <a:rPr lang="en-US" sz="1800">
+                <a:solidFill>
+                  <a:srgbClr val="0000FF"/>
+                </a:solidFill>
+                <a:latin typeface="Cascadia Mono" panose="020B0609020000020004" pitchFamily="49" charset="0"/>
+              </a:rPr>
+              <a:t>public</a:t>
+            </a:r>
+            <a:r>
+              <a:rPr lang="en-US" sz="1800">
+                <a:solidFill>
+                  <a:srgbClr val="000000"/>
+                </a:solidFill>
+                <a:latin typeface="Cascadia Mono" panose="020B0609020000020004" pitchFamily="49" charset="0"/>
+              </a:rPr>
+              <a:t> </a:t>
+            </a:r>
+            <a:r>
+              <a:rPr lang="en-US" sz="1800">
+                <a:solidFill>
+                  <a:srgbClr val="0000FF"/>
+                </a:solidFill>
+                <a:latin typeface="Cascadia Mono" panose="020B0609020000020004" pitchFamily="49" charset="0"/>
+              </a:rPr>
+              <a:t>double</a:t>
+            </a:r>
+            <a:r>
+              <a:rPr lang="en-US" sz="1800">
+                <a:solidFill>
+                  <a:srgbClr val="000000"/>
+                </a:solidFill>
+                <a:latin typeface="Cascadia Mono" panose="020B0609020000020004" pitchFamily="49" charset="0"/>
+              </a:rPr>
+              <a:t> Double;</a:t>
+            </a:r>
+          </a:p>
+          <a:p>
+            <a:r>
+              <a:rPr lang="en-US" sz="1800">
+                <a:solidFill>
+                  <a:srgbClr val="000000"/>
+                </a:solidFill>
+                <a:latin typeface="Cascadia Mono" panose="020B0609020000020004" pitchFamily="49" charset="0"/>
+              </a:rPr>
+              <a:t>    [FieldOffset(0)]</a:t>
+            </a:r>
+          </a:p>
+          <a:p>
+            <a:r>
+              <a:rPr lang="en-US" sz="1800">
+                <a:solidFill>
+                  <a:srgbClr val="000000"/>
+                </a:solidFill>
+                <a:latin typeface="Cascadia Mono" panose="020B0609020000020004" pitchFamily="49" charset="0"/>
+              </a:rPr>
+              <a:t>    </a:t>
+            </a:r>
+            <a:r>
+              <a:rPr lang="en-US" sz="1800">
+                <a:solidFill>
+                  <a:srgbClr val="0000FF"/>
+                </a:solidFill>
+                <a:latin typeface="Cascadia Mono" panose="020B0609020000020004" pitchFamily="49" charset="0"/>
+              </a:rPr>
+              <a:t>public</a:t>
+            </a:r>
+            <a:r>
+              <a:rPr lang="en-US" sz="1800">
+                <a:solidFill>
+                  <a:srgbClr val="000000"/>
+                </a:solidFill>
+                <a:latin typeface="Cascadia Mono" panose="020B0609020000020004" pitchFamily="49" charset="0"/>
+              </a:rPr>
+              <a:t> </a:t>
+            </a:r>
+            <a:r>
+              <a:rPr lang="en-US" sz="1800">
+                <a:solidFill>
+                  <a:srgbClr val="0000FF"/>
+                </a:solidFill>
+                <a:latin typeface="Cascadia Mono" panose="020B0609020000020004" pitchFamily="49" charset="0"/>
+              </a:rPr>
+              <a:t>void</a:t>
+            </a:r>
+            <a:r>
+              <a:rPr lang="en-US" sz="1800">
+                <a:solidFill>
+                  <a:srgbClr val="000000"/>
+                </a:solidFill>
+                <a:latin typeface="Cascadia Mono" panose="020B0609020000020004" pitchFamily="49" charset="0"/>
+              </a:rPr>
+              <a:t>* Ptr;</a:t>
+            </a:r>
+          </a:p>
+          <a:p>
+            <a:r>
+              <a:rPr lang="en-US" sz="1800">
+                <a:solidFill>
+                  <a:srgbClr val="000000"/>
+                </a:solidFill>
+                <a:latin typeface="Cascadia Mono" panose="020B0609020000020004" pitchFamily="49" charset="0"/>
+              </a:rPr>
+              <a:t>}</a:t>
+            </a:r>
+          </a:p>
+          <a:p>
+            <a:endParaRPr lang="en-US">
+              <a:solidFill>
+                <a:srgbClr val="000000"/>
+              </a:solidFill>
+              <a:latin typeface="Cascadia Mono" panose="020B0609020000020004" pitchFamily="49" charset="0"/>
+            </a:endParaRPr>
+          </a:p>
+          <a:p>
+            <a:r>
+              <a:rPr lang="en-US" sz="1800">
+                <a:solidFill>
+                  <a:srgbClr val="000000"/>
+                </a:solidFill>
+                <a:latin typeface="Cascadia Mono" panose="020B0609020000020004" pitchFamily="49" charset="0"/>
+              </a:rPr>
+              <a:t>ReinterpretCast c = </a:t>
+            </a:r>
+            <a:r>
+              <a:rPr lang="en-US" sz="1800">
+                <a:solidFill>
+                  <a:srgbClr val="0000FF"/>
+                </a:solidFill>
+                <a:latin typeface="Cascadia Mono" panose="020B0609020000020004" pitchFamily="49" charset="0"/>
+              </a:rPr>
+              <a:t>new</a:t>
+            </a:r>
+            <a:r>
+              <a:rPr lang="en-US" sz="1800">
+                <a:solidFill>
+                  <a:srgbClr val="000000"/>
+                </a:solidFill>
+                <a:latin typeface="Cascadia Mono" panose="020B0609020000020004" pitchFamily="49" charset="0"/>
+              </a:rPr>
+              <a:t>() { Long = 47 };</a:t>
+            </a:r>
+          </a:p>
+          <a:p>
+            <a:r>
+              <a:rPr lang="en-US" sz="1800">
+                <a:solidFill>
+                  <a:srgbClr val="000000"/>
+                </a:solidFill>
+                <a:latin typeface="Cascadia Mono" panose="020B0609020000020004" pitchFamily="49" charset="0"/>
+              </a:rPr>
+              <a:t>Console.WriteLine(c.Double); </a:t>
+            </a:r>
+            <a:r>
+              <a:rPr lang="en-US" sz="1800">
+                <a:solidFill>
+                  <a:srgbClr val="008000"/>
+                </a:solidFill>
+                <a:latin typeface="Cascadia Mono" panose="020B0609020000020004" pitchFamily="49" charset="0"/>
+              </a:rPr>
+              <a:t>// Prints "2.3E-322"</a:t>
+            </a:r>
+            <a:endParaRPr lang="en-US" sz="1800">
+              <a:solidFill>
+                <a:srgbClr val="000000"/>
+              </a:solidFill>
+              <a:latin typeface="Cascadia Mono" panose="020B0609020000020004" pitchFamily="49" charset="0"/>
+            </a:endParaRPr>
+          </a:p>
+          <a:p>
+            <a:endParaRPr lang="en-US" sz="1800">
+              <a:solidFill>
+                <a:srgbClr val="000000"/>
+              </a:solidFill>
+              <a:latin typeface="Cascadia Mono" panose="020B0609020000020004" pitchFamily="49" charset="0"/>
+            </a:endParaRPr>
+          </a:p>
+          <a:p>
+            <a:endParaRPr lang="en-US" sz="1800">
+              <a:solidFill>
+                <a:srgbClr val="000000"/>
+              </a:solidFill>
+              <a:latin typeface="Cascadia Mono" panose="020B0609020000020004" pitchFamily="49" charset="0"/>
+            </a:endParaRPr>
+          </a:p>
+        </p:txBody>
+      </p:sp>
+    </p:spTree>
+    <p:extLst>
+      <p:ext uri="{BB962C8B-B14F-4D97-AF65-F5344CB8AC3E}">
+        <p14:creationId xmlns:p14="http://schemas.microsoft.com/office/powerpoint/2010/main" val="3057610466"/>
+      </p:ext>
+    </p:extLst>
+  </p:cSld>
+  <p:clrMapOvr>
+    <a:masterClrMapping/>
+  </p:clrMapOvr>
+</p:sld>
+</file>
+
+<file path=ppt/slides/slide15.xml><?xml version="1.0" encoding="utf-8"?>
+<p:sld xmlns:a="http://schemas.openxmlformats.org/drawingml/2006/main" xmlns:r="http://schemas.openxmlformats.org/officeDocument/2006/relationships" xmlns:p="http://schemas.openxmlformats.org/presentationml/2006/main">
+  <p:cSld>
+    <p:spTree>
+      <p:nvGrpSpPr>
+        <p:cNvPr id="1" name=""/>
+        <p:cNvGrpSpPr/>
+        <p:nvPr/>
+      </p:nvGrpSpPr>
+      <p:grpSpPr>
+        <a:xfrm>
+          <a:off x="0" y="0"/>
+          <a:ext cx="0" cy="0"/>
+          <a:chOff x="0" y="0"/>
+          <a:chExt cx="0" cy="0"/>
+        </a:xfrm>
+      </p:grpSpPr>
+      <p:sp>
+        <p:nvSpPr>
+          <p:cNvPr id="2" name="Title 1">
+            <a:extLst>
+              <a:ext uri="{FF2B5EF4-FFF2-40B4-BE49-F238E27FC236}">
                 <a16:creationId xmlns:a16="http://schemas.microsoft.com/office/drawing/2014/main" id="{384CFDA5-C923-7D81-0BCF-0BE825FB0E61}"/>
               </a:ext>
             </a:extLst>
@@ -8740,7 +9945,7 @@
 </p:sld>
 </file>
 
-<file path=ppt/slides/slide14.xml><?xml version="1.0" encoding="utf-8"?>
+<file path=ppt/slides/slide16.xml><?xml version="1.0" encoding="utf-8"?>
 <p:sld xmlns:a="http://schemas.openxmlformats.org/drawingml/2006/main" xmlns:r="http://schemas.openxmlformats.org/officeDocument/2006/relationships" xmlns:p="http://schemas.openxmlformats.org/presentationml/2006/main">
   <p:cSld>
     <p:spTree>
@@ -9206,7 +10411,7 @@
 </p:sld>
 </file>
 
-<file path=ppt/slides/slide15.xml><?xml version="1.0" encoding="utf-8"?>
+<file path=ppt/slides/slide17.xml><?xml version="1.0" encoding="utf-8"?>
 <p:sld xmlns:a="http://schemas.openxmlformats.org/drawingml/2006/main" xmlns:r="http://schemas.openxmlformats.org/officeDocument/2006/relationships" xmlns:p="http://schemas.openxmlformats.org/presentationml/2006/main">
   <p:cSld>
     <p:spTree>
@@ -10037,7 +11242,7 @@
 </p:sld>
 </file>
 
-<file path=ppt/slides/slide16.xml><?xml version="1.0" encoding="utf-8"?>
+<file path=ppt/slides/slide18.xml><?xml version="1.0" encoding="utf-8"?>
 <p:sld xmlns:a="http://schemas.openxmlformats.org/drawingml/2006/main" xmlns:r="http://schemas.openxmlformats.org/officeDocument/2006/relationships" xmlns:p="http://schemas.openxmlformats.org/presentationml/2006/main">
   <p:cSld>
     <p:spTree>
@@ -11130,7 +12335,7 @@
 </p:sld>
 </file>
 
-<file path=ppt/slides/slide17.xml><?xml version="1.0" encoding="utf-8"?>
+<file path=ppt/slides/slide19.xml><?xml version="1.0" encoding="utf-8"?>
 <p:sld xmlns:a="http://schemas.openxmlformats.org/drawingml/2006/main" xmlns:r="http://schemas.openxmlformats.org/officeDocument/2006/relationships" xmlns:p="http://schemas.openxmlformats.org/presentationml/2006/main">
   <p:cSld>
     <p:spTree>
@@ -11243,15 +12448,44 @@
           <a:lstStyle/>
           <a:p>
             <a:r>
-              <a:rPr lang="en-US" sz="1800">
+              <a:rPr lang="en-US" sz="1800" dirty="0">
                 <a:solidFill>
                   <a:srgbClr val="0000FF"/>
                 </a:solidFill>
                 <a:latin typeface="Cascadia Mono" panose="020B0609020000020004" pitchFamily="49" charset="0"/>
               </a:rPr>
-              <a:t>unsafe</a:t>
-            </a:r>
-            <a:endParaRPr lang="en-US" sz="1800">
+              <a:t>using</a:t>
+            </a:r>
+            <a:r>
+              <a:rPr lang="en-US" sz="1800" dirty="0">
+                <a:solidFill>
+                  <a:srgbClr val="000000"/>
+                </a:solidFill>
+                <a:latin typeface="Cascadia Mono" panose="020B0609020000020004" pitchFamily="49" charset="0"/>
+              </a:rPr>
+              <a:t> </a:t>
+            </a:r>
+            <a:r>
+              <a:rPr lang="en-US" sz="1800" dirty="0">
+                <a:solidFill>
+                  <a:srgbClr val="0000FF"/>
+                </a:solidFill>
+                <a:latin typeface="Cascadia Mono" panose="020B0609020000020004" pitchFamily="49" charset="0"/>
+              </a:rPr>
+              <a:t>static</a:t>
+            </a:r>
+            <a:r>
+              <a:rPr lang="en-US" sz="1800" dirty="0">
+                <a:solidFill>
+                  <a:srgbClr val="000000"/>
+                </a:solidFill>
+                <a:latin typeface="Cascadia Mono" panose="020B0609020000020004" pitchFamily="49" charset="0"/>
+              </a:rPr>
+              <a:t> MemoryManagement.Kernel32;</a:t>
+            </a:r>
+          </a:p>
+          <a:p>
+            <a:endParaRPr lang="en-US" sz="1800" dirty="0">
               <a:solidFill>
                 <a:srgbClr val="000000"/>
               </a:solidFill>
@@ -11260,46 +12494,15 @@
           </a:p>
           <a:p>
             <a:r>
-              <a:rPr lang="en-US" sz="1800">
-                <a:solidFill>
-                  <a:srgbClr val="000000"/>
-                </a:solidFill>
-                <a:latin typeface="Cascadia Mono" panose="020B0609020000020004" pitchFamily="49" charset="0"/>
-              </a:rPr>
-              <a:t>{</a:t>
-            </a:r>
-          </a:p>
-          <a:p>
-            <a:r>
-              <a:rPr lang="en-US" sz="1800">
-                <a:solidFill>
-                  <a:srgbClr val="000000"/>
-                </a:solidFill>
-                <a:latin typeface="Cascadia Mono" panose="020B0609020000020004" pitchFamily="49" charset="0"/>
-              </a:rPr>
-              <a:t>    </a:t>
-            </a:r>
-            <a:r>
-              <a:rPr lang="en-US" sz="1800">
+              <a:rPr lang="en-US" sz="1800" dirty="0">
                 <a:solidFill>
                   <a:srgbClr val="0000FF"/>
                 </a:solidFill>
                 <a:latin typeface="Cascadia Mono" panose="020B0609020000020004" pitchFamily="49" charset="0"/>
               </a:rPr>
-              <a:t>void</a:t>
-            </a:r>
-            <a:r>
-              <a:rPr lang="en-US" sz="1800">
-                <a:solidFill>
-                  <a:srgbClr val="000000"/>
-                </a:solidFill>
-                <a:latin typeface="Cascadia Mono" panose="020B0609020000020004" pitchFamily="49" charset="0"/>
-              </a:rPr>
-              <a:t>* ptr = HeapAlloc(HeapHandle, 0, 1024);</a:t>
-            </a:r>
-          </a:p>
-          <a:p>
-            <a:endParaRPr lang="en-US" sz="1800">
+              <a:t>unsafe</a:t>
+            </a:r>
+            <a:endParaRPr lang="en-US" sz="1800" dirty="0">
               <a:solidFill>
                 <a:srgbClr val="000000"/>
               </a:solidFill>
@@ -11308,7 +12511,18 @@
           </a:p>
           <a:p>
             <a:r>
-              <a:rPr lang="en-US" sz="1800">
+              <a:rPr lang="en-US" sz="1800" dirty="0">
+                <a:solidFill>
+                  <a:srgbClr val="000000"/>
+                </a:solidFill>
+                <a:latin typeface="Cascadia Mono" panose="020B0609020000020004" pitchFamily="49" charset="0"/>
+              </a:rPr>
+              <a:t>{</a:t>
+            </a:r>
+          </a:p>
+          <a:p>
+            <a:r>
+              <a:rPr lang="en-US" sz="1800" dirty="0">
                 <a:solidFill>
                   <a:srgbClr val="000000"/>
                 </a:solidFill>
@@ -11317,91 +12531,80 @@
               <a:t>    </a:t>
             </a:r>
             <a:r>
-              <a:rPr lang="en-US" sz="1800">
+              <a:rPr lang="en-US" sz="1800" dirty="0">
                 <a:solidFill>
                   <a:srgbClr val="0000FF"/>
                 </a:solidFill>
                 <a:latin typeface="Cascadia Mono" panose="020B0609020000020004" pitchFamily="49" charset="0"/>
               </a:rPr>
-              <a:t>if</a:t>
-            </a:r>
-            <a:r>
-              <a:rPr lang="en-US" sz="1800">
-                <a:solidFill>
-                  <a:srgbClr val="000000"/>
-                </a:solidFill>
-                <a:latin typeface="Cascadia Mono" panose="020B0609020000020004" pitchFamily="49" charset="0"/>
-              </a:rPr>
-              <a:t> (ptr == </a:t>
-            </a:r>
-            <a:r>
-              <a:rPr lang="en-US" sz="1800">
-                <a:solidFill>
-                  <a:srgbClr val="0000FF"/>
-                </a:solidFill>
-                <a:latin typeface="Cascadia Mono" panose="020B0609020000020004" pitchFamily="49" charset="0"/>
-              </a:rPr>
-              <a:t>null</a:t>
-            </a:r>
-            <a:r>
-              <a:rPr lang="en-US" sz="1800">
-                <a:solidFill>
-                  <a:srgbClr val="000000"/>
-                </a:solidFill>
-                <a:latin typeface="Cascadia Mono" panose="020B0609020000020004" pitchFamily="49" charset="0"/>
-              </a:rPr>
-              <a:t>)</a:t>
-            </a:r>
-          </a:p>
-          <a:p>
-            <a:r>
-              <a:rPr lang="en-US" sz="1800">
-                <a:solidFill>
-                  <a:srgbClr val="000000"/>
-                </a:solidFill>
-                <a:latin typeface="Cascadia Mono" panose="020B0609020000020004" pitchFamily="49" charset="0"/>
-              </a:rPr>
-              <a:t>        </a:t>
-            </a:r>
-            <a:r>
-              <a:rPr lang="en-US" sz="1800">
-                <a:solidFill>
-                  <a:srgbClr val="0000FF"/>
-                </a:solidFill>
-                <a:latin typeface="Cascadia Mono" panose="020B0609020000020004" pitchFamily="49" charset="0"/>
-              </a:rPr>
-              <a:t>throw</a:t>
-            </a:r>
-            <a:r>
-              <a:rPr lang="en-US" sz="1800">
-                <a:solidFill>
-                  <a:srgbClr val="000000"/>
-                </a:solidFill>
-                <a:latin typeface="Cascadia Mono" panose="020B0609020000020004" pitchFamily="49" charset="0"/>
-              </a:rPr>
-              <a:t> </a:t>
-            </a:r>
-            <a:r>
-              <a:rPr lang="en-US" sz="1800">
-                <a:solidFill>
-                  <a:srgbClr val="0000FF"/>
-                </a:solidFill>
-                <a:latin typeface="Cascadia Mono" panose="020B0609020000020004" pitchFamily="49" charset="0"/>
-              </a:rPr>
-              <a:t>new</a:t>
-            </a:r>
-            <a:r>
-              <a:rPr lang="en-US" sz="1800">
-                <a:solidFill>
-                  <a:srgbClr val="000000"/>
-                </a:solidFill>
-                <a:latin typeface="Cascadia Mono" panose="020B0609020000020004" pitchFamily="49" charset="0"/>
-              </a:rPr>
-              <a:t> OutOfMemoryException();</a:t>
-            </a:r>
-          </a:p>
-          <a:p>
-            <a:endParaRPr lang="en-US" sz="1800">
+              <a:t>void</a:t>
+            </a:r>
+            <a:r>
+              <a:rPr lang="en-US" sz="1800" dirty="0">
+                <a:solidFill>
+                  <a:srgbClr val="000000"/>
+                </a:solidFill>
+                <a:latin typeface="Cascadia Mono" panose="020B0609020000020004" pitchFamily="49" charset="0"/>
+              </a:rPr>
+              <a:t>* </a:t>
+            </a:r>
+            <a:r>
+              <a:rPr lang="en-US" sz="1800" dirty="0" err="1">
+                <a:solidFill>
+                  <a:srgbClr val="000000"/>
+                </a:solidFill>
+                <a:latin typeface="Cascadia Mono" panose="020B0609020000020004" pitchFamily="49" charset="0"/>
+              </a:rPr>
+              <a:t>ptr</a:t>
+            </a:r>
+            <a:r>
+              <a:rPr lang="en-US" sz="1800" dirty="0">
+                <a:solidFill>
+                  <a:srgbClr val="000000"/>
+                </a:solidFill>
+                <a:latin typeface="Cascadia Mono" panose="020B0609020000020004" pitchFamily="49" charset="0"/>
+              </a:rPr>
+              <a:t> = </a:t>
+            </a:r>
+            <a:r>
+              <a:rPr lang="en-US" sz="1800" dirty="0" err="1">
+                <a:solidFill>
+                  <a:srgbClr val="000000"/>
+                </a:solidFill>
+                <a:latin typeface="Cascadia Mono" panose="020B0609020000020004" pitchFamily="49" charset="0"/>
+              </a:rPr>
+              <a:t>HeapAlloc</a:t>
+            </a:r>
+            <a:r>
+              <a:rPr lang="en-US" sz="1800" dirty="0">
+                <a:solidFill>
+                  <a:srgbClr val="000000"/>
+                </a:solidFill>
+                <a:latin typeface="Cascadia Mono" panose="020B0609020000020004" pitchFamily="49" charset="0"/>
+              </a:rPr>
+              <a:t>(</a:t>
+            </a:r>
+            <a:r>
+              <a:rPr lang="en-US" sz="1800" dirty="0" err="1">
+                <a:solidFill>
+                  <a:srgbClr val="000000"/>
+                </a:solidFill>
+                <a:latin typeface="Cascadia Mono" panose="020B0609020000020004" pitchFamily="49" charset="0"/>
+              </a:rPr>
+              <a:t>HeapHandle</a:t>
+            </a:r>
+            <a:r>
+              <a:rPr lang="en-US" sz="1800" dirty="0">
+                <a:solidFill>
+                  <a:srgbClr val="000000"/>
+                </a:solidFill>
+                <a:latin typeface="Cascadia Mono" panose="020B0609020000020004" pitchFamily="49" charset="0"/>
+              </a:rPr>
+              <a:t>, 0, 1024);</a:t>
+            </a:r>
+          </a:p>
+          <a:p>
+            <a:endParaRPr lang="en-US" sz="1800" dirty="0">
               <a:solidFill>
                 <a:srgbClr val="000000"/>
               </a:solidFill>
@@ -11410,18 +12613,210 @@
           </a:p>
           <a:p>
             <a:r>
-              <a:rPr lang="en-US" sz="1800">
-                <a:solidFill>
-                  <a:srgbClr val="000000"/>
-                </a:solidFill>
-                <a:latin typeface="Cascadia Mono" panose="020B0609020000020004" pitchFamily="49" charset="0"/>
-              </a:rPr>
-              <a:t>    HeapFree(HeapHandle, 0, ptr);</a:t>
-            </a:r>
-          </a:p>
-          <a:p>
-            <a:r>
-              <a:rPr lang="en-US" sz="1800">
+              <a:rPr lang="en-US" sz="1800" dirty="0">
+                <a:solidFill>
+                  <a:srgbClr val="000000"/>
+                </a:solidFill>
+                <a:latin typeface="Cascadia Mono" panose="020B0609020000020004" pitchFamily="49" charset="0"/>
+              </a:rPr>
+              <a:t>    </a:t>
+            </a:r>
+            <a:r>
+              <a:rPr lang="en-US" sz="1800" dirty="0">
+                <a:solidFill>
+                  <a:srgbClr val="0000FF"/>
+                </a:solidFill>
+                <a:latin typeface="Cascadia Mono" panose="020B0609020000020004" pitchFamily="49" charset="0"/>
+              </a:rPr>
+              <a:t>if</a:t>
+            </a:r>
+            <a:r>
+              <a:rPr lang="en-US" sz="1800" dirty="0">
+                <a:solidFill>
+                  <a:srgbClr val="000000"/>
+                </a:solidFill>
+                <a:latin typeface="Cascadia Mono" panose="020B0609020000020004" pitchFamily="49" charset="0"/>
+              </a:rPr>
+              <a:t> (</a:t>
+            </a:r>
+            <a:r>
+              <a:rPr lang="en-US" sz="1800" dirty="0" err="1">
+                <a:solidFill>
+                  <a:srgbClr val="000000"/>
+                </a:solidFill>
+                <a:latin typeface="Cascadia Mono" panose="020B0609020000020004" pitchFamily="49" charset="0"/>
+              </a:rPr>
+              <a:t>ptr</a:t>
+            </a:r>
+            <a:r>
+              <a:rPr lang="en-US" sz="1800" dirty="0">
+                <a:solidFill>
+                  <a:srgbClr val="000000"/>
+                </a:solidFill>
+                <a:latin typeface="Cascadia Mono" panose="020B0609020000020004" pitchFamily="49" charset="0"/>
+              </a:rPr>
+              <a:t> == </a:t>
+            </a:r>
+            <a:r>
+              <a:rPr lang="en-US" sz="1800" dirty="0">
+                <a:solidFill>
+                  <a:srgbClr val="0000FF"/>
+                </a:solidFill>
+                <a:latin typeface="Cascadia Mono" panose="020B0609020000020004" pitchFamily="49" charset="0"/>
+              </a:rPr>
+              <a:t>null</a:t>
+            </a:r>
+            <a:r>
+              <a:rPr lang="en-US" sz="1800" dirty="0">
+                <a:solidFill>
+                  <a:srgbClr val="000000"/>
+                </a:solidFill>
+                <a:latin typeface="Cascadia Mono" panose="020B0609020000020004" pitchFamily="49" charset="0"/>
+              </a:rPr>
+              <a:t>)</a:t>
+            </a:r>
+          </a:p>
+          <a:p>
+            <a:r>
+              <a:rPr lang="en-US" sz="1800" dirty="0">
+                <a:solidFill>
+                  <a:srgbClr val="000000"/>
+                </a:solidFill>
+                <a:latin typeface="Cascadia Mono" panose="020B0609020000020004" pitchFamily="49" charset="0"/>
+              </a:rPr>
+              <a:t>        </a:t>
+            </a:r>
+            <a:r>
+              <a:rPr lang="en-US" sz="1800" dirty="0">
+                <a:solidFill>
+                  <a:srgbClr val="0000FF"/>
+                </a:solidFill>
+                <a:latin typeface="Cascadia Mono" panose="020B0609020000020004" pitchFamily="49" charset="0"/>
+              </a:rPr>
+              <a:t>throw</a:t>
+            </a:r>
+            <a:r>
+              <a:rPr lang="en-US" sz="1800" dirty="0">
+                <a:solidFill>
+                  <a:srgbClr val="000000"/>
+                </a:solidFill>
+                <a:latin typeface="Cascadia Mono" panose="020B0609020000020004" pitchFamily="49" charset="0"/>
+              </a:rPr>
+              <a:t> </a:t>
+            </a:r>
+            <a:r>
+              <a:rPr lang="en-US" sz="1800" dirty="0">
+                <a:solidFill>
+                  <a:srgbClr val="0000FF"/>
+                </a:solidFill>
+                <a:latin typeface="Cascadia Mono" panose="020B0609020000020004" pitchFamily="49" charset="0"/>
+              </a:rPr>
+              <a:t>new</a:t>
+            </a:r>
+            <a:r>
+              <a:rPr lang="en-US" sz="1800" dirty="0">
+                <a:solidFill>
+                  <a:srgbClr val="000000"/>
+                </a:solidFill>
+                <a:latin typeface="Cascadia Mono" panose="020B0609020000020004" pitchFamily="49" charset="0"/>
+              </a:rPr>
+              <a:t> </a:t>
+            </a:r>
+            <a:r>
+              <a:rPr lang="en-US" sz="1800" dirty="0" err="1">
+                <a:solidFill>
+                  <a:srgbClr val="000000"/>
+                </a:solidFill>
+                <a:latin typeface="Cascadia Mono" panose="020B0609020000020004" pitchFamily="49" charset="0"/>
+              </a:rPr>
+              <a:t>OutOfMemoryException</a:t>
+            </a:r>
+            <a:r>
+              <a:rPr lang="en-US" sz="1800" dirty="0">
+                <a:solidFill>
+                  <a:srgbClr val="000000"/>
+                </a:solidFill>
+                <a:latin typeface="Cascadia Mono" panose="020B0609020000020004" pitchFamily="49" charset="0"/>
+              </a:rPr>
+              <a:t>();</a:t>
+            </a:r>
+          </a:p>
+          <a:p>
+            <a:endParaRPr lang="en-US" sz="1800" dirty="0">
+              <a:solidFill>
+                <a:srgbClr val="000000"/>
+              </a:solidFill>
+              <a:latin typeface="Cascadia Mono" panose="020B0609020000020004" pitchFamily="49" charset="0"/>
+            </a:endParaRPr>
+          </a:p>
+          <a:p>
+            <a:r>
+              <a:rPr lang="en-US" sz="1800" dirty="0">
+                <a:solidFill>
+                  <a:srgbClr val="000000"/>
+                </a:solidFill>
+                <a:latin typeface="Cascadia Mono" panose="020B0609020000020004" pitchFamily="49" charset="0"/>
+              </a:rPr>
+              <a:t>    </a:t>
+            </a:r>
+            <a:r>
+              <a:rPr lang="en-US" sz="1800" dirty="0" err="1">
+                <a:solidFill>
+                  <a:srgbClr val="000000"/>
+                </a:solidFill>
+                <a:latin typeface="Cascadia Mono" panose="020B0609020000020004" pitchFamily="49" charset="0"/>
+              </a:rPr>
+              <a:t>HeapFree</a:t>
+            </a:r>
+            <a:r>
+              <a:rPr lang="en-US" sz="1800" dirty="0">
+                <a:solidFill>
+                  <a:srgbClr val="000000"/>
+                </a:solidFill>
+                <a:latin typeface="Cascadia Mono" panose="020B0609020000020004" pitchFamily="49" charset="0"/>
+              </a:rPr>
+              <a:t>(</a:t>
+            </a:r>
+            <a:r>
+              <a:rPr lang="en-US" sz="1800" dirty="0" err="1">
+                <a:solidFill>
+                  <a:srgbClr val="000000"/>
+                </a:solidFill>
+                <a:latin typeface="Cascadia Mono" panose="020B0609020000020004" pitchFamily="49" charset="0"/>
+              </a:rPr>
+              <a:t>HeapHandle</a:t>
+            </a:r>
+            <a:r>
+              <a:rPr lang="en-US" sz="1800" dirty="0">
+                <a:solidFill>
+                  <a:srgbClr val="000000"/>
+                </a:solidFill>
+                <a:latin typeface="Cascadia Mono" panose="020B0609020000020004" pitchFamily="49" charset="0"/>
+              </a:rPr>
+              <a:t>, 0, </a:t>
+            </a:r>
+            <a:r>
+              <a:rPr lang="en-US" sz="1800" dirty="0" err="1">
+                <a:solidFill>
+                  <a:srgbClr val="000000"/>
+                </a:solidFill>
+                <a:latin typeface="Cascadia Mono" panose="020B0609020000020004" pitchFamily="49" charset="0"/>
+              </a:rPr>
+              <a:t>ptr</a:t>
+            </a:r>
+            <a:r>
+              <a:rPr lang="en-US" sz="1800" dirty="0">
+                <a:solidFill>
+                  <a:srgbClr val="000000"/>
+                </a:solidFill>
+                <a:latin typeface="Cascadia Mono" panose="020B0609020000020004" pitchFamily="49" charset="0"/>
+              </a:rPr>
+              <a:t>);</a:t>
+            </a:r>
+          </a:p>
+          <a:p>
+            <a:r>
+              <a:rPr lang="en-US" sz="1800" dirty="0">
                 <a:solidFill>
                   <a:srgbClr val="000000"/>
                 </a:solidFill>
@@ -11429,7 +12824,7 @@
               </a:rPr>
               <a:t>}</a:t>
             </a:r>
-            <a:endParaRPr lang="en-US"/>
+            <a:endParaRPr lang="en-US" dirty="0"/>
           </a:p>
         </p:txBody>
       </p:sp>
@@ -11840,6 +13235,327 @@
 </p:sld>
 </file>
 
+<file path=ppt/slides/slide20.xml><?xml version="1.0" encoding="utf-8"?>
+<p:sld xmlns:a="http://schemas.openxmlformats.org/drawingml/2006/main" xmlns:r="http://schemas.openxmlformats.org/officeDocument/2006/relationships" xmlns:p="http://schemas.openxmlformats.org/presentationml/2006/main">
+  <p:cSld>
+    <p:spTree>
+      <p:nvGrpSpPr>
+        <p:cNvPr id="1" name=""/>
+        <p:cNvGrpSpPr/>
+        <p:nvPr/>
+      </p:nvGrpSpPr>
+      <p:grpSpPr>
+        <a:xfrm>
+          <a:off x="0" y="0"/>
+          <a:ext cx="0" cy="0"/>
+          <a:chOff x="0" y="0"/>
+          <a:chExt cx="0" cy="0"/>
+        </a:xfrm>
+      </p:grpSpPr>
+      <p:sp>
+        <p:nvSpPr>
+          <p:cNvPr id="2" name="Title 1">
+            <a:extLst>
+              <a:ext uri="{FF2B5EF4-FFF2-40B4-BE49-F238E27FC236}">
+                <a16:creationId xmlns:a16="http://schemas.microsoft.com/office/drawing/2014/main" id="{14A36D40-D956-01D2-74B2-92BF979B44BD}"/>
+              </a:ext>
+            </a:extLst>
+          </p:cNvPr>
+          <p:cNvSpPr>
+            <a:spLocks noGrp="1"/>
+          </p:cNvSpPr>
+          <p:nvPr>
+            <p:ph type="title"/>
+          </p:nvPr>
+        </p:nvSpPr>
+        <p:spPr/>
+        <p:txBody>
+          <a:bodyPr/>
+          <a:lstStyle/>
+          <a:p>
+            <a:r>
+              <a:rPr lang="en-US"/>
+              <a:t>Platform Invoke (P/Invoke)</a:t>
+            </a:r>
+            <a:br>
+              <a:rPr lang="en-US"/>
+            </a:br>
+            <a:r>
+              <a:rPr lang="en-US"/>
+              <a:t>Data type resources</a:t>
+            </a:r>
+          </a:p>
+        </p:txBody>
+      </p:sp>
+      <p:sp>
+        <p:nvSpPr>
+          <p:cNvPr id="3" name="Content Placeholder 2">
+            <a:extLst>
+              <a:ext uri="{FF2B5EF4-FFF2-40B4-BE49-F238E27FC236}">
+                <a16:creationId xmlns:a16="http://schemas.microsoft.com/office/drawing/2014/main" id="{8C0E00EB-8909-22BF-CA91-A4CA53DDCC2D}"/>
+              </a:ext>
+            </a:extLst>
+          </p:cNvPr>
+          <p:cNvSpPr>
+            <a:spLocks noGrp="1"/>
+          </p:cNvSpPr>
+          <p:nvPr>
+            <p:ph idx="1"/>
+          </p:nvPr>
+        </p:nvSpPr>
+        <p:spPr/>
+        <p:txBody>
+          <a:bodyPr/>
+          <a:lstStyle/>
+          <a:p>
+            <a:r>
+              <a:rPr lang="en-US" dirty="0"/>
+              <a:t>Header files</a:t>
+            </a:r>
+          </a:p>
+          <a:p>
+            <a:r>
+              <a:rPr lang="en-US" dirty="0"/>
+              <a:t>The </a:t>
+            </a:r>
+            <a:r>
+              <a:rPr lang="en-US" i="1" dirty="0"/>
+              <a:t>Data Type Ranges</a:t>
+            </a:r>
+            <a:r>
+              <a:rPr lang="en-US" dirty="0"/>
+              <a:t> page of the C++ language reference</a:t>
+            </a:r>
+            <a:br>
+              <a:rPr lang="en-US" dirty="0"/>
+            </a:br>
+            <a:r>
+              <a:rPr lang="en-US" sz="1200" dirty="0">
+                <a:hlinkClick r:id="rId2"/>
+              </a:rPr>
+              <a:t>https://docs.microsoft.com/en-us/cpp/cpp/data-type-ranges</a:t>
+            </a:r>
+            <a:endParaRPr lang="en-US" sz="1200" dirty="0"/>
+          </a:p>
+          <a:p>
+            <a:r>
+              <a:rPr lang="en-US" dirty="0"/>
+              <a:t>The </a:t>
+            </a:r>
+            <a:r>
+              <a:rPr lang="en-US" i="1" dirty="0"/>
+              <a:t>Windows Data Types</a:t>
+            </a:r>
+            <a:r>
+              <a:rPr lang="en-US" dirty="0"/>
+              <a:t> page of the Win32 documentation</a:t>
+            </a:r>
+            <a:br>
+              <a:rPr lang="en-US" dirty="0"/>
+            </a:br>
+            <a:r>
+              <a:rPr lang="en-US" sz="1200" dirty="0">
+                <a:hlinkClick r:id="rId3"/>
+              </a:rPr>
+              <a:t>https://docs.microsoft.com/en-us/windows/win32/winprog/windows-data-types</a:t>
+            </a:r>
+            <a:endParaRPr lang="en-US" sz="1200" dirty="0"/>
+          </a:p>
+        </p:txBody>
+      </p:sp>
+    </p:spTree>
+    <p:extLst>
+      <p:ext uri="{BB962C8B-B14F-4D97-AF65-F5344CB8AC3E}">
+        <p14:creationId xmlns:p14="http://schemas.microsoft.com/office/powerpoint/2010/main" val="3575870599"/>
+      </p:ext>
+    </p:extLst>
+  </p:cSld>
+  <p:clrMapOvr>
+    <a:masterClrMapping/>
+  </p:clrMapOvr>
+  <p:timing>
+    <p:tnLst>
+      <p:par>
+        <p:cTn id="1" dur="indefinite" restart="never" nodeType="tmRoot">
+          <p:childTnLst>
+            <p:seq concurrent="1" nextAc="seek">
+              <p:cTn id="2" dur="indefinite" nodeType="mainSeq">
+                <p:childTnLst>
+                  <p:par>
+                    <p:cTn id="3" fill="hold">
+                      <p:stCondLst>
+                        <p:cond delay="indefinite"/>
+                      </p:stCondLst>
+                      <p:childTnLst>
+                        <p:par>
+                          <p:cTn id="4" fill="hold">
+                            <p:stCondLst>
+                              <p:cond delay="0"/>
+                            </p:stCondLst>
+                            <p:childTnLst>
+                              <p:par>
+                                <p:cTn id="5" presetID="1" presetClass="entr" presetSubtype="0" fill="hold" grpId="0" nodeType="clickEffect">
+                                  <p:stCondLst>
+                                    <p:cond delay="0"/>
+                                  </p:stCondLst>
+                                  <p:childTnLst>
+                                    <p:set>
+                                      <p:cBhvr>
+                                        <p:cTn id="6" dur="1" fill="hold">
+                                          <p:stCondLst>
+                                            <p:cond delay="0"/>
+                                          </p:stCondLst>
+                                        </p:cTn>
+                                        <p:tgtEl>
+                                          <p:spTgt spid="3">
+                                            <p:txEl>
+                                              <p:pRg st="0" end="0"/>
+                                            </p:txEl>
+                                          </p:spTgt>
+                                        </p:tgtEl>
+                                        <p:attrNameLst>
+                                          <p:attrName>style.visibility</p:attrName>
+                                        </p:attrNameLst>
+                                      </p:cBhvr>
+                                      <p:to>
+                                        <p:strVal val="visible"/>
+                                      </p:to>
+                                    </p:set>
+                                  </p:childTnLst>
+                                </p:cTn>
+                              </p:par>
+                            </p:childTnLst>
+                          </p:cTn>
+                        </p:par>
+                      </p:childTnLst>
+                    </p:cTn>
+                  </p:par>
+                  <p:par>
+                    <p:cTn id="7" fill="hold">
+                      <p:stCondLst>
+                        <p:cond delay="indefinite"/>
+                      </p:stCondLst>
+                      <p:childTnLst>
+                        <p:par>
+                          <p:cTn id="8" fill="hold">
+                            <p:stCondLst>
+                              <p:cond delay="0"/>
+                            </p:stCondLst>
+                            <p:childTnLst>
+                              <p:par>
+                                <p:cTn id="9" presetID="1" presetClass="entr" presetSubtype="0" fill="hold" grpId="0" nodeType="clickEffect">
+                                  <p:stCondLst>
+                                    <p:cond delay="0"/>
+                                  </p:stCondLst>
+                                  <p:childTnLst>
+                                    <p:set>
+                                      <p:cBhvr>
+                                        <p:cTn id="10" dur="1" fill="hold">
+                                          <p:stCondLst>
+                                            <p:cond delay="0"/>
+                                          </p:stCondLst>
+                                        </p:cTn>
+                                        <p:tgtEl>
+                                          <p:spTgt spid="3">
+                                            <p:txEl>
+                                              <p:pRg st="1" end="1"/>
+                                            </p:txEl>
+                                          </p:spTgt>
+                                        </p:tgtEl>
+                                        <p:attrNameLst>
+                                          <p:attrName>style.visibility</p:attrName>
+                                        </p:attrNameLst>
+                                      </p:cBhvr>
+                                      <p:to>
+                                        <p:strVal val="visible"/>
+                                      </p:to>
+                                    </p:set>
+                                  </p:childTnLst>
+                                </p:cTn>
+                              </p:par>
+                            </p:childTnLst>
+                          </p:cTn>
+                        </p:par>
+                      </p:childTnLst>
+                    </p:cTn>
+                  </p:par>
+                  <p:par>
+                    <p:cTn id="11" fill="hold">
+                      <p:stCondLst>
+                        <p:cond delay="indefinite"/>
+                      </p:stCondLst>
+                      <p:childTnLst>
+                        <p:par>
+                          <p:cTn id="12" fill="hold">
+                            <p:stCondLst>
+                              <p:cond delay="0"/>
+                            </p:stCondLst>
+                            <p:childTnLst>
+                              <p:par>
+                                <p:cTn id="13" presetID="1" presetClass="entr" presetSubtype="0" fill="hold" grpId="0" nodeType="clickEffect">
+                                  <p:stCondLst>
+                                    <p:cond delay="0"/>
+                                  </p:stCondLst>
+                                  <p:childTnLst>
+                                    <p:set>
+                                      <p:cBhvr>
+                                        <p:cTn id="14" dur="1" fill="hold">
+                                          <p:stCondLst>
+                                            <p:cond delay="0"/>
+                                          </p:stCondLst>
+                                        </p:cTn>
+                                        <p:tgtEl>
+                                          <p:spTgt spid="3">
+                                            <p:txEl>
+                                              <p:pRg st="2" end="2"/>
+                                            </p:txEl>
+                                          </p:spTgt>
+                                        </p:tgtEl>
+                                        <p:attrNameLst>
+                                          <p:attrName>style.visibility</p:attrName>
+                                        </p:attrNameLst>
+                                      </p:cBhvr>
+                                      <p:to>
+                                        <p:strVal val="visible"/>
+                                      </p:to>
+                                    </p:set>
+                                  </p:childTnLst>
+                                </p:cTn>
+                              </p:par>
+                            </p:childTnLst>
+                          </p:cTn>
+                        </p:par>
+                      </p:childTnLst>
+                    </p:cTn>
+                  </p:par>
+                </p:childTnLst>
+              </p:cTn>
+              <p:prevCondLst>
+                <p:cond evt="onPrev" delay="0">
+                  <p:tgtEl>
+                    <p:sldTgt/>
+                  </p:tgtEl>
+                </p:cond>
+              </p:prevCondLst>
+              <p:nextCondLst>
+                <p:cond evt="onNext" delay="0">
+                  <p:tgtEl>
+                    <p:sldTgt/>
+                  </p:tgtEl>
+                </p:cond>
+              </p:nextCondLst>
+            </p:seq>
+          </p:childTnLst>
+        </p:cTn>
+      </p:par>
+    </p:tnLst>
+    <p:bldLst>
+      <p:bldP spid="3" grpId="0" build="p"/>
+    </p:bldLst>
+  </p:timing>
+</p:sld>
+</file>
+
 <file path=ppt/slides/slide3.xml><?xml version="1.0" encoding="utf-8"?>
 <p:sld xmlns:a="http://schemas.openxmlformats.org/drawingml/2006/main" xmlns:r="http://schemas.openxmlformats.org/officeDocument/2006/relationships" xmlns:p="http://schemas.openxmlformats.org/presentationml/2006/main">
   <p:cSld>
@@ -12719,15 +14435,15 @@
               <a:buNone/>
             </a:pPr>
             <a:r>
-              <a:rPr lang="en-US"/>
+              <a:rPr lang="en-US" dirty="0"/>
               <a:t>"</a:t>
             </a:r>
             <a:r>
-              <a:rPr lang="en-US" i="1"/>
+              <a:rPr lang="en-US" i="1" dirty="0"/>
               <a:t>In unsafe code, it is possible to declare and operate on pointers, to perform conversions between pointers and integral types, to take the address of variables, and so forth. In a sense, writing unsafe code is much like writing C code within a C# program.</a:t>
             </a:r>
             <a:r>
-              <a:rPr lang="en-US"/>
+              <a:rPr lang="en-US" dirty="0"/>
               <a:t>"</a:t>
             </a:r>
           </a:p>
@@ -12736,12 +14452,12 @@
               <a:buNone/>
             </a:pPr>
             <a:r>
-              <a:rPr lang="en-US" sz="1200">
+              <a:rPr lang="en-US" sz="1200" dirty="0">
                 <a:hlinkClick r:id="rId2"/>
               </a:rPr>
               <a:t>https://docs.microsoft.com/en-us/dotnet/csharp/language-reference/language-specification/unsafe-code</a:t>
             </a:r>
-            <a:endParaRPr lang="en-US" sz="1200"/>
+            <a:endParaRPr lang="en-US" sz="1200" dirty="0"/>
           </a:p>
         </p:txBody>
       </p:sp>

</xml_diff>

<commit_message>
Removed unused elements from slides
</commit_message>
<xml_diff>
--- a/doc/Introduction to unsafe C#.pptx
+++ b/doc/Introduction to unsafe C#.pptx
@@ -327,7 +327,7 @@
           <a:p>
             <a:fld id="{F9BC75CE-03FF-4667-898C-4C70B4392062}" type="datetimeFigureOut">
               <a:rPr lang="en-US" smtClean="0"/>
-              <a:t>6/22/2022</a:t>
+              <a:t>10/8/2022</a:t>
             </a:fld>
             <a:endParaRPr lang="en-US"/>
           </a:p>
@@ -602,7 +602,7 @@
           <a:p>
             <a:fld id="{F9BC75CE-03FF-4667-898C-4C70B4392062}" type="datetimeFigureOut">
               <a:rPr lang="en-US" smtClean="0"/>
-              <a:t>6/22/2022</a:t>
+              <a:t>10/8/2022</a:t>
             </a:fld>
             <a:endParaRPr lang="en-US"/>
           </a:p>
@@ -796,7 +796,7 @@
           <a:p>
             <a:fld id="{F9BC75CE-03FF-4667-898C-4C70B4392062}" type="datetimeFigureOut">
               <a:rPr lang="en-US" smtClean="0"/>
-              <a:t>6/22/2022</a:t>
+              <a:t>10/8/2022</a:t>
             </a:fld>
             <a:endParaRPr lang="en-US"/>
           </a:p>
@@ -1069,7 +1069,7 @@
           <a:p>
             <a:fld id="{F9BC75CE-03FF-4667-898C-4C70B4392062}" type="datetimeFigureOut">
               <a:rPr lang="en-US" smtClean="0"/>
-              <a:t>6/22/2022</a:t>
+              <a:t>10/8/2022</a:t>
             </a:fld>
             <a:endParaRPr lang="en-US"/>
           </a:p>
@@ -1410,7 +1410,7 @@
           <a:p>
             <a:fld id="{F9BC75CE-03FF-4667-898C-4C70B4392062}" type="datetimeFigureOut">
               <a:rPr lang="en-US" smtClean="0"/>
-              <a:t>6/22/2022</a:t>
+              <a:t>10/8/2022</a:t>
             </a:fld>
             <a:endParaRPr lang="en-US"/>
           </a:p>
@@ -2033,7 +2033,7 @@
           <a:p>
             <a:fld id="{F9BC75CE-03FF-4667-898C-4C70B4392062}" type="datetimeFigureOut">
               <a:rPr lang="en-US" smtClean="0"/>
-              <a:t>6/22/2022</a:t>
+              <a:t>10/8/2022</a:t>
             </a:fld>
             <a:endParaRPr lang="en-US"/>
           </a:p>
@@ -2893,7 +2893,7 @@
           <a:p>
             <a:fld id="{F9BC75CE-03FF-4667-898C-4C70B4392062}" type="datetimeFigureOut">
               <a:rPr lang="en-US" smtClean="0"/>
-              <a:t>6/22/2022</a:t>
+              <a:t>10/8/2022</a:t>
             </a:fld>
             <a:endParaRPr lang="en-US"/>
           </a:p>
@@ -3063,7 +3063,7 @@
           <a:p>
             <a:fld id="{F9BC75CE-03FF-4667-898C-4C70B4392062}" type="datetimeFigureOut">
               <a:rPr lang="en-US" smtClean="0"/>
-              <a:t>6/22/2022</a:t>
+              <a:t>10/8/2022</a:t>
             </a:fld>
             <a:endParaRPr lang="en-US"/>
           </a:p>
@@ -3243,7 +3243,7 @@
           <a:p>
             <a:fld id="{F9BC75CE-03FF-4667-898C-4C70B4392062}" type="datetimeFigureOut">
               <a:rPr lang="en-US" smtClean="0"/>
-              <a:t>6/22/2022</a:t>
+              <a:t>10/8/2022</a:t>
             </a:fld>
             <a:endParaRPr lang="en-US"/>
           </a:p>
@@ -3413,7 +3413,7 @@
           <a:p>
             <a:fld id="{F9BC75CE-03FF-4667-898C-4C70B4392062}" type="datetimeFigureOut">
               <a:rPr lang="en-US" smtClean="0"/>
-              <a:t>6/22/2022</a:t>
+              <a:t>10/8/2022</a:t>
             </a:fld>
             <a:endParaRPr lang="en-US"/>
           </a:p>
@@ -3660,7 +3660,7 @@
           <a:p>
             <a:fld id="{F9BC75CE-03FF-4667-898C-4C70B4392062}" type="datetimeFigureOut">
               <a:rPr lang="en-US" smtClean="0"/>
-              <a:t>6/22/2022</a:t>
+              <a:t>10/8/2022</a:t>
             </a:fld>
             <a:endParaRPr lang="en-US"/>
           </a:p>
@@ -3952,7 +3952,7 @@
           <a:p>
             <a:fld id="{F9BC75CE-03FF-4667-898C-4C70B4392062}" type="datetimeFigureOut">
               <a:rPr lang="en-US" smtClean="0"/>
-              <a:t>6/22/2022</a:t>
+              <a:t>10/8/2022</a:t>
             </a:fld>
             <a:endParaRPr lang="en-US"/>
           </a:p>
@@ -4396,7 +4396,7 @@
           <a:p>
             <a:fld id="{F9BC75CE-03FF-4667-898C-4C70B4392062}" type="datetimeFigureOut">
               <a:rPr lang="en-US" smtClean="0"/>
-              <a:t>6/22/2022</a:t>
+              <a:t>10/8/2022</a:t>
             </a:fld>
             <a:endParaRPr lang="en-US"/>
           </a:p>
@@ -4514,7 +4514,7 @@
           <a:p>
             <a:fld id="{F9BC75CE-03FF-4667-898C-4C70B4392062}" type="datetimeFigureOut">
               <a:rPr lang="en-US" smtClean="0"/>
-              <a:t>6/22/2022</a:t>
+              <a:t>10/8/2022</a:t>
             </a:fld>
             <a:endParaRPr lang="en-US"/>
           </a:p>
@@ -4609,7 +4609,7 @@
           <a:p>
             <a:fld id="{F9BC75CE-03FF-4667-898C-4C70B4392062}" type="datetimeFigureOut">
               <a:rPr lang="en-US" smtClean="0"/>
-              <a:t>6/22/2022</a:t>
+              <a:t>10/8/2022</a:t>
             </a:fld>
             <a:endParaRPr lang="en-US"/>
           </a:p>
@@ -4888,7 +4888,7 @@
           <a:p>
             <a:fld id="{F9BC75CE-03FF-4667-898C-4C70B4392062}" type="datetimeFigureOut">
               <a:rPr lang="en-US" smtClean="0"/>
-              <a:t>6/22/2022</a:t>
+              <a:t>10/8/2022</a:t>
             </a:fld>
             <a:endParaRPr lang="en-US"/>
           </a:p>
@@ -5163,7 +5163,7 @@
           <a:p>
             <a:fld id="{F9BC75CE-03FF-4667-898C-4C70B4392062}" type="datetimeFigureOut">
               <a:rPr lang="en-US" smtClean="0"/>
-              <a:t>6/22/2022</a:t>
+              <a:t>10/8/2022</a:t>
             </a:fld>
             <a:endParaRPr lang="en-US"/>
           </a:p>
@@ -5592,7 +5592,7 @@
           <a:p>
             <a:fld id="{F9BC75CE-03FF-4667-898C-4C70B4392062}" type="datetimeFigureOut">
               <a:rPr lang="en-US" smtClean="0"/>
-              <a:t>6/22/2022</a:t>
+              <a:t>10/8/2022</a:t>
             </a:fld>
             <a:endParaRPr lang="en-US"/>
           </a:p>
@@ -6136,7 +6136,12 @@
             <p:ph type="ctrTitle"/>
           </p:nvPr>
         </p:nvSpPr>
-        <p:spPr/>
+        <p:spPr>
+          <a:xfrm>
+            <a:off x="1154955" y="1451020"/>
+            <a:ext cx="8825658" cy="3329581"/>
+          </a:xfrm>
+        </p:spPr>
         <p:txBody>
           <a:bodyPr/>
           <a:lstStyle/>
@@ -6740,7 +6745,11 @@
           <a:p>
             <a:r>
               <a:rPr lang="en-US" sz="1200" dirty="0"/>
-              <a:t>Rev. 1 (2022-06-22), </a:t>
+              <a:t>Rev. 2 </a:t>
+            </a:r>
+            <a:r>
+              <a:rPr lang="en-US" sz="1200"/>
+              <a:t>(2022-10-??), </a:t>
             </a:r>
             <a:r>
               <a:rPr lang="en-US" sz="1200" dirty="0">
@@ -6814,31 +6823,6 @@
               <a:rPr lang="en-US"/>
               <a:t>Pointer operations III</a:t>
             </a:r>
-          </a:p>
-        </p:txBody>
-      </p:sp>
-      <p:sp>
-        <p:nvSpPr>
-          <p:cNvPr id="3" name="Content Placeholder 2">
-            <a:extLst>
-              <a:ext uri="{FF2B5EF4-FFF2-40B4-BE49-F238E27FC236}">
-                <a16:creationId xmlns:a16="http://schemas.microsoft.com/office/drawing/2014/main" id="{7CA10E1D-6BE6-B9EE-FBF1-E5F05F981322}"/>
-              </a:ext>
-            </a:extLst>
-          </p:cNvPr>
-          <p:cNvSpPr>
-            <a:spLocks noGrp="1"/>
-          </p:cNvSpPr>
-          <p:nvPr>
-            <p:ph idx="1"/>
-          </p:nvPr>
-        </p:nvSpPr>
-        <p:spPr/>
-        <p:txBody>
-          <a:bodyPr/>
-          <a:lstStyle/>
-          <a:p>
-            <a:endParaRPr lang="en-US"/>
           </a:p>
         </p:txBody>
       </p:sp>
@@ -7929,31 +7913,6 @@
       </p:sp>
       <p:sp>
         <p:nvSpPr>
-          <p:cNvPr id="3" name="Content Placeholder 2">
-            <a:extLst>
-              <a:ext uri="{FF2B5EF4-FFF2-40B4-BE49-F238E27FC236}">
-                <a16:creationId xmlns:a16="http://schemas.microsoft.com/office/drawing/2014/main" id="{11A4F7B0-BCCF-C1EE-997A-2D1B75E9B2C9}"/>
-              </a:ext>
-            </a:extLst>
-          </p:cNvPr>
-          <p:cNvSpPr>
-            <a:spLocks noGrp="1"/>
-          </p:cNvSpPr>
-          <p:nvPr>
-            <p:ph idx="1"/>
-          </p:nvPr>
-        </p:nvSpPr>
-        <p:spPr/>
-        <p:txBody>
-          <a:bodyPr/>
-          <a:lstStyle/>
-          <a:p>
-            <a:endParaRPr lang="en-US"/>
-          </a:p>
-        </p:txBody>
-      </p:sp>
-      <p:sp>
-        <p:nvSpPr>
           <p:cNvPr id="4" name="TextBox 3">
             <a:extLst>
               <a:ext uri="{FF2B5EF4-FFF2-40B4-BE49-F238E27FC236}">
@@ -8612,31 +8571,6 @@
       </p:sp>
       <p:sp>
         <p:nvSpPr>
-          <p:cNvPr id="3" name="Content Placeholder 2">
-            <a:extLst>
-              <a:ext uri="{FF2B5EF4-FFF2-40B4-BE49-F238E27FC236}">
-                <a16:creationId xmlns:a16="http://schemas.microsoft.com/office/drawing/2014/main" id="{A6519404-09A2-EF2F-2AD5-9F7A2DA4724C}"/>
-              </a:ext>
-            </a:extLst>
-          </p:cNvPr>
-          <p:cNvSpPr>
-            <a:spLocks noGrp="1"/>
-          </p:cNvSpPr>
-          <p:nvPr>
-            <p:ph idx="1"/>
-          </p:nvPr>
-        </p:nvSpPr>
-        <p:spPr/>
-        <p:txBody>
-          <a:bodyPr/>
-          <a:lstStyle/>
-          <a:p>
-            <a:endParaRPr lang="en-US"/>
-          </a:p>
-        </p:txBody>
-      </p:sp>
-      <p:sp>
-        <p:nvSpPr>
           <p:cNvPr id="4" name="TextBox 3">
             <a:extLst>
               <a:ext uri="{FF2B5EF4-FFF2-40B4-BE49-F238E27FC236}">
@@ -9331,31 +9265,6 @@
       </p:sp>
       <p:sp>
         <p:nvSpPr>
-          <p:cNvPr id="3" name="Content Placeholder 2">
-            <a:extLst>
-              <a:ext uri="{FF2B5EF4-FFF2-40B4-BE49-F238E27FC236}">
-                <a16:creationId xmlns:a16="http://schemas.microsoft.com/office/drawing/2014/main" id="{466F3FCC-7859-47E1-4CF9-D9416046558E}"/>
-              </a:ext>
-            </a:extLst>
-          </p:cNvPr>
-          <p:cNvSpPr>
-            <a:spLocks noGrp="1"/>
-          </p:cNvSpPr>
-          <p:nvPr>
-            <p:ph idx="1"/>
-          </p:nvPr>
-        </p:nvSpPr>
-        <p:spPr/>
-        <p:txBody>
-          <a:bodyPr/>
-          <a:lstStyle/>
-          <a:p>
-            <a:endParaRPr lang="en-US"/>
-          </a:p>
-        </p:txBody>
-      </p:sp>
-      <p:sp>
-        <p:nvSpPr>
           <p:cNvPr id="4" name="TextBox 3">
             <a:extLst>
               <a:ext uri="{FF2B5EF4-FFF2-40B4-BE49-F238E27FC236}">
@@ -9989,31 +9898,6 @@
               <a:rPr lang="de-DE"/>
               <a:t>way</a:t>
             </a:r>
-            <a:endParaRPr lang="en-US" dirty="0"/>
-          </a:p>
-        </p:txBody>
-      </p:sp>
-      <p:sp>
-        <p:nvSpPr>
-          <p:cNvPr id="3" name="Content Placeholder 2">
-            <a:extLst>
-              <a:ext uri="{FF2B5EF4-FFF2-40B4-BE49-F238E27FC236}">
-                <a16:creationId xmlns:a16="http://schemas.microsoft.com/office/drawing/2014/main" id="{BEC839C9-E755-DC18-C714-E31A83E8C7FD}"/>
-              </a:ext>
-            </a:extLst>
-          </p:cNvPr>
-          <p:cNvSpPr>
-            <a:spLocks noGrp="1"/>
-          </p:cNvSpPr>
-          <p:nvPr>
-            <p:ph idx="1"/>
-          </p:nvPr>
-        </p:nvSpPr>
-        <p:spPr/>
-        <p:txBody>
-          <a:bodyPr/>
-          <a:lstStyle/>
-          <a:p>
             <a:endParaRPr lang="en-US" dirty="0"/>
           </a:p>
         </p:txBody>
@@ -10815,31 +10699,6 @@
       </p:sp>
       <p:sp>
         <p:nvSpPr>
-          <p:cNvPr id="3" name="Content Placeholder 2">
-            <a:extLst>
-              <a:ext uri="{FF2B5EF4-FFF2-40B4-BE49-F238E27FC236}">
-                <a16:creationId xmlns:a16="http://schemas.microsoft.com/office/drawing/2014/main" id="{C6FDDC7E-6EDB-0DA4-ED07-F79511512831}"/>
-              </a:ext>
-            </a:extLst>
-          </p:cNvPr>
-          <p:cNvSpPr>
-            <a:spLocks noGrp="1"/>
-          </p:cNvSpPr>
-          <p:nvPr>
-            <p:ph idx="1"/>
-          </p:nvPr>
-        </p:nvSpPr>
-        <p:spPr/>
-        <p:txBody>
-          <a:bodyPr/>
-          <a:lstStyle/>
-          <a:p>
-            <a:endParaRPr lang="en-US"/>
-          </a:p>
-        </p:txBody>
-      </p:sp>
-      <p:sp>
-        <p:nvSpPr>
           <p:cNvPr id="4" name="TextBox 3">
             <a:extLst>
               <a:ext uri="{FF2B5EF4-FFF2-40B4-BE49-F238E27FC236}">
@@ -11646,31 +11505,6 @@
       </p:sp>
       <p:sp>
         <p:nvSpPr>
-          <p:cNvPr id="3" name="Content Placeholder 2">
-            <a:extLst>
-              <a:ext uri="{FF2B5EF4-FFF2-40B4-BE49-F238E27FC236}">
-                <a16:creationId xmlns:a16="http://schemas.microsoft.com/office/drawing/2014/main" id="{506D6E58-134B-DBEF-45D2-70CBC0174D5F}"/>
-              </a:ext>
-            </a:extLst>
-          </p:cNvPr>
-          <p:cNvSpPr>
-            <a:spLocks noGrp="1"/>
-          </p:cNvSpPr>
-          <p:nvPr>
-            <p:ph idx="1"/>
-          </p:nvPr>
-        </p:nvSpPr>
-        <p:spPr/>
-        <p:txBody>
-          <a:bodyPr/>
-          <a:lstStyle/>
-          <a:p>
-            <a:endParaRPr lang="en-US"/>
-          </a:p>
-        </p:txBody>
-      </p:sp>
-      <p:sp>
-        <p:nvSpPr>
           <p:cNvPr id="4" name="TextBox 3">
             <a:extLst>
               <a:ext uri="{FF2B5EF4-FFF2-40B4-BE49-F238E27FC236}">
@@ -12736,31 +12570,6 @@
               <a:rPr lang="en-US"/>
               <a:t>Calling external functions</a:t>
             </a:r>
-          </a:p>
-        </p:txBody>
-      </p:sp>
-      <p:sp>
-        <p:nvSpPr>
-          <p:cNvPr id="3" name="Content Placeholder 2">
-            <a:extLst>
-              <a:ext uri="{FF2B5EF4-FFF2-40B4-BE49-F238E27FC236}">
-                <a16:creationId xmlns:a16="http://schemas.microsoft.com/office/drawing/2014/main" id="{B16B8B4D-72AC-55F6-F473-EF1B055CB64A}"/>
-              </a:ext>
-            </a:extLst>
-          </p:cNvPr>
-          <p:cNvSpPr>
-            <a:spLocks noGrp="1"/>
-          </p:cNvSpPr>
-          <p:nvPr>
-            <p:ph idx="1"/>
-          </p:nvPr>
-        </p:nvSpPr>
-        <p:spPr/>
-        <p:txBody>
-          <a:bodyPr/>
-          <a:lstStyle/>
-          <a:p>
-            <a:endParaRPr lang="en-US"/>
           </a:p>
         </p:txBody>
       </p:sp>
@@ -14991,31 +14800,6 @@
       </p:sp>
       <p:sp>
         <p:nvSpPr>
-          <p:cNvPr id="3" name="Content Placeholder 2">
-            <a:extLst>
-              <a:ext uri="{FF2B5EF4-FFF2-40B4-BE49-F238E27FC236}">
-                <a16:creationId xmlns:a16="http://schemas.microsoft.com/office/drawing/2014/main" id="{3708A915-E631-D17A-97E5-B62A181350E6}"/>
-              </a:ext>
-            </a:extLst>
-          </p:cNvPr>
-          <p:cNvSpPr>
-            <a:spLocks noGrp="1"/>
-          </p:cNvSpPr>
-          <p:nvPr>
-            <p:ph idx="1"/>
-          </p:nvPr>
-        </p:nvSpPr>
-        <p:spPr/>
-        <p:txBody>
-          <a:bodyPr/>
-          <a:lstStyle/>
-          <a:p>
-            <a:endParaRPr lang="en-US"/>
-          </a:p>
-        </p:txBody>
-      </p:sp>
-      <p:sp>
-        <p:nvSpPr>
           <p:cNvPr id="4" name="TextBox 3">
             <a:extLst>
               <a:ext uri="{FF2B5EF4-FFF2-40B4-BE49-F238E27FC236}">
@@ -16664,31 +16448,6 @@
       </p:sp>
       <p:sp>
         <p:nvSpPr>
-          <p:cNvPr id="3" name="Content Placeholder 2">
-            <a:extLst>
-              <a:ext uri="{FF2B5EF4-FFF2-40B4-BE49-F238E27FC236}">
-                <a16:creationId xmlns:a16="http://schemas.microsoft.com/office/drawing/2014/main" id="{F75F8266-82D7-988A-97E6-72353BA61C84}"/>
-              </a:ext>
-            </a:extLst>
-          </p:cNvPr>
-          <p:cNvSpPr>
-            <a:spLocks noGrp="1"/>
-          </p:cNvSpPr>
-          <p:nvPr>
-            <p:ph idx="1"/>
-          </p:nvPr>
-        </p:nvSpPr>
-        <p:spPr/>
-        <p:txBody>
-          <a:bodyPr/>
-          <a:lstStyle/>
-          <a:p>
-            <a:endParaRPr lang="en-US"/>
-          </a:p>
-        </p:txBody>
-      </p:sp>
-      <p:sp>
-        <p:nvSpPr>
           <p:cNvPr id="4" name="TextBox 3">
             <a:extLst>
               <a:ext uri="{FF2B5EF4-FFF2-40B4-BE49-F238E27FC236}">
@@ -17229,31 +16988,6 @@
               <a:rPr lang="en-US"/>
               <a:t>Database wrapper class I</a:t>
             </a:r>
-          </a:p>
-        </p:txBody>
-      </p:sp>
-      <p:sp>
-        <p:nvSpPr>
-          <p:cNvPr id="3" name="Content Placeholder 2">
-            <a:extLst>
-              <a:ext uri="{FF2B5EF4-FFF2-40B4-BE49-F238E27FC236}">
-                <a16:creationId xmlns:a16="http://schemas.microsoft.com/office/drawing/2014/main" id="{8BB700A9-FC2C-CBE4-318D-8C93F516CC3A}"/>
-              </a:ext>
-            </a:extLst>
-          </p:cNvPr>
-          <p:cNvSpPr>
-            <a:spLocks noGrp="1"/>
-          </p:cNvSpPr>
-          <p:nvPr>
-            <p:ph idx="1"/>
-          </p:nvPr>
-        </p:nvSpPr>
-        <p:spPr/>
-        <p:txBody>
-          <a:bodyPr/>
-          <a:lstStyle/>
-          <a:p>
-            <a:endParaRPr lang="en-US"/>
           </a:p>
         </p:txBody>
       </p:sp>
@@ -17820,31 +17554,6 @@
               <a:rPr lang="en-US"/>
               <a:t>Database wrapper class II</a:t>
             </a:r>
-          </a:p>
-        </p:txBody>
-      </p:sp>
-      <p:sp>
-        <p:nvSpPr>
-          <p:cNvPr id="3" name="Content Placeholder 2">
-            <a:extLst>
-              <a:ext uri="{FF2B5EF4-FFF2-40B4-BE49-F238E27FC236}">
-                <a16:creationId xmlns:a16="http://schemas.microsoft.com/office/drawing/2014/main" id="{8BB700A9-FC2C-CBE4-318D-8C93F516CC3A}"/>
-              </a:ext>
-            </a:extLst>
-          </p:cNvPr>
-          <p:cNvSpPr>
-            <a:spLocks noGrp="1"/>
-          </p:cNvSpPr>
-          <p:nvPr>
-            <p:ph idx="1"/>
-          </p:nvPr>
-        </p:nvSpPr>
-        <p:spPr/>
-        <p:txBody>
-          <a:bodyPr/>
-          <a:lstStyle/>
-          <a:p>
-            <a:endParaRPr lang="en-US"/>
           </a:p>
         </p:txBody>
       </p:sp>
@@ -19072,31 +18781,6 @@
       </p:sp>
       <p:sp>
         <p:nvSpPr>
-          <p:cNvPr id="3" name="Content Placeholder 2">
-            <a:extLst>
-              <a:ext uri="{FF2B5EF4-FFF2-40B4-BE49-F238E27FC236}">
-                <a16:creationId xmlns:a16="http://schemas.microsoft.com/office/drawing/2014/main" id="{91FB4784-BC6C-576F-C101-59BE4DF7ADB9}"/>
-              </a:ext>
-            </a:extLst>
-          </p:cNvPr>
-          <p:cNvSpPr>
-            <a:spLocks noGrp="1"/>
-          </p:cNvSpPr>
-          <p:nvPr>
-            <p:ph idx="1"/>
-          </p:nvPr>
-        </p:nvSpPr>
-        <p:spPr/>
-        <p:txBody>
-          <a:bodyPr/>
-          <a:lstStyle/>
-          <a:p>
-            <a:endParaRPr lang="en-US"/>
-          </a:p>
-        </p:txBody>
-      </p:sp>
-      <p:sp>
-        <p:nvSpPr>
           <p:cNvPr id="5" name="TextBox 4">
             <a:extLst>
               <a:ext uri="{FF2B5EF4-FFF2-40B4-BE49-F238E27FC236}">
@@ -19403,31 +19087,6 @@
               <a:rPr lang="en-US"/>
               <a:t>Code that can break the rules!</a:t>
             </a:r>
-          </a:p>
-        </p:txBody>
-      </p:sp>
-      <p:sp>
-        <p:nvSpPr>
-          <p:cNvPr id="3" name="Content Placeholder 2">
-            <a:extLst>
-              <a:ext uri="{FF2B5EF4-FFF2-40B4-BE49-F238E27FC236}">
-                <a16:creationId xmlns:a16="http://schemas.microsoft.com/office/drawing/2014/main" id="{2DAE068C-8D7E-72D6-9146-A72EC0417D09}"/>
-              </a:ext>
-            </a:extLst>
-          </p:cNvPr>
-          <p:cNvSpPr>
-            <a:spLocks noGrp="1"/>
-          </p:cNvSpPr>
-          <p:nvPr>
-            <p:ph idx="1"/>
-          </p:nvPr>
-        </p:nvSpPr>
-        <p:spPr/>
-        <p:txBody>
-          <a:bodyPr/>
-          <a:lstStyle/>
-          <a:p>
-            <a:endParaRPr lang="en-US"/>
           </a:p>
         </p:txBody>
       </p:sp>
@@ -20874,31 +20533,6 @@
       </p:sp>
       <p:sp>
         <p:nvSpPr>
-          <p:cNvPr id="3" name="Content Placeholder 2">
-            <a:extLst>
-              <a:ext uri="{FF2B5EF4-FFF2-40B4-BE49-F238E27FC236}">
-                <a16:creationId xmlns:a16="http://schemas.microsoft.com/office/drawing/2014/main" id="{85954B8F-5C42-FCF2-ED35-1F1ECCF62F03}"/>
-              </a:ext>
-            </a:extLst>
-          </p:cNvPr>
-          <p:cNvSpPr>
-            <a:spLocks noGrp="1"/>
-          </p:cNvSpPr>
-          <p:nvPr>
-            <p:ph idx="1"/>
-          </p:nvPr>
-        </p:nvSpPr>
-        <p:spPr/>
-        <p:txBody>
-          <a:bodyPr/>
-          <a:lstStyle/>
-          <a:p>
-            <a:endParaRPr lang="en-US"/>
-          </a:p>
-        </p:txBody>
-      </p:sp>
-      <p:sp>
-        <p:nvSpPr>
           <p:cNvPr id="4" name="TextBox 3">
             <a:extLst>
               <a:ext uri="{FF2B5EF4-FFF2-40B4-BE49-F238E27FC236}">
@@ -21655,31 +21289,6 @@
       </p:sp>
       <p:sp>
         <p:nvSpPr>
-          <p:cNvPr id="3" name="Content Placeholder 2">
-            <a:extLst>
-              <a:ext uri="{FF2B5EF4-FFF2-40B4-BE49-F238E27FC236}">
-                <a16:creationId xmlns:a16="http://schemas.microsoft.com/office/drawing/2014/main" id="{0075CCD4-5221-AD75-FC8F-98741FE39B74}"/>
-              </a:ext>
-            </a:extLst>
-          </p:cNvPr>
-          <p:cNvSpPr>
-            <a:spLocks noGrp="1"/>
-          </p:cNvSpPr>
-          <p:nvPr>
-            <p:ph idx="1"/>
-          </p:nvPr>
-        </p:nvSpPr>
-        <p:spPr/>
-        <p:txBody>
-          <a:bodyPr/>
-          <a:lstStyle/>
-          <a:p>
-            <a:endParaRPr lang="en-US"/>
-          </a:p>
-        </p:txBody>
-      </p:sp>
-      <p:sp>
-        <p:nvSpPr>
           <p:cNvPr id="6" name="TextBox 5">
             <a:extLst>
               <a:ext uri="{FF2B5EF4-FFF2-40B4-BE49-F238E27FC236}">
@@ -22139,31 +21748,6 @@
               <a:rPr lang="en-US"/>
               <a:t>Pointer operations II</a:t>
             </a:r>
-          </a:p>
-        </p:txBody>
-      </p:sp>
-      <p:sp>
-        <p:nvSpPr>
-          <p:cNvPr id="3" name="Content Placeholder 2">
-            <a:extLst>
-              <a:ext uri="{FF2B5EF4-FFF2-40B4-BE49-F238E27FC236}">
-                <a16:creationId xmlns:a16="http://schemas.microsoft.com/office/drawing/2014/main" id="{1F7CC20D-4401-3B3D-6CC2-8576753EA120}"/>
-              </a:ext>
-            </a:extLst>
-          </p:cNvPr>
-          <p:cNvSpPr>
-            <a:spLocks noGrp="1"/>
-          </p:cNvSpPr>
-          <p:nvPr>
-            <p:ph idx="1"/>
-          </p:nvPr>
-        </p:nvSpPr>
-        <p:spPr/>
-        <p:txBody>
-          <a:bodyPr/>
-          <a:lstStyle/>
-          <a:p>
-            <a:endParaRPr lang="en-US"/>
           </a:p>
         </p:txBody>
       </p:sp>

</xml_diff>

<commit_message>
Updated old Microsoft Docs links to new Microsoft Learn links
</commit_message>
<xml_diff>
--- a/doc/Introduction to unsafe C#.pptx
+++ b/doc/Introduction to unsafe C#.pptx
@@ -24531,7 +24531,7 @@
               <a:rPr lang="en-US" sz="1200" dirty="0">
                 <a:hlinkClick r:id="rId2"/>
               </a:rPr>
-              <a:t>https://docs.microsoft.com/en-us/dotnet/csharp/language-reference/unsafe-code</a:t>
+              <a:t>https://learn.microsoft.com/en-us/dotnet/csharp/language-reference/unsafe-code</a:t>
             </a:r>
             <a:endParaRPr lang="en-US" sz="1200" dirty="0"/>
           </a:p>
@@ -24551,7 +24551,7 @@
               <a:rPr lang="en-US" sz="1200" dirty="0">
                 <a:hlinkClick r:id="rId3"/>
               </a:rPr>
-              <a:t>https://docs.microsoft.com/en-us/dotnet/csharp/language-reference/language-specification/unsafe-code</a:t>
+              <a:t>https://learn.microsoft.com/en-us/dotnet/csharp/language-reference/language-specification/unsafe-code</a:t>
             </a:r>
             <a:endParaRPr lang="en-US" sz="1200" dirty="0"/>
           </a:p>
@@ -24567,7 +24567,7 @@
               <a:rPr lang="en-US" sz="1200" dirty="0">
                 <a:hlinkClick r:id="rId4"/>
               </a:rPr>
-              <a:t>https://docs.microsoft.com/en-us/dotnet/standard/native-interop/</a:t>
+              <a:t>https://learn.microsoft.com/en-us/dotnet/standard/native-interop/</a:t>
             </a:r>
             <a:endParaRPr lang="en-US" sz="1200" dirty="0"/>
           </a:p>
@@ -24860,6 +24860,222 @@
           </a:p>
         </p:txBody>
       </p:sp>
+      <p:pic>
+        <p:nvPicPr>
+          <p:cNvPr id="3" name="Picture 2" descr="GitHub">
+            <a:extLst>
+              <a:ext uri="{FF2B5EF4-FFF2-40B4-BE49-F238E27FC236}">
+                <a16:creationId xmlns:a16="http://schemas.microsoft.com/office/drawing/2014/main" id="{29B12B77-0EED-C756-22C8-6C8E5EDEE4D1}"/>
+              </a:ext>
+            </a:extLst>
+          </p:cNvPr>
+          <p:cNvPicPr>
+            <a:picLocks noChangeAspect="1"/>
+          </p:cNvPicPr>
+          <p:nvPr/>
+        </p:nvPicPr>
+        <p:blipFill>
+          <a:blip r:embed="rId2">
+            <a:extLst>
+              <a:ext uri="{28A0092B-C50C-407E-A947-70E740481C1C}">
+                <a14:useLocalDpi xmlns:a14="http://schemas.microsoft.com/office/drawing/2010/main" val="0"/>
+              </a:ext>
+            </a:extLst>
+          </a:blip>
+          <a:stretch>
+            <a:fillRect/>
+          </a:stretch>
+        </p:blipFill>
+        <p:spPr>
+          <a:xfrm>
+            <a:off x="457200" y="5303520"/>
+            <a:ext cx="274320" cy="274320"/>
+          </a:xfrm>
+          <a:prstGeom prst="rect">
+            <a:avLst/>
+          </a:prstGeom>
+        </p:spPr>
+      </p:pic>
+      <p:sp>
+        <p:nvSpPr>
+          <p:cNvPr id="4" name="TextBox 3">
+            <a:extLst>
+              <a:ext uri="{FF2B5EF4-FFF2-40B4-BE49-F238E27FC236}">
+                <a16:creationId xmlns:a16="http://schemas.microsoft.com/office/drawing/2014/main" id="{6B8471E3-9146-8ED9-8175-0660582F81E8}"/>
+              </a:ext>
+            </a:extLst>
+          </p:cNvPr>
+          <p:cNvSpPr txBox="1"/>
+          <p:nvPr/>
+        </p:nvSpPr>
+        <p:spPr>
+          <a:xfrm>
+            <a:off x="800098" y="5247459"/>
+            <a:ext cx="3457641" cy="400110"/>
+          </a:xfrm>
+          <a:prstGeom prst="rect">
+            <a:avLst/>
+          </a:prstGeom>
+          <a:noFill/>
+        </p:spPr>
+        <p:txBody>
+          <a:bodyPr wrap="square" rtlCol="0">
+            <a:spAutoFit/>
+          </a:bodyPr>
+          <a:lstStyle/>
+          <a:p>
+            <a:r>
+              <a:rPr lang="en-US" sz="2000" dirty="0" err="1"/>
+              <a:t>dennisdietrich</a:t>
+            </a:r>
+            <a:endParaRPr lang="en-US" sz="2000" dirty="0"/>
+          </a:p>
+        </p:txBody>
+      </p:sp>
+      <p:sp>
+        <p:nvSpPr>
+          <p:cNvPr id="5" name="TextBox 4">
+            <a:extLst>
+              <a:ext uri="{FF2B5EF4-FFF2-40B4-BE49-F238E27FC236}">
+                <a16:creationId xmlns:a16="http://schemas.microsoft.com/office/drawing/2014/main" id="{B1D6468B-2C26-1307-0433-2A67BD6787E4}"/>
+              </a:ext>
+            </a:extLst>
+          </p:cNvPr>
+          <p:cNvSpPr txBox="1"/>
+          <p:nvPr/>
+        </p:nvSpPr>
+        <p:spPr>
+          <a:xfrm>
+            <a:off x="800099" y="5664321"/>
+            <a:ext cx="3457641" cy="400110"/>
+          </a:xfrm>
+          <a:prstGeom prst="rect">
+            <a:avLst/>
+          </a:prstGeom>
+          <a:noFill/>
+        </p:spPr>
+        <p:txBody>
+          <a:bodyPr wrap="square" rtlCol="0">
+            <a:spAutoFit/>
+          </a:bodyPr>
+          <a:lstStyle/>
+          <a:p>
+            <a:r>
+              <a:rPr lang="en-US" sz="2000" dirty="0" err="1"/>
+              <a:t>dcdietrich</a:t>
+            </a:r>
+            <a:endParaRPr lang="en-US" sz="2000" dirty="0"/>
+          </a:p>
+        </p:txBody>
+      </p:sp>
+      <p:pic>
+        <p:nvPicPr>
+          <p:cNvPr id="6" name="Picture 5" descr="LinkedIn">
+            <a:extLst>
+              <a:ext uri="{FF2B5EF4-FFF2-40B4-BE49-F238E27FC236}">
+                <a16:creationId xmlns:a16="http://schemas.microsoft.com/office/drawing/2014/main" id="{7D98E4BD-5402-43AA-9908-E267E4745B8A}"/>
+              </a:ext>
+            </a:extLst>
+          </p:cNvPr>
+          <p:cNvPicPr>
+            <a:picLocks noChangeAspect="1"/>
+          </p:cNvPicPr>
+          <p:nvPr/>
+        </p:nvPicPr>
+        <p:blipFill>
+          <a:blip r:embed="rId3">
+            <a:extLst>
+              <a:ext uri="{28A0092B-C50C-407E-A947-70E740481C1C}">
+                <a14:useLocalDpi xmlns:a14="http://schemas.microsoft.com/office/drawing/2010/main" val="0"/>
+              </a:ext>
+            </a:extLst>
+          </a:blip>
+          <a:stretch>
+            <a:fillRect/>
+          </a:stretch>
+        </p:blipFill>
+        <p:spPr>
+          <a:xfrm>
+            <a:off x="457200" y="5715000"/>
+            <a:ext cx="274320" cy="274320"/>
+          </a:xfrm>
+          <a:prstGeom prst="rect">
+            <a:avLst/>
+          </a:prstGeom>
+        </p:spPr>
+      </p:pic>
+      <p:sp>
+        <p:nvSpPr>
+          <p:cNvPr id="7" name="TextBox 6">
+            <a:extLst>
+              <a:ext uri="{FF2B5EF4-FFF2-40B4-BE49-F238E27FC236}">
+                <a16:creationId xmlns:a16="http://schemas.microsoft.com/office/drawing/2014/main" id="{EDD6CCD0-31CF-5DBF-6C0A-518339E8E5BA}"/>
+              </a:ext>
+            </a:extLst>
+          </p:cNvPr>
+          <p:cNvSpPr txBox="1"/>
+          <p:nvPr/>
+        </p:nvSpPr>
+        <p:spPr>
+          <a:xfrm>
+            <a:off x="800100" y="6064431"/>
+            <a:ext cx="3457641" cy="400110"/>
+          </a:xfrm>
+          <a:prstGeom prst="rect">
+            <a:avLst/>
+          </a:prstGeom>
+          <a:noFill/>
+        </p:spPr>
+        <p:txBody>
+          <a:bodyPr wrap="square" rtlCol="0">
+            <a:spAutoFit/>
+          </a:bodyPr>
+          <a:lstStyle/>
+          <a:p>
+            <a:r>
+              <a:rPr lang="en-US" sz="2000" dirty="0" err="1"/>
+              <a:t>denniscdietrich</a:t>
+            </a:r>
+            <a:endParaRPr lang="en-US" sz="2000" dirty="0"/>
+          </a:p>
+        </p:txBody>
+      </p:sp>
+      <p:pic>
+        <p:nvPicPr>
+          <p:cNvPr id="8" name="Picture 7" descr="Twitter">
+            <a:extLst>
+              <a:ext uri="{FF2B5EF4-FFF2-40B4-BE49-F238E27FC236}">
+                <a16:creationId xmlns:a16="http://schemas.microsoft.com/office/drawing/2014/main" id="{F16C749F-DD8B-78D1-C6C9-72359231BF66}"/>
+              </a:ext>
+            </a:extLst>
+          </p:cNvPr>
+          <p:cNvPicPr>
+            <a:picLocks noChangeAspect="1"/>
+          </p:cNvPicPr>
+          <p:nvPr/>
+        </p:nvPicPr>
+        <p:blipFill>
+          <a:blip r:embed="rId4">
+            <a:extLst>
+              <a:ext uri="{28A0092B-C50C-407E-A947-70E740481C1C}">
+                <a14:useLocalDpi xmlns:a14="http://schemas.microsoft.com/office/drawing/2010/main" val="0"/>
+              </a:ext>
+            </a:extLst>
+          </a:blip>
+          <a:stretch>
+            <a:fillRect/>
+          </a:stretch>
+        </p:blipFill>
+        <p:spPr>
+          <a:xfrm>
+            <a:off x="457200" y="6126480"/>
+            <a:ext cx="274320" cy="274320"/>
+          </a:xfrm>
+          <a:prstGeom prst="rect">
+            <a:avLst/>
+          </a:prstGeom>
+        </p:spPr>
+      </p:pic>
     </p:spTree>
     <p:extLst>
       <p:ext uri="{BB962C8B-B14F-4D97-AF65-F5344CB8AC3E}">
@@ -24967,6 +25183,222 @@
           </a:p>
         </p:txBody>
       </p:sp>
+      <p:pic>
+        <p:nvPicPr>
+          <p:cNvPr id="5" name="Picture 4" descr="GitHub">
+            <a:extLst>
+              <a:ext uri="{FF2B5EF4-FFF2-40B4-BE49-F238E27FC236}">
+                <a16:creationId xmlns:a16="http://schemas.microsoft.com/office/drawing/2014/main" id="{C9112408-9719-E440-BC6C-BA3E3E65E31E}"/>
+              </a:ext>
+            </a:extLst>
+          </p:cNvPr>
+          <p:cNvPicPr>
+            <a:picLocks noChangeAspect="1"/>
+          </p:cNvPicPr>
+          <p:nvPr/>
+        </p:nvPicPr>
+        <p:blipFill>
+          <a:blip r:embed="rId2">
+            <a:extLst>
+              <a:ext uri="{28A0092B-C50C-407E-A947-70E740481C1C}">
+                <a14:useLocalDpi xmlns:a14="http://schemas.microsoft.com/office/drawing/2010/main" val="0"/>
+              </a:ext>
+            </a:extLst>
+          </a:blip>
+          <a:stretch>
+            <a:fillRect/>
+          </a:stretch>
+        </p:blipFill>
+        <p:spPr>
+          <a:xfrm>
+            <a:off x="457200" y="5303520"/>
+            <a:ext cx="274320" cy="274320"/>
+          </a:xfrm>
+          <a:prstGeom prst="rect">
+            <a:avLst/>
+          </a:prstGeom>
+        </p:spPr>
+      </p:pic>
+      <p:sp>
+        <p:nvSpPr>
+          <p:cNvPr id="6" name="TextBox 5">
+            <a:extLst>
+              <a:ext uri="{FF2B5EF4-FFF2-40B4-BE49-F238E27FC236}">
+                <a16:creationId xmlns:a16="http://schemas.microsoft.com/office/drawing/2014/main" id="{F2FAD6ED-B45F-E480-52EB-49AC0568C9BA}"/>
+              </a:ext>
+            </a:extLst>
+          </p:cNvPr>
+          <p:cNvSpPr txBox="1"/>
+          <p:nvPr/>
+        </p:nvSpPr>
+        <p:spPr>
+          <a:xfrm>
+            <a:off x="800098" y="5247459"/>
+            <a:ext cx="3457641" cy="400110"/>
+          </a:xfrm>
+          <a:prstGeom prst="rect">
+            <a:avLst/>
+          </a:prstGeom>
+          <a:noFill/>
+        </p:spPr>
+        <p:txBody>
+          <a:bodyPr wrap="square" rtlCol="0">
+            <a:spAutoFit/>
+          </a:bodyPr>
+          <a:lstStyle/>
+          <a:p>
+            <a:r>
+              <a:rPr lang="en-US" sz="2000" dirty="0" err="1"/>
+              <a:t>dennisdietrich</a:t>
+            </a:r>
+            <a:endParaRPr lang="en-US" sz="2000" dirty="0"/>
+          </a:p>
+        </p:txBody>
+      </p:sp>
+      <p:sp>
+        <p:nvSpPr>
+          <p:cNvPr id="18" name="TextBox 17">
+            <a:extLst>
+              <a:ext uri="{FF2B5EF4-FFF2-40B4-BE49-F238E27FC236}">
+                <a16:creationId xmlns:a16="http://schemas.microsoft.com/office/drawing/2014/main" id="{CF7F53EC-6158-915C-CFC1-D4626D193755}"/>
+              </a:ext>
+            </a:extLst>
+          </p:cNvPr>
+          <p:cNvSpPr txBox="1"/>
+          <p:nvPr/>
+        </p:nvSpPr>
+        <p:spPr>
+          <a:xfrm>
+            <a:off x="800099" y="5664321"/>
+            <a:ext cx="3457641" cy="400110"/>
+          </a:xfrm>
+          <a:prstGeom prst="rect">
+            <a:avLst/>
+          </a:prstGeom>
+          <a:noFill/>
+        </p:spPr>
+        <p:txBody>
+          <a:bodyPr wrap="square" rtlCol="0">
+            <a:spAutoFit/>
+          </a:bodyPr>
+          <a:lstStyle/>
+          <a:p>
+            <a:r>
+              <a:rPr lang="en-US" sz="2000" dirty="0" err="1"/>
+              <a:t>dcdietrich</a:t>
+            </a:r>
+            <a:endParaRPr lang="en-US" sz="2000" dirty="0"/>
+          </a:p>
+        </p:txBody>
+      </p:sp>
+      <p:pic>
+        <p:nvPicPr>
+          <p:cNvPr id="20" name="Picture 19" descr="LinkedIn">
+            <a:extLst>
+              <a:ext uri="{FF2B5EF4-FFF2-40B4-BE49-F238E27FC236}">
+                <a16:creationId xmlns:a16="http://schemas.microsoft.com/office/drawing/2014/main" id="{4FA14B23-7ADB-953A-F57A-3E44D463F836}"/>
+              </a:ext>
+            </a:extLst>
+          </p:cNvPr>
+          <p:cNvPicPr>
+            <a:picLocks noChangeAspect="1"/>
+          </p:cNvPicPr>
+          <p:nvPr/>
+        </p:nvPicPr>
+        <p:blipFill>
+          <a:blip r:embed="rId3">
+            <a:extLst>
+              <a:ext uri="{28A0092B-C50C-407E-A947-70E740481C1C}">
+                <a14:useLocalDpi xmlns:a14="http://schemas.microsoft.com/office/drawing/2010/main" val="0"/>
+              </a:ext>
+            </a:extLst>
+          </a:blip>
+          <a:stretch>
+            <a:fillRect/>
+          </a:stretch>
+        </p:blipFill>
+        <p:spPr>
+          <a:xfrm>
+            <a:off x="457200" y="5715000"/>
+            <a:ext cx="274320" cy="274320"/>
+          </a:xfrm>
+          <a:prstGeom prst="rect">
+            <a:avLst/>
+          </a:prstGeom>
+        </p:spPr>
+      </p:pic>
+      <p:sp>
+        <p:nvSpPr>
+          <p:cNvPr id="24" name="TextBox 23">
+            <a:extLst>
+              <a:ext uri="{FF2B5EF4-FFF2-40B4-BE49-F238E27FC236}">
+                <a16:creationId xmlns:a16="http://schemas.microsoft.com/office/drawing/2014/main" id="{A04B5C49-8425-CBED-2FE0-96A50C78E05B}"/>
+              </a:ext>
+            </a:extLst>
+          </p:cNvPr>
+          <p:cNvSpPr txBox="1"/>
+          <p:nvPr/>
+        </p:nvSpPr>
+        <p:spPr>
+          <a:xfrm>
+            <a:off x="800100" y="6064431"/>
+            <a:ext cx="3457641" cy="400110"/>
+          </a:xfrm>
+          <a:prstGeom prst="rect">
+            <a:avLst/>
+          </a:prstGeom>
+          <a:noFill/>
+        </p:spPr>
+        <p:txBody>
+          <a:bodyPr wrap="square" rtlCol="0">
+            <a:spAutoFit/>
+          </a:bodyPr>
+          <a:lstStyle/>
+          <a:p>
+            <a:r>
+              <a:rPr lang="en-US" sz="2000" dirty="0" err="1"/>
+              <a:t>denniscdietrich</a:t>
+            </a:r>
+            <a:endParaRPr lang="en-US" sz="2000" dirty="0"/>
+          </a:p>
+        </p:txBody>
+      </p:sp>
+      <p:pic>
+        <p:nvPicPr>
+          <p:cNvPr id="26" name="Picture 25" descr="Twitter">
+            <a:extLst>
+              <a:ext uri="{FF2B5EF4-FFF2-40B4-BE49-F238E27FC236}">
+                <a16:creationId xmlns:a16="http://schemas.microsoft.com/office/drawing/2014/main" id="{E7AAD714-7A4D-FABA-7D6C-B2446830DBC8}"/>
+              </a:ext>
+            </a:extLst>
+          </p:cNvPr>
+          <p:cNvPicPr>
+            <a:picLocks noChangeAspect="1"/>
+          </p:cNvPicPr>
+          <p:nvPr/>
+        </p:nvPicPr>
+        <p:blipFill>
+          <a:blip r:embed="rId4">
+            <a:extLst>
+              <a:ext uri="{28A0092B-C50C-407E-A947-70E740481C1C}">
+                <a14:useLocalDpi xmlns:a14="http://schemas.microsoft.com/office/drawing/2010/main" val="0"/>
+              </a:ext>
+            </a:extLst>
+          </a:blip>
+          <a:stretch>
+            <a:fillRect/>
+          </a:stretch>
+        </p:blipFill>
+        <p:spPr>
+          <a:xfrm>
+            <a:off x="457200" y="6126480"/>
+            <a:ext cx="274320" cy="274320"/>
+          </a:xfrm>
+          <a:prstGeom prst="rect">
+            <a:avLst/>
+          </a:prstGeom>
+        </p:spPr>
+      </p:pic>
     </p:spTree>
     <p:extLst>
       <p:ext uri="{BB962C8B-B14F-4D97-AF65-F5344CB8AC3E}">

</xml_diff>

<commit_message>
Updated the remaining Microsoft Docs links
</commit_message>
<xml_diff>
--- a/doc/Introduction to unsafe C#.pptx
+++ b/doc/Introduction to unsafe C#.pptx
@@ -17383,7 +17383,7 @@
               <a:rPr lang="en-US" sz="1200" dirty="0">
                 <a:hlinkClick r:id="rId2"/>
               </a:rPr>
-              <a:t>https://docs.microsoft.com/en-us/cpp/cpp/data-type-ranges</a:t>
+              <a:t>https://learn.microsoft.com/en-us/cpp/cpp/data-type-ranges</a:t>
             </a:r>
             <a:endParaRPr lang="en-US" sz="1200" dirty="0"/>
           </a:p>
@@ -17407,7 +17407,7 @@
               <a:rPr lang="en-US" sz="1200" dirty="0">
                 <a:hlinkClick r:id="rId3"/>
               </a:rPr>
-              <a:t>https://docs.microsoft.com/en-us/windows/win32/winprog/windows-data-types</a:t>
+              <a:t>https://learn.microsoft.com/en-us/windows/win32/winprog/windows-data-types</a:t>
             </a:r>
             <a:endParaRPr lang="en-US" sz="1200" dirty="0"/>
           </a:p>
@@ -20749,7 +20749,7 @@
               <a:rPr lang="en-US" sz="1200" dirty="0">
                 <a:hlinkClick r:id="rId2"/>
               </a:rPr>
-              <a:t>https://docs.microsoft.com/en-us/dotnet/api/system.runtime.interopservices.safehandle</a:t>
+              <a:t>https://learn.microsoft.com/en-us/dotnet/api/system.runtime.interopservices.safehandle</a:t>
             </a:r>
             <a:endParaRPr lang="en-US" sz="1200" dirty="0"/>
           </a:p>
@@ -20777,7 +20777,7 @@
               <a:rPr lang="en-US" sz="1200" dirty="0">
                 <a:hlinkClick r:id="rId3"/>
               </a:rPr>
-              <a:t>https://docs.microsoft.com/en-us/dotnet/api/system.runtime.constrainedexecution.criticalfinalizerobject</a:t>
+              <a:t>https://learn.microsoft.com/en-us/dotnet/api/system.runtime.constrainedexecution.criticalfinalizerobject</a:t>
             </a:r>
             <a:endParaRPr lang="en-US" sz="1200" dirty="0"/>
           </a:p>
@@ -20793,7 +20793,7 @@
               <a:rPr lang="en-US" sz="1200" dirty="0">
                 <a:hlinkClick r:id="rId4"/>
               </a:rPr>
-              <a:t>https://docs.microsoft.com/en-us/dotnet/framework/performance/constrained-execution-regions</a:t>
+              <a:t>https://learn.microsoft.com/en-us/dotnet/framework/performance/constrained-execution-regions</a:t>
             </a:r>
             <a:endParaRPr lang="en-US" sz="1200" dirty="0"/>
           </a:p>
@@ -26988,7 +26988,7 @@
               <a:rPr lang="en-US" sz="1200" dirty="0">
                 <a:hlinkClick r:id="rId2"/>
               </a:rPr>
-              <a:t>https://docs.microsoft.com/en-us/dotnet/csharp/language-reference/language-specification/unsafe-code</a:t>
+              <a:t>https://learn.microsoft.com/en-us/dotnet/csharp/language-reference/language-specification/unsafe-code</a:t>
             </a:r>
             <a:endParaRPr lang="en-US" sz="1200" dirty="0"/>
           </a:p>

</xml_diff>

<commit_message>
Added information on unsafe compilation being opt-in (issue #5)
</commit_message>
<xml_diff>
--- a/doc/Introduction to unsafe C#.pptx
+++ b/doc/Introduction to unsafe C#.pptx
@@ -334,7 +334,7 @@
           <a:p>
             <a:fld id="{F9BC75CE-03FF-4667-898C-4C70B4392062}" type="datetimeFigureOut">
               <a:rPr lang="en-US" smtClean="0"/>
-              <a:t>10/9/2022</a:t>
+              <a:t>10/12/2022</a:t>
             </a:fld>
             <a:endParaRPr lang="en-US"/>
           </a:p>
@@ -609,7 +609,7 @@
           <a:p>
             <a:fld id="{F9BC75CE-03FF-4667-898C-4C70B4392062}" type="datetimeFigureOut">
               <a:rPr lang="en-US" smtClean="0"/>
-              <a:t>10/9/2022</a:t>
+              <a:t>10/12/2022</a:t>
             </a:fld>
             <a:endParaRPr lang="en-US"/>
           </a:p>
@@ -803,7 +803,7 @@
           <a:p>
             <a:fld id="{F9BC75CE-03FF-4667-898C-4C70B4392062}" type="datetimeFigureOut">
               <a:rPr lang="en-US" smtClean="0"/>
-              <a:t>10/9/2022</a:t>
+              <a:t>10/12/2022</a:t>
             </a:fld>
             <a:endParaRPr lang="en-US"/>
           </a:p>
@@ -1076,7 +1076,7 @@
           <a:p>
             <a:fld id="{F9BC75CE-03FF-4667-898C-4C70B4392062}" type="datetimeFigureOut">
               <a:rPr lang="en-US" smtClean="0"/>
-              <a:t>10/9/2022</a:t>
+              <a:t>10/12/2022</a:t>
             </a:fld>
             <a:endParaRPr lang="en-US"/>
           </a:p>
@@ -1417,7 +1417,7 @@
           <a:p>
             <a:fld id="{F9BC75CE-03FF-4667-898C-4C70B4392062}" type="datetimeFigureOut">
               <a:rPr lang="en-US" smtClean="0"/>
-              <a:t>10/9/2022</a:t>
+              <a:t>10/12/2022</a:t>
             </a:fld>
             <a:endParaRPr lang="en-US"/>
           </a:p>
@@ -2040,7 +2040,7 @@
           <a:p>
             <a:fld id="{F9BC75CE-03FF-4667-898C-4C70B4392062}" type="datetimeFigureOut">
               <a:rPr lang="en-US" smtClean="0"/>
-              <a:t>10/9/2022</a:t>
+              <a:t>10/12/2022</a:t>
             </a:fld>
             <a:endParaRPr lang="en-US"/>
           </a:p>
@@ -2900,7 +2900,7 @@
           <a:p>
             <a:fld id="{F9BC75CE-03FF-4667-898C-4C70B4392062}" type="datetimeFigureOut">
               <a:rPr lang="en-US" smtClean="0"/>
-              <a:t>10/9/2022</a:t>
+              <a:t>10/12/2022</a:t>
             </a:fld>
             <a:endParaRPr lang="en-US"/>
           </a:p>
@@ -3070,7 +3070,7 @@
           <a:p>
             <a:fld id="{F9BC75CE-03FF-4667-898C-4C70B4392062}" type="datetimeFigureOut">
               <a:rPr lang="en-US" smtClean="0"/>
-              <a:t>10/9/2022</a:t>
+              <a:t>10/12/2022</a:t>
             </a:fld>
             <a:endParaRPr lang="en-US"/>
           </a:p>
@@ -3250,7 +3250,7 @@
           <a:p>
             <a:fld id="{F9BC75CE-03FF-4667-898C-4C70B4392062}" type="datetimeFigureOut">
               <a:rPr lang="en-US" smtClean="0"/>
-              <a:t>10/9/2022</a:t>
+              <a:t>10/12/2022</a:t>
             </a:fld>
             <a:endParaRPr lang="en-US"/>
           </a:p>
@@ -3420,7 +3420,7 @@
           <a:p>
             <a:fld id="{F9BC75CE-03FF-4667-898C-4C70B4392062}" type="datetimeFigureOut">
               <a:rPr lang="en-US" smtClean="0"/>
-              <a:t>10/9/2022</a:t>
+              <a:t>10/12/2022</a:t>
             </a:fld>
             <a:endParaRPr lang="en-US"/>
           </a:p>
@@ -3667,7 +3667,7 @@
           <a:p>
             <a:fld id="{F9BC75CE-03FF-4667-898C-4C70B4392062}" type="datetimeFigureOut">
               <a:rPr lang="en-US" smtClean="0"/>
-              <a:t>10/9/2022</a:t>
+              <a:t>10/12/2022</a:t>
             </a:fld>
             <a:endParaRPr lang="en-US"/>
           </a:p>
@@ -3959,7 +3959,7 @@
           <a:p>
             <a:fld id="{F9BC75CE-03FF-4667-898C-4C70B4392062}" type="datetimeFigureOut">
               <a:rPr lang="en-US" smtClean="0"/>
-              <a:t>10/9/2022</a:t>
+              <a:t>10/12/2022</a:t>
             </a:fld>
             <a:endParaRPr lang="en-US"/>
           </a:p>
@@ -4403,7 +4403,7 @@
           <a:p>
             <a:fld id="{F9BC75CE-03FF-4667-898C-4C70B4392062}" type="datetimeFigureOut">
               <a:rPr lang="en-US" smtClean="0"/>
-              <a:t>10/9/2022</a:t>
+              <a:t>10/12/2022</a:t>
             </a:fld>
             <a:endParaRPr lang="en-US"/>
           </a:p>
@@ -4521,7 +4521,7 @@
           <a:p>
             <a:fld id="{F9BC75CE-03FF-4667-898C-4C70B4392062}" type="datetimeFigureOut">
               <a:rPr lang="en-US" smtClean="0"/>
-              <a:t>10/9/2022</a:t>
+              <a:t>10/12/2022</a:t>
             </a:fld>
             <a:endParaRPr lang="en-US"/>
           </a:p>
@@ -4616,7 +4616,7 @@
           <a:p>
             <a:fld id="{F9BC75CE-03FF-4667-898C-4C70B4392062}" type="datetimeFigureOut">
               <a:rPr lang="en-US" smtClean="0"/>
-              <a:t>10/9/2022</a:t>
+              <a:t>10/12/2022</a:t>
             </a:fld>
             <a:endParaRPr lang="en-US"/>
           </a:p>
@@ -4895,7 +4895,7 @@
           <a:p>
             <a:fld id="{F9BC75CE-03FF-4667-898C-4C70B4392062}" type="datetimeFigureOut">
               <a:rPr lang="en-US" smtClean="0"/>
-              <a:t>10/9/2022</a:t>
+              <a:t>10/12/2022</a:t>
             </a:fld>
             <a:endParaRPr lang="en-US"/>
           </a:p>
@@ -5170,7 +5170,7 @@
           <a:p>
             <a:fld id="{F9BC75CE-03FF-4667-898C-4C70B4392062}" type="datetimeFigureOut">
               <a:rPr lang="en-US" smtClean="0"/>
-              <a:t>10/9/2022</a:t>
+              <a:t>10/12/2022</a:t>
             </a:fld>
             <a:endParaRPr lang="en-US"/>
           </a:p>
@@ -5599,7 +5599,7 @@
           <a:p>
             <a:fld id="{F9BC75CE-03FF-4667-898C-4C70B4392062}" type="datetimeFigureOut">
               <a:rPr lang="en-US" smtClean="0"/>
-              <a:t>10/9/2022</a:t>
+              <a:t>10/12/2022</a:t>
             </a:fld>
             <a:endParaRPr lang="en-US"/>
           </a:p>
@@ -13610,37 +13610,32 @@
       </p:sp>
       <p:pic>
         <p:nvPicPr>
-          <p:cNvPr id="8" name="Content Placeholder 7" descr="Remarks&#10;AllocHGlobal is one of two memory allocation methods in the Marshal class. (Marshal.AllocCoTaskMem is the other.) This method exposes the Win32 LocalAlloc function from Kernel32.dll.">
+          <p:cNvPr id="5" name="Picture 4" descr="Remarks&#10;AllocHGlobal is one of two memory allocation methods in the Marshal class. (Marshal.AllocCoTaskMem is the other.) This method exposes the Win32 LocalAlloc function from Kernel32.dll.">
             <a:extLst>
               <a:ext uri="{FF2B5EF4-FFF2-40B4-BE49-F238E27FC236}">
-                <a16:creationId xmlns:a16="http://schemas.microsoft.com/office/drawing/2014/main" id="{B7993E01-3CDA-1050-8125-BA251CC8940B}"/>
+                <a16:creationId xmlns:a16="http://schemas.microsoft.com/office/drawing/2014/main" id="{A2E051FD-E634-FAB7-1FD7-F497EE828A69}"/>
               </a:ext>
             </a:extLst>
           </p:cNvPr>
           <p:cNvPicPr>
-            <a:picLocks noGrp="1" noChangeAspect="1"/>
+            <a:picLocks noChangeAspect="1"/>
           </p:cNvPicPr>
-          <p:nvPr>
-            <p:ph idx="1"/>
-          </p:nvPr>
+          <p:nvPr/>
         </p:nvPicPr>
         <p:blipFill>
-          <a:blip r:embed="rId2">
-            <a:extLst>
-              <a:ext uri="{28A0092B-C50C-407E-A947-70E740481C1C}">
-                <a14:useLocalDpi xmlns:a14="http://schemas.microsoft.com/office/drawing/2010/main" val="0"/>
-              </a:ext>
-            </a:extLst>
-          </a:blip>
+          <a:blip r:embed="rId2"/>
           <a:stretch>
             <a:fillRect/>
           </a:stretch>
         </p:blipFill>
         <p:spPr>
           <a:xfrm>
-            <a:off x="380977" y="2971575"/>
-            <a:ext cx="8947150" cy="1179082"/>
+            <a:off x="491896" y="2993119"/>
+            <a:ext cx="6873428" cy="1518000"/>
           </a:xfrm>
+          <a:prstGeom prst="rect">
+            <a:avLst/>
+          </a:prstGeom>
           <a:ln w="15875">
             <a:solidFill>
               <a:schemeClr val="accent1"/>
@@ -13659,10 +13654,10 @@
       </p:pic>
       <p:pic>
         <p:nvPicPr>
-          <p:cNvPr id="10" name="Picture 9" descr="Note&#10;The local functions have greater overhead and provide fewer features than other memory management functions. New applications should use the heap functions unless documentation states that a local function should be used. For more information, see Global and Local Functions.">
+          <p:cNvPr id="11" name="Picture 10" descr="Note&#10;The local functions have greater overhead and provide fewer features than other memory management functions. New applications should use the heap functions unless documentation states that a local function should be used. For more information, see Global and Local Functions.">
             <a:extLst>
               <a:ext uri="{FF2B5EF4-FFF2-40B4-BE49-F238E27FC236}">
-                <a16:creationId xmlns:a16="http://schemas.microsoft.com/office/drawing/2014/main" id="{75B5B8C9-97F6-435C-F911-D380160600CF}"/>
+                <a16:creationId xmlns:a16="http://schemas.microsoft.com/office/drawing/2014/main" id="{D43EFFB9-B5FF-6E79-A610-87285F16736D}"/>
               </a:ext>
             </a:extLst>
           </p:cNvPr>
@@ -13672,21 +13667,15 @@
           <p:nvPr/>
         </p:nvPicPr>
         <p:blipFill>
-          <a:blip r:embed="rId3">
-            <a:extLst>
-              <a:ext uri="{28A0092B-C50C-407E-A947-70E740481C1C}">
-                <a14:useLocalDpi xmlns:a14="http://schemas.microsoft.com/office/drawing/2010/main" val="0"/>
-              </a:ext>
-            </a:extLst>
-          </a:blip>
+          <a:blip r:embed="rId3"/>
           <a:stretch>
             <a:fillRect/>
           </a:stretch>
         </p:blipFill>
         <p:spPr>
           <a:xfrm>
-            <a:off x="1638408" y="4532743"/>
-            <a:ext cx="10236726" cy="1333569"/>
+            <a:off x="3731019" y="4771739"/>
+            <a:ext cx="6867143" cy="1222571"/>
           </a:xfrm>
           <a:prstGeom prst="rect">
             <a:avLst/>
@@ -13751,7 +13740,7 @@
                                           </p:stCondLst>
                                         </p:cTn>
                                         <p:tgtEl>
-                                          <p:spTgt spid="8"/>
+                                          <p:spTgt spid="5"/>
                                         </p:tgtEl>
                                         <p:attrNameLst>
                                           <p:attrName>style.visibility</p:attrName>
@@ -13796,7 +13785,7 @@
                                           </p:stCondLst>
                                         </p:cTn>
                                         <p:tgtEl>
-                                          <p:spTgt spid="10"/>
+                                          <p:spTgt spid="11"/>
                                         </p:tgtEl>
                                         <p:attrNameLst>
                                           <p:attrName>style.visibility</p:attrName>
@@ -24932,42 +24921,6 @@
           </a:p>
         </p:txBody>
       </p:sp>
-      <p:sp>
-        <p:nvSpPr>
-          <p:cNvPr id="5" name="TextBox 4">
-            <a:extLst>
-              <a:ext uri="{FF2B5EF4-FFF2-40B4-BE49-F238E27FC236}">
-                <a16:creationId xmlns:a16="http://schemas.microsoft.com/office/drawing/2014/main" id="{B1D6468B-2C26-1307-0433-2A67BD6787E4}"/>
-              </a:ext>
-            </a:extLst>
-          </p:cNvPr>
-          <p:cNvSpPr txBox="1"/>
-          <p:nvPr/>
-        </p:nvSpPr>
-        <p:spPr>
-          <a:xfrm>
-            <a:off x="800099" y="5664321"/>
-            <a:ext cx="3457641" cy="400110"/>
-          </a:xfrm>
-          <a:prstGeom prst="rect">
-            <a:avLst/>
-          </a:prstGeom>
-          <a:noFill/>
-        </p:spPr>
-        <p:txBody>
-          <a:bodyPr wrap="square" rtlCol="0">
-            <a:spAutoFit/>
-          </a:bodyPr>
-          <a:lstStyle/>
-          <a:p>
-            <a:r>
-              <a:rPr lang="en-US" sz="2000" dirty="0" err="1"/>
-              <a:t>dcdietrich</a:t>
-            </a:r>
-            <a:endParaRPr lang="en-US" sz="2000" dirty="0"/>
-          </a:p>
-        </p:txBody>
-      </p:sp>
       <p:pic>
         <p:nvPicPr>
           <p:cNvPr id="6" name="Picture 5" descr="LinkedIn">
@@ -25006,10 +24959,10 @@
       </p:pic>
       <p:sp>
         <p:nvSpPr>
-          <p:cNvPr id="7" name="TextBox 6">
+          <p:cNvPr id="5" name="TextBox 4">
             <a:extLst>
               <a:ext uri="{FF2B5EF4-FFF2-40B4-BE49-F238E27FC236}">
-                <a16:creationId xmlns:a16="http://schemas.microsoft.com/office/drawing/2014/main" id="{EDD6CCD0-31CF-5DBF-6C0A-518339E8E5BA}"/>
+                <a16:creationId xmlns:a16="http://schemas.microsoft.com/office/drawing/2014/main" id="{B1D6468B-2C26-1307-0433-2A67BD6787E4}"/>
               </a:ext>
             </a:extLst>
           </p:cNvPr>
@@ -25018,7 +24971,7 @@
         </p:nvSpPr>
         <p:spPr>
           <a:xfrm>
-            <a:off x="800100" y="6064431"/>
+            <a:off x="800099" y="5664321"/>
             <a:ext cx="3457641" cy="400110"/>
           </a:xfrm>
           <a:prstGeom prst="rect">
@@ -25034,7 +24987,7 @@
           <a:p>
             <a:r>
               <a:rPr lang="en-US" sz="2000" dirty="0" err="1"/>
-              <a:t>denniscdietrich</a:t>
+              <a:t>dcdietrich</a:t>
             </a:r>
             <a:endParaRPr lang="en-US" sz="2000" dirty="0"/>
           </a:p>
@@ -25076,6 +25029,42 @@
           </a:prstGeom>
         </p:spPr>
       </p:pic>
+      <p:sp>
+        <p:nvSpPr>
+          <p:cNvPr id="7" name="TextBox 6">
+            <a:extLst>
+              <a:ext uri="{FF2B5EF4-FFF2-40B4-BE49-F238E27FC236}">
+                <a16:creationId xmlns:a16="http://schemas.microsoft.com/office/drawing/2014/main" id="{EDD6CCD0-31CF-5DBF-6C0A-518339E8E5BA}"/>
+              </a:ext>
+            </a:extLst>
+          </p:cNvPr>
+          <p:cNvSpPr txBox="1"/>
+          <p:nvPr/>
+        </p:nvSpPr>
+        <p:spPr>
+          <a:xfrm>
+            <a:off x="800100" y="6064431"/>
+            <a:ext cx="3457641" cy="400110"/>
+          </a:xfrm>
+          <a:prstGeom prst="rect">
+            <a:avLst/>
+          </a:prstGeom>
+          <a:noFill/>
+        </p:spPr>
+        <p:txBody>
+          <a:bodyPr wrap="square" rtlCol="0">
+            <a:spAutoFit/>
+          </a:bodyPr>
+          <a:lstStyle/>
+          <a:p>
+            <a:r>
+              <a:rPr lang="en-US" sz="2000" dirty="0" err="1"/>
+              <a:t>denniscdietrich</a:t>
+            </a:r>
+            <a:endParaRPr lang="en-US" sz="2000" dirty="0"/>
+          </a:p>
+        </p:txBody>
+      </p:sp>
     </p:spTree>
     <p:extLst>
       <p:ext uri="{BB962C8B-B14F-4D97-AF65-F5344CB8AC3E}">
@@ -25255,42 +25244,6 @@
           </a:p>
         </p:txBody>
       </p:sp>
-      <p:sp>
-        <p:nvSpPr>
-          <p:cNvPr id="18" name="TextBox 17">
-            <a:extLst>
-              <a:ext uri="{FF2B5EF4-FFF2-40B4-BE49-F238E27FC236}">
-                <a16:creationId xmlns:a16="http://schemas.microsoft.com/office/drawing/2014/main" id="{CF7F53EC-6158-915C-CFC1-D4626D193755}"/>
-              </a:ext>
-            </a:extLst>
-          </p:cNvPr>
-          <p:cNvSpPr txBox="1"/>
-          <p:nvPr/>
-        </p:nvSpPr>
-        <p:spPr>
-          <a:xfrm>
-            <a:off x="800099" y="5664321"/>
-            <a:ext cx="3457641" cy="400110"/>
-          </a:xfrm>
-          <a:prstGeom prst="rect">
-            <a:avLst/>
-          </a:prstGeom>
-          <a:noFill/>
-        </p:spPr>
-        <p:txBody>
-          <a:bodyPr wrap="square" rtlCol="0">
-            <a:spAutoFit/>
-          </a:bodyPr>
-          <a:lstStyle/>
-          <a:p>
-            <a:r>
-              <a:rPr lang="en-US" sz="2000" dirty="0" err="1"/>
-              <a:t>dcdietrich</a:t>
-            </a:r>
-            <a:endParaRPr lang="en-US" sz="2000" dirty="0"/>
-          </a:p>
-        </p:txBody>
-      </p:sp>
       <p:pic>
         <p:nvPicPr>
           <p:cNvPr id="20" name="Picture 19" descr="LinkedIn">
@@ -25329,10 +25282,10 @@
       </p:pic>
       <p:sp>
         <p:nvSpPr>
-          <p:cNvPr id="24" name="TextBox 23">
+          <p:cNvPr id="18" name="TextBox 17">
             <a:extLst>
               <a:ext uri="{FF2B5EF4-FFF2-40B4-BE49-F238E27FC236}">
-                <a16:creationId xmlns:a16="http://schemas.microsoft.com/office/drawing/2014/main" id="{A04B5C49-8425-CBED-2FE0-96A50C78E05B}"/>
+                <a16:creationId xmlns:a16="http://schemas.microsoft.com/office/drawing/2014/main" id="{CF7F53EC-6158-915C-CFC1-D4626D193755}"/>
               </a:ext>
             </a:extLst>
           </p:cNvPr>
@@ -25341,7 +25294,7 @@
         </p:nvSpPr>
         <p:spPr>
           <a:xfrm>
-            <a:off x="800100" y="6064431"/>
+            <a:off x="800099" y="5664321"/>
             <a:ext cx="3457641" cy="400110"/>
           </a:xfrm>
           <a:prstGeom prst="rect">
@@ -25357,7 +25310,7 @@
           <a:p>
             <a:r>
               <a:rPr lang="en-US" sz="2000" dirty="0" err="1"/>
-              <a:t>denniscdietrich</a:t>
+              <a:t>dcdietrich</a:t>
             </a:r>
             <a:endParaRPr lang="en-US" sz="2000" dirty="0"/>
           </a:p>
@@ -25399,6 +25352,42 @@
           </a:prstGeom>
         </p:spPr>
       </p:pic>
+      <p:sp>
+        <p:nvSpPr>
+          <p:cNvPr id="24" name="TextBox 23">
+            <a:extLst>
+              <a:ext uri="{FF2B5EF4-FFF2-40B4-BE49-F238E27FC236}">
+                <a16:creationId xmlns:a16="http://schemas.microsoft.com/office/drawing/2014/main" id="{A04B5C49-8425-CBED-2FE0-96A50C78E05B}"/>
+              </a:ext>
+            </a:extLst>
+          </p:cNvPr>
+          <p:cNvSpPr txBox="1"/>
+          <p:nvPr/>
+        </p:nvSpPr>
+        <p:spPr>
+          <a:xfrm>
+            <a:off x="800100" y="6064431"/>
+            <a:ext cx="3457641" cy="400110"/>
+          </a:xfrm>
+          <a:prstGeom prst="rect">
+            <a:avLst/>
+          </a:prstGeom>
+          <a:noFill/>
+        </p:spPr>
+        <p:txBody>
+          <a:bodyPr wrap="square" rtlCol="0">
+            <a:spAutoFit/>
+          </a:bodyPr>
+          <a:lstStyle/>
+          <a:p>
+            <a:r>
+              <a:rPr lang="en-US" sz="2000" dirty="0" err="1"/>
+              <a:t>denniscdietrich</a:t>
+            </a:r>
+            <a:endParaRPr lang="en-US" sz="2000" dirty="0"/>
+          </a:p>
+        </p:txBody>
+      </p:sp>
     </p:spTree>
     <p:extLst>
       <p:ext uri="{BB962C8B-B14F-4D97-AF65-F5344CB8AC3E}">
@@ -28536,6 +28525,94 @@
           </a:p>
         </p:txBody>
       </p:sp>
+      <p:pic>
+        <p:nvPicPr>
+          <p:cNvPr id="6" name="Picture 5" descr="The AllowUnsafeBlocks compiler option allows code that uses the unsafe keyword to compile. The default value for this option is false, meaning unsafe code is not allowed.">
+            <a:extLst>
+              <a:ext uri="{FF2B5EF4-FFF2-40B4-BE49-F238E27FC236}">
+                <a16:creationId xmlns:a16="http://schemas.microsoft.com/office/drawing/2014/main" id="{04F1556D-5F99-4F64-655B-56E61F18CB24}"/>
+              </a:ext>
+            </a:extLst>
+          </p:cNvPr>
+          <p:cNvPicPr>
+            <a:picLocks noChangeAspect="1"/>
+          </p:cNvPicPr>
+          <p:nvPr/>
+        </p:nvPicPr>
+        <p:blipFill>
+          <a:blip r:embed="rId2"/>
+          <a:stretch>
+            <a:fillRect/>
+          </a:stretch>
+        </p:blipFill>
+        <p:spPr>
+          <a:xfrm>
+            <a:off x="551907" y="2686294"/>
+            <a:ext cx="6046857" cy="2275429"/>
+          </a:xfrm>
+          <a:prstGeom prst="rect">
+            <a:avLst/>
+          </a:prstGeom>
+          <a:ln w="15875">
+            <a:solidFill>
+              <a:schemeClr val="accent1"/>
+            </a:solidFill>
+          </a:ln>
+          <a:effectLst>
+            <a:outerShdw blurRad="127000" dist="127000" dir="2700000" algn="tl" rotWithShape="0">
+              <a:schemeClr val="bg1">
+                <a:lumMod val="95000"/>
+                <a:lumOff val="5000"/>
+                <a:alpha val="80000"/>
+              </a:schemeClr>
+            </a:outerShdw>
+          </a:effectLst>
+        </p:spPr>
+      </p:pic>
+      <p:pic>
+        <p:nvPicPr>
+          <p:cNvPr id="8" name="Picture 7" descr="Compiler error CS0227: Unsafe code may only appear if compiling with /unsafe">
+            <a:extLst>
+              <a:ext uri="{FF2B5EF4-FFF2-40B4-BE49-F238E27FC236}">
+                <a16:creationId xmlns:a16="http://schemas.microsoft.com/office/drawing/2014/main" id="{6BDEAAC3-D7B0-8476-DA82-8155DC7F996D}"/>
+              </a:ext>
+            </a:extLst>
+          </p:cNvPr>
+          <p:cNvPicPr>
+            <a:picLocks noChangeAspect="1"/>
+          </p:cNvPicPr>
+          <p:nvPr/>
+        </p:nvPicPr>
+        <p:blipFill>
+          <a:blip r:embed="rId3"/>
+          <a:stretch>
+            <a:fillRect/>
+          </a:stretch>
+        </p:blipFill>
+        <p:spPr>
+          <a:xfrm>
+            <a:off x="4330337" y="4223493"/>
+            <a:ext cx="7172897" cy="2426589"/>
+          </a:xfrm>
+          <a:prstGeom prst="rect">
+            <a:avLst/>
+          </a:prstGeom>
+          <a:ln w="15875">
+            <a:solidFill>
+              <a:schemeClr val="accent1"/>
+            </a:solidFill>
+          </a:ln>
+          <a:effectLst>
+            <a:outerShdw blurRad="127000" dist="127000" dir="2700000" algn="tl" rotWithShape="0">
+              <a:schemeClr val="bg1">
+                <a:lumMod val="95000"/>
+                <a:lumOff val="5000"/>
+                <a:alpha val="80000"/>
+              </a:schemeClr>
+            </a:outerShdw>
+          </a:effectLst>
+        </p:spPr>
+      </p:pic>
     </p:spTree>
     <p:extLst>
       <p:ext uri="{BB962C8B-B14F-4D97-AF65-F5344CB8AC3E}">
@@ -28546,6 +28623,126 @@
   <p:clrMapOvr>
     <a:masterClrMapping/>
   </p:clrMapOvr>
+  <p:timing>
+    <p:tnLst>
+      <p:par>
+        <p:cTn id="1" dur="indefinite" restart="never" nodeType="tmRoot">
+          <p:childTnLst>
+            <p:seq concurrent="1" nextAc="seek">
+              <p:cTn id="2" dur="indefinite" nodeType="mainSeq">
+                <p:childTnLst>
+                  <p:par>
+                    <p:cTn id="3" fill="hold">
+                      <p:stCondLst>
+                        <p:cond delay="indefinite"/>
+                      </p:stCondLst>
+                      <p:childTnLst>
+                        <p:par>
+                          <p:cTn id="4" fill="hold">
+                            <p:stCondLst>
+                              <p:cond delay="0"/>
+                            </p:stCondLst>
+                            <p:childTnLst>
+                              <p:par>
+                                <p:cTn id="5" presetID="1" presetClass="entr" presetSubtype="0" fill="hold" nodeType="clickEffect">
+                                  <p:stCondLst>
+                                    <p:cond delay="0"/>
+                                  </p:stCondLst>
+                                  <p:childTnLst>
+                                    <p:set>
+                                      <p:cBhvr>
+                                        <p:cTn id="6" dur="1" fill="hold">
+                                          <p:stCondLst>
+                                            <p:cond delay="0"/>
+                                          </p:stCondLst>
+                                        </p:cTn>
+                                        <p:tgtEl>
+                                          <p:spTgt spid="6"/>
+                                        </p:tgtEl>
+                                        <p:attrNameLst>
+                                          <p:attrName>style.visibility</p:attrName>
+                                        </p:attrNameLst>
+                                      </p:cBhvr>
+                                      <p:to>
+                                        <p:strVal val="visible"/>
+                                      </p:to>
+                                    </p:set>
+                                  </p:childTnLst>
+                                </p:cTn>
+                              </p:par>
+                            </p:childTnLst>
+                          </p:cTn>
+                        </p:par>
+                      </p:childTnLst>
+                    </p:cTn>
+                  </p:par>
+                  <p:par>
+                    <p:cTn id="7" fill="hold">
+                      <p:stCondLst>
+                        <p:cond delay="indefinite"/>
+                      </p:stCondLst>
+                      <p:childTnLst>
+                        <p:par>
+                          <p:cTn id="8" fill="hold">
+                            <p:stCondLst>
+                              <p:cond delay="0"/>
+                            </p:stCondLst>
+                            <p:childTnLst>
+                              <p:par>
+                                <p:cTn id="9" presetID="1" presetClass="entr" presetSubtype="0" fill="hold" nodeType="clickEffect">
+                                  <p:stCondLst>
+                                    <p:cond delay="0"/>
+                                  </p:stCondLst>
+                                  <p:childTnLst>
+                                    <p:set>
+                                      <p:cBhvr>
+                                        <p:cTn id="10" dur="1" fill="hold">
+                                          <p:stCondLst>
+                                            <p:cond delay="0"/>
+                                          </p:stCondLst>
+                                        </p:cTn>
+                                        <p:tgtEl>
+                                          <p:spTgt spid="8"/>
+                                        </p:tgtEl>
+                                        <p:attrNameLst>
+                                          <p:attrName>style.visibility</p:attrName>
+                                        </p:attrNameLst>
+                                      </p:cBhvr>
+                                      <p:to>
+                                        <p:strVal val="visible"/>
+                                      </p:to>
+                                    </p:set>
+                                  </p:childTnLst>
+                                </p:cTn>
+                              </p:par>
+                            </p:childTnLst>
+                          </p:cTn>
+                        </p:par>
+                      </p:childTnLst>
+                    </p:cTn>
+                  </p:par>
+                </p:childTnLst>
+              </p:cTn>
+              <p:prevCondLst>
+                <p:cond evt="onPrev" delay="0">
+                  <p:tgtEl>
+                    <p:sldTgt/>
+                  </p:tgtEl>
+                </p:cond>
+              </p:prevCondLst>
+              <p:nextCondLst>
+                <p:cond evt="onNext" delay="0">
+                  <p:tgtEl>
+                    <p:sldTgt/>
+                  </p:tgtEl>
+                </p:cond>
+              </p:nextCondLst>
+            </p:seq>
+          </p:childTnLst>
+        </p:cTn>
+      </p:par>
+    </p:tnLst>
+  </p:timing>
 </p:sld>
 </file>
 

</xml_diff>

<commit_message>
Added a BradA quote to the slide about DLL import generation (issue #3)
</commit_message>
<xml_diff>
--- a/doc/Introduction to unsafe C#.pptx
+++ b/doc/Introduction to unsafe C#.pptx
@@ -17759,6 +17759,148 @@
           </a:p>
         </p:txBody>
       </p:sp>
+      <p:sp>
+        <p:nvSpPr>
+          <p:cNvPr id="4" name="TextBox 3">
+            <a:extLst>
+              <a:ext uri="{FF2B5EF4-FFF2-40B4-BE49-F238E27FC236}">
+                <a16:creationId xmlns:a16="http://schemas.microsoft.com/office/drawing/2014/main" id="{D5296834-0104-2E14-8ADF-DE4FA1A0AEAD}"/>
+              </a:ext>
+            </a:extLst>
+          </p:cNvPr>
+          <p:cNvSpPr txBox="1"/>
+          <p:nvPr/>
+        </p:nvSpPr>
+        <p:spPr>
+          <a:xfrm>
+            <a:off x="2683360" y="2182505"/>
+            <a:ext cx="6825280" cy="2492990"/>
+          </a:xfrm>
+          <a:prstGeom prst="rect">
+            <a:avLst/>
+          </a:prstGeom>
+          <a:solidFill>
+            <a:schemeClr val="bg1">
+              <a:lumMod val="85000"/>
+              <a:lumOff val="15000"/>
+            </a:schemeClr>
+          </a:solidFill>
+          <a:ln w="15875">
+            <a:solidFill>
+              <a:schemeClr val="accent1"/>
+            </a:solidFill>
+          </a:ln>
+          <a:effectLst>
+            <a:outerShdw blurRad="127000" dist="127000" dir="2700000" algn="tl" rotWithShape="0">
+              <a:schemeClr val="bg1">
+                <a:lumMod val="95000"/>
+                <a:lumOff val="5000"/>
+                <a:alpha val="80000"/>
+              </a:schemeClr>
+            </a:outerShdw>
+          </a:effectLst>
+        </p:spPr>
+        <p:txBody>
+          <a:bodyPr wrap="square" rtlCol="0">
+            <a:spAutoFit/>
+          </a:bodyPr>
+          <a:lstStyle/>
+          <a:p>
+            <a:r>
+              <a:rPr lang="en-US" dirty="0"/>
+              <a:t>“</a:t>
+            </a:r>
+            <a:r>
+              <a:rPr lang="en-US" i="1" dirty="0"/>
+              <a:t>We were asked to […] provide a tool that would take an unmanaged C header file and produce </a:t>
+            </a:r>
+            <a:r>
+              <a:rPr lang="en-US" i="1" dirty="0" err="1"/>
+              <a:t>pinvoke</a:t>
+            </a:r>
+            <a:r>
+              <a:rPr lang="en-US" i="1" dirty="0"/>
+              <a:t> declarations […]. The […] ask is unfortunately impossible to do 100% correctly since unmanaged header files are too ambiguous to be automatically convertible. For example, how would such tool convert </a:t>
+            </a:r>
+            <a:r>
+              <a:rPr lang="en-US" dirty="0">
+                <a:latin typeface="Consolas" panose="020B0609020204030204" pitchFamily="49" charset="0"/>
+              </a:rPr>
+              <a:t>char*</a:t>
+            </a:r>
+            <a:r>
+              <a:rPr lang="en-US" i="1" dirty="0"/>
+              <a:t> parameter? As </a:t>
+            </a:r>
+            <a:r>
+              <a:rPr lang="en-US" dirty="0">
+                <a:latin typeface="Consolas" panose="020B0609020204030204" pitchFamily="49" charset="0"/>
+              </a:rPr>
+              <a:t>String</a:t>
+            </a:r>
+            <a:r>
+              <a:rPr lang="en-US" i="1" dirty="0"/>
+              <a:t>, </a:t>
+            </a:r>
+            <a:r>
+              <a:rPr lang="en-US" dirty="0">
+                <a:latin typeface="Consolas" panose="020B0609020204030204" pitchFamily="49" charset="0"/>
+              </a:rPr>
+              <a:t>StringBuilder</a:t>
+            </a:r>
+            <a:r>
+              <a:rPr lang="en-US" i="1" dirty="0"/>
+              <a:t>, </a:t>
+            </a:r>
+            <a:r>
+              <a:rPr lang="en-US" dirty="0">
+                <a:latin typeface="Consolas" panose="020B0609020204030204" pitchFamily="49" charset="0"/>
+              </a:rPr>
+              <a:t>ref char</a:t>
+            </a:r>
+            <a:r>
+              <a:rPr lang="en-US" i="1" dirty="0"/>
+              <a:t> or </a:t>
+            </a:r>
+            <a:r>
+              <a:rPr lang="en-US" dirty="0">
+                <a:latin typeface="Consolas" panose="020B0609020204030204" pitchFamily="49" charset="0"/>
+              </a:rPr>
+              <a:t>char[]</a:t>
+            </a:r>
+            <a:r>
+              <a:rPr lang="en-US" i="1" dirty="0"/>
+              <a:t>?</a:t>
+            </a:r>
+            <a:r>
+              <a:rPr lang="en-US" dirty="0"/>
+              <a:t>”</a:t>
+            </a:r>
+          </a:p>
+          <a:p>
+            <a:r>
+              <a:rPr lang="en-US" dirty="0"/>
+              <a:t> - Brad Abrams</a:t>
+            </a:r>
+          </a:p>
+          <a:p>
+            <a:r>
+              <a:rPr lang="en-US" sz="1200" dirty="0">
+                <a:solidFill>
+                  <a:schemeClr val="bg1"/>
+                </a:solidFill>
+                <a:hlinkClick r:id="rId4"/>
+              </a:rPr>
+              <a:t>https://learn.microsoft.com/en-us/archive/blogs/brada/the-pinvoke-problem</a:t>
+            </a:r>
+            <a:endParaRPr lang="en-US" sz="1200" dirty="0">
+              <a:solidFill>
+                <a:schemeClr val="bg1"/>
+              </a:solidFill>
+            </a:endParaRPr>
+          </a:p>
+        </p:txBody>
+      </p:sp>
     </p:spTree>
     <p:extLst>
       <p:ext uri="{BB962C8B-B14F-4D97-AF65-F5344CB8AC3E}">
@@ -17924,6 +18066,51 @@
                       </p:childTnLst>
                     </p:cTn>
                   </p:par>
+                  <p:par>
+                    <p:cTn id="15" fill="hold">
+                      <p:stCondLst>
+                        <p:cond delay="indefinite"/>
+                      </p:stCondLst>
+                      <p:childTnLst>
+                        <p:par>
+                          <p:cTn id="16" fill="hold">
+                            <p:stCondLst>
+                              <p:cond delay="0"/>
+                            </p:stCondLst>
+                            <p:childTnLst>
+                              <p:par>
+                                <p:cTn id="17" presetID="1" presetClass="entr" presetSubtype="0" fill="hold" grpId="0" nodeType="clickEffect">
+                                  <p:stCondLst>
+                                    <p:cond delay="0"/>
+                                  </p:stCondLst>
+                                  <p:childTnLst>
+                                    <p:set>
+                                      <p:cBhvr>
+                                        <p:cTn id="18" dur="1" fill="hold">
+                                          <p:stCondLst>
+                                            <p:cond delay="0"/>
+                                          </p:stCondLst>
+                                        </p:cTn>
+                                        <p:tgtEl>
+                                          <p:spTgt spid="4"/>
+                                        </p:tgtEl>
+                                        <p:attrNameLst>
+                                          <p:attrName>style.visibility</p:attrName>
+                                        </p:attrNameLst>
+                                      </p:cBhvr>
+                                      <p:to>
+                                        <p:strVal val="visible"/>
+                                      </p:to>
+                                    </p:set>
+                                  </p:childTnLst>
+                                </p:cTn>
+                              </p:par>
+                            </p:childTnLst>
+                          </p:cTn>
+                        </p:par>
+                      </p:childTnLst>
+                    </p:cTn>
+                  </p:par>
                 </p:childTnLst>
               </p:cTn>
               <p:prevCondLst>
@@ -17947,6 +18134,7 @@
     </p:tnLst>
     <p:bldLst>
       <p:bldP spid="3" grpId="0" build="p"/>
+      <p:bldP spid="4" grpId="0" animBg="1"/>
     </p:bldLst>
   </p:timing>
 </p:sld>

</xml_diff>

<commit_message>
Added slides about calling conventions (issue #2)
</commit_message>
<xml_diff>
--- a/doc/Introduction to unsafe C#.pptx
+++ b/doc/Introduction to unsafe C#.pptx
@@ -30,18 +30,21 @@
     <p:sldId id="305" r:id="rId24"/>
     <p:sldId id="273" r:id="rId25"/>
     <p:sldId id="276" r:id="rId26"/>
-    <p:sldId id="290" r:id="rId27"/>
-    <p:sldId id="307" r:id="rId28"/>
-    <p:sldId id="309" r:id="rId29"/>
-    <p:sldId id="279" r:id="rId30"/>
-    <p:sldId id="310" r:id="rId31"/>
-    <p:sldId id="311" r:id="rId32"/>
-    <p:sldId id="312" r:id="rId33"/>
-    <p:sldId id="291" r:id="rId34"/>
-    <p:sldId id="292" r:id="rId35"/>
-    <p:sldId id="283" r:id="rId36"/>
-    <p:sldId id="284" r:id="rId37"/>
-    <p:sldId id="285" r:id="rId38"/>
+    <p:sldId id="313" r:id="rId27"/>
+    <p:sldId id="315" r:id="rId28"/>
+    <p:sldId id="314" r:id="rId29"/>
+    <p:sldId id="290" r:id="rId30"/>
+    <p:sldId id="307" r:id="rId31"/>
+    <p:sldId id="309" r:id="rId32"/>
+    <p:sldId id="279" r:id="rId33"/>
+    <p:sldId id="310" r:id="rId34"/>
+    <p:sldId id="311" r:id="rId35"/>
+    <p:sldId id="312" r:id="rId36"/>
+    <p:sldId id="291" r:id="rId37"/>
+    <p:sldId id="292" r:id="rId38"/>
+    <p:sldId id="283" r:id="rId39"/>
+    <p:sldId id="284" r:id="rId40"/>
+    <p:sldId id="285" r:id="rId41"/>
   </p:sldIdLst>
   <p:sldSz cx="12192000" cy="6858000"/>
   <p:notesSz cx="6858000" cy="9144000"/>
@@ -334,7 +337,7 @@
           <a:p>
             <a:fld id="{F9BC75CE-03FF-4667-898C-4C70B4392062}" type="datetimeFigureOut">
               <a:rPr lang="en-US" smtClean="0"/>
-              <a:t>10/12/2022</a:t>
+              <a:t>10/15/2022</a:t>
             </a:fld>
             <a:endParaRPr lang="en-US"/>
           </a:p>
@@ -609,7 +612,7 @@
           <a:p>
             <a:fld id="{F9BC75CE-03FF-4667-898C-4C70B4392062}" type="datetimeFigureOut">
               <a:rPr lang="en-US" smtClean="0"/>
-              <a:t>10/12/2022</a:t>
+              <a:t>10/15/2022</a:t>
             </a:fld>
             <a:endParaRPr lang="en-US"/>
           </a:p>
@@ -803,7 +806,7 @@
           <a:p>
             <a:fld id="{F9BC75CE-03FF-4667-898C-4C70B4392062}" type="datetimeFigureOut">
               <a:rPr lang="en-US" smtClean="0"/>
-              <a:t>10/12/2022</a:t>
+              <a:t>10/15/2022</a:t>
             </a:fld>
             <a:endParaRPr lang="en-US"/>
           </a:p>
@@ -1076,7 +1079,7 @@
           <a:p>
             <a:fld id="{F9BC75CE-03FF-4667-898C-4C70B4392062}" type="datetimeFigureOut">
               <a:rPr lang="en-US" smtClean="0"/>
-              <a:t>10/12/2022</a:t>
+              <a:t>10/15/2022</a:t>
             </a:fld>
             <a:endParaRPr lang="en-US"/>
           </a:p>
@@ -1417,7 +1420,7 @@
           <a:p>
             <a:fld id="{F9BC75CE-03FF-4667-898C-4C70B4392062}" type="datetimeFigureOut">
               <a:rPr lang="en-US" smtClean="0"/>
-              <a:t>10/12/2022</a:t>
+              <a:t>10/15/2022</a:t>
             </a:fld>
             <a:endParaRPr lang="en-US"/>
           </a:p>
@@ -2040,7 +2043,7 @@
           <a:p>
             <a:fld id="{F9BC75CE-03FF-4667-898C-4C70B4392062}" type="datetimeFigureOut">
               <a:rPr lang="en-US" smtClean="0"/>
-              <a:t>10/12/2022</a:t>
+              <a:t>10/15/2022</a:t>
             </a:fld>
             <a:endParaRPr lang="en-US"/>
           </a:p>
@@ -2900,7 +2903,7 @@
           <a:p>
             <a:fld id="{F9BC75CE-03FF-4667-898C-4C70B4392062}" type="datetimeFigureOut">
               <a:rPr lang="en-US" smtClean="0"/>
-              <a:t>10/12/2022</a:t>
+              <a:t>10/15/2022</a:t>
             </a:fld>
             <a:endParaRPr lang="en-US"/>
           </a:p>
@@ -3070,7 +3073,7 @@
           <a:p>
             <a:fld id="{F9BC75CE-03FF-4667-898C-4C70B4392062}" type="datetimeFigureOut">
               <a:rPr lang="en-US" smtClean="0"/>
-              <a:t>10/12/2022</a:t>
+              <a:t>10/15/2022</a:t>
             </a:fld>
             <a:endParaRPr lang="en-US"/>
           </a:p>
@@ -3250,7 +3253,7 @@
           <a:p>
             <a:fld id="{F9BC75CE-03FF-4667-898C-4C70B4392062}" type="datetimeFigureOut">
               <a:rPr lang="en-US" smtClean="0"/>
-              <a:t>10/12/2022</a:t>
+              <a:t>10/15/2022</a:t>
             </a:fld>
             <a:endParaRPr lang="en-US"/>
           </a:p>
@@ -3420,7 +3423,7 @@
           <a:p>
             <a:fld id="{F9BC75CE-03FF-4667-898C-4C70B4392062}" type="datetimeFigureOut">
               <a:rPr lang="en-US" smtClean="0"/>
-              <a:t>10/12/2022</a:t>
+              <a:t>10/15/2022</a:t>
             </a:fld>
             <a:endParaRPr lang="en-US"/>
           </a:p>
@@ -3667,7 +3670,7 @@
           <a:p>
             <a:fld id="{F9BC75CE-03FF-4667-898C-4C70B4392062}" type="datetimeFigureOut">
               <a:rPr lang="en-US" smtClean="0"/>
-              <a:t>10/12/2022</a:t>
+              <a:t>10/15/2022</a:t>
             </a:fld>
             <a:endParaRPr lang="en-US"/>
           </a:p>
@@ -3959,7 +3962,7 @@
           <a:p>
             <a:fld id="{F9BC75CE-03FF-4667-898C-4C70B4392062}" type="datetimeFigureOut">
               <a:rPr lang="en-US" smtClean="0"/>
-              <a:t>10/12/2022</a:t>
+              <a:t>10/15/2022</a:t>
             </a:fld>
             <a:endParaRPr lang="en-US"/>
           </a:p>
@@ -4403,7 +4406,7 @@
           <a:p>
             <a:fld id="{F9BC75CE-03FF-4667-898C-4C70B4392062}" type="datetimeFigureOut">
               <a:rPr lang="en-US" smtClean="0"/>
-              <a:t>10/12/2022</a:t>
+              <a:t>10/15/2022</a:t>
             </a:fld>
             <a:endParaRPr lang="en-US"/>
           </a:p>
@@ -4521,7 +4524,7 @@
           <a:p>
             <a:fld id="{F9BC75CE-03FF-4667-898C-4C70B4392062}" type="datetimeFigureOut">
               <a:rPr lang="en-US" smtClean="0"/>
-              <a:t>10/12/2022</a:t>
+              <a:t>10/15/2022</a:t>
             </a:fld>
             <a:endParaRPr lang="en-US"/>
           </a:p>
@@ -4616,7 +4619,7 @@
           <a:p>
             <a:fld id="{F9BC75CE-03FF-4667-898C-4C70B4392062}" type="datetimeFigureOut">
               <a:rPr lang="en-US" smtClean="0"/>
-              <a:t>10/12/2022</a:t>
+              <a:t>10/15/2022</a:t>
             </a:fld>
             <a:endParaRPr lang="en-US"/>
           </a:p>
@@ -4895,7 +4898,7 @@
           <a:p>
             <a:fld id="{F9BC75CE-03FF-4667-898C-4C70B4392062}" type="datetimeFigureOut">
               <a:rPr lang="en-US" smtClean="0"/>
-              <a:t>10/12/2022</a:t>
+              <a:t>10/15/2022</a:t>
             </a:fld>
             <a:endParaRPr lang="en-US"/>
           </a:p>
@@ -5170,7 +5173,7 @@
           <a:p>
             <a:fld id="{F9BC75CE-03FF-4667-898C-4C70B4392062}" type="datetimeFigureOut">
               <a:rPr lang="en-US" smtClean="0"/>
-              <a:t>10/12/2022</a:t>
+              <a:t>10/15/2022</a:t>
             </a:fld>
             <a:endParaRPr lang="en-US"/>
           </a:p>
@@ -5599,7 +5602,7 @@
           <a:p>
             <a:fld id="{F9BC75CE-03FF-4667-898C-4C70B4392062}" type="datetimeFigureOut">
               <a:rPr lang="en-US" smtClean="0"/>
-              <a:t>10/12/2022</a:t>
+              <a:t>10/15/2022</a:t>
             </a:fld>
             <a:endParaRPr lang="en-US"/>
           </a:p>
@@ -17634,14 +17637,14 @@
           <a:lstStyle/>
           <a:p>
             <a:r>
-              <a:rPr lang="en-US"/>
+              <a:rPr lang="en-US" dirty="0"/>
               <a:t>Platform Invoke (P/Invoke)</a:t>
             </a:r>
             <a:br>
-              <a:rPr lang="en-US"/>
+              <a:rPr lang="en-US" dirty="0"/>
             </a:br>
             <a:r>
-              <a:rPr lang="en-US"/>
+              <a:rPr lang="en-US" dirty="0"/>
               <a:t>Code generators</a:t>
             </a:r>
           </a:p>
@@ -18162,6 +18165,1290 @@
           <p:cNvPr id="2" name="Title 1">
             <a:extLst>
               <a:ext uri="{FF2B5EF4-FFF2-40B4-BE49-F238E27FC236}">
+                <a16:creationId xmlns:a16="http://schemas.microsoft.com/office/drawing/2014/main" id="{A690C17B-431B-47C6-8EFF-E87685350308}"/>
+              </a:ext>
+            </a:extLst>
+          </p:cNvPr>
+          <p:cNvSpPr>
+            <a:spLocks noGrp="1"/>
+          </p:cNvSpPr>
+          <p:nvPr>
+            <p:ph type="title"/>
+          </p:nvPr>
+        </p:nvSpPr>
+        <p:spPr/>
+        <p:txBody>
+          <a:bodyPr/>
+          <a:lstStyle/>
+          <a:p>
+            <a:r>
+              <a:rPr lang="en-US" dirty="0"/>
+              <a:t>Platform Invoke (P/Invoke)</a:t>
+            </a:r>
+            <a:br>
+              <a:rPr lang="en-US" dirty="0"/>
+            </a:br>
+            <a:r>
+              <a:rPr lang="en-US" dirty="0"/>
+              <a:t>Calling conventions I</a:t>
+            </a:r>
+          </a:p>
+        </p:txBody>
+      </p:sp>
+      <p:sp>
+        <p:nvSpPr>
+          <p:cNvPr id="3" name="Content Placeholder 2">
+            <a:extLst>
+              <a:ext uri="{FF2B5EF4-FFF2-40B4-BE49-F238E27FC236}">
+                <a16:creationId xmlns:a16="http://schemas.microsoft.com/office/drawing/2014/main" id="{06F7C0BF-2621-7C50-FF99-08F9D86B9C28}"/>
+              </a:ext>
+            </a:extLst>
+          </p:cNvPr>
+          <p:cNvSpPr>
+            <a:spLocks noGrp="1"/>
+          </p:cNvSpPr>
+          <p:nvPr>
+            <p:ph idx="1"/>
+          </p:nvPr>
+        </p:nvSpPr>
+        <p:spPr/>
+        <p:txBody>
+          <a:bodyPr/>
+          <a:lstStyle/>
+          <a:p>
+            <a:r>
+              <a:rPr lang="en-US" dirty="0"/>
+              <a:t>Argument passing to the caller</a:t>
+            </a:r>
+          </a:p>
+          <a:p>
+            <a:r>
+              <a:rPr lang="en-US" dirty="0"/>
+              <a:t>Return value passing to the callee</a:t>
+            </a:r>
+          </a:p>
+          <a:p>
+            <a:r>
+              <a:rPr lang="en-US" dirty="0"/>
+              <a:t>Stack cleanup</a:t>
+            </a:r>
+          </a:p>
+          <a:p>
+            <a:r>
+              <a:rPr lang="en-US" dirty="0"/>
+              <a:t>Can be specified as part of the DLL import</a:t>
+            </a:r>
+            <a:br>
+              <a:rPr lang="en-US" dirty="0"/>
+            </a:br>
+            <a:r>
+              <a:rPr lang="en-US" sz="1200" dirty="0">
+                <a:hlinkClick r:id="rId2"/>
+              </a:rPr>
+              <a:t>https://learn.microsoft.com/en-us/dotnet/api/system.runtime.interopservices.dllimportattribute.callingconvention</a:t>
+            </a:r>
+            <a:endParaRPr lang="en-US" sz="1200" dirty="0"/>
+          </a:p>
+        </p:txBody>
+      </p:sp>
+    </p:spTree>
+    <p:extLst>
+      <p:ext uri="{BB962C8B-B14F-4D97-AF65-F5344CB8AC3E}">
+        <p14:creationId xmlns:p14="http://schemas.microsoft.com/office/powerpoint/2010/main" val="2782735177"/>
+      </p:ext>
+    </p:extLst>
+  </p:cSld>
+  <p:clrMapOvr>
+    <a:masterClrMapping/>
+  </p:clrMapOvr>
+  <p:timing>
+    <p:tnLst>
+      <p:par>
+        <p:cTn id="1" dur="indefinite" restart="never" nodeType="tmRoot">
+          <p:childTnLst>
+            <p:seq concurrent="1" nextAc="seek">
+              <p:cTn id="2" dur="indefinite" nodeType="mainSeq">
+                <p:childTnLst>
+                  <p:par>
+                    <p:cTn id="3" fill="hold">
+                      <p:stCondLst>
+                        <p:cond delay="indefinite"/>
+                      </p:stCondLst>
+                      <p:childTnLst>
+                        <p:par>
+                          <p:cTn id="4" fill="hold">
+                            <p:stCondLst>
+                              <p:cond delay="0"/>
+                            </p:stCondLst>
+                            <p:childTnLst>
+                              <p:par>
+                                <p:cTn id="5" presetID="1" presetClass="entr" presetSubtype="0" fill="hold" grpId="0" nodeType="clickEffect">
+                                  <p:stCondLst>
+                                    <p:cond delay="0"/>
+                                  </p:stCondLst>
+                                  <p:childTnLst>
+                                    <p:set>
+                                      <p:cBhvr>
+                                        <p:cTn id="6" dur="1" fill="hold">
+                                          <p:stCondLst>
+                                            <p:cond delay="0"/>
+                                          </p:stCondLst>
+                                        </p:cTn>
+                                        <p:tgtEl>
+                                          <p:spTgt spid="3">
+                                            <p:txEl>
+                                              <p:pRg st="0" end="0"/>
+                                            </p:txEl>
+                                          </p:spTgt>
+                                        </p:tgtEl>
+                                        <p:attrNameLst>
+                                          <p:attrName>style.visibility</p:attrName>
+                                        </p:attrNameLst>
+                                      </p:cBhvr>
+                                      <p:to>
+                                        <p:strVal val="visible"/>
+                                      </p:to>
+                                    </p:set>
+                                  </p:childTnLst>
+                                </p:cTn>
+                              </p:par>
+                            </p:childTnLst>
+                          </p:cTn>
+                        </p:par>
+                      </p:childTnLst>
+                    </p:cTn>
+                  </p:par>
+                  <p:par>
+                    <p:cTn id="7" fill="hold">
+                      <p:stCondLst>
+                        <p:cond delay="indefinite"/>
+                      </p:stCondLst>
+                      <p:childTnLst>
+                        <p:par>
+                          <p:cTn id="8" fill="hold">
+                            <p:stCondLst>
+                              <p:cond delay="0"/>
+                            </p:stCondLst>
+                            <p:childTnLst>
+                              <p:par>
+                                <p:cTn id="9" presetID="1" presetClass="entr" presetSubtype="0" fill="hold" grpId="0" nodeType="clickEffect">
+                                  <p:stCondLst>
+                                    <p:cond delay="0"/>
+                                  </p:stCondLst>
+                                  <p:childTnLst>
+                                    <p:set>
+                                      <p:cBhvr>
+                                        <p:cTn id="10" dur="1" fill="hold">
+                                          <p:stCondLst>
+                                            <p:cond delay="0"/>
+                                          </p:stCondLst>
+                                        </p:cTn>
+                                        <p:tgtEl>
+                                          <p:spTgt spid="3">
+                                            <p:txEl>
+                                              <p:pRg st="1" end="1"/>
+                                            </p:txEl>
+                                          </p:spTgt>
+                                        </p:tgtEl>
+                                        <p:attrNameLst>
+                                          <p:attrName>style.visibility</p:attrName>
+                                        </p:attrNameLst>
+                                      </p:cBhvr>
+                                      <p:to>
+                                        <p:strVal val="visible"/>
+                                      </p:to>
+                                    </p:set>
+                                  </p:childTnLst>
+                                </p:cTn>
+                              </p:par>
+                            </p:childTnLst>
+                          </p:cTn>
+                        </p:par>
+                      </p:childTnLst>
+                    </p:cTn>
+                  </p:par>
+                  <p:par>
+                    <p:cTn id="11" fill="hold">
+                      <p:stCondLst>
+                        <p:cond delay="indefinite"/>
+                      </p:stCondLst>
+                      <p:childTnLst>
+                        <p:par>
+                          <p:cTn id="12" fill="hold">
+                            <p:stCondLst>
+                              <p:cond delay="0"/>
+                            </p:stCondLst>
+                            <p:childTnLst>
+                              <p:par>
+                                <p:cTn id="13" presetID="1" presetClass="entr" presetSubtype="0" fill="hold" grpId="0" nodeType="clickEffect">
+                                  <p:stCondLst>
+                                    <p:cond delay="0"/>
+                                  </p:stCondLst>
+                                  <p:childTnLst>
+                                    <p:set>
+                                      <p:cBhvr>
+                                        <p:cTn id="14" dur="1" fill="hold">
+                                          <p:stCondLst>
+                                            <p:cond delay="0"/>
+                                          </p:stCondLst>
+                                        </p:cTn>
+                                        <p:tgtEl>
+                                          <p:spTgt spid="3">
+                                            <p:txEl>
+                                              <p:pRg st="2" end="2"/>
+                                            </p:txEl>
+                                          </p:spTgt>
+                                        </p:tgtEl>
+                                        <p:attrNameLst>
+                                          <p:attrName>style.visibility</p:attrName>
+                                        </p:attrNameLst>
+                                      </p:cBhvr>
+                                      <p:to>
+                                        <p:strVal val="visible"/>
+                                      </p:to>
+                                    </p:set>
+                                  </p:childTnLst>
+                                </p:cTn>
+                              </p:par>
+                            </p:childTnLst>
+                          </p:cTn>
+                        </p:par>
+                      </p:childTnLst>
+                    </p:cTn>
+                  </p:par>
+                  <p:par>
+                    <p:cTn id="15" fill="hold">
+                      <p:stCondLst>
+                        <p:cond delay="indefinite"/>
+                      </p:stCondLst>
+                      <p:childTnLst>
+                        <p:par>
+                          <p:cTn id="16" fill="hold">
+                            <p:stCondLst>
+                              <p:cond delay="0"/>
+                            </p:stCondLst>
+                            <p:childTnLst>
+                              <p:par>
+                                <p:cTn id="17" presetID="1" presetClass="entr" presetSubtype="0" fill="hold" grpId="0" nodeType="clickEffect">
+                                  <p:stCondLst>
+                                    <p:cond delay="0"/>
+                                  </p:stCondLst>
+                                  <p:childTnLst>
+                                    <p:set>
+                                      <p:cBhvr>
+                                        <p:cTn id="18" dur="1" fill="hold">
+                                          <p:stCondLst>
+                                            <p:cond delay="0"/>
+                                          </p:stCondLst>
+                                        </p:cTn>
+                                        <p:tgtEl>
+                                          <p:spTgt spid="3">
+                                            <p:txEl>
+                                              <p:pRg st="3" end="3"/>
+                                            </p:txEl>
+                                          </p:spTgt>
+                                        </p:tgtEl>
+                                        <p:attrNameLst>
+                                          <p:attrName>style.visibility</p:attrName>
+                                        </p:attrNameLst>
+                                      </p:cBhvr>
+                                      <p:to>
+                                        <p:strVal val="visible"/>
+                                      </p:to>
+                                    </p:set>
+                                  </p:childTnLst>
+                                </p:cTn>
+                              </p:par>
+                            </p:childTnLst>
+                          </p:cTn>
+                        </p:par>
+                      </p:childTnLst>
+                    </p:cTn>
+                  </p:par>
+                </p:childTnLst>
+              </p:cTn>
+              <p:prevCondLst>
+                <p:cond evt="onPrev" delay="0">
+                  <p:tgtEl>
+                    <p:sldTgt/>
+                  </p:tgtEl>
+                </p:cond>
+              </p:prevCondLst>
+              <p:nextCondLst>
+                <p:cond evt="onNext" delay="0">
+                  <p:tgtEl>
+                    <p:sldTgt/>
+                  </p:tgtEl>
+                </p:cond>
+              </p:nextCondLst>
+            </p:seq>
+          </p:childTnLst>
+        </p:cTn>
+      </p:par>
+    </p:tnLst>
+    <p:bldLst>
+      <p:bldP spid="3" grpId="0" build="p"/>
+    </p:bldLst>
+  </p:timing>
+</p:sld>
+</file>
+
+<file path=ppt/slides/slide27.xml><?xml version="1.0" encoding="utf-8"?>
+<p:sld xmlns:a="http://schemas.openxmlformats.org/drawingml/2006/main" xmlns:r="http://schemas.openxmlformats.org/officeDocument/2006/relationships" xmlns:p="http://schemas.openxmlformats.org/presentationml/2006/main">
+  <p:cSld>
+    <p:spTree>
+      <p:nvGrpSpPr>
+        <p:cNvPr id="1" name=""/>
+        <p:cNvGrpSpPr/>
+        <p:nvPr/>
+      </p:nvGrpSpPr>
+      <p:grpSpPr>
+        <a:xfrm>
+          <a:off x="0" y="0"/>
+          <a:ext cx="0" cy="0"/>
+          <a:chOff x="0" y="0"/>
+          <a:chExt cx="0" cy="0"/>
+        </a:xfrm>
+      </p:grpSpPr>
+      <p:sp>
+        <p:nvSpPr>
+          <p:cNvPr id="2" name="Title 1">
+            <a:extLst>
+              <a:ext uri="{FF2B5EF4-FFF2-40B4-BE49-F238E27FC236}">
+                <a16:creationId xmlns:a16="http://schemas.microsoft.com/office/drawing/2014/main" id="{A690C17B-431B-47C6-8EFF-E87685350308}"/>
+              </a:ext>
+            </a:extLst>
+          </p:cNvPr>
+          <p:cNvSpPr>
+            <a:spLocks noGrp="1"/>
+          </p:cNvSpPr>
+          <p:nvPr>
+            <p:ph type="title"/>
+          </p:nvPr>
+        </p:nvSpPr>
+        <p:spPr/>
+        <p:txBody>
+          <a:bodyPr/>
+          <a:lstStyle/>
+          <a:p>
+            <a:r>
+              <a:rPr lang="en-US" dirty="0"/>
+              <a:t>Platform Invoke (P/Invoke)</a:t>
+            </a:r>
+            <a:br>
+              <a:rPr lang="en-US" dirty="0"/>
+            </a:br>
+            <a:r>
+              <a:rPr lang="en-US" dirty="0"/>
+              <a:t>Calling conventions II</a:t>
+            </a:r>
+          </a:p>
+        </p:txBody>
+      </p:sp>
+      <p:sp>
+        <p:nvSpPr>
+          <p:cNvPr id="3" name="Content Placeholder 2">
+            <a:extLst>
+              <a:ext uri="{FF2B5EF4-FFF2-40B4-BE49-F238E27FC236}">
+                <a16:creationId xmlns:a16="http://schemas.microsoft.com/office/drawing/2014/main" id="{06F7C0BF-2621-7C50-FF99-08F9D86B9C28}"/>
+              </a:ext>
+            </a:extLst>
+          </p:cNvPr>
+          <p:cNvSpPr>
+            <a:spLocks noGrp="1"/>
+          </p:cNvSpPr>
+          <p:nvPr>
+            <p:ph idx="1"/>
+          </p:nvPr>
+        </p:nvSpPr>
+        <p:spPr/>
+        <p:txBody>
+          <a:bodyPr/>
+          <a:lstStyle/>
+          <a:p>
+            <a:r>
+              <a:rPr lang="en-US" dirty="0"/>
+              <a:t>Windows, x86</a:t>
+            </a:r>
+            <a:br>
+              <a:rPr lang="en-US" dirty="0"/>
+            </a:br>
+            <a:r>
+              <a:rPr lang="en-US" sz="1200" dirty="0">
+                <a:hlinkClick r:id="rId2"/>
+              </a:rPr>
+              <a:t>https://learn.microsoft.com/en-us/cpp/cpp/argument-passing-and-naming-conventions</a:t>
+            </a:r>
+            <a:endParaRPr lang="en-US" sz="1200" dirty="0"/>
+          </a:p>
+          <a:p>
+            <a:pPr lvl="1"/>
+            <a:r>
+              <a:rPr lang="en-US" dirty="0"/>
+              <a:t>Supported by .NET: </a:t>
+            </a:r>
+            <a:r>
+              <a:rPr lang="en-US" dirty="0">
+                <a:latin typeface="Consolas" panose="020B0609020204030204" pitchFamily="49" charset="0"/>
+              </a:rPr>
+              <a:t>__</a:t>
+            </a:r>
+            <a:r>
+              <a:rPr lang="en-US" dirty="0" err="1">
+                <a:latin typeface="Consolas" panose="020B0609020204030204" pitchFamily="49" charset="0"/>
+              </a:rPr>
+              <a:t>cdecl</a:t>
+            </a:r>
+            <a:r>
+              <a:rPr lang="en-US" dirty="0"/>
+              <a:t>, </a:t>
+            </a:r>
+            <a:r>
+              <a:rPr lang="en-US" dirty="0">
+                <a:latin typeface="Consolas" panose="020B0609020204030204" pitchFamily="49" charset="0"/>
+              </a:rPr>
+              <a:t>__</a:t>
+            </a:r>
+            <a:r>
+              <a:rPr lang="en-US" dirty="0" err="1">
+                <a:latin typeface="Consolas" panose="020B0609020204030204" pitchFamily="49" charset="0"/>
+              </a:rPr>
+              <a:t>stdcall</a:t>
+            </a:r>
+            <a:r>
+              <a:rPr lang="en-US" dirty="0"/>
+              <a:t>, </a:t>
+            </a:r>
+            <a:r>
+              <a:rPr lang="en-US" dirty="0">
+                <a:latin typeface="Consolas" panose="020B0609020204030204" pitchFamily="49" charset="0"/>
+              </a:rPr>
+              <a:t>__</a:t>
+            </a:r>
+            <a:r>
+              <a:rPr lang="en-US" dirty="0" err="1">
+                <a:latin typeface="Consolas" panose="020B0609020204030204" pitchFamily="49" charset="0"/>
+              </a:rPr>
+              <a:t>thiscall</a:t>
+            </a:r>
+            <a:endParaRPr lang="en-US" dirty="0">
+              <a:latin typeface="Consolas" panose="020B0609020204030204" pitchFamily="49" charset="0"/>
+            </a:endParaRPr>
+          </a:p>
+          <a:p>
+            <a:pPr lvl="1"/>
+            <a:r>
+              <a:rPr lang="en-US" dirty="0"/>
+              <a:t>Unsupported by .NET: </a:t>
+            </a:r>
+            <a:r>
+              <a:rPr lang="en-US" dirty="0">
+                <a:latin typeface="Consolas" panose="020B0609020204030204" pitchFamily="49" charset="0"/>
+              </a:rPr>
+              <a:t>__</a:t>
+            </a:r>
+            <a:r>
+              <a:rPr lang="en-US" dirty="0" err="1">
+                <a:latin typeface="Consolas" panose="020B0609020204030204" pitchFamily="49" charset="0"/>
+              </a:rPr>
+              <a:t>fastcall</a:t>
+            </a:r>
+            <a:r>
+              <a:rPr lang="en-US" dirty="0"/>
+              <a:t>, </a:t>
+            </a:r>
+            <a:r>
+              <a:rPr lang="en-US" dirty="0">
+                <a:latin typeface="Consolas" panose="020B0609020204030204" pitchFamily="49" charset="0"/>
+              </a:rPr>
+              <a:t>__</a:t>
+            </a:r>
+            <a:r>
+              <a:rPr lang="en-US" dirty="0" err="1">
+                <a:latin typeface="Consolas" panose="020B0609020204030204" pitchFamily="49" charset="0"/>
+              </a:rPr>
+              <a:t>vectorcall</a:t>
+            </a:r>
+            <a:endParaRPr lang="en-US" dirty="0">
+              <a:latin typeface="Consolas" panose="020B0609020204030204" pitchFamily="49" charset="0"/>
+            </a:endParaRPr>
+          </a:p>
+          <a:p>
+            <a:r>
+              <a:rPr lang="en-US" dirty="0"/>
+              <a:t>Windows, x64</a:t>
+            </a:r>
+          </a:p>
+          <a:p>
+            <a:pPr lvl="1"/>
+            <a:r>
+              <a:rPr lang="en-US" dirty="0"/>
+              <a:t>Standard calling convention</a:t>
+            </a:r>
+            <a:br>
+              <a:rPr lang="en-US" dirty="0"/>
+            </a:br>
+            <a:r>
+              <a:rPr lang="en-US" sz="1200" dirty="0">
+                <a:hlinkClick r:id="rId3"/>
+              </a:rPr>
+              <a:t>https://learn.microsoft.com/en-us/cpp/build/x64-calling-convention</a:t>
+            </a:r>
+            <a:endParaRPr lang="en-US" sz="1200" dirty="0"/>
+          </a:p>
+          <a:p>
+            <a:pPr lvl="1"/>
+            <a:r>
+              <a:rPr lang="en-US" dirty="0">
+                <a:latin typeface="Consolas" panose="020B0609020204030204" pitchFamily="49" charset="0"/>
+              </a:rPr>
+              <a:t>__</a:t>
+            </a:r>
+            <a:r>
+              <a:rPr lang="en-US" dirty="0" err="1">
+                <a:latin typeface="Consolas" panose="020B0609020204030204" pitchFamily="49" charset="0"/>
+              </a:rPr>
+              <a:t>vectorcall</a:t>
+            </a:r>
+            <a:r>
+              <a:rPr lang="en-US" dirty="0"/>
+              <a:t> convention as an extension of the standard convention (unsupported by .NET)</a:t>
+            </a:r>
+            <a:br>
+              <a:rPr lang="en-US" dirty="0"/>
+            </a:br>
+            <a:r>
+              <a:rPr lang="en-US" sz="1200" dirty="0">
+                <a:hlinkClick r:id="rId4"/>
+              </a:rPr>
+              <a:t>https://learn.microsoft.com/en-us/cpp/cpp/vectorcall</a:t>
+            </a:r>
+            <a:endParaRPr lang="en-US" sz="1200" dirty="0"/>
+          </a:p>
+          <a:p>
+            <a:pPr lvl="1"/>
+            <a:endParaRPr lang="en-US" dirty="0"/>
+          </a:p>
+        </p:txBody>
+      </p:sp>
+    </p:spTree>
+    <p:extLst>
+      <p:ext uri="{BB962C8B-B14F-4D97-AF65-F5344CB8AC3E}">
+        <p14:creationId xmlns:p14="http://schemas.microsoft.com/office/powerpoint/2010/main" val="3652254688"/>
+      </p:ext>
+    </p:extLst>
+  </p:cSld>
+  <p:clrMapOvr>
+    <a:masterClrMapping/>
+  </p:clrMapOvr>
+  <p:timing>
+    <p:tnLst>
+      <p:par>
+        <p:cTn id="1" dur="indefinite" restart="never" nodeType="tmRoot">
+          <p:childTnLst>
+            <p:seq concurrent="1" nextAc="seek">
+              <p:cTn id="2" dur="indefinite" nodeType="mainSeq">
+                <p:childTnLst>
+                  <p:par>
+                    <p:cTn id="3" fill="hold">
+                      <p:stCondLst>
+                        <p:cond delay="indefinite"/>
+                      </p:stCondLst>
+                      <p:childTnLst>
+                        <p:par>
+                          <p:cTn id="4" fill="hold">
+                            <p:stCondLst>
+                              <p:cond delay="0"/>
+                            </p:stCondLst>
+                            <p:childTnLst>
+                              <p:par>
+                                <p:cTn id="5" presetID="1" presetClass="entr" presetSubtype="0" fill="hold" grpId="0" nodeType="clickEffect">
+                                  <p:stCondLst>
+                                    <p:cond delay="0"/>
+                                  </p:stCondLst>
+                                  <p:childTnLst>
+                                    <p:set>
+                                      <p:cBhvr>
+                                        <p:cTn id="6" dur="1" fill="hold">
+                                          <p:stCondLst>
+                                            <p:cond delay="0"/>
+                                          </p:stCondLst>
+                                        </p:cTn>
+                                        <p:tgtEl>
+                                          <p:spTgt spid="3">
+                                            <p:txEl>
+                                              <p:pRg st="0" end="0"/>
+                                            </p:txEl>
+                                          </p:spTgt>
+                                        </p:tgtEl>
+                                        <p:attrNameLst>
+                                          <p:attrName>style.visibility</p:attrName>
+                                        </p:attrNameLst>
+                                      </p:cBhvr>
+                                      <p:to>
+                                        <p:strVal val="visible"/>
+                                      </p:to>
+                                    </p:set>
+                                  </p:childTnLst>
+                                </p:cTn>
+                              </p:par>
+                              <p:par>
+                                <p:cTn id="7" presetID="1" presetClass="entr" presetSubtype="0" fill="hold" grpId="0" nodeType="withEffect">
+                                  <p:stCondLst>
+                                    <p:cond delay="0"/>
+                                  </p:stCondLst>
+                                  <p:childTnLst>
+                                    <p:set>
+                                      <p:cBhvr>
+                                        <p:cTn id="8" dur="1" fill="hold">
+                                          <p:stCondLst>
+                                            <p:cond delay="0"/>
+                                          </p:stCondLst>
+                                        </p:cTn>
+                                        <p:tgtEl>
+                                          <p:spTgt spid="3">
+                                            <p:txEl>
+                                              <p:pRg st="1" end="1"/>
+                                            </p:txEl>
+                                          </p:spTgt>
+                                        </p:tgtEl>
+                                        <p:attrNameLst>
+                                          <p:attrName>style.visibility</p:attrName>
+                                        </p:attrNameLst>
+                                      </p:cBhvr>
+                                      <p:to>
+                                        <p:strVal val="visible"/>
+                                      </p:to>
+                                    </p:set>
+                                  </p:childTnLst>
+                                </p:cTn>
+                              </p:par>
+                              <p:par>
+                                <p:cTn id="9" presetID="1" presetClass="entr" presetSubtype="0" fill="hold" grpId="0" nodeType="withEffect">
+                                  <p:stCondLst>
+                                    <p:cond delay="0"/>
+                                  </p:stCondLst>
+                                  <p:childTnLst>
+                                    <p:set>
+                                      <p:cBhvr>
+                                        <p:cTn id="10" dur="1" fill="hold">
+                                          <p:stCondLst>
+                                            <p:cond delay="0"/>
+                                          </p:stCondLst>
+                                        </p:cTn>
+                                        <p:tgtEl>
+                                          <p:spTgt spid="3">
+                                            <p:txEl>
+                                              <p:pRg st="2" end="2"/>
+                                            </p:txEl>
+                                          </p:spTgt>
+                                        </p:tgtEl>
+                                        <p:attrNameLst>
+                                          <p:attrName>style.visibility</p:attrName>
+                                        </p:attrNameLst>
+                                      </p:cBhvr>
+                                      <p:to>
+                                        <p:strVal val="visible"/>
+                                      </p:to>
+                                    </p:set>
+                                  </p:childTnLst>
+                                </p:cTn>
+                              </p:par>
+                            </p:childTnLst>
+                          </p:cTn>
+                        </p:par>
+                      </p:childTnLst>
+                    </p:cTn>
+                  </p:par>
+                  <p:par>
+                    <p:cTn id="11" fill="hold">
+                      <p:stCondLst>
+                        <p:cond delay="indefinite"/>
+                      </p:stCondLst>
+                      <p:childTnLst>
+                        <p:par>
+                          <p:cTn id="12" fill="hold">
+                            <p:stCondLst>
+                              <p:cond delay="0"/>
+                            </p:stCondLst>
+                            <p:childTnLst>
+                              <p:par>
+                                <p:cTn id="13" presetID="1" presetClass="entr" presetSubtype="0" fill="hold" grpId="0" nodeType="clickEffect">
+                                  <p:stCondLst>
+                                    <p:cond delay="0"/>
+                                  </p:stCondLst>
+                                  <p:childTnLst>
+                                    <p:set>
+                                      <p:cBhvr>
+                                        <p:cTn id="14" dur="1" fill="hold">
+                                          <p:stCondLst>
+                                            <p:cond delay="0"/>
+                                          </p:stCondLst>
+                                        </p:cTn>
+                                        <p:tgtEl>
+                                          <p:spTgt spid="3">
+                                            <p:txEl>
+                                              <p:pRg st="3" end="3"/>
+                                            </p:txEl>
+                                          </p:spTgt>
+                                        </p:tgtEl>
+                                        <p:attrNameLst>
+                                          <p:attrName>style.visibility</p:attrName>
+                                        </p:attrNameLst>
+                                      </p:cBhvr>
+                                      <p:to>
+                                        <p:strVal val="visible"/>
+                                      </p:to>
+                                    </p:set>
+                                  </p:childTnLst>
+                                </p:cTn>
+                              </p:par>
+                              <p:par>
+                                <p:cTn id="15" presetID="1" presetClass="entr" presetSubtype="0" fill="hold" grpId="0" nodeType="withEffect">
+                                  <p:stCondLst>
+                                    <p:cond delay="0"/>
+                                  </p:stCondLst>
+                                  <p:childTnLst>
+                                    <p:set>
+                                      <p:cBhvr>
+                                        <p:cTn id="16" dur="1" fill="hold">
+                                          <p:stCondLst>
+                                            <p:cond delay="0"/>
+                                          </p:stCondLst>
+                                        </p:cTn>
+                                        <p:tgtEl>
+                                          <p:spTgt spid="3">
+                                            <p:txEl>
+                                              <p:pRg st="4" end="4"/>
+                                            </p:txEl>
+                                          </p:spTgt>
+                                        </p:tgtEl>
+                                        <p:attrNameLst>
+                                          <p:attrName>style.visibility</p:attrName>
+                                        </p:attrNameLst>
+                                      </p:cBhvr>
+                                      <p:to>
+                                        <p:strVal val="visible"/>
+                                      </p:to>
+                                    </p:set>
+                                  </p:childTnLst>
+                                </p:cTn>
+                              </p:par>
+                              <p:par>
+                                <p:cTn id="17" presetID="1" presetClass="entr" presetSubtype="0" fill="hold" grpId="0" nodeType="withEffect">
+                                  <p:stCondLst>
+                                    <p:cond delay="0"/>
+                                  </p:stCondLst>
+                                  <p:childTnLst>
+                                    <p:set>
+                                      <p:cBhvr>
+                                        <p:cTn id="18" dur="1" fill="hold">
+                                          <p:stCondLst>
+                                            <p:cond delay="0"/>
+                                          </p:stCondLst>
+                                        </p:cTn>
+                                        <p:tgtEl>
+                                          <p:spTgt spid="3">
+                                            <p:txEl>
+                                              <p:pRg st="5" end="5"/>
+                                            </p:txEl>
+                                          </p:spTgt>
+                                        </p:tgtEl>
+                                        <p:attrNameLst>
+                                          <p:attrName>style.visibility</p:attrName>
+                                        </p:attrNameLst>
+                                      </p:cBhvr>
+                                      <p:to>
+                                        <p:strVal val="visible"/>
+                                      </p:to>
+                                    </p:set>
+                                  </p:childTnLst>
+                                </p:cTn>
+                              </p:par>
+                            </p:childTnLst>
+                          </p:cTn>
+                        </p:par>
+                      </p:childTnLst>
+                    </p:cTn>
+                  </p:par>
+                </p:childTnLst>
+              </p:cTn>
+              <p:prevCondLst>
+                <p:cond evt="onPrev" delay="0">
+                  <p:tgtEl>
+                    <p:sldTgt/>
+                  </p:tgtEl>
+                </p:cond>
+              </p:prevCondLst>
+              <p:nextCondLst>
+                <p:cond evt="onNext" delay="0">
+                  <p:tgtEl>
+                    <p:sldTgt/>
+                  </p:tgtEl>
+                </p:cond>
+              </p:nextCondLst>
+            </p:seq>
+          </p:childTnLst>
+        </p:cTn>
+      </p:par>
+    </p:tnLst>
+    <p:bldLst>
+      <p:bldP spid="3" grpId="0" build="p"/>
+    </p:bldLst>
+  </p:timing>
+</p:sld>
+</file>
+
+<file path=ppt/slides/slide28.xml><?xml version="1.0" encoding="utf-8"?>
+<p:sld xmlns:a="http://schemas.openxmlformats.org/drawingml/2006/main" xmlns:r="http://schemas.openxmlformats.org/officeDocument/2006/relationships" xmlns:p="http://schemas.openxmlformats.org/presentationml/2006/main">
+  <p:cSld>
+    <p:spTree>
+      <p:nvGrpSpPr>
+        <p:cNvPr id="1" name=""/>
+        <p:cNvGrpSpPr/>
+        <p:nvPr/>
+      </p:nvGrpSpPr>
+      <p:grpSpPr>
+        <a:xfrm>
+          <a:off x="0" y="0"/>
+          <a:ext cx="0" cy="0"/>
+          <a:chOff x="0" y="0"/>
+          <a:chExt cx="0" cy="0"/>
+        </a:xfrm>
+      </p:grpSpPr>
+      <p:sp>
+        <p:nvSpPr>
+          <p:cNvPr id="2" name="Title 1">
+            <a:extLst>
+              <a:ext uri="{FF2B5EF4-FFF2-40B4-BE49-F238E27FC236}">
+                <a16:creationId xmlns:a16="http://schemas.microsoft.com/office/drawing/2014/main" id="{A690C17B-431B-47C6-8EFF-E87685350308}"/>
+              </a:ext>
+            </a:extLst>
+          </p:cNvPr>
+          <p:cNvSpPr>
+            <a:spLocks noGrp="1"/>
+          </p:cNvSpPr>
+          <p:nvPr>
+            <p:ph type="title"/>
+          </p:nvPr>
+        </p:nvSpPr>
+        <p:spPr/>
+        <p:txBody>
+          <a:bodyPr/>
+          <a:lstStyle/>
+          <a:p>
+            <a:r>
+              <a:rPr lang="en-US" dirty="0"/>
+              <a:t>Platform Invoke (P/Invoke)</a:t>
+            </a:r>
+            <a:br>
+              <a:rPr lang="en-US" dirty="0"/>
+            </a:br>
+            <a:r>
+              <a:rPr lang="en-US" dirty="0"/>
+              <a:t>Calling conventions III</a:t>
+            </a:r>
+          </a:p>
+        </p:txBody>
+      </p:sp>
+      <p:sp>
+        <p:nvSpPr>
+          <p:cNvPr id="3" name="Content Placeholder 2">
+            <a:extLst>
+              <a:ext uri="{FF2B5EF4-FFF2-40B4-BE49-F238E27FC236}">
+                <a16:creationId xmlns:a16="http://schemas.microsoft.com/office/drawing/2014/main" id="{06F7C0BF-2621-7C50-FF99-08F9D86B9C28}"/>
+              </a:ext>
+            </a:extLst>
+          </p:cNvPr>
+          <p:cNvSpPr>
+            <a:spLocks noGrp="1"/>
+          </p:cNvSpPr>
+          <p:nvPr>
+            <p:ph idx="1"/>
+          </p:nvPr>
+        </p:nvSpPr>
+        <p:spPr/>
+        <p:txBody>
+          <a:bodyPr/>
+          <a:lstStyle/>
+          <a:p>
+            <a:r>
+              <a:rPr lang="en-US" dirty="0"/>
+              <a:t>macOS, ARM64</a:t>
+            </a:r>
+          </a:p>
+          <a:p>
+            <a:pPr lvl="1"/>
+            <a:r>
+              <a:rPr lang="en-US" dirty="0"/>
+              <a:t>Single calling convention</a:t>
+            </a:r>
+            <a:br>
+              <a:rPr lang="en-US" dirty="0"/>
+            </a:br>
+            <a:r>
+              <a:rPr lang="en-US" sz="1200" dirty="0">
+                <a:hlinkClick r:id="rId2"/>
+              </a:rPr>
+              <a:t>https://developer.apple.com/documentation/xcode/writing-arm64-code-for-apple-platforms</a:t>
+            </a:r>
+            <a:endParaRPr lang="en-US" sz="1200" dirty="0"/>
+          </a:p>
+          <a:p>
+            <a:pPr lvl="1"/>
+            <a:r>
+              <a:rPr lang="en-US" dirty="0"/>
+              <a:t>Modified version of the official AArch64 Procedure Call Standard (PCS)</a:t>
+            </a:r>
+            <a:br>
+              <a:rPr lang="en-US" sz="1200" dirty="0"/>
+            </a:br>
+            <a:r>
+              <a:rPr lang="en-US" sz="1200" dirty="0">
+                <a:hlinkClick r:id="rId3"/>
+              </a:rPr>
+              <a:t>https://developer.arm.com/documentation/102374/0100/Procedure-Call-Standard</a:t>
+            </a:r>
+            <a:endParaRPr lang="en-US" sz="1200" dirty="0"/>
+          </a:p>
+          <a:p>
+            <a:r>
+              <a:rPr lang="en-US" dirty="0"/>
+              <a:t>Linux, x64</a:t>
+            </a:r>
+          </a:p>
+          <a:p>
+            <a:pPr lvl="1"/>
+            <a:r>
+              <a:rPr lang="en-US" dirty="0"/>
+              <a:t>Single calling convention</a:t>
+            </a:r>
+          </a:p>
+          <a:p>
+            <a:pPr lvl="1"/>
+            <a:r>
+              <a:rPr lang="en-US" dirty="0"/>
+              <a:t>Implements the </a:t>
+            </a:r>
+            <a:r>
+              <a:rPr lang="en-US" i="1" dirty="0"/>
+              <a:t>AMD64 Architecture Processor Supplement</a:t>
+            </a:r>
+            <a:r>
+              <a:rPr lang="en-US" dirty="0"/>
+              <a:t> of the </a:t>
+            </a:r>
+            <a:r>
+              <a:rPr lang="en-US" i="1" dirty="0"/>
+              <a:t>System V Application Binary Interface</a:t>
+            </a:r>
+            <a:r>
+              <a:rPr lang="en-US" dirty="0"/>
+              <a:t> specification</a:t>
+            </a:r>
+            <a:br>
+              <a:rPr lang="en-US" dirty="0"/>
+            </a:br>
+            <a:r>
+              <a:rPr lang="en-US" sz="1200" dirty="0">
+                <a:hlinkClick r:id="rId4"/>
+              </a:rPr>
+              <a:t>https://refspecs.linuxbase.org/elf/x86_64-abi-0.99.pdf</a:t>
+            </a:r>
+            <a:endParaRPr lang="en-US" sz="1200" dirty="0"/>
+          </a:p>
+        </p:txBody>
+      </p:sp>
+    </p:spTree>
+    <p:extLst>
+      <p:ext uri="{BB962C8B-B14F-4D97-AF65-F5344CB8AC3E}">
+        <p14:creationId xmlns:p14="http://schemas.microsoft.com/office/powerpoint/2010/main" val="796157535"/>
+      </p:ext>
+    </p:extLst>
+  </p:cSld>
+  <p:clrMapOvr>
+    <a:masterClrMapping/>
+  </p:clrMapOvr>
+  <p:timing>
+    <p:tnLst>
+      <p:par>
+        <p:cTn id="1" dur="indefinite" restart="never" nodeType="tmRoot">
+          <p:childTnLst>
+            <p:seq concurrent="1" nextAc="seek">
+              <p:cTn id="2" dur="indefinite" nodeType="mainSeq">
+                <p:childTnLst>
+                  <p:par>
+                    <p:cTn id="3" fill="hold">
+                      <p:stCondLst>
+                        <p:cond delay="indefinite"/>
+                      </p:stCondLst>
+                      <p:childTnLst>
+                        <p:par>
+                          <p:cTn id="4" fill="hold">
+                            <p:stCondLst>
+                              <p:cond delay="0"/>
+                            </p:stCondLst>
+                            <p:childTnLst>
+                              <p:par>
+                                <p:cTn id="5" presetID="1" presetClass="entr" presetSubtype="0" fill="hold" grpId="0" nodeType="clickEffect">
+                                  <p:stCondLst>
+                                    <p:cond delay="0"/>
+                                  </p:stCondLst>
+                                  <p:childTnLst>
+                                    <p:set>
+                                      <p:cBhvr>
+                                        <p:cTn id="6" dur="1" fill="hold">
+                                          <p:stCondLst>
+                                            <p:cond delay="0"/>
+                                          </p:stCondLst>
+                                        </p:cTn>
+                                        <p:tgtEl>
+                                          <p:spTgt spid="3">
+                                            <p:txEl>
+                                              <p:pRg st="0" end="0"/>
+                                            </p:txEl>
+                                          </p:spTgt>
+                                        </p:tgtEl>
+                                        <p:attrNameLst>
+                                          <p:attrName>style.visibility</p:attrName>
+                                        </p:attrNameLst>
+                                      </p:cBhvr>
+                                      <p:to>
+                                        <p:strVal val="visible"/>
+                                      </p:to>
+                                    </p:set>
+                                  </p:childTnLst>
+                                </p:cTn>
+                              </p:par>
+                              <p:par>
+                                <p:cTn id="7" presetID="1" presetClass="entr" presetSubtype="0" fill="hold" grpId="0" nodeType="withEffect">
+                                  <p:stCondLst>
+                                    <p:cond delay="0"/>
+                                  </p:stCondLst>
+                                  <p:childTnLst>
+                                    <p:set>
+                                      <p:cBhvr>
+                                        <p:cTn id="8" dur="1" fill="hold">
+                                          <p:stCondLst>
+                                            <p:cond delay="0"/>
+                                          </p:stCondLst>
+                                        </p:cTn>
+                                        <p:tgtEl>
+                                          <p:spTgt spid="3">
+                                            <p:txEl>
+                                              <p:pRg st="1" end="1"/>
+                                            </p:txEl>
+                                          </p:spTgt>
+                                        </p:tgtEl>
+                                        <p:attrNameLst>
+                                          <p:attrName>style.visibility</p:attrName>
+                                        </p:attrNameLst>
+                                      </p:cBhvr>
+                                      <p:to>
+                                        <p:strVal val="visible"/>
+                                      </p:to>
+                                    </p:set>
+                                  </p:childTnLst>
+                                </p:cTn>
+                              </p:par>
+                              <p:par>
+                                <p:cTn id="9" presetID="1" presetClass="entr" presetSubtype="0" fill="hold" grpId="0" nodeType="withEffect">
+                                  <p:stCondLst>
+                                    <p:cond delay="0"/>
+                                  </p:stCondLst>
+                                  <p:childTnLst>
+                                    <p:set>
+                                      <p:cBhvr>
+                                        <p:cTn id="10" dur="1" fill="hold">
+                                          <p:stCondLst>
+                                            <p:cond delay="0"/>
+                                          </p:stCondLst>
+                                        </p:cTn>
+                                        <p:tgtEl>
+                                          <p:spTgt spid="3">
+                                            <p:txEl>
+                                              <p:pRg st="2" end="2"/>
+                                            </p:txEl>
+                                          </p:spTgt>
+                                        </p:tgtEl>
+                                        <p:attrNameLst>
+                                          <p:attrName>style.visibility</p:attrName>
+                                        </p:attrNameLst>
+                                      </p:cBhvr>
+                                      <p:to>
+                                        <p:strVal val="visible"/>
+                                      </p:to>
+                                    </p:set>
+                                  </p:childTnLst>
+                                </p:cTn>
+                              </p:par>
+                            </p:childTnLst>
+                          </p:cTn>
+                        </p:par>
+                      </p:childTnLst>
+                    </p:cTn>
+                  </p:par>
+                  <p:par>
+                    <p:cTn id="11" fill="hold">
+                      <p:stCondLst>
+                        <p:cond delay="indefinite"/>
+                      </p:stCondLst>
+                      <p:childTnLst>
+                        <p:par>
+                          <p:cTn id="12" fill="hold">
+                            <p:stCondLst>
+                              <p:cond delay="0"/>
+                            </p:stCondLst>
+                            <p:childTnLst>
+                              <p:par>
+                                <p:cTn id="13" presetID="1" presetClass="entr" presetSubtype="0" fill="hold" grpId="0" nodeType="clickEffect">
+                                  <p:stCondLst>
+                                    <p:cond delay="0"/>
+                                  </p:stCondLst>
+                                  <p:childTnLst>
+                                    <p:set>
+                                      <p:cBhvr>
+                                        <p:cTn id="14" dur="1" fill="hold">
+                                          <p:stCondLst>
+                                            <p:cond delay="0"/>
+                                          </p:stCondLst>
+                                        </p:cTn>
+                                        <p:tgtEl>
+                                          <p:spTgt spid="3">
+                                            <p:txEl>
+                                              <p:pRg st="3" end="3"/>
+                                            </p:txEl>
+                                          </p:spTgt>
+                                        </p:tgtEl>
+                                        <p:attrNameLst>
+                                          <p:attrName>style.visibility</p:attrName>
+                                        </p:attrNameLst>
+                                      </p:cBhvr>
+                                      <p:to>
+                                        <p:strVal val="visible"/>
+                                      </p:to>
+                                    </p:set>
+                                  </p:childTnLst>
+                                </p:cTn>
+                              </p:par>
+                              <p:par>
+                                <p:cTn id="15" presetID="1" presetClass="entr" presetSubtype="0" fill="hold" grpId="0" nodeType="withEffect">
+                                  <p:stCondLst>
+                                    <p:cond delay="0"/>
+                                  </p:stCondLst>
+                                  <p:childTnLst>
+                                    <p:set>
+                                      <p:cBhvr>
+                                        <p:cTn id="16" dur="1" fill="hold">
+                                          <p:stCondLst>
+                                            <p:cond delay="0"/>
+                                          </p:stCondLst>
+                                        </p:cTn>
+                                        <p:tgtEl>
+                                          <p:spTgt spid="3">
+                                            <p:txEl>
+                                              <p:pRg st="4" end="4"/>
+                                            </p:txEl>
+                                          </p:spTgt>
+                                        </p:tgtEl>
+                                        <p:attrNameLst>
+                                          <p:attrName>style.visibility</p:attrName>
+                                        </p:attrNameLst>
+                                      </p:cBhvr>
+                                      <p:to>
+                                        <p:strVal val="visible"/>
+                                      </p:to>
+                                    </p:set>
+                                  </p:childTnLst>
+                                </p:cTn>
+                              </p:par>
+                              <p:par>
+                                <p:cTn id="17" presetID="1" presetClass="entr" presetSubtype="0" fill="hold" grpId="0" nodeType="withEffect">
+                                  <p:stCondLst>
+                                    <p:cond delay="0"/>
+                                  </p:stCondLst>
+                                  <p:childTnLst>
+                                    <p:set>
+                                      <p:cBhvr>
+                                        <p:cTn id="18" dur="1" fill="hold">
+                                          <p:stCondLst>
+                                            <p:cond delay="0"/>
+                                          </p:stCondLst>
+                                        </p:cTn>
+                                        <p:tgtEl>
+                                          <p:spTgt spid="3">
+                                            <p:txEl>
+                                              <p:pRg st="5" end="5"/>
+                                            </p:txEl>
+                                          </p:spTgt>
+                                        </p:tgtEl>
+                                        <p:attrNameLst>
+                                          <p:attrName>style.visibility</p:attrName>
+                                        </p:attrNameLst>
+                                      </p:cBhvr>
+                                      <p:to>
+                                        <p:strVal val="visible"/>
+                                      </p:to>
+                                    </p:set>
+                                  </p:childTnLst>
+                                </p:cTn>
+                              </p:par>
+                            </p:childTnLst>
+                          </p:cTn>
+                        </p:par>
+                      </p:childTnLst>
+                    </p:cTn>
+                  </p:par>
+                </p:childTnLst>
+              </p:cTn>
+              <p:prevCondLst>
+                <p:cond evt="onPrev" delay="0">
+                  <p:tgtEl>
+                    <p:sldTgt/>
+                  </p:tgtEl>
+                </p:cond>
+              </p:prevCondLst>
+              <p:nextCondLst>
+                <p:cond evt="onNext" delay="0">
+                  <p:tgtEl>
+                    <p:sldTgt/>
+                  </p:tgtEl>
+                </p:cond>
+              </p:nextCondLst>
+            </p:seq>
+          </p:childTnLst>
+        </p:cTn>
+      </p:par>
+    </p:tnLst>
+    <p:bldLst>
+      <p:bldP spid="3" grpId="0" build="p"/>
+    </p:bldLst>
+  </p:timing>
+</p:sld>
+</file>
+
+<file path=ppt/slides/slide29.xml><?xml version="1.0" encoding="utf-8"?>
+<p:sld xmlns:a="http://schemas.openxmlformats.org/drawingml/2006/main" xmlns:r="http://schemas.openxmlformats.org/officeDocument/2006/relationships" xmlns:p="http://schemas.openxmlformats.org/presentationml/2006/main">
+  <p:cSld>
+    <p:spTree>
+      <p:nvGrpSpPr>
+        <p:cNvPr id="1" name=""/>
+        <p:cNvGrpSpPr/>
+        <p:nvPr/>
+      </p:nvGrpSpPr>
+      <p:grpSpPr>
+        <a:xfrm>
+          <a:off x="0" y="0"/>
+          <a:ext cx="0" cy="0"/>
+          <a:chOff x="0" y="0"/>
+          <a:chExt cx="0" cy="0"/>
+        </a:xfrm>
+      </p:grpSpPr>
+      <p:sp>
+        <p:nvSpPr>
+          <p:cNvPr id="2" name="Title 1">
+            <a:extLst>
+              <a:ext uri="{FF2B5EF4-FFF2-40B4-BE49-F238E27FC236}">
                 <a16:creationId xmlns:a16="http://schemas.microsoft.com/office/drawing/2014/main" id="{7306C212-B3B4-8E92-B9B3-B626EF37EBA4}"/>
               </a:ext>
             </a:extLst>
@@ -18247,7 +19534,114 @@
 </p:sld>
 </file>
 
-<file path=ppt/slides/slide27.xml><?xml version="1.0" encoding="utf-8"?>
+<file path=ppt/slides/slide3.xml><?xml version="1.0" encoding="utf-8"?>
+<p:sld xmlns:a="http://schemas.openxmlformats.org/drawingml/2006/main" xmlns:r="http://schemas.openxmlformats.org/officeDocument/2006/relationships" xmlns:p="http://schemas.openxmlformats.org/presentationml/2006/main">
+  <p:cSld>
+    <p:spTree>
+      <p:nvGrpSpPr>
+        <p:cNvPr id="1" name=""/>
+        <p:cNvGrpSpPr/>
+        <p:nvPr/>
+      </p:nvGrpSpPr>
+      <p:grpSpPr>
+        <a:xfrm>
+          <a:off x="0" y="0"/>
+          <a:ext cx="0" cy="0"/>
+          <a:chOff x="0" y="0"/>
+          <a:chExt cx="0" cy="0"/>
+        </a:xfrm>
+      </p:grpSpPr>
+      <p:sp>
+        <p:nvSpPr>
+          <p:cNvPr id="2" name="Title 1">
+            <a:extLst>
+              <a:ext uri="{FF2B5EF4-FFF2-40B4-BE49-F238E27FC236}">
+                <a16:creationId xmlns:a16="http://schemas.microsoft.com/office/drawing/2014/main" id="{7306C212-B3B4-8E92-B9B3-B626EF37EBA4}"/>
+              </a:ext>
+            </a:extLst>
+          </p:cNvPr>
+          <p:cNvSpPr txBox="1">
+            <a:spLocks noGrp="1"/>
+          </p:cNvSpPr>
+          <p:nvPr>
+            <p:ph type="title" idx="4294967295"/>
+          </p:nvPr>
+        </p:nvSpPr>
+        <p:spPr>
+          <a:xfrm>
+            <a:off x="1061794" y="2828836"/>
+            <a:ext cx="10068412" cy="1200329"/>
+          </a:xfrm>
+          <a:prstGeom prst="rect">
+            <a:avLst/>
+          </a:prstGeom>
+          <a:noFill/>
+          <a:ln>
+            <a:noFill/>
+            <a:prstDash/>
+          </a:ln>
+          <a:effectLst/>
+        </p:spPr>
+        <p:txBody>
+          <a:bodyPr rot="0" spcFirstLastPara="0" vertOverflow="overflow" horzOverflow="overflow" vert="horz" wrap="square" lIns="91440" tIns="45720" rIns="91440" bIns="45720" numCol="1" spcCol="0" rtlCol="0" fromWordArt="0" anchor="t" anchorCtr="0" forceAA="0" compatLnSpc="1">
+            <a:prstTxWarp prst="textNoShape">
+              <a:avLst/>
+            </a:prstTxWarp>
+            <a:spAutoFit/>
+          </a:bodyPr>
+          <a:lstStyle/>
+          <a:p>
+            <a:pPr marL="0" marR="0" lvl="0" indent="0" algn="ctr" defTabSz="457200" rtl="0" eaLnBrk="1" fontAlgn="auto" latinLnBrk="0" hangingPunct="1">
+              <a:lnSpc>
+                <a:spcPct val="100000"/>
+              </a:lnSpc>
+              <a:spcBef>
+                <a:spcPts val="0"/>
+              </a:spcBef>
+              <a:spcAft>
+                <a:spcPts val="0"/>
+              </a:spcAft>
+              <a:buClrTx/>
+              <a:buSzTx/>
+              <a:buFontTx/>
+              <a:buNone/>
+              <a:tabLst/>
+              <a:defRPr/>
+            </a:pPr>
+            <a:r>
+              <a:rPr kumimoji="0" lang="en-US" sz="7200" b="0" i="0" u="none" strike="noStrike" kern="1200" cap="none" spc="0" normalizeH="0" baseline="0" noProof="0" dirty="0">
+                <a:ln>
+                  <a:noFill/>
+                </a:ln>
+                <a:solidFill>
+                  <a:schemeClr val="tx1"/>
+                </a:solidFill>
+                <a:effectLst/>
+                <a:uLnTx/>
+                <a:uFillTx/>
+                <a:latin typeface="+mn-lt"/>
+                <a:ea typeface="+mn-ea"/>
+                <a:cs typeface="+mn-cs"/>
+              </a:rPr>
+              <a:t>What is unsafe code?</a:t>
+            </a:r>
+          </a:p>
+        </p:txBody>
+      </p:sp>
+    </p:spTree>
+    <p:extLst>
+      <p:ext uri="{BB962C8B-B14F-4D97-AF65-F5344CB8AC3E}">
+        <p14:creationId xmlns:p14="http://schemas.microsoft.com/office/powerpoint/2010/main" val="1134924029"/>
+      </p:ext>
+    </p:extLst>
+  </p:cSld>
+  <p:clrMapOvr>
+    <a:masterClrMapping/>
+  </p:clrMapOvr>
+</p:sld>
+</file>
+
+<file path=ppt/slides/slide30.xml><?xml version="1.0" encoding="utf-8"?>
 <p:sld xmlns:a="http://schemas.openxmlformats.org/drawingml/2006/main" xmlns:r="http://schemas.openxmlformats.org/officeDocument/2006/relationships" xmlns:p="http://schemas.openxmlformats.org/presentationml/2006/main">
   <p:cSld>
     <p:spTree>
@@ -19179,7 +20573,7 @@
 </p:sld>
 </file>
 
-<file path=ppt/slides/slide28.xml><?xml version="1.0" encoding="utf-8"?>
+<file path=ppt/slides/slide31.xml><?xml version="1.0" encoding="utf-8"?>
 <p:sld xmlns:a="http://schemas.openxmlformats.org/drawingml/2006/main" xmlns:r="http://schemas.openxmlformats.org/officeDocument/2006/relationships" xmlns:p="http://schemas.openxmlformats.org/presentationml/2006/main">
   <p:cSld>
     <p:spTree>
@@ -20832,7 +22226,7 @@
 </p:sld>
 </file>
 
-<file path=ppt/slides/slide29.xml><?xml version="1.0" encoding="utf-8"?>
+<file path=ppt/slides/slide32.xml><?xml version="1.0" encoding="utf-8"?>
 <p:sld xmlns:a="http://schemas.openxmlformats.org/drawingml/2006/main" xmlns:r="http://schemas.openxmlformats.org/officeDocument/2006/relationships" xmlns:p="http://schemas.openxmlformats.org/presentationml/2006/main">
   <p:cSld>
     <p:spTree>
@@ -21273,114 +22667,7 @@
 </p:sld>
 </file>
 
-<file path=ppt/slides/slide3.xml><?xml version="1.0" encoding="utf-8"?>
-<p:sld xmlns:a="http://schemas.openxmlformats.org/drawingml/2006/main" xmlns:r="http://schemas.openxmlformats.org/officeDocument/2006/relationships" xmlns:p="http://schemas.openxmlformats.org/presentationml/2006/main">
-  <p:cSld>
-    <p:spTree>
-      <p:nvGrpSpPr>
-        <p:cNvPr id="1" name=""/>
-        <p:cNvGrpSpPr/>
-        <p:nvPr/>
-      </p:nvGrpSpPr>
-      <p:grpSpPr>
-        <a:xfrm>
-          <a:off x="0" y="0"/>
-          <a:ext cx="0" cy="0"/>
-          <a:chOff x="0" y="0"/>
-          <a:chExt cx="0" cy="0"/>
-        </a:xfrm>
-      </p:grpSpPr>
-      <p:sp>
-        <p:nvSpPr>
-          <p:cNvPr id="2" name="Title 1">
-            <a:extLst>
-              <a:ext uri="{FF2B5EF4-FFF2-40B4-BE49-F238E27FC236}">
-                <a16:creationId xmlns:a16="http://schemas.microsoft.com/office/drawing/2014/main" id="{7306C212-B3B4-8E92-B9B3-B626EF37EBA4}"/>
-              </a:ext>
-            </a:extLst>
-          </p:cNvPr>
-          <p:cNvSpPr txBox="1">
-            <a:spLocks noGrp="1"/>
-          </p:cNvSpPr>
-          <p:nvPr>
-            <p:ph type="title" idx="4294967295"/>
-          </p:nvPr>
-        </p:nvSpPr>
-        <p:spPr>
-          <a:xfrm>
-            <a:off x="1061794" y="2828836"/>
-            <a:ext cx="10068412" cy="1200329"/>
-          </a:xfrm>
-          <a:prstGeom prst="rect">
-            <a:avLst/>
-          </a:prstGeom>
-          <a:noFill/>
-          <a:ln>
-            <a:noFill/>
-            <a:prstDash/>
-          </a:ln>
-          <a:effectLst/>
-        </p:spPr>
-        <p:txBody>
-          <a:bodyPr rot="0" spcFirstLastPara="0" vertOverflow="overflow" horzOverflow="overflow" vert="horz" wrap="square" lIns="91440" tIns="45720" rIns="91440" bIns="45720" numCol="1" spcCol="0" rtlCol="0" fromWordArt="0" anchor="t" anchorCtr="0" forceAA="0" compatLnSpc="1">
-            <a:prstTxWarp prst="textNoShape">
-              <a:avLst/>
-            </a:prstTxWarp>
-            <a:spAutoFit/>
-          </a:bodyPr>
-          <a:lstStyle/>
-          <a:p>
-            <a:pPr marL="0" marR="0" lvl="0" indent="0" algn="ctr" defTabSz="457200" rtl="0" eaLnBrk="1" fontAlgn="auto" latinLnBrk="0" hangingPunct="1">
-              <a:lnSpc>
-                <a:spcPct val="100000"/>
-              </a:lnSpc>
-              <a:spcBef>
-                <a:spcPts val="0"/>
-              </a:spcBef>
-              <a:spcAft>
-                <a:spcPts val="0"/>
-              </a:spcAft>
-              <a:buClrTx/>
-              <a:buSzTx/>
-              <a:buFontTx/>
-              <a:buNone/>
-              <a:tabLst/>
-              <a:defRPr/>
-            </a:pPr>
-            <a:r>
-              <a:rPr kumimoji="0" lang="en-US" sz="7200" b="0" i="0" u="none" strike="noStrike" kern="1200" cap="none" spc="0" normalizeH="0" baseline="0" noProof="0" dirty="0">
-                <a:ln>
-                  <a:noFill/>
-                </a:ln>
-                <a:solidFill>
-                  <a:schemeClr val="tx1"/>
-                </a:solidFill>
-                <a:effectLst/>
-                <a:uLnTx/>
-                <a:uFillTx/>
-                <a:latin typeface="+mn-lt"/>
-                <a:ea typeface="+mn-ea"/>
-                <a:cs typeface="+mn-cs"/>
-              </a:rPr>
-              <a:t>What is unsafe code?</a:t>
-            </a:r>
-          </a:p>
-        </p:txBody>
-      </p:sp>
-    </p:spTree>
-    <p:extLst>
-      <p:ext uri="{BB962C8B-B14F-4D97-AF65-F5344CB8AC3E}">
-        <p14:creationId xmlns:p14="http://schemas.microsoft.com/office/powerpoint/2010/main" val="1134924029"/>
-      </p:ext>
-    </p:extLst>
-  </p:cSld>
-  <p:clrMapOvr>
-    <a:masterClrMapping/>
-  </p:clrMapOvr>
-</p:sld>
-</file>
-
-<file path=ppt/slides/slide30.xml><?xml version="1.0" encoding="utf-8"?>
+<file path=ppt/slides/slide33.xml><?xml version="1.0" encoding="utf-8"?>
 <p:sld xmlns:a="http://schemas.openxmlformats.org/drawingml/2006/main" xmlns:r="http://schemas.openxmlformats.org/officeDocument/2006/relationships" xmlns:p="http://schemas.openxmlformats.org/presentationml/2006/main">
   <p:cSld>
     <p:spTree>
@@ -22227,7 +23514,7 @@
 </p:sld>
 </file>
 
-<file path=ppt/slides/slide31.xml><?xml version="1.0" encoding="utf-8"?>
+<file path=ppt/slides/slide34.xml><?xml version="1.0" encoding="utf-8"?>
 <p:sld xmlns:a="http://schemas.openxmlformats.org/drawingml/2006/main" xmlns:r="http://schemas.openxmlformats.org/officeDocument/2006/relationships" xmlns:p="http://schemas.openxmlformats.org/presentationml/2006/main">
   <p:cSld>
     <p:spTree>
@@ -23055,7 +24342,7 @@
 </p:sld>
 </file>
 
-<file path=ppt/slides/slide32.xml><?xml version="1.0" encoding="utf-8"?>
+<file path=ppt/slides/slide35.xml><?xml version="1.0" encoding="utf-8"?>
 <p:sld xmlns:a="http://schemas.openxmlformats.org/drawingml/2006/main" xmlns:r="http://schemas.openxmlformats.org/officeDocument/2006/relationships" xmlns:p="http://schemas.openxmlformats.org/presentationml/2006/main">
   <p:cSld>
     <p:spTree>
@@ -24410,7 +25697,7 @@
 </p:sld>
 </file>
 
-<file path=ppt/slides/slide33.xml><?xml version="1.0" encoding="utf-8"?>
+<file path=ppt/slides/slide36.xml><?xml version="1.0" encoding="utf-8"?>
 <p:sld xmlns:a="http://schemas.openxmlformats.org/drawingml/2006/main" xmlns:r="http://schemas.openxmlformats.org/officeDocument/2006/relationships" xmlns:p="http://schemas.openxmlformats.org/presentationml/2006/main">
   <p:cSld>
     <p:spTree>
@@ -24517,7 +25804,7 @@
 </p:sld>
 </file>
 
-<file path=ppt/slides/slide34.xml><?xml version="1.0" encoding="utf-8"?>
+<file path=ppt/slides/slide37.xml><?xml version="1.0" encoding="utf-8"?>
 <p:sld xmlns:a="http://schemas.openxmlformats.org/drawingml/2006/main" xmlns:r="http://schemas.openxmlformats.org/officeDocument/2006/relationships" xmlns:p="http://schemas.openxmlformats.org/presentationml/2006/main">
   <p:cSld>
     <p:spTree>
@@ -24624,7 +25911,7 @@
 </p:sld>
 </file>
 
-<file path=ppt/slides/slide35.xml><?xml version="1.0" encoding="utf-8"?>
+<file path=ppt/slides/slide38.xml><?xml version="1.0" encoding="utf-8"?>
 <p:sld xmlns:a="http://schemas.openxmlformats.org/drawingml/2006/main" xmlns:r="http://schemas.openxmlformats.org/officeDocument/2006/relationships" xmlns:p="http://schemas.openxmlformats.org/presentationml/2006/main">
   <p:cSld>
     <p:spTree>
@@ -24943,7 +26230,7 @@
 </p:sld>
 </file>
 
-<file path=ppt/slides/slide36.xml><?xml version="1.0" encoding="utf-8"?>
+<file path=ppt/slides/slide39.xml><?xml version="1.0" encoding="utf-8"?>
 <p:sld xmlns:a="http://schemas.openxmlformats.org/drawingml/2006/main" xmlns:r="http://schemas.openxmlformats.org/officeDocument/2006/relationships" xmlns:p="http://schemas.openxmlformats.org/presentationml/2006/main">
   <p:cSld>
     <p:spTree>
@@ -25257,329 +26544,6 @@
     <p:extLst>
       <p:ext uri="{BB962C8B-B14F-4D97-AF65-F5344CB8AC3E}">
         <p14:creationId xmlns:p14="http://schemas.microsoft.com/office/powerpoint/2010/main" val="1870771211"/>
-      </p:ext>
-    </p:extLst>
-  </p:cSld>
-  <p:clrMapOvr>
-    <a:masterClrMapping/>
-  </p:clrMapOvr>
-</p:sld>
-</file>
-
-<file path=ppt/slides/slide37.xml><?xml version="1.0" encoding="utf-8"?>
-<p:sld xmlns:a="http://schemas.openxmlformats.org/drawingml/2006/main" xmlns:r="http://schemas.openxmlformats.org/officeDocument/2006/relationships" xmlns:p="http://schemas.openxmlformats.org/presentationml/2006/main">
-  <p:cSld>
-    <p:spTree>
-      <p:nvGrpSpPr>
-        <p:cNvPr id="1" name=""/>
-        <p:cNvGrpSpPr/>
-        <p:nvPr/>
-      </p:nvGrpSpPr>
-      <p:grpSpPr>
-        <a:xfrm>
-          <a:off x="0" y="0"/>
-          <a:ext cx="0" cy="0"/>
-          <a:chOff x="0" y="0"/>
-          <a:chExt cx="0" cy="0"/>
-        </a:xfrm>
-      </p:grpSpPr>
-      <p:sp>
-        <p:nvSpPr>
-          <p:cNvPr id="2" name="Title 1">
-            <a:extLst>
-              <a:ext uri="{FF2B5EF4-FFF2-40B4-BE49-F238E27FC236}">
-                <a16:creationId xmlns:a16="http://schemas.microsoft.com/office/drawing/2014/main" id="{7306C212-B3B4-8E92-B9B3-B626EF37EBA4}"/>
-              </a:ext>
-            </a:extLst>
-          </p:cNvPr>
-          <p:cNvSpPr txBox="1">
-            <a:spLocks noGrp="1"/>
-          </p:cNvSpPr>
-          <p:nvPr>
-            <p:ph type="title" idx="4294967295"/>
-          </p:nvPr>
-        </p:nvSpPr>
-        <p:spPr>
-          <a:xfrm>
-            <a:off x="1061794" y="2828836"/>
-            <a:ext cx="10068412" cy="1200329"/>
-          </a:xfrm>
-          <a:prstGeom prst="rect">
-            <a:avLst/>
-          </a:prstGeom>
-          <a:noFill/>
-          <a:ln>
-            <a:noFill/>
-            <a:prstDash/>
-          </a:ln>
-          <a:effectLst/>
-        </p:spPr>
-        <p:txBody>
-          <a:bodyPr rot="0" spcFirstLastPara="0" vertOverflow="overflow" horzOverflow="overflow" vert="horz" wrap="square" lIns="91440" tIns="45720" rIns="91440" bIns="45720" numCol="1" spcCol="0" rtlCol="0" fromWordArt="0" anchor="t" anchorCtr="0" forceAA="0" compatLnSpc="1">
-            <a:prstTxWarp prst="textNoShape">
-              <a:avLst/>
-            </a:prstTxWarp>
-            <a:spAutoFit/>
-          </a:bodyPr>
-          <a:lstStyle/>
-          <a:p>
-            <a:pPr marL="0" marR="0" lvl="0" indent="0" algn="ctr" defTabSz="457200" rtl="0" eaLnBrk="1" fontAlgn="auto" latinLnBrk="0" hangingPunct="1">
-              <a:lnSpc>
-                <a:spcPct val="100000"/>
-              </a:lnSpc>
-              <a:spcBef>
-                <a:spcPts val="0"/>
-              </a:spcBef>
-              <a:spcAft>
-                <a:spcPts val="0"/>
-              </a:spcAft>
-              <a:buClrTx/>
-              <a:buSzTx/>
-              <a:buFontTx/>
-              <a:buNone/>
-              <a:tabLst/>
-              <a:defRPr/>
-            </a:pPr>
-            <a:r>
-              <a:rPr kumimoji="0" lang="en-US" sz="7200" b="0" i="0" u="none" strike="noStrike" kern="1200" cap="none" spc="0" normalizeH="0" baseline="0" noProof="0" dirty="0">
-                <a:ln>
-                  <a:noFill/>
-                </a:ln>
-                <a:solidFill>
-                  <a:schemeClr val="tx1"/>
-                </a:solidFill>
-                <a:effectLst/>
-                <a:uLnTx/>
-                <a:uFillTx/>
-                <a:latin typeface="+mn-lt"/>
-                <a:ea typeface="+mn-ea"/>
-                <a:cs typeface="+mn-cs"/>
-              </a:rPr>
-              <a:t>Thanks for listening!</a:t>
-            </a:r>
-          </a:p>
-        </p:txBody>
-      </p:sp>
-      <p:pic>
-        <p:nvPicPr>
-          <p:cNvPr id="5" name="Picture 4" descr="GitHub">
-            <a:extLst>
-              <a:ext uri="{FF2B5EF4-FFF2-40B4-BE49-F238E27FC236}">
-                <a16:creationId xmlns:a16="http://schemas.microsoft.com/office/drawing/2014/main" id="{C9112408-9719-E440-BC6C-BA3E3E65E31E}"/>
-              </a:ext>
-            </a:extLst>
-          </p:cNvPr>
-          <p:cNvPicPr>
-            <a:picLocks noChangeAspect="1"/>
-          </p:cNvPicPr>
-          <p:nvPr/>
-        </p:nvPicPr>
-        <p:blipFill>
-          <a:blip r:embed="rId2">
-            <a:extLst>
-              <a:ext uri="{28A0092B-C50C-407E-A947-70E740481C1C}">
-                <a14:useLocalDpi xmlns:a14="http://schemas.microsoft.com/office/drawing/2010/main" val="0"/>
-              </a:ext>
-            </a:extLst>
-          </a:blip>
-          <a:stretch>
-            <a:fillRect/>
-          </a:stretch>
-        </p:blipFill>
-        <p:spPr>
-          <a:xfrm>
-            <a:off x="457200" y="5303520"/>
-            <a:ext cx="274320" cy="274320"/>
-          </a:xfrm>
-          <a:prstGeom prst="rect">
-            <a:avLst/>
-          </a:prstGeom>
-        </p:spPr>
-      </p:pic>
-      <p:sp>
-        <p:nvSpPr>
-          <p:cNvPr id="6" name="TextBox 5">
-            <a:extLst>
-              <a:ext uri="{FF2B5EF4-FFF2-40B4-BE49-F238E27FC236}">
-                <a16:creationId xmlns:a16="http://schemas.microsoft.com/office/drawing/2014/main" id="{F2FAD6ED-B45F-E480-52EB-49AC0568C9BA}"/>
-              </a:ext>
-            </a:extLst>
-          </p:cNvPr>
-          <p:cNvSpPr txBox="1"/>
-          <p:nvPr/>
-        </p:nvSpPr>
-        <p:spPr>
-          <a:xfrm>
-            <a:off x="800098" y="5247459"/>
-            <a:ext cx="3457641" cy="400110"/>
-          </a:xfrm>
-          <a:prstGeom prst="rect">
-            <a:avLst/>
-          </a:prstGeom>
-          <a:noFill/>
-        </p:spPr>
-        <p:txBody>
-          <a:bodyPr wrap="square" rtlCol="0">
-            <a:spAutoFit/>
-          </a:bodyPr>
-          <a:lstStyle/>
-          <a:p>
-            <a:r>
-              <a:rPr lang="en-US" sz="2000" dirty="0" err="1"/>
-              <a:t>dennisdietrich</a:t>
-            </a:r>
-            <a:endParaRPr lang="en-US" sz="2000" dirty="0"/>
-          </a:p>
-        </p:txBody>
-      </p:sp>
-      <p:pic>
-        <p:nvPicPr>
-          <p:cNvPr id="20" name="Picture 19" descr="LinkedIn">
-            <a:extLst>
-              <a:ext uri="{FF2B5EF4-FFF2-40B4-BE49-F238E27FC236}">
-                <a16:creationId xmlns:a16="http://schemas.microsoft.com/office/drawing/2014/main" id="{4FA14B23-7ADB-953A-F57A-3E44D463F836}"/>
-              </a:ext>
-            </a:extLst>
-          </p:cNvPr>
-          <p:cNvPicPr>
-            <a:picLocks noChangeAspect="1"/>
-          </p:cNvPicPr>
-          <p:nvPr/>
-        </p:nvPicPr>
-        <p:blipFill>
-          <a:blip r:embed="rId3">
-            <a:extLst>
-              <a:ext uri="{28A0092B-C50C-407E-A947-70E740481C1C}">
-                <a14:useLocalDpi xmlns:a14="http://schemas.microsoft.com/office/drawing/2010/main" val="0"/>
-              </a:ext>
-            </a:extLst>
-          </a:blip>
-          <a:stretch>
-            <a:fillRect/>
-          </a:stretch>
-        </p:blipFill>
-        <p:spPr>
-          <a:xfrm>
-            <a:off x="457200" y="5715000"/>
-            <a:ext cx="274320" cy="274320"/>
-          </a:xfrm>
-          <a:prstGeom prst="rect">
-            <a:avLst/>
-          </a:prstGeom>
-        </p:spPr>
-      </p:pic>
-      <p:sp>
-        <p:nvSpPr>
-          <p:cNvPr id="18" name="TextBox 17">
-            <a:extLst>
-              <a:ext uri="{FF2B5EF4-FFF2-40B4-BE49-F238E27FC236}">
-                <a16:creationId xmlns:a16="http://schemas.microsoft.com/office/drawing/2014/main" id="{CF7F53EC-6158-915C-CFC1-D4626D193755}"/>
-              </a:ext>
-            </a:extLst>
-          </p:cNvPr>
-          <p:cNvSpPr txBox="1"/>
-          <p:nvPr/>
-        </p:nvSpPr>
-        <p:spPr>
-          <a:xfrm>
-            <a:off x="800099" y="5664321"/>
-            <a:ext cx="3457641" cy="400110"/>
-          </a:xfrm>
-          <a:prstGeom prst="rect">
-            <a:avLst/>
-          </a:prstGeom>
-          <a:noFill/>
-        </p:spPr>
-        <p:txBody>
-          <a:bodyPr wrap="square" rtlCol="0">
-            <a:spAutoFit/>
-          </a:bodyPr>
-          <a:lstStyle/>
-          <a:p>
-            <a:r>
-              <a:rPr lang="en-US" sz="2000" dirty="0" err="1"/>
-              <a:t>dcdietrich</a:t>
-            </a:r>
-            <a:endParaRPr lang="en-US" sz="2000" dirty="0"/>
-          </a:p>
-        </p:txBody>
-      </p:sp>
-      <p:pic>
-        <p:nvPicPr>
-          <p:cNvPr id="26" name="Picture 25" descr="Twitter">
-            <a:extLst>
-              <a:ext uri="{FF2B5EF4-FFF2-40B4-BE49-F238E27FC236}">
-                <a16:creationId xmlns:a16="http://schemas.microsoft.com/office/drawing/2014/main" id="{E7AAD714-7A4D-FABA-7D6C-B2446830DBC8}"/>
-              </a:ext>
-            </a:extLst>
-          </p:cNvPr>
-          <p:cNvPicPr>
-            <a:picLocks noChangeAspect="1"/>
-          </p:cNvPicPr>
-          <p:nvPr/>
-        </p:nvPicPr>
-        <p:blipFill>
-          <a:blip r:embed="rId4">
-            <a:extLst>
-              <a:ext uri="{28A0092B-C50C-407E-A947-70E740481C1C}">
-                <a14:useLocalDpi xmlns:a14="http://schemas.microsoft.com/office/drawing/2010/main" val="0"/>
-              </a:ext>
-            </a:extLst>
-          </a:blip>
-          <a:stretch>
-            <a:fillRect/>
-          </a:stretch>
-        </p:blipFill>
-        <p:spPr>
-          <a:xfrm>
-            <a:off x="457200" y="6126480"/>
-            <a:ext cx="274320" cy="274320"/>
-          </a:xfrm>
-          <a:prstGeom prst="rect">
-            <a:avLst/>
-          </a:prstGeom>
-        </p:spPr>
-      </p:pic>
-      <p:sp>
-        <p:nvSpPr>
-          <p:cNvPr id="24" name="TextBox 23">
-            <a:extLst>
-              <a:ext uri="{FF2B5EF4-FFF2-40B4-BE49-F238E27FC236}">
-                <a16:creationId xmlns:a16="http://schemas.microsoft.com/office/drawing/2014/main" id="{A04B5C49-8425-CBED-2FE0-96A50C78E05B}"/>
-              </a:ext>
-            </a:extLst>
-          </p:cNvPr>
-          <p:cNvSpPr txBox="1"/>
-          <p:nvPr/>
-        </p:nvSpPr>
-        <p:spPr>
-          <a:xfrm>
-            <a:off x="800100" y="6064431"/>
-            <a:ext cx="3457641" cy="400110"/>
-          </a:xfrm>
-          <a:prstGeom prst="rect">
-            <a:avLst/>
-          </a:prstGeom>
-          <a:noFill/>
-        </p:spPr>
-        <p:txBody>
-          <a:bodyPr wrap="square" rtlCol="0">
-            <a:spAutoFit/>
-          </a:bodyPr>
-          <a:lstStyle/>
-          <a:p>
-            <a:r>
-              <a:rPr lang="en-US" sz="2000" dirty="0" err="1"/>
-              <a:t>denniscdietrich</a:t>
-            </a:r>
-            <a:endParaRPr lang="en-US" sz="2000" dirty="0"/>
-          </a:p>
-        </p:txBody>
-      </p:sp>
-    </p:spTree>
-    <p:extLst>
-      <p:ext uri="{BB962C8B-B14F-4D97-AF65-F5344CB8AC3E}">
-        <p14:creationId xmlns:p14="http://schemas.microsoft.com/office/powerpoint/2010/main" val="4124308893"/>
       </p:ext>
     </p:extLst>
   </p:cSld>
@@ -25972,6 +26936,329 @@
     <p:extLst>
       <p:ext uri="{BB962C8B-B14F-4D97-AF65-F5344CB8AC3E}">
         <p14:creationId xmlns:p14="http://schemas.microsoft.com/office/powerpoint/2010/main" val="2813357318"/>
+      </p:ext>
+    </p:extLst>
+  </p:cSld>
+  <p:clrMapOvr>
+    <a:masterClrMapping/>
+  </p:clrMapOvr>
+</p:sld>
+</file>
+
+<file path=ppt/slides/slide40.xml><?xml version="1.0" encoding="utf-8"?>
+<p:sld xmlns:a="http://schemas.openxmlformats.org/drawingml/2006/main" xmlns:r="http://schemas.openxmlformats.org/officeDocument/2006/relationships" xmlns:p="http://schemas.openxmlformats.org/presentationml/2006/main">
+  <p:cSld>
+    <p:spTree>
+      <p:nvGrpSpPr>
+        <p:cNvPr id="1" name=""/>
+        <p:cNvGrpSpPr/>
+        <p:nvPr/>
+      </p:nvGrpSpPr>
+      <p:grpSpPr>
+        <a:xfrm>
+          <a:off x="0" y="0"/>
+          <a:ext cx="0" cy="0"/>
+          <a:chOff x="0" y="0"/>
+          <a:chExt cx="0" cy="0"/>
+        </a:xfrm>
+      </p:grpSpPr>
+      <p:sp>
+        <p:nvSpPr>
+          <p:cNvPr id="2" name="Title 1">
+            <a:extLst>
+              <a:ext uri="{FF2B5EF4-FFF2-40B4-BE49-F238E27FC236}">
+                <a16:creationId xmlns:a16="http://schemas.microsoft.com/office/drawing/2014/main" id="{7306C212-B3B4-8E92-B9B3-B626EF37EBA4}"/>
+              </a:ext>
+            </a:extLst>
+          </p:cNvPr>
+          <p:cNvSpPr txBox="1">
+            <a:spLocks noGrp="1"/>
+          </p:cNvSpPr>
+          <p:nvPr>
+            <p:ph type="title" idx="4294967295"/>
+          </p:nvPr>
+        </p:nvSpPr>
+        <p:spPr>
+          <a:xfrm>
+            <a:off x="1061794" y="2828836"/>
+            <a:ext cx="10068412" cy="1200329"/>
+          </a:xfrm>
+          <a:prstGeom prst="rect">
+            <a:avLst/>
+          </a:prstGeom>
+          <a:noFill/>
+          <a:ln>
+            <a:noFill/>
+            <a:prstDash/>
+          </a:ln>
+          <a:effectLst/>
+        </p:spPr>
+        <p:txBody>
+          <a:bodyPr rot="0" spcFirstLastPara="0" vertOverflow="overflow" horzOverflow="overflow" vert="horz" wrap="square" lIns="91440" tIns="45720" rIns="91440" bIns="45720" numCol="1" spcCol="0" rtlCol="0" fromWordArt="0" anchor="t" anchorCtr="0" forceAA="0" compatLnSpc="1">
+            <a:prstTxWarp prst="textNoShape">
+              <a:avLst/>
+            </a:prstTxWarp>
+            <a:spAutoFit/>
+          </a:bodyPr>
+          <a:lstStyle/>
+          <a:p>
+            <a:pPr marL="0" marR="0" lvl="0" indent="0" algn="ctr" defTabSz="457200" rtl="0" eaLnBrk="1" fontAlgn="auto" latinLnBrk="0" hangingPunct="1">
+              <a:lnSpc>
+                <a:spcPct val="100000"/>
+              </a:lnSpc>
+              <a:spcBef>
+                <a:spcPts val="0"/>
+              </a:spcBef>
+              <a:spcAft>
+                <a:spcPts val="0"/>
+              </a:spcAft>
+              <a:buClrTx/>
+              <a:buSzTx/>
+              <a:buFontTx/>
+              <a:buNone/>
+              <a:tabLst/>
+              <a:defRPr/>
+            </a:pPr>
+            <a:r>
+              <a:rPr kumimoji="0" lang="en-US" sz="7200" b="0" i="0" u="none" strike="noStrike" kern="1200" cap="none" spc="0" normalizeH="0" baseline="0" noProof="0" dirty="0">
+                <a:ln>
+                  <a:noFill/>
+                </a:ln>
+                <a:solidFill>
+                  <a:schemeClr val="tx1"/>
+                </a:solidFill>
+                <a:effectLst/>
+                <a:uLnTx/>
+                <a:uFillTx/>
+                <a:latin typeface="+mn-lt"/>
+                <a:ea typeface="+mn-ea"/>
+                <a:cs typeface="+mn-cs"/>
+              </a:rPr>
+              <a:t>Thanks for listening!</a:t>
+            </a:r>
+          </a:p>
+        </p:txBody>
+      </p:sp>
+      <p:pic>
+        <p:nvPicPr>
+          <p:cNvPr id="5" name="Picture 4" descr="GitHub">
+            <a:extLst>
+              <a:ext uri="{FF2B5EF4-FFF2-40B4-BE49-F238E27FC236}">
+                <a16:creationId xmlns:a16="http://schemas.microsoft.com/office/drawing/2014/main" id="{C9112408-9719-E440-BC6C-BA3E3E65E31E}"/>
+              </a:ext>
+            </a:extLst>
+          </p:cNvPr>
+          <p:cNvPicPr>
+            <a:picLocks noChangeAspect="1"/>
+          </p:cNvPicPr>
+          <p:nvPr/>
+        </p:nvPicPr>
+        <p:blipFill>
+          <a:blip r:embed="rId2">
+            <a:extLst>
+              <a:ext uri="{28A0092B-C50C-407E-A947-70E740481C1C}">
+                <a14:useLocalDpi xmlns:a14="http://schemas.microsoft.com/office/drawing/2010/main" val="0"/>
+              </a:ext>
+            </a:extLst>
+          </a:blip>
+          <a:stretch>
+            <a:fillRect/>
+          </a:stretch>
+        </p:blipFill>
+        <p:spPr>
+          <a:xfrm>
+            <a:off x="457200" y="5303520"/>
+            <a:ext cx="274320" cy="274320"/>
+          </a:xfrm>
+          <a:prstGeom prst="rect">
+            <a:avLst/>
+          </a:prstGeom>
+        </p:spPr>
+      </p:pic>
+      <p:sp>
+        <p:nvSpPr>
+          <p:cNvPr id="6" name="TextBox 5">
+            <a:extLst>
+              <a:ext uri="{FF2B5EF4-FFF2-40B4-BE49-F238E27FC236}">
+                <a16:creationId xmlns:a16="http://schemas.microsoft.com/office/drawing/2014/main" id="{F2FAD6ED-B45F-E480-52EB-49AC0568C9BA}"/>
+              </a:ext>
+            </a:extLst>
+          </p:cNvPr>
+          <p:cNvSpPr txBox="1"/>
+          <p:nvPr/>
+        </p:nvSpPr>
+        <p:spPr>
+          <a:xfrm>
+            <a:off x="800098" y="5247459"/>
+            <a:ext cx="3457641" cy="400110"/>
+          </a:xfrm>
+          <a:prstGeom prst="rect">
+            <a:avLst/>
+          </a:prstGeom>
+          <a:noFill/>
+        </p:spPr>
+        <p:txBody>
+          <a:bodyPr wrap="square" rtlCol="0">
+            <a:spAutoFit/>
+          </a:bodyPr>
+          <a:lstStyle/>
+          <a:p>
+            <a:r>
+              <a:rPr lang="en-US" sz="2000" dirty="0" err="1"/>
+              <a:t>dennisdietrich</a:t>
+            </a:r>
+            <a:endParaRPr lang="en-US" sz="2000" dirty="0"/>
+          </a:p>
+        </p:txBody>
+      </p:sp>
+      <p:pic>
+        <p:nvPicPr>
+          <p:cNvPr id="20" name="Picture 19" descr="LinkedIn">
+            <a:extLst>
+              <a:ext uri="{FF2B5EF4-FFF2-40B4-BE49-F238E27FC236}">
+                <a16:creationId xmlns:a16="http://schemas.microsoft.com/office/drawing/2014/main" id="{4FA14B23-7ADB-953A-F57A-3E44D463F836}"/>
+              </a:ext>
+            </a:extLst>
+          </p:cNvPr>
+          <p:cNvPicPr>
+            <a:picLocks noChangeAspect="1"/>
+          </p:cNvPicPr>
+          <p:nvPr/>
+        </p:nvPicPr>
+        <p:blipFill>
+          <a:blip r:embed="rId3">
+            <a:extLst>
+              <a:ext uri="{28A0092B-C50C-407E-A947-70E740481C1C}">
+                <a14:useLocalDpi xmlns:a14="http://schemas.microsoft.com/office/drawing/2010/main" val="0"/>
+              </a:ext>
+            </a:extLst>
+          </a:blip>
+          <a:stretch>
+            <a:fillRect/>
+          </a:stretch>
+        </p:blipFill>
+        <p:spPr>
+          <a:xfrm>
+            <a:off x="457200" y="5715000"/>
+            <a:ext cx="274320" cy="274320"/>
+          </a:xfrm>
+          <a:prstGeom prst="rect">
+            <a:avLst/>
+          </a:prstGeom>
+        </p:spPr>
+      </p:pic>
+      <p:sp>
+        <p:nvSpPr>
+          <p:cNvPr id="18" name="TextBox 17">
+            <a:extLst>
+              <a:ext uri="{FF2B5EF4-FFF2-40B4-BE49-F238E27FC236}">
+                <a16:creationId xmlns:a16="http://schemas.microsoft.com/office/drawing/2014/main" id="{CF7F53EC-6158-915C-CFC1-D4626D193755}"/>
+              </a:ext>
+            </a:extLst>
+          </p:cNvPr>
+          <p:cNvSpPr txBox="1"/>
+          <p:nvPr/>
+        </p:nvSpPr>
+        <p:spPr>
+          <a:xfrm>
+            <a:off x="800099" y="5664321"/>
+            <a:ext cx="3457641" cy="400110"/>
+          </a:xfrm>
+          <a:prstGeom prst="rect">
+            <a:avLst/>
+          </a:prstGeom>
+          <a:noFill/>
+        </p:spPr>
+        <p:txBody>
+          <a:bodyPr wrap="square" rtlCol="0">
+            <a:spAutoFit/>
+          </a:bodyPr>
+          <a:lstStyle/>
+          <a:p>
+            <a:r>
+              <a:rPr lang="en-US" sz="2000" dirty="0" err="1"/>
+              <a:t>dcdietrich</a:t>
+            </a:r>
+            <a:endParaRPr lang="en-US" sz="2000" dirty="0"/>
+          </a:p>
+        </p:txBody>
+      </p:sp>
+      <p:pic>
+        <p:nvPicPr>
+          <p:cNvPr id="26" name="Picture 25" descr="Twitter">
+            <a:extLst>
+              <a:ext uri="{FF2B5EF4-FFF2-40B4-BE49-F238E27FC236}">
+                <a16:creationId xmlns:a16="http://schemas.microsoft.com/office/drawing/2014/main" id="{E7AAD714-7A4D-FABA-7D6C-B2446830DBC8}"/>
+              </a:ext>
+            </a:extLst>
+          </p:cNvPr>
+          <p:cNvPicPr>
+            <a:picLocks noChangeAspect="1"/>
+          </p:cNvPicPr>
+          <p:nvPr/>
+        </p:nvPicPr>
+        <p:blipFill>
+          <a:blip r:embed="rId4">
+            <a:extLst>
+              <a:ext uri="{28A0092B-C50C-407E-A947-70E740481C1C}">
+                <a14:useLocalDpi xmlns:a14="http://schemas.microsoft.com/office/drawing/2010/main" val="0"/>
+              </a:ext>
+            </a:extLst>
+          </a:blip>
+          <a:stretch>
+            <a:fillRect/>
+          </a:stretch>
+        </p:blipFill>
+        <p:spPr>
+          <a:xfrm>
+            <a:off x="457200" y="6126480"/>
+            <a:ext cx="274320" cy="274320"/>
+          </a:xfrm>
+          <a:prstGeom prst="rect">
+            <a:avLst/>
+          </a:prstGeom>
+        </p:spPr>
+      </p:pic>
+      <p:sp>
+        <p:nvSpPr>
+          <p:cNvPr id="24" name="TextBox 23">
+            <a:extLst>
+              <a:ext uri="{FF2B5EF4-FFF2-40B4-BE49-F238E27FC236}">
+                <a16:creationId xmlns:a16="http://schemas.microsoft.com/office/drawing/2014/main" id="{A04B5C49-8425-CBED-2FE0-96A50C78E05B}"/>
+              </a:ext>
+            </a:extLst>
+          </p:cNvPr>
+          <p:cNvSpPr txBox="1"/>
+          <p:nvPr/>
+        </p:nvSpPr>
+        <p:spPr>
+          <a:xfrm>
+            <a:off x="800100" y="6064431"/>
+            <a:ext cx="3457641" cy="400110"/>
+          </a:xfrm>
+          <a:prstGeom prst="rect">
+            <a:avLst/>
+          </a:prstGeom>
+          <a:noFill/>
+        </p:spPr>
+        <p:txBody>
+          <a:bodyPr wrap="square" rtlCol="0">
+            <a:spAutoFit/>
+          </a:bodyPr>
+          <a:lstStyle/>
+          <a:p>
+            <a:r>
+              <a:rPr lang="en-US" sz="2000" dirty="0" err="1"/>
+              <a:t>denniscdietrich</a:t>
+            </a:r>
+            <a:endParaRPr lang="en-US" sz="2000" dirty="0"/>
+          </a:p>
+        </p:txBody>
+      </p:sp>
+    </p:spTree>
+    <p:extLst>
+      <p:ext uri="{BB962C8B-B14F-4D97-AF65-F5344CB8AC3E}">
+        <p14:creationId xmlns:p14="http://schemas.microsoft.com/office/powerpoint/2010/main" val="4124308893"/>
       </p:ext>
     </p:extLst>
   </p:cSld>

</xml_diff>

<commit_message>
Corrected typos on two slides (#8)
</commit_message>
<xml_diff>
--- a/doc/Introduction to unsafe C#.pptx
+++ b/doc/Introduction to unsafe C#.pptx
@@ -6767,7 +6767,7 @@
           <a:p>
             <a:r>
               <a:rPr lang="en-US" sz="1200" dirty="0"/>
-              <a:t>Rev. 2 (2022-10-17), </a:t>
+              <a:t>Rev. 3 (2022-10-17), </a:t>
             </a:r>
             <a:r>
               <a:rPr lang="en-US" sz="1200" dirty="0">
@@ -19728,13 +19728,13 @@
           <a:p>
             <a:r>
               <a:rPr lang="en-US" dirty="0"/>
-              <a:t>Argument passing to the caller</a:t>
+              <a:t>Argument passing to the callee</a:t>
             </a:r>
           </a:p>
           <a:p>
             <a:r>
               <a:rPr lang="en-US" dirty="0"/>
-              <a:t>Return value passing to the callee</a:t>
+              <a:t>Return value passing back to the caller</a:t>
             </a:r>
           </a:p>
           <a:p>
@@ -34295,7 +34295,7 @@
             </a:br>
             <a:r>
               <a:rPr lang="en-US" dirty="0"/>
-              <a:t>Callback delegate lifetime VI</a:t>
+              <a:t>Callback delegate lifetime IV</a:t>
             </a:r>
           </a:p>
         </p:txBody>
@@ -34484,7 +34484,7 @@
                 <a:effectLst/>
                 <a:latin typeface="Consolas" panose="020B0609020204030204" pitchFamily="49" charset="0"/>
               </a:rPr>
-              <a:t>// Let's not wait for the finalizers (.NET 6 on Windows x64)</a:t>
+              <a:t>// Let's not wait for the finalizers</a:t>
             </a:r>
             <a:br>
               <a:rPr kumimoji="0" lang="en-US" altLang="en-US" b="0" i="1" u="none" strike="noStrike" cap="none" normalizeH="0" baseline="0" dirty="0">

</xml_diff>

<commit_message>
Small edits and notes for future presentations based on feedback from last dry run
</commit_message>
<xml_diff>
--- a/doc/Introduction to unsafe C#.pptx
+++ b/doc/Introduction to unsafe C#.pptx
@@ -4,6 +4,9 @@
   <p:sldMasterIdLst>
     <p:sldMasterId id="2147483660" r:id="rId1"/>
   </p:sldMasterIdLst>
+  <p:notesMasterIdLst>
+    <p:notesMasterId r:id="rId54"/>
+  </p:notesMasterIdLst>
   <p:sldIdLst>
     <p:sldId id="256" r:id="rId2"/>
     <p:sldId id="257" r:id="rId3"/>
@@ -163,6 +166,529 @@
 </p:presentation>
 </file>
 
+<file path=ppt/notesMasters/notesMaster1.xml><?xml version="1.0" encoding="utf-8"?>
+<p:notesMaster xmlns:a="http://schemas.openxmlformats.org/drawingml/2006/main" xmlns:r="http://schemas.openxmlformats.org/officeDocument/2006/relationships" xmlns:p="http://schemas.openxmlformats.org/presentationml/2006/main">
+  <p:cSld>
+    <p:bg>
+      <p:bgRef idx="1001">
+        <a:schemeClr val="bg1"/>
+      </p:bgRef>
+    </p:bg>
+    <p:spTree>
+      <p:nvGrpSpPr>
+        <p:cNvPr id="1" name=""/>
+        <p:cNvGrpSpPr/>
+        <p:nvPr/>
+      </p:nvGrpSpPr>
+      <p:grpSpPr>
+        <a:xfrm>
+          <a:off x="0" y="0"/>
+          <a:ext cx="0" cy="0"/>
+          <a:chOff x="0" y="0"/>
+          <a:chExt cx="0" cy="0"/>
+        </a:xfrm>
+      </p:grpSpPr>
+      <p:sp>
+        <p:nvSpPr>
+          <p:cNvPr id="2" name="Header Placeholder 1"/>
+          <p:cNvSpPr>
+            <a:spLocks noGrp="1"/>
+          </p:cNvSpPr>
+          <p:nvPr>
+            <p:ph type="hdr" sz="quarter"/>
+          </p:nvPr>
+        </p:nvSpPr>
+        <p:spPr>
+          <a:xfrm>
+            <a:off x="0" y="0"/>
+            <a:ext cx="2971800" cy="458788"/>
+          </a:xfrm>
+          <a:prstGeom prst="rect">
+            <a:avLst/>
+          </a:prstGeom>
+        </p:spPr>
+        <p:txBody>
+          <a:bodyPr vert="horz" lIns="91440" tIns="45720" rIns="91440" bIns="45720" rtlCol="0"/>
+          <a:lstStyle>
+            <a:lvl1pPr algn="l">
+              <a:defRPr sz="1200"/>
+            </a:lvl1pPr>
+          </a:lstStyle>
+          <a:p>
+            <a:endParaRPr lang="en-US"/>
+          </a:p>
+        </p:txBody>
+      </p:sp>
+      <p:sp>
+        <p:nvSpPr>
+          <p:cNvPr id="3" name="Date Placeholder 2"/>
+          <p:cNvSpPr>
+            <a:spLocks noGrp="1"/>
+          </p:cNvSpPr>
+          <p:nvPr>
+            <p:ph type="dt" idx="1"/>
+          </p:nvPr>
+        </p:nvSpPr>
+        <p:spPr>
+          <a:xfrm>
+            <a:off x="3884613" y="0"/>
+            <a:ext cx="2971800" cy="458788"/>
+          </a:xfrm>
+          <a:prstGeom prst="rect">
+            <a:avLst/>
+          </a:prstGeom>
+        </p:spPr>
+        <p:txBody>
+          <a:bodyPr vert="horz" lIns="91440" tIns="45720" rIns="91440" bIns="45720" rtlCol="0"/>
+          <a:lstStyle>
+            <a:lvl1pPr algn="r">
+              <a:defRPr sz="1200"/>
+            </a:lvl1pPr>
+          </a:lstStyle>
+          <a:p>
+            <a:fld id="{2B6DBF41-98D5-4B29-8B81-B31614D19ACC}" type="datetimeFigureOut">
+              <a:rPr lang="en-US" smtClean="0"/>
+              <a:t>10/23/2022</a:t>
+            </a:fld>
+            <a:endParaRPr lang="en-US"/>
+          </a:p>
+        </p:txBody>
+      </p:sp>
+      <p:sp>
+        <p:nvSpPr>
+          <p:cNvPr id="4" name="Slide Image Placeholder 3"/>
+          <p:cNvSpPr>
+            <a:spLocks noGrp="1" noRot="1" noChangeAspect="1"/>
+          </p:cNvSpPr>
+          <p:nvPr>
+            <p:ph type="sldImg" idx="2"/>
+          </p:nvPr>
+        </p:nvSpPr>
+        <p:spPr>
+          <a:xfrm>
+            <a:off x="685800" y="1143000"/>
+            <a:ext cx="5486400" cy="3086100"/>
+          </a:xfrm>
+          <a:prstGeom prst="rect">
+            <a:avLst/>
+          </a:prstGeom>
+          <a:noFill/>
+          <a:ln w="12700">
+            <a:solidFill>
+              <a:prstClr val="black"/>
+            </a:solidFill>
+          </a:ln>
+        </p:spPr>
+        <p:txBody>
+          <a:bodyPr vert="horz" lIns="91440" tIns="45720" rIns="91440" bIns="45720" rtlCol="0" anchor="ctr"/>
+          <a:lstStyle/>
+          <a:p>
+            <a:endParaRPr lang="en-US"/>
+          </a:p>
+        </p:txBody>
+      </p:sp>
+      <p:sp>
+        <p:nvSpPr>
+          <p:cNvPr id="5" name="Notes Placeholder 4"/>
+          <p:cNvSpPr>
+            <a:spLocks noGrp="1"/>
+          </p:cNvSpPr>
+          <p:nvPr>
+            <p:ph type="body" sz="quarter" idx="3"/>
+          </p:nvPr>
+        </p:nvSpPr>
+        <p:spPr>
+          <a:xfrm>
+            <a:off x="685800" y="4400550"/>
+            <a:ext cx="5486400" cy="3600450"/>
+          </a:xfrm>
+          <a:prstGeom prst="rect">
+            <a:avLst/>
+          </a:prstGeom>
+        </p:spPr>
+        <p:txBody>
+          <a:bodyPr vert="horz" lIns="91440" tIns="45720" rIns="91440" bIns="45720" rtlCol="0"/>
+          <a:lstStyle/>
+          <a:p>
+            <a:pPr lvl="0"/>
+            <a:r>
+              <a:rPr lang="en-US"/>
+              <a:t>Click to edit Master text styles</a:t>
+            </a:r>
+          </a:p>
+          <a:p>
+            <a:pPr lvl="1"/>
+            <a:r>
+              <a:rPr lang="en-US"/>
+              <a:t>Second level</a:t>
+            </a:r>
+          </a:p>
+          <a:p>
+            <a:pPr lvl="2"/>
+            <a:r>
+              <a:rPr lang="en-US"/>
+              <a:t>Third level</a:t>
+            </a:r>
+          </a:p>
+          <a:p>
+            <a:pPr lvl="3"/>
+            <a:r>
+              <a:rPr lang="en-US"/>
+              <a:t>Fourth level</a:t>
+            </a:r>
+          </a:p>
+          <a:p>
+            <a:pPr lvl="4"/>
+            <a:r>
+              <a:rPr lang="en-US"/>
+              <a:t>Fifth level</a:t>
+            </a:r>
+          </a:p>
+        </p:txBody>
+      </p:sp>
+      <p:sp>
+        <p:nvSpPr>
+          <p:cNvPr id="6" name="Footer Placeholder 5"/>
+          <p:cNvSpPr>
+            <a:spLocks noGrp="1"/>
+          </p:cNvSpPr>
+          <p:nvPr>
+            <p:ph type="ftr" sz="quarter" idx="4"/>
+          </p:nvPr>
+        </p:nvSpPr>
+        <p:spPr>
+          <a:xfrm>
+            <a:off x="0" y="8685213"/>
+            <a:ext cx="2971800" cy="458787"/>
+          </a:xfrm>
+          <a:prstGeom prst="rect">
+            <a:avLst/>
+          </a:prstGeom>
+        </p:spPr>
+        <p:txBody>
+          <a:bodyPr vert="horz" lIns="91440" tIns="45720" rIns="91440" bIns="45720" rtlCol="0" anchor="b"/>
+          <a:lstStyle>
+            <a:lvl1pPr algn="l">
+              <a:defRPr sz="1200"/>
+            </a:lvl1pPr>
+          </a:lstStyle>
+          <a:p>
+            <a:endParaRPr lang="en-US"/>
+          </a:p>
+        </p:txBody>
+      </p:sp>
+      <p:sp>
+        <p:nvSpPr>
+          <p:cNvPr id="7" name="Slide Number Placeholder 6"/>
+          <p:cNvSpPr>
+            <a:spLocks noGrp="1"/>
+          </p:cNvSpPr>
+          <p:nvPr>
+            <p:ph type="sldNum" sz="quarter" idx="5"/>
+          </p:nvPr>
+        </p:nvSpPr>
+        <p:spPr>
+          <a:xfrm>
+            <a:off x="3884613" y="8685213"/>
+            <a:ext cx="2971800" cy="458787"/>
+          </a:xfrm>
+          <a:prstGeom prst="rect">
+            <a:avLst/>
+          </a:prstGeom>
+        </p:spPr>
+        <p:txBody>
+          <a:bodyPr vert="horz" lIns="91440" tIns="45720" rIns="91440" bIns="45720" rtlCol="0" anchor="b"/>
+          <a:lstStyle>
+            <a:lvl1pPr algn="r">
+              <a:defRPr sz="1200"/>
+            </a:lvl1pPr>
+          </a:lstStyle>
+          <a:p>
+            <a:fld id="{2B4F40D4-862D-491C-85E3-1A34EFA2BD00}" type="slidenum">
+              <a:rPr lang="en-US" smtClean="0"/>
+              <a:t>‹#›</a:t>
+            </a:fld>
+            <a:endParaRPr lang="en-US"/>
+          </a:p>
+        </p:txBody>
+      </p:sp>
+    </p:spTree>
+    <p:extLst>
+      <p:ext uri="{BB962C8B-B14F-4D97-AF65-F5344CB8AC3E}">
+        <p14:creationId xmlns:p14="http://schemas.microsoft.com/office/powerpoint/2010/main" val="518753005"/>
+      </p:ext>
+    </p:extLst>
+  </p:cSld>
+  <p:clrMap bg1="lt1" tx1="dk1" bg2="lt2" tx2="dk2" accent1="accent1" accent2="accent2" accent3="accent3" accent4="accent4" accent5="accent5" accent6="accent6" hlink="hlink" folHlink="folHlink"/>
+  <p:notesStyle>
+    <a:lvl1pPr marL="0" algn="l" defTabSz="914400" rtl="0" eaLnBrk="1" latinLnBrk="0" hangingPunct="1">
+      <a:defRPr sz="1200" kern="1200">
+        <a:solidFill>
+          <a:schemeClr val="tx1"/>
+        </a:solidFill>
+        <a:latin typeface="+mn-lt"/>
+        <a:ea typeface="+mn-ea"/>
+        <a:cs typeface="+mn-cs"/>
+      </a:defRPr>
+    </a:lvl1pPr>
+    <a:lvl2pPr marL="457200" algn="l" defTabSz="914400" rtl="0" eaLnBrk="1" latinLnBrk="0" hangingPunct="1">
+      <a:defRPr sz="1200" kern="1200">
+        <a:solidFill>
+          <a:schemeClr val="tx1"/>
+        </a:solidFill>
+        <a:latin typeface="+mn-lt"/>
+        <a:ea typeface="+mn-ea"/>
+        <a:cs typeface="+mn-cs"/>
+      </a:defRPr>
+    </a:lvl2pPr>
+    <a:lvl3pPr marL="914400" algn="l" defTabSz="914400" rtl="0" eaLnBrk="1" latinLnBrk="0" hangingPunct="1">
+      <a:defRPr sz="1200" kern="1200">
+        <a:solidFill>
+          <a:schemeClr val="tx1"/>
+        </a:solidFill>
+        <a:latin typeface="+mn-lt"/>
+        <a:ea typeface="+mn-ea"/>
+        <a:cs typeface="+mn-cs"/>
+      </a:defRPr>
+    </a:lvl3pPr>
+    <a:lvl4pPr marL="1371600" algn="l" defTabSz="914400" rtl="0" eaLnBrk="1" latinLnBrk="0" hangingPunct="1">
+      <a:defRPr sz="1200" kern="1200">
+        <a:solidFill>
+          <a:schemeClr val="tx1"/>
+        </a:solidFill>
+        <a:latin typeface="+mn-lt"/>
+        <a:ea typeface="+mn-ea"/>
+        <a:cs typeface="+mn-cs"/>
+      </a:defRPr>
+    </a:lvl4pPr>
+    <a:lvl5pPr marL="1828800" algn="l" defTabSz="914400" rtl="0" eaLnBrk="1" latinLnBrk="0" hangingPunct="1">
+      <a:defRPr sz="1200" kern="1200">
+        <a:solidFill>
+          <a:schemeClr val="tx1"/>
+        </a:solidFill>
+        <a:latin typeface="+mn-lt"/>
+        <a:ea typeface="+mn-ea"/>
+        <a:cs typeface="+mn-cs"/>
+      </a:defRPr>
+    </a:lvl5pPr>
+    <a:lvl6pPr marL="2286000" algn="l" defTabSz="914400" rtl="0" eaLnBrk="1" latinLnBrk="0" hangingPunct="1">
+      <a:defRPr sz="1200" kern="1200">
+        <a:solidFill>
+          <a:schemeClr val="tx1"/>
+        </a:solidFill>
+        <a:latin typeface="+mn-lt"/>
+        <a:ea typeface="+mn-ea"/>
+        <a:cs typeface="+mn-cs"/>
+      </a:defRPr>
+    </a:lvl6pPr>
+    <a:lvl7pPr marL="2743200" algn="l" defTabSz="914400" rtl="0" eaLnBrk="1" latinLnBrk="0" hangingPunct="1">
+      <a:defRPr sz="1200" kern="1200">
+        <a:solidFill>
+          <a:schemeClr val="tx1"/>
+        </a:solidFill>
+        <a:latin typeface="+mn-lt"/>
+        <a:ea typeface="+mn-ea"/>
+        <a:cs typeface="+mn-cs"/>
+      </a:defRPr>
+    </a:lvl7pPr>
+    <a:lvl8pPr marL="3200400" algn="l" defTabSz="914400" rtl="0" eaLnBrk="1" latinLnBrk="0" hangingPunct="1">
+      <a:defRPr sz="1200" kern="1200">
+        <a:solidFill>
+          <a:schemeClr val="tx1"/>
+        </a:solidFill>
+        <a:latin typeface="+mn-lt"/>
+        <a:ea typeface="+mn-ea"/>
+        <a:cs typeface="+mn-cs"/>
+      </a:defRPr>
+    </a:lvl8pPr>
+    <a:lvl9pPr marL="3657600" algn="l" defTabSz="914400" rtl="0" eaLnBrk="1" latinLnBrk="0" hangingPunct="1">
+      <a:defRPr sz="1200" kern="1200">
+        <a:solidFill>
+          <a:schemeClr val="tx1"/>
+        </a:solidFill>
+        <a:latin typeface="+mn-lt"/>
+        <a:ea typeface="+mn-ea"/>
+        <a:cs typeface="+mn-cs"/>
+      </a:defRPr>
+    </a:lvl9pPr>
+  </p:notesStyle>
+</p:notesMaster>
+</file>
+
+<file path=ppt/notesSlides/notesSlide1.xml><?xml version="1.0" encoding="utf-8"?>
+<p:notes xmlns:a="http://schemas.openxmlformats.org/drawingml/2006/main" xmlns:r="http://schemas.openxmlformats.org/officeDocument/2006/relationships" xmlns:p="http://schemas.openxmlformats.org/presentationml/2006/main">
+  <p:cSld>
+    <p:spTree>
+      <p:nvGrpSpPr>
+        <p:cNvPr id="1" name=""/>
+        <p:cNvGrpSpPr/>
+        <p:nvPr/>
+      </p:nvGrpSpPr>
+      <p:grpSpPr>
+        <a:xfrm>
+          <a:off x="0" y="0"/>
+          <a:ext cx="0" cy="0"/>
+          <a:chOff x="0" y="0"/>
+          <a:chExt cx="0" cy="0"/>
+        </a:xfrm>
+      </p:grpSpPr>
+      <p:sp>
+        <p:nvSpPr>
+          <p:cNvPr id="2" name="Slide Image Placeholder 1"/>
+          <p:cNvSpPr>
+            <a:spLocks noGrp="1" noRot="1" noChangeAspect="1"/>
+          </p:cNvSpPr>
+          <p:nvPr>
+            <p:ph type="sldImg"/>
+          </p:nvPr>
+        </p:nvSpPr>
+        <p:spPr/>
+      </p:sp>
+      <p:sp>
+        <p:nvSpPr>
+          <p:cNvPr id="3" name="Notes Placeholder 2"/>
+          <p:cNvSpPr>
+            <a:spLocks noGrp="1"/>
+          </p:cNvSpPr>
+          <p:nvPr>
+            <p:ph type="body" idx="1"/>
+          </p:nvPr>
+        </p:nvSpPr>
+        <p:spPr/>
+        <p:txBody>
+          <a:bodyPr/>
+          <a:lstStyle/>
+          <a:p>
+            <a:r>
+              <a:rPr lang="en-US" noProof="0" dirty="0"/>
+              <a:t>Need to give the audience enough time to understand the code sample and its implications. When giving the presentation in-person, should ask for a show of hands if this is actually possible.</a:t>
+            </a:r>
+          </a:p>
+        </p:txBody>
+      </p:sp>
+      <p:sp>
+        <p:nvSpPr>
+          <p:cNvPr id="4" name="Slide Number Placeholder 3"/>
+          <p:cNvSpPr>
+            <a:spLocks noGrp="1"/>
+          </p:cNvSpPr>
+          <p:nvPr>
+            <p:ph type="sldNum" sz="quarter" idx="5"/>
+          </p:nvPr>
+        </p:nvSpPr>
+        <p:spPr/>
+        <p:txBody>
+          <a:bodyPr/>
+          <a:lstStyle/>
+          <a:p>
+            <a:fld id="{2B4F40D4-862D-491C-85E3-1A34EFA2BD00}" type="slidenum">
+              <a:rPr lang="en-US" smtClean="0"/>
+              <a:t>4</a:t>
+            </a:fld>
+            <a:endParaRPr lang="en-US"/>
+          </a:p>
+        </p:txBody>
+      </p:sp>
+    </p:spTree>
+    <p:extLst>
+      <p:ext uri="{BB962C8B-B14F-4D97-AF65-F5344CB8AC3E}">
+        <p14:creationId xmlns:p14="http://schemas.microsoft.com/office/powerpoint/2010/main" val="586819055"/>
+      </p:ext>
+    </p:extLst>
+  </p:cSld>
+  <p:clrMapOvr>
+    <a:masterClrMapping/>
+  </p:clrMapOvr>
+</p:notes>
+</file>
+
+<file path=ppt/notesSlides/notesSlide2.xml><?xml version="1.0" encoding="utf-8"?>
+<p:notes xmlns:a="http://schemas.openxmlformats.org/drawingml/2006/main" xmlns:r="http://schemas.openxmlformats.org/officeDocument/2006/relationships" xmlns:p="http://schemas.openxmlformats.org/presentationml/2006/main">
+  <p:cSld>
+    <p:spTree>
+      <p:nvGrpSpPr>
+        <p:cNvPr id="1" name=""/>
+        <p:cNvGrpSpPr/>
+        <p:nvPr/>
+      </p:nvGrpSpPr>
+      <p:grpSpPr>
+        <a:xfrm>
+          <a:off x="0" y="0"/>
+          <a:ext cx="0" cy="0"/>
+          <a:chOff x="0" y="0"/>
+          <a:chExt cx="0" cy="0"/>
+        </a:xfrm>
+      </p:grpSpPr>
+      <p:sp>
+        <p:nvSpPr>
+          <p:cNvPr id="2" name="Slide Image Placeholder 1"/>
+          <p:cNvSpPr>
+            <a:spLocks noGrp="1" noRot="1" noChangeAspect="1"/>
+          </p:cNvSpPr>
+          <p:nvPr>
+            <p:ph type="sldImg"/>
+          </p:nvPr>
+        </p:nvSpPr>
+        <p:spPr/>
+      </p:sp>
+      <p:sp>
+        <p:nvSpPr>
+          <p:cNvPr id="3" name="Notes Placeholder 2"/>
+          <p:cNvSpPr>
+            <a:spLocks noGrp="1"/>
+          </p:cNvSpPr>
+          <p:nvPr>
+            <p:ph type="body" idx="1"/>
+          </p:nvPr>
+        </p:nvSpPr>
+        <p:spPr/>
+        <p:txBody>
+          <a:bodyPr/>
+          <a:lstStyle/>
+          <a:p>
+            <a:r>
+              <a:rPr lang="en-US" noProof="0" dirty="0"/>
+              <a:t>Platform invoke is a bit of a misnomer stemming from the fact that a primary use case in the early days of .NET was to call Win32 APIs. Of course, like the more aptly named JNI, P/Invoke can be used to call any native library (assuming supported calling conventions). Also, these days the actual platform can be macOS (and its variations) and Linux in addition to Windows.</a:t>
+            </a:r>
+          </a:p>
+        </p:txBody>
+      </p:sp>
+      <p:sp>
+        <p:nvSpPr>
+          <p:cNvPr id="4" name="Slide Number Placeholder 3"/>
+          <p:cNvSpPr>
+            <a:spLocks noGrp="1"/>
+          </p:cNvSpPr>
+          <p:nvPr>
+            <p:ph type="sldNum" sz="quarter" idx="5"/>
+          </p:nvPr>
+        </p:nvSpPr>
+        <p:spPr/>
+        <p:txBody>
+          <a:bodyPr/>
+          <a:lstStyle/>
+          <a:p>
+            <a:fld id="{2B4F40D4-862D-491C-85E3-1A34EFA2BD00}" type="slidenum">
+              <a:rPr lang="en-US" smtClean="0"/>
+              <a:t>23</a:t>
+            </a:fld>
+            <a:endParaRPr lang="en-US"/>
+          </a:p>
+        </p:txBody>
+      </p:sp>
+    </p:spTree>
+    <p:extLst>
+      <p:ext uri="{BB962C8B-B14F-4D97-AF65-F5344CB8AC3E}">
+        <p14:creationId xmlns:p14="http://schemas.microsoft.com/office/powerpoint/2010/main" val="2569954282"/>
+      </p:ext>
+    </p:extLst>
+  </p:cSld>
+  <p:clrMapOvr>
+    <a:masterClrMapping/>
+  </p:clrMapOvr>
+</p:notes>
+</file>
+
 <file path=ppt/slideLayouts/slideLayout1.xml><?xml version="1.0" encoding="utf-8"?>
 <p:sldLayout xmlns:a="http://schemas.openxmlformats.org/drawingml/2006/main" xmlns:r="http://schemas.openxmlformats.org/officeDocument/2006/relationships" xmlns:p="http://schemas.openxmlformats.org/presentationml/2006/main" type="title" preserve="1">
   <p:cSld name="Title Slide">
@@ -349,7 +875,7 @@
           <a:p>
             <a:fld id="{F9BC75CE-03FF-4667-898C-4C70B4392062}" type="datetimeFigureOut">
               <a:rPr lang="en-US" smtClean="0"/>
-              <a:t>10/17/2022</a:t>
+              <a:t>10/23/2022</a:t>
             </a:fld>
             <a:endParaRPr lang="en-US"/>
           </a:p>
@@ -624,7 +1150,7 @@
           <a:p>
             <a:fld id="{F9BC75CE-03FF-4667-898C-4C70B4392062}" type="datetimeFigureOut">
               <a:rPr lang="en-US" smtClean="0"/>
-              <a:t>10/17/2022</a:t>
+              <a:t>10/23/2022</a:t>
             </a:fld>
             <a:endParaRPr lang="en-US"/>
           </a:p>
@@ -818,7 +1344,7 @@
           <a:p>
             <a:fld id="{F9BC75CE-03FF-4667-898C-4C70B4392062}" type="datetimeFigureOut">
               <a:rPr lang="en-US" smtClean="0"/>
-              <a:t>10/17/2022</a:t>
+              <a:t>10/23/2022</a:t>
             </a:fld>
             <a:endParaRPr lang="en-US"/>
           </a:p>
@@ -1091,7 +1617,7 @@
           <a:p>
             <a:fld id="{F9BC75CE-03FF-4667-898C-4C70B4392062}" type="datetimeFigureOut">
               <a:rPr lang="en-US" smtClean="0"/>
-              <a:t>10/17/2022</a:t>
+              <a:t>10/23/2022</a:t>
             </a:fld>
             <a:endParaRPr lang="en-US"/>
           </a:p>
@@ -1432,7 +1958,7 @@
           <a:p>
             <a:fld id="{F9BC75CE-03FF-4667-898C-4C70B4392062}" type="datetimeFigureOut">
               <a:rPr lang="en-US" smtClean="0"/>
-              <a:t>10/17/2022</a:t>
+              <a:t>10/23/2022</a:t>
             </a:fld>
             <a:endParaRPr lang="en-US"/>
           </a:p>
@@ -2055,7 +2581,7 @@
           <a:p>
             <a:fld id="{F9BC75CE-03FF-4667-898C-4C70B4392062}" type="datetimeFigureOut">
               <a:rPr lang="en-US" smtClean="0"/>
-              <a:t>10/17/2022</a:t>
+              <a:t>10/23/2022</a:t>
             </a:fld>
             <a:endParaRPr lang="en-US"/>
           </a:p>
@@ -2915,7 +3441,7 @@
           <a:p>
             <a:fld id="{F9BC75CE-03FF-4667-898C-4C70B4392062}" type="datetimeFigureOut">
               <a:rPr lang="en-US" smtClean="0"/>
-              <a:t>10/17/2022</a:t>
+              <a:t>10/23/2022</a:t>
             </a:fld>
             <a:endParaRPr lang="en-US"/>
           </a:p>
@@ -3085,7 +3611,7 @@
           <a:p>
             <a:fld id="{F9BC75CE-03FF-4667-898C-4C70B4392062}" type="datetimeFigureOut">
               <a:rPr lang="en-US" smtClean="0"/>
-              <a:t>10/17/2022</a:t>
+              <a:t>10/23/2022</a:t>
             </a:fld>
             <a:endParaRPr lang="en-US"/>
           </a:p>
@@ -3265,7 +3791,7 @@
           <a:p>
             <a:fld id="{F9BC75CE-03FF-4667-898C-4C70B4392062}" type="datetimeFigureOut">
               <a:rPr lang="en-US" smtClean="0"/>
-              <a:t>10/17/2022</a:t>
+              <a:t>10/23/2022</a:t>
             </a:fld>
             <a:endParaRPr lang="en-US"/>
           </a:p>
@@ -3435,7 +3961,7 @@
           <a:p>
             <a:fld id="{F9BC75CE-03FF-4667-898C-4C70B4392062}" type="datetimeFigureOut">
               <a:rPr lang="en-US" smtClean="0"/>
-              <a:t>10/17/2022</a:t>
+              <a:t>10/23/2022</a:t>
             </a:fld>
             <a:endParaRPr lang="en-US"/>
           </a:p>
@@ -3682,7 +4208,7 @@
           <a:p>
             <a:fld id="{F9BC75CE-03FF-4667-898C-4C70B4392062}" type="datetimeFigureOut">
               <a:rPr lang="en-US" smtClean="0"/>
-              <a:t>10/17/2022</a:t>
+              <a:t>10/23/2022</a:t>
             </a:fld>
             <a:endParaRPr lang="en-US"/>
           </a:p>
@@ -3974,7 +4500,7 @@
           <a:p>
             <a:fld id="{F9BC75CE-03FF-4667-898C-4C70B4392062}" type="datetimeFigureOut">
               <a:rPr lang="en-US" smtClean="0"/>
-              <a:t>10/17/2022</a:t>
+              <a:t>10/23/2022</a:t>
             </a:fld>
             <a:endParaRPr lang="en-US"/>
           </a:p>
@@ -4418,7 +4944,7 @@
           <a:p>
             <a:fld id="{F9BC75CE-03FF-4667-898C-4C70B4392062}" type="datetimeFigureOut">
               <a:rPr lang="en-US" smtClean="0"/>
-              <a:t>10/17/2022</a:t>
+              <a:t>10/23/2022</a:t>
             </a:fld>
             <a:endParaRPr lang="en-US"/>
           </a:p>
@@ -4536,7 +5062,7 @@
           <a:p>
             <a:fld id="{F9BC75CE-03FF-4667-898C-4C70B4392062}" type="datetimeFigureOut">
               <a:rPr lang="en-US" smtClean="0"/>
-              <a:t>10/17/2022</a:t>
+              <a:t>10/23/2022</a:t>
             </a:fld>
             <a:endParaRPr lang="en-US"/>
           </a:p>
@@ -4631,7 +5157,7 @@
           <a:p>
             <a:fld id="{F9BC75CE-03FF-4667-898C-4C70B4392062}" type="datetimeFigureOut">
               <a:rPr lang="en-US" smtClean="0"/>
-              <a:t>10/17/2022</a:t>
+              <a:t>10/23/2022</a:t>
             </a:fld>
             <a:endParaRPr lang="en-US"/>
           </a:p>
@@ -4910,7 +5436,7 @@
           <a:p>
             <a:fld id="{F9BC75CE-03FF-4667-898C-4C70B4392062}" type="datetimeFigureOut">
               <a:rPr lang="en-US" smtClean="0"/>
-              <a:t>10/17/2022</a:t>
+              <a:t>10/23/2022</a:t>
             </a:fld>
             <a:endParaRPr lang="en-US"/>
           </a:p>
@@ -5185,7 +5711,7 @@
           <a:p>
             <a:fld id="{F9BC75CE-03FF-4667-898C-4C70B4392062}" type="datetimeFigureOut">
               <a:rPr lang="en-US" smtClean="0"/>
-              <a:t>10/17/2022</a:t>
+              <a:t>10/23/2022</a:t>
             </a:fld>
             <a:endParaRPr lang="en-US"/>
           </a:p>
@@ -5614,7 +6140,7 @@
           <a:p>
             <a:fld id="{F9BC75CE-03FF-4667-898C-4C70B4392062}" type="datetimeFigureOut">
               <a:rPr lang="en-US" smtClean="0"/>
-              <a:t>10/17/2022</a:t>
+              <a:t>10/23/2022</a:t>
             </a:fld>
             <a:endParaRPr lang="en-US"/>
           </a:p>
@@ -6767,7 +7293,7 @@
           <a:p>
             <a:r>
               <a:rPr lang="en-US" sz="1200" dirty="0"/>
-              <a:t>Rev. 3 (2022-10-17), </a:t>
+              <a:t>Rev. 4 (2022-10-??), </a:t>
             </a:r>
             <a:r>
               <a:rPr lang="en-US" sz="1200" dirty="0">
@@ -9586,7 +10112,12 @@
             <p:ph type="title"/>
           </p:nvPr>
         </p:nvSpPr>
-        <p:spPr/>
+        <p:spPr>
+          <a:xfrm>
+            <a:off x="646111" y="465782"/>
+            <a:ext cx="9404723" cy="1400530"/>
+          </a:xfrm>
+        </p:spPr>
         <p:txBody>
           <a:bodyPr/>
           <a:lstStyle/>
@@ -9621,7 +10152,7 @@
         </p:nvSpPr>
         <p:spPr bwMode="auto">
           <a:xfrm>
-            <a:off x="1103313" y="2052917"/>
+            <a:off x="1103313" y="2049651"/>
             <a:ext cx="8946540" cy="4195481"/>
           </a:xfrm>
           <a:prstGeom prst="rect">
@@ -10486,6 +11017,50 @@
           </a:p>
         </p:txBody>
       </p:sp>
+      <p:pic>
+        <p:nvPicPr>
+          <p:cNvPr id="5" name="Picture 4" descr="Question &quot;Any way to use stackalloc while avoiding stackoverflow exception&quot; on stackoverflow.com">
+            <a:extLst>
+              <a:ext uri="{FF2B5EF4-FFF2-40B4-BE49-F238E27FC236}">
+                <a16:creationId xmlns:a16="http://schemas.microsoft.com/office/drawing/2014/main" id="{491DC914-E2C4-07BA-8293-36B6F0EC86B3}"/>
+              </a:ext>
+            </a:extLst>
+          </p:cNvPr>
+          <p:cNvPicPr>
+            <a:picLocks noChangeAspect="1"/>
+          </p:cNvPicPr>
+          <p:nvPr/>
+        </p:nvPicPr>
+        <p:blipFill>
+          <a:blip r:embed="rId2"/>
+          <a:stretch>
+            <a:fillRect/>
+          </a:stretch>
+        </p:blipFill>
+        <p:spPr>
+          <a:xfrm>
+            <a:off x="2844437" y="1880290"/>
+            <a:ext cx="8942546" cy="2712625"/>
+          </a:xfrm>
+          <a:prstGeom prst="rect">
+            <a:avLst/>
+          </a:prstGeom>
+          <a:ln w="15875">
+            <a:solidFill>
+              <a:schemeClr val="accent1"/>
+            </a:solidFill>
+          </a:ln>
+          <a:effectLst>
+            <a:outerShdw blurRad="127000" dist="127000" dir="2700000" algn="tl" rotWithShape="0">
+              <a:schemeClr val="bg1">
+                <a:lumMod val="95000"/>
+                <a:lumOff val="5000"/>
+                <a:alpha val="80000"/>
+              </a:schemeClr>
+            </a:outerShdw>
+          </a:effectLst>
+        </p:spPr>
+      </p:pic>
     </p:spTree>
     <p:extLst>
       <p:ext uri="{BB962C8B-B14F-4D97-AF65-F5344CB8AC3E}">
@@ -10496,6 +11071,81 @@
   <p:clrMapOvr>
     <a:masterClrMapping/>
   </p:clrMapOvr>
+  <p:timing>
+    <p:tnLst>
+      <p:par>
+        <p:cTn id="1" dur="indefinite" restart="never" nodeType="tmRoot">
+          <p:childTnLst>
+            <p:seq concurrent="1" nextAc="seek">
+              <p:cTn id="2" dur="indefinite" nodeType="mainSeq">
+                <p:childTnLst>
+                  <p:par>
+                    <p:cTn id="3" fill="hold">
+                      <p:stCondLst>
+                        <p:cond delay="indefinite"/>
+                      </p:stCondLst>
+                      <p:childTnLst>
+                        <p:par>
+                          <p:cTn id="4" fill="hold">
+                            <p:stCondLst>
+                              <p:cond delay="0"/>
+                            </p:stCondLst>
+                            <p:childTnLst>
+                              <p:par>
+                                <p:cTn id="5" presetID="1" presetClass="entr" presetSubtype="0" fill="hold" nodeType="clickEffect">
+                                  <p:stCondLst>
+                                    <p:cond delay="0"/>
+                                  </p:stCondLst>
+                                  <p:childTnLst>
+                                    <p:set>
+                                      <p:cBhvr>
+                                        <p:cTn id="6" dur="1" fill="hold">
+                                          <p:stCondLst>
+                                            <p:cond delay="0"/>
+                                          </p:stCondLst>
+                                        </p:cTn>
+                                        <p:tgtEl>
+                                          <p:spTgt spid="5"/>
+                                        </p:tgtEl>
+                                        <p:attrNameLst>
+                                          <p:attrName>style.visibility</p:attrName>
+                                        </p:attrNameLst>
+                                      </p:cBhvr>
+                                      <p:to>
+                                        <p:strVal val="visible"/>
+                                      </p:to>
+                                    </p:set>
+                                  </p:childTnLst>
+                                </p:cTn>
+                              </p:par>
+                            </p:childTnLst>
+                          </p:cTn>
+                        </p:par>
+                      </p:childTnLst>
+                    </p:cTn>
+                  </p:par>
+                </p:childTnLst>
+              </p:cTn>
+              <p:prevCondLst>
+                <p:cond evt="onPrev" delay="0">
+                  <p:tgtEl>
+                    <p:sldTgt/>
+                  </p:tgtEl>
+                </p:cond>
+              </p:prevCondLst>
+              <p:nextCondLst>
+                <p:cond evt="onNext" delay="0">
+                  <p:tgtEl>
+                    <p:sldTgt/>
+                  </p:tgtEl>
+                </p:cond>
+              </p:nextCondLst>
+            </p:seq>
+          </p:childTnLst>
+        </p:cTn>
+      </p:par>
+    </p:tnLst>
+  </p:timing>
 </p:sld>
 </file>
 
@@ -21995,6 +22645,94 @@
           </a:effectLst>
         </p:spPr>
       </p:pic>
+      <p:pic>
+        <p:nvPicPr>
+          <p:cNvPr id="4" name="Picture 3" descr="Microsoft.Data.Sqlite overview:&#10;Microsoft.Data.Sqlite is a lightweight ADO.NET provider for SQLite. The Entity Framework Core provider for SQLite is built on top of this library. However, it can also be used independently or with other data access libraries.">
+            <a:extLst>
+              <a:ext uri="{FF2B5EF4-FFF2-40B4-BE49-F238E27FC236}">
+                <a16:creationId xmlns:a16="http://schemas.microsoft.com/office/drawing/2014/main" id="{C0FA53F1-FDCD-2689-0141-34700ACD2DF4}"/>
+              </a:ext>
+            </a:extLst>
+          </p:cNvPr>
+          <p:cNvPicPr>
+            <a:picLocks noChangeAspect="1"/>
+          </p:cNvPicPr>
+          <p:nvPr/>
+        </p:nvPicPr>
+        <p:blipFill>
+          <a:blip r:embed="rId3"/>
+          <a:stretch>
+            <a:fillRect/>
+          </a:stretch>
+        </p:blipFill>
+        <p:spPr>
+          <a:xfrm>
+            <a:off x="281076" y="1894579"/>
+            <a:ext cx="6474286" cy="3454000"/>
+          </a:xfrm>
+          <a:prstGeom prst="rect">
+            <a:avLst/>
+          </a:prstGeom>
+          <a:ln w="15875">
+            <a:solidFill>
+              <a:schemeClr val="accent1"/>
+            </a:solidFill>
+          </a:ln>
+          <a:effectLst>
+            <a:outerShdw blurRad="127000" dist="127000" dir="2700000" algn="tl" rotWithShape="0">
+              <a:schemeClr val="bg1">
+                <a:lumMod val="95000"/>
+                <a:lumOff val="5000"/>
+                <a:alpha val="80000"/>
+              </a:schemeClr>
+            </a:outerShdw>
+          </a:effectLst>
+        </p:spPr>
+      </p:pic>
+      <p:pic>
+        <p:nvPicPr>
+          <p:cNvPr id="8" name="Picture 7" descr="SQLite EF Core Database Provider:&#10;This database provider allows Entity Framework Core to be used with SQLite. The provider is maintained as part of the Entity Framework Core project.">
+            <a:extLst>
+              <a:ext uri="{FF2B5EF4-FFF2-40B4-BE49-F238E27FC236}">
+                <a16:creationId xmlns:a16="http://schemas.microsoft.com/office/drawing/2014/main" id="{10738902-C004-D4E2-31BE-1B7B13927EC9}"/>
+              </a:ext>
+            </a:extLst>
+          </p:cNvPr>
+          <p:cNvPicPr>
+            <a:picLocks noChangeAspect="1"/>
+          </p:cNvPicPr>
+          <p:nvPr/>
+        </p:nvPicPr>
+        <p:blipFill>
+          <a:blip r:embed="rId4"/>
+          <a:stretch>
+            <a:fillRect/>
+          </a:stretch>
+        </p:blipFill>
+        <p:spPr>
+          <a:xfrm>
+            <a:off x="5453104" y="3399445"/>
+            <a:ext cx="6408286" cy="3146000"/>
+          </a:xfrm>
+          <a:prstGeom prst="rect">
+            <a:avLst/>
+          </a:prstGeom>
+          <a:ln w="15875">
+            <a:solidFill>
+              <a:schemeClr val="accent1"/>
+            </a:solidFill>
+          </a:ln>
+          <a:effectLst>
+            <a:outerShdw blurRad="127000" dist="127000" dir="2700000" algn="tl" rotWithShape="0">
+              <a:schemeClr val="bg1">
+                <a:lumMod val="95000"/>
+                <a:lumOff val="5000"/>
+                <a:alpha val="80000"/>
+              </a:schemeClr>
+            </a:outerShdw>
+          </a:effectLst>
+        </p:spPr>
+      </p:pic>
     </p:spTree>
     <p:extLst>
       <p:ext uri="{BB962C8B-B14F-4D97-AF65-F5344CB8AC3E}">
@@ -22040,6 +22778,96 @@
                                         </p:cTn>
                                         <p:tgtEl>
                                           <p:spTgt spid="6"/>
+                                        </p:tgtEl>
+                                        <p:attrNameLst>
+                                          <p:attrName>style.visibility</p:attrName>
+                                        </p:attrNameLst>
+                                      </p:cBhvr>
+                                      <p:to>
+                                        <p:strVal val="visible"/>
+                                      </p:to>
+                                    </p:set>
+                                  </p:childTnLst>
+                                </p:cTn>
+                              </p:par>
+                            </p:childTnLst>
+                          </p:cTn>
+                        </p:par>
+                      </p:childTnLst>
+                    </p:cTn>
+                  </p:par>
+                  <p:par>
+                    <p:cTn id="7" fill="hold">
+                      <p:stCondLst>
+                        <p:cond delay="indefinite"/>
+                      </p:stCondLst>
+                      <p:childTnLst>
+                        <p:par>
+                          <p:cTn id="8" fill="hold">
+                            <p:stCondLst>
+                              <p:cond delay="0"/>
+                            </p:stCondLst>
+                            <p:childTnLst>
+                              <p:par>
+                                <p:cTn id="9" presetID="1" presetClass="entr" presetSubtype="0" fill="hold" nodeType="clickEffect">
+                                  <p:stCondLst>
+                                    <p:cond delay="0"/>
+                                  </p:stCondLst>
+                                  <p:childTnLst>
+                                    <p:set>
+                                      <p:cBhvr>
+                                        <p:cTn id="10" dur="1" fill="hold">
+                                          <p:stCondLst>
+                                            <p:cond delay="0"/>
+                                          </p:stCondLst>
+                                        </p:cTn>
+                                        <p:tgtEl>
+                                          <p:spTgt spid="4"/>
+                                        </p:tgtEl>
+                                        <p:attrNameLst>
+                                          <p:attrName>style.visibility</p:attrName>
+                                        </p:attrNameLst>
+                                      </p:cBhvr>
+                                      <p:to>
+                                        <p:strVal val="visible"/>
+                                      </p:to>
+                                    </p:set>
+                                  </p:childTnLst>
+                                </p:cTn>
+                              </p:par>
+                            </p:childTnLst>
+                          </p:cTn>
+                        </p:par>
+                      </p:childTnLst>
+                    </p:cTn>
+                  </p:par>
+                  <p:par>
+                    <p:cTn id="11" fill="hold">
+                      <p:stCondLst>
+                        <p:cond delay="indefinite"/>
+                      </p:stCondLst>
+                      <p:childTnLst>
+                        <p:par>
+                          <p:cTn id="12" fill="hold">
+                            <p:stCondLst>
+                              <p:cond delay="0"/>
+                            </p:stCondLst>
+                            <p:childTnLst>
+                              <p:par>
+                                <p:cTn id="13" presetID="1" presetClass="entr" presetSubtype="0" fill="hold" nodeType="clickEffect">
+                                  <p:stCondLst>
+                                    <p:cond delay="0"/>
+                                  </p:stCondLst>
+                                  <p:childTnLst>
+                                    <p:set>
+                                      <p:cBhvr>
+                                        <p:cTn id="14" dur="1" fill="hold">
+                                          <p:stCondLst>
+                                            <p:cond delay="0"/>
+                                          </p:stCondLst>
+                                        </p:cTn>
+                                        <p:tgtEl>
+                                          <p:spTgt spid="8"/>
                                         </p:tgtEl>
                                         <p:attrNameLst>
                                           <p:attrName>style.visibility</p:attrName>
@@ -43212,8 +44040,303 @@
 </a:theme>
 </file>
 
+<file path=ppt/theme/theme2.xml><?xml version="1.0" encoding="utf-8"?>
+<a:theme xmlns:a="http://schemas.openxmlformats.org/drawingml/2006/main" name="Office Theme">
+  <a:themeElements>
+    <a:clrScheme name="Office">
+      <a:dk1>
+        <a:sysClr val="windowText" lastClr="000000"/>
+      </a:dk1>
+      <a:lt1>
+        <a:sysClr val="window" lastClr="FFFFFF"/>
+      </a:lt1>
+      <a:dk2>
+        <a:srgbClr val="44546A"/>
+      </a:dk2>
+      <a:lt2>
+        <a:srgbClr val="E7E6E6"/>
+      </a:lt2>
+      <a:accent1>
+        <a:srgbClr val="4472C4"/>
+      </a:accent1>
+      <a:accent2>
+        <a:srgbClr val="ED7D31"/>
+      </a:accent2>
+      <a:accent3>
+        <a:srgbClr val="A5A5A5"/>
+      </a:accent3>
+      <a:accent4>
+        <a:srgbClr val="FFC000"/>
+      </a:accent4>
+      <a:accent5>
+        <a:srgbClr val="5B9BD5"/>
+      </a:accent5>
+      <a:accent6>
+        <a:srgbClr val="70AD47"/>
+      </a:accent6>
+      <a:hlink>
+        <a:srgbClr val="0563C1"/>
+      </a:hlink>
+      <a:folHlink>
+        <a:srgbClr val="954F72"/>
+      </a:folHlink>
+    </a:clrScheme>
+    <a:fontScheme name="Office">
+      <a:majorFont>
+        <a:latin typeface="Calibri Light" panose="020F0302020204030204"/>
+        <a:ea typeface=""/>
+        <a:cs typeface=""/>
+        <a:font script="Jpan" typeface="游ゴシック Light"/>
+        <a:font script="Hang" typeface="맑은 고딕"/>
+        <a:font script="Hans" typeface="等线 Light"/>
+        <a:font script="Hant" typeface="新細明體"/>
+        <a:font script="Arab" typeface="Times New Roman"/>
+        <a:font script="Hebr" typeface="Times New Roman"/>
+        <a:font script="Thai" typeface="Angsana New"/>
+        <a:font script="Ethi" typeface="Nyala"/>
+        <a:font script="Beng" typeface="Vrinda"/>
+        <a:font script="Gujr" typeface="Shruti"/>
+        <a:font script="Khmr" typeface="MoolBoran"/>
+        <a:font script="Knda" typeface="Tunga"/>
+        <a:font script="Guru" typeface="Raavi"/>
+        <a:font script="Cans" typeface="Euphemia"/>
+        <a:font script="Cher" typeface="Plantagenet Cherokee"/>
+        <a:font script="Yiii" typeface="Microsoft Yi Baiti"/>
+        <a:font script="Tibt" typeface="Microsoft Himalaya"/>
+        <a:font script="Thaa" typeface="MV Boli"/>
+        <a:font script="Deva" typeface="Mangal"/>
+        <a:font script="Telu" typeface="Gautami"/>
+        <a:font script="Taml" typeface="Latha"/>
+        <a:font script="Syrc" typeface="Estrangelo Edessa"/>
+        <a:font script="Orya" typeface="Kalinga"/>
+        <a:font script="Mlym" typeface="Kartika"/>
+        <a:font script="Laoo" typeface="DokChampa"/>
+        <a:font script="Sinh" typeface="Iskoola Pota"/>
+        <a:font script="Mong" typeface="Mongolian Baiti"/>
+        <a:font script="Viet" typeface="Times New Roman"/>
+        <a:font script="Uigh" typeface="Microsoft Uighur"/>
+        <a:font script="Geor" typeface="Sylfaen"/>
+        <a:font script="Armn" typeface="Arial"/>
+        <a:font script="Bugi" typeface="Leelawadee UI"/>
+        <a:font script="Bopo" typeface="Microsoft JhengHei"/>
+        <a:font script="Java" typeface="Javanese Text"/>
+        <a:font script="Lisu" typeface="Segoe UI"/>
+        <a:font script="Mymr" typeface="Myanmar Text"/>
+        <a:font script="Nkoo" typeface="Ebrima"/>
+        <a:font script="Olck" typeface="Nirmala UI"/>
+        <a:font script="Osma" typeface="Ebrima"/>
+        <a:font script="Phag" typeface="Phagspa"/>
+        <a:font script="Syrn" typeface="Estrangelo Edessa"/>
+        <a:font script="Syrj" typeface="Estrangelo Edessa"/>
+        <a:font script="Syre" typeface="Estrangelo Edessa"/>
+        <a:font script="Sora" typeface="Nirmala UI"/>
+        <a:font script="Tale" typeface="Microsoft Tai Le"/>
+        <a:font script="Talu" typeface="Microsoft New Tai Lue"/>
+        <a:font script="Tfng" typeface="Ebrima"/>
+      </a:majorFont>
+      <a:minorFont>
+        <a:latin typeface="Calibri" panose="020F0502020204030204"/>
+        <a:ea typeface=""/>
+        <a:cs typeface=""/>
+        <a:font script="Jpan" typeface="游ゴシック"/>
+        <a:font script="Hang" typeface="맑은 고딕"/>
+        <a:font script="Hans" typeface="等线"/>
+        <a:font script="Hant" typeface="新細明體"/>
+        <a:font script="Arab" typeface="Arial"/>
+        <a:font script="Hebr" typeface="Arial"/>
+        <a:font script="Thai" typeface="Cordia New"/>
+        <a:font script="Ethi" typeface="Nyala"/>
+        <a:font script="Beng" typeface="Vrinda"/>
+        <a:font script="Gujr" typeface="Shruti"/>
+        <a:font script="Khmr" typeface="DaunPenh"/>
+        <a:font script="Knda" typeface="Tunga"/>
+        <a:font script="Guru" typeface="Raavi"/>
+        <a:font script="Cans" typeface="Euphemia"/>
+        <a:font script="Cher" typeface="Plantagenet Cherokee"/>
+        <a:font script="Yiii" typeface="Microsoft Yi Baiti"/>
+        <a:font script="Tibt" typeface="Microsoft Himalaya"/>
+        <a:font script="Thaa" typeface="MV Boli"/>
+        <a:font script="Deva" typeface="Mangal"/>
+        <a:font script="Telu" typeface="Gautami"/>
+        <a:font script="Taml" typeface="Latha"/>
+        <a:font script="Syrc" typeface="Estrangelo Edessa"/>
+        <a:font script="Orya" typeface="Kalinga"/>
+        <a:font script="Mlym" typeface="Kartika"/>
+        <a:font script="Laoo" typeface="DokChampa"/>
+        <a:font script="Sinh" typeface="Iskoola Pota"/>
+        <a:font script="Mong" typeface="Mongolian Baiti"/>
+        <a:font script="Viet" typeface="Arial"/>
+        <a:font script="Uigh" typeface="Microsoft Uighur"/>
+        <a:font script="Geor" typeface="Sylfaen"/>
+        <a:font script="Armn" typeface="Arial"/>
+        <a:font script="Bugi" typeface="Leelawadee UI"/>
+        <a:font script="Bopo" typeface="Microsoft JhengHei"/>
+        <a:font script="Java" typeface="Javanese Text"/>
+        <a:font script="Lisu" typeface="Segoe UI"/>
+        <a:font script="Mymr" typeface="Myanmar Text"/>
+        <a:font script="Nkoo" typeface="Ebrima"/>
+        <a:font script="Olck" typeface="Nirmala UI"/>
+        <a:font script="Osma" typeface="Ebrima"/>
+        <a:font script="Phag" typeface="Phagspa"/>
+        <a:font script="Syrn" typeface="Estrangelo Edessa"/>
+        <a:font script="Syrj" typeface="Estrangelo Edessa"/>
+        <a:font script="Syre" typeface="Estrangelo Edessa"/>
+        <a:font script="Sora" typeface="Nirmala UI"/>
+        <a:font script="Tale" typeface="Microsoft Tai Le"/>
+        <a:font script="Talu" typeface="Microsoft New Tai Lue"/>
+        <a:font script="Tfng" typeface="Ebrima"/>
+      </a:minorFont>
+    </a:fontScheme>
+    <a:fmtScheme name="Office">
+      <a:fillStyleLst>
+        <a:solidFill>
+          <a:schemeClr val="phClr"/>
+        </a:solidFill>
+        <a:gradFill rotWithShape="1">
+          <a:gsLst>
+            <a:gs pos="0">
+              <a:schemeClr val="phClr">
+                <a:lumMod val="110000"/>
+                <a:satMod val="105000"/>
+                <a:tint val="67000"/>
+              </a:schemeClr>
+            </a:gs>
+            <a:gs pos="50000">
+              <a:schemeClr val="phClr">
+                <a:lumMod val="105000"/>
+                <a:satMod val="103000"/>
+                <a:tint val="73000"/>
+              </a:schemeClr>
+            </a:gs>
+            <a:gs pos="100000">
+              <a:schemeClr val="phClr">
+                <a:lumMod val="105000"/>
+                <a:satMod val="109000"/>
+                <a:tint val="81000"/>
+              </a:schemeClr>
+            </a:gs>
+          </a:gsLst>
+          <a:lin ang="5400000" scaled="0"/>
+        </a:gradFill>
+        <a:gradFill rotWithShape="1">
+          <a:gsLst>
+            <a:gs pos="0">
+              <a:schemeClr val="phClr">
+                <a:satMod val="103000"/>
+                <a:lumMod val="102000"/>
+                <a:tint val="94000"/>
+              </a:schemeClr>
+            </a:gs>
+            <a:gs pos="50000">
+              <a:schemeClr val="phClr">
+                <a:satMod val="110000"/>
+                <a:lumMod val="100000"/>
+                <a:shade val="100000"/>
+              </a:schemeClr>
+            </a:gs>
+            <a:gs pos="100000">
+              <a:schemeClr val="phClr">
+                <a:lumMod val="99000"/>
+                <a:satMod val="120000"/>
+                <a:shade val="78000"/>
+              </a:schemeClr>
+            </a:gs>
+          </a:gsLst>
+          <a:lin ang="5400000" scaled="0"/>
+        </a:gradFill>
+      </a:fillStyleLst>
+      <a:lnStyleLst>
+        <a:ln w="6350" cap="flat" cmpd="sng" algn="ctr">
+          <a:solidFill>
+            <a:schemeClr val="phClr"/>
+          </a:solidFill>
+          <a:prstDash val="solid"/>
+          <a:miter lim="800000"/>
+        </a:ln>
+        <a:ln w="12700" cap="flat" cmpd="sng" algn="ctr">
+          <a:solidFill>
+            <a:schemeClr val="phClr"/>
+          </a:solidFill>
+          <a:prstDash val="solid"/>
+          <a:miter lim="800000"/>
+        </a:ln>
+        <a:ln w="19050" cap="flat" cmpd="sng" algn="ctr">
+          <a:solidFill>
+            <a:schemeClr val="phClr"/>
+          </a:solidFill>
+          <a:prstDash val="solid"/>
+          <a:miter lim="800000"/>
+        </a:ln>
+      </a:lnStyleLst>
+      <a:effectStyleLst>
+        <a:effectStyle>
+          <a:effectLst/>
+        </a:effectStyle>
+        <a:effectStyle>
+          <a:effectLst/>
+        </a:effectStyle>
+        <a:effectStyle>
+          <a:effectLst>
+            <a:outerShdw blurRad="57150" dist="19050" dir="5400000" algn="ctr" rotWithShape="0">
+              <a:srgbClr val="000000">
+                <a:alpha val="63000"/>
+              </a:srgbClr>
+            </a:outerShdw>
+          </a:effectLst>
+        </a:effectStyle>
+      </a:effectStyleLst>
+      <a:bgFillStyleLst>
+        <a:solidFill>
+          <a:schemeClr val="phClr"/>
+        </a:solidFill>
+        <a:solidFill>
+          <a:schemeClr val="phClr">
+            <a:tint val="95000"/>
+            <a:satMod val="170000"/>
+          </a:schemeClr>
+        </a:solidFill>
+        <a:gradFill rotWithShape="1">
+          <a:gsLst>
+            <a:gs pos="0">
+              <a:schemeClr val="phClr">
+                <a:tint val="93000"/>
+                <a:satMod val="150000"/>
+                <a:shade val="98000"/>
+                <a:lumMod val="102000"/>
+              </a:schemeClr>
+            </a:gs>
+            <a:gs pos="50000">
+              <a:schemeClr val="phClr">
+                <a:tint val="98000"/>
+                <a:satMod val="130000"/>
+                <a:shade val="90000"/>
+                <a:lumMod val="103000"/>
+              </a:schemeClr>
+            </a:gs>
+            <a:gs pos="100000">
+              <a:schemeClr val="phClr">
+                <a:shade val="63000"/>
+                <a:satMod val="120000"/>
+              </a:schemeClr>
+            </a:gs>
+          </a:gsLst>
+          <a:lin ang="5400000" scaled="0"/>
+        </a:gradFill>
+      </a:bgFillStyleLst>
+    </a:fmtScheme>
+  </a:themeElements>
+  <a:objectDefaults/>
+  <a:extraClrSchemeLst/>
+  <a:extLst>
+    <a:ext uri="{05A4C25C-085E-4340-85A3-A5531E510DB2}">
+      <thm15:themeFamily xmlns:thm15="http://schemas.microsoft.com/office/thememl/2012/main" name="Office Theme" id="{62F939B6-93AF-4DB8-9C6B-D6C7DFDC589F}" vid="{4A3C46E8-61CC-4603-A589-7422A47A8E4A}"/>
+    </a:ext>
+  </a:extLst>
+</a:theme>
+</file>
+
 <file path=docMetadata/LabelInfo.xml><?xml version="1.0" encoding="utf-8"?>
 <clbl:labelList xmlns:clbl="http://schemas.microsoft.com/office/2020/mipLabelMetadata">
-  <clbl:label id="{f42aa342-8706-4288-bd11-ebb85995028c}" enabled="1" method="Standard" siteId="{72f988bf-86f1-41af-91ab-2d7cd011db47}" contentBits="0" removed="0"/>
+  <clbl:label id="{87867195-f2b8-4ac2-b0b6-6bb73cb33afc}" enabled="1" method="Privileged" siteId="{72f988bf-86f1-41af-91ab-2d7cd011db47}" contentBits="0" removed="0"/>
 </clbl:labelList>
 </file>
</xml_diff>

<commit_message>
Added note for opening
</commit_message>
<xml_diff>
--- a/doc/Introduction to unsafe C#.pptx
+++ b/doc/Introduction to unsafe C#.pptx
@@ -561,6 +561,93 @@
           <a:p>
             <a:r>
               <a:rPr lang="en-US" noProof="0" dirty="0"/>
+              <a:t>Why call native code in the first place? There may not be any managed wrappers available. Existing wrappers may not provide a suitable API for your use case. You may want to create your own high-performance or platform-specific native code (out of scope for this presentation).</a:t>
+            </a:r>
+          </a:p>
+        </p:txBody>
+      </p:sp>
+      <p:sp>
+        <p:nvSpPr>
+          <p:cNvPr id="4" name="Slide Number Placeholder 3"/>
+          <p:cNvSpPr>
+            <a:spLocks noGrp="1"/>
+          </p:cNvSpPr>
+          <p:nvPr>
+            <p:ph type="sldNum" sz="quarter" idx="5"/>
+          </p:nvPr>
+        </p:nvSpPr>
+        <p:spPr/>
+        <p:txBody>
+          <a:bodyPr/>
+          <a:lstStyle/>
+          <a:p>
+            <a:fld id="{2B4F40D4-862D-491C-85E3-1A34EFA2BD00}" type="slidenum">
+              <a:rPr lang="en-US" smtClean="0"/>
+              <a:t>1</a:t>
+            </a:fld>
+            <a:endParaRPr lang="en-US"/>
+          </a:p>
+        </p:txBody>
+      </p:sp>
+    </p:spTree>
+    <p:extLst>
+      <p:ext uri="{BB962C8B-B14F-4D97-AF65-F5344CB8AC3E}">
+        <p14:creationId xmlns:p14="http://schemas.microsoft.com/office/powerpoint/2010/main" val="2706683152"/>
+      </p:ext>
+    </p:extLst>
+  </p:cSld>
+  <p:clrMapOvr>
+    <a:masterClrMapping/>
+  </p:clrMapOvr>
+</p:notes>
+</file>
+
+<file path=ppt/notesSlides/notesSlide2.xml><?xml version="1.0" encoding="utf-8"?>
+<p:notes xmlns:a="http://schemas.openxmlformats.org/drawingml/2006/main" xmlns:r="http://schemas.openxmlformats.org/officeDocument/2006/relationships" xmlns:p="http://schemas.openxmlformats.org/presentationml/2006/main">
+  <p:cSld>
+    <p:spTree>
+      <p:nvGrpSpPr>
+        <p:cNvPr id="1" name=""/>
+        <p:cNvGrpSpPr/>
+        <p:nvPr/>
+      </p:nvGrpSpPr>
+      <p:grpSpPr>
+        <a:xfrm>
+          <a:off x="0" y="0"/>
+          <a:ext cx="0" cy="0"/>
+          <a:chOff x="0" y="0"/>
+          <a:chExt cx="0" cy="0"/>
+        </a:xfrm>
+      </p:grpSpPr>
+      <p:sp>
+        <p:nvSpPr>
+          <p:cNvPr id="2" name="Slide Image Placeholder 1"/>
+          <p:cNvSpPr>
+            <a:spLocks noGrp="1" noRot="1" noChangeAspect="1"/>
+          </p:cNvSpPr>
+          <p:nvPr>
+            <p:ph type="sldImg"/>
+          </p:nvPr>
+        </p:nvSpPr>
+        <p:spPr/>
+      </p:sp>
+      <p:sp>
+        <p:nvSpPr>
+          <p:cNvPr id="3" name="Notes Placeholder 2"/>
+          <p:cNvSpPr>
+            <a:spLocks noGrp="1"/>
+          </p:cNvSpPr>
+          <p:nvPr>
+            <p:ph type="body" idx="1"/>
+          </p:nvPr>
+        </p:nvSpPr>
+        <p:spPr/>
+        <p:txBody>
+          <a:bodyPr/>
+          <a:lstStyle/>
+          <a:p>
+            <a:r>
+              <a:rPr lang="en-US" noProof="0" dirty="0"/>
               <a:t>Need to give the audience enough time to understand the code sample and its implications. When giving the presentation in-person, should ask for a show of hands if this is actually possible.</a:t>
             </a:r>
           </a:p>
@@ -602,7 +689,7 @@
 </p:notes>
 </file>
 
-<file path=ppt/notesSlides/notesSlide2.xml><?xml version="1.0" encoding="utf-8"?>
+<file path=ppt/notesSlides/notesSlide3.xml><?xml version="1.0" encoding="utf-8"?>
 <p:notes xmlns:a="http://schemas.openxmlformats.org/drawingml/2006/main" xmlns:r="http://schemas.openxmlformats.org/officeDocument/2006/relationships" xmlns:p="http://schemas.openxmlformats.org/presentationml/2006/main">
   <p:cSld>
     <p:spTree>
@@ -7297,7 +7384,7 @@
             </a:r>
             <a:r>
               <a:rPr lang="en-US" sz="1200" dirty="0">
-                <a:hlinkClick r:id="rId2"/>
+                <a:hlinkClick r:id="rId3"/>
               </a:rPr>
               <a:t>https://github.com/dennisdietrich/UnsafeCSharp/</a:t>
             </a:r>

</xml_diff>

<commit_message>
Updates based on feedback from last dry run
</commit_message>
<xml_diff>
--- a/doc/Introduction to unsafe C#.pptx
+++ b/doc/Introduction to unsafe C#.pptx
@@ -248,7 +248,7 @@
           <a:p>
             <a:fld id="{2B6DBF41-98D5-4B29-8B81-B31614D19ACC}" type="datetimeFigureOut">
               <a:rPr lang="en-US" smtClean="0"/>
-              <a:t>10/23/2022</a:t>
+              <a:t>11/7/2022</a:t>
             </a:fld>
             <a:endParaRPr lang="en-US"/>
           </a:p>
@@ -962,7 +962,7 @@
           <a:p>
             <a:fld id="{F9BC75CE-03FF-4667-898C-4C70B4392062}" type="datetimeFigureOut">
               <a:rPr lang="en-US" smtClean="0"/>
-              <a:t>10/23/2022</a:t>
+              <a:t>11/7/2022</a:t>
             </a:fld>
             <a:endParaRPr lang="en-US"/>
           </a:p>
@@ -1237,7 +1237,7 @@
           <a:p>
             <a:fld id="{F9BC75CE-03FF-4667-898C-4C70B4392062}" type="datetimeFigureOut">
               <a:rPr lang="en-US" smtClean="0"/>
-              <a:t>10/23/2022</a:t>
+              <a:t>11/7/2022</a:t>
             </a:fld>
             <a:endParaRPr lang="en-US"/>
           </a:p>
@@ -1431,7 +1431,7 @@
           <a:p>
             <a:fld id="{F9BC75CE-03FF-4667-898C-4C70B4392062}" type="datetimeFigureOut">
               <a:rPr lang="en-US" smtClean="0"/>
-              <a:t>10/23/2022</a:t>
+              <a:t>11/7/2022</a:t>
             </a:fld>
             <a:endParaRPr lang="en-US"/>
           </a:p>
@@ -1704,7 +1704,7 @@
           <a:p>
             <a:fld id="{F9BC75CE-03FF-4667-898C-4C70B4392062}" type="datetimeFigureOut">
               <a:rPr lang="en-US" smtClean="0"/>
-              <a:t>10/23/2022</a:t>
+              <a:t>11/7/2022</a:t>
             </a:fld>
             <a:endParaRPr lang="en-US"/>
           </a:p>
@@ -2045,7 +2045,7 @@
           <a:p>
             <a:fld id="{F9BC75CE-03FF-4667-898C-4C70B4392062}" type="datetimeFigureOut">
               <a:rPr lang="en-US" smtClean="0"/>
-              <a:t>10/23/2022</a:t>
+              <a:t>11/7/2022</a:t>
             </a:fld>
             <a:endParaRPr lang="en-US"/>
           </a:p>
@@ -2668,7 +2668,7 @@
           <a:p>
             <a:fld id="{F9BC75CE-03FF-4667-898C-4C70B4392062}" type="datetimeFigureOut">
               <a:rPr lang="en-US" smtClean="0"/>
-              <a:t>10/23/2022</a:t>
+              <a:t>11/7/2022</a:t>
             </a:fld>
             <a:endParaRPr lang="en-US"/>
           </a:p>
@@ -3528,7 +3528,7 @@
           <a:p>
             <a:fld id="{F9BC75CE-03FF-4667-898C-4C70B4392062}" type="datetimeFigureOut">
               <a:rPr lang="en-US" smtClean="0"/>
-              <a:t>10/23/2022</a:t>
+              <a:t>11/7/2022</a:t>
             </a:fld>
             <a:endParaRPr lang="en-US"/>
           </a:p>
@@ -3698,7 +3698,7 @@
           <a:p>
             <a:fld id="{F9BC75CE-03FF-4667-898C-4C70B4392062}" type="datetimeFigureOut">
               <a:rPr lang="en-US" smtClean="0"/>
-              <a:t>10/23/2022</a:t>
+              <a:t>11/7/2022</a:t>
             </a:fld>
             <a:endParaRPr lang="en-US"/>
           </a:p>
@@ -3878,7 +3878,7 @@
           <a:p>
             <a:fld id="{F9BC75CE-03FF-4667-898C-4C70B4392062}" type="datetimeFigureOut">
               <a:rPr lang="en-US" smtClean="0"/>
-              <a:t>10/23/2022</a:t>
+              <a:t>11/7/2022</a:t>
             </a:fld>
             <a:endParaRPr lang="en-US"/>
           </a:p>
@@ -4048,7 +4048,7 @@
           <a:p>
             <a:fld id="{F9BC75CE-03FF-4667-898C-4C70B4392062}" type="datetimeFigureOut">
               <a:rPr lang="en-US" smtClean="0"/>
-              <a:t>10/23/2022</a:t>
+              <a:t>11/7/2022</a:t>
             </a:fld>
             <a:endParaRPr lang="en-US"/>
           </a:p>
@@ -4295,7 +4295,7 @@
           <a:p>
             <a:fld id="{F9BC75CE-03FF-4667-898C-4C70B4392062}" type="datetimeFigureOut">
               <a:rPr lang="en-US" smtClean="0"/>
-              <a:t>10/23/2022</a:t>
+              <a:t>11/7/2022</a:t>
             </a:fld>
             <a:endParaRPr lang="en-US"/>
           </a:p>
@@ -4587,7 +4587,7 @@
           <a:p>
             <a:fld id="{F9BC75CE-03FF-4667-898C-4C70B4392062}" type="datetimeFigureOut">
               <a:rPr lang="en-US" smtClean="0"/>
-              <a:t>10/23/2022</a:t>
+              <a:t>11/7/2022</a:t>
             </a:fld>
             <a:endParaRPr lang="en-US"/>
           </a:p>
@@ -5031,7 +5031,7 @@
           <a:p>
             <a:fld id="{F9BC75CE-03FF-4667-898C-4C70B4392062}" type="datetimeFigureOut">
               <a:rPr lang="en-US" smtClean="0"/>
-              <a:t>10/23/2022</a:t>
+              <a:t>11/7/2022</a:t>
             </a:fld>
             <a:endParaRPr lang="en-US"/>
           </a:p>
@@ -5149,7 +5149,7 @@
           <a:p>
             <a:fld id="{F9BC75CE-03FF-4667-898C-4C70B4392062}" type="datetimeFigureOut">
               <a:rPr lang="en-US" smtClean="0"/>
-              <a:t>10/23/2022</a:t>
+              <a:t>11/7/2022</a:t>
             </a:fld>
             <a:endParaRPr lang="en-US"/>
           </a:p>
@@ -5244,7 +5244,7 @@
           <a:p>
             <a:fld id="{F9BC75CE-03FF-4667-898C-4C70B4392062}" type="datetimeFigureOut">
               <a:rPr lang="en-US" smtClean="0"/>
-              <a:t>10/23/2022</a:t>
+              <a:t>11/7/2022</a:t>
             </a:fld>
             <a:endParaRPr lang="en-US"/>
           </a:p>
@@ -5523,7 +5523,7 @@
           <a:p>
             <a:fld id="{F9BC75CE-03FF-4667-898C-4C70B4392062}" type="datetimeFigureOut">
               <a:rPr lang="en-US" smtClean="0"/>
-              <a:t>10/23/2022</a:t>
+              <a:t>11/7/2022</a:t>
             </a:fld>
             <a:endParaRPr lang="en-US"/>
           </a:p>
@@ -5798,7 +5798,7 @@
           <a:p>
             <a:fld id="{F9BC75CE-03FF-4667-898C-4C70B4392062}" type="datetimeFigureOut">
               <a:rPr lang="en-US" smtClean="0"/>
-              <a:t>10/23/2022</a:t>
+              <a:t>11/7/2022</a:t>
             </a:fld>
             <a:endParaRPr lang="en-US"/>
           </a:p>
@@ -6227,7 +6227,7 @@
           <a:p>
             <a:fld id="{F9BC75CE-03FF-4667-898C-4C70B4392062}" type="datetimeFigureOut">
               <a:rPr lang="en-US" smtClean="0"/>
-              <a:t>10/23/2022</a:t>
+              <a:t>11/7/2022</a:t>
             </a:fld>
             <a:endParaRPr lang="en-US"/>
           </a:p>
@@ -7380,7 +7380,7 @@
           <a:p>
             <a:r>
               <a:rPr lang="en-US" sz="1200" dirty="0"/>
-              <a:t>Rev. 4 (2022-10-??), </a:t>
+              <a:t>Rev. 4 (2022-10-24), </a:t>
             </a:r>
             <a:r>
               <a:rPr lang="en-US" sz="1200" dirty="0">

</xml_diff>

<commit_message>
Small updates based on feedback from last dry run (#10)
</commit_message>
<xml_diff>
--- a/doc/Introduction to unsafe C#.pptx
+++ b/doc/Introduction to unsafe C#.pptx
@@ -4,6 +4,9 @@
   <p:sldMasterIdLst>
     <p:sldMasterId id="2147483660" r:id="rId1"/>
   </p:sldMasterIdLst>
+  <p:notesMasterIdLst>
+    <p:notesMasterId r:id="rId54"/>
+  </p:notesMasterIdLst>
   <p:sldIdLst>
     <p:sldId id="256" r:id="rId2"/>
     <p:sldId id="257" r:id="rId3"/>
@@ -163,6 +166,616 @@
 </p:presentation>
 </file>
 
+<file path=ppt/notesMasters/notesMaster1.xml><?xml version="1.0" encoding="utf-8"?>
+<p:notesMaster xmlns:a="http://schemas.openxmlformats.org/drawingml/2006/main" xmlns:r="http://schemas.openxmlformats.org/officeDocument/2006/relationships" xmlns:p="http://schemas.openxmlformats.org/presentationml/2006/main">
+  <p:cSld>
+    <p:bg>
+      <p:bgRef idx="1001">
+        <a:schemeClr val="bg1"/>
+      </p:bgRef>
+    </p:bg>
+    <p:spTree>
+      <p:nvGrpSpPr>
+        <p:cNvPr id="1" name=""/>
+        <p:cNvGrpSpPr/>
+        <p:nvPr/>
+      </p:nvGrpSpPr>
+      <p:grpSpPr>
+        <a:xfrm>
+          <a:off x="0" y="0"/>
+          <a:ext cx="0" cy="0"/>
+          <a:chOff x="0" y="0"/>
+          <a:chExt cx="0" cy="0"/>
+        </a:xfrm>
+      </p:grpSpPr>
+      <p:sp>
+        <p:nvSpPr>
+          <p:cNvPr id="2" name="Header Placeholder 1"/>
+          <p:cNvSpPr>
+            <a:spLocks noGrp="1"/>
+          </p:cNvSpPr>
+          <p:nvPr>
+            <p:ph type="hdr" sz="quarter"/>
+          </p:nvPr>
+        </p:nvSpPr>
+        <p:spPr>
+          <a:xfrm>
+            <a:off x="0" y="0"/>
+            <a:ext cx="2971800" cy="458788"/>
+          </a:xfrm>
+          <a:prstGeom prst="rect">
+            <a:avLst/>
+          </a:prstGeom>
+        </p:spPr>
+        <p:txBody>
+          <a:bodyPr vert="horz" lIns="91440" tIns="45720" rIns="91440" bIns="45720" rtlCol="0"/>
+          <a:lstStyle>
+            <a:lvl1pPr algn="l">
+              <a:defRPr sz="1200"/>
+            </a:lvl1pPr>
+          </a:lstStyle>
+          <a:p>
+            <a:endParaRPr lang="en-US"/>
+          </a:p>
+        </p:txBody>
+      </p:sp>
+      <p:sp>
+        <p:nvSpPr>
+          <p:cNvPr id="3" name="Date Placeholder 2"/>
+          <p:cNvSpPr>
+            <a:spLocks noGrp="1"/>
+          </p:cNvSpPr>
+          <p:nvPr>
+            <p:ph type="dt" idx="1"/>
+          </p:nvPr>
+        </p:nvSpPr>
+        <p:spPr>
+          <a:xfrm>
+            <a:off x="3884613" y="0"/>
+            <a:ext cx="2971800" cy="458788"/>
+          </a:xfrm>
+          <a:prstGeom prst="rect">
+            <a:avLst/>
+          </a:prstGeom>
+        </p:spPr>
+        <p:txBody>
+          <a:bodyPr vert="horz" lIns="91440" tIns="45720" rIns="91440" bIns="45720" rtlCol="0"/>
+          <a:lstStyle>
+            <a:lvl1pPr algn="r">
+              <a:defRPr sz="1200"/>
+            </a:lvl1pPr>
+          </a:lstStyle>
+          <a:p>
+            <a:fld id="{2B6DBF41-98D5-4B29-8B81-B31614D19ACC}" type="datetimeFigureOut">
+              <a:rPr lang="en-US" smtClean="0"/>
+              <a:t>11/7/2022</a:t>
+            </a:fld>
+            <a:endParaRPr lang="en-US"/>
+          </a:p>
+        </p:txBody>
+      </p:sp>
+      <p:sp>
+        <p:nvSpPr>
+          <p:cNvPr id="4" name="Slide Image Placeholder 3"/>
+          <p:cNvSpPr>
+            <a:spLocks noGrp="1" noRot="1" noChangeAspect="1"/>
+          </p:cNvSpPr>
+          <p:nvPr>
+            <p:ph type="sldImg" idx="2"/>
+          </p:nvPr>
+        </p:nvSpPr>
+        <p:spPr>
+          <a:xfrm>
+            <a:off x="685800" y="1143000"/>
+            <a:ext cx="5486400" cy="3086100"/>
+          </a:xfrm>
+          <a:prstGeom prst="rect">
+            <a:avLst/>
+          </a:prstGeom>
+          <a:noFill/>
+          <a:ln w="12700">
+            <a:solidFill>
+              <a:prstClr val="black"/>
+            </a:solidFill>
+          </a:ln>
+        </p:spPr>
+        <p:txBody>
+          <a:bodyPr vert="horz" lIns="91440" tIns="45720" rIns="91440" bIns="45720" rtlCol="0" anchor="ctr"/>
+          <a:lstStyle/>
+          <a:p>
+            <a:endParaRPr lang="en-US"/>
+          </a:p>
+        </p:txBody>
+      </p:sp>
+      <p:sp>
+        <p:nvSpPr>
+          <p:cNvPr id="5" name="Notes Placeholder 4"/>
+          <p:cNvSpPr>
+            <a:spLocks noGrp="1"/>
+          </p:cNvSpPr>
+          <p:nvPr>
+            <p:ph type="body" sz="quarter" idx="3"/>
+          </p:nvPr>
+        </p:nvSpPr>
+        <p:spPr>
+          <a:xfrm>
+            <a:off x="685800" y="4400550"/>
+            <a:ext cx="5486400" cy="3600450"/>
+          </a:xfrm>
+          <a:prstGeom prst="rect">
+            <a:avLst/>
+          </a:prstGeom>
+        </p:spPr>
+        <p:txBody>
+          <a:bodyPr vert="horz" lIns="91440" tIns="45720" rIns="91440" bIns="45720" rtlCol="0"/>
+          <a:lstStyle/>
+          <a:p>
+            <a:pPr lvl="0"/>
+            <a:r>
+              <a:rPr lang="en-US"/>
+              <a:t>Click to edit Master text styles</a:t>
+            </a:r>
+          </a:p>
+          <a:p>
+            <a:pPr lvl="1"/>
+            <a:r>
+              <a:rPr lang="en-US"/>
+              <a:t>Second level</a:t>
+            </a:r>
+          </a:p>
+          <a:p>
+            <a:pPr lvl="2"/>
+            <a:r>
+              <a:rPr lang="en-US"/>
+              <a:t>Third level</a:t>
+            </a:r>
+          </a:p>
+          <a:p>
+            <a:pPr lvl="3"/>
+            <a:r>
+              <a:rPr lang="en-US"/>
+              <a:t>Fourth level</a:t>
+            </a:r>
+          </a:p>
+          <a:p>
+            <a:pPr lvl="4"/>
+            <a:r>
+              <a:rPr lang="en-US"/>
+              <a:t>Fifth level</a:t>
+            </a:r>
+          </a:p>
+        </p:txBody>
+      </p:sp>
+      <p:sp>
+        <p:nvSpPr>
+          <p:cNvPr id="6" name="Footer Placeholder 5"/>
+          <p:cNvSpPr>
+            <a:spLocks noGrp="1"/>
+          </p:cNvSpPr>
+          <p:nvPr>
+            <p:ph type="ftr" sz="quarter" idx="4"/>
+          </p:nvPr>
+        </p:nvSpPr>
+        <p:spPr>
+          <a:xfrm>
+            <a:off x="0" y="8685213"/>
+            <a:ext cx="2971800" cy="458787"/>
+          </a:xfrm>
+          <a:prstGeom prst="rect">
+            <a:avLst/>
+          </a:prstGeom>
+        </p:spPr>
+        <p:txBody>
+          <a:bodyPr vert="horz" lIns="91440" tIns="45720" rIns="91440" bIns="45720" rtlCol="0" anchor="b"/>
+          <a:lstStyle>
+            <a:lvl1pPr algn="l">
+              <a:defRPr sz="1200"/>
+            </a:lvl1pPr>
+          </a:lstStyle>
+          <a:p>
+            <a:endParaRPr lang="en-US"/>
+          </a:p>
+        </p:txBody>
+      </p:sp>
+      <p:sp>
+        <p:nvSpPr>
+          <p:cNvPr id="7" name="Slide Number Placeholder 6"/>
+          <p:cNvSpPr>
+            <a:spLocks noGrp="1"/>
+          </p:cNvSpPr>
+          <p:nvPr>
+            <p:ph type="sldNum" sz="quarter" idx="5"/>
+          </p:nvPr>
+        </p:nvSpPr>
+        <p:spPr>
+          <a:xfrm>
+            <a:off x="3884613" y="8685213"/>
+            <a:ext cx="2971800" cy="458787"/>
+          </a:xfrm>
+          <a:prstGeom prst="rect">
+            <a:avLst/>
+          </a:prstGeom>
+        </p:spPr>
+        <p:txBody>
+          <a:bodyPr vert="horz" lIns="91440" tIns="45720" rIns="91440" bIns="45720" rtlCol="0" anchor="b"/>
+          <a:lstStyle>
+            <a:lvl1pPr algn="r">
+              <a:defRPr sz="1200"/>
+            </a:lvl1pPr>
+          </a:lstStyle>
+          <a:p>
+            <a:fld id="{2B4F40D4-862D-491C-85E3-1A34EFA2BD00}" type="slidenum">
+              <a:rPr lang="en-US" smtClean="0"/>
+              <a:t>‹#›</a:t>
+            </a:fld>
+            <a:endParaRPr lang="en-US"/>
+          </a:p>
+        </p:txBody>
+      </p:sp>
+    </p:spTree>
+    <p:extLst>
+      <p:ext uri="{BB962C8B-B14F-4D97-AF65-F5344CB8AC3E}">
+        <p14:creationId xmlns:p14="http://schemas.microsoft.com/office/powerpoint/2010/main" val="518753005"/>
+      </p:ext>
+    </p:extLst>
+  </p:cSld>
+  <p:clrMap bg1="lt1" tx1="dk1" bg2="lt2" tx2="dk2" accent1="accent1" accent2="accent2" accent3="accent3" accent4="accent4" accent5="accent5" accent6="accent6" hlink="hlink" folHlink="folHlink"/>
+  <p:notesStyle>
+    <a:lvl1pPr marL="0" algn="l" defTabSz="914400" rtl="0" eaLnBrk="1" latinLnBrk="0" hangingPunct="1">
+      <a:defRPr sz="1200" kern="1200">
+        <a:solidFill>
+          <a:schemeClr val="tx1"/>
+        </a:solidFill>
+        <a:latin typeface="+mn-lt"/>
+        <a:ea typeface="+mn-ea"/>
+        <a:cs typeface="+mn-cs"/>
+      </a:defRPr>
+    </a:lvl1pPr>
+    <a:lvl2pPr marL="457200" algn="l" defTabSz="914400" rtl="0" eaLnBrk="1" latinLnBrk="0" hangingPunct="1">
+      <a:defRPr sz="1200" kern="1200">
+        <a:solidFill>
+          <a:schemeClr val="tx1"/>
+        </a:solidFill>
+        <a:latin typeface="+mn-lt"/>
+        <a:ea typeface="+mn-ea"/>
+        <a:cs typeface="+mn-cs"/>
+      </a:defRPr>
+    </a:lvl2pPr>
+    <a:lvl3pPr marL="914400" algn="l" defTabSz="914400" rtl="0" eaLnBrk="1" latinLnBrk="0" hangingPunct="1">
+      <a:defRPr sz="1200" kern="1200">
+        <a:solidFill>
+          <a:schemeClr val="tx1"/>
+        </a:solidFill>
+        <a:latin typeface="+mn-lt"/>
+        <a:ea typeface="+mn-ea"/>
+        <a:cs typeface="+mn-cs"/>
+      </a:defRPr>
+    </a:lvl3pPr>
+    <a:lvl4pPr marL="1371600" algn="l" defTabSz="914400" rtl="0" eaLnBrk="1" latinLnBrk="0" hangingPunct="1">
+      <a:defRPr sz="1200" kern="1200">
+        <a:solidFill>
+          <a:schemeClr val="tx1"/>
+        </a:solidFill>
+        <a:latin typeface="+mn-lt"/>
+        <a:ea typeface="+mn-ea"/>
+        <a:cs typeface="+mn-cs"/>
+      </a:defRPr>
+    </a:lvl4pPr>
+    <a:lvl5pPr marL="1828800" algn="l" defTabSz="914400" rtl="0" eaLnBrk="1" latinLnBrk="0" hangingPunct="1">
+      <a:defRPr sz="1200" kern="1200">
+        <a:solidFill>
+          <a:schemeClr val="tx1"/>
+        </a:solidFill>
+        <a:latin typeface="+mn-lt"/>
+        <a:ea typeface="+mn-ea"/>
+        <a:cs typeface="+mn-cs"/>
+      </a:defRPr>
+    </a:lvl5pPr>
+    <a:lvl6pPr marL="2286000" algn="l" defTabSz="914400" rtl="0" eaLnBrk="1" latinLnBrk="0" hangingPunct="1">
+      <a:defRPr sz="1200" kern="1200">
+        <a:solidFill>
+          <a:schemeClr val="tx1"/>
+        </a:solidFill>
+        <a:latin typeface="+mn-lt"/>
+        <a:ea typeface="+mn-ea"/>
+        <a:cs typeface="+mn-cs"/>
+      </a:defRPr>
+    </a:lvl6pPr>
+    <a:lvl7pPr marL="2743200" algn="l" defTabSz="914400" rtl="0" eaLnBrk="1" latinLnBrk="0" hangingPunct="1">
+      <a:defRPr sz="1200" kern="1200">
+        <a:solidFill>
+          <a:schemeClr val="tx1"/>
+        </a:solidFill>
+        <a:latin typeface="+mn-lt"/>
+        <a:ea typeface="+mn-ea"/>
+        <a:cs typeface="+mn-cs"/>
+      </a:defRPr>
+    </a:lvl7pPr>
+    <a:lvl8pPr marL="3200400" algn="l" defTabSz="914400" rtl="0" eaLnBrk="1" latinLnBrk="0" hangingPunct="1">
+      <a:defRPr sz="1200" kern="1200">
+        <a:solidFill>
+          <a:schemeClr val="tx1"/>
+        </a:solidFill>
+        <a:latin typeface="+mn-lt"/>
+        <a:ea typeface="+mn-ea"/>
+        <a:cs typeface="+mn-cs"/>
+      </a:defRPr>
+    </a:lvl8pPr>
+    <a:lvl9pPr marL="3657600" algn="l" defTabSz="914400" rtl="0" eaLnBrk="1" latinLnBrk="0" hangingPunct="1">
+      <a:defRPr sz="1200" kern="1200">
+        <a:solidFill>
+          <a:schemeClr val="tx1"/>
+        </a:solidFill>
+        <a:latin typeface="+mn-lt"/>
+        <a:ea typeface="+mn-ea"/>
+        <a:cs typeface="+mn-cs"/>
+      </a:defRPr>
+    </a:lvl9pPr>
+  </p:notesStyle>
+</p:notesMaster>
+</file>
+
+<file path=ppt/notesSlides/notesSlide1.xml><?xml version="1.0" encoding="utf-8"?>
+<p:notes xmlns:a="http://schemas.openxmlformats.org/drawingml/2006/main" xmlns:r="http://schemas.openxmlformats.org/officeDocument/2006/relationships" xmlns:p="http://schemas.openxmlformats.org/presentationml/2006/main">
+  <p:cSld>
+    <p:spTree>
+      <p:nvGrpSpPr>
+        <p:cNvPr id="1" name=""/>
+        <p:cNvGrpSpPr/>
+        <p:nvPr/>
+      </p:nvGrpSpPr>
+      <p:grpSpPr>
+        <a:xfrm>
+          <a:off x="0" y="0"/>
+          <a:ext cx="0" cy="0"/>
+          <a:chOff x="0" y="0"/>
+          <a:chExt cx="0" cy="0"/>
+        </a:xfrm>
+      </p:grpSpPr>
+      <p:sp>
+        <p:nvSpPr>
+          <p:cNvPr id="2" name="Slide Image Placeholder 1"/>
+          <p:cNvSpPr>
+            <a:spLocks noGrp="1" noRot="1" noChangeAspect="1"/>
+          </p:cNvSpPr>
+          <p:nvPr>
+            <p:ph type="sldImg"/>
+          </p:nvPr>
+        </p:nvSpPr>
+        <p:spPr/>
+      </p:sp>
+      <p:sp>
+        <p:nvSpPr>
+          <p:cNvPr id="3" name="Notes Placeholder 2"/>
+          <p:cNvSpPr>
+            <a:spLocks noGrp="1"/>
+          </p:cNvSpPr>
+          <p:nvPr>
+            <p:ph type="body" idx="1"/>
+          </p:nvPr>
+        </p:nvSpPr>
+        <p:spPr/>
+        <p:txBody>
+          <a:bodyPr/>
+          <a:lstStyle/>
+          <a:p>
+            <a:r>
+              <a:rPr lang="en-US" noProof="0" dirty="0"/>
+              <a:t>Why call native code in the first place? There may not be any managed wrappers available. Existing wrappers may not provide a suitable API for your use case. You may want to create your own high-performance or platform-specific native code (out of scope for this presentation).</a:t>
+            </a:r>
+          </a:p>
+        </p:txBody>
+      </p:sp>
+      <p:sp>
+        <p:nvSpPr>
+          <p:cNvPr id="4" name="Slide Number Placeholder 3"/>
+          <p:cNvSpPr>
+            <a:spLocks noGrp="1"/>
+          </p:cNvSpPr>
+          <p:nvPr>
+            <p:ph type="sldNum" sz="quarter" idx="5"/>
+          </p:nvPr>
+        </p:nvSpPr>
+        <p:spPr/>
+        <p:txBody>
+          <a:bodyPr/>
+          <a:lstStyle/>
+          <a:p>
+            <a:fld id="{2B4F40D4-862D-491C-85E3-1A34EFA2BD00}" type="slidenum">
+              <a:rPr lang="en-US" smtClean="0"/>
+              <a:t>1</a:t>
+            </a:fld>
+            <a:endParaRPr lang="en-US"/>
+          </a:p>
+        </p:txBody>
+      </p:sp>
+    </p:spTree>
+    <p:extLst>
+      <p:ext uri="{BB962C8B-B14F-4D97-AF65-F5344CB8AC3E}">
+        <p14:creationId xmlns:p14="http://schemas.microsoft.com/office/powerpoint/2010/main" val="2706683152"/>
+      </p:ext>
+    </p:extLst>
+  </p:cSld>
+  <p:clrMapOvr>
+    <a:masterClrMapping/>
+  </p:clrMapOvr>
+</p:notes>
+</file>
+
+<file path=ppt/notesSlides/notesSlide2.xml><?xml version="1.0" encoding="utf-8"?>
+<p:notes xmlns:a="http://schemas.openxmlformats.org/drawingml/2006/main" xmlns:r="http://schemas.openxmlformats.org/officeDocument/2006/relationships" xmlns:p="http://schemas.openxmlformats.org/presentationml/2006/main">
+  <p:cSld>
+    <p:spTree>
+      <p:nvGrpSpPr>
+        <p:cNvPr id="1" name=""/>
+        <p:cNvGrpSpPr/>
+        <p:nvPr/>
+      </p:nvGrpSpPr>
+      <p:grpSpPr>
+        <a:xfrm>
+          <a:off x="0" y="0"/>
+          <a:ext cx="0" cy="0"/>
+          <a:chOff x="0" y="0"/>
+          <a:chExt cx="0" cy="0"/>
+        </a:xfrm>
+      </p:grpSpPr>
+      <p:sp>
+        <p:nvSpPr>
+          <p:cNvPr id="2" name="Slide Image Placeholder 1"/>
+          <p:cNvSpPr>
+            <a:spLocks noGrp="1" noRot="1" noChangeAspect="1"/>
+          </p:cNvSpPr>
+          <p:nvPr>
+            <p:ph type="sldImg"/>
+          </p:nvPr>
+        </p:nvSpPr>
+        <p:spPr/>
+      </p:sp>
+      <p:sp>
+        <p:nvSpPr>
+          <p:cNvPr id="3" name="Notes Placeholder 2"/>
+          <p:cNvSpPr>
+            <a:spLocks noGrp="1"/>
+          </p:cNvSpPr>
+          <p:nvPr>
+            <p:ph type="body" idx="1"/>
+          </p:nvPr>
+        </p:nvSpPr>
+        <p:spPr/>
+        <p:txBody>
+          <a:bodyPr/>
+          <a:lstStyle/>
+          <a:p>
+            <a:r>
+              <a:rPr lang="en-US" noProof="0" dirty="0"/>
+              <a:t>Need to give the audience enough time to understand the code sample and its implications. When giving the presentation in-person, should ask for a show of hands if this is actually possible.</a:t>
+            </a:r>
+          </a:p>
+        </p:txBody>
+      </p:sp>
+      <p:sp>
+        <p:nvSpPr>
+          <p:cNvPr id="4" name="Slide Number Placeholder 3"/>
+          <p:cNvSpPr>
+            <a:spLocks noGrp="1"/>
+          </p:cNvSpPr>
+          <p:nvPr>
+            <p:ph type="sldNum" sz="quarter" idx="5"/>
+          </p:nvPr>
+        </p:nvSpPr>
+        <p:spPr/>
+        <p:txBody>
+          <a:bodyPr/>
+          <a:lstStyle/>
+          <a:p>
+            <a:fld id="{2B4F40D4-862D-491C-85E3-1A34EFA2BD00}" type="slidenum">
+              <a:rPr lang="en-US" smtClean="0"/>
+              <a:t>4</a:t>
+            </a:fld>
+            <a:endParaRPr lang="en-US"/>
+          </a:p>
+        </p:txBody>
+      </p:sp>
+    </p:spTree>
+    <p:extLst>
+      <p:ext uri="{BB962C8B-B14F-4D97-AF65-F5344CB8AC3E}">
+        <p14:creationId xmlns:p14="http://schemas.microsoft.com/office/powerpoint/2010/main" val="586819055"/>
+      </p:ext>
+    </p:extLst>
+  </p:cSld>
+  <p:clrMapOvr>
+    <a:masterClrMapping/>
+  </p:clrMapOvr>
+</p:notes>
+</file>
+
+<file path=ppt/notesSlides/notesSlide3.xml><?xml version="1.0" encoding="utf-8"?>
+<p:notes xmlns:a="http://schemas.openxmlformats.org/drawingml/2006/main" xmlns:r="http://schemas.openxmlformats.org/officeDocument/2006/relationships" xmlns:p="http://schemas.openxmlformats.org/presentationml/2006/main">
+  <p:cSld>
+    <p:spTree>
+      <p:nvGrpSpPr>
+        <p:cNvPr id="1" name=""/>
+        <p:cNvGrpSpPr/>
+        <p:nvPr/>
+      </p:nvGrpSpPr>
+      <p:grpSpPr>
+        <a:xfrm>
+          <a:off x="0" y="0"/>
+          <a:ext cx="0" cy="0"/>
+          <a:chOff x="0" y="0"/>
+          <a:chExt cx="0" cy="0"/>
+        </a:xfrm>
+      </p:grpSpPr>
+      <p:sp>
+        <p:nvSpPr>
+          <p:cNvPr id="2" name="Slide Image Placeholder 1"/>
+          <p:cNvSpPr>
+            <a:spLocks noGrp="1" noRot="1" noChangeAspect="1"/>
+          </p:cNvSpPr>
+          <p:nvPr>
+            <p:ph type="sldImg"/>
+          </p:nvPr>
+        </p:nvSpPr>
+        <p:spPr/>
+      </p:sp>
+      <p:sp>
+        <p:nvSpPr>
+          <p:cNvPr id="3" name="Notes Placeholder 2"/>
+          <p:cNvSpPr>
+            <a:spLocks noGrp="1"/>
+          </p:cNvSpPr>
+          <p:nvPr>
+            <p:ph type="body" idx="1"/>
+          </p:nvPr>
+        </p:nvSpPr>
+        <p:spPr/>
+        <p:txBody>
+          <a:bodyPr/>
+          <a:lstStyle/>
+          <a:p>
+            <a:r>
+              <a:rPr lang="en-US" noProof="0" dirty="0"/>
+              <a:t>Platform invoke is a bit of a misnomer stemming from the fact that a primary use case in the early days of .NET was to call Win32 APIs. Of course, like the more aptly named JNI, P/Invoke can be used to call any native library (assuming supported calling conventions). Also, these days the actual platform can be macOS (and its variations) and Linux in addition to Windows.</a:t>
+            </a:r>
+          </a:p>
+        </p:txBody>
+      </p:sp>
+      <p:sp>
+        <p:nvSpPr>
+          <p:cNvPr id="4" name="Slide Number Placeholder 3"/>
+          <p:cNvSpPr>
+            <a:spLocks noGrp="1"/>
+          </p:cNvSpPr>
+          <p:nvPr>
+            <p:ph type="sldNum" sz="quarter" idx="5"/>
+          </p:nvPr>
+        </p:nvSpPr>
+        <p:spPr/>
+        <p:txBody>
+          <a:bodyPr/>
+          <a:lstStyle/>
+          <a:p>
+            <a:fld id="{2B4F40D4-862D-491C-85E3-1A34EFA2BD00}" type="slidenum">
+              <a:rPr lang="en-US" smtClean="0"/>
+              <a:t>23</a:t>
+            </a:fld>
+            <a:endParaRPr lang="en-US"/>
+          </a:p>
+        </p:txBody>
+      </p:sp>
+    </p:spTree>
+    <p:extLst>
+      <p:ext uri="{BB962C8B-B14F-4D97-AF65-F5344CB8AC3E}">
+        <p14:creationId xmlns:p14="http://schemas.microsoft.com/office/powerpoint/2010/main" val="2569954282"/>
+      </p:ext>
+    </p:extLst>
+  </p:cSld>
+  <p:clrMapOvr>
+    <a:masterClrMapping/>
+  </p:clrMapOvr>
+</p:notes>
+</file>
+
 <file path=ppt/slideLayouts/slideLayout1.xml><?xml version="1.0" encoding="utf-8"?>
 <p:sldLayout xmlns:a="http://schemas.openxmlformats.org/drawingml/2006/main" xmlns:r="http://schemas.openxmlformats.org/officeDocument/2006/relationships" xmlns:p="http://schemas.openxmlformats.org/presentationml/2006/main" type="title" preserve="1">
   <p:cSld name="Title Slide">
@@ -349,7 +962,7 @@
           <a:p>
             <a:fld id="{F9BC75CE-03FF-4667-898C-4C70B4392062}" type="datetimeFigureOut">
               <a:rPr lang="en-US" smtClean="0"/>
-              <a:t>10/17/2022</a:t>
+              <a:t>11/7/2022</a:t>
             </a:fld>
             <a:endParaRPr lang="en-US"/>
           </a:p>
@@ -624,7 +1237,7 @@
           <a:p>
             <a:fld id="{F9BC75CE-03FF-4667-898C-4C70B4392062}" type="datetimeFigureOut">
               <a:rPr lang="en-US" smtClean="0"/>
-              <a:t>10/17/2022</a:t>
+              <a:t>11/7/2022</a:t>
             </a:fld>
             <a:endParaRPr lang="en-US"/>
           </a:p>
@@ -818,7 +1431,7 @@
           <a:p>
             <a:fld id="{F9BC75CE-03FF-4667-898C-4C70B4392062}" type="datetimeFigureOut">
               <a:rPr lang="en-US" smtClean="0"/>
-              <a:t>10/17/2022</a:t>
+              <a:t>11/7/2022</a:t>
             </a:fld>
             <a:endParaRPr lang="en-US"/>
           </a:p>
@@ -1091,7 +1704,7 @@
           <a:p>
             <a:fld id="{F9BC75CE-03FF-4667-898C-4C70B4392062}" type="datetimeFigureOut">
               <a:rPr lang="en-US" smtClean="0"/>
-              <a:t>10/17/2022</a:t>
+              <a:t>11/7/2022</a:t>
             </a:fld>
             <a:endParaRPr lang="en-US"/>
           </a:p>
@@ -1432,7 +2045,7 @@
           <a:p>
             <a:fld id="{F9BC75CE-03FF-4667-898C-4C70B4392062}" type="datetimeFigureOut">
               <a:rPr lang="en-US" smtClean="0"/>
-              <a:t>10/17/2022</a:t>
+              <a:t>11/7/2022</a:t>
             </a:fld>
             <a:endParaRPr lang="en-US"/>
           </a:p>
@@ -2055,7 +2668,7 @@
           <a:p>
             <a:fld id="{F9BC75CE-03FF-4667-898C-4C70B4392062}" type="datetimeFigureOut">
               <a:rPr lang="en-US" smtClean="0"/>
-              <a:t>10/17/2022</a:t>
+              <a:t>11/7/2022</a:t>
             </a:fld>
             <a:endParaRPr lang="en-US"/>
           </a:p>
@@ -2915,7 +3528,7 @@
           <a:p>
             <a:fld id="{F9BC75CE-03FF-4667-898C-4C70B4392062}" type="datetimeFigureOut">
               <a:rPr lang="en-US" smtClean="0"/>
-              <a:t>10/17/2022</a:t>
+              <a:t>11/7/2022</a:t>
             </a:fld>
             <a:endParaRPr lang="en-US"/>
           </a:p>
@@ -3085,7 +3698,7 @@
           <a:p>
             <a:fld id="{F9BC75CE-03FF-4667-898C-4C70B4392062}" type="datetimeFigureOut">
               <a:rPr lang="en-US" smtClean="0"/>
-              <a:t>10/17/2022</a:t>
+              <a:t>11/7/2022</a:t>
             </a:fld>
             <a:endParaRPr lang="en-US"/>
           </a:p>
@@ -3265,7 +3878,7 @@
           <a:p>
             <a:fld id="{F9BC75CE-03FF-4667-898C-4C70B4392062}" type="datetimeFigureOut">
               <a:rPr lang="en-US" smtClean="0"/>
-              <a:t>10/17/2022</a:t>
+              <a:t>11/7/2022</a:t>
             </a:fld>
             <a:endParaRPr lang="en-US"/>
           </a:p>
@@ -3435,7 +4048,7 @@
           <a:p>
             <a:fld id="{F9BC75CE-03FF-4667-898C-4C70B4392062}" type="datetimeFigureOut">
               <a:rPr lang="en-US" smtClean="0"/>
-              <a:t>10/17/2022</a:t>
+              <a:t>11/7/2022</a:t>
             </a:fld>
             <a:endParaRPr lang="en-US"/>
           </a:p>
@@ -3682,7 +4295,7 @@
           <a:p>
             <a:fld id="{F9BC75CE-03FF-4667-898C-4C70B4392062}" type="datetimeFigureOut">
               <a:rPr lang="en-US" smtClean="0"/>
-              <a:t>10/17/2022</a:t>
+              <a:t>11/7/2022</a:t>
             </a:fld>
             <a:endParaRPr lang="en-US"/>
           </a:p>
@@ -3974,7 +4587,7 @@
           <a:p>
             <a:fld id="{F9BC75CE-03FF-4667-898C-4C70B4392062}" type="datetimeFigureOut">
               <a:rPr lang="en-US" smtClean="0"/>
-              <a:t>10/17/2022</a:t>
+              <a:t>11/7/2022</a:t>
             </a:fld>
             <a:endParaRPr lang="en-US"/>
           </a:p>
@@ -4418,7 +5031,7 @@
           <a:p>
             <a:fld id="{F9BC75CE-03FF-4667-898C-4C70B4392062}" type="datetimeFigureOut">
               <a:rPr lang="en-US" smtClean="0"/>
-              <a:t>10/17/2022</a:t>
+              <a:t>11/7/2022</a:t>
             </a:fld>
             <a:endParaRPr lang="en-US"/>
           </a:p>
@@ -4536,7 +5149,7 @@
           <a:p>
             <a:fld id="{F9BC75CE-03FF-4667-898C-4C70B4392062}" type="datetimeFigureOut">
               <a:rPr lang="en-US" smtClean="0"/>
-              <a:t>10/17/2022</a:t>
+              <a:t>11/7/2022</a:t>
             </a:fld>
             <a:endParaRPr lang="en-US"/>
           </a:p>
@@ -4631,7 +5244,7 @@
           <a:p>
             <a:fld id="{F9BC75CE-03FF-4667-898C-4C70B4392062}" type="datetimeFigureOut">
               <a:rPr lang="en-US" smtClean="0"/>
-              <a:t>10/17/2022</a:t>
+              <a:t>11/7/2022</a:t>
             </a:fld>
             <a:endParaRPr lang="en-US"/>
           </a:p>
@@ -4910,7 +5523,7 @@
           <a:p>
             <a:fld id="{F9BC75CE-03FF-4667-898C-4C70B4392062}" type="datetimeFigureOut">
               <a:rPr lang="en-US" smtClean="0"/>
-              <a:t>10/17/2022</a:t>
+              <a:t>11/7/2022</a:t>
             </a:fld>
             <a:endParaRPr lang="en-US"/>
           </a:p>
@@ -5185,7 +5798,7 @@
           <a:p>
             <a:fld id="{F9BC75CE-03FF-4667-898C-4C70B4392062}" type="datetimeFigureOut">
               <a:rPr lang="en-US" smtClean="0"/>
-              <a:t>10/17/2022</a:t>
+              <a:t>11/7/2022</a:t>
             </a:fld>
             <a:endParaRPr lang="en-US"/>
           </a:p>
@@ -5614,7 +6227,7 @@
           <a:p>
             <a:fld id="{F9BC75CE-03FF-4667-898C-4C70B4392062}" type="datetimeFigureOut">
               <a:rPr lang="en-US" smtClean="0"/>
-              <a:t>10/17/2022</a:t>
+              <a:t>11/7/2022</a:t>
             </a:fld>
             <a:endParaRPr lang="en-US"/>
           </a:p>
@@ -6767,11 +7380,11 @@
           <a:p>
             <a:r>
               <a:rPr lang="en-US" sz="1200" dirty="0"/>
-              <a:t>Rev. 3 (2022-10-17), </a:t>
+              <a:t>Rev. 4 (2022-10-24), </a:t>
             </a:r>
             <a:r>
               <a:rPr lang="en-US" sz="1200" dirty="0">
-                <a:hlinkClick r:id="rId2"/>
+                <a:hlinkClick r:id="rId3"/>
               </a:rPr>
               <a:t>https://github.com/dennisdietrich/UnsafeCSharp/</a:t>
             </a:r>
@@ -9586,7 +10199,12 @@
             <p:ph type="title"/>
           </p:nvPr>
         </p:nvSpPr>
-        <p:spPr/>
+        <p:spPr>
+          <a:xfrm>
+            <a:off x="646111" y="465782"/>
+            <a:ext cx="9404723" cy="1400530"/>
+          </a:xfrm>
+        </p:spPr>
         <p:txBody>
           <a:bodyPr/>
           <a:lstStyle/>
@@ -9621,7 +10239,7 @@
         </p:nvSpPr>
         <p:spPr bwMode="auto">
           <a:xfrm>
-            <a:off x="1103313" y="2052917"/>
+            <a:off x="1103313" y="2049651"/>
             <a:ext cx="8946540" cy="4195481"/>
           </a:xfrm>
           <a:prstGeom prst="rect">
@@ -10486,6 +11104,50 @@
           </a:p>
         </p:txBody>
       </p:sp>
+      <p:pic>
+        <p:nvPicPr>
+          <p:cNvPr id="5" name="Picture 4" descr="Question &quot;Any way to use stackalloc while avoiding stackoverflow exception&quot; on stackoverflow.com">
+            <a:extLst>
+              <a:ext uri="{FF2B5EF4-FFF2-40B4-BE49-F238E27FC236}">
+                <a16:creationId xmlns:a16="http://schemas.microsoft.com/office/drawing/2014/main" id="{491DC914-E2C4-07BA-8293-36B6F0EC86B3}"/>
+              </a:ext>
+            </a:extLst>
+          </p:cNvPr>
+          <p:cNvPicPr>
+            <a:picLocks noChangeAspect="1"/>
+          </p:cNvPicPr>
+          <p:nvPr/>
+        </p:nvPicPr>
+        <p:blipFill>
+          <a:blip r:embed="rId2"/>
+          <a:stretch>
+            <a:fillRect/>
+          </a:stretch>
+        </p:blipFill>
+        <p:spPr>
+          <a:xfrm>
+            <a:off x="2844437" y="1880290"/>
+            <a:ext cx="8942546" cy="2712625"/>
+          </a:xfrm>
+          <a:prstGeom prst="rect">
+            <a:avLst/>
+          </a:prstGeom>
+          <a:ln w="15875">
+            <a:solidFill>
+              <a:schemeClr val="accent1"/>
+            </a:solidFill>
+          </a:ln>
+          <a:effectLst>
+            <a:outerShdw blurRad="127000" dist="127000" dir="2700000" algn="tl" rotWithShape="0">
+              <a:schemeClr val="bg1">
+                <a:lumMod val="95000"/>
+                <a:lumOff val="5000"/>
+                <a:alpha val="80000"/>
+              </a:schemeClr>
+            </a:outerShdw>
+          </a:effectLst>
+        </p:spPr>
+      </p:pic>
     </p:spTree>
     <p:extLst>
       <p:ext uri="{BB962C8B-B14F-4D97-AF65-F5344CB8AC3E}">
@@ -10496,6 +11158,81 @@
   <p:clrMapOvr>
     <a:masterClrMapping/>
   </p:clrMapOvr>
+  <p:timing>
+    <p:tnLst>
+      <p:par>
+        <p:cTn id="1" dur="indefinite" restart="never" nodeType="tmRoot">
+          <p:childTnLst>
+            <p:seq concurrent="1" nextAc="seek">
+              <p:cTn id="2" dur="indefinite" nodeType="mainSeq">
+                <p:childTnLst>
+                  <p:par>
+                    <p:cTn id="3" fill="hold">
+                      <p:stCondLst>
+                        <p:cond delay="indefinite"/>
+                      </p:stCondLst>
+                      <p:childTnLst>
+                        <p:par>
+                          <p:cTn id="4" fill="hold">
+                            <p:stCondLst>
+                              <p:cond delay="0"/>
+                            </p:stCondLst>
+                            <p:childTnLst>
+                              <p:par>
+                                <p:cTn id="5" presetID="1" presetClass="entr" presetSubtype="0" fill="hold" nodeType="clickEffect">
+                                  <p:stCondLst>
+                                    <p:cond delay="0"/>
+                                  </p:stCondLst>
+                                  <p:childTnLst>
+                                    <p:set>
+                                      <p:cBhvr>
+                                        <p:cTn id="6" dur="1" fill="hold">
+                                          <p:stCondLst>
+                                            <p:cond delay="0"/>
+                                          </p:stCondLst>
+                                        </p:cTn>
+                                        <p:tgtEl>
+                                          <p:spTgt spid="5"/>
+                                        </p:tgtEl>
+                                        <p:attrNameLst>
+                                          <p:attrName>style.visibility</p:attrName>
+                                        </p:attrNameLst>
+                                      </p:cBhvr>
+                                      <p:to>
+                                        <p:strVal val="visible"/>
+                                      </p:to>
+                                    </p:set>
+                                  </p:childTnLst>
+                                </p:cTn>
+                              </p:par>
+                            </p:childTnLst>
+                          </p:cTn>
+                        </p:par>
+                      </p:childTnLst>
+                    </p:cTn>
+                  </p:par>
+                </p:childTnLst>
+              </p:cTn>
+              <p:prevCondLst>
+                <p:cond evt="onPrev" delay="0">
+                  <p:tgtEl>
+                    <p:sldTgt/>
+                  </p:tgtEl>
+                </p:cond>
+              </p:prevCondLst>
+              <p:nextCondLst>
+                <p:cond evt="onNext" delay="0">
+                  <p:tgtEl>
+                    <p:sldTgt/>
+                  </p:tgtEl>
+                </p:cond>
+              </p:nextCondLst>
+            </p:seq>
+          </p:childTnLst>
+        </p:cTn>
+      </p:par>
+    </p:tnLst>
+  </p:timing>
 </p:sld>
 </file>
 
@@ -21995,6 +22732,94 @@
           </a:effectLst>
         </p:spPr>
       </p:pic>
+      <p:pic>
+        <p:nvPicPr>
+          <p:cNvPr id="4" name="Picture 3" descr="Microsoft.Data.Sqlite overview:&#10;Microsoft.Data.Sqlite is a lightweight ADO.NET provider for SQLite. The Entity Framework Core provider for SQLite is built on top of this library. However, it can also be used independently or with other data access libraries.">
+            <a:extLst>
+              <a:ext uri="{FF2B5EF4-FFF2-40B4-BE49-F238E27FC236}">
+                <a16:creationId xmlns:a16="http://schemas.microsoft.com/office/drawing/2014/main" id="{C0FA53F1-FDCD-2689-0141-34700ACD2DF4}"/>
+              </a:ext>
+            </a:extLst>
+          </p:cNvPr>
+          <p:cNvPicPr>
+            <a:picLocks noChangeAspect="1"/>
+          </p:cNvPicPr>
+          <p:nvPr/>
+        </p:nvPicPr>
+        <p:blipFill>
+          <a:blip r:embed="rId3"/>
+          <a:stretch>
+            <a:fillRect/>
+          </a:stretch>
+        </p:blipFill>
+        <p:spPr>
+          <a:xfrm>
+            <a:off x="281076" y="1894579"/>
+            <a:ext cx="6474286" cy="3454000"/>
+          </a:xfrm>
+          <a:prstGeom prst="rect">
+            <a:avLst/>
+          </a:prstGeom>
+          <a:ln w="15875">
+            <a:solidFill>
+              <a:schemeClr val="accent1"/>
+            </a:solidFill>
+          </a:ln>
+          <a:effectLst>
+            <a:outerShdw blurRad="127000" dist="127000" dir="2700000" algn="tl" rotWithShape="0">
+              <a:schemeClr val="bg1">
+                <a:lumMod val="95000"/>
+                <a:lumOff val="5000"/>
+                <a:alpha val="80000"/>
+              </a:schemeClr>
+            </a:outerShdw>
+          </a:effectLst>
+        </p:spPr>
+      </p:pic>
+      <p:pic>
+        <p:nvPicPr>
+          <p:cNvPr id="8" name="Picture 7" descr="SQLite EF Core Database Provider:&#10;This database provider allows Entity Framework Core to be used with SQLite. The provider is maintained as part of the Entity Framework Core project.">
+            <a:extLst>
+              <a:ext uri="{FF2B5EF4-FFF2-40B4-BE49-F238E27FC236}">
+                <a16:creationId xmlns:a16="http://schemas.microsoft.com/office/drawing/2014/main" id="{10738902-C004-D4E2-31BE-1B7B13927EC9}"/>
+              </a:ext>
+            </a:extLst>
+          </p:cNvPr>
+          <p:cNvPicPr>
+            <a:picLocks noChangeAspect="1"/>
+          </p:cNvPicPr>
+          <p:nvPr/>
+        </p:nvPicPr>
+        <p:blipFill>
+          <a:blip r:embed="rId4"/>
+          <a:stretch>
+            <a:fillRect/>
+          </a:stretch>
+        </p:blipFill>
+        <p:spPr>
+          <a:xfrm>
+            <a:off x="5453104" y="3399445"/>
+            <a:ext cx="6408286" cy="3146000"/>
+          </a:xfrm>
+          <a:prstGeom prst="rect">
+            <a:avLst/>
+          </a:prstGeom>
+          <a:ln w="15875">
+            <a:solidFill>
+              <a:schemeClr val="accent1"/>
+            </a:solidFill>
+          </a:ln>
+          <a:effectLst>
+            <a:outerShdw blurRad="127000" dist="127000" dir="2700000" algn="tl" rotWithShape="0">
+              <a:schemeClr val="bg1">
+                <a:lumMod val="95000"/>
+                <a:lumOff val="5000"/>
+                <a:alpha val="80000"/>
+              </a:schemeClr>
+            </a:outerShdw>
+          </a:effectLst>
+        </p:spPr>
+      </p:pic>
     </p:spTree>
     <p:extLst>
       <p:ext uri="{BB962C8B-B14F-4D97-AF65-F5344CB8AC3E}">
@@ -22040,6 +22865,96 @@
                                         </p:cTn>
                                         <p:tgtEl>
                                           <p:spTgt spid="6"/>
+                                        </p:tgtEl>
+                                        <p:attrNameLst>
+                                          <p:attrName>style.visibility</p:attrName>
+                                        </p:attrNameLst>
+                                      </p:cBhvr>
+                                      <p:to>
+                                        <p:strVal val="visible"/>
+                                      </p:to>
+                                    </p:set>
+                                  </p:childTnLst>
+                                </p:cTn>
+                              </p:par>
+                            </p:childTnLst>
+                          </p:cTn>
+                        </p:par>
+                      </p:childTnLst>
+                    </p:cTn>
+                  </p:par>
+                  <p:par>
+                    <p:cTn id="7" fill="hold">
+                      <p:stCondLst>
+                        <p:cond delay="indefinite"/>
+                      </p:stCondLst>
+                      <p:childTnLst>
+                        <p:par>
+                          <p:cTn id="8" fill="hold">
+                            <p:stCondLst>
+                              <p:cond delay="0"/>
+                            </p:stCondLst>
+                            <p:childTnLst>
+                              <p:par>
+                                <p:cTn id="9" presetID="1" presetClass="entr" presetSubtype="0" fill="hold" nodeType="clickEffect">
+                                  <p:stCondLst>
+                                    <p:cond delay="0"/>
+                                  </p:stCondLst>
+                                  <p:childTnLst>
+                                    <p:set>
+                                      <p:cBhvr>
+                                        <p:cTn id="10" dur="1" fill="hold">
+                                          <p:stCondLst>
+                                            <p:cond delay="0"/>
+                                          </p:stCondLst>
+                                        </p:cTn>
+                                        <p:tgtEl>
+                                          <p:spTgt spid="4"/>
+                                        </p:tgtEl>
+                                        <p:attrNameLst>
+                                          <p:attrName>style.visibility</p:attrName>
+                                        </p:attrNameLst>
+                                      </p:cBhvr>
+                                      <p:to>
+                                        <p:strVal val="visible"/>
+                                      </p:to>
+                                    </p:set>
+                                  </p:childTnLst>
+                                </p:cTn>
+                              </p:par>
+                            </p:childTnLst>
+                          </p:cTn>
+                        </p:par>
+                      </p:childTnLst>
+                    </p:cTn>
+                  </p:par>
+                  <p:par>
+                    <p:cTn id="11" fill="hold">
+                      <p:stCondLst>
+                        <p:cond delay="indefinite"/>
+                      </p:stCondLst>
+                      <p:childTnLst>
+                        <p:par>
+                          <p:cTn id="12" fill="hold">
+                            <p:stCondLst>
+                              <p:cond delay="0"/>
+                            </p:stCondLst>
+                            <p:childTnLst>
+                              <p:par>
+                                <p:cTn id="13" presetID="1" presetClass="entr" presetSubtype="0" fill="hold" nodeType="clickEffect">
+                                  <p:stCondLst>
+                                    <p:cond delay="0"/>
+                                  </p:stCondLst>
+                                  <p:childTnLst>
+                                    <p:set>
+                                      <p:cBhvr>
+                                        <p:cTn id="14" dur="1" fill="hold">
+                                          <p:stCondLst>
+                                            <p:cond delay="0"/>
+                                          </p:stCondLst>
+                                        </p:cTn>
+                                        <p:tgtEl>
+                                          <p:spTgt spid="8"/>
                                         </p:tgtEl>
                                         <p:attrNameLst>
                                           <p:attrName>style.visibility</p:attrName>
@@ -43212,8 +44127,303 @@
 </a:theme>
 </file>
 
+<file path=ppt/theme/theme2.xml><?xml version="1.0" encoding="utf-8"?>
+<a:theme xmlns:a="http://schemas.openxmlformats.org/drawingml/2006/main" name="Office Theme">
+  <a:themeElements>
+    <a:clrScheme name="Office">
+      <a:dk1>
+        <a:sysClr val="windowText" lastClr="000000"/>
+      </a:dk1>
+      <a:lt1>
+        <a:sysClr val="window" lastClr="FFFFFF"/>
+      </a:lt1>
+      <a:dk2>
+        <a:srgbClr val="44546A"/>
+      </a:dk2>
+      <a:lt2>
+        <a:srgbClr val="E7E6E6"/>
+      </a:lt2>
+      <a:accent1>
+        <a:srgbClr val="4472C4"/>
+      </a:accent1>
+      <a:accent2>
+        <a:srgbClr val="ED7D31"/>
+      </a:accent2>
+      <a:accent3>
+        <a:srgbClr val="A5A5A5"/>
+      </a:accent3>
+      <a:accent4>
+        <a:srgbClr val="FFC000"/>
+      </a:accent4>
+      <a:accent5>
+        <a:srgbClr val="5B9BD5"/>
+      </a:accent5>
+      <a:accent6>
+        <a:srgbClr val="70AD47"/>
+      </a:accent6>
+      <a:hlink>
+        <a:srgbClr val="0563C1"/>
+      </a:hlink>
+      <a:folHlink>
+        <a:srgbClr val="954F72"/>
+      </a:folHlink>
+    </a:clrScheme>
+    <a:fontScheme name="Office">
+      <a:majorFont>
+        <a:latin typeface="Calibri Light" panose="020F0302020204030204"/>
+        <a:ea typeface=""/>
+        <a:cs typeface=""/>
+        <a:font script="Jpan" typeface="游ゴシック Light"/>
+        <a:font script="Hang" typeface="맑은 고딕"/>
+        <a:font script="Hans" typeface="等线 Light"/>
+        <a:font script="Hant" typeface="新細明體"/>
+        <a:font script="Arab" typeface="Times New Roman"/>
+        <a:font script="Hebr" typeface="Times New Roman"/>
+        <a:font script="Thai" typeface="Angsana New"/>
+        <a:font script="Ethi" typeface="Nyala"/>
+        <a:font script="Beng" typeface="Vrinda"/>
+        <a:font script="Gujr" typeface="Shruti"/>
+        <a:font script="Khmr" typeface="MoolBoran"/>
+        <a:font script="Knda" typeface="Tunga"/>
+        <a:font script="Guru" typeface="Raavi"/>
+        <a:font script="Cans" typeface="Euphemia"/>
+        <a:font script="Cher" typeface="Plantagenet Cherokee"/>
+        <a:font script="Yiii" typeface="Microsoft Yi Baiti"/>
+        <a:font script="Tibt" typeface="Microsoft Himalaya"/>
+        <a:font script="Thaa" typeface="MV Boli"/>
+        <a:font script="Deva" typeface="Mangal"/>
+        <a:font script="Telu" typeface="Gautami"/>
+        <a:font script="Taml" typeface="Latha"/>
+        <a:font script="Syrc" typeface="Estrangelo Edessa"/>
+        <a:font script="Orya" typeface="Kalinga"/>
+        <a:font script="Mlym" typeface="Kartika"/>
+        <a:font script="Laoo" typeface="DokChampa"/>
+        <a:font script="Sinh" typeface="Iskoola Pota"/>
+        <a:font script="Mong" typeface="Mongolian Baiti"/>
+        <a:font script="Viet" typeface="Times New Roman"/>
+        <a:font script="Uigh" typeface="Microsoft Uighur"/>
+        <a:font script="Geor" typeface="Sylfaen"/>
+        <a:font script="Armn" typeface="Arial"/>
+        <a:font script="Bugi" typeface="Leelawadee UI"/>
+        <a:font script="Bopo" typeface="Microsoft JhengHei"/>
+        <a:font script="Java" typeface="Javanese Text"/>
+        <a:font script="Lisu" typeface="Segoe UI"/>
+        <a:font script="Mymr" typeface="Myanmar Text"/>
+        <a:font script="Nkoo" typeface="Ebrima"/>
+        <a:font script="Olck" typeface="Nirmala UI"/>
+        <a:font script="Osma" typeface="Ebrima"/>
+        <a:font script="Phag" typeface="Phagspa"/>
+        <a:font script="Syrn" typeface="Estrangelo Edessa"/>
+        <a:font script="Syrj" typeface="Estrangelo Edessa"/>
+        <a:font script="Syre" typeface="Estrangelo Edessa"/>
+        <a:font script="Sora" typeface="Nirmala UI"/>
+        <a:font script="Tale" typeface="Microsoft Tai Le"/>
+        <a:font script="Talu" typeface="Microsoft New Tai Lue"/>
+        <a:font script="Tfng" typeface="Ebrima"/>
+      </a:majorFont>
+      <a:minorFont>
+        <a:latin typeface="Calibri" panose="020F0502020204030204"/>
+        <a:ea typeface=""/>
+        <a:cs typeface=""/>
+        <a:font script="Jpan" typeface="游ゴシック"/>
+        <a:font script="Hang" typeface="맑은 고딕"/>
+        <a:font script="Hans" typeface="等线"/>
+        <a:font script="Hant" typeface="新細明體"/>
+        <a:font script="Arab" typeface="Arial"/>
+        <a:font script="Hebr" typeface="Arial"/>
+        <a:font script="Thai" typeface="Cordia New"/>
+        <a:font script="Ethi" typeface="Nyala"/>
+        <a:font script="Beng" typeface="Vrinda"/>
+        <a:font script="Gujr" typeface="Shruti"/>
+        <a:font script="Khmr" typeface="DaunPenh"/>
+        <a:font script="Knda" typeface="Tunga"/>
+        <a:font script="Guru" typeface="Raavi"/>
+        <a:font script="Cans" typeface="Euphemia"/>
+        <a:font script="Cher" typeface="Plantagenet Cherokee"/>
+        <a:font script="Yiii" typeface="Microsoft Yi Baiti"/>
+        <a:font script="Tibt" typeface="Microsoft Himalaya"/>
+        <a:font script="Thaa" typeface="MV Boli"/>
+        <a:font script="Deva" typeface="Mangal"/>
+        <a:font script="Telu" typeface="Gautami"/>
+        <a:font script="Taml" typeface="Latha"/>
+        <a:font script="Syrc" typeface="Estrangelo Edessa"/>
+        <a:font script="Orya" typeface="Kalinga"/>
+        <a:font script="Mlym" typeface="Kartika"/>
+        <a:font script="Laoo" typeface="DokChampa"/>
+        <a:font script="Sinh" typeface="Iskoola Pota"/>
+        <a:font script="Mong" typeface="Mongolian Baiti"/>
+        <a:font script="Viet" typeface="Arial"/>
+        <a:font script="Uigh" typeface="Microsoft Uighur"/>
+        <a:font script="Geor" typeface="Sylfaen"/>
+        <a:font script="Armn" typeface="Arial"/>
+        <a:font script="Bugi" typeface="Leelawadee UI"/>
+        <a:font script="Bopo" typeface="Microsoft JhengHei"/>
+        <a:font script="Java" typeface="Javanese Text"/>
+        <a:font script="Lisu" typeface="Segoe UI"/>
+        <a:font script="Mymr" typeface="Myanmar Text"/>
+        <a:font script="Nkoo" typeface="Ebrima"/>
+        <a:font script="Olck" typeface="Nirmala UI"/>
+        <a:font script="Osma" typeface="Ebrima"/>
+        <a:font script="Phag" typeface="Phagspa"/>
+        <a:font script="Syrn" typeface="Estrangelo Edessa"/>
+        <a:font script="Syrj" typeface="Estrangelo Edessa"/>
+        <a:font script="Syre" typeface="Estrangelo Edessa"/>
+        <a:font script="Sora" typeface="Nirmala UI"/>
+        <a:font script="Tale" typeface="Microsoft Tai Le"/>
+        <a:font script="Talu" typeface="Microsoft New Tai Lue"/>
+        <a:font script="Tfng" typeface="Ebrima"/>
+      </a:minorFont>
+    </a:fontScheme>
+    <a:fmtScheme name="Office">
+      <a:fillStyleLst>
+        <a:solidFill>
+          <a:schemeClr val="phClr"/>
+        </a:solidFill>
+        <a:gradFill rotWithShape="1">
+          <a:gsLst>
+            <a:gs pos="0">
+              <a:schemeClr val="phClr">
+                <a:lumMod val="110000"/>
+                <a:satMod val="105000"/>
+                <a:tint val="67000"/>
+              </a:schemeClr>
+            </a:gs>
+            <a:gs pos="50000">
+              <a:schemeClr val="phClr">
+                <a:lumMod val="105000"/>
+                <a:satMod val="103000"/>
+                <a:tint val="73000"/>
+              </a:schemeClr>
+            </a:gs>
+            <a:gs pos="100000">
+              <a:schemeClr val="phClr">
+                <a:lumMod val="105000"/>
+                <a:satMod val="109000"/>
+                <a:tint val="81000"/>
+              </a:schemeClr>
+            </a:gs>
+          </a:gsLst>
+          <a:lin ang="5400000" scaled="0"/>
+        </a:gradFill>
+        <a:gradFill rotWithShape="1">
+          <a:gsLst>
+            <a:gs pos="0">
+              <a:schemeClr val="phClr">
+                <a:satMod val="103000"/>
+                <a:lumMod val="102000"/>
+                <a:tint val="94000"/>
+              </a:schemeClr>
+            </a:gs>
+            <a:gs pos="50000">
+              <a:schemeClr val="phClr">
+                <a:satMod val="110000"/>
+                <a:lumMod val="100000"/>
+                <a:shade val="100000"/>
+              </a:schemeClr>
+            </a:gs>
+            <a:gs pos="100000">
+              <a:schemeClr val="phClr">
+                <a:lumMod val="99000"/>
+                <a:satMod val="120000"/>
+                <a:shade val="78000"/>
+              </a:schemeClr>
+            </a:gs>
+          </a:gsLst>
+          <a:lin ang="5400000" scaled="0"/>
+        </a:gradFill>
+      </a:fillStyleLst>
+      <a:lnStyleLst>
+        <a:ln w="6350" cap="flat" cmpd="sng" algn="ctr">
+          <a:solidFill>
+            <a:schemeClr val="phClr"/>
+          </a:solidFill>
+          <a:prstDash val="solid"/>
+          <a:miter lim="800000"/>
+        </a:ln>
+        <a:ln w="12700" cap="flat" cmpd="sng" algn="ctr">
+          <a:solidFill>
+            <a:schemeClr val="phClr"/>
+          </a:solidFill>
+          <a:prstDash val="solid"/>
+          <a:miter lim="800000"/>
+        </a:ln>
+        <a:ln w="19050" cap="flat" cmpd="sng" algn="ctr">
+          <a:solidFill>
+            <a:schemeClr val="phClr"/>
+          </a:solidFill>
+          <a:prstDash val="solid"/>
+          <a:miter lim="800000"/>
+        </a:ln>
+      </a:lnStyleLst>
+      <a:effectStyleLst>
+        <a:effectStyle>
+          <a:effectLst/>
+        </a:effectStyle>
+        <a:effectStyle>
+          <a:effectLst/>
+        </a:effectStyle>
+        <a:effectStyle>
+          <a:effectLst>
+            <a:outerShdw blurRad="57150" dist="19050" dir="5400000" algn="ctr" rotWithShape="0">
+              <a:srgbClr val="000000">
+                <a:alpha val="63000"/>
+              </a:srgbClr>
+            </a:outerShdw>
+          </a:effectLst>
+        </a:effectStyle>
+      </a:effectStyleLst>
+      <a:bgFillStyleLst>
+        <a:solidFill>
+          <a:schemeClr val="phClr"/>
+        </a:solidFill>
+        <a:solidFill>
+          <a:schemeClr val="phClr">
+            <a:tint val="95000"/>
+            <a:satMod val="170000"/>
+          </a:schemeClr>
+        </a:solidFill>
+        <a:gradFill rotWithShape="1">
+          <a:gsLst>
+            <a:gs pos="0">
+              <a:schemeClr val="phClr">
+                <a:tint val="93000"/>
+                <a:satMod val="150000"/>
+                <a:shade val="98000"/>
+                <a:lumMod val="102000"/>
+              </a:schemeClr>
+            </a:gs>
+            <a:gs pos="50000">
+              <a:schemeClr val="phClr">
+                <a:tint val="98000"/>
+                <a:satMod val="130000"/>
+                <a:shade val="90000"/>
+                <a:lumMod val="103000"/>
+              </a:schemeClr>
+            </a:gs>
+            <a:gs pos="100000">
+              <a:schemeClr val="phClr">
+                <a:shade val="63000"/>
+                <a:satMod val="120000"/>
+              </a:schemeClr>
+            </a:gs>
+          </a:gsLst>
+          <a:lin ang="5400000" scaled="0"/>
+        </a:gradFill>
+      </a:bgFillStyleLst>
+    </a:fmtScheme>
+  </a:themeElements>
+  <a:objectDefaults/>
+  <a:extraClrSchemeLst/>
+  <a:extLst>
+    <a:ext uri="{05A4C25C-085E-4340-85A3-A5531E510DB2}">
+      <thm15:themeFamily xmlns:thm15="http://schemas.microsoft.com/office/thememl/2012/main" name="Office Theme" id="{62F939B6-93AF-4DB8-9C6B-D6C7DFDC589F}" vid="{4A3C46E8-61CC-4603-A589-7422A47A8E4A}"/>
+    </a:ext>
+  </a:extLst>
+</a:theme>
+</file>
+
 <file path=docMetadata/LabelInfo.xml><?xml version="1.0" encoding="utf-8"?>
 <clbl:labelList xmlns:clbl="http://schemas.microsoft.com/office/2020/mipLabelMetadata">
-  <clbl:label id="{f42aa342-8706-4288-bd11-ebb85995028c}" enabled="1" method="Standard" siteId="{72f988bf-86f1-41af-91ab-2d7cd011db47}" contentBits="0" removed="0"/>
+  <clbl:label id="{87867195-f2b8-4ac2-b0b6-6bb73cb33afc}" enabled="1" method="Privileged" siteId="{72f988bf-86f1-41af-91ab-2d7cd011db47}" contentBits="0" removed="0"/>
 </clbl:labelList>
 </file>
</xml_diff>

<commit_message>
Added slide about getting pointers to obj refs in C#11 (issue #13)
</commit_message>
<xml_diff>
--- a/doc/Introduction to unsafe C#.pptx
+++ b/doc/Introduction to unsafe C#.pptx
@@ -5,7 +5,7 @@
     <p:sldMasterId id="2147483660" r:id="rId1"/>
   </p:sldMasterIdLst>
   <p:notesMasterIdLst>
-    <p:notesMasterId r:id="rId54"/>
+    <p:notesMasterId r:id="rId55"/>
   </p:notesMasterIdLst>
   <p:sldIdLst>
     <p:sldId id="256" r:id="rId2"/>
@@ -21,45 +21,46 @@
     <p:sldId id="297" r:id="rId12"/>
     <p:sldId id="298" r:id="rId13"/>
     <p:sldId id="266" r:id="rId14"/>
-    <p:sldId id="299" r:id="rId15"/>
-    <p:sldId id="288" r:id="rId16"/>
-    <p:sldId id="317" r:id="rId17"/>
-    <p:sldId id="300" r:id="rId18"/>
-    <p:sldId id="301" r:id="rId19"/>
-    <p:sldId id="316" r:id="rId20"/>
-    <p:sldId id="302" r:id="rId21"/>
-    <p:sldId id="303" r:id="rId22"/>
-    <p:sldId id="270" r:id="rId23"/>
-    <p:sldId id="289" r:id="rId24"/>
-    <p:sldId id="304" r:id="rId25"/>
-    <p:sldId id="305" r:id="rId26"/>
-    <p:sldId id="273" r:id="rId27"/>
-    <p:sldId id="276" r:id="rId28"/>
-    <p:sldId id="313" r:id="rId29"/>
-    <p:sldId id="315" r:id="rId30"/>
-    <p:sldId id="314" r:id="rId31"/>
-    <p:sldId id="290" r:id="rId32"/>
-    <p:sldId id="307" r:id="rId33"/>
-    <p:sldId id="309" r:id="rId34"/>
-    <p:sldId id="279" r:id="rId35"/>
-    <p:sldId id="310" r:id="rId36"/>
-    <p:sldId id="311" r:id="rId37"/>
-    <p:sldId id="312" r:id="rId38"/>
-    <p:sldId id="291" r:id="rId39"/>
-    <p:sldId id="318" r:id="rId40"/>
-    <p:sldId id="319" r:id="rId41"/>
-    <p:sldId id="320" r:id="rId42"/>
-    <p:sldId id="321" r:id="rId43"/>
-    <p:sldId id="322" r:id="rId44"/>
-    <p:sldId id="323" r:id="rId45"/>
-    <p:sldId id="324" r:id="rId46"/>
-    <p:sldId id="325" r:id="rId47"/>
-    <p:sldId id="326" r:id="rId48"/>
-    <p:sldId id="327" r:id="rId49"/>
-    <p:sldId id="292" r:id="rId50"/>
-    <p:sldId id="283" r:id="rId51"/>
-    <p:sldId id="284" r:id="rId52"/>
-    <p:sldId id="285" r:id="rId53"/>
+    <p:sldId id="328" r:id="rId15"/>
+    <p:sldId id="299" r:id="rId16"/>
+    <p:sldId id="288" r:id="rId17"/>
+    <p:sldId id="317" r:id="rId18"/>
+    <p:sldId id="300" r:id="rId19"/>
+    <p:sldId id="301" r:id="rId20"/>
+    <p:sldId id="316" r:id="rId21"/>
+    <p:sldId id="302" r:id="rId22"/>
+    <p:sldId id="303" r:id="rId23"/>
+    <p:sldId id="270" r:id="rId24"/>
+    <p:sldId id="289" r:id="rId25"/>
+    <p:sldId id="304" r:id="rId26"/>
+    <p:sldId id="305" r:id="rId27"/>
+    <p:sldId id="273" r:id="rId28"/>
+    <p:sldId id="276" r:id="rId29"/>
+    <p:sldId id="313" r:id="rId30"/>
+    <p:sldId id="315" r:id="rId31"/>
+    <p:sldId id="314" r:id="rId32"/>
+    <p:sldId id="290" r:id="rId33"/>
+    <p:sldId id="307" r:id="rId34"/>
+    <p:sldId id="309" r:id="rId35"/>
+    <p:sldId id="279" r:id="rId36"/>
+    <p:sldId id="310" r:id="rId37"/>
+    <p:sldId id="311" r:id="rId38"/>
+    <p:sldId id="312" r:id="rId39"/>
+    <p:sldId id="291" r:id="rId40"/>
+    <p:sldId id="318" r:id="rId41"/>
+    <p:sldId id="319" r:id="rId42"/>
+    <p:sldId id="320" r:id="rId43"/>
+    <p:sldId id="321" r:id="rId44"/>
+    <p:sldId id="322" r:id="rId45"/>
+    <p:sldId id="323" r:id="rId46"/>
+    <p:sldId id="324" r:id="rId47"/>
+    <p:sldId id="325" r:id="rId48"/>
+    <p:sldId id="326" r:id="rId49"/>
+    <p:sldId id="327" r:id="rId50"/>
+    <p:sldId id="292" r:id="rId51"/>
+    <p:sldId id="283" r:id="rId52"/>
+    <p:sldId id="284" r:id="rId53"/>
+    <p:sldId id="285" r:id="rId54"/>
   </p:sldIdLst>
   <p:sldSz cx="12192000" cy="6858000"/>
   <p:notesSz cx="6858000" cy="9144000"/>
@@ -248,7 +249,7 @@
           <a:p>
             <a:fld id="{2B6DBF41-98D5-4B29-8B81-B31614D19ACC}" type="datetimeFigureOut">
               <a:rPr lang="en-US" smtClean="0"/>
-              <a:t>11/7/2022</a:t>
+              <a:t>1/19/2023</a:t>
             </a:fld>
             <a:endParaRPr lang="en-US"/>
           </a:p>
@@ -757,7 +758,7 @@
           <a:p>
             <a:fld id="{2B4F40D4-862D-491C-85E3-1A34EFA2BD00}" type="slidenum">
               <a:rPr lang="en-US" smtClean="0"/>
-              <a:t>23</a:t>
+              <a:t>24</a:t>
             </a:fld>
             <a:endParaRPr lang="en-US"/>
           </a:p>
@@ -962,7 +963,7 @@
           <a:p>
             <a:fld id="{F9BC75CE-03FF-4667-898C-4C70B4392062}" type="datetimeFigureOut">
               <a:rPr lang="en-US" smtClean="0"/>
-              <a:t>11/7/2022</a:t>
+              <a:t>1/19/2023</a:t>
             </a:fld>
             <a:endParaRPr lang="en-US"/>
           </a:p>
@@ -1237,7 +1238,7 @@
           <a:p>
             <a:fld id="{F9BC75CE-03FF-4667-898C-4C70B4392062}" type="datetimeFigureOut">
               <a:rPr lang="en-US" smtClean="0"/>
-              <a:t>11/7/2022</a:t>
+              <a:t>1/19/2023</a:t>
             </a:fld>
             <a:endParaRPr lang="en-US"/>
           </a:p>
@@ -1431,7 +1432,7 @@
           <a:p>
             <a:fld id="{F9BC75CE-03FF-4667-898C-4C70B4392062}" type="datetimeFigureOut">
               <a:rPr lang="en-US" smtClean="0"/>
-              <a:t>11/7/2022</a:t>
+              <a:t>1/19/2023</a:t>
             </a:fld>
             <a:endParaRPr lang="en-US"/>
           </a:p>
@@ -1704,7 +1705,7 @@
           <a:p>
             <a:fld id="{F9BC75CE-03FF-4667-898C-4C70B4392062}" type="datetimeFigureOut">
               <a:rPr lang="en-US" smtClean="0"/>
-              <a:t>11/7/2022</a:t>
+              <a:t>1/19/2023</a:t>
             </a:fld>
             <a:endParaRPr lang="en-US"/>
           </a:p>
@@ -2045,7 +2046,7 @@
           <a:p>
             <a:fld id="{F9BC75CE-03FF-4667-898C-4C70B4392062}" type="datetimeFigureOut">
               <a:rPr lang="en-US" smtClean="0"/>
-              <a:t>11/7/2022</a:t>
+              <a:t>1/19/2023</a:t>
             </a:fld>
             <a:endParaRPr lang="en-US"/>
           </a:p>
@@ -2668,7 +2669,7 @@
           <a:p>
             <a:fld id="{F9BC75CE-03FF-4667-898C-4C70B4392062}" type="datetimeFigureOut">
               <a:rPr lang="en-US" smtClean="0"/>
-              <a:t>11/7/2022</a:t>
+              <a:t>1/19/2023</a:t>
             </a:fld>
             <a:endParaRPr lang="en-US"/>
           </a:p>
@@ -3528,7 +3529,7 @@
           <a:p>
             <a:fld id="{F9BC75CE-03FF-4667-898C-4C70B4392062}" type="datetimeFigureOut">
               <a:rPr lang="en-US" smtClean="0"/>
-              <a:t>11/7/2022</a:t>
+              <a:t>1/19/2023</a:t>
             </a:fld>
             <a:endParaRPr lang="en-US"/>
           </a:p>
@@ -3698,7 +3699,7 @@
           <a:p>
             <a:fld id="{F9BC75CE-03FF-4667-898C-4C70B4392062}" type="datetimeFigureOut">
               <a:rPr lang="en-US" smtClean="0"/>
-              <a:t>11/7/2022</a:t>
+              <a:t>1/19/2023</a:t>
             </a:fld>
             <a:endParaRPr lang="en-US"/>
           </a:p>
@@ -3878,7 +3879,7 @@
           <a:p>
             <a:fld id="{F9BC75CE-03FF-4667-898C-4C70B4392062}" type="datetimeFigureOut">
               <a:rPr lang="en-US" smtClean="0"/>
-              <a:t>11/7/2022</a:t>
+              <a:t>1/19/2023</a:t>
             </a:fld>
             <a:endParaRPr lang="en-US"/>
           </a:p>
@@ -4048,7 +4049,7 @@
           <a:p>
             <a:fld id="{F9BC75CE-03FF-4667-898C-4C70B4392062}" type="datetimeFigureOut">
               <a:rPr lang="en-US" smtClean="0"/>
-              <a:t>11/7/2022</a:t>
+              <a:t>1/19/2023</a:t>
             </a:fld>
             <a:endParaRPr lang="en-US"/>
           </a:p>
@@ -4295,7 +4296,7 @@
           <a:p>
             <a:fld id="{F9BC75CE-03FF-4667-898C-4C70B4392062}" type="datetimeFigureOut">
               <a:rPr lang="en-US" smtClean="0"/>
-              <a:t>11/7/2022</a:t>
+              <a:t>1/19/2023</a:t>
             </a:fld>
             <a:endParaRPr lang="en-US"/>
           </a:p>
@@ -4587,7 +4588,7 @@
           <a:p>
             <a:fld id="{F9BC75CE-03FF-4667-898C-4C70B4392062}" type="datetimeFigureOut">
               <a:rPr lang="en-US" smtClean="0"/>
-              <a:t>11/7/2022</a:t>
+              <a:t>1/19/2023</a:t>
             </a:fld>
             <a:endParaRPr lang="en-US"/>
           </a:p>
@@ -5031,7 +5032,7 @@
           <a:p>
             <a:fld id="{F9BC75CE-03FF-4667-898C-4C70B4392062}" type="datetimeFigureOut">
               <a:rPr lang="en-US" smtClean="0"/>
-              <a:t>11/7/2022</a:t>
+              <a:t>1/19/2023</a:t>
             </a:fld>
             <a:endParaRPr lang="en-US"/>
           </a:p>
@@ -5149,7 +5150,7 @@
           <a:p>
             <a:fld id="{F9BC75CE-03FF-4667-898C-4C70B4392062}" type="datetimeFigureOut">
               <a:rPr lang="en-US" smtClean="0"/>
-              <a:t>11/7/2022</a:t>
+              <a:t>1/19/2023</a:t>
             </a:fld>
             <a:endParaRPr lang="en-US"/>
           </a:p>
@@ -5244,7 +5245,7 @@
           <a:p>
             <a:fld id="{F9BC75CE-03FF-4667-898C-4C70B4392062}" type="datetimeFigureOut">
               <a:rPr lang="en-US" smtClean="0"/>
-              <a:t>11/7/2022</a:t>
+              <a:t>1/19/2023</a:t>
             </a:fld>
             <a:endParaRPr lang="en-US"/>
           </a:p>
@@ -5523,7 +5524,7 @@
           <a:p>
             <a:fld id="{F9BC75CE-03FF-4667-898C-4C70B4392062}" type="datetimeFigureOut">
               <a:rPr lang="en-US" smtClean="0"/>
-              <a:t>11/7/2022</a:t>
+              <a:t>1/19/2023</a:t>
             </a:fld>
             <a:endParaRPr lang="en-US"/>
           </a:p>
@@ -5798,7 +5799,7 @@
           <a:p>
             <a:fld id="{F9BC75CE-03FF-4667-898C-4C70B4392062}" type="datetimeFigureOut">
               <a:rPr lang="en-US" smtClean="0"/>
-              <a:t>11/7/2022</a:t>
+              <a:t>1/19/2023</a:t>
             </a:fld>
             <a:endParaRPr lang="en-US"/>
           </a:p>
@@ -6227,7 +6228,7 @@
           <a:p>
             <a:fld id="{F9BC75CE-03FF-4667-898C-4C70B4392062}" type="datetimeFigureOut">
               <a:rPr lang="en-US" smtClean="0"/>
-              <a:t>11/7/2022</a:t>
+              <a:t>1/19/2023</a:t>
             </a:fld>
             <a:endParaRPr lang="en-US"/>
           </a:p>
@@ -7380,7 +7381,7 @@
           <a:p>
             <a:r>
               <a:rPr lang="en-US" sz="1200" dirty="0"/>
-              <a:t>Rev. 4 (2022-10-24), </a:t>
+              <a:t>Rev. 5 (2023-01-20), </a:t>
             </a:r>
             <a:r>
               <a:rPr lang="en-US" sz="1200" dirty="0">
@@ -9859,20 +9860,25 @@
             <p:ph type="title"/>
           </p:nvPr>
         </p:nvSpPr>
-        <p:spPr/>
+        <p:spPr>
+          <a:xfrm>
+            <a:off x="646111" y="455984"/>
+            <a:ext cx="9404723" cy="1400530"/>
+          </a:xfrm>
+        </p:spPr>
         <p:txBody>
           <a:bodyPr/>
           <a:lstStyle/>
           <a:p>
             <a:r>
-              <a:rPr lang="en-US"/>
+              <a:rPr lang="en-US" dirty="0"/>
               <a:t>Unsafe C# features</a:t>
             </a:r>
             <a:br>
-              <a:rPr lang="en-US"/>
+              <a:rPr lang="en-US" dirty="0"/>
             </a:br>
             <a:r>
-              <a:rPr lang="en-US"/>
+              <a:rPr lang="en-US" dirty="0"/>
               <a:t>What can you get the address of?</a:t>
             </a:r>
           </a:p>
@@ -9924,6 +9930,50 @@
           </a:p>
         </p:txBody>
       </p:sp>
+      <p:pic>
+        <p:nvPicPr>
+          <p:cNvPr id="5" name="Picture 4" descr="Compiler Error CS0208&#10;Cannot take the address of, get the size of, or declare a pointer to a managed type ('type')&#10;Even when used with the unsafe keyword, taking the address of a managed object, getting the size of a managed object, or declaring a pointer to a managed type is not allowed.">
+            <a:extLst>
+              <a:ext uri="{FF2B5EF4-FFF2-40B4-BE49-F238E27FC236}">
+                <a16:creationId xmlns:a16="http://schemas.microsoft.com/office/drawing/2014/main" id="{2FF86BD2-0CDC-D26C-6279-03CA011342F8}"/>
+              </a:ext>
+            </a:extLst>
+          </p:cNvPr>
+          <p:cNvPicPr>
+            <a:picLocks noChangeAspect="1"/>
+          </p:cNvPicPr>
+          <p:nvPr/>
+        </p:nvPicPr>
+        <p:blipFill>
+          <a:blip r:embed="rId2"/>
+          <a:stretch>
+            <a:fillRect/>
+          </a:stretch>
+        </p:blipFill>
+        <p:spPr>
+          <a:xfrm>
+            <a:off x="5986809" y="1853248"/>
+            <a:ext cx="5462969" cy="4485418"/>
+          </a:xfrm>
+          <a:prstGeom prst="rect">
+            <a:avLst/>
+          </a:prstGeom>
+          <a:ln w="15875">
+            <a:solidFill>
+              <a:schemeClr val="accent1"/>
+            </a:solidFill>
+          </a:ln>
+          <a:effectLst>
+            <a:outerShdw blurRad="127000" dist="127000" dir="2700000" algn="ctr" rotWithShape="0">
+              <a:schemeClr val="bg1">
+                <a:lumMod val="95000"/>
+                <a:lumOff val="5000"/>
+                <a:alpha val="80000"/>
+              </a:schemeClr>
+            </a:outerShdw>
+          </a:effectLst>
+        </p:spPr>
+      </p:pic>
     </p:spTree>
     <p:extLst>
       <p:ext uri="{BB962C8B-B14F-4D97-AF65-F5344CB8AC3E}">
@@ -10138,6 +10188,51 @@
                       </p:childTnLst>
                     </p:cTn>
                   </p:par>
+                  <p:par>
+                    <p:cTn id="19" fill="hold">
+                      <p:stCondLst>
+                        <p:cond delay="indefinite"/>
+                      </p:stCondLst>
+                      <p:childTnLst>
+                        <p:par>
+                          <p:cTn id="20" fill="hold">
+                            <p:stCondLst>
+                              <p:cond delay="0"/>
+                            </p:stCondLst>
+                            <p:childTnLst>
+                              <p:par>
+                                <p:cTn id="21" presetID="1" presetClass="entr" presetSubtype="0" fill="hold" nodeType="clickEffect">
+                                  <p:stCondLst>
+                                    <p:cond delay="0"/>
+                                  </p:stCondLst>
+                                  <p:childTnLst>
+                                    <p:set>
+                                      <p:cBhvr>
+                                        <p:cTn id="22" dur="1" fill="hold">
+                                          <p:stCondLst>
+                                            <p:cond delay="0"/>
+                                          </p:stCondLst>
+                                        </p:cTn>
+                                        <p:tgtEl>
+                                          <p:spTgt spid="5"/>
+                                        </p:tgtEl>
+                                        <p:attrNameLst>
+                                          <p:attrName>style.visibility</p:attrName>
+                                        </p:attrNameLst>
+                                      </p:cBhvr>
+                                      <p:to>
+                                        <p:strVal val="visible"/>
+                                      </p:to>
+                                    </p:set>
+                                  </p:childTnLst>
+                                </p:cTn>
+                              </p:par>
+                            </p:childTnLst>
+                          </p:cTn>
+                        </p:par>
+                      </p:childTnLst>
+                    </p:cTn>
+                  </p:par>
                 </p:childTnLst>
               </p:cTn>
               <p:prevCondLst>
@@ -10167,6 +10262,1649 @@
 </file>
 
 <file path=ppt/slides/slide14.xml><?xml version="1.0" encoding="utf-8"?>
+<p:sld xmlns:a="http://schemas.openxmlformats.org/drawingml/2006/main" xmlns:r="http://schemas.openxmlformats.org/officeDocument/2006/relationships" xmlns:p="http://schemas.openxmlformats.org/presentationml/2006/main">
+  <p:cSld>
+    <p:spTree>
+      <p:nvGrpSpPr>
+        <p:cNvPr id="1" name=""/>
+        <p:cNvGrpSpPr/>
+        <p:nvPr/>
+      </p:nvGrpSpPr>
+      <p:grpSpPr>
+        <a:xfrm>
+          <a:off x="0" y="0"/>
+          <a:ext cx="0" cy="0"/>
+          <a:chOff x="0" y="0"/>
+          <a:chExt cx="0" cy="0"/>
+        </a:xfrm>
+      </p:grpSpPr>
+      <p:sp>
+        <p:nvSpPr>
+          <p:cNvPr id="2" name="Title 1">
+            <a:extLst>
+              <a:ext uri="{FF2B5EF4-FFF2-40B4-BE49-F238E27FC236}">
+                <a16:creationId xmlns:a16="http://schemas.microsoft.com/office/drawing/2014/main" id="{4BEB305B-6D21-CC8D-59CA-D86B526DF402}"/>
+              </a:ext>
+            </a:extLst>
+          </p:cNvPr>
+          <p:cNvSpPr>
+            <a:spLocks noGrp="1"/>
+          </p:cNvSpPr>
+          <p:nvPr>
+            <p:ph type="title"/>
+          </p:nvPr>
+        </p:nvSpPr>
+        <p:spPr/>
+        <p:txBody>
+          <a:bodyPr/>
+          <a:lstStyle/>
+          <a:p>
+            <a:r>
+              <a:rPr lang="en-US" dirty="0"/>
+              <a:t>Unsafe C# features</a:t>
+            </a:r>
+            <a:br>
+              <a:rPr lang="en-US" dirty="0"/>
+            </a:br>
+            <a:r>
+              <a:rPr lang="en-US" dirty="0"/>
+              <a:t>…unless you’re already using C# 11</a:t>
+            </a:r>
+          </a:p>
+        </p:txBody>
+      </p:sp>
+      <p:sp>
+        <p:nvSpPr>
+          <p:cNvPr id="7" name="Rectangle 3">
+            <a:extLst>
+              <a:ext uri="{FF2B5EF4-FFF2-40B4-BE49-F238E27FC236}">
+                <a16:creationId xmlns:a16="http://schemas.microsoft.com/office/drawing/2014/main" id="{6FAF8F90-DED7-5DEB-05CB-F3A9881BAA2E}"/>
+              </a:ext>
+            </a:extLst>
+          </p:cNvPr>
+          <p:cNvSpPr>
+            <a:spLocks noChangeArrowheads="1"/>
+          </p:cNvSpPr>
+          <p:nvPr/>
+        </p:nvSpPr>
+        <p:spPr bwMode="auto">
+          <a:xfrm>
+            <a:off x="1103314" y="2052919"/>
+            <a:ext cx="8946540" cy="4195480"/>
+          </a:xfrm>
+          <a:prstGeom prst="rect">
+            <a:avLst/>
+          </a:prstGeom>
+          <a:solidFill>
+            <a:srgbClr val="FFFFFF"/>
+          </a:solidFill>
+          <a:ln w="15875">
+            <a:solidFill>
+              <a:schemeClr val="accent1"/>
+            </a:solidFill>
+            <a:miter lim="800000"/>
+            <a:headEnd/>
+            <a:tailEnd/>
+          </a:ln>
+          <a:effectLst/>
+          <a:extLst>
+            <a:ext uri="{AF507438-7753-43E0-B8FC-AC1667EBCBE1}">
+              <a14:hiddenEffects xmlns:a14="http://schemas.microsoft.com/office/drawing/2010/main">
+                <a:effectLst>
+                  <a:outerShdw dist="35921" dir="2700000" algn="ctr" rotWithShape="0">
+                    <a:schemeClr val="bg2"/>
+                  </a:outerShdw>
+                </a:effectLst>
+              </a14:hiddenEffects>
+            </a:ext>
+          </a:extLst>
+        </p:spPr>
+        <p:txBody>
+          <a:bodyPr vert="horz" wrap="none" lIns="91440" tIns="45720" rIns="91440" bIns="45720" numCol="1" anchor="t" anchorCtr="0" compatLnSpc="1">
+            <a:prstTxWarp prst="textNoShape">
+              <a:avLst/>
+            </a:prstTxWarp>
+            <a:noAutofit/>
+          </a:bodyPr>
+          <a:lstStyle/>
+          <a:p>
+            <a:pPr marL="0" marR="0" lvl="0" indent="0" algn="l" defTabSz="914400" rtl="0" eaLnBrk="0" fontAlgn="base" latinLnBrk="0" hangingPunct="0">
+              <a:lnSpc>
+                <a:spcPct val="100000"/>
+              </a:lnSpc>
+              <a:spcBef>
+                <a:spcPct val="0"/>
+              </a:spcBef>
+              <a:spcAft>
+                <a:spcPct val="0"/>
+              </a:spcAft>
+              <a:buClrTx/>
+              <a:buSzTx/>
+              <a:buFontTx/>
+              <a:buNone/>
+              <a:tabLst/>
+            </a:pPr>
+            <a:r>
+              <a:rPr kumimoji="0" lang="en-US" altLang="en-US" sz="1300" b="0" i="0" u="none" strike="noStrike" cap="none" normalizeH="0" baseline="0" dirty="0">
+                <a:ln>
+                  <a:noFill/>
+                </a:ln>
+                <a:solidFill>
+                  <a:srgbClr val="0F54D6"/>
+                </a:solidFill>
+                <a:effectLst/>
+                <a:latin typeface="Consolas" panose="020B0609020204030204" pitchFamily="49" charset="0"/>
+              </a:rPr>
+              <a:t>public class </a:t>
+            </a:r>
+            <a:r>
+              <a:rPr kumimoji="0" lang="en-US" altLang="en-US" sz="1300" b="0" i="0" u="none" strike="noStrike" cap="none" normalizeH="0" baseline="0" dirty="0" err="1">
+                <a:ln>
+                  <a:noFill/>
+                </a:ln>
+                <a:solidFill>
+                  <a:srgbClr val="6B2FBA"/>
+                </a:solidFill>
+                <a:effectLst/>
+                <a:latin typeface="Consolas" panose="020B0609020204030204" pitchFamily="49" charset="0"/>
+              </a:rPr>
+              <a:t>ManagedType</a:t>
+            </a:r>
+            <a:br>
+              <a:rPr kumimoji="0" lang="en-US" altLang="en-US" sz="1300" b="0" i="0" u="none" strike="noStrike" cap="none" normalizeH="0" baseline="0" dirty="0">
+                <a:ln>
+                  <a:noFill/>
+                </a:ln>
+                <a:solidFill>
+                  <a:srgbClr val="6B2FBA"/>
+                </a:solidFill>
+                <a:effectLst/>
+                <a:latin typeface="Consolas" panose="020B0609020204030204" pitchFamily="49" charset="0"/>
+              </a:rPr>
+            </a:br>
+            <a:r>
+              <a:rPr kumimoji="0" lang="en-US" altLang="en-US" sz="1300" b="0" i="0" u="none" strike="noStrike" cap="none" normalizeH="0" baseline="0" dirty="0">
+                <a:ln>
+                  <a:noFill/>
+                </a:ln>
+                <a:solidFill>
+                  <a:srgbClr val="383838"/>
+                </a:solidFill>
+                <a:effectLst/>
+                <a:latin typeface="Consolas" panose="020B0609020204030204" pitchFamily="49" charset="0"/>
+              </a:rPr>
+              <a:t>{</a:t>
+            </a:r>
+            <a:br>
+              <a:rPr kumimoji="0" lang="en-US" altLang="en-US" sz="1300" b="0" i="0" u="none" strike="noStrike" cap="none" normalizeH="0" baseline="0" dirty="0">
+                <a:ln>
+                  <a:noFill/>
+                </a:ln>
+                <a:solidFill>
+                  <a:srgbClr val="383838"/>
+                </a:solidFill>
+                <a:effectLst/>
+                <a:latin typeface="Consolas" panose="020B0609020204030204" pitchFamily="49" charset="0"/>
+              </a:rPr>
+            </a:br>
+            <a:r>
+              <a:rPr kumimoji="0" lang="en-US" altLang="en-US" sz="1300" b="0" i="0" u="none" strike="noStrike" cap="none" normalizeH="0" baseline="0" dirty="0">
+                <a:ln>
+                  <a:noFill/>
+                </a:ln>
+                <a:solidFill>
+                  <a:srgbClr val="383838"/>
+                </a:solidFill>
+                <a:effectLst/>
+                <a:latin typeface="Consolas" panose="020B0609020204030204" pitchFamily="49" charset="0"/>
+              </a:rPr>
+              <a:t>    </a:t>
+            </a:r>
+            <a:r>
+              <a:rPr kumimoji="0" lang="en-US" altLang="en-US" sz="1300" b="0" i="0" u="none" strike="noStrike" cap="none" normalizeH="0" baseline="0" dirty="0">
+                <a:ln>
+                  <a:noFill/>
+                </a:ln>
+                <a:solidFill>
+                  <a:srgbClr val="0F54D6"/>
+                </a:solidFill>
+                <a:effectLst/>
+                <a:latin typeface="Consolas" panose="020B0609020204030204" pitchFamily="49" charset="0"/>
+              </a:rPr>
+              <a:t>public </a:t>
+            </a:r>
+            <a:r>
+              <a:rPr kumimoji="0" lang="en-US" altLang="en-US" sz="1300" b="0" i="0" u="none" strike="noStrike" cap="none" normalizeH="0" baseline="0" dirty="0" err="1">
+                <a:ln>
+                  <a:noFill/>
+                </a:ln>
+                <a:solidFill>
+                  <a:srgbClr val="0F54D6"/>
+                </a:solidFill>
+                <a:effectLst/>
+                <a:latin typeface="Consolas" panose="020B0609020204030204" pitchFamily="49" charset="0"/>
+              </a:rPr>
+              <a:t>ushort</a:t>
+            </a:r>
+            <a:r>
+              <a:rPr kumimoji="0" lang="en-US" altLang="en-US" sz="1300" b="0" i="0" u="none" strike="noStrike" cap="none" normalizeH="0" baseline="0" dirty="0">
+                <a:ln>
+                  <a:noFill/>
+                </a:ln>
+                <a:solidFill>
+                  <a:srgbClr val="0F54D6"/>
+                </a:solidFill>
+                <a:effectLst/>
+                <a:latin typeface="Consolas" panose="020B0609020204030204" pitchFamily="49" charset="0"/>
+              </a:rPr>
+              <a:t> </a:t>
+            </a:r>
+            <a:r>
+              <a:rPr kumimoji="0" lang="en-US" altLang="en-US" sz="1300" b="0" i="0" u="none" strike="noStrike" cap="none" normalizeH="0" baseline="0" dirty="0">
+                <a:ln>
+                  <a:noFill/>
+                </a:ln>
+                <a:solidFill>
+                  <a:srgbClr val="0093A1"/>
+                </a:solidFill>
+                <a:effectLst/>
+                <a:latin typeface="Consolas" panose="020B0609020204030204" pitchFamily="49" charset="0"/>
+              </a:rPr>
+              <a:t>Value </a:t>
+            </a:r>
+            <a:r>
+              <a:rPr kumimoji="0" lang="en-US" altLang="en-US" sz="1300" b="0" i="0" u="none" strike="noStrike" cap="none" normalizeH="0" baseline="0" dirty="0">
+                <a:ln>
+                  <a:noFill/>
+                </a:ln>
+                <a:solidFill>
+                  <a:srgbClr val="383838"/>
+                </a:solidFill>
+                <a:effectLst/>
+                <a:latin typeface="Consolas" panose="020B0609020204030204" pitchFamily="49" charset="0"/>
+              </a:rPr>
+              <a:t>= </a:t>
+            </a:r>
+            <a:r>
+              <a:rPr kumimoji="0" lang="en-US" altLang="en-US" sz="1300" b="0" i="0" u="none" strike="noStrike" cap="none" normalizeH="0" baseline="0" dirty="0">
+                <a:ln>
+                  <a:noFill/>
+                </a:ln>
+                <a:solidFill>
+                  <a:srgbClr val="AB2F6B"/>
+                </a:solidFill>
+                <a:effectLst/>
+                <a:latin typeface="Consolas" panose="020B0609020204030204" pitchFamily="49" charset="0"/>
+              </a:rPr>
+              <a:t>0xBEEF</a:t>
+            </a:r>
+            <a:r>
+              <a:rPr kumimoji="0" lang="en-US" altLang="en-US" sz="1300" b="0" i="0" u="none" strike="noStrike" cap="none" normalizeH="0" baseline="0" dirty="0">
+                <a:ln>
+                  <a:noFill/>
+                </a:ln>
+                <a:solidFill>
+                  <a:srgbClr val="383838"/>
+                </a:solidFill>
+                <a:effectLst/>
+                <a:latin typeface="Consolas" panose="020B0609020204030204" pitchFamily="49" charset="0"/>
+              </a:rPr>
+              <a:t>;</a:t>
+            </a:r>
+            <a:br>
+              <a:rPr kumimoji="0" lang="en-US" altLang="en-US" sz="1300" b="0" i="0" u="none" strike="noStrike" cap="none" normalizeH="0" baseline="0" dirty="0">
+                <a:ln>
+                  <a:noFill/>
+                </a:ln>
+                <a:solidFill>
+                  <a:srgbClr val="383838"/>
+                </a:solidFill>
+                <a:effectLst/>
+                <a:latin typeface="Consolas" panose="020B0609020204030204" pitchFamily="49" charset="0"/>
+              </a:rPr>
+            </a:br>
+            <a:r>
+              <a:rPr kumimoji="0" lang="en-US" altLang="en-US" sz="1300" b="0" i="0" u="none" strike="noStrike" cap="none" normalizeH="0" baseline="0" dirty="0">
+                <a:ln>
+                  <a:noFill/>
+                </a:ln>
+                <a:solidFill>
+                  <a:srgbClr val="383838"/>
+                </a:solidFill>
+                <a:effectLst/>
+                <a:latin typeface="Consolas" panose="020B0609020204030204" pitchFamily="49" charset="0"/>
+              </a:rPr>
+              <a:t>}</a:t>
+            </a:r>
+          </a:p>
+          <a:p>
+            <a:pPr marL="0" marR="0" lvl="0" indent="0" algn="l" defTabSz="914400" rtl="0" eaLnBrk="0" fontAlgn="base" latinLnBrk="0" hangingPunct="0">
+              <a:lnSpc>
+                <a:spcPct val="100000"/>
+              </a:lnSpc>
+              <a:spcBef>
+                <a:spcPct val="0"/>
+              </a:spcBef>
+              <a:spcAft>
+                <a:spcPct val="0"/>
+              </a:spcAft>
+              <a:buClrTx/>
+              <a:buSzTx/>
+              <a:buFontTx/>
+              <a:buNone/>
+              <a:tabLst/>
+            </a:pPr>
+            <a:endParaRPr lang="en-US" altLang="en-US" sz="1300" dirty="0">
+              <a:solidFill>
+                <a:srgbClr val="383838"/>
+              </a:solidFill>
+              <a:latin typeface="Consolas" panose="020B0609020204030204" pitchFamily="49" charset="0"/>
+            </a:endParaRPr>
+          </a:p>
+          <a:p>
+            <a:pPr defTabSz="914400" eaLnBrk="0" fontAlgn="base" hangingPunct="0">
+              <a:spcBef>
+                <a:spcPct val="0"/>
+              </a:spcBef>
+              <a:spcAft>
+                <a:spcPct val="0"/>
+              </a:spcAft>
+            </a:pPr>
+            <a:r>
+              <a:rPr kumimoji="0" lang="en-US" altLang="en-US" sz="1300" b="0" i="0" u="none" strike="noStrike" cap="none" normalizeH="0" baseline="0" dirty="0">
+                <a:ln>
+                  <a:noFill/>
+                </a:ln>
+                <a:solidFill>
+                  <a:srgbClr val="0F54D6"/>
+                </a:solidFill>
+                <a:effectLst/>
+                <a:latin typeface="Consolas" panose="020B0609020204030204" pitchFamily="49" charset="0"/>
+              </a:rPr>
+              <a:t>var </a:t>
+            </a:r>
+            <a:r>
+              <a:rPr kumimoji="0" lang="en-US" altLang="en-US" sz="1300" b="0" i="0" u="none" strike="noStrike" cap="none" normalizeH="0" baseline="0" dirty="0">
+                <a:ln>
+                  <a:noFill/>
+                </a:ln>
+                <a:solidFill>
+                  <a:srgbClr val="383838"/>
+                </a:solidFill>
+                <a:effectLst/>
+                <a:latin typeface="Consolas" panose="020B0609020204030204" pitchFamily="49" charset="0"/>
+              </a:rPr>
+              <a:t>managed = </a:t>
+            </a:r>
+            <a:r>
+              <a:rPr kumimoji="0" lang="en-US" altLang="en-US" sz="1300" b="0" i="0" u="none" strike="noStrike" cap="none" normalizeH="0" baseline="0" dirty="0">
+                <a:ln>
+                  <a:noFill/>
+                </a:ln>
+                <a:solidFill>
+                  <a:srgbClr val="0F54D6"/>
+                </a:solidFill>
+                <a:effectLst/>
+                <a:latin typeface="Consolas" panose="020B0609020204030204" pitchFamily="49" charset="0"/>
+              </a:rPr>
+              <a:t>new </a:t>
+            </a:r>
+            <a:r>
+              <a:rPr kumimoji="0" lang="en-US" altLang="en-US" sz="1300" b="0" i="0" u="none" strike="noStrike" cap="none" normalizeH="0" baseline="0" dirty="0" err="1">
+                <a:ln>
+                  <a:noFill/>
+                </a:ln>
+                <a:solidFill>
+                  <a:srgbClr val="6B2FBA"/>
+                </a:solidFill>
+                <a:effectLst/>
+                <a:latin typeface="Consolas" panose="020B0609020204030204" pitchFamily="49" charset="0"/>
+              </a:rPr>
+              <a:t>ManagedType</a:t>
+            </a:r>
+            <a:r>
+              <a:rPr kumimoji="0" lang="en-US" altLang="en-US" sz="1300" b="0" i="0" u="none" strike="noStrike" cap="none" normalizeH="0" baseline="0" dirty="0">
+                <a:ln>
+                  <a:noFill/>
+                </a:ln>
+                <a:solidFill>
+                  <a:srgbClr val="383838"/>
+                </a:solidFill>
+                <a:effectLst/>
+                <a:latin typeface="Consolas" panose="020B0609020204030204" pitchFamily="49" charset="0"/>
+              </a:rPr>
+              <a:t>();</a:t>
+            </a:r>
+            <a:br>
+              <a:rPr kumimoji="0" lang="en-US" altLang="en-US" sz="1300" b="0" i="0" u="none" strike="noStrike" cap="none" normalizeH="0" baseline="0" dirty="0">
+                <a:ln>
+                  <a:noFill/>
+                </a:ln>
+                <a:solidFill>
+                  <a:srgbClr val="383838"/>
+                </a:solidFill>
+                <a:effectLst/>
+                <a:latin typeface="Consolas" panose="020B0609020204030204" pitchFamily="49" charset="0"/>
+              </a:rPr>
+            </a:br>
+            <a:r>
+              <a:rPr kumimoji="0" lang="en-US" altLang="en-US" sz="1300" b="0" i="0" u="none" strike="noStrike" cap="none" normalizeH="0" baseline="0" dirty="0">
+                <a:ln>
+                  <a:noFill/>
+                </a:ln>
+                <a:solidFill>
+                  <a:srgbClr val="0F54D6"/>
+                </a:solidFill>
+                <a:effectLst/>
+                <a:latin typeface="Consolas" panose="020B0609020204030204" pitchFamily="49" charset="0"/>
+              </a:rPr>
+              <a:t>fixed </a:t>
+            </a:r>
+            <a:r>
+              <a:rPr kumimoji="0" lang="en-US" altLang="en-US" sz="1300" b="0" i="0" u="none" strike="noStrike" cap="none" normalizeH="0" baseline="0" dirty="0">
+                <a:ln>
+                  <a:noFill/>
+                </a:ln>
+                <a:solidFill>
+                  <a:srgbClr val="383838"/>
+                </a:solidFill>
+                <a:effectLst/>
+                <a:latin typeface="Consolas" panose="020B0609020204030204" pitchFamily="49" charset="0"/>
+              </a:rPr>
+              <a:t>(</a:t>
+            </a:r>
+            <a:r>
+              <a:rPr kumimoji="0" lang="en-US" altLang="en-US" sz="1300" b="0" i="0" u="none" strike="noStrike" cap="none" normalizeH="0" baseline="0" dirty="0" err="1">
+                <a:ln>
+                  <a:noFill/>
+                </a:ln>
+                <a:solidFill>
+                  <a:srgbClr val="0F54D6"/>
+                </a:solidFill>
+                <a:effectLst/>
+                <a:latin typeface="Consolas" panose="020B0609020204030204" pitchFamily="49" charset="0"/>
+              </a:rPr>
+              <a:t>ushort</a:t>
+            </a:r>
+            <a:r>
+              <a:rPr kumimoji="0" lang="en-US" altLang="en-US" sz="1300" b="0" i="0" u="none" strike="noStrike" cap="none" normalizeH="0" baseline="0" dirty="0">
+                <a:ln>
+                  <a:noFill/>
+                </a:ln>
+                <a:solidFill>
+                  <a:srgbClr val="383838"/>
+                </a:solidFill>
+                <a:effectLst/>
+                <a:latin typeface="Consolas" panose="020B0609020204030204" pitchFamily="49" charset="0"/>
+              </a:rPr>
+              <a:t>* </a:t>
+            </a:r>
+            <a:r>
+              <a:rPr kumimoji="0" lang="en-US" altLang="en-US" sz="1300" b="0" i="0" u="none" strike="noStrike" cap="none" normalizeH="0" baseline="0" dirty="0" err="1">
+                <a:ln>
+                  <a:noFill/>
+                </a:ln>
+                <a:solidFill>
+                  <a:srgbClr val="383838"/>
+                </a:solidFill>
+                <a:effectLst/>
+                <a:latin typeface="Consolas" panose="020B0609020204030204" pitchFamily="49" charset="0"/>
+              </a:rPr>
+              <a:t>fieldPtr</a:t>
+            </a:r>
+            <a:r>
+              <a:rPr kumimoji="0" lang="en-US" altLang="en-US" sz="1300" b="0" i="0" u="none" strike="noStrike" cap="none" normalizeH="0" baseline="0" dirty="0">
+                <a:ln>
+                  <a:noFill/>
+                </a:ln>
+                <a:solidFill>
+                  <a:srgbClr val="383838"/>
+                </a:solidFill>
+                <a:effectLst/>
+                <a:latin typeface="Consolas" panose="020B0609020204030204" pitchFamily="49" charset="0"/>
+              </a:rPr>
+              <a:t> = &amp;</a:t>
+            </a:r>
+            <a:r>
+              <a:rPr kumimoji="0" lang="en-US" altLang="en-US" sz="1300" b="0" i="0" u="none" strike="noStrike" cap="none" normalizeH="0" baseline="0" dirty="0" err="1">
+                <a:ln>
+                  <a:noFill/>
+                </a:ln>
+                <a:solidFill>
+                  <a:srgbClr val="383838"/>
+                </a:solidFill>
+                <a:effectLst/>
+                <a:latin typeface="Consolas" panose="020B0609020204030204" pitchFamily="49" charset="0"/>
+              </a:rPr>
+              <a:t>managed.</a:t>
+            </a:r>
+            <a:r>
+              <a:rPr kumimoji="0" lang="en-US" altLang="en-US" sz="1300" b="0" i="0" u="none" strike="noStrike" cap="none" normalizeH="0" baseline="0" dirty="0" err="1">
+                <a:ln>
+                  <a:noFill/>
+                </a:ln>
+                <a:solidFill>
+                  <a:srgbClr val="0093A1"/>
+                </a:solidFill>
+                <a:effectLst/>
+                <a:latin typeface="Consolas" panose="020B0609020204030204" pitchFamily="49" charset="0"/>
+              </a:rPr>
+              <a:t>Value</a:t>
+            </a:r>
+            <a:r>
+              <a:rPr kumimoji="0" lang="en-US" altLang="en-US" sz="1300" b="0" i="0" u="none" strike="noStrike" cap="none" normalizeH="0" baseline="0" dirty="0">
+                <a:ln>
+                  <a:noFill/>
+                </a:ln>
+                <a:solidFill>
+                  <a:srgbClr val="383838"/>
+                </a:solidFill>
+                <a:effectLst/>
+                <a:latin typeface="Consolas" panose="020B0609020204030204" pitchFamily="49" charset="0"/>
+              </a:rPr>
+              <a:t>)</a:t>
+            </a:r>
+            <a:br>
+              <a:rPr kumimoji="0" lang="en-US" altLang="en-US" sz="1300" b="0" i="0" u="none" strike="noStrike" cap="none" normalizeH="0" baseline="0" dirty="0">
+                <a:ln>
+                  <a:noFill/>
+                </a:ln>
+                <a:solidFill>
+                  <a:srgbClr val="383838"/>
+                </a:solidFill>
+                <a:effectLst/>
+                <a:latin typeface="Consolas" panose="020B0609020204030204" pitchFamily="49" charset="0"/>
+              </a:rPr>
+            </a:br>
+            <a:r>
+              <a:rPr kumimoji="0" lang="en-US" altLang="en-US" sz="1300" b="0" i="0" u="none" strike="noStrike" cap="none" normalizeH="0" baseline="0" dirty="0">
+                <a:ln>
+                  <a:noFill/>
+                </a:ln>
+                <a:solidFill>
+                  <a:srgbClr val="383838"/>
+                </a:solidFill>
+                <a:effectLst/>
+                <a:latin typeface="Consolas" panose="020B0609020204030204" pitchFamily="49" charset="0"/>
+              </a:rPr>
+              <a:t>{</a:t>
+            </a:r>
+            <a:br>
+              <a:rPr kumimoji="0" lang="en-US" altLang="en-US" sz="1300" b="0" i="0" u="none" strike="noStrike" cap="none" normalizeH="0" baseline="0" dirty="0">
+                <a:ln>
+                  <a:noFill/>
+                </a:ln>
+                <a:solidFill>
+                  <a:srgbClr val="383838"/>
+                </a:solidFill>
+                <a:effectLst/>
+                <a:latin typeface="Consolas" panose="020B0609020204030204" pitchFamily="49" charset="0"/>
+              </a:rPr>
+            </a:br>
+            <a:r>
+              <a:rPr kumimoji="0" lang="en-US" altLang="en-US" sz="1300" b="0" i="0" u="none" strike="noStrike" cap="none" normalizeH="0" baseline="0" dirty="0">
+                <a:ln>
+                  <a:noFill/>
+                </a:ln>
+                <a:solidFill>
+                  <a:srgbClr val="383838"/>
+                </a:solidFill>
+                <a:effectLst/>
+                <a:latin typeface="Consolas" panose="020B0609020204030204" pitchFamily="49" charset="0"/>
+              </a:rPr>
+              <a:t>    </a:t>
+            </a:r>
+            <a:r>
+              <a:rPr kumimoji="0" lang="en-US" altLang="en-US" sz="1300" b="0" i="0" u="none" strike="noStrike" cap="none" normalizeH="0" baseline="0" dirty="0" err="1">
+                <a:ln>
+                  <a:noFill/>
+                </a:ln>
+                <a:solidFill>
+                  <a:srgbClr val="6B2FBA"/>
+                </a:solidFill>
+                <a:effectLst/>
+                <a:latin typeface="Consolas" panose="020B0609020204030204" pitchFamily="49" charset="0"/>
+              </a:rPr>
+              <a:t>ManagedType</a:t>
+            </a:r>
+            <a:r>
+              <a:rPr kumimoji="0" lang="en-US" altLang="en-US" sz="1300" b="0" i="0" u="none" strike="noStrike" cap="none" normalizeH="0" baseline="0" dirty="0">
+                <a:ln>
+                  <a:noFill/>
+                </a:ln>
+                <a:solidFill>
+                  <a:srgbClr val="383838"/>
+                </a:solidFill>
+                <a:effectLst/>
+                <a:latin typeface="Consolas" panose="020B0609020204030204" pitchFamily="49" charset="0"/>
+              </a:rPr>
+              <a:t>* </a:t>
+            </a:r>
+            <a:r>
+              <a:rPr kumimoji="0" lang="en-US" altLang="en-US" sz="1300" b="0" i="0" u="none" strike="noStrike" cap="none" normalizeH="0" baseline="0" dirty="0" err="1">
+                <a:ln>
+                  <a:noFill/>
+                </a:ln>
+                <a:solidFill>
+                  <a:srgbClr val="383838"/>
+                </a:solidFill>
+                <a:effectLst/>
+                <a:latin typeface="Consolas" panose="020B0609020204030204" pitchFamily="49" charset="0"/>
+              </a:rPr>
+              <a:t>objPtr</a:t>
+            </a:r>
+            <a:r>
+              <a:rPr kumimoji="0" lang="en-US" altLang="en-US" sz="1300" b="0" i="0" u="none" strike="noStrike" cap="none" normalizeH="0" baseline="0" dirty="0">
+                <a:ln>
+                  <a:noFill/>
+                </a:ln>
+                <a:solidFill>
+                  <a:srgbClr val="383838"/>
+                </a:solidFill>
+                <a:effectLst/>
+                <a:latin typeface="Consolas" panose="020B0609020204030204" pitchFamily="49" charset="0"/>
+              </a:rPr>
+              <a:t> = &amp;managed;</a:t>
+            </a:r>
+            <a:br>
+              <a:rPr kumimoji="0" lang="en-US" altLang="en-US" sz="1300" b="0" i="0" u="none" strike="noStrike" cap="none" normalizeH="0" baseline="0" dirty="0">
+                <a:ln>
+                  <a:noFill/>
+                </a:ln>
+                <a:solidFill>
+                  <a:srgbClr val="383838"/>
+                </a:solidFill>
+                <a:effectLst/>
+                <a:latin typeface="Consolas" panose="020B0609020204030204" pitchFamily="49" charset="0"/>
+              </a:rPr>
+            </a:br>
+            <a:r>
+              <a:rPr kumimoji="0" lang="en-US" altLang="en-US" sz="1300" b="0" i="0" u="none" strike="noStrike" cap="none" normalizeH="0" baseline="0" dirty="0">
+                <a:ln>
+                  <a:noFill/>
+                </a:ln>
+                <a:solidFill>
+                  <a:srgbClr val="383838"/>
+                </a:solidFill>
+                <a:effectLst/>
+                <a:latin typeface="Consolas" panose="020B0609020204030204" pitchFamily="49" charset="0"/>
+              </a:rPr>
+              <a:t>    </a:t>
+            </a:r>
+            <a:r>
+              <a:rPr kumimoji="0" lang="en-US" altLang="en-US" sz="1300" b="0" i="0" u="none" strike="noStrike" cap="none" normalizeH="0" baseline="0" dirty="0" err="1">
+                <a:ln>
+                  <a:noFill/>
+                </a:ln>
+                <a:solidFill>
+                  <a:srgbClr val="6B2FBA"/>
+                </a:solidFill>
+                <a:effectLst/>
+                <a:latin typeface="Consolas" panose="020B0609020204030204" pitchFamily="49" charset="0"/>
+              </a:rPr>
+              <a:t>Console</a:t>
+            </a:r>
+            <a:r>
+              <a:rPr kumimoji="0" lang="en-US" altLang="en-US" sz="1300" b="0" i="0" u="none" strike="noStrike" cap="none" normalizeH="0" baseline="0" dirty="0" err="1">
+                <a:ln>
+                  <a:noFill/>
+                </a:ln>
+                <a:solidFill>
+                  <a:srgbClr val="383838"/>
+                </a:solidFill>
+                <a:effectLst/>
+                <a:latin typeface="Consolas" panose="020B0609020204030204" pitchFamily="49" charset="0"/>
+              </a:rPr>
+              <a:t>.</a:t>
+            </a:r>
+            <a:r>
+              <a:rPr kumimoji="0" lang="en-US" altLang="en-US" sz="1300" b="0" i="0" u="none" strike="noStrike" cap="none" normalizeH="0" baseline="0" dirty="0" err="1">
+                <a:ln>
+                  <a:noFill/>
+                </a:ln>
+                <a:solidFill>
+                  <a:srgbClr val="00855F"/>
+                </a:solidFill>
+                <a:effectLst/>
+                <a:latin typeface="Consolas" panose="020B0609020204030204" pitchFamily="49" charset="0"/>
+              </a:rPr>
+              <a:t>WriteLine</a:t>
+            </a:r>
+            <a:r>
+              <a:rPr kumimoji="0" lang="en-US" altLang="en-US" sz="1300" b="0" i="0" u="none" strike="noStrike" cap="none" normalizeH="0" baseline="0" dirty="0">
+                <a:ln>
+                  <a:noFill/>
+                </a:ln>
+                <a:solidFill>
+                  <a:srgbClr val="383838"/>
+                </a:solidFill>
+                <a:effectLst/>
+                <a:latin typeface="Consolas" panose="020B0609020204030204" pitchFamily="49" charset="0"/>
+              </a:rPr>
+              <a:t>(</a:t>
+            </a:r>
+            <a:r>
+              <a:rPr kumimoji="0" lang="en-US" altLang="en-US" sz="1300" b="0" i="0" u="none" strike="noStrike" cap="none" normalizeH="0" baseline="0" dirty="0">
+                <a:ln>
+                  <a:noFill/>
+                </a:ln>
+                <a:solidFill>
+                  <a:srgbClr val="8C6C41"/>
+                </a:solidFill>
+                <a:effectLst/>
+                <a:latin typeface="Consolas" panose="020B0609020204030204" pitchFamily="49" charset="0"/>
+              </a:rPr>
+              <a:t>$"Ref address:    {</a:t>
+            </a:r>
+            <a:r>
+              <a:rPr kumimoji="0" lang="en-US" altLang="en-US" sz="1300" b="0" i="0" u="none" strike="noStrike" cap="none" normalizeH="0" baseline="0" dirty="0">
+                <a:ln>
+                  <a:noFill/>
+                </a:ln>
+                <a:solidFill>
+                  <a:srgbClr val="383838"/>
+                </a:solidFill>
+                <a:effectLst/>
+                <a:latin typeface="Consolas" panose="020B0609020204030204" pitchFamily="49" charset="0"/>
+              </a:rPr>
+              <a:t>(</a:t>
+            </a:r>
+            <a:r>
+              <a:rPr kumimoji="0" lang="en-US" altLang="en-US" sz="1300" b="0" i="0" u="none" strike="noStrike" cap="none" normalizeH="0" baseline="0" dirty="0" err="1">
+                <a:ln>
+                  <a:noFill/>
+                </a:ln>
+                <a:solidFill>
+                  <a:srgbClr val="202020"/>
+                </a:solidFill>
+                <a:effectLst/>
+                <a:latin typeface="Consolas" panose="020B0609020204030204" pitchFamily="49" charset="0"/>
+              </a:rPr>
+              <a:t>nuint</a:t>
+            </a:r>
+            <a:r>
+              <a:rPr kumimoji="0" lang="en-US" altLang="en-US" sz="1300" b="0" i="0" u="none" strike="noStrike" cap="none" normalizeH="0" baseline="0" dirty="0">
+                <a:ln>
+                  <a:noFill/>
+                </a:ln>
+                <a:solidFill>
+                  <a:srgbClr val="383838"/>
+                </a:solidFill>
+                <a:effectLst/>
+                <a:latin typeface="Consolas" panose="020B0609020204030204" pitchFamily="49" charset="0"/>
+              </a:rPr>
+              <a:t>)objPtr</a:t>
+            </a:r>
+            <a:r>
+              <a:rPr kumimoji="0" lang="en-US" altLang="en-US" sz="1300" b="0" i="0" u="none" strike="noStrike" cap="none" normalizeH="0" baseline="0" dirty="0">
+                <a:ln>
+                  <a:noFill/>
+                </a:ln>
+                <a:solidFill>
+                  <a:srgbClr val="6B2FBA"/>
+                </a:solidFill>
+                <a:effectLst/>
+                <a:latin typeface="Consolas" panose="020B0609020204030204" pitchFamily="49" charset="0"/>
+              </a:rPr>
+              <a:t>:X16</a:t>
+            </a:r>
+            <a:r>
+              <a:rPr kumimoji="0" lang="en-US" altLang="en-US" sz="1300" b="0" i="0" u="none" strike="noStrike" cap="none" normalizeH="0" baseline="0" dirty="0">
+                <a:ln>
+                  <a:noFill/>
+                </a:ln>
+                <a:solidFill>
+                  <a:srgbClr val="8C6C41"/>
+                </a:solidFill>
+                <a:effectLst/>
+                <a:latin typeface="Consolas" panose="020B0609020204030204" pitchFamily="49" charset="0"/>
+              </a:rPr>
+              <a:t>}"</a:t>
+            </a:r>
+            <a:r>
+              <a:rPr kumimoji="0" lang="en-US" altLang="en-US" sz="1300" b="0" i="0" u="none" strike="noStrike" cap="none" normalizeH="0" baseline="0" dirty="0">
+                <a:ln>
+                  <a:noFill/>
+                </a:ln>
+                <a:solidFill>
+                  <a:srgbClr val="383838"/>
+                </a:solidFill>
+                <a:effectLst/>
+                <a:latin typeface="Consolas" panose="020B0609020204030204" pitchFamily="49" charset="0"/>
+              </a:rPr>
+              <a:t>);</a:t>
+            </a:r>
+            <a:br>
+              <a:rPr kumimoji="0" lang="en-US" altLang="en-US" sz="1300" b="0" i="0" u="none" strike="noStrike" cap="none" normalizeH="0" baseline="0" dirty="0">
+                <a:ln>
+                  <a:noFill/>
+                </a:ln>
+                <a:solidFill>
+                  <a:srgbClr val="383838"/>
+                </a:solidFill>
+                <a:effectLst/>
+                <a:latin typeface="Consolas" panose="020B0609020204030204" pitchFamily="49" charset="0"/>
+              </a:rPr>
+            </a:br>
+            <a:r>
+              <a:rPr kumimoji="0" lang="en-US" altLang="en-US" sz="1300" b="0" i="0" u="none" strike="noStrike" cap="none" normalizeH="0" baseline="0" dirty="0">
+                <a:ln>
+                  <a:noFill/>
+                </a:ln>
+                <a:solidFill>
+                  <a:srgbClr val="383838"/>
+                </a:solidFill>
+                <a:effectLst/>
+                <a:latin typeface="Consolas" panose="020B0609020204030204" pitchFamily="49" charset="0"/>
+              </a:rPr>
+              <a:t>    </a:t>
+            </a:r>
+            <a:r>
+              <a:rPr kumimoji="0" lang="en-US" altLang="en-US" sz="1300" b="0" i="0" u="none" strike="noStrike" cap="none" normalizeH="0" baseline="0" dirty="0" err="1">
+                <a:ln>
+                  <a:noFill/>
+                </a:ln>
+                <a:solidFill>
+                  <a:srgbClr val="6B2FBA"/>
+                </a:solidFill>
+                <a:effectLst/>
+                <a:latin typeface="Consolas" panose="020B0609020204030204" pitchFamily="49" charset="0"/>
+              </a:rPr>
+              <a:t>Console</a:t>
+            </a:r>
+            <a:r>
+              <a:rPr kumimoji="0" lang="en-US" altLang="en-US" sz="1300" b="0" i="0" u="none" strike="noStrike" cap="none" normalizeH="0" baseline="0" dirty="0" err="1">
+                <a:ln>
+                  <a:noFill/>
+                </a:ln>
+                <a:solidFill>
+                  <a:srgbClr val="383838"/>
+                </a:solidFill>
+                <a:effectLst/>
+                <a:latin typeface="Consolas" panose="020B0609020204030204" pitchFamily="49" charset="0"/>
+              </a:rPr>
+              <a:t>.</a:t>
+            </a:r>
+            <a:r>
+              <a:rPr kumimoji="0" lang="en-US" altLang="en-US" sz="1300" b="0" i="0" u="none" strike="noStrike" cap="none" normalizeH="0" baseline="0" dirty="0" err="1">
+                <a:ln>
+                  <a:noFill/>
+                </a:ln>
+                <a:solidFill>
+                  <a:srgbClr val="00855F"/>
+                </a:solidFill>
+                <a:effectLst/>
+                <a:latin typeface="Consolas" panose="020B0609020204030204" pitchFamily="49" charset="0"/>
+              </a:rPr>
+              <a:t>WriteLine</a:t>
+            </a:r>
+            <a:r>
+              <a:rPr kumimoji="0" lang="en-US" altLang="en-US" sz="1300" b="0" i="0" u="none" strike="noStrike" cap="none" normalizeH="0" baseline="0" dirty="0">
+                <a:ln>
+                  <a:noFill/>
+                </a:ln>
+                <a:solidFill>
+                  <a:srgbClr val="383838"/>
+                </a:solidFill>
+                <a:effectLst/>
+                <a:latin typeface="Consolas" panose="020B0609020204030204" pitchFamily="49" charset="0"/>
+              </a:rPr>
+              <a:t>(</a:t>
+            </a:r>
+            <a:r>
+              <a:rPr kumimoji="0" lang="en-US" altLang="en-US" sz="1300" b="0" i="0" u="none" strike="noStrike" cap="none" normalizeH="0" baseline="0" dirty="0">
+                <a:ln>
+                  <a:noFill/>
+                </a:ln>
+                <a:solidFill>
+                  <a:srgbClr val="8C6C41"/>
+                </a:solidFill>
+                <a:effectLst/>
+                <a:latin typeface="Consolas" panose="020B0609020204030204" pitchFamily="49" charset="0"/>
+              </a:rPr>
+              <a:t>$"Object address: {</a:t>
+            </a:r>
+            <a:r>
+              <a:rPr kumimoji="0" lang="en-US" altLang="en-US" sz="1300" b="0" i="0" u="none" strike="noStrike" cap="none" normalizeH="0" baseline="0" dirty="0">
+                <a:ln>
+                  <a:noFill/>
+                </a:ln>
+                <a:solidFill>
+                  <a:srgbClr val="383838"/>
+                </a:solidFill>
+                <a:effectLst/>
+                <a:latin typeface="Consolas" panose="020B0609020204030204" pitchFamily="49" charset="0"/>
+              </a:rPr>
+              <a:t>(</a:t>
+            </a:r>
+            <a:r>
+              <a:rPr kumimoji="0" lang="en-US" altLang="en-US" sz="1300" b="0" i="0" u="none" strike="noStrike" cap="none" normalizeH="0" baseline="0" dirty="0" err="1">
+                <a:ln>
+                  <a:noFill/>
+                </a:ln>
+                <a:solidFill>
+                  <a:srgbClr val="202020"/>
+                </a:solidFill>
+                <a:effectLst/>
+                <a:latin typeface="Consolas" panose="020B0609020204030204" pitchFamily="49" charset="0"/>
+              </a:rPr>
+              <a:t>nuint</a:t>
+            </a:r>
+            <a:r>
+              <a:rPr kumimoji="0" lang="en-US" altLang="en-US" sz="1300" b="0" i="0" u="none" strike="noStrike" cap="none" normalizeH="0" baseline="0" dirty="0">
+                <a:ln>
+                  <a:noFill/>
+                </a:ln>
+                <a:solidFill>
+                  <a:srgbClr val="383838"/>
+                </a:solidFill>
+                <a:effectLst/>
+                <a:latin typeface="Consolas" panose="020B0609020204030204" pitchFamily="49" charset="0"/>
+              </a:rPr>
+              <a:t>)(*(</a:t>
+            </a:r>
+            <a:r>
+              <a:rPr kumimoji="0" lang="en-US" altLang="en-US" sz="1300" b="0" i="0" u="none" strike="noStrike" cap="none" normalizeH="0" baseline="0" dirty="0" err="1">
+                <a:ln>
+                  <a:noFill/>
+                </a:ln>
+                <a:solidFill>
+                  <a:srgbClr val="202020"/>
+                </a:solidFill>
+                <a:effectLst/>
+                <a:latin typeface="Consolas" panose="020B0609020204030204" pitchFamily="49" charset="0"/>
+              </a:rPr>
+              <a:t>nuint</a:t>
+            </a:r>
+            <a:r>
+              <a:rPr kumimoji="0" lang="en-US" altLang="en-US" sz="1300" b="0" i="0" u="none" strike="noStrike" cap="none" normalizeH="0" baseline="0" dirty="0">
+                <a:ln>
+                  <a:noFill/>
+                </a:ln>
+                <a:solidFill>
+                  <a:srgbClr val="383838"/>
+                </a:solidFill>
+                <a:effectLst/>
+                <a:latin typeface="Consolas" panose="020B0609020204030204" pitchFamily="49" charset="0"/>
+              </a:rPr>
+              <a:t>**)</a:t>
+            </a:r>
+            <a:r>
+              <a:rPr kumimoji="0" lang="en-US" altLang="en-US" sz="1300" b="0" i="0" u="none" strike="noStrike" cap="none" normalizeH="0" baseline="0" dirty="0" err="1">
+                <a:ln>
+                  <a:noFill/>
+                </a:ln>
+                <a:solidFill>
+                  <a:srgbClr val="383838"/>
+                </a:solidFill>
+                <a:effectLst/>
+                <a:latin typeface="Consolas" panose="020B0609020204030204" pitchFamily="49" charset="0"/>
+              </a:rPr>
+              <a:t>objPtr</a:t>
+            </a:r>
+            <a:r>
+              <a:rPr kumimoji="0" lang="en-US" altLang="en-US" sz="1300" b="0" i="0" u="none" strike="noStrike" cap="none" normalizeH="0" baseline="0" dirty="0">
+                <a:ln>
+                  <a:noFill/>
+                </a:ln>
+                <a:solidFill>
+                  <a:srgbClr val="383838"/>
+                </a:solidFill>
+                <a:effectLst/>
+                <a:latin typeface="Consolas" panose="020B0609020204030204" pitchFamily="49" charset="0"/>
+              </a:rPr>
+              <a:t>)</a:t>
+            </a:r>
+            <a:r>
+              <a:rPr kumimoji="0" lang="en-US" altLang="en-US" sz="1300" b="0" i="0" u="none" strike="noStrike" cap="none" normalizeH="0" baseline="0" dirty="0">
+                <a:ln>
+                  <a:noFill/>
+                </a:ln>
+                <a:solidFill>
+                  <a:srgbClr val="6B2FBA"/>
+                </a:solidFill>
+                <a:effectLst/>
+                <a:latin typeface="Consolas" panose="020B0609020204030204" pitchFamily="49" charset="0"/>
+              </a:rPr>
+              <a:t>:X16</a:t>
+            </a:r>
+            <a:r>
+              <a:rPr kumimoji="0" lang="en-US" altLang="en-US" sz="1300" b="0" i="0" u="none" strike="noStrike" cap="none" normalizeH="0" baseline="0" dirty="0">
+                <a:ln>
+                  <a:noFill/>
+                </a:ln>
+                <a:solidFill>
+                  <a:srgbClr val="8C6C41"/>
+                </a:solidFill>
+                <a:effectLst/>
+                <a:latin typeface="Consolas" panose="020B0609020204030204" pitchFamily="49" charset="0"/>
+              </a:rPr>
+              <a:t>}"</a:t>
+            </a:r>
+            <a:r>
+              <a:rPr kumimoji="0" lang="en-US" altLang="en-US" sz="1300" b="0" i="0" u="none" strike="noStrike" cap="none" normalizeH="0" baseline="0" dirty="0">
+                <a:ln>
+                  <a:noFill/>
+                </a:ln>
+                <a:solidFill>
+                  <a:srgbClr val="383838"/>
+                </a:solidFill>
+                <a:effectLst/>
+                <a:latin typeface="Consolas" panose="020B0609020204030204" pitchFamily="49" charset="0"/>
+              </a:rPr>
+              <a:t>);</a:t>
+            </a:r>
+            <a:br>
+              <a:rPr kumimoji="0" lang="en-US" altLang="en-US" sz="1300" b="0" i="0" u="none" strike="noStrike" cap="none" normalizeH="0" baseline="0" dirty="0">
+                <a:ln>
+                  <a:noFill/>
+                </a:ln>
+                <a:solidFill>
+                  <a:srgbClr val="383838"/>
+                </a:solidFill>
+                <a:effectLst/>
+                <a:latin typeface="Consolas" panose="020B0609020204030204" pitchFamily="49" charset="0"/>
+              </a:rPr>
+            </a:br>
+            <a:r>
+              <a:rPr kumimoji="0" lang="en-US" altLang="en-US" sz="1300" b="0" i="0" u="none" strike="noStrike" cap="none" normalizeH="0" baseline="0" dirty="0">
+                <a:ln>
+                  <a:noFill/>
+                </a:ln>
+                <a:solidFill>
+                  <a:srgbClr val="383838"/>
+                </a:solidFill>
+                <a:effectLst/>
+                <a:latin typeface="Consolas" panose="020B0609020204030204" pitchFamily="49" charset="0"/>
+              </a:rPr>
+              <a:t>    </a:t>
+            </a:r>
+            <a:r>
+              <a:rPr kumimoji="0" lang="en-US" altLang="en-US" sz="1300" b="0" i="0" u="none" strike="noStrike" cap="none" normalizeH="0" baseline="0" dirty="0" err="1">
+                <a:ln>
+                  <a:noFill/>
+                </a:ln>
+                <a:solidFill>
+                  <a:srgbClr val="6B2FBA"/>
+                </a:solidFill>
+                <a:effectLst/>
+                <a:latin typeface="Consolas" panose="020B0609020204030204" pitchFamily="49" charset="0"/>
+              </a:rPr>
+              <a:t>Console</a:t>
+            </a:r>
+            <a:r>
+              <a:rPr kumimoji="0" lang="en-US" altLang="en-US" sz="1300" b="0" i="0" u="none" strike="noStrike" cap="none" normalizeH="0" baseline="0" dirty="0" err="1">
+                <a:ln>
+                  <a:noFill/>
+                </a:ln>
+                <a:solidFill>
+                  <a:srgbClr val="383838"/>
+                </a:solidFill>
+                <a:effectLst/>
+                <a:latin typeface="Consolas" panose="020B0609020204030204" pitchFamily="49" charset="0"/>
+              </a:rPr>
+              <a:t>.</a:t>
+            </a:r>
+            <a:r>
+              <a:rPr kumimoji="0" lang="en-US" altLang="en-US" sz="1300" b="0" i="0" u="none" strike="noStrike" cap="none" normalizeH="0" baseline="0" dirty="0" err="1">
+                <a:ln>
+                  <a:noFill/>
+                </a:ln>
+                <a:solidFill>
+                  <a:srgbClr val="00855F"/>
+                </a:solidFill>
+                <a:effectLst/>
+                <a:latin typeface="Consolas" panose="020B0609020204030204" pitchFamily="49" charset="0"/>
+              </a:rPr>
+              <a:t>WriteLine</a:t>
+            </a:r>
+            <a:r>
+              <a:rPr kumimoji="0" lang="en-US" altLang="en-US" sz="1300" b="0" i="0" u="none" strike="noStrike" cap="none" normalizeH="0" baseline="0" dirty="0">
+                <a:ln>
+                  <a:noFill/>
+                </a:ln>
+                <a:solidFill>
+                  <a:srgbClr val="383838"/>
+                </a:solidFill>
+                <a:effectLst/>
+                <a:latin typeface="Consolas" panose="020B0609020204030204" pitchFamily="49" charset="0"/>
+              </a:rPr>
+              <a:t>(</a:t>
+            </a:r>
+            <a:r>
+              <a:rPr kumimoji="0" lang="en-US" altLang="en-US" sz="1300" b="0" i="0" u="none" strike="noStrike" cap="none" normalizeH="0" baseline="0" dirty="0">
+                <a:ln>
+                  <a:noFill/>
+                </a:ln>
+                <a:solidFill>
+                  <a:srgbClr val="8C6C41"/>
+                </a:solidFill>
+                <a:effectLst/>
+                <a:latin typeface="Consolas" panose="020B0609020204030204" pitchFamily="49" charset="0"/>
+              </a:rPr>
+              <a:t>$"Field address:  {</a:t>
+            </a:r>
+            <a:r>
+              <a:rPr kumimoji="0" lang="en-US" altLang="en-US" sz="1300" b="0" i="0" u="none" strike="noStrike" cap="none" normalizeH="0" baseline="0" dirty="0">
+                <a:ln>
+                  <a:noFill/>
+                </a:ln>
+                <a:solidFill>
+                  <a:srgbClr val="383838"/>
+                </a:solidFill>
+                <a:effectLst/>
+                <a:latin typeface="Consolas" panose="020B0609020204030204" pitchFamily="49" charset="0"/>
+              </a:rPr>
+              <a:t>(</a:t>
+            </a:r>
+            <a:r>
+              <a:rPr kumimoji="0" lang="en-US" altLang="en-US" sz="1300" b="0" i="0" u="none" strike="noStrike" cap="none" normalizeH="0" baseline="0" dirty="0" err="1">
+                <a:ln>
+                  <a:noFill/>
+                </a:ln>
+                <a:solidFill>
+                  <a:srgbClr val="202020"/>
+                </a:solidFill>
+                <a:effectLst/>
+                <a:latin typeface="Consolas" panose="020B0609020204030204" pitchFamily="49" charset="0"/>
+              </a:rPr>
+              <a:t>nuint</a:t>
+            </a:r>
+            <a:r>
+              <a:rPr kumimoji="0" lang="en-US" altLang="en-US" sz="1300" b="0" i="0" u="none" strike="noStrike" cap="none" normalizeH="0" baseline="0" dirty="0">
+                <a:ln>
+                  <a:noFill/>
+                </a:ln>
+                <a:solidFill>
+                  <a:srgbClr val="383838"/>
+                </a:solidFill>
+                <a:effectLst/>
+                <a:latin typeface="Consolas" panose="020B0609020204030204" pitchFamily="49" charset="0"/>
+              </a:rPr>
+              <a:t>)fieldPtr</a:t>
+            </a:r>
+            <a:r>
+              <a:rPr kumimoji="0" lang="en-US" altLang="en-US" sz="1300" b="0" i="0" u="none" strike="noStrike" cap="none" normalizeH="0" baseline="0" dirty="0">
+                <a:ln>
+                  <a:noFill/>
+                </a:ln>
+                <a:solidFill>
+                  <a:srgbClr val="6B2FBA"/>
+                </a:solidFill>
+                <a:effectLst/>
+                <a:latin typeface="Consolas" panose="020B0609020204030204" pitchFamily="49" charset="0"/>
+              </a:rPr>
+              <a:t>:X16</a:t>
+            </a:r>
+            <a:r>
+              <a:rPr kumimoji="0" lang="en-US" altLang="en-US" sz="1300" b="0" i="0" u="none" strike="noStrike" cap="none" normalizeH="0" baseline="0" dirty="0">
+                <a:ln>
+                  <a:noFill/>
+                </a:ln>
+                <a:solidFill>
+                  <a:srgbClr val="8C6C41"/>
+                </a:solidFill>
+                <a:effectLst/>
+                <a:latin typeface="Consolas" panose="020B0609020204030204" pitchFamily="49" charset="0"/>
+              </a:rPr>
+              <a:t>}"</a:t>
+            </a:r>
+            <a:r>
+              <a:rPr kumimoji="0" lang="en-US" altLang="en-US" sz="1300" b="0" i="0" u="none" strike="noStrike" cap="none" normalizeH="0" baseline="0" dirty="0">
+                <a:ln>
+                  <a:noFill/>
+                </a:ln>
+                <a:solidFill>
+                  <a:srgbClr val="383838"/>
+                </a:solidFill>
+                <a:effectLst/>
+                <a:latin typeface="Consolas" panose="020B0609020204030204" pitchFamily="49" charset="0"/>
+              </a:rPr>
+              <a:t>);</a:t>
+            </a:r>
+            <a:br>
+              <a:rPr kumimoji="0" lang="en-US" altLang="en-US" sz="1300" b="0" i="0" u="none" strike="noStrike" cap="none" normalizeH="0" baseline="0" dirty="0">
+                <a:ln>
+                  <a:noFill/>
+                </a:ln>
+                <a:solidFill>
+                  <a:srgbClr val="383838"/>
+                </a:solidFill>
+                <a:effectLst/>
+                <a:latin typeface="Consolas" panose="020B0609020204030204" pitchFamily="49" charset="0"/>
+              </a:rPr>
+            </a:br>
+            <a:r>
+              <a:rPr kumimoji="0" lang="en-US" altLang="en-US" sz="1300" b="0" i="0" u="none" strike="noStrike" cap="none" normalizeH="0" baseline="0" dirty="0">
+                <a:ln>
+                  <a:noFill/>
+                </a:ln>
+                <a:solidFill>
+                  <a:srgbClr val="383838"/>
+                </a:solidFill>
+                <a:effectLst/>
+                <a:latin typeface="Consolas" panose="020B0609020204030204" pitchFamily="49" charset="0"/>
+              </a:rPr>
+              <a:t>    </a:t>
+            </a:r>
+            <a:r>
+              <a:rPr kumimoji="0" lang="en-US" altLang="en-US" sz="1300" b="0" i="0" u="none" strike="noStrike" cap="none" normalizeH="0" baseline="0" dirty="0" err="1">
+                <a:ln>
+                  <a:noFill/>
+                </a:ln>
+                <a:solidFill>
+                  <a:srgbClr val="6B2FBA"/>
+                </a:solidFill>
+                <a:effectLst/>
+                <a:latin typeface="Consolas" panose="020B0609020204030204" pitchFamily="49" charset="0"/>
+              </a:rPr>
+              <a:t>Console</a:t>
+            </a:r>
+            <a:r>
+              <a:rPr kumimoji="0" lang="en-US" altLang="en-US" sz="1300" b="0" i="0" u="none" strike="noStrike" cap="none" normalizeH="0" baseline="0" dirty="0" err="1">
+                <a:ln>
+                  <a:noFill/>
+                </a:ln>
+                <a:solidFill>
+                  <a:srgbClr val="383838"/>
+                </a:solidFill>
+                <a:effectLst/>
+                <a:latin typeface="Consolas" panose="020B0609020204030204" pitchFamily="49" charset="0"/>
+              </a:rPr>
+              <a:t>.</a:t>
+            </a:r>
+            <a:r>
+              <a:rPr kumimoji="0" lang="en-US" altLang="en-US" sz="1300" b="0" i="0" u="none" strike="noStrike" cap="none" normalizeH="0" baseline="0" dirty="0" err="1">
+                <a:ln>
+                  <a:noFill/>
+                </a:ln>
+                <a:solidFill>
+                  <a:srgbClr val="00855F"/>
+                </a:solidFill>
+                <a:effectLst/>
+                <a:latin typeface="Consolas" panose="020B0609020204030204" pitchFamily="49" charset="0"/>
+              </a:rPr>
+              <a:t>WriteLine</a:t>
+            </a:r>
+            <a:r>
+              <a:rPr kumimoji="0" lang="en-US" altLang="en-US" sz="1300" b="0" i="0" u="none" strike="noStrike" cap="none" normalizeH="0" baseline="0" dirty="0">
+                <a:ln>
+                  <a:noFill/>
+                </a:ln>
+                <a:solidFill>
+                  <a:srgbClr val="383838"/>
+                </a:solidFill>
+                <a:effectLst/>
+                <a:latin typeface="Consolas" panose="020B0609020204030204" pitchFamily="49" charset="0"/>
+              </a:rPr>
+              <a:t>(</a:t>
+            </a:r>
+            <a:r>
+              <a:rPr kumimoji="0" lang="en-US" altLang="en-US" sz="1300" b="0" i="0" u="none" strike="noStrike" cap="none" normalizeH="0" baseline="0" dirty="0">
+                <a:ln>
+                  <a:noFill/>
+                </a:ln>
+                <a:solidFill>
+                  <a:srgbClr val="8C6C41"/>
+                </a:solidFill>
+                <a:effectLst/>
+                <a:latin typeface="Consolas" panose="020B0609020204030204" pitchFamily="49" charset="0"/>
+              </a:rPr>
+              <a:t>$"Field offset:   {</a:t>
+            </a:r>
+            <a:r>
+              <a:rPr kumimoji="0" lang="en-US" altLang="en-US" sz="1300" b="0" i="0" u="none" strike="noStrike" cap="none" normalizeH="0" baseline="0" dirty="0">
+                <a:ln>
+                  <a:noFill/>
+                </a:ln>
+                <a:solidFill>
+                  <a:srgbClr val="383838"/>
+                </a:solidFill>
+                <a:effectLst/>
+                <a:latin typeface="Consolas" panose="020B0609020204030204" pitchFamily="49" charset="0"/>
+              </a:rPr>
+              <a:t>(</a:t>
+            </a:r>
+            <a:r>
+              <a:rPr kumimoji="0" lang="en-US" altLang="en-US" sz="1300" b="0" i="0" u="none" strike="noStrike" cap="none" normalizeH="0" baseline="0" dirty="0" err="1">
+                <a:ln>
+                  <a:noFill/>
+                </a:ln>
+                <a:solidFill>
+                  <a:srgbClr val="202020"/>
+                </a:solidFill>
+                <a:effectLst/>
+                <a:latin typeface="Consolas" panose="020B0609020204030204" pitchFamily="49" charset="0"/>
+              </a:rPr>
+              <a:t>nuint</a:t>
+            </a:r>
+            <a:r>
+              <a:rPr kumimoji="0" lang="en-US" altLang="en-US" sz="1300" b="0" i="0" u="none" strike="noStrike" cap="none" normalizeH="0" baseline="0" dirty="0">
+                <a:ln>
+                  <a:noFill/>
+                </a:ln>
+                <a:solidFill>
+                  <a:srgbClr val="383838"/>
+                </a:solidFill>
+                <a:effectLst/>
+                <a:latin typeface="Consolas" panose="020B0609020204030204" pitchFamily="49" charset="0"/>
+              </a:rPr>
+              <a:t>)((</a:t>
+            </a:r>
+            <a:r>
+              <a:rPr kumimoji="0" lang="en-US" altLang="en-US" sz="1300" b="0" i="0" u="none" strike="noStrike" cap="none" normalizeH="0" baseline="0" dirty="0">
+                <a:ln>
+                  <a:noFill/>
+                </a:ln>
+                <a:solidFill>
+                  <a:srgbClr val="0F54D6"/>
+                </a:solidFill>
+                <a:effectLst/>
+                <a:latin typeface="Consolas" panose="020B0609020204030204" pitchFamily="49" charset="0"/>
+              </a:rPr>
+              <a:t>byte</a:t>
+            </a:r>
+            <a:r>
+              <a:rPr kumimoji="0" lang="en-US" altLang="en-US" sz="1300" b="0" i="0" u="none" strike="noStrike" cap="none" normalizeH="0" baseline="0" dirty="0">
+                <a:ln>
+                  <a:noFill/>
+                </a:ln>
+                <a:solidFill>
+                  <a:srgbClr val="383838"/>
+                </a:solidFill>
+                <a:effectLst/>
+                <a:latin typeface="Consolas" panose="020B0609020204030204" pitchFamily="49" charset="0"/>
+              </a:rPr>
+              <a:t>*)</a:t>
+            </a:r>
+            <a:r>
+              <a:rPr kumimoji="0" lang="en-US" altLang="en-US" sz="1300" b="0" i="0" u="none" strike="noStrike" cap="none" normalizeH="0" baseline="0" dirty="0" err="1">
+                <a:ln>
+                  <a:noFill/>
+                </a:ln>
+                <a:solidFill>
+                  <a:srgbClr val="383838"/>
+                </a:solidFill>
+                <a:effectLst/>
+                <a:latin typeface="Consolas" panose="020B0609020204030204" pitchFamily="49" charset="0"/>
+              </a:rPr>
+              <a:t>fieldPtr</a:t>
+            </a:r>
+            <a:r>
+              <a:rPr kumimoji="0" lang="en-US" altLang="en-US" sz="1300" b="0" i="0" u="none" strike="noStrike" cap="none" normalizeH="0" baseline="0" dirty="0">
+                <a:ln>
+                  <a:noFill/>
+                </a:ln>
+                <a:solidFill>
+                  <a:srgbClr val="383838"/>
+                </a:solidFill>
+                <a:effectLst/>
+                <a:latin typeface="Consolas" panose="020B0609020204030204" pitchFamily="49" charset="0"/>
+              </a:rPr>
+              <a:t> - *(</a:t>
+            </a:r>
+            <a:r>
+              <a:rPr kumimoji="0" lang="en-US" altLang="en-US" sz="1300" b="0" i="0" u="none" strike="noStrike" cap="none" normalizeH="0" baseline="0" dirty="0">
+                <a:ln>
+                  <a:noFill/>
+                </a:ln>
+                <a:solidFill>
+                  <a:srgbClr val="0F54D6"/>
+                </a:solidFill>
+                <a:effectLst/>
+                <a:latin typeface="Consolas" panose="020B0609020204030204" pitchFamily="49" charset="0"/>
+              </a:rPr>
+              <a:t>byte</a:t>
+            </a:r>
+            <a:r>
+              <a:rPr kumimoji="0" lang="en-US" altLang="en-US" sz="1300" b="0" i="0" u="none" strike="noStrike" cap="none" normalizeH="0" baseline="0" dirty="0">
+                <a:ln>
+                  <a:noFill/>
+                </a:ln>
+                <a:solidFill>
+                  <a:srgbClr val="383838"/>
+                </a:solidFill>
+                <a:effectLst/>
+                <a:latin typeface="Consolas" panose="020B0609020204030204" pitchFamily="49" charset="0"/>
+              </a:rPr>
+              <a:t>**)</a:t>
+            </a:r>
+            <a:r>
+              <a:rPr kumimoji="0" lang="en-US" altLang="en-US" sz="1300" b="0" i="0" u="none" strike="noStrike" cap="none" normalizeH="0" baseline="0" dirty="0" err="1">
+                <a:ln>
+                  <a:noFill/>
+                </a:ln>
+                <a:solidFill>
+                  <a:srgbClr val="383838"/>
+                </a:solidFill>
+                <a:effectLst/>
+                <a:latin typeface="Consolas" panose="020B0609020204030204" pitchFamily="49" charset="0"/>
+              </a:rPr>
+              <a:t>objPtr</a:t>
+            </a:r>
+            <a:r>
+              <a:rPr kumimoji="0" lang="en-US" altLang="en-US" sz="1300" b="0" i="0" u="none" strike="noStrike" cap="none" normalizeH="0" baseline="0" dirty="0">
+                <a:ln>
+                  <a:noFill/>
+                </a:ln>
+                <a:solidFill>
+                  <a:srgbClr val="383838"/>
+                </a:solidFill>
+                <a:effectLst/>
+                <a:latin typeface="Consolas" panose="020B0609020204030204" pitchFamily="49" charset="0"/>
+              </a:rPr>
+              <a:t>)</a:t>
+            </a:r>
+            <a:r>
+              <a:rPr kumimoji="0" lang="en-US" altLang="en-US" sz="1300" b="0" i="0" u="none" strike="noStrike" cap="none" normalizeH="0" baseline="0" dirty="0">
+                <a:ln>
+                  <a:noFill/>
+                </a:ln>
+                <a:solidFill>
+                  <a:srgbClr val="6B2FBA"/>
+                </a:solidFill>
+                <a:effectLst/>
+                <a:latin typeface="Consolas" panose="020B0609020204030204" pitchFamily="49" charset="0"/>
+              </a:rPr>
+              <a:t>,16:X1</a:t>
+            </a:r>
+            <a:r>
+              <a:rPr kumimoji="0" lang="en-US" altLang="en-US" sz="1300" b="0" i="0" u="none" strike="noStrike" cap="none" normalizeH="0" baseline="0" dirty="0">
+                <a:ln>
+                  <a:noFill/>
+                </a:ln>
+                <a:solidFill>
+                  <a:srgbClr val="8C6C41"/>
+                </a:solidFill>
+                <a:effectLst/>
+                <a:latin typeface="Consolas" panose="020B0609020204030204" pitchFamily="49" charset="0"/>
+              </a:rPr>
+              <a:t>}"</a:t>
+            </a:r>
+            <a:r>
+              <a:rPr kumimoji="0" lang="en-US" altLang="en-US" sz="1300" b="0" i="0" u="none" strike="noStrike" cap="none" normalizeH="0" baseline="0" dirty="0">
+                <a:ln>
+                  <a:noFill/>
+                </a:ln>
+                <a:solidFill>
+                  <a:srgbClr val="383838"/>
+                </a:solidFill>
+                <a:effectLst/>
+                <a:latin typeface="Consolas" panose="020B0609020204030204" pitchFamily="49" charset="0"/>
+              </a:rPr>
+              <a:t>);</a:t>
+            </a:r>
+            <a:br>
+              <a:rPr kumimoji="0" lang="en-US" altLang="en-US" sz="1300" b="0" i="0" u="none" strike="noStrike" cap="none" normalizeH="0" baseline="0" dirty="0">
+                <a:ln>
+                  <a:noFill/>
+                </a:ln>
+                <a:solidFill>
+                  <a:srgbClr val="383838"/>
+                </a:solidFill>
+                <a:effectLst/>
+                <a:latin typeface="Consolas" panose="020B0609020204030204" pitchFamily="49" charset="0"/>
+              </a:rPr>
+            </a:br>
+            <a:r>
+              <a:rPr kumimoji="0" lang="en-US" altLang="en-US" sz="1300" b="0" i="0" u="none" strike="noStrike" cap="none" normalizeH="0" baseline="0" dirty="0">
+                <a:ln>
+                  <a:noFill/>
+                </a:ln>
+                <a:solidFill>
+                  <a:srgbClr val="383838"/>
+                </a:solidFill>
+                <a:effectLst/>
+                <a:latin typeface="Consolas" panose="020B0609020204030204" pitchFamily="49" charset="0"/>
+              </a:rPr>
+              <a:t>}</a:t>
+            </a:r>
+            <a:endParaRPr kumimoji="0" lang="en-US" altLang="en-US" sz="1300" b="0" i="0" u="none" strike="noStrike" cap="none" normalizeH="0" baseline="0" dirty="0">
+              <a:ln>
+                <a:noFill/>
+              </a:ln>
+              <a:solidFill>
+                <a:schemeClr val="tx1"/>
+              </a:solidFill>
+              <a:effectLst/>
+              <a:latin typeface="Consolas" panose="020B0609020204030204" pitchFamily="49" charset="0"/>
+            </a:endParaRPr>
+          </a:p>
+        </p:txBody>
+      </p:sp>
+      <p:pic>
+        <p:nvPicPr>
+          <p:cNvPr id="11" name="Picture 10" descr="Ref address: 08BE897E348&#10;Object address: 27EC430A5D0&#10;Field address: 27EC430A5D8&#10;Field offset:  8">
+            <a:extLst>
+              <a:ext uri="{FF2B5EF4-FFF2-40B4-BE49-F238E27FC236}">
+                <a16:creationId xmlns:a16="http://schemas.microsoft.com/office/drawing/2014/main" id="{F20E94CF-6C38-D5A8-E44D-8794DDE9DE5A}"/>
+              </a:ext>
+            </a:extLst>
+          </p:cNvPr>
+          <p:cNvPicPr>
+            <a:picLocks noChangeAspect="1"/>
+          </p:cNvPicPr>
+          <p:nvPr/>
+        </p:nvPicPr>
+        <p:blipFill>
+          <a:blip r:embed="rId2"/>
+          <a:stretch>
+            <a:fillRect/>
+          </a:stretch>
+        </p:blipFill>
+        <p:spPr>
+          <a:xfrm>
+            <a:off x="6630581" y="2495515"/>
+            <a:ext cx="2810066" cy="895826"/>
+          </a:xfrm>
+          <a:prstGeom prst="rect">
+            <a:avLst/>
+          </a:prstGeom>
+          <a:ln w="15875">
+            <a:solidFill>
+              <a:schemeClr val="accent1"/>
+            </a:solidFill>
+          </a:ln>
+          <a:effectLst>
+            <a:outerShdw blurRad="127000" dist="127000" dir="2700000" algn="tl" rotWithShape="0">
+              <a:schemeClr val="bg1">
+                <a:lumMod val="95000"/>
+                <a:lumOff val="5000"/>
+                <a:alpha val="80000"/>
+              </a:schemeClr>
+            </a:outerShdw>
+          </a:effectLst>
+        </p:spPr>
+      </p:pic>
+    </p:spTree>
+    <p:extLst>
+      <p:ext uri="{BB962C8B-B14F-4D97-AF65-F5344CB8AC3E}">
+        <p14:creationId xmlns:p14="http://schemas.microsoft.com/office/powerpoint/2010/main" val="2298693242"/>
+      </p:ext>
+    </p:extLst>
+  </p:cSld>
+  <p:clrMapOvr>
+    <a:masterClrMapping/>
+  </p:clrMapOvr>
+  <p:timing>
+    <p:tnLst>
+      <p:par>
+        <p:cTn id="1" dur="indefinite" restart="never" nodeType="tmRoot">
+          <p:childTnLst>
+            <p:seq concurrent="1" nextAc="seek">
+              <p:cTn id="2" dur="indefinite" nodeType="mainSeq">
+                <p:childTnLst>
+                  <p:par>
+                    <p:cTn id="3" fill="hold">
+                      <p:stCondLst>
+                        <p:cond delay="indefinite"/>
+                      </p:stCondLst>
+                      <p:childTnLst>
+                        <p:par>
+                          <p:cTn id="4" fill="hold">
+                            <p:stCondLst>
+                              <p:cond delay="0"/>
+                            </p:stCondLst>
+                            <p:childTnLst>
+                              <p:par>
+                                <p:cTn id="5" presetID="1" presetClass="entr" presetSubtype="0" fill="hold" nodeType="clickEffect">
+                                  <p:stCondLst>
+                                    <p:cond delay="0"/>
+                                  </p:stCondLst>
+                                  <p:childTnLst>
+                                    <p:set>
+                                      <p:cBhvr>
+                                        <p:cTn id="6" dur="1" fill="hold">
+                                          <p:stCondLst>
+                                            <p:cond delay="0"/>
+                                          </p:stCondLst>
+                                        </p:cTn>
+                                        <p:tgtEl>
+                                          <p:spTgt spid="11"/>
+                                        </p:tgtEl>
+                                        <p:attrNameLst>
+                                          <p:attrName>style.visibility</p:attrName>
+                                        </p:attrNameLst>
+                                      </p:cBhvr>
+                                      <p:to>
+                                        <p:strVal val="visible"/>
+                                      </p:to>
+                                    </p:set>
+                                  </p:childTnLst>
+                                </p:cTn>
+                              </p:par>
+                            </p:childTnLst>
+                          </p:cTn>
+                        </p:par>
+                      </p:childTnLst>
+                    </p:cTn>
+                  </p:par>
+                </p:childTnLst>
+              </p:cTn>
+              <p:prevCondLst>
+                <p:cond evt="onPrev" delay="0">
+                  <p:tgtEl>
+                    <p:sldTgt/>
+                  </p:tgtEl>
+                </p:cond>
+              </p:prevCondLst>
+              <p:nextCondLst>
+                <p:cond evt="onNext" delay="0">
+                  <p:tgtEl>
+                    <p:sldTgt/>
+                  </p:tgtEl>
+                </p:cond>
+              </p:nextCondLst>
+            </p:seq>
+          </p:childTnLst>
+        </p:cTn>
+      </p:par>
+    </p:tnLst>
+  </p:timing>
+</p:sld>
+</file>
+
+<file path=ppt/slides/slide15.xml><?xml version="1.0" encoding="utf-8"?>
 <p:sld xmlns:a="http://schemas.openxmlformats.org/drawingml/2006/main" xmlns:r="http://schemas.openxmlformats.org/officeDocument/2006/relationships" xmlns:p="http://schemas.openxmlformats.org/presentationml/2006/main">
   <p:cSld>
     <p:spTree>
@@ -11236,7 +12974,7 @@
 </p:sld>
 </file>
 
-<file path=ppt/slides/slide15.xml><?xml version="1.0" encoding="utf-8"?>
+<file path=ppt/slides/slide16.xml><?xml version="1.0" encoding="utf-8"?>
 <p:sld xmlns:a="http://schemas.openxmlformats.org/drawingml/2006/main" xmlns:r="http://schemas.openxmlformats.org/officeDocument/2006/relationships" xmlns:p="http://schemas.openxmlformats.org/presentationml/2006/main">
   <p:cSld>
     <p:spTree>
@@ -11343,7 +13081,7 @@
 </p:sld>
 </file>
 
-<file path=ppt/slides/slide16.xml><?xml version="1.0" encoding="utf-8"?>
+<file path=ppt/slides/slide17.xml><?xml version="1.0" encoding="utf-8"?>
 <p:sld xmlns:a="http://schemas.openxmlformats.org/drawingml/2006/main" xmlns:r="http://schemas.openxmlformats.org/officeDocument/2006/relationships" xmlns:p="http://schemas.openxmlformats.org/presentationml/2006/main">
   <p:cSld>
     <p:spTree>
@@ -12560,7 +14298,7 @@
 </p:sld>
 </file>
 
-<file path=ppt/slides/slide17.xml><?xml version="1.0" encoding="utf-8"?>
+<file path=ppt/slides/slide18.xml><?xml version="1.0" encoding="utf-8"?>
 <p:sld xmlns:a="http://schemas.openxmlformats.org/drawingml/2006/main" xmlns:r="http://schemas.openxmlformats.org/officeDocument/2006/relationships" xmlns:p="http://schemas.openxmlformats.org/presentationml/2006/main">
   <p:cSld>
     <p:spTree>
@@ -13751,7 +15489,7 @@
 </p:sld>
 </file>
 
-<file path=ppt/slides/slide18.xml><?xml version="1.0" encoding="utf-8"?>
+<file path=ppt/slides/slide19.xml><?xml version="1.0" encoding="utf-8"?>
 <p:sld xmlns:a="http://schemas.openxmlformats.org/drawingml/2006/main" xmlns:r="http://schemas.openxmlformats.org/officeDocument/2006/relationships" xmlns:p="http://schemas.openxmlformats.org/presentationml/2006/main">
   <p:cSld>
     <p:spTree>
@@ -14795,113 +16533,6 @@
       </p:par>
     </p:tnLst>
   </p:timing>
-</p:sld>
-</file>
-
-<file path=ppt/slides/slide19.xml><?xml version="1.0" encoding="utf-8"?>
-<p:sld xmlns:a="http://schemas.openxmlformats.org/drawingml/2006/main" xmlns:r="http://schemas.openxmlformats.org/officeDocument/2006/relationships" xmlns:p="http://schemas.openxmlformats.org/presentationml/2006/main">
-  <p:cSld>
-    <p:spTree>
-      <p:nvGrpSpPr>
-        <p:cNvPr id="1" name=""/>
-        <p:cNvGrpSpPr/>
-        <p:nvPr/>
-      </p:nvGrpSpPr>
-      <p:grpSpPr>
-        <a:xfrm>
-          <a:off x="0" y="0"/>
-          <a:ext cx="0" cy="0"/>
-          <a:chOff x="0" y="0"/>
-          <a:chExt cx="0" cy="0"/>
-        </a:xfrm>
-      </p:grpSpPr>
-      <p:sp>
-        <p:nvSpPr>
-          <p:cNvPr id="2" name="Title 1">
-            <a:extLst>
-              <a:ext uri="{FF2B5EF4-FFF2-40B4-BE49-F238E27FC236}">
-                <a16:creationId xmlns:a16="http://schemas.microsoft.com/office/drawing/2014/main" id="{7306C212-B3B4-8E92-B9B3-B626EF37EBA4}"/>
-              </a:ext>
-            </a:extLst>
-          </p:cNvPr>
-          <p:cNvSpPr txBox="1">
-            <a:spLocks noGrp="1"/>
-          </p:cNvSpPr>
-          <p:nvPr>
-            <p:ph type="title" idx="4294967295"/>
-          </p:nvPr>
-        </p:nvSpPr>
-        <p:spPr>
-          <a:xfrm>
-            <a:off x="1061794" y="2274838"/>
-            <a:ext cx="10068412" cy="2308324"/>
-          </a:xfrm>
-          <a:prstGeom prst="rect">
-            <a:avLst/>
-          </a:prstGeom>
-          <a:noFill/>
-          <a:ln>
-            <a:noFill/>
-            <a:prstDash/>
-          </a:ln>
-          <a:effectLst/>
-        </p:spPr>
-        <p:txBody>
-          <a:bodyPr rot="0" spcFirstLastPara="0" vertOverflow="overflow" horzOverflow="overflow" vert="horz" wrap="square" lIns="91440" tIns="45720" rIns="91440" bIns="45720" numCol="1" spcCol="0" rtlCol="0" fromWordArt="0" anchor="t" anchorCtr="0" forceAA="0" compatLnSpc="1">
-            <a:prstTxWarp prst="textNoShape">
-              <a:avLst/>
-            </a:prstTxWarp>
-            <a:spAutoFit/>
-          </a:bodyPr>
-          <a:lstStyle/>
-          <a:p>
-            <a:pPr marL="0" marR="0" lvl="0" indent="0" algn="ctr" defTabSz="457200" rtl="0" eaLnBrk="1" fontAlgn="auto" latinLnBrk="0" hangingPunct="1">
-              <a:lnSpc>
-                <a:spcPct val="100000"/>
-              </a:lnSpc>
-              <a:spcBef>
-                <a:spcPts val="0"/>
-              </a:spcBef>
-              <a:spcAft>
-                <a:spcPts val="0"/>
-              </a:spcAft>
-              <a:buClrTx/>
-              <a:buSzTx/>
-              <a:buFontTx/>
-              <a:buNone/>
-              <a:tabLst/>
-              <a:defRPr/>
-            </a:pPr>
-            <a:r>
-              <a:rPr kumimoji="0" lang="en-US" sz="7200" b="0" i="0" u="none" strike="noStrike" kern="1200" cap="none" spc="0" normalizeH="0" baseline="0" noProof="0" dirty="0">
-                <a:ln>
-                  <a:noFill/>
-                </a:ln>
-                <a:solidFill>
-                  <a:schemeClr val="tx1"/>
-                </a:solidFill>
-                <a:effectLst/>
-                <a:uLnTx/>
-                <a:uFillTx/>
-                <a:latin typeface="+mn-lt"/>
-                <a:ea typeface="+mn-ea"/>
-                <a:cs typeface="+mn-cs"/>
-              </a:rPr>
-              <a:t>Managing unmanaged memory</a:t>
-            </a:r>
-          </a:p>
-        </p:txBody>
-      </p:sp>
-    </p:spTree>
-    <p:extLst>
-      <p:ext uri="{BB962C8B-B14F-4D97-AF65-F5344CB8AC3E}">
-        <p14:creationId xmlns:p14="http://schemas.microsoft.com/office/powerpoint/2010/main" val="795551212"/>
-      </p:ext>
-    </p:extLst>
-  </p:cSld>
-  <p:clrMapOvr>
-    <a:masterClrMapping/>
-  </p:clrMapOvr>
 </p:sld>
 </file>
 
@@ -15480,6 +17111,113 @@
           <p:cNvPr id="2" name="Title 1">
             <a:extLst>
               <a:ext uri="{FF2B5EF4-FFF2-40B4-BE49-F238E27FC236}">
+                <a16:creationId xmlns:a16="http://schemas.microsoft.com/office/drawing/2014/main" id="{7306C212-B3B4-8E92-B9B3-B626EF37EBA4}"/>
+              </a:ext>
+            </a:extLst>
+          </p:cNvPr>
+          <p:cNvSpPr txBox="1">
+            <a:spLocks noGrp="1"/>
+          </p:cNvSpPr>
+          <p:nvPr>
+            <p:ph type="title" idx="4294967295"/>
+          </p:nvPr>
+        </p:nvSpPr>
+        <p:spPr>
+          <a:xfrm>
+            <a:off x="1061794" y="2274838"/>
+            <a:ext cx="10068412" cy="2308324"/>
+          </a:xfrm>
+          <a:prstGeom prst="rect">
+            <a:avLst/>
+          </a:prstGeom>
+          <a:noFill/>
+          <a:ln>
+            <a:noFill/>
+            <a:prstDash/>
+          </a:ln>
+          <a:effectLst/>
+        </p:spPr>
+        <p:txBody>
+          <a:bodyPr rot="0" spcFirstLastPara="0" vertOverflow="overflow" horzOverflow="overflow" vert="horz" wrap="square" lIns="91440" tIns="45720" rIns="91440" bIns="45720" numCol="1" spcCol="0" rtlCol="0" fromWordArt="0" anchor="t" anchorCtr="0" forceAA="0" compatLnSpc="1">
+            <a:prstTxWarp prst="textNoShape">
+              <a:avLst/>
+            </a:prstTxWarp>
+            <a:spAutoFit/>
+          </a:bodyPr>
+          <a:lstStyle/>
+          <a:p>
+            <a:pPr marL="0" marR="0" lvl="0" indent="0" algn="ctr" defTabSz="457200" rtl="0" eaLnBrk="1" fontAlgn="auto" latinLnBrk="0" hangingPunct="1">
+              <a:lnSpc>
+                <a:spcPct val="100000"/>
+              </a:lnSpc>
+              <a:spcBef>
+                <a:spcPts val="0"/>
+              </a:spcBef>
+              <a:spcAft>
+                <a:spcPts val="0"/>
+              </a:spcAft>
+              <a:buClrTx/>
+              <a:buSzTx/>
+              <a:buFontTx/>
+              <a:buNone/>
+              <a:tabLst/>
+              <a:defRPr/>
+            </a:pPr>
+            <a:r>
+              <a:rPr kumimoji="0" lang="en-US" sz="7200" b="0" i="0" u="none" strike="noStrike" kern="1200" cap="none" spc="0" normalizeH="0" baseline="0" noProof="0" dirty="0">
+                <a:ln>
+                  <a:noFill/>
+                </a:ln>
+                <a:solidFill>
+                  <a:schemeClr val="tx1"/>
+                </a:solidFill>
+                <a:effectLst/>
+                <a:uLnTx/>
+                <a:uFillTx/>
+                <a:latin typeface="+mn-lt"/>
+                <a:ea typeface="+mn-ea"/>
+                <a:cs typeface="+mn-cs"/>
+              </a:rPr>
+              <a:t>Managing unmanaged memory</a:t>
+            </a:r>
+          </a:p>
+        </p:txBody>
+      </p:sp>
+    </p:spTree>
+    <p:extLst>
+      <p:ext uri="{BB962C8B-B14F-4D97-AF65-F5344CB8AC3E}">
+        <p14:creationId xmlns:p14="http://schemas.microsoft.com/office/powerpoint/2010/main" val="795551212"/>
+      </p:ext>
+    </p:extLst>
+  </p:cSld>
+  <p:clrMapOvr>
+    <a:masterClrMapping/>
+  </p:clrMapOvr>
+</p:sld>
+</file>
+
+<file path=ppt/slides/slide21.xml><?xml version="1.0" encoding="utf-8"?>
+<p:sld xmlns:a="http://schemas.openxmlformats.org/drawingml/2006/main" xmlns:r="http://schemas.openxmlformats.org/officeDocument/2006/relationships" xmlns:p="http://schemas.openxmlformats.org/presentationml/2006/main">
+  <p:cSld>
+    <p:spTree>
+      <p:nvGrpSpPr>
+        <p:cNvPr id="1" name=""/>
+        <p:cNvGrpSpPr/>
+        <p:nvPr/>
+      </p:nvGrpSpPr>
+      <p:grpSpPr>
+        <a:xfrm>
+          <a:off x="0" y="0"/>
+          <a:ext cx="0" cy="0"/>
+          <a:chOff x="0" y="0"/>
+          <a:chExt cx="0" cy="0"/>
+        </a:xfrm>
+      </p:grpSpPr>
+      <p:sp>
+        <p:nvSpPr>
+          <p:cNvPr id="2" name="Title 1">
+            <a:extLst>
+              <a:ext uri="{FF2B5EF4-FFF2-40B4-BE49-F238E27FC236}">
                 <a16:creationId xmlns:a16="http://schemas.microsoft.com/office/drawing/2014/main" id="{384CFDA5-C923-7D81-0BCF-0BE825FB0E61}"/>
               </a:ext>
             </a:extLst>
@@ -15925,7 +17663,7 @@
 </p:sld>
 </file>
 
-<file path=ppt/slides/slide21.xml><?xml version="1.0" encoding="utf-8"?>
+<file path=ppt/slides/slide22.xml><?xml version="1.0" encoding="utf-8"?>
 <p:sld xmlns:a="http://schemas.openxmlformats.org/drawingml/2006/main" xmlns:r="http://schemas.openxmlformats.org/officeDocument/2006/relationships" xmlns:p="http://schemas.openxmlformats.org/presentationml/2006/main">
   <p:cSld>
     <p:spTree>
@@ -16577,7 +18315,7 @@
 </p:sld>
 </file>
 
-<file path=ppt/slides/slide22.xml><?xml version="1.0" encoding="utf-8"?>
+<file path=ppt/slides/slide23.xml><?xml version="1.0" encoding="utf-8"?>
 <p:sld xmlns:a="http://schemas.openxmlformats.org/drawingml/2006/main" xmlns:r="http://schemas.openxmlformats.org/officeDocument/2006/relationships" xmlns:p="http://schemas.openxmlformats.org/presentationml/2006/main">
   <p:cSld>
     <p:spTree>
@@ -17383,7 +19121,7 @@
 </p:sld>
 </file>
 
-<file path=ppt/slides/slide23.xml><?xml version="1.0" encoding="utf-8"?>
+<file path=ppt/slides/slide24.xml><?xml version="1.0" encoding="utf-8"?>
 <p:sld xmlns:a="http://schemas.openxmlformats.org/drawingml/2006/main" xmlns:r="http://schemas.openxmlformats.org/officeDocument/2006/relationships" xmlns:p="http://schemas.openxmlformats.org/presentationml/2006/main">
   <p:cSld>
     <p:spTree>
@@ -17490,7 +19228,7 @@
 </p:sld>
 </file>
 
-<file path=ppt/slides/slide24.xml><?xml version="1.0" encoding="utf-8"?>
+<file path=ppt/slides/slide25.xml><?xml version="1.0" encoding="utf-8"?>
 <p:sld xmlns:a="http://schemas.openxmlformats.org/drawingml/2006/main" xmlns:r="http://schemas.openxmlformats.org/officeDocument/2006/relationships" xmlns:p="http://schemas.openxmlformats.org/presentationml/2006/main">
   <p:cSld>
     <p:spTree>
@@ -18722,7 +20460,7 @@
 </p:sld>
 </file>
 
-<file path=ppt/slides/slide25.xml><?xml version="1.0" encoding="utf-8"?>
+<file path=ppt/slides/slide26.xml><?xml version="1.0" encoding="utf-8"?>
 <p:sld xmlns:a="http://schemas.openxmlformats.org/drawingml/2006/main" xmlns:r="http://schemas.openxmlformats.org/officeDocument/2006/relationships" xmlns:p="http://schemas.openxmlformats.org/presentationml/2006/main">
   <p:cSld>
     <p:spTree>
@@ -19524,7 +21262,7 @@
 </p:sld>
 </file>
 
-<file path=ppt/slides/slide26.xml><?xml version="1.0" encoding="utf-8"?>
+<file path=ppt/slides/slide27.xml><?xml version="1.0" encoding="utf-8"?>
 <p:sld xmlns:a="http://schemas.openxmlformats.org/drawingml/2006/main" xmlns:r="http://schemas.openxmlformats.org/officeDocument/2006/relationships" xmlns:p="http://schemas.openxmlformats.org/presentationml/2006/main">
   <p:cSld>
     <p:spTree>
@@ -19845,7 +21583,7 @@
 </p:sld>
 </file>
 
-<file path=ppt/slides/slide27.xml><?xml version="1.0" encoding="utf-8"?>
+<file path=ppt/slides/slide28.xml><?xml version="1.0" encoding="utf-8"?>
 <p:sld xmlns:a="http://schemas.openxmlformats.org/drawingml/2006/main" xmlns:r="http://schemas.openxmlformats.org/officeDocument/2006/relationships" xmlns:p="http://schemas.openxmlformats.org/presentationml/2006/main">
   <p:cSld>
     <p:spTree>
@@ -20390,7 +22128,7 @@
 </p:sld>
 </file>
 
-<file path=ppt/slides/slide28.xml><?xml version="1.0" encoding="utf-8"?>
+<file path=ppt/slides/slide29.xml><?xml version="1.0" encoding="utf-8"?>
 <p:sld xmlns:a="http://schemas.openxmlformats.org/drawingml/2006/main" xmlns:r="http://schemas.openxmlformats.org/officeDocument/2006/relationships" xmlns:p="http://schemas.openxmlformats.org/presentationml/2006/main">
   <p:cSld>
     <p:spTree>
@@ -20740,512 +22478,6 @@
 </p:sld>
 </file>
 
-<file path=ppt/slides/slide29.xml><?xml version="1.0" encoding="utf-8"?>
-<p:sld xmlns:a="http://schemas.openxmlformats.org/drawingml/2006/main" xmlns:r="http://schemas.openxmlformats.org/officeDocument/2006/relationships" xmlns:p="http://schemas.openxmlformats.org/presentationml/2006/main">
-  <p:cSld>
-    <p:spTree>
-      <p:nvGrpSpPr>
-        <p:cNvPr id="1" name=""/>
-        <p:cNvGrpSpPr/>
-        <p:nvPr/>
-      </p:nvGrpSpPr>
-      <p:grpSpPr>
-        <a:xfrm>
-          <a:off x="0" y="0"/>
-          <a:ext cx="0" cy="0"/>
-          <a:chOff x="0" y="0"/>
-          <a:chExt cx="0" cy="0"/>
-        </a:xfrm>
-      </p:grpSpPr>
-      <p:sp>
-        <p:nvSpPr>
-          <p:cNvPr id="2" name="Title 1">
-            <a:extLst>
-              <a:ext uri="{FF2B5EF4-FFF2-40B4-BE49-F238E27FC236}">
-                <a16:creationId xmlns:a16="http://schemas.microsoft.com/office/drawing/2014/main" id="{A690C17B-431B-47C6-8EFF-E87685350308}"/>
-              </a:ext>
-            </a:extLst>
-          </p:cNvPr>
-          <p:cNvSpPr>
-            <a:spLocks noGrp="1"/>
-          </p:cNvSpPr>
-          <p:nvPr>
-            <p:ph type="title"/>
-          </p:nvPr>
-        </p:nvSpPr>
-        <p:spPr/>
-        <p:txBody>
-          <a:bodyPr/>
-          <a:lstStyle/>
-          <a:p>
-            <a:r>
-              <a:rPr lang="en-US" dirty="0"/>
-              <a:t>Platform Invoke (P/Invoke)</a:t>
-            </a:r>
-            <a:br>
-              <a:rPr lang="en-US" dirty="0"/>
-            </a:br>
-            <a:r>
-              <a:rPr lang="en-US" dirty="0"/>
-              <a:t>Calling conventions II</a:t>
-            </a:r>
-          </a:p>
-        </p:txBody>
-      </p:sp>
-      <p:sp>
-        <p:nvSpPr>
-          <p:cNvPr id="3" name="Content Placeholder 2">
-            <a:extLst>
-              <a:ext uri="{FF2B5EF4-FFF2-40B4-BE49-F238E27FC236}">
-                <a16:creationId xmlns:a16="http://schemas.microsoft.com/office/drawing/2014/main" id="{06F7C0BF-2621-7C50-FF99-08F9D86B9C28}"/>
-              </a:ext>
-            </a:extLst>
-          </p:cNvPr>
-          <p:cNvSpPr>
-            <a:spLocks noGrp="1"/>
-          </p:cNvSpPr>
-          <p:nvPr>
-            <p:ph idx="1"/>
-          </p:nvPr>
-        </p:nvSpPr>
-        <p:spPr/>
-        <p:txBody>
-          <a:bodyPr/>
-          <a:lstStyle/>
-          <a:p>
-            <a:r>
-              <a:rPr lang="en-US" dirty="0"/>
-              <a:t>Windows, x86</a:t>
-            </a:r>
-            <a:br>
-              <a:rPr lang="en-US" dirty="0"/>
-            </a:br>
-            <a:r>
-              <a:rPr lang="en-US" sz="1200" dirty="0">
-                <a:hlinkClick r:id="rId2"/>
-              </a:rPr>
-              <a:t>https://learn.microsoft.com/en-us/cpp/cpp/argument-passing-and-naming-conventions</a:t>
-            </a:r>
-            <a:endParaRPr lang="en-US" sz="1200" dirty="0"/>
-          </a:p>
-          <a:p>
-            <a:pPr lvl="1"/>
-            <a:r>
-              <a:rPr lang="en-US" dirty="0"/>
-              <a:t>Supported by .NET: </a:t>
-            </a:r>
-            <a:r>
-              <a:rPr lang="en-US" dirty="0">
-                <a:latin typeface="Consolas" panose="020B0609020204030204" pitchFamily="49" charset="0"/>
-              </a:rPr>
-              <a:t>__</a:t>
-            </a:r>
-            <a:r>
-              <a:rPr lang="en-US" dirty="0" err="1">
-                <a:latin typeface="Consolas" panose="020B0609020204030204" pitchFamily="49" charset="0"/>
-              </a:rPr>
-              <a:t>cdecl</a:t>
-            </a:r>
-            <a:r>
-              <a:rPr lang="en-US" dirty="0"/>
-              <a:t>, </a:t>
-            </a:r>
-            <a:r>
-              <a:rPr lang="en-US" dirty="0">
-                <a:latin typeface="Consolas" panose="020B0609020204030204" pitchFamily="49" charset="0"/>
-              </a:rPr>
-              <a:t>__</a:t>
-            </a:r>
-            <a:r>
-              <a:rPr lang="en-US" dirty="0" err="1">
-                <a:latin typeface="Consolas" panose="020B0609020204030204" pitchFamily="49" charset="0"/>
-              </a:rPr>
-              <a:t>stdcall</a:t>
-            </a:r>
-            <a:r>
-              <a:rPr lang="en-US" dirty="0"/>
-              <a:t>, </a:t>
-            </a:r>
-            <a:r>
-              <a:rPr lang="en-US" dirty="0">
-                <a:latin typeface="Consolas" panose="020B0609020204030204" pitchFamily="49" charset="0"/>
-              </a:rPr>
-              <a:t>__</a:t>
-            </a:r>
-            <a:r>
-              <a:rPr lang="en-US" dirty="0" err="1">
-                <a:latin typeface="Consolas" panose="020B0609020204030204" pitchFamily="49" charset="0"/>
-              </a:rPr>
-              <a:t>thiscall</a:t>
-            </a:r>
-            <a:endParaRPr lang="en-US" dirty="0">
-              <a:latin typeface="Consolas" panose="020B0609020204030204" pitchFamily="49" charset="0"/>
-            </a:endParaRPr>
-          </a:p>
-          <a:p>
-            <a:pPr lvl="1"/>
-            <a:r>
-              <a:rPr lang="en-US" dirty="0"/>
-              <a:t>Unsupported by .NET: </a:t>
-            </a:r>
-            <a:r>
-              <a:rPr lang="en-US" dirty="0">
-                <a:latin typeface="Consolas" panose="020B0609020204030204" pitchFamily="49" charset="0"/>
-              </a:rPr>
-              <a:t>__</a:t>
-            </a:r>
-            <a:r>
-              <a:rPr lang="en-US" dirty="0" err="1">
-                <a:latin typeface="Consolas" panose="020B0609020204030204" pitchFamily="49" charset="0"/>
-              </a:rPr>
-              <a:t>fastcall</a:t>
-            </a:r>
-            <a:r>
-              <a:rPr lang="en-US" dirty="0"/>
-              <a:t>, </a:t>
-            </a:r>
-            <a:r>
-              <a:rPr lang="en-US" dirty="0">
-                <a:latin typeface="Consolas" panose="020B0609020204030204" pitchFamily="49" charset="0"/>
-              </a:rPr>
-              <a:t>__</a:t>
-            </a:r>
-            <a:r>
-              <a:rPr lang="en-US" dirty="0" err="1">
-                <a:latin typeface="Consolas" panose="020B0609020204030204" pitchFamily="49" charset="0"/>
-              </a:rPr>
-              <a:t>vectorcall</a:t>
-            </a:r>
-            <a:endParaRPr lang="en-US" dirty="0">
-              <a:latin typeface="Consolas" panose="020B0609020204030204" pitchFamily="49" charset="0"/>
-            </a:endParaRPr>
-          </a:p>
-          <a:p>
-            <a:r>
-              <a:rPr lang="en-US" dirty="0"/>
-              <a:t>Windows, x64</a:t>
-            </a:r>
-          </a:p>
-          <a:p>
-            <a:pPr lvl="1"/>
-            <a:r>
-              <a:rPr lang="en-US" dirty="0"/>
-              <a:t>Standard calling convention</a:t>
-            </a:r>
-            <a:br>
-              <a:rPr lang="en-US" dirty="0"/>
-            </a:br>
-            <a:r>
-              <a:rPr lang="en-US" sz="1200" dirty="0">
-                <a:hlinkClick r:id="rId3"/>
-              </a:rPr>
-              <a:t>https://learn.microsoft.com/en-us/cpp/build/x64-calling-convention</a:t>
-            </a:r>
-            <a:endParaRPr lang="en-US" sz="1200" dirty="0"/>
-          </a:p>
-          <a:p>
-            <a:pPr lvl="1"/>
-            <a:r>
-              <a:rPr lang="en-US" dirty="0">
-                <a:latin typeface="Consolas" panose="020B0609020204030204" pitchFamily="49" charset="0"/>
-              </a:rPr>
-              <a:t>__</a:t>
-            </a:r>
-            <a:r>
-              <a:rPr lang="en-US" dirty="0" err="1">
-                <a:latin typeface="Consolas" panose="020B0609020204030204" pitchFamily="49" charset="0"/>
-              </a:rPr>
-              <a:t>vectorcall</a:t>
-            </a:r>
-            <a:r>
-              <a:rPr lang="en-US" dirty="0"/>
-              <a:t> convention as an extension of the standard convention (unsupported by .NET)</a:t>
-            </a:r>
-            <a:br>
-              <a:rPr lang="en-US" dirty="0"/>
-            </a:br>
-            <a:r>
-              <a:rPr lang="en-US" sz="1200" dirty="0">
-                <a:hlinkClick r:id="rId4"/>
-              </a:rPr>
-              <a:t>https://learn.microsoft.com/en-us/cpp/cpp/vectorcall</a:t>
-            </a:r>
-            <a:endParaRPr lang="en-US" sz="1200" dirty="0"/>
-          </a:p>
-          <a:p>
-            <a:pPr lvl="1"/>
-            <a:endParaRPr lang="en-US" dirty="0"/>
-          </a:p>
-        </p:txBody>
-      </p:sp>
-    </p:spTree>
-    <p:extLst>
-      <p:ext uri="{BB962C8B-B14F-4D97-AF65-F5344CB8AC3E}">
-        <p14:creationId xmlns:p14="http://schemas.microsoft.com/office/powerpoint/2010/main" val="3652254688"/>
-      </p:ext>
-    </p:extLst>
-  </p:cSld>
-  <p:clrMapOvr>
-    <a:masterClrMapping/>
-  </p:clrMapOvr>
-  <p:timing>
-    <p:tnLst>
-      <p:par>
-        <p:cTn id="1" dur="indefinite" restart="never" nodeType="tmRoot">
-          <p:childTnLst>
-            <p:seq concurrent="1" nextAc="seek">
-              <p:cTn id="2" dur="indefinite" nodeType="mainSeq">
-                <p:childTnLst>
-                  <p:par>
-                    <p:cTn id="3" fill="hold">
-                      <p:stCondLst>
-                        <p:cond delay="indefinite"/>
-                      </p:stCondLst>
-                      <p:childTnLst>
-                        <p:par>
-                          <p:cTn id="4" fill="hold">
-                            <p:stCondLst>
-                              <p:cond delay="0"/>
-                            </p:stCondLst>
-                            <p:childTnLst>
-                              <p:par>
-                                <p:cTn id="5" presetID="1" presetClass="entr" presetSubtype="0" fill="hold" grpId="0" nodeType="clickEffect">
-                                  <p:stCondLst>
-                                    <p:cond delay="0"/>
-                                  </p:stCondLst>
-                                  <p:childTnLst>
-                                    <p:set>
-                                      <p:cBhvr>
-                                        <p:cTn id="6" dur="1" fill="hold">
-                                          <p:stCondLst>
-                                            <p:cond delay="0"/>
-                                          </p:stCondLst>
-                                        </p:cTn>
-                                        <p:tgtEl>
-                                          <p:spTgt spid="3">
-                                            <p:txEl>
-                                              <p:pRg st="0" end="0"/>
-                                            </p:txEl>
-                                          </p:spTgt>
-                                        </p:tgtEl>
-                                        <p:attrNameLst>
-                                          <p:attrName>style.visibility</p:attrName>
-                                        </p:attrNameLst>
-                                      </p:cBhvr>
-                                      <p:to>
-                                        <p:strVal val="visible"/>
-                                      </p:to>
-                                    </p:set>
-                                  </p:childTnLst>
-                                </p:cTn>
-                              </p:par>
-                              <p:par>
-                                <p:cTn id="7" presetID="1" presetClass="entr" presetSubtype="0" fill="hold" grpId="0" nodeType="withEffect">
-                                  <p:stCondLst>
-                                    <p:cond delay="0"/>
-                                  </p:stCondLst>
-                                  <p:childTnLst>
-                                    <p:set>
-                                      <p:cBhvr>
-                                        <p:cTn id="8" dur="1" fill="hold">
-                                          <p:stCondLst>
-                                            <p:cond delay="0"/>
-                                          </p:stCondLst>
-                                        </p:cTn>
-                                        <p:tgtEl>
-                                          <p:spTgt spid="3">
-                                            <p:txEl>
-                                              <p:pRg st="1" end="1"/>
-                                            </p:txEl>
-                                          </p:spTgt>
-                                        </p:tgtEl>
-                                        <p:attrNameLst>
-                                          <p:attrName>style.visibility</p:attrName>
-                                        </p:attrNameLst>
-                                      </p:cBhvr>
-                                      <p:to>
-                                        <p:strVal val="visible"/>
-                                      </p:to>
-                                    </p:set>
-                                  </p:childTnLst>
-                                </p:cTn>
-                              </p:par>
-                              <p:par>
-                                <p:cTn id="9" presetID="1" presetClass="entr" presetSubtype="0" fill="hold" grpId="0" nodeType="withEffect">
-                                  <p:stCondLst>
-                                    <p:cond delay="0"/>
-                                  </p:stCondLst>
-                                  <p:childTnLst>
-                                    <p:set>
-                                      <p:cBhvr>
-                                        <p:cTn id="10" dur="1" fill="hold">
-                                          <p:stCondLst>
-                                            <p:cond delay="0"/>
-                                          </p:stCondLst>
-                                        </p:cTn>
-                                        <p:tgtEl>
-                                          <p:spTgt spid="3">
-                                            <p:txEl>
-                                              <p:pRg st="2" end="2"/>
-                                            </p:txEl>
-                                          </p:spTgt>
-                                        </p:tgtEl>
-                                        <p:attrNameLst>
-                                          <p:attrName>style.visibility</p:attrName>
-                                        </p:attrNameLst>
-                                      </p:cBhvr>
-                                      <p:to>
-                                        <p:strVal val="visible"/>
-                                      </p:to>
-                                    </p:set>
-                                  </p:childTnLst>
-                                </p:cTn>
-                              </p:par>
-                            </p:childTnLst>
-                          </p:cTn>
-                        </p:par>
-                      </p:childTnLst>
-                    </p:cTn>
-                  </p:par>
-                  <p:par>
-                    <p:cTn id="11" fill="hold">
-                      <p:stCondLst>
-                        <p:cond delay="indefinite"/>
-                      </p:stCondLst>
-                      <p:childTnLst>
-                        <p:par>
-                          <p:cTn id="12" fill="hold">
-                            <p:stCondLst>
-                              <p:cond delay="0"/>
-                            </p:stCondLst>
-                            <p:childTnLst>
-                              <p:par>
-                                <p:cTn id="13" presetID="1" presetClass="entr" presetSubtype="0" fill="hold" grpId="0" nodeType="clickEffect">
-                                  <p:stCondLst>
-                                    <p:cond delay="0"/>
-                                  </p:stCondLst>
-                                  <p:childTnLst>
-                                    <p:set>
-                                      <p:cBhvr>
-                                        <p:cTn id="14" dur="1" fill="hold">
-                                          <p:stCondLst>
-                                            <p:cond delay="0"/>
-                                          </p:stCondLst>
-                                        </p:cTn>
-                                        <p:tgtEl>
-                                          <p:spTgt spid="3">
-                                            <p:txEl>
-                                              <p:pRg st="3" end="3"/>
-                                            </p:txEl>
-                                          </p:spTgt>
-                                        </p:tgtEl>
-                                        <p:attrNameLst>
-                                          <p:attrName>style.visibility</p:attrName>
-                                        </p:attrNameLst>
-                                      </p:cBhvr>
-                                      <p:to>
-                                        <p:strVal val="visible"/>
-                                      </p:to>
-                                    </p:set>
-                                  </p:childTnLst>
-                                </p:cTn>
-                              </p:par>
-                              <p:par>
-                                <p:cTn id="15" presetID="1" presetClass="entr" presetSubtype="0" fill="hold" grpId="0" nodeType="withEffect">
-                                  <p:stCondLst>
-                                    <p:cond delay="0"/>
-                                  </p:stCondLst>
-                                  <p:childTnLst>
-                                    <p:set>
-                                      <p:cBhvr>
-                                        <p:cTn id="16" dur="1" fill="hold">
-                                          <p:stCondLst>
-                                            <p:cond delay="0"/>
-                                          </p:stCondLst>
-                                        </p:cTn>
-                                        <p:tgtEl>
-                                          <p:spTgt spid="3">
-                                            <p:txEl>
-                                              <p:pRg st="4" end="4"/>
-                                            </p:txEl>
-                                          </p:spTgt>
-                                        </p:tgtEl>
-                                        <p:attrNameLst>
-                                          <p:attrName>style.visibility</p:attrName>
-                                        </p:attrNameLst>
-                                      </p:cBhvr>
-                                      <p:to>
-                                        <p:strVal val="visible"/>
-                                      </p:to>
-                                    </p:set>
-                                  </p:childTnLst>
-                                </p:cTn>
-                              </p:par>
-                              <p:par>
-                                <p:cTn id="17" presetID="1" presetClass="entr" presetSubtype="0" fill="hold" grpId="0" nodeType="withEffect">
-                                  <p:stCondLst>
-                                    <p:cond delay="0"/>
-                                  </p:stCondLst>
-                                  <p:childTnLst>
-                                    <p:set>
-                                      <p:cBhvr>
-                                        <p:cTn id="18" dur="1" fill="hold">
-                                          <p:stCondLst>
-                                            <p:cond delay="0"/>
-                                          </p:stCondLst>
-                                        </p:cTn>
-                                        <p:tgtEl>
-                                          <p:spTgt spid="3">
-                                            <p:txEl>
-                                              <p:pRg st="5" end="5"/>
-                                            </p:txEl>
-                                          </p:spTgt>
-                                        </p:tgtEl>
-                                        <p:attrNameLst>
-                                          <p:attrName>style.visibility</p:attrName>
-                                        </p:attrNameLst>
-                                      </p:cBhvr>
-                                      <p:to>
-                                        <p:strVal val="visible"/>
-                                      </p:to>
-                                    </p:set>
-                                  </p:childTnLst>
-                                </p:cTn>
-                              </p:par>
-                            </p:childTnLst>
-                          </p:cTn>
-                        </p:par>
-                      </p:childTnLst>
-                    </p:cTn>
-                  </p:par>
-                </p:childTnLst>
-              </p:cTn>
-              <p:prevCondLst>
-                <p:cond evt="onPrev" delay="0">
-                  <p:tgtEl>
-                    <p:sldTgt/>
-                  </p:tgtEl>
-                </p:cond>
-              </p:prevCondLst>
-              <p:nextCondLst>
-                <p:cond evt="onNext" delay="0">
-                  <p:tgtEl>
-                    <p:sldTgt/>
-                  </p:tgtEl>
-                </p:cond>
-              </p:nextCondLst>
-            </p:seq>
-          </p:childTnLst>
-        </p:cTn>
-      </p:par>
-    </p:tnLst>
-    <p:bldLst>
-      <p:bldP spid="3" grpId="0" build="p"/>
-    </p:bldLst>
-  </p:timing>
-</p:sld>
-</file>
-
 <file path=ppt/slides/slide3.xml><?xml version="1.0" encoding="utf-8"?>
 <p:sld xmlns:a="http://schemas.openxmlformats.org/drawingml/2006/main" xmlns:r="http://schemas.openxmlformats.org/officeDocument/2006/relationships" xmlns:p="http://schemas.openxmlformats.org/presentationml/2006/main">
   <p:cSld>
@@ -21400,7 +22632,7 @@
             </a:br>
             <a:r>
               <a:rPr lang="en-US" dirty="0"/>
-              <a:t>Calling conventions III</a:t>
+              <a:t>Calling conventions II</a:t>
             </a:r>
           </a:p>
         </p:txBody>
@@ -21428,14 +22660,7 @@
           <a:p>
             <a:r>
               <a:rPr lang="en-US" dirty="0"/>
-              <a:t>macOS, ARM64</a:t>
-            </a:r>
-          </a:p>
-          <a:p>
-            <a:pPr lvl="1"/>
-            <a:r>
-              <a:rPr lang="en-US" dirty="0"/>
-              <a:t>Single calling convention</a:t>
+              <a:t>Windows, x86</a:t>
             </a:r>
             <a:br>
               <a:rPr lang="en-US" dirty="0"/>
@@ -21444,7 +22669,7 @@
               <a:rPr lang="en-US" sz="1200" dirty="0">
                 <a:hlinkClick r:id="rId2"/>
               </a:rPr>
-              <a:t>https://developer.apple.com/documentation/xcode/writing-arm64-code-for-apple-platforms</a:t>
+              <a:t>https://learn.microsoft.com/en-us/cpp/cpp/argument-passing-and-naming-conventions</a:t>
             </a:r>
             <a:endParaRPr lang="en-US" sz="1200" dirty="0"/>
           </a:p>
@@ -21452,71 +22677,156 @@
             <a:pPr lvl="1"/>
             <a:r>
               <a:rPr lang="en-US" dirty="0"/>
-              <a:t>Modified version of the official AArch64 Procedure Call Standard (PCS)</a:t>
+              <a:t>Supported by .NET: </a:t>
+            </a:r>
+            <a:r>
+              <a:rPr lang="en-US" dirty="0">
+                <a:latin typeface="Consolas" panose="020B0609020204030204" pitchFamily="49" charset="0"/>
+              </a:rPr>
+              <a:t>__</a:t>
+            </a:r>
+            <a:r>
+              <a:rPr lang="en-US" dirty="0" err="1">
+                <a:latin typeface="Consolas" panose="020B0609020204030204" pitchFamily="49" charset="0"/>
+              </a:rPr>
+              <a:t>cdecl</a:t>
+            </a:r>
+            <a:r>
+              <a:rPr lang="en-US" dirty="0"/>
+              <a:t>, </a:t>
+            </a:r>
+            <a:r>
+              <a:rPr lang="en-US" dirty="0">
+                <a:latin typeface="Consolas" panose="020B0609020204030204" pitchFamily="49" charset="0"/>
+              </a:rPr>
+              <a:t>__</a:t>
+            </a:r>
+            <a:r>
+              <a:rPr lang="en-US" dirty="0" err="1">
+                <a:latin typeface="Consolas" panose="020B0609020204030204" pitchFamily="49" charset="0"/>
+              </a:rPr>
+              <a:t>stdcall</a:t>
+            </a:r>
+            <a:r>
+              <a:rPr lang="en-US" dirty="0"/>
+              <a:t>, </a:t>
+            </a:r>
+            <a:r>
+              <a:rPr lang="en-US" dirty="0">
+                <a:latin typeface="Consolas" panose="020B0609020204030204" pitchFamily="49" charset="0"/>
+              </a:rPr>
+              <a:t>__</a:t>
+            </a:r>
+            <a:r>
+              <a:rPr lang="en-US" dirty="0" err="1">
+                <a:latin typeface="Consolas" panose="020B0609020204030204" pitchFamily="49" charset="0"/>
+              </a:rPr>
+              <a:t>thiscall</a:t>
+            </a:r>
+            <a:endParaRPr lang="en-US" dirty="0">
+              <a:latin typeface="Consolas" panose="020B0609020204030204" pitchFamily="49" charset="0"/>
+            </a:endParaRPr>
+          </a:p>
+          <a:p>
+            <a:pPr lvl="1"/>
+            <a:r>
+              <a:rPr lang="en-US" dirty="0"/>
+              <a:t>Unsupported by .NET: </a:t>
+            </a:r>
+            <a:r>
+              <a:rPr lang="en-US" dirty="0">
+                <a:latin typeface="Consolas" panose="020B0609020204030204" pitchFamily="49" charset="0"/>
+              </a:rPr>
+              <a:t>__</a:t>
+            </a:r>
+            <a:r>
+              <a:rPr lang="en-US" dirty="0" err="1">
+                <a:latin typeface="Consolas" panose="020B0609020204030204" pitchFamily="49" charset="0"/>
+              </a:rPr>
+              <a:t>fastcall</a:t>
+            </a:r>
+            <a:r>
+              <a:rPr lang="en-US" dirty="0"/>
+              <a:t>, </a:t>
+            </a:r>
+            <a:r>
+              <a:rPr lang="en-US" dirty="0">
+                <a:latin typeface="Consolas" panose="020B0609020204030204" pitchFamily="49" charset="0"/>
+              </a:rPr>
+              <a:t>__</a:t>
+            </a:r>
+            <a:r>
+              <a:rPr lang="en-US" dirty="0" err="1">
+                <a:latin typeface="Consolas" panose="020B0609020204030204" pitchFamily="49" charset="0"/>
+              </a:rPr>
+              <a:t>vectorcall</a:t>
+            </a:r>
+            <a:endParaRPr lang="en-US" dirty="0">
+              <a:latin typeface="Consolas" panose="020B0609020204030204" pitchFamily="49" charset="0"/>
+            </a:endParaRPr>
+          </a:p>
+          <a:p>
+            <a:r>
+              <a:rPr lang="en-US" dirty="0"/>
+              <a:t>Windows, x64</a:t>
+            </a:r>
+          </a:p>
+          <a:p>
+            <a:pPr lvl="1"/>
+            <a:r>
+              <a:rPr lang="en-US" dirty="0"/>
+              <a:t>Standard calling convention</a:t>
             </a:r>
             <a:br>
-              <a:rPr lang="en-US" sz="1200" dirty="0"/>
+              <a:rPr lang="en-US" dirty="0"/>
             </a:br>
             <a:r>
               <a:rPr lang="en-US" sz="1200" dirty="0">
                 <a:hlinkClick r:id="rId3"/>
               </a:rPr>
-              <a:t>https://developer.arm.com/documentation/102374/0100/Procedure-Call-Standard</a:t>
+              <a:t>https://learn.microsoft.com/en-us/cpp/build/x64-calling-convention</a:t>
             </a:r>
             <a:endParaRPr lang="en-US" sz="1200" dirty="0"/>
           </a:p>
           <a:p>
+            <a:pPr lvl="1"/>
+            <a:r>
+              <a:rPr lang="en-US" dirty="0">
+                <a:latin typeface="Consolas" panose="020B0609020204030204" pitchFamily="49" charset="0"/>
+              </a:rPr>
+              <a:t>__</a:t>
+            </a:r>
+            <a:r>
+              <a:rPr lang="en-US" dirty="0" err="1">
+                <a:latin typeface="Consolas" panose="020B0609020204030204" pitchFamily="49" charset="0"/>
+              </a:rPr>
+              <a:t>vectorcall</a:t>
+            </a:r>
             <a:r>
               <a:rPr lang="en-US" dirty="0"/>
-              <a:t>Linux, x64</a:t>
-            </a:r>
+              <a:t> convention as an extension of the standard convention (unsupported by .NET)</a:t>
+            </a:r>
+            <a:br>
+              <a:rPr lang="en-US" dirty="0"/>
+            </a:br>
+            <a:r>
+              <a:rPr lang="en-US" sz="1200" dirty="0">
+                <a:hlinkClick r:id="rId4"/>
+              </a:rPr>
+              <a:t>https://learn.microsoft.com/en-us/cpp/cpp/vectorcall</a:t>
+            </a:r>
+            <a:endParaRPr lang="en-US" sz="1200" dirty="0"/>
           </a:p>
           <a:p>
             <a:pPr lvl="1"/>
-            <a:r>
-              <a:rPr lang="en-US" dirty="0"/>
-              <a:t>Single calling convention</a:t>
-            </a:r>
-          </a:p>
-          <a:p>
-            <a:pPr lvl="1"/>
-            <a:r>
-              <a:rPr lang="en-US" dirty="0"/>
-              <a:t>Implements the </a:t>
-            </a:r>
-            <a:r>
-              <a:rPr lang="en-US" i="1" dirty="0"/>
-              <a:t>AMD64 Architecture Processor Supplement</a:t>
-            </a:r>
-            <a:r>
-              <a:rPr lang="en-US" dirty="0"/>
-              <a:t> of the </a:t>
-            </a:r>
-            <a:r>
-              <a:rPr lang="en-US" i="1" dirty="0"/>
-              <a:t>System V Application Binary Interface</a:t>
-            </a:r>
-            <a:r>
-              <a:rPr lang="en-US" dirty="0"/>
-              <a:t> specification</a:t>
-            </a:r>
-            <a:br>
-              <a:rPr lang="en-US" dirty="0"/>
-            </a:br>
-            <a:r>
-              <a:rPr lang="en-US" sz="1200" dirty="0">
-                <a:hlinkClick r:id="rId4"/>
-              </a:rPr>
-              <a:t>https://refspecs.linuxbase.org/elf/x86_64-abi-0.99.pdf</a:t>
-            </a:r>
-            <a:endParaRPr lang="en-US" sz="1200" dirty="0"/>
+            <a:endParaRPr lang="en-US" dirty="0"/>
           </a:p>
         </p:txBody>
       </p:sp>
     </p:spTree>
     <p:extLst>
       <p:ext uri="{BB962C8B-B14F-4D97-AF65-F5344CB8AC3E}">
-        <p14:creationId xmlns:p14="http://schemas.microsoft.com/office/powerpoint/2010/main" val="796157535"/>
+        <p14:creationId xmlns:p14="http://schemas.microsoft.com/office/powerpoint/2010/main" val="3652254688"/>
       </p:ext>
     </p:extLst>
   </p:cSld>
@@ -21803,6 +23113,434 @@
           <p:cNvPr id="2" name="Title 1">
             <a:extLst>
               <a:ext uri="{FF2B5EF4-FFF2-40B4-BE49-F238E27FC236}">
+                <a16:creationId xmlns:a16="http://schemas.microsoft.com/office/drawing/2014/main" id="{A690C17B-431B-47C6-8EFF-E87685350308}"/>
+              </a:ext>
+            </a:extLst>
+          </p:cNvPr>
+          <p:cNvSpPr>
+            <a:spLocks noGrp="1"/>
+          </p:cNvSpPr>
+          <p:nvPr>
+            <p:ph type="title"/>
+          </p:nvPr>
+        </p:nvSpPr>
+        <p:spPr/>
+        <p:txBody>
+          <a:bodyPr/>
+          <a:lstStyle/>
+          <a:p>
+            <a:r>
+              <a:rPr lang="en-US" dirty="0"/>
+              <a:t>Platform Invoke (P/Invoke)</a:t>
+            </a:r>
+            <a:br>
+              <a:rPr lang="en-US" dirty="0"/>
+            </a:br>
+            <a:r>
+              <a:rPr lang="en-US" dirty="0"/>
+              <a:t>Calling conventions III</a:t>
+            </a:r>
+          </a:p>
+        </p:txBody>
+      </p:sp>
+      <p:sp>
+        <p:nvSpPr>
+          <p:cNvPr id="3" name="Content Placeholder 2">
+            <a:extLst>
+              <a:ext uri="{FF2B5EF4-FFF2-40B4-BE49-F238E27FC236}">
+                <a16:creationId xmlns:a16="http://schemas.microsoft.com/office/drawing/2014/main" id="{06F7C0BF-2621-7C50-FF99-08F9D86B9C28}"/>
+              </a:ext>
+            </a:extLst>
+          </p:cNvPr>
+          <p:cNvSpPr>
+            <a:spLocks noGrp="1"/>
+          </p:cNvSpPr>
+          <p:nvPr>
+            <p:ph idx="1"/>
+          </p:nvPr>
+        </p:nvSpPr>
+        <p:spPr/>
+        <p:txBody>
+          <a:bodyPr/>
+          <a:lstStyle/>
+          <a:p>
+            <a:r>
+              <a:rPr lang="en-US" dirty="0"/>
+              <a:t>macOS, ARM64</a:t>
+            </a:r>
+          </a:p>
+          <a:p>
+            <a:pPr lvl="1"/>
+            <a:r>
+              <a:rPr lang="en-US" dirty="0"/>
+              <a:t>Single calling convention</a:t>
+            </a:r>
+            <a:br>
+              <a:rPr lang="en-US" dirty="0"/>
+            </a:br>
+            <a:r>
+              <a:rPr lang="en-US" sz="1200" dirty="0">
+                <a:hlinkClick r:id="rId2"/>
+              </a:rPr>
+              <a:t>https://developer.apple.com/documentation/xcode/writing-arm64-code-for-apple-platforms</a:t>
+            </a:r>
+            <a:endParaRPr lang="en-US" sz="1200" dirty="0"/>
+          </a:p>
+          <a:p>
+            <a:pPr lvl="1"/>
+            <a:r>
+              <a:rPr lang="en-US" dirty="0"/>
+              <a:t>Modified version of the official AArch64 Procedure Call Standard (PCS)</a:t>
+            </a:r>
+            <a:br>
+              <a:rPr lang="en-US" sz="1200" dirty="0"/>
+            </a:br>
+            <a:r>
+              <a:rPr lang="en-US" sz="1200" dirty="0">
+                <a:hlinkClick r:id="rId3"/>
+              </a:rPr>
+              <a:t>https://developer.arm.com/documentation/102374/0100/Procedure-Call-Standard</a:t>
+            </a:r>
+            <a:endParaRPr lang="en-US" sz="1200" dirty="0"/>
+          </a:p>
+          <a:p>
+            <a:r>
+              <a:rPr lang="en-US" dirty="0"/>
+              <a:t>Linux, x64</a:t>
+            </a:r>
+          </a:p>
+          <a:p>
+            <a:pPr lvl="1"/>
+            <a:r>
+              <a:rPr lang="en-US" dirty="0"/>
+              <a:t>Single calling convention</a:t>
+            </a:r>
+          </a:p>
+          <a:p>
+            <a:pPr lvl="1"/>
+            <a:r>
+              <a:rPr lang="en-US" dirty="0"/>
+              <a:t>Implements the </a:t>
+            </a:r>
+            <a:r>
+              <a:rPr lang="en-US" i="1" dirty="0"/>
+              <a:t>AMD64 Architecture Processor Supplement</a:t>
+            </a:r>
+            <a:r>
+              <a:rPr lang="en-US" dirty="0"/>
+              <a:t> of the </a:t>
+            </a:r>
+            <a:r>
+              <a:rPr lang="en-US" i="1" dirty="0"/>
+              <a:t>System V Application Binary Interface</a:t>
+            </a:r>
+            <a:r>
+              <a:rPr lang="en-US" dirty="0"/>
+              <a:t> specification</a:t>
+            </a:r>
+            <a:br>
+              <a:rPr lang="en-US" dirty="0"/>
+            </a:br>
+            <a:r>
+              <a:rPr lang="en-US" sz="1200" dirty="0">
+                <a:hlinkClick r:id="rId4"/>
+              </a:rPr>
+              <a:t>https://refspecs.linuxbase.org/elf/x86_64-abi-0.99.pdf</a:t>
+            </a:r>
+            <a:endParaRPr lang="en-US" sz="1200" dirty="0"/>
+          </a:p>
+        </p:txBody>
+      </p:sp>
+    </p:spTree>
+    <p:extLst>
+      <p:ext uri="{BB962C8B-B14F-4D97-AF65-F5344CB8AC3E}">
+        <p14:creationId xmlns:p14="http://schemas.microsoft.com/office/powerpoint/2010/main" val="796157535"/>
+      </p:ext>
+    </p:extLst>
+  </p:cSld>
+  <p:clrMapOvr>
+    <a:masterClrMapping/>
+  </p:clrMapOvr>
+  <p:timing>
+    <p:tnLst>
+      <p:par>
+        <p:cTn id="1" dur="indefinite" restart="never" nodeType="tmRoot">
+          <p:childTnLst>
+            <p:seq concurrent="1" nextAc="seek">
+              <p:cTn id="2" dur="indefinite" nodeType="mainSeq">
+                <p:childTnLst>
+                  <p:par>
+                    <p:cTn id="3" fill="hold">
+                      <p:stCondLst>
+                        <p:cond delay="indefinite"/>
+                      </p:stCondLst>
+                      <p:childTnLst>
+                        <p:par>
+                          <p:cTn id="4" fill="hold">
+                            <p:stCondLst>
+                              <p:cond delay="0"/>
+                            </p:stCondLst>
+                            <p:childTnLst>
+                              <p:par>
+                                <p:cTn id="5" presetID="1" presetClass="entr" presetSubtype="0" fill="hold" grpId="0" nodeType="clickEffect">
+                                  <p:stCondLst>
+                                    <p:cond delay="0"/>
+                                  </p:stCondLst>
+                                  <p:childTnLst>
+                                    <p:set>
+                                      <p:cBhvr>
+                                        <p:cTn id="6" dur="1" fill="hold">
+                                          <p:stCondLst>
+                                            <p:cond delay="0"/>
+                                          </p:stCondLst>
+                                        </p:cTn>
+                                        <p:tgtEl>
+                                          <p:spTgt spid="3">
+                                            <p:txEl>
+                                              <p:pRg st="0" end="0"/>
+                                            </p:txEl>
+                                          </p:spTgt>
+                                        </p:tgtEl>
+                                        <p:attrNameLst>
+                                          <p:attrName>style.visibility</p:attrName>
+                                        </p:attrNameLst>
+                                      </p:cBhvr>
+                                      <p:to>
+                                        <p:strVal val="visible"/>
+                                      </p:to>
+                                    </p:set>
+                                  </p:childTnLst>
+                                </p:cTn>
+                              </p:par>
+                              <p:par>
+                                <p:cTn id="7" presetID="1" presetClass="entr" presetSubtype="0" fill="hold" grpId="0" nodeType="withEffect">
+                                  <p:stCondLst>
+                                    <p:cond delay="0"/>
+                                  </p:stCondLst>
+                                  <p:childTnLst>
+                                    <p:set>
+                                      <p:cBhvr>
+                                        <p:cTn id="8" dur="1" fill="hold">
+                                          <p:stCondLst>
+                                            <p:cond delay="0"/>
+                                          </p:stCondLst>
+                                        </p:cTn>
+                                        <p:tgtEl>
+                                          <p:spTgt spid="3">
+                                            <p:txEl>
+                                              <p:pRg st="1" end="1"/>
+                                            </p:txEl>
+                                          </p:spTgt>
+                                        </p:tgtEl>
+                                        <p:attrNameLst>
+                                          <p:attrName>style.visibility</p:attrName>
+                                        </p:attrNameLst>
+                                      </p:cBhvr>
+                                      <p:to>
+                                        <p:strVal val="visible"/>
+                                      </p:to>
+                                    </p:set>
+                                  </p:childTnLst>
+                                </p:cTn>
+                              </p:par>
+                              <p:par>
+                                <p:cTn id="9" presetID="1" presetClass="entr" presetSubtype="0" fill="hold" grpId="0" nodeType="withEffect">
+                                  <p:stCondLst>
+                                    <p:cond delay="0"/>
+                                  </p:stCondLst>
+                                  <p:childTnLst>
+                                    <p:set>
+                                      <p:cBhvr>
+                                        <p:cTn id="10" dur="1" fill="hold">
+                                          <p:stCondLst>
+                                            <p:cond delay="0"/>
+                                          </p:stCondLst>
+                                        </p:cTn>
+                                        <p:tgtEl>
+                                          <p:spTgt spid="3">
+                                            <p:txEl>
+                                              <p:pRg st="2" end="2"/>
+                                            </p:txEl>
+                                          </p:spTgt>
+                                        </p:tgtEl>
+                                        <p:attrNameLst>
+                                          <p:attrName>style.visibility</p:attrName>
+                                        </p:attrNameLst>
+                                      </p:cBhvr>
+                                      <p:to>
+                                        <p:strVal val="visible"/>
+                                      </p:to>
+                                    </p:set>
+                                  </p:childTnLst>
+                                </p:cTn>
+                              </p:par>
+                            </p:childTnLst>
+                          </p:cTn>
+                        </p:par>
+                      </p:childTnLst>
+                    </p:cTn>
+                  </p:par>
+                  <p:par>
+                    <p:cTn id="11" fill="hold">
+                      <p:stCondLst>
+                        <p:cond delay="indefinite"/>
+                      </p:stCondLst>
+                      <p:childTnLst>
+                        <p:par>
+                          <p:cTn id="12" fill="hold">
+                            <p:stCondLst>
+                              <p:cond delay="0"/>
+                            </p:stCondLst>
+                            <p:childTnLst>
+                              <p:par>
+                                <p:cTn id="13" presetID="1" presetClass="entr" presetSubtype="0" fill="hold" grpId="0" nodeType="clickEffect">
+                                  <p:stCondLst>
+                                    <p:cond delay="0"/>
+                                  </p:stCondLst>
+                                  <p:childTnLst>
+                                    <p:set>
+                                      <p:cBhvr>
+                                        <p:cTn id="14" dur="1" fill="hold">
+                                          <p:stCondLst>
+                                            <p:cond delay="0"/>
+                                          </p:stCondLst>
+                                        </p:cTn>
+                                        <p:tgtEl>
+                                          <p:spTgt spid="3">
+                                            <p:txEl>
+                                              <p:pRg st="3" end="3"/>
+                                            </p:txEl>
+                                          </p:spTgt>
+                                        </p:tgtEl>
+                                        <p:attrNameLst>
+                                          <p:attrName>style.visibility</p:attrName>
+                                        </p:attrNameLst>
+                                      </p:cBhvr>
+                                      <p:to>
+                                        <p:strVal val="visible"/>
+                                      </p:to>
+                                    </p:set>
+                                  </p:childTnLst>
+                                </p:cTn>
+                              </p:par>
+                              <p:par>
+                                <p:cTn id="15" presetID="1" presetClass="entr" presetSubtype="0" fill="hold" grpId="0" nodeType="withEffect">
+                                  <p:stCondLst>
+                                    <p:cond delay="0"/>
+                                  </p:stCondLst>
+                                  <p:childTnLst>
+                                    <p:set>
+                                      <p:cBhvr>
+                                        <p:cTn id="16" dur="1" fill="hold">
+                                          <p:stCondLst>
+                                            <p:cond delay="0"/>
+                                          </p:stCondLst>
+                                        </p:cTn>
+                                        <p:tgtEl>
+                                          <p:spTgt spid="3">
+                                            <p:txEl>
+                                              <p:pRg st="4" end="4"/>
+                                            </p:txEl>
+                                          </p:spTgt>
+                                        </p:tgtEl>
+                                        <p:attrNameLst>
+                                          <p:attrName>style.visibility</p:attrName>
+                                        </p:attrNameLst>
+                                      </p:cBhvr>
+                                      <p:to>
+                                        <p:strVal val="visible"/>
+                                      </p:to>
+                                    </p:set>
+                                  </p:childTnLst>
+                                </p:cTn>
+                              </p:par>
+                              <p:par>
+                                <p:cTn id="17" presetID="1" presetClass="entr" presetSubtype="0" fill="hold" grpId="0" nodeType="withEffect">
+                                  <p:stCondLst>
+                                    <p:cond delay="0"/>
+                                  </p:stCondLst>
+                                  <p:childTnLst>
+                                    <p:set>
+                                      <p:cBhvr>
+                                        <p:cTn id="18" dur="1" fill="hold">
+                                          <p:stCondLst>
+                                            <p:cond delay="0"/>
+                                          </p:stCondLst>
+                                        </p:cTn>
+                                        <p:tgtEl>
+                                          <p:spTgt spid="3">
+                                            <p:txEl>
+                                              <p:pRg st="5" end="5"/>
+                                            </p:txEl>
+                                          </p:spTgt>
+                                        </p:tgtEl>
+                                        <p:attrNameLst>
+                                          <p:attrName>style.visibility</p:attrName>
+                                        </p:attrNameLst>
+                                      </p:cBhvr>
+                                      <p:to>
+                                        <p:strVal val="visible"/>
+                                      </p:to>
+                                    </p:set>
+                                  </p:childTnLst>
+                                </p:cTn>
+                              </p:par>
+                            </p:childTnLst>
+                          </p:cTn>
+                        </p:par>
+                      </p:childTnLst>
+                    </p:cTn>
+                  </p:par>
+                </p:childTnLst>
+              </p:cTn>
+              <p:prevCondLst>
+                <p:cond evt="onPrev" delay="0">
+                  <p:tgtEl>
+                    <p:sldTgt/>
+                  </p:tgtEl>
+                </p:cond>
+              </p:prevCondLst>
+              <p:nextCondLst>
+                <p:cond evt="onNext" delay="0">
+                  <p:tgtEl>
+                    <p:sldTgt/>
+                  </p:tgtEl>
+                </p:cond>
+              </p:nextCondLst>
+            </p:seq>
+          </p:childTnLst>
+        </p:cTn>
+      </p:par>
+    </p:tnLst>
+    <p:bldLst>
+      <p:bldP spid="3" grpId="0" build="p"/>
+    </p:bldLst>
+  </p:timing>
+</p:sld>
+</file>
+
+<file path=ppt/slides/slide32.xml><?xml version="1.0" encoding="utf-8"?>
+<p:sld xmlns:a="http://schemas.openxmlformats.org/drawingml/2006/main" xmlns:r="http://schemas.openxmlformats.org/officeDocument/2006/relationships" xmlns:p="http://schemas.openxmlformats.org/presentationml/2006/main">
+  <p:cSld>
+    <p:spTree>
+      <p:nvGrpSpPr>
+        <p:cNvPr id="1" name=""/>
+        <p:cNvGrpSpPr/>
+        <p:nvPr/>
+      </p:nvGrpSpPr>
+      <p:grpSpPr>
+        <a:xfrm>
+          <a:off x="0" y="0"/>
+          <a:ext cx="0" cy="0"/>
+          <a:chOff x="0" y="0"/>
+          <a:chExt cx="0" cy="0"/>
+        </a:xfrm>
+      </p:grpSpPr>
+      <p:sp>
+        <p:nvSpPr>
+          <p:cNvPr id="2" name="Title 1">
+            <a:extLst>
+              <a:ext uri="{FF2B5EF4-FFF2-40B4-BE49-F238E27FC236}">
                 <a16:creationId xmlns:a16="http://schemas.microsoft.com/office/drawing/2014/main" id="{7306C212-B3B4-8E92-B9B3-B626EF37EBA4}"/>
               </a:ext>
             </a:extLst>
@@ -21888,7 +23626,7 @@
 </p:sld>
 </file>
 
-<file path=ppt/slides/slide32.xml><?xml version="1.0" encoding="utf-8"?>
+<file path=ppt/slides/slide33.xml><?xml version="1.0" encoding="utf-8"?>
 <p:sld xmlns:a="http://schemas.openxmlformats.org/drawingml/2006/main" xmlns:r="http://schemas.openxmlformats.org/officeDocument/2006/relationships" xmlns:p="http://schemas.openxmlformats.org/presentationml/2006/main">
   <p:cSld>
     <p:spTree>
@@ -22998,7 +24736,7 @@
 </p:sld>
 </file>
 
-<file path=ppt/slides/slide33.xml><?xml version="1.0" encoding="utf-8"?>
+<file path=ppt/slides/slide34.xml><?xml version="1.0" encoding="utf-8"?>
 <p:sld xmlns:a="http://schemas.openxmlformats.org/drawingml/2006/main" xmlns:r="http://schemas.openxmlformats.org/officeDocument/2006/relationships" xmlns:p="http://schemas.openxmlformats.org/presentationml/2006/main">
   <p:cSld>
     <p:spTree>
@@ -24651,7 +26389,7 @@
 </p:sld>
 </file>
 
-<file path=ppt/slides/slide34.xml><?xml version="1.0" encoding="utf-8"?>
+<file path=ppt/slides/slide35.xml><?xml version="1.0" encoding="utf-8"?>
 <p:sld xmlns:a="http://schemas.openxmlformats.org/drawingml/2006/main" xmlns:r="http://schemas.openxmlformats.org/officeDocument/2006/relationships" xmlns:p="http://schemas.openxmlformats.org/presentationml/2006/main">
   <p:cSld>
     <p:spTree>
@@ -25092,7 +26830,7 @@
 </p:sld>
 </file>
 
-<file path=ppt/slides/slide35.xml><?xml version="1.0" encoding="utf-8"?>
+<file path=ppt/slides/slide36.xml><?xml version="1.0" encoding="utf-8"?>
 <p:sld xmlns:a="http://schemas.openxmlformats.org/drawingml/2006/main" xmlns:r="http://schemas.openxmlformats.org/officeDocument/2006/relationships" xmlns:p="http://schemas.openxmlformats.org/presentationml/2006/main">
   <p:cSld>
     <p:spTree>
@@ -25939,7 +27677,7 @@
 </p:sld>
 </file>
 
-<file path=ppt/slides/slide36.xml><?xml version="1.0" encoding="utf-8"?>
+<file path=ppt/slides/slide37.xml><?xml version="1.0" encoding="utf-8"?>
 <p:sld xmlns:a="http://schemas.openxmlformats.org/drawingml/2006/main" xmlns:r="http://schemas.openxmlformats.org/officeDocument/2006/relationships" xmlns:p="http://schemas.openxmlformats.org/presentationml/2006/main">
   <p:cSld>
     <p:spTree>
@@ -26767,7 +28505,7 @@
 </p:sld>
 </file>
 
-<file path=ppt/slides/slide37.xml><?xml version="1.0" encoding="utf-8"?>
+<file path=ppt/slides/slide38.xml><?xml version="1.0" encoding="utf-8"?>
 <p:sld xmlns:a="http://schemas.openxmlformats.org/drawingml/2006/main" xmlns:r="http://schemas.openxmlformats.org/officeDocument/2006/relationships" xmlns:p="http://schemas.openxmlformats.org/presentationml/2006/main">
   <p:cSld>
     <p:spTree>
@@ -28122,7 +29860,7 @@
 </p:sld>
 </file>
 
-<file path=ppt/slides/slide38.xml><?xml version="1.0" encoding="utf-8"?>
+<file path=ppt/slides/slide39.xml><?xml version="1.0" encoding="utf-8"?>
 <p:sld xmlns:a="http://schemas.openxmlformats.org/drawingml/2006/main" xmlns:r="http://schemas.openxmlformats.org/officeDocument/2006/relationships" xmlns:p="http://schemas.openxmlformats.org/presentationml/2006/main">
   <p:cSld>
     <p:spTree>
@@ -28229,7 +29967,399 @@
 </p:sld>
 </file>
 
-<file path=ppt/slides/slide39.xml><?xml version="1.0" encoding="utf-8"?>
+<file path=ppt/slides/slide4.xml><?xml version="1.0" encoding="utf-8"?>
+<p:sld xmlns:a="http://schemas.openxmlformats.org/drawingml/2006/main" xmlns:r="http://schemas.openxmlformats.org/officeDocument/2006/relationships" xmlns:p="http://schemas.openxmlformats.org/presentationml/2006/main">
+  <p:cSld>
+    <p:spTree>
+      <p:nvGrpSpPr>
+        <p:cNvPr id="1" name=""/>
+        <p:cNvGrpSpPr/>
+        <p:nvPr/>
+      </p:nvGrpSpPr>
+      <p:grpSpPr>
+        <a:xfrm>
+          <a:off x="0" y="0"/>
+          <a:ext cx="0" cy="0"/>
+          <a:chOff x="0" y="0"/>
+          <a:chExt cx="0" cy="0"/>
+        </a:xfrm>
+      </p:grpSpPr>
+      <p:sp>
+        <p:nvSpPr>
+          <p:cNvPr id="2" name="Title 1">
+            <a:extLst>
+              <a:ext uri="{FF2B5EF4-FFF2-40B4-BE49-F238E27FC236}">
+                <a16:creationId xmlns:a16="http://schemas.microsoft.com/office/drawing/2014/main" id="{2E40FDBA-ADBB-239F-A158-F2CEC1806C5B}"/>
+              </a:ext>
+            </a:extLst>
+          </p:cNvPr>
+          <p:cNvSpPr>
+            <a:spLocks noGrp="1"/>
+          </p:cNvSpPr>
+          <p:nvPr>
+            <p:ph type="title"/>
+          </p:nvPr>
+        </p:nvSpPr>
+        <p:spPr/>
+        <p:txBody>
+          <a:bodyPr/>
+          <a:lstStyle/>
+          <a:p>
+            <a:r>
+              <a:rPr lang="en-US" dirty="0"/>
+              <a:t>What is unsafe code?</a:t>
+            </a:r>
+            <a:br>
+              <a:rPr lang="en-US" dirty="0"/>
+            </a:br>
+            <a:r>
+              <a:rPr lang="en-US" dirty="0"/>
+              <a:t>Mutating the immutable</a:t>
+            </a:r>
+          </a:p>
+        </p:txBody>
+      </p:sp>
+      <p:sp>
+        <p:nvSpPr>
+          <p:cNvPr id="6" name="Rectangle 3">
+            <a:extLst>
+              <a:ext uri="{FF2B5EF4-FFF2-40B4-BE49-F238E27FC236}">
+                <a16:creationId xmlns:a16="http://schemas.microsoft.com/office/drawing/2014/main" id="{18478F97-948F-AF46-3AB7-0D47D90B1085}"/>
+              </a:ext>
+            </a:extLst>
+          </p:cNvPr>
+          <p:cNvSpPr>
+            <a:spLocks noChangeArrowheads="1"/>
+          </p:cNvSpPr>
+          <p:nvPr/>
+        </p:nvSpPr>
+        <p:spPr bwMode="auto">
+          <a:xfrm>
+            <a:off x="1103313" y="2052919"/>
+            <a:ext cx="8946540" cy="4195480"/>
+          </a:xfrm>
+          <a:prstGeom prst="rect">
+            <a:avLst/>
+          </a:prstGeom>
+          <a:solidFill>
+            <a:srgbClr val="FFFFFF"/>
+          </a:solidFill>
+          <a:ln w="15875">
+            <a:solidFill>
+              <a:schemeClr val="accent1"/>
+            </a:solidFill>
+            <a:miter lim="800000"/>
+            <a:headEnd/>
+            <a:tailEnd/>
+          </a:ln>
+          <a:effectLst/>
+          <a:extLst>
+            <a:ext uri="{AF507438-7753-43E0-B8FC-AC1667EBCBE1}">
+              <a14:hiddenEffects xmlns:a14="http://schemas.microsoft.com/office/drawing/2010/main">
+                <a:effectLst>
+                  <a:outerShdw dist="35921" dir="2700000" algn="ctr" rotWithShape="0">
+                    <a:schemeClr val="bg2"/>
+                  </a:outerShdw>
+                </a:effectLst>
+              </a14:hiddenEffects>
+            </a:ext>
+          </a:extLst>
+        </p:spPr>
+        <p:txBody>
+          <a:bodyPr vert="horz" wrap="square" lIns="91440" tIns="45720" rIns="91440" bIns="45720" numCol="1" anchor="t" anchorCtr="0" compatLnSpc="1">
+            <a:prstTxWarp prst="textNoShape">
+              <a:avLst/>
+            </a:prstTxWarp>
+            <a:noAutofit/>
+          </a:bodyPr>
+          <a:lstStyle/>
+          <a:p>
+            <a:pPr marL="0" marR="0" lvl="0" indent="0" algn="l" defTabSz="914400" rtl="0" eaLnBrk="0" fontAlgn="base" latinLnBrk="0" hangingPunct="0">
+              <a:lnSpc>
+                <a:spcPct val="100000"/>
+              </a:lnSpc>
+              <a:spcBef>
+                <a:spcPct val="0"/>
+              </a:spcBef>
+              <a:spcAft>
+                <a:spcPct val="0"/>
+              </a:spcAft>
+              <a:buClrTx/>
+              <a:buSzTx/>
+              <a:buFontTx/>
+              <a:buNone/>
+              <a:tabLst/>
+            </a:pPr>
+            <a:r>
+              <a:rPr kumimoji="0" lang="en-US" altLang="en-US" b="0" i="0" u="none" strike="noStrike" cap="none" normalizeH="0" baseline="0" dirty="0">
+                <a:ln>
+                  <a:noFill/>
+                </a:ln>
+                <a:solidFill>
+                  <a:srgbClr val="0F54D6"/>
+                </a:solidFill>
+                <a:effectLst/>
+                <a:latin typeface="Consolas" panose="020B0609020204030204" pitchFamily="49" charset="0"/>
+              </a:rPr>
+              <a:t>using </a:t>
+            </a:r>
+            <a:r>
+              <a:rPr kumimoji="0" lang="en-US" altLang="en-US" b="0" i="0" u="none" strike="noStrike" cap="none" normalizeH="0" baseline="0" dirty="0" err="1">
+                <a:ln>
+                  <a:noFill/>
+                </a:ln>
+                <a:solidFill>
+                  <a:srgbClr val="6B2FBA"/>
+                </a:solidFill>
+                <a:effectLst/>
+                <a:latin typeface="Consolas" panose="020B0609020204030204" pitchFamily="49" charset="0"/>
+              </a:rPr>
+              <a:t>StringMutation</a:t>
+            </a:r>
+            <a:r>
+              <a:rPr kumimoji="0" lang="en-US" altLang="en-US" b="0" i="0" u="none" strike="noStrike" cap="none" normalizeH="0" baseline="0" dirty="0">
+                <a:ln>
+                  <a:noFill/>
+                </a:ln>
+                <a:solidFill>
+                  <a:srgbClr val="383838"/>
+                </a:solidFill>
+                <a:effectLst/>
+                <a:latin typeface="Consolas" panose="020B0609020204030204" pitchFamily="49" charset="0"/>
+              </a:rPr>
+              <a:t>;</a:t>
+            </a:r>
+            <a:br>
+              <a:rPr kumimoji="0" lang="en-US" altLang="en-US" b="0" i="0" u="none" strike="noStrike" cap="none" normalizeH="0" baseline="0" dirty="0">
+                <a:ln>
+                  <a:noFill/>
+                </a:ln>
+                <a:solidFill>
+                  <a:srgbClr val="383838"/>
+                </a:solidFill>
+                <a:effectLst/>
+                <a:latin typeface="Consolas" panose="020B0609020204030204" pitchFamily="49" charset="0"/>
+              </a:rPr>
+            </a:br>
+            <a:br>
+              <a:rPr kumimoji="0" lang="en-US" altLang="en-US" b="0" i="0" u="none" strike="noStrike" cap="none" normalizeH="0" baseline="0" dirty="0">
+                <a:ln>
+                  <a:noFill/>
+                </a:ln>
+                <a:solidFill>
+                  <a:srgbClr val="383838"/>
+                </a:solidFill>
+                <a:effectLst/>
+                <a:latin typeface="Consolas" panose="020B0609020204030204" pitchFamily="49" charset="0"/>
+              </a:rPr>
+            </a:br>
+            <a:r>
+              <a:rPr kumimoji="0" lang="en-US" altLang="en-US" b="0" i="0" u="none" strike="noStrike" cap="none" normalizeH="0" baseline="0" dirty="0">
+                <a:ln>
+                  <a:noFill/>
+                </a:ln>
+                <a:solidFill>
+                  <a:srgbClr val="0F54D6"/>
+                </a:solidFill>
+                <a:effectLst/>
+                <a:latin typeface="Consolas" panose="020B0609020204030204" pitchFamily="49" charset="0"/>
+              </a:rPr>
+              <a:t>string </a:t>
+            </a:r>
+            <a:r>
+              <a:rPr kumimoji="0" lang="en-US" altLang="en-US" b="0" i="0" u="none" strike="noStrike" cap="none" normalizeH="0" baseline="0" dirty="0">
+                <a:ln>
+                  <a:noFill/>
+                </a:ln>
+                <a:solidFill>
+                  <a:srgbClr val="383838"/>
+                </a:solidFill>
+                <a:effectLst/>
+                <a:latin typeface="Consolas" panose="020B0609020204030204" pitchFamily="49" charset="0"/>
+              </a:rPr>
+              <a:t>s = </a:t>
+            </a:r>
+            <a:r>
+              <a:rPr kumimoji="0" lang="en-US" altLang="en-US" b="0" i="0" u="none" strike="noStrike" cap="none" normalizeH="0" baseline="0" dirty="0">
+                <a:ln>
+                  <a:noFill/>
+                </a:ln>
+                <a:solidFill>
+                  <a:srgbClr val="8C6C41"/>
+                </a:solidFill>
+                <a:effectLst/>
+                <a:latin typeface="Consolas" panose="020B0609020204030204" pitchFamily="49" charset="0"/>
+              </a:rPr>
+              <a:t>"Hello, World!"</a:t>
+            </a:r>
+            <a:r>
+              <a:rPr kumimoji="0" lang="en-US" altLang="en-US" b="0" i="0" u="none" strike="noStrike" cap="none" normalizeH="0" baseline="0" dirty="0">
+                <a:ln>
+                  <a:noFill/>
+                </a:ln>
+                <a:solidFill>
+                  <a:srgbClr val="383838"/>
+                </a:solidFill>
+                <a:effectLst/>
+                <a:latin typeface="Consolas" panose="020B0609020204030204" pitchFamily="49" charset="0"/>
+              </a:rPr>
+              <a:t>;</a:t>
+            </a:r>
+            <a:br>
+              <a:rPr kumimoji="0" lang="en-US" altLang="en-US" b="0" i="0" u="none" strike="noStrike" cap="none" normalizeH="0" baseline="0" dirty="0">
+                <a:ln>
+                  <a:noFill/>
+                </a:ln>
+                <a:solidFill>
+                  <a:srgbClr val="383838"/>
+                </a:solidFill>
+                <a:effectLst/>
+                <a:latin typeface="Consolas" panose="020B0609020204030204" pitchFamily="49" charset="0"/>
+              </a:rPr>
+            </a:br>
+            <a:r>
+              <a:rPr kumimoji="0" lang="en-US" altLang="en-US" b="0" i="0" u="none" strike="noStrike" cap="none" normalizeH="0" baseline="0" dirty="0" err="1">
+                <a:ln>
+                  <a:noFill/>
+                </a:ln>
+                <a:solidFill>
+                  <a:srgbClr val="383838"/>
+                </a:solidFill>
+                <a:effectLst/>
+                <a:latin typeface="Consolas" panose="020B0609020204030204" pitchFamily="49" charset="0"/>
+              </a:rPr>
+              <a:t>s.</a:t>
+            </a:r>
+            <a:r>
+              <a:rPr kumimoji="0" lang="en-US" altLang="en-US" b="0" i="0" u="none" strike="noStrike" cap="none" normalizeH="0" baseline="0" dirty="0" err="1">
+                <a:ln>
+                  <a:noFill/>
+                </a:ln>
+                <a:solidFill>
+                  <a:srgbClr val="00855F"/>
+                </a:solidFill>
+                <a:effectLst/>
+                <a:latin typeface="Consolas" panose="020B0609020204030204" pitchFamily="49" charset="0"/>
+              </a:rPr>
+              <a:t>AsciiToUpper</a:t>
+            </a:r>
+            <a:r>
+              <a:rPr kumimoji="0" lang="en-US" altLang="en-US" b="0" i="0" u="none" strike="noStrike" cap="none" normalizeH="0" baseline="0" dirty="0">
+                <a:ln>
+                  <a:noFill/>
+                </a:ln>
+                <a:solidFill>
+                  <a:srgbClr val="383838"/>
+                </a:solidFill>
+                <a:effectLst/>
+                <a:latin typeface="Consolas" panose="020B0609020204030204" pitchFamily="49" charset="0"/>
+              </a:rPr>
+              <a:t>();</a:t>
+            </a:r>
+            <a:br>
+              <a:rPr kumimoji="0" lang="en-US" altLang="en-US" b="0" i="0" u="none" strike="noStrike" cap="none" normalizeH="0" baseline="0" dirty="0">
+                <a:ln>
+                  <a:noFill/>
+                </a:ln>
+                <a:solidFill>
+                  <a:srgbClr val="383838"/>
+                </a:solidFill>
+                <a:effectLst/>
+                <a:latin typeface="Consolas" panose="020B0609020204030204" pitchFamily="49" charset="0"/>
+              </a:rPr>
+            </a:br>
+            <a:r>
+              <a:rPr kumimoji="0" lang="en-US" altLang="en-US" b="0" i="0" u="none" strike="noStrike" cap="none" normalizeH="0" baseline="0" dirty="0" err="1">
+                <a:ln>
+                  <a:noFill/>
+                </a:ln>
+                <a:solidFill>
+                  <a:srgbClr val="6B2FBA"/>
+                </a:solidFill>
+                <a:effectLst/>
+                <a:latin typeface="Consolas" panose="020B0609020204030204" pitchFamily="49" charset="0"/>
+              </a:rPr>
+              <a:t>Console</a:t>
+            </a:r>
+            <a:r>
+              <a:rPr kumimoji="0" lang="en-US" altLang="en-US" b="0" i="0" u="none" strike="noStrike" cap="none" normalizeH="0" baseline="0" dirty="0" err="1">
+                <a:ln>
+                  <a:noFill/>
+                </a:ln>
+                <a:solidFill>
+                  <a:srgbClr val="383838"/>
+                </a:solidFill>
+                <a:effectLst/>
+                <a:latin typeface="Consolas" panose="020B0609020204030204" pitchFamily="49" charset="0"/>
+              </a:rPr>
+              <a:t>.</a:t>
+            </a:r>
+            <a:r>
+              <a:rPr kumimoji="0" lang="en-US" altLang="en-US" b="0" i="0" u="none" strike="noStrike" cap="none" normalizeH="0" baseline="0" dirty="0" err="1">
+                <a:ln>
+                  <a:noFill/>
+                </a:ln>
+                <a:solidFill>
+                  <a:srgbClr val="00855F"/>
+                </a:solidFill>
+                <a:effectLst/>
+                <a:latin typeface="Consolas" panose="020B0609020204030204" pitchFamily="49" charset="0"/>
+              </a:rPr>
+              <a:t>WriteLine</a:t>
+            </a:r>
+            <a:r>
+              <a:rPr kumimoji="0" lang="en-US" altLang="en-US" b="0" i="0" u="none" strike="noStrike" cap="none" normalizeH="0" baseline="0" dirty="0">
+                <a:ln>
+                  <a:noFill/>
+                </a:ln>
+                <a:solidFill>
+                  <a:srgbClr val="383838"/>
+                </a:solidFill>
+                <a:effectLst/>
+                <a:latin typeface="Consolas" panose="020B0609020204030204" pitchFamily="49" charset="0"/>
+              </a:rPr>
+              <a:t>(s); </a:t>
+            </a:r>
+            <a:r>
+              <a:rPr kumimoji="0" lang="en-US" altLang="en-US" b="0" i="1" u="none" strike="noStrike" cap="none" normalizeH="0" baseline="0" dirty="0">
+                <a:ln>
+                  <a:noFill/>
+                </a:ln>
+                <a:solidFill>
+                  <a:srgbClr val="248700"/>
+                </a:solidFill>
+                <a:effectLst/>
+                <a:latin typeface="Consolas" panose="020B0609020204030204" pitchFamily="49" charset="0"/>
+              </a:rPr>
+              <a:t>// prints "HELLO, WORLD!"</a:t>
+            </a:r>
+            <a:endParaRPr kumimoji="0" lang="en-US" altLang="en-US" b="0" i="0" u="none" strike="noStrike" cap="none" normalizeH="0" baseline="0" dirty="0">
+              <a:ln>
+                <a:noFill/>
+              </a:ln>
+              <a:solidFill>
+                <a:schemeClr val="tx1"/>
+              </a:solidFill>
+              <a:effectLst/>
+              <a:latin typeface="Consolas" panose="020B0609020204030204" pitchFamily="49" charset="0"/>
+            </a:endParaRPr>
+          </a:p>
+        </p:txBody>
+      </p:sp>
+    </p:spTree>
+    <p:extLst>
+      <p:ext uri="{BB962C8B-B14F-4D97-AF65-F5344CB8AC3E}">
+        <p14:creationId xmlns:p14="http://schemas.microsoft.com/office/powerpoint/2010/main" val="2813357318"/>
+      </p:ext>
+    </p:extLst>
+  </p:cSld>
+  <p:clrMapOvr>
+    <a:masterClrMapping/>
+  </p:clrMapOvr>
+</p:sld>
+</file>
+
+<file path=ppt/slides/slide40.xml><?xml version="1.0" encoding="utf-8"?>
 <p:sld xmlns:a="http://schemas.openxmlformats.org/drawingml/2006/main" xmlns:r="http://schemas.openxmlformats.org/officeDocument/2006/relationships" xmlns:p="http://schemas.openxmlformats.org/presentationml/2006/main">
   <p:cSld>
     <p:spTree>
@@ -30103,399 +32233,7 @@
 </p:sld>
 </file>
 
-<file path=ppt/slides/slide4.xml><?xml version="1.0" encoding="utf-8"?>
-<p:sld xmlns:a="http://schemas.openxmlformats.org/drawingml/2006/main" xmlns:r="http://schemas.openxmlformats.org/officeDocument/2006/relationships" xmlns:p="http://schemas.openxmlformats.org/presentationml/2006/main">
-  <p:cSld>
-    <p:spTree>
-      <p:nvGrpSpPr>
-        <p:cNvPr id="1" name=""/>
-        <p:cNvGrpSpPr/>
-        <p:nvPr/>
-      </p:nvGrpSpPr>
-      <p:grpSpPr>
-        <a:xfrm>
-          <a:off x="0" y="0"/>
-          <a:ext cx="0" cy="0"/>
-          <a:chOff x="0" y="0"/>
-          <a:chExt cx="0" cy="0"/>
-        </a:xfrm>
-      </p:grpSpPr>
-      <p:sp>
-        <p:nvSpPr>
-          <p:cNvPr id="2" name="Title 1">
-            <a:extLst>
-              <a:ext uri="{FF2B5EF4-FFF2-40B4-BE49-F238E27FC236}">
-                <a16:creationId xmlns:a16="http://schemas.microsoft.com/office/drawing/2014/main" id="{2E40FDBA-ADBB-239F-A158-F2CEC1806C5B}"/>
-              </a:ext>
-            </a:extLst>
-          </p:cNvPr>
-          <p:cNvSpPr>
-            <a:spLocks noGrp="1"/>
-          </p:cNvSpPr>
-          <p:nvPr>
-            <p:ph type="title"/>
-          </p:nvPr>
-        </p:nvSpPr>
-        <p:spPr/>
-        <p:txBody>
-          <a:bodyPr/>
-          <a:lstStyle/>
-          <a:p>
-            <a:r>
-              <a:rPr lang="en-US" dirty="0"/>
-              <a:t>What is unsafe code?</a:t>
-            </a:r>
-            <a:br>
-              <a:rPr lang="en-US" dirty="0"/>
-            </a:br>
-            <a:r>
-              <a:rPr lang="en-US" dirty="0"/>
-              <a:t>Mutating the immutable</a:t>
-            </a:r>
-          </a:p>
-        </p:txBody>
-      </p:sp>
-      <p:sp>
-        <p:nvSpPr>
-          <p:cNvPr id="6" name="Rectangle 3">
-            <a:extLst>
-              <a:ext uri="{FF2B5EF4-FFF2-40B4-BE49-F238E27FC236}">
-                <a16:creationId xmlns:a16="http://schemas.microsoft.com/office/drawing/2014/main" id="{18478F97-948F-AF46-3AB7-0D47D90B1085}"/>
-              </a:ext>
-            </a:extLst>
-          </p:cNvPr>
-          <p:cNvSpPr>
-            <a:spLocks noChangeArrowheads="1"/>
-          </p:cNvSpPr>
-          <p:nvPr/>
-        </p:nvSpPr>
-        <p:spPr bwMode="auto">
-          <a:xfrm>
-            <a:off x="1103313" y="2052919"/>
-            <a:ext cx="8946540" cy="4195480"/>
-          </a:xfrm>
-          <a:prstGeom prst="rect">
-            <a:avLst/>
-          </a:prstGeom>
-          <a:solidFill>
-            <a:srgbClr val="FFFFFF"/>
-          </a:solidFill>
-          <a:ln w="15875">
-            <a:solidFill>
-              <a:schemeClr val="accent1"/>
-            </a:solidFill>
-            <a:miter lim="800000"/>
-            <a:headEnd/>
-            <a:tailEnd/>
-          </a:ln>
-          <a:effectLst/>
-          <a:extLst>
-            <a:ext uri="{AF507438-7753-43E0-B8FC-AC1667EBCBE1}">
-              <a14:hiddenEffects xmlns:a14="http://schemas.microsoft.com/office/drawing/2010/main">
-                <a:effectLst>
-                  <a:outerShdw dist="35921" dir="2700000" algn="ctr" rotWithShape="0">
-                    <a:schemeClr val="bg2"/>
-                  </a:outerShdw>
-                </a:effectLst>
-              </a14:hiddenEffects>
-            </a:ext>
-          </a:extLst>
-        </p:spPr>
-        <p:txBody>
-          <a:bodyPr vert="horz" wrap="square" lIns="91440" tIns="45720" rIns="91440" bIns="45720" numCol="1" anchor="t" anchorCtr="0" compatLnSpc="1">
-            <a:prstTxWarp prst="textNoShape">
-              <a:avLst/>
-            </a:prstTxWarp>
-            <a:noAutofit/>
-          </a:bodyPr>
-          <a:lstStyle/>
-          <a:p>
-            <a:pPr marL="0" marR="0" lvl="0" indent="0" algn="l" defTabSz="914400" rtl="0" eaLnBrk="0" fontAlgn="base" latinLnBrk="0" hangingPunct="0">
-              <a:lnSpc>
-                <a:spcPct val="100000"/>
-              </a:lnSpc>
-              <a:spcBef>
-                <a:spcPct val="0"/>
-              </a:spcBef>
-              <a:spcAft>
-                <a:spcPct val="0"/>
-              </a:spcAft>
-              <a:buClrTx/>
-              <a:buSzTx/>
-              <a:buFontTx/>
-              <a:buNone/>
-              <a:tabLst/>
-            </a:pPr>
-            <a:r>
-              <a:rPr kumimoji="0" lang="en-US" altLang="en-US" b="0" i="0" u="none" strike="noStrike" cap="none" normalizeH="0" baseline="0" dirty="0">
-                <a:ln>
-                  <a:noFill/>
-                </a:ln>
-                <a:solidFill>
-                  <a:srgbClr val="0F54D6"/>
-                </a:solidFill>
-                <a:effectLst/>
-                <a:latin typeface="Consolas" panose="020B0609020204030204" pitchFamily="49" charset="0"/>
-              </a:rPr>
-              <a:t>using </a:t>
-            </a:r>
-            <a:r>
-              <a:rPr kumimoji="0" lang="en-US" altLang="en-US" b="0" i="0" u="none" strike="noStrike" cap="none" normalizeH="0" baseline="0" dirty="0" err="1">
-                <a:ln>
-                  <a:noFill/>
-                </a:ln>
-                <a:solidFill>
-                  <a:srgbClr val="6B2FBA"/>
-                </a:solidFill>
-                <a:effectLst/>
-                <a:latin typeface="Consolas" panose="020B0609020204030204" pitchFamily="49" charset="0"/>
-              </a:rPr>
-              <a:t>StringMutation</a:t>
-            </a:r>
-            <a:r>
-              <a:rPr kumimoji="0" lang="en-US" altLang="en-US" b="0" i="0" u="none" strike="noStrike" cap="none" normalizeH="0" baseline="0" dirty="0">
-                <a:ln>
-                  <a:noFill/>
-                </a:ln>
-                <a:solidFill>
-                  <a:srgbClr val="383838"/>
-                </a:solidFill>
-                <a:effectLst/>
-                <a:latin typeface="Consolas" panose="020B0609020204030204" pitchFamily="49" charset="0"/>
-              </a:rPr>
-              <a:t>;</a:t>
-            </a:r>
-            <a:br>
-              <a:rPr kumimoji="0" lang="en-US" altLang="en-US" b="0" i="0" u="none" strike="noStrike" cap="none" normalizeH="0" baseline="0" dirty="0">
-                <a:ln>
-                  <a:noFill/>
-                </a:ln>
-                <a:solidFill>
-                  <a:srgbClr val="383838"/>
-                </a:solidFill>
-                <a:effectLst/>
-                <a:latin typeface="Consolas" panose="020B0609020204030204" pitchFamily="49" charset="0"/>
-              </a:rPr>
-            </a:br>
-            <a:br>
-              <a:rPr kumimoji="0" lang="en-US" altLang="en-US" b="0" i="0" u="none" strike="noStrike" cap="none" normalizeH="0" baseline="0" dirty="0">
-                <a:ln>
-                  <a:noFill/>
-                </a:ln>
-                <a:solidFill>
-                  <a:srgbClr val="383838"/>
-                </a:solidFill>
-                <a:effectLst/>
-                <a:latin typeface="Consolas" panose="020B0609020204030204" pitchFamily="49" charset="0"/>
-              </a:rPr>
-            </a:br>
-            <a:r>
-              <a:rPr kumimoji="0" lang="en-US" altLang="en-US" b="0" i="0" u="none" strike="noStrike" cap="none" normalizeH="0" baseline="0" dirty="0">
-                <a:ln>
-                  <a:noFill/>
-                </a:ln>
-                <a:solidFill>
-                  <a:srgbClr val="0F54D6"/>
-                </a:solidFill>
-                <a:effectLst/>
-                <a:latin typeface="Consolas" panose="020B0609020204030204" pitchFamily="49" charset="0"/>
-              </a:rPr>
-              <a:t>string </a:t>
-            </a:r>
-            <a:r>
-              <a:rPr kumimoji="0" lang="en-US" altLang="en-US" b="0" i="0" u="none" strike="noStrike" cap="none" normalizeH="0" baseline="0" dirty="0">
-                <a:ln>
-                  <a:noFill/>
-                </a:ln>
-                <a:solidFill>
-                  <a:srgbClr val="383838"/>
-                </a:solidFill>
-                <a:effectLst/>
-                <a:latin typeface="Consolas" panose="020B0609020204030204" pitchFamily="49" charset="0"/>
-              </a:rPr>
-              <a:t>s = </a:t>
-            </a:r>
-            <a:r>
-              <a:rPr kumimoji="0" lang="en-US" altLang="en-US" b="0" i="0" u="none" strike="noStrike" cap="none" normalizeH="0" baseline="0" dirty="0">
-                <a:ln>
-                  <a:noFill/>
-                </a:ln>
-                <a:solidFill>
-                  <a:srgbClr val="8C6C41"/>
-                </a:solidFill>
-                <a:effectLst/>
-                <a:latin typeface="Consolas" panose="020B0609020204030204" pitchFamily="49" charset="0"/>
-              </a:rPr>
-              <a:t>"Hello, World!"</a:t>
-            </a:r>
-            <a:r>
-              <a:rPr kumimoji="0" lang="en-US" altLang="en-US" b="0" i="0" u="none" strike="noStrike" cap="none" normalizeH="0" baseline="0" dirty="0">
-                <a:ln>
-                  <a:noFill/>
-                </a:ln>
-                <a:solidFill>
-                  <a:srgbClr val="383838"/>
-                </a:solidFill>
-                <a:effectLst/>
-                <a:latin typeface="Consolas" panose="020B0609020204030204" pitchFamily="49" charset="0"/>
-              </a:rPr>
-              <a:t>;</a:t>
-            </a:r>
-            <a:br>
-              <a:rPr kumimoji="0" lang="en-US" altLang="en-US" b="0" i="0" u="none" strike="noStrike" cap="none" normalizeH="0" baseline="0" dirty="0">
-                <a:ln>
-                  <a:noFill/>
-                </a:ln>
-                <a:solidFill>
-                  <a:srgbClr val="383838"/>
-                </a:solidFill>
-                <a:effectLst/>
-                <a:latin typeface="Consolas" panose="020B0609020204030204" pitchFamily="49" charset="0"/>
-              </a:rPr>
-            </a:br>
-            <a:r>
-              <a:rPr kumimoji="0" lang="en-US" altLang="en-US" b="0" i="0" u="none" strike="noStrike" cap="none" normalizeH="0" baseline="0" dirty="0" err="1">
-                <a:ln>
-                  <a:noFill/>
-                </a:ln>
-                <a:solidFill>
-                  <a:srgbClr val="383838"/>
-                </a:solidFill>
-                <a:effectLst/>
-                <a:latin typeface="Consolas" panose="020B0609020204030204" pitchFamily="49" charset="0"/>
-              </a:rPr>
-              <a:t>s.</a:t>
-            </a:r>
-            <a:r>
-              <a:rPr kumimoji="0" lang="en-US" altLang="en-US" b="0" i="0" u="none" strike="noStrike" cap="none" normalizeH="0" baseline="0" dirty="0" err="1">
-                <a:ln>
-                  <a:noFill/>
-                </a:ln>
-                <a:solidFill>
-                  <a:srgbClr val="00855F"/>
-                </a:solidFill>
-                <a:effectLst/>
-                <a:latin typeface="Consolas" panose="020B0609020204030204" pitchFamily="49" charset="0"/>
-              </a:rPr>
-              <a:t>AsciiToUpper</a:t>
-            </a:r>
-            <a:r>
-              <a:rPr kumimoji="0" lang="en-US" altLang="en-US" b="0" i="0" u="none" strike="noStrike" cap="none" normalizeH="0" baseline="0" dirty="0">
-                <a:ln>
-                  <a:noFill/>
-                </a:ln>
-                <a:solidFill>
-                  <a:srgbClr val="383838"/>
-                </a:solidFill>
-                <a:effectLst/>
-                <a:latin typeface="Consolas" panose="020B0609020204030204" pitchFamily="49" charset="0"/>
-              </a:rPr>
-              <a:t>();</a:t>
-            </a:r>
-            <a:br>
-              <a:rPr kumimoji="0" lang="en-US" altLang="en-US" b="0" i="0" u="none" strike="noStrike" cap="none" normalizeH="0" baseline="0" dirty="0">
-                <a:ln>
-                  <a:noFill/>
-                </a:ln>
-                <a:solidFill>
-                  <a:srgbClr val="383838"/>
-                </a:solidFill>
-                <a:effectLst/>
-                <a:latin typeface="Consolas" panose="020B0609020204030204" pitchFamily="49" charset="0"/>
-              </a:rPr>
-            </a:br>
-            <a:r>
-              <a:rPr kumimoji="0" lang="en-US" altLang="en-US" b="0" i="0" u="none" strike="noStrike" cap="none" normalizeH="0" baseline="0" dirty="0" err="1">
-                <a:ln>
-                  <a:noFill/>
-                </a:ln>
-                <a:solidFill>
-                  <a:srgbClr val="6B2FBA"/>
-                </a:solidFill>
-                <a:effectLst/>
-                <a:latin typeface="Consolas" panose="020B0609020204030204" pitchFamily="49" charset="0"/>
-              </a:rPr>
-              <a:t>Console</a:t>
-            </a:r>
-            <a:r>
-              <a:rPr kumimoji="0" lang="en-US" altLang="en-US" b="0" i="0" u="none" strike="noStrike" cap="none" normalizeH="0" baseline="0" dirty="0" err="1">
-                <a:ln>
-                  <a:noFill/>
-                </a:ln>
-                <a:solidFill>
-                  <a:srgbClr val="383838"/>
-                </a:solidFill>
-                <a:effectLst/>
-                <a:latin typeface="Consolas" panose="020B0609020204030204" pitchFamily="49" charset="0"/>
-              </a:rPr>
-              <a:t>.</a:t>
-            </a:r>
-            <a:r>
-              <a:rPr kumimoji="0" lang="en-US" altLang="en-US" b="0" i="0" u="none" strike="noStrike" cap="none" normalizeH="0" baseline="0" dirty="0" err="1">
-                <a:ln>
-                  <a:noFill/>
-                </a:ln>
-                <a:solidFill>
-                  <a:srgbClr val="00855F"/>
-                </a:solidFill>
-                <a:effectLst/>
-                <a:latin typeface="Consolas" panose="020B0609020204030204" pitchFamily="49" charset="0"/>
-              </a:rPr>
-              <a:t>WriteLine</a:t>
-            </a:r>
-            <a:r>
-              <a:rPr kumimoji="0" lang="en-US" altLang="en-US" b="0" i="0" u="none" strike="noStrike" cap="none" normalizeH="0" baseline="0" dirty="0">
-                <a:ln>
-                  <a:noFill/>
-                </a:ln>
-                <a:solidFill>
-                  <a:srgbClr val="383838"/>
-                </a:solidFill>
-                <a:effectLst/>
-                <a:latin typeface="Consolas" panose="020B0609020204030204" pitchFamily="49" charset="0"/>
-              </a:rPr>
-              <a:t>(s); </a:t>
-            </a:r>
-            <a:r>
-              <a:rPr kumimoji="0" lang="en-US" altLang="en-US" b="0" i="1" u="none" strike="noStrike" cap="none" normalizeH="0" baseline="0" dirty="0">
-                <a:ln>
-                  <a:noFill/>
-                </a:ln>
-                <a:solidFill>
-                  <a:srgbClr val="248700"/>
-                </a:solidFill>
-                <a:effectLst/>
-                <a:latin typeface="Consolas" panose="020B0609020204030204" pitchFamily="49" charset="0"/>
-              </a:rPr>
-              <a:t>// prints "HELLO, WORLD!"</a:t>
-            </a:r>
-            <a:endParaRPr kumimoji="0" lang="en-US" altLang="en-US" b="0" i="0" u="none" strike="noStrike" cap="none" normalizeH="0" baseline="0" dirty="0">
-              <a:ln>
-                <a:noFill/>
-              </a:ln>
-              <a:solidFill>
-                <a:schemeClr val="tx1"/>
-              </a:solidFill>
-              <a:effectLst/>
-              <a:latin typeface="Consolas" panose="020B0609020204030204" pitchFamily="49" charset="0"/>
-            </a:endParaRPr>
-          </a:p>
-        </p:txBody>
-      </p:sp>
-    </p:spTree>
-    <p:extLst>
-      <p:ext uri="{BB962C8B-B14F-4D97-AF65-F5344CB8AC3E}">
-        <p14:creationId xmlns:p14="http://schemas.microsoft.com/office/powerpoint/2010/main" val="2813357318"/>
-      </p:ext>
-    </p:extLst>
-  </p:cSld>
-  <p:clrMapOvr>
-    <a:masterClrMapping/>
-  </p:clrMapOvr>
-</p:sld>
-</file>
-
-<file path=ppt/slides/slide40.xml><?xml version="1.0" encoding="utf-8"?>
+<file path=ppt/slides/slide41.xml><?xml version="1.0" encoding="utf-8"?>
 <p:sld xmlns:a="http://schemas.openxmlformats.org/drawingml/2006/main" xmlns:r="http://schemas.openxmlformats.org/officeDocument/2006/relationships" xmlns:p="http://schemas.openxmlformats.org/presentationml/2006/main">
   <p:cSld>
     <p:spTree>
@@ -31200,7 +32938,7 @@
 </p:sld>
 </file>
 
-<file path=ppt/slides/slide41.xml><?xml version="1.0" encoding="utf-8"?>
+<file path=ppt/slides/slide42.xml><?xml version="1.0" encoding="utf-8"?>
 <p:sld xmlns:a="http://schemas.openxmlformats.org/drawingml/2006/main" xmlns:r="http://schemas.openxmlformats.org/officeDocument/2006/relationships" xmlns:p="http://schemas.openxmlformats.org/presentationml/2006/main">
   <p:cSld>
     <p:spTree>
@@ -32653,7 +34391,7 @@
 </p:sld>
 </file>
 
-<file path=ppt/slides/slide42.xml><?xml version="1.0" encoding="utf-8"?>
+<file path=ppt/slides/slide43.xml><?xml version="1.0" encoding="utf-8"?>
 <p:sld xmlns:a="http://schemas.openxmlformats.org/drawingml/2006/main" xmlns:r="http://schemas.openxmlformats.org/officeDocument/2006/relationships" xmlns:p="http://schemas.openxmlformats.org/presentationml/2006/main">
   <p:cSld>
     <p:spTree>
@@ -33415,7 +35153,7 @@
 </p:sld>
 </file>
 
-<file path=ppt/slides/slide43.xml><?xml version="1.0" encoding="utf-8"?>
+<file path=ppt/slides/slide44.xml><?xml version="1.0" encoding="utf-8"?>
 <p:sld xmlns:a="http://schemas.openxmlformats.org/drawingml/2006/main" xmlns:r="http://schemas.openxmlformats.org/officeDocument/2006/relationships" xmlns:p="http://schemas.openxmlformats.org/presentationml/2006/main">
   <p:cSld>
     <p:spTree>
@@ -34092,7 +35830,7 @@
 </p:sld>
 </file>
 
-<file path=ppt/slides/slide44.xml><?xml version="1.0" encoding="utf-8"?>
+<file path=ppt/slides/slide45.xml><?xml version="1.0" encoding="utf-8"?>
 <p:sld xmlns:a="http://schemas.openxmlformats.org/drawingml/2006/main" xmlns:r="http://schemas.openxmlformats.org/officeDocument/2006/relationships" xmlns:p="http://schemas.openxmlformats.org/presentationml/2006/main">
   <p:cSld>
     <p:spTree>
@@ -35163,7 +36901,7 @@
 </p:sld>
 </file>
 
-<file path=ppt/slides/slide45.xml><?xml version="1.0" encoding="utf-8"?>
+<file path=ppt/slides/slide46.xml><?xml version="1.0" encoding="utf-8"?>
 <p:sld xmlns:a="http://schemas.openxmlformats.org/drawingml/2006/main" xmlns:r="http://schemas.openxmlformats.org/officeDocument/2006/relationships" xmlns:p="http://schemas.openxmlformats.org/presentationml/2006/main">
   <p:cSld>
     <p:spTree>
@@ -36138,7 +37876,7 @@
 </p:sld>
 </file>
 
-<file path=ppt/slides/slide46.xml><?xml version="1.0" encoding="utf-8"?>
+<file path=ppt/slides/slide47.xml><?xml version="1.0" encoding="utf-8"?>
 <p:sld xmlns:a="http://schemas.openxmlformats.org/drawingml/2006/main" xmlns:r="http://schemas.openxmlformats.org/officeDocument/2006/relationships" xmlns:p="http://schemas.openxmlformats.org/presentationml/2006/main">
   <p:cSld>
     <p:spTree>
@@ -37110,7 +38848,7 @@
 </p:sld>
 </file>
 
-<file path=ppt/slides/slide47.xml><?xml version="1.0" encoding="utf-8"?>
+<file path=ppt/slides/slide48.xml><?xml version="1.0" encoding="utf-8"?>
 <p:sld xmlns:a="http://schemas.openxmlformats.org/drawingml/2006/main" xmlns:r="http://schemas.openxmlformats.org/officeDocument/2006/relationships" xmlns:p="http://schemas.openxmlformats.org/presentationml/2006/main">
   <p:cSld>
     <p:spTree>
@@ -38052,7 +39790,7 @@
 </p:sld>
 </file>
 
-<file path=ppt/slides/slide48.xml><?xml version="1.0" encoding="utf-8"?>
+<file path=ppt/slides/slide49.xml><?xml version="1.0" encoding="utf-8"?>
 <p:sld xmlns:a="http://schemas.openxmlformats.org/drawingml/2006/main" xmlns:r="http://schemas.openxmlformats.org/officeDocument/2006/relationships" xmlns:p="http://schemas.openxmlformats.org/presentationml/2006/main">
   <p:cSld>
     <p:spTree>
@@ -39827,113 +41565,6 @@
     <p:extLst>
       <p:ext uri="{BB962C8B-B14F-4D97-AF65-F5344CB8AC3E}">
         <p14:creationId xmlns:p14="http://schemas.microsoft.com/office/powerpoint/2010/main" val="927931644"/>
-      </p:ext>
-    </p:extLst>
-  </p:cSld>
-  <p:clrMapOvr>
-    <a:masterClrMapping/>
-  </p:clrMapOvr>
-</p:sld>
-</file>
-
-<file path=ppt/slides/slide49.xml><?xml version="1.0" encoding="utf-8"?>
-<p:sld xmlns:a="http://schemas.openxmlformats.org/drawingml/2006/main" xmlns:r="http://schemas.openxmlformats.org/officeDocument/2006/relationships" xmlns:p="http://schemas.openxmlformats.org/presentationml/2006/main">
-  <p:cSld>
-    <p:spTree>
-      <p:nvGrpSpPr>
-        <p:cNvPr id="1" name=""/>
-        <p:cNvGrpSpPr/>
-        <p:nvPr/>
-      </p:nvGrpSpPr>
-      <p:grpSpPr>
-        <a:xfrm>
-          <a:off x="0" y="0"/>
-          <a:ext cx="0" cy="0"/>
-          <a:chOff x="0" y="0"/>
-          <a:chExt cx="0" cy="0"/>
-        </a:xfrm>
-      </p:grpSpPr>
-      <p:sp>
-        <p:nvSpPr>
-          <p:cNvPr id="2" name="Title 1">
-            <a:extLst>
-              <a:ext uri="{FF2B5EF4-FFF2-40B4-BE49-F238E27FC236}">
-                <a16:creationId xmlns:a16="http://schemas.microsoft.com/office/drawing/2014/main" id="{7306C212-B3B4-8E92-B9B3-B626EF37EBA4}"/>
-              </a:ext>
-            </a:extLst>
-          </p:cNvPr>
-          <p:cNvSpPr txBox="1">
-            <a:spLocks noGrp="1"/>
-          </p:cNvSpPr>
-          <p:nvPr>
-            <p:ph type="title" idx="4294967295"/>
-          </p:nvPr>
-        </p:nvSpPr>
-        <p:spPr>
-          <a:xfrm>
-            <a:off x="1061794" y="2828836"/>
-            <a:ext cx="10068412" cy="1200329"/>
-          </a:xfrm>
-          <a:prstGeom prst="rect">
-            <a:avLst/>
-          </a:prstGeom>
-          <a:noFill/>
-          <a:ln>
-            <a:noFill/>
-            <a:prstDash/>
-          </a:ln>
-          <a:effectLst/>
-        </p:spPr>
-        <p:txBody>
-          <a:bodyPr rot="0" spcFirstLastPara="0" vertOverflow="overflow" horzOverflow="overflow" vert="horz" wrap="square" lIns="91440" tIns="45720" rIns="91440" bIns="45720" numCol="1" spcCol="0" rtlCol="0" fromWordArt="0" anchor="t" anchorCtr="0" forceAA="0" compatLnSpc="1">
-            <a:prstTxWarp prst="textNoShape">
-              <a:avLst/>
-            </a:prstTxWarp>
-            <a:spAutoFit/>
-          </a:bodyPr>
-          <a:lstStyle/>
-          <a:p>
-            <a:pPr marL="0" marR="0" lvl="0" indent="0" algn="ctr" defTabSz="457200" rtl="0" eaLnBrk="1" fontAlgn="auto" latinLnBrk="0" hangingPunct="1">
-              <a:lnSpc>
-                <a:spcPct val="100000"/>
-              </a:lnSpc>
-              <a:spcBef>
-                <a:spcPts val="0"/>
-              </a:spcBef>
-              <a:spcAft>
-                <a:spcPts val="0"/>
-              </a:spcAft>
-              <a:buClrTx/>
-              <a:buSzTx/>
-              <a:buFontTx/>
-              <a:buNone/>
-              <a:tabLst/>
-              <a:defRPr/>
-            </a:pPr>
-            <a:r>
-              <a:rPr kumimoji="0" lang="en-US" sz="7200" b="0" i="0" u="none" strike="noStrike" kern="1200" cap="none" spc="0" normalizeH="0" baseline="0" noProof="0" dirty="0">
-                <a:ln>
-                  <a:noFill/>
-                </a:ln>
-                <a:solidFill>
-                  <a:schemeClr val="tx1"/>
-                </a:solidFill>
-                <a:effectLst/>
-                <a:uLnTx/>
-                <a:uFillTx/>
-                <a:latin typeface="+mn-lt"/>
-                <a:ea typeface="+mn-ea"/>
-                <a:cs typeface="+mn-cs"/>
-              </a:rPr>
-              <a:t>Further resources</a:t>
-            </a:r>
-          </a:p>
-        </p:txBody>
-      </p:sp>
-    </p:spTree>
-    <p:extLst>
-      <p:ext uri="{BB962C8B-B14F-4D97-AF65-F5344CB8AC3E}">
-        <p14:creationId xmlns:p14="http://schemas.microsoft.com/office/powerpoint/2010/main" val="1980333425"/>
       </p:ext>
     </p:extLst>
   </p:cSld>
@@ -41031,6 +42662,113 @@
 </file>
 
 <file path=ppt/slides/slide50.xml><?xml version="1.0" encoding="utf-8"?>
+<p:sld xmlns:a="http://schemas.openxmlformats.org/drawingml/2006/main" xmlns:r="http://schemas.openxmlformats.org/officeDocument/2006/relationships" xmlns:p="http://schemas.openxmlformats.org/presentationml/2006/main">
+  <p:cSld>
+    <p:spTree>
+      <p:nvGrpSpPr>
+        <p:cNvPr id="1" name=""/>
+        <p:cNvGrpSpPr/>
+        <p:nvPr/>
+      </p:nvGrpSpPr>
+      <p:grpSpPr>
+        <a:xfrm>
+          <a:off x="0" y="0"/>
+          <a:ext cx="0" cy="0"/>
+          <a:chOff x="0" y="0"/>
+          <a:chExt cx="0" cy="0"/>
+        </a:xfrm>
+      </p:grpSpPr>
+      <p:sp>
+        <p:nvSpPr>
+          <p:cNvPr id="2" name="Title 1">
+            <a:extLst>
+              <a:ext uri="{FF2B5EF4-FFF2-40B4-BE49-F238E27FC236}">
+                <a16:creationId xmlns:a16="http://schemas.microsoft.com/office/drawing/2014/main" id="{7306C212-B3B4-8E92-B9B3-B626EF37EBA4}"/>
+              </a:ext>
+            </a:extLst>
+          </p:cNvPr>
+          <p:cNvSpPr txBox="1">
+            <a:spLocks noGrp="1"/>
+          </p:cNvSpPr>
+          <p:nvPr>
+            <p:ph type="title" idx="4294967295"/>
+          </p:nvPr>
+        </p:nvSpPr>
+        <p:spPr>
+          <a:xfrm>
+            <a:off x="1061794" y="2828836"/>
+            <a:ext cx="10068412" cy="1200329"/>
+          </a:xfrm>
+          <a:prstGeom prst="rect">
+            <a:avLst/>
+          </a:prstGeom>
+          <a:noFill/>
+          <a:ln>
+            <a:noFill/>
+            <a:prstDash/>
+          </a:ln>
+          <a:effectLst/>
+        </p:spPr>
+        <p:txBody>
+          <a:bodyPr rot="0" spcFirstLastPara="0" vertOverflow="overflow" horzOverflow="overflow" vert="horz" wrap="square" lIns="91440" tIns="45720" rIns="91440" bIns="45720" numCol="1" spcCol="0" rtlCol="0" fromWordArt="0" anchor="t" anchorCtr="0" forceAA="0" compatLnSpc="1">
+            <a:prstTxWarp prst="textNoShape">
+              <a:avLst/>
+            </a:prstTxWarp>
+            <a:spAutoFit/>
+          </a:bodyPr>
+          <a:lstStyle/>
+          <a:p>
+            <a:pPr marL="0" marR="0" lvl="0" indent="0" algn="ctr" defTabSz="457200" rtl="0" eaLnBrk="1" fontAlgn="auto" latinLnBrk="0" hangingPunct="1">
+              <a:lnSpc>
+                <a:spcPct val="100000"/>
+              </a:lnSpc>
+              <a:spcBef>
+                <a:spcPts val="0"/>
+              </a:spcBef>
+              <a:spcAft>
+                <a:spcPts val="0"/>
+              </a:spcAft>
+              <a:buClrTx/>
+              <a:buSzTx/>
+              <a:buFontTx/>
+              <a:buNone/>
+              <a:tabLst/>
+              <a:defRPr/>
+            </a:pPr>
+            <a:r>
+              <a:rPr kumimoji="0" lang="en-US" sz="7200" b="0" i="0" u="none" strike="noStrike" kern="1200" cap="none" spc="0" normalizeH="0" baseline="0" noProof="0" dirty="0">
+                <a:ln>
+                  <a:noFill/>
+                </a:ln>
+                <a:solidFill>
+                  <a:schemeClr val="tx1"/>
+                </a:solidFill>
+                <a:effectLst/>
+                <a:uLnTx/>
+                <a:uFillTx/>
+                <a:latin typeface="+mn-lt"/>
+                <a:ea typeface="+mn-ea"/>
+                <a:cs typeface="+mn-cs"/>
+              </a:rPr>
+              <a:t>Further resources</a:t>
+            </a:r>
+          </a:p>
+        </p:txBody>
+      </p:sp>
+    </p:spTree>
+    <p:extLst>
+      <p:ext uri="{BB962C8B-B14F-4D97-AF65-F5344CB8AC3E}">
+        <p14:creationId xmlns:p14="http://schemas.microsoft.com/office/powerpoint/2010/main" val="1980333425"/>
+      </p:ext>
+    </p:extLst>
+  </p:cSld>
+  <p:clrMapOvr>
+    <a:masterClrMapping/>
+  </p:clrMapOvr>
+</p:sld>
+</file>
+
+<file path=ppt/slides/slide51.xml><?xml version="1.0" encoding="utf-8"?>
 <p:sld xmlns:a="http://schemas.openxmlformats.org/drawingml/2006/main" xmlns:r="http://schemas.openxmlformats.org/officeDocument/2006/relationships" xmlns:p="http://schemas.openxmlformats.org/presentationml/2006/main">
   <p:cSld>
     <p:spTree>
@@ -41349,7 +43087,7 @@
 </p:sld>
 </file>
 
-<file path=ppt/slides/slide51.xml><?xml version="1.0" encoding="utf-8"?>
+<file path=ppt/slides/slide52.xml><?xml version="1.0" encoding="utf-8"?>
 <p:sld xmlns:a="http://schemas.openxmlformats.org/drawingml/2006/main" xmlns:r="http://schemas.openxmlformats.org/officeDocument/2006/relationships" xmlns:p="http://schemas.openxmlformats.org/presentationml/2006/main">
   <p:cSld>
     <p:spTree>
@@ -41672,7 +43410,7 @@
 </p:sld>
 </file>
 
-<file path=ppt/slides/slide52.xml><?xml version="1.0" encoding="utf-8"?>
+<file path=ppt/slides/slide53.xml><?xml version="1.0" encoding="utf-8"?>
 <p:sld xmlns:a="http://schemas.openxmlformats.org/drawingml/2006/main" xmlns:r="http://schemas.openxmlformats.org/officeDocument/2006/relationships" xmlns:p="http://schemas.openxmlformats.org/presentationml/2006/main">
   <p:cSld>
     <p:spTree>

</xml_diff>

<commit_message>
Fixed calling convention of SQLite Execute() callback (issue #11)
</commit_message>
<xml_diff>
--- a/doc/Introduction to unsafe C#.pptx
+++ b/doc/Introduction to unsafe C#.pptx
@@ -40039,12 +40039,12 @@
                   <a:noFill/>
                 </a:ln>
                 <a:solidFill>
-                  <a:srgbClr val="202020"/>
-                </a:solidFill>
-                <a:effectLst/>
-                <a:latin typeface="Consolas" panose="020B0609020204030204" pitchFamily="49" charset="0"/>
-              </a:rPr>
-              <a:t>Stdcall</a:t>
+                  <a:srgbClr val="383838"/>
+                </a:solidFill>
+                <a:effectLst/>
+                <a:latin typeface="Consolas" panose="020B0609020204030204" pitchFamily="49" charset="0"/>
+              </a:rPr>
+              <a:t>Cdecl</a:t>
             </a:r>
             <a:r>
               <a:rPr kumimoji="0" lang="en-US" altLang="en-US" b="0" i="0" u="none" strike="noStrike" cap="none" normalizeH="0" baseline="0" dirty="0">
@@ -40699,12 +40699,12 @@
                   <a:noFill/>
                 </a:ln>
                 <a:solidFill>
-                  <a:srgbClr val="202020"/>
-                </a:solidFill>
-                <a:effectLst/>
-                <a:latin typeface="Consolas" panose="020B0609020204030204" pitchFamily="49" charset="0"/>
-              </a:rPr>
-              <a:t>Stdcall</a:t>
+                  <a:srgbClr val="383838"/>
+                </a:solidFill>
+                <a:effectLst/>
+                <a:latin typeface="Consolas" panose="020B0609020204030204" pitchFamily="49" charset="0"/>
+              </a:rPr>
+              <a:t>Cdecl</a:t>
             </a:r>
             <a:r>
               <a:rPr kumimoji="0" lang="en-US" altLang="en-US" b="0" i="0" u="none" strike="noStrike" cap="none" normalizeH="0" baseline="0" dirty="0">
@@ -42948,7 +42948,7 @@
                 <a:effectLst/>
                 <a:latin typeface="Consolas" panose="020B0609020204030204" pitchFamily="49" charset="0"/>
               </a:rPr>
-              <a:t>CallConvStdcall</a:t>
+              <a:t>CallConvCdecl</a:t>
             </a:r>
             <a:r>
               <a:rPr kumimoji="0" lang="en-US" altLang="en-US" sz="1400" b="0" i="0" u="none" strike="noStrike" cap="none" normalizeH="0" baseline="0" dirty="0">

</xml_diff>

<commit_message>
Updated social media links
</commit_message>
<xml_diff>
--- a/doc/Introduction to unsafe C#.pptx
+++ b/doc/Introduction to unsafe C#.pptx
@@ -250,7 +250,7 @@
           <a:p>
             <a:fld id="{2B6DBF41-98D5-4B29-8B81-B31614D19ACC}" type="datetimeFigureOut">
               <a:rPr lang="en-US" smtClean="0"/>
-              <a:t>1/19/2023</a:t>
+              <a:t>5/13/2023</a:t>
             </a:fld>
             <a:endParaRPr lang="en-US"/>
           </a:p>
@@ -1048,7 +1048,7 @@
           <a:p>
             <a:fld id="{F9BC75CE-03FF-4667-898C-4C70B4392062}" type="datetimeFigureOut">
               <a:rPr lang="en-US" smtClean="0"/>
-              <a:t>1/19/2023</a:t>
+              <a:t>5/13/2023</a:t>
             </a:fld>
             <a:endParaRPr lang="en-US"/>
           </a:p>
@@ -1323,7 +1323,7 @@
           <a:p>
             <a:fld id="{F9BC75CE-03FF-4667-898C-4C70B4392062}" type="datetimeFigureOut">
               <a:rPr lang="en-US" smtClean="0"/>
-              <a:t>1/19/2023</a:t>
+              <a:t>5/13/2023</a:t>
             </a:fld>
             <a:endParaRPr lang="en-US"/>
           </a:p>
@@ -1517,7 +1517,7 @@
           <a:p>
             <a:fld id="{F9BC75CE-03FF-4667-898C-4C70B4392062}" type="datetimeFigureOut">
               <a:rPr lang="en-US" smtClean="0"/>
-              <a:t>1/19/2023</a:t>
+              <a:t>5/13/2023</a:t>
             </a:fld>
             <a:endParaRPr lang="en-US"/>
           </a:p>
@@ -1790,7 +1790,7 @@
           <a:p>
             <a:fld id="{F9BC75CE-03FF-4667-898C-4C70B4392062}" type="datetimeFigureOut">
               <a:rPr lang="en-US" smtClean="0"/>
-              <a:t>1/19/2023</a:t>
+              <a:t>5/13/2023</a:t>
             </a:fld>
             <a:endParaRPr lang="en-US"/>
           </a:p>
@@ -2131,7 +2131,7 @@
           <a:p>
             <a:fld id="{F9BC75CE-03FF-4667-898C-4C70B4392062}" type="datetimeFigureOut">
               <a:rPr lang="en-US" smtClean="0"/>
-              <a:t>1/19/2023</a:t>
+              <a:t>5/13/2023</a:t>
             </a:fld>
             <a:endParaRPr lang="en-US"/>
           </a:p>
@@ -2754,7 +2754,7 @@
           <a:p>
             <a:fld id="{F9BC75CE-03FF-4667-898C-4C70B4392062}" type="datetimeFigureOut">
               <a:rPr lang="en-US" smtClean="0"/>
-              <a:t>1/19/2023</a:t>
+              <a:t>5/13/2023</a:t>
             </a:fld>
             <a:endParaRPr lang="en-US"/>
           </a:p>
@@ -3614,7 +3614,7 @@
           <a:p>
             <a:fld id="{F9BC75CE-03FF-4667-898C-4C70B4392062}" type="datetimeFigureOut">
               <a:rPr lang="en-US" smtClean="0"/>
-              <a:t>1/19/2023</a:t>
+              <a:t>5/13/2023</a:t>
             </a:fld>
             <a:endParaRPr lang="en-US"/>
           </a:p>
@@ -3784,7 +3784,7 @@
           <a:p>
             <a:fld id="{F9BC75CE-03FF-4667-898C-4C70B4392062}" type="datetimeFigureOut">
               <a:rPr lang="en-US" smtClean="0"/>
-              <a:t>1/19/2023</a:t>
+              <a:t>5/13/2023</a:t>
             </a:fld>
             <a:endParaRPr lang="en-US"/>
           </a:p>
@@ -3964,7 +3964,7 @@
           <a:p>
             <a:fld id="{F9BC75CE-03FF-4667-898C-4C70B4392062}" type="datetimeFigureOut">
               <a:rPr lang="en-US" smtClean="0"/>
-              <a:t>1/19/2023</a:t>
+              <a:t>5/13/2023</a:t>
             </a:fld>
             <a:endParaRPr lang="en-US"/>
           </a:p>
@@ -4134,7 +4134,7 @@
           <a:p>
             <a:fld id="{F9BC75CE-03FF-4667-898C-4C70B4392062}" type="datetimeFigureOut">
               <a:rPr lang="en-US" smtClean="0"/>
-              <a:t>1/19/2023</a:t>
+              <a:t>5/13/2023</a:t>
             </a:fld>
             <a:endParaRPr lang="en-US"/>
           </a:p>
@@ -4381,7 +4381,7 @@
           <a:p>
             <a:fld id="{F9BC75CE-03FF-4667-898C-4C70B4392062}" type="datetimeFigureOut">
               <a:rPr lang="en-US" smtClean="0"/>
-              <a:t>1/19/2023</a:t>
+              <a:t>5/13/2023</a:t>
             </a:fld>
             <a:endParaRPr lang="en-US"/>
           </a:p>
@@ -4673,7 +4673,7 @@
           <a:p>
             <a:fld id="{F9BC75CE-03FF-4667-898C-4C70B4392062}" type="datetimeFigureOut">
               <a:rPr lang="en-US" smtClean="0"/>
-              <a:t>1/19/2023</a:t>
+              <a:t>5/13/2023</a:t>
             </a:fld>
             <a:endParaRPr lang="en-US"/>
           </a:p>
@@ -5117,7 +5117,7 @@
           <a:p>
             <a:fld id="{F9BC75CE-03FF-4667-898C-4C70B4392062}" type="datetimeFigureOut">
               <a:rPr lang="en-US" smtClean="0"/>
-              <a:t>1/19/2023</a:t>
+              <a:t>5/13/2023</a:t>
             </a:fld>
             <a:endParaRPr lang="en-US"/>
           </a:p>
@@ -5235,7 +5235,7 @@
           <a:p>
             <a:fld id="{F9BC75CE-03FF-4667-898C-4C70B4392062}" type="datetimeFigureOut">
               <a:rPr lang="en-US" smtClean="0"/>
-              <a:t>1/19/2023</a:t>
+              <a:t>5/13/2023</a:t>
             </a:fld>
             <a:endParaRPr lang="en-US"/>
           </a:p>
@@ -5330,7 +5330,7 @@
           <a:p>
             <a:fld id="{F9BC75CE-03FF-4667-898C-4C70B4392062}" type="datetimeFigureOut">
               <a:rPr lang="en-US" smtClean="0"/>
-              <a:t>1/19/2023</a:t>
+              <a:t>5/13/2023</a:t>
             </a:fld>
             <a:endParaRPr lang="en-US"/>
           </a:p>
@@ -5609,7 +5609,7 @@
           <a:p>
             <a:fld id="{F9BC75CE-03FF-4667-898C-4C70B4392062}" type="datetimeFigureOut">
               <a:rPr lang="en-US" smtClean="0"/>
-              <a:t>1/19/2023</a:t>
+              <a:t>5/13/2023</a:t>
             </a:fld>
             <a:endParaRPr lang="en-US"/>
           </a:p>
@@ -5884,7 +5884,7 @@
           <a:p>
             <a:fld id="{F9BC75CE-03FF-4667-898C-4C70B4392062}" type="datetimeFigureOut">
               <a:rPr lang="en-US" smtClean="0"/>
-              <a:t>1/19/2023</a:t>
+              <a:t>5/13/2023</a:t>
             </a:fld>
             <a:endParaRPr lang="en-US"/>
           </a:p>
@@ -6313,7 +6313,7 @@
           <a:p>
             <a:fld id="{F9BC75CE-03FF-4667-898C-4C70B4392062}" type="datetimeFigureOut">
               <a:rPr lang="en-US" smtClean="0"/>
-              <a:t>1/19/2023</a:t>
+              <a:t>5/13/2023</a:t>
             </a:fld>
             <a:endParaRPr lang="en-US"/>
           </a:p>
@@ -7466,7 +7466,7 @@
           <a:p>
             <a:r>
               <a:rPr lang="en-US" sz="1200" dirty="0"/>
-              <a:t>Rev. 5 (2023-01-20), </a:t>
+              <a:t>Rev. 6 (2023-05-??), </a:t>
             </a:r>
             <a:r>
               <a:rPr lang="en-US" sz="1200" dirty="0">
@@ -44721,10 +44721,10 @@
       </p:sp>
       <p:pic>
         <p:nvPicPr>
-          <p:cNvPr id="3" name="Picture 2" descr="GitHub">
+          <p:cNvPr id="9" name="Picture 8" descr="GitHub">
             <a:extLst>
               <a:ext uri="{FF2B5EF4-FFF2-40B4-BE49-F238E27FC236}">
-                <a16:creationId xmlns:a16="http://schemas.microsoft.com/office/drawing/2014/main" id="{29B12B77-0EED-C756-22C8-6C8E5EDEE4D1}"/>
+                <a16:creationId xmlns:a16="http://schemas.microsoft.com/office/drawing/2014/main" id="{D413AEAD-8A92-6186-D075-5F3D3F946656}"/>
               </a:ext>
             </a:extLst>
           </p:cNvPr>
@@ -44757,10 +44757,10 @@
       </p:pic>
       <p:sp>
         <p:nvSpPr>
-          <p:cNvPr id="4" name="TextBox 3">
+          <p:cNvPr id="10" name="TextBox 9">
             <a:extLst>
               <a:ext uri="{FF2B5EF4-FFF2-40B4-BE49-F238E27FC236}">
-                <a16:creationId xmlns:a16="http://schemas.microsoft.com/office/drawing/2014/main" id="{6B8471E3-9146-8ED9-8175-0660582F81E8}"/>
+                <a16:creationId xmlns:a16="http://schemas.microsoft.com/office/drawing/2014/main" id="{888E3480-3A92-8D18-6D43-A59A2C6A1260}"/>
               </a:ext>
             </a:extLst>
           </p:cNvPr>
@@ -44793,10 +44793,10 @@
       </p:sp>
       <p:pic>
         <p:nvPicPr>
-          <p:cNvPr id="6" name="Picture 5" descr="LinkedIn">
+          <p:cNvPr id="11" name="Picture 10" descr="LinkedIn">
             <a:extLst>
               <a:ext uri="{FF2B5EF4-FFF2-40B4-BE49-F238E27FC236}">
-                <a16:creationId xmlns:a16="http://schemas.microsoft.com/office/drawing/2014/main" id="{7D98E4BD-5402-43AA-9908-E267E4745B8A}"/>
+                <a16:creationId xmlns:a16="http://schemas.microsoft.com/office/drawing/2014/main" id="{5498B0FC-EAA9-1A93-9862-02CC73B5EEE3}"/>
               </a:ext>
             </a:extLst>
           </p:cNvPr>
@@ -44829,10 +44829,10 @@
       </p:pic>
       <p:sp>
         <p:nvSpPr>
-          <p:cNvPr id="5" name="TextBox 4">
+          <p:cNvPr id="12" name="TextBox 11">
             <a:extLst>
               <a:ext uri="{FF2B5EF4-FFF2-40B4-BE49-F238E27FC236}">
-                <a16:creationId xmlns:a16="http://schemas.microsoft.com/office/drawing/2014/main" id="{B1D6468B-2C26-1307-0433-2A67BD6787E4}"/>
+                <a16:creationId xmlns:a16="http://schemas.microsoft.com/office/drawing/2014/main" id="{E80021A4-348A-BF7C-63BF-6C89D7630DCC}"/>
               </a:ext>
             </a:extLst>
           </p:cNvPr>
@@ -44865,10 +44865,10 @@
       </p:sp>
       <p:pic>
         <p:nvPicPr>
-          <p:cNvPr id="8" name="Picture 7" descr="Twitter">
+          <p:cNvPr id="13" name="Graphic 12" descr="Mastodon">
             <a:extLst>
               <a:ext uri="{FF2B5EF4-FFF2-40B4-BE49-F238E27FC236}">
-                <a16:creationId xmlns:a16="http://schemas.microsoft.com/office/drawing/2014/main" id="{F16C749F-DD8B-78D1-C6C9-72359231BF66}"/>
+                <a16:creationId xmlns:a16="http://schemas.microsoft.com/office/drawing/2014/main" id="{DCED133C-A505-FBA4-FD79-26B84EFC1909}"/>
               </a:ext>
             </a:extLst>
           </p:cNvPr>
@@ -44883,6 +44883,9 @@
               <a:ext uri="{28A0092B-C50C-407E-A947-70E740481C1C}">
                 <a14:useLocalDpi xmlns:a14="http://schemas.microsoft.com/office/drawing/2010/main" val="0"/>
               </a:ext>
+              <a:ext uri="{96DAC541-7B7A-43D3-8B79-37D633B846F1}">
+                <asvg:svgBlip xmlns:asvg="http://schemas.microsoft.com/office/drawing/2016/SVG/main" r:embed="rId5"/>
+              </a:ext>
             </a:extLst>
           </a:blip>
           <a:stretch>
@@ -44892,7 +44895,7 @@
         <p:spPr>
           <a:xfrm>
             <a:off x="457200" y="6126480"/>
-            <a:ext cx="274320" cy="274320"/>
+            <a:ext cx="274320" cy="292855"/>
           </a:xfrm>
           <a:prstGeom prst="rect">
             <a:avLst/>
@@ -44901,10 +44904,10 @@
       </p:pic>
       <p:sp>
         <p:nvSpPr>
-          <p:cNvPr id="7" name="TextBox 6">
+          <p:cNvPr id="14" name="TextBox 13">
             <a:extLst>
               <a:ext uri="{FF2B5EF4-FFF2-40B4-BE49-F238E27FC236}">
-                <a16:creationId xmlns:a16="http://schemas.microsoft.com/office/drawing/2014/main" id="{EDD6CCD0-31CF-5DBF-6C0A-518339E8E5BA}"/>
+                <a16:creationId xmlns:a16="http://schemas.microsoft.com/office/drawing/2014/main" id="{E5813634-0CE6-B509-5B60-E9061F6A69C4}"/>
               </a:ext>
             </a:extLst>
           </p:cNvPr>
@@ -44914,7 +44917,7 @@
         <p:spPr>
           <a:xfrm>
             <a:off x="800100" y="6064431"/>
-            <a:ext cx="3457641" cy="400110"/>
+            <a:ext cx="5935551" cy="400110"/>
           </a:xfrm>
           <a:prstGeom prst="rect">
             <a:avLst/>
@@ -44928,10 +44931,9 @@
           <a:lstStyle/>
           <a:p>
             <a:r>
-              <a:rPr lang="en-US" sz="2000" dirty="0" err="1"/>
-              <a:t>denniscdietrich</a:t>
-            </a:r>
-            <a:endParaRPr lang="en-US" sz="2000" dirty="0"/>
+              <a:rPr lang="en-US" sz="2000" dirty="0"/>
+              <a:t>@dc@social.advancedsoftware.engineering</a:t>
+            </a:r>
           </a:p>
         </p:txBody>
       </p:sp>
@@ -45044,10 +45046,10 @@
       </p:sp>
       <p:pic>
         <p:nvPicPr>
-          <p:cNvPr id="5" name="Picture 4" descr="GitHub">
+          <p:cNvPr id="3" name="Picture 2" descr="GitHub">
             <a:extLst>
               <a:ext uri="{FF2B5EF4-FFF2-40B4-BE49-F238E27FC236}">
-                <a16:creationId xmlns:a16="http://schemas.microsoft.com/office/drawing/2014/main" id="{C9112408-9719-E440-BC6C-BA3E3E65E31E}"/>
+                <a16:creationId xmlns:a16="http://schemas.microsoft.com/office/drawing/2014/main" id="{1C6807BB-2FE0-8AC1-C000-303938DA65F6}"/>
               </a:ext>
             </a:extLst>
           </p:cNvPr>
@@ -45080,10 +45082,10 @@
       </p:pic>
       <p:sp>
         <p:nvSpPr>
-          <p:cNvPr id="6" name="TextBox 5">
+          <p:cNvPr id="4" name="TextBox 3">
             <a:extLst>
               <a:ext uri="{FF2B5EF4-FFF2-40B4-BE49-F238E27FC236}">
-                <a16:creationId xmlns:a16="http://schemas.microsoft.com/office/drawing/2014/main" id="{F2FAD6ED-B45F-E480-52EB-49AC0568C9BA}"/>
+                <a16:creationId xmlns:a16="http://schemas.microsoft.com/office/drawing/2014/main" id="{7C00689C-58BE-8CB3-A3BE-5AC4726F5F67}"/>
               </a:ext>
             </a:extLst>
           </p:cNvPr>
@@ -45116,10 +45118,10 @@
       </p:sp>
       <p:pic>
         <p:nvPicPr>
-          <p:cNvPr id="20" name="Picture 19" descr="LinkedIn">
+          <p:cNvPr id="7" name="Picture 6" descr="LinkedIn">
             <a:extLst>
               <a:ext uri="{FF2B5EF4-FFF2-40B4-BE49-F238E27FC236}">
-                <a16:creationId xmlns:a16="http://schemas.microsoft.com/office/drawing/2014/main" id="{4FA14B23-7ADB-953A-F57A-3E44D463F836}"/>
+                <a16:creationId xmlns:a16="http://schemas.microsoft.com/office/drawing/2014/main" id="{8FAF0638-CCFD-84A0-547A-EA307F2E70C5}"/>
               </a:ext>
             </a:extLst>
           </p:cNvPr>
@@ -45152,10 +45154,10 @@
       </p:pic>
       <p:sp>
         <p:nvSpPr>
-          <p:cNvPr id="18" name="TextBox 17">
+          <p:cNvPr id="8" name="TextBox 7">
             <a:extLst>
               <a:ext uri="{FF2B5EF4-FFF2-40B4-BE49-F238E27FC236}">
-                <a16:creationId xmlns:a16="http://schemas.microsoft.com/office/drawing/2014/main" id="{CF7F53EC-6158-915C-CFC1-D4626D193755}"/>
+                <a16:creationId xmlns:a16="http://schemas.microsoft.com/office/drawing/2014/main" id="{338AE759-2568-CC79-5E0A-3FDD566C7DDA}"/>
               </a:ext>
             </a:extLst>
           </p:cNvPr>
@@ -45188,10 +45190,10 @@
       </p:sp>
       <p:pic>
         <p:nvPicPr>
-          <p:cNvPr id="26" name="Picture 25" descr="Twitter">
+          <p:cNvPr id="9" name="Graphic 8" descr="Mastodon">
             <a:extLst>
               <a:ext uri="{FF2B5EF4-FFF2-40B4-BE49-F238E27FC236}">
-                <a16:creationId xmlns:a16="http://schemas.microsoft.com/office/drawing/2014/main" id="{E7AAD714-7A4D-FABA-7D6C-B2446830DBC8}"/>
+                <a16:creationId xmlns:a16="http://schemas.microsoft.com/office/drawing/2014/main" id="{BF98801E-9928-B651-1FAE-635F24D543A0}"/>
               </a:ext>
             </a:extLst>
           </p:cNvPr>
@@ -45206,6 +45208,9 @@
               <a:ext uri="{28A0092B-C50C-407E-A947-70E740481C1C}">
                 <a14:useLocalDpi xmlns:a14="http://schemas.microsoft.com/office/drawing/2010/main" val="0"/>
               </a:ext>
+              <a:ext uri="{96DAC541-7B7A-43D3-8B79-37D633B846F1}">
+                <asvg:svgBlip xmlns:asvg="http://schemas.microsoft.com/office/drawing/2016/SVG/main" r:embed="rId5"/>
+              </a:ext>
             </a:extLst>
           </a:blip>
           <a:stretch>
@@ -45215,7 +45220,7 @@
         <p:spPr>
           <a:xfrm>
             <a:off x="457200" y="6126480"/>
-            <a:ext cx="274320" cy="274320"/>
+            <a:ext cx="274320" cy="292855"/>
           </a:xfrm>
           <a:prstGeom prst="rect">
             <a:avLst/>
@@ -45224,10 +45229,10 @@
       </p:pic>
       <p:sp>
         <p:nvSpPr>
-          <p:cNvPr id="24" name="TextBox 23">
+          <p:cNvPr id="10" name="TextBox 9">
             <a:extLst>
               <a:ext uri="{FF2B5EF4-FFF2-40B4-BE49-F238E27FC236}">
-                <a16:creationId xmlns:a16="http://schemas.microsoft.com/office/drawing/2014/main" id="{A04B5C49-8425-CBED-2FE0-96A50C78E05B}"/>
+                <a16:creationId xmlns:a16="http://schemas.microsoft.com/office/drawing/2014/main" id="{FFDCD6FD-B230-C7B5-B746-B2489B5E1A1A}"/>
               </a:ext>
             </a:extLst>
           </p:cNvPr>
@@ -45237,7 +45242,7 @@
         <p:spPr>
           <a:xfrm>
             <a:off x="800100" y="6064431"/>
-            <a:ext cx="3457641" cy="400110"/>
+            <a:ext cx="5935551" cy="400110"/>
           </a:xfrm>
           <a:prstGeom prst="rect">
             <a:avLst/>
@@ -45251,10 +45256,9 @@
           <a:lstStyle/>
           <a:p>
             <a:r>
-              <a:rPr lang="en-US" sz="2000" dirty="0" err="1"/>
-              <a:t>denniscdietrich</a:t>
-            </a:r>
-            <a:endParaRPr lang="en-US" sz="2000" dirty="0"/>
+              <a:rPr lang="en-US" sz="2000" dirty="0"/>
+              <a:t>@dc@social.advancedsoftware.engineering</a:t>
+            </a:r>
           </a:p>
         </p:txBody>
       </p:sp>

</xml_diff>

<commit_message>
Minor tweaks to C# lang spec slide
</commit_message>
<xml_diff>
--- a/doc/Introduction to unsafe C#.pptx
+++ b/doc/Introduction to unsafe C#.pptx
@@ -45322,15 +45322,15 @@
           <a:lstStyle/>
           <a:p>
             <a:r>
-              <a:rPr lang="en-US"/>
+              <a:rPr lang="en-US" dirty="0"/>
               <a:t>What is unsafe code?</a:t>
             </a:r>
             <a:br>
-              <a:rPr lang="en-US"/>
+              <a:rPr lang="en-US" dirty="0"/>
             </a:br>
             <a:r>
-              <a:rPr lang="en-US"/>
-              <a:t>According to the specification</a:t>
+              <a:rPr lang="en-US" dirty="0"/>
+              <a:t>According to the specification:</a:t>
             </a:r>
           </a:p>
         </p:txBody>
@@ -45365,7 +45365,11 @@
             </a:r>
             <a:r>
               <a:rPr lang="en-US" i="1" dirty="0"/>
-              <a:t>In unsafe code, it is possible to declare and operate on pointers, to perform conversions between pointers and integral types, to take the address of variables, and so forth. In a sense, writing unsafe code is much like writing C code within a C# program.</a:t>
+              <a:t>In unsafe code, it is possible to declare and operate on pointers, to perform conversions between pointers and integral types, to take the address of variables, and so forth. </a:t>
+            </a:r>
+            <a:r>
+              <a:rPr lang="en-US" b="1" i="1" dirty="0"/>
+              <a:t>In a sense, writing unsafe code is much like writing C code within a C# program.</a:t>
             </a:r>
             <a:r>
               <a:rPr lang="en-US" dirty="0"/>

</xml_diff>

<commit_message>
Tweak to struct layout slide
</commit_message>
<xml_diff>
--- a/doc/Introduction to unsafe C#.pptx
+++ b/doc/Introduction to unsafe C#.pptx
@@ -735,7 +735,22 @@
           <a:bodyPr/>
           <a:lstStyle/>
           <a:p>
-            <a:endParaRPr lang="en-US" dirty="0"/>
+            <a:r>
+              <a:rPr lang="en-US" noProof="0" dirty="0" err="1"/>
+              <a:t>StructLayout</a:t>
+            </a:r>
+            <a:r>
+              <a:rPr lang="en-US" noProof="0" dirty="0"/>
+              <a:t>(</a:t>
+            </a:r>
+            <a:r>
+              <a:rPr lang="en-US" noProof="0" dirty="0" err="1"/>
+              <a:t>LayoutKind.Sequential</a:t>
+            </a:r>
+            <a:r>
+              <a:rPr lang="en-US" noProof="0" dirty="0"/>
+              <a:t>) is emitted by the C# compiler by default.</a:t>
+            </a:r>
           </a:p>
         </p:txBody>
       </p:sp>
@@ -14376,50 +14391,6 @@
           </a:p>
         </p:txBody>
       </p:sp>
-      <p:pic>
-        <p:nvPicPr>
-          <p:cNvPr id="7" name="Picture 6" descr="This enumeration is used with StructLayoutAttribute. The common language runtime uses the Auto layout value by default. To reduce layout-related problems associated with the Auto value, C#, Visual Basic, and C++ compilers specify Sequential layout for value types.">
-            <a:extLst>
-              <a:ext uri="{FF2B5EF4-FFF2-40B4-BE49-F238E27FC236}">
-                <a16:creationId xmlns:a16="http://schemas.microsoft.com/office/drawing/2014/main" id="{77A9615B-DBDF-1F64-33CC-3C85835F13BF}"/>
-              </a:ext>
-            </a:extLst>
-          </p:cNvPr>
-          <p:cNvPicPr>
-            <a:picLocks noChangeAspect="1"/>
-          </p:cNvPicPr>
-          <p:nvPr/>
-        </p:nvPicPr>
-        <p:blipFill>
-          <a:blip r:embed="rId3"/>
-          <a:stretch>
-            <a:fillRect/>
-          </a:stretch>
-        </p:blipFill>
-        <p:spPr>
-          <a:xfrm>
-            <a:off x="2717557" y="3842185"/>
-            <a:ext cx="6977143" cy="2036572"/>
-          </a:xfrm>
-          <a:prstGeom prst="rect">
-            <a:avLst/>
-          </a:prstGeom>
-          <a:ln w="15875">
-            <a:solidFill>
-              <a:schemeClr val="accent1"/>
-            </a:solidFill>
-          </a:ln>
-          <a:effectLst>
-            <a:outerShdw blurRad="127000" dist="127000" dir="2700000" algn="tl" rotWithShape="0">
-              <a:schemeClr val="bg1">
-                <a:lumMod val="95000"/>
-                <a:lumOff val="5000"/>
-                <a:alpha val="80000"/>
-              </a:schemeClr>
-            </a:outerShdw>
-          </a:effectLst>
-        </p:spPr>
-      </p:pic>
     </p:spTree>
     <p:extLst>
       <p:ext uri="{BB962C8B-B14F-4D97-AF65-F5344CB8AC3E}">
@@ -14430,81 +14401,6 @@
   <p:clrMapOvr>
     <a:masterClrMapping/>
   </p:clrMapOvr>
-  <p:timing>
-    <p:tnLst>
-      <p:par>
-        <p:cTn id="1" dur="indefinite" restart="never" nodeType="tmRoot">
-          <p:childTnLst>
-            <p:seq concurrent="1" nextAc="seek">
-              <p:cTn id="2" dur="indefinite" nodeType="mainSeq">
-                <p:childTnLst>
-                  <p:par>
-                    <p:cTn id="3" fill="hold">
-                      <p:stCondLst>
-                        <p:cond delay="indefinite"/>
-                      </p:stCondLst>
-                      <p:childTnLst>
-                        <p:par>
-                          <p:cTn id="4" fill="hold">
-                            <p:stCondLst>
-                              <p:cond delay="0"/>
-                            </p:stCondLst>
-                            <p:childTnLst>
-                              <p:par>
-                                <p:cTn id="5" presetID="1" presetClass="entr" presetSubtype="0" fill="hold" nodeType="clickEffect">
-                                  <p:stCondLst>
-                                    <p:cond delay="0"/>
-                                  </p:stCondLst>
-                                  <p:childTnLst>
-                                    <p:set>
-                                      <p:cBhvr>
-                                        <p:cTn id="6" dur="1" fill="hold">
-                                          <p:stCondLst>
-                                            <p:cond delay="0"/>
-                                          </p:stCondLst>
-                                        </p:cTn>
-                                        <p:tgtEl>
-                                          <p:spTgt spid="7"/>
-                                        </p:tgtEl>
-                                        <p:attrNameLst>
-                                          <p:attrName>style.visibility</p:attrName>
-                                        </p:attrNameLst>
-                                      </p:cBhvr>
-                                      <p:to>
-                                        <p:strVal val="visible"/>
-                                      </p:to>
-                                    </p:set>
-                                  </p:childTnLst>
-                                </p:cTn>
-                              </p:par>
-                            </p:childTnLst>
-                          </p:cTn>
-                        </p:par>
-                      </p:childTnLst>
-                    </p:cTn>
-                  </p:par>
-                </p:childTnLst>
-              </p:cTn>
-              <p:prevCondLst>
-                <p:cond evt="onPrev" delay="0">
-                  <p:tgtEl>
-                    <p:sldTgt/>
-                  </p:tgtEl>
-                </p:cond>
-              </p:prevCondLst>
-              <p:nextCondLst>
-                <p:cond evt="onNext" delay="0">
-                  <p:tgtEl>
-                    <p:sldTgt/>
-                  </p:tgtEl>
-                </p:cond>
-              </p:nextCondLst>
-            </p:seq>
-          </p:childTnLst>
-        </p:cTn>
-      </p:par>
-    </p:tnLst>
-  </p:timing>
 </p:sld>
 </file>
 

</xml_diff>

<commit_message>
Removed Windows x86 calling conventions
</commit_message>
<xml_diff>
--- a/doc/Introduction to unsafe C#.pptx
+++ b/doc/Introduction to unsafe C#.pptx
@@ -5,7 +5,7 @@
     <p:sldMasterId id="2147483660" r:id="rId1"/>
   </p:sldMasterIdLst>
   <p:notesMasterIdLst>
-    <p:notesMasterId r:id="rId56"/>
+    <p:notesMasterId r:id="rId57"/>
   </p:notesMasterIdLst>
   <p:sldIdLst>
     <p:sldId id="256" r:id="rId2"/>
@@ -39,29 +39,30 @@
     <p:sldId id="276" r:id="rId30"/>
     <p:sldId id="313" r:id="rId31"/>
     <p:sldId id="315" r:id="rId32"/>
-    <p:sldId id="314" r:id="rId33"/>
-    <p:sldId id="290" r:id="rId34"/>
-    <p:sldId id="307" r:id="rId35"/>
-    <p:sldId id="309" r:id="rId36"/>
-    <p:sldId id="279" r:id="rId37"/>
-    <p:sldId id="310" r:id="rId38"/>
-    <p:sldId id="311" r:id="rId39"/>
-    <p:sldId id="312" r:id="rId40"/>
-    <p:sldId id="291" r:id="rId41"/>
-    <p:sldId id="318" r:id="rId42"/>
-    <p:sldId id="319" r:id="rId43"/>
-    <p:sldId id="320" r:id="rId44"/>
-    <p:sldId id="321" r:id="rId45"/>
-    <p:sldId id="322" r:id="rId46"/>
-    <p:sldId id="323" r:id="rId47"/>
-    <p:sldId id="324" r:id="rId48"/>
-    <p:sldId id="325" r:id="rId49"/>
-    <p:sldId id="326" r:id="rId50"/>
-    <p:sldId id="327" r:id="rId51"/>
-    <p:sldId id="292" r:id="rId52"/>
-    <p:sldId id="283" r:id="rId53"/>
-    <p:sldId id="284" r:id="rId54"/>
-    <p:sldId id="285" r:id="rId55"/>
+    <p:sldId id="330" r:id="rId33"/>
+    <p:sldId id="314" r:id="rId34"/>
+    <p:sldId id="290" r:id="rId35"/>
+    <p:sldId id="307" r:id="rId36"/>
+    <p:sldId id="309" r:id="rId37"/>
+    <p:sldId id="279" r:id="rId38"/>
+    <p:sldId id="310" r:id="rId39"/>
+    <p:sldId id="311" r:id="rId40"/>
+    <p:sldId id="312" r:id="rId41"/>
+    <p:sldId id="291" r:id="rId42"/>
+    <p:sldId id="318" r:id="rId43"/>
+    <p:sldId id="319" r:id="rId44"/>
+    <p:sldId id="320" r:id="rId45"/>
+    <p:sldId id="321" r:id="rId46"/>
+    <p:sldId id="322" r:id="rId47"/>
+    <p:sldId id="323" r:id="rId48"/>
+    <p:sldId id="324" r:id="rId49"/>
+    <p:sldId id="325" r:id="rId50"/>
+    <p:sldId id="326" r:id="rId51"/>
+    <p:sldId id="327" r:id="rId52"/>
+    <p:sldId id="292" r:id="rId53"/>
+    <p:sldId id="283" r:id="rId54"/>
+    <p:sldId id="284" r:id="rId55"/>
+    <p:sldId id="285" r:id="rId56"/>
   </p:sldIdLst>
   <p:sldSz cx="12192000" cy="6858000"/>
   <p:notesSz cx="6858000" cy="9144000"/>
@@ -24212,14 +24213,28 @@
             <p:ph idx="1"/>
           </p:nvPr>
         </p:nvSpPr>
-        <p:spPr/>
+        <p:spPr>
+          <a:xfrm>
+            <a:off x="1103312" y="2052918"/>
+            <a:ext cx="8946541" cy="4805082"/>
+          </a:xfrm>
+        </p:spPr>
         <p:txBody>
-          <a:bodyPr/>
+          <a:bodyPr>
+            <a:normAutofit fontScale="92500" lnSpcReduction="10000"/>
+          </a:bodyPr>
           <a:lstStyle/>
           <a:p>
             <a:r>
               <a:rPr lang="en-US" dirty="0"/>
-              <a:t>Windows, x86</a:t>
+              <a:t>Windows, x64</a:t>
+            </a:r>
+          </a:p>
+          <a:p>
+            <a:pPr lvl="1"/>
+            <a:r>
+              <a:rPr lang="en-US" dirty="0"/>
+              <a:t>Standard calling convention</a:t>
             </a:r>
             <a:br>
               <a:rPr lang="en-US" dirty="0"/>
@@ -24228,151 +24243,122 @@
               <a:rPr lang="en-US" sz="1200" dirty="0">
                 <a:hlinkClick r:id="rId2"/>
               </a:rPr>
-              <a:t>https://learn.microsoft.com/en-us/cpp/cpp/argument-passing-and-naming-conventions</a:t>
+              <a:t>https://learn.microsoft.com/en-us/cpp/build/x64-calling-convention</a:t>
             </a:r>
             <a:endParaRPr lang="en-US" sz="1200" dirty="0"/>
           </a:p>
           <a:p>
             <a:pPr lvl="1"/>
             <a:r>
+              <a:rPr lang="en-US" dirty="0">
+                <a:latin typeface="Consolas" panose="020B0609020204030204" pitchFamily="49" charset="0"/>
+              </a:rPr>
+              <a:t>__</a:t>
+            </a:r>
+            <a:r>
+              <a:rPr lang="en-US" dirty="0" err="1">
+                <a:latin typeface="Consolas" panose="020B0609020204030204" pitchFamily="49" charset="0"/>
+              </a:rPr>
+              <a:t>vectorcall</a:t>
+            </a:r>
+            <a:r>
               <a:rPr lang="en-US" dirty="0"/>
-              <a:t>Supported by .NET: </a:t>
-            </a:r>
-            <a:r>
-              <a:rPr lang="en-US" dirty="0">
-                <a:latin typeface="Consolas" panose="020B0609020204030204" pitchFamily="49" charset="0"/>
-              </a:rPr>
-              <a:t>__</a:t>
-            </a:r>
-            <a:r>
-              <a:rPr lang="en-US" dirty="0" err="1">
-                <a:latin typeface="Consolas" panose="020B0609020204030204" pitchFamily="49" charset="0"/>
-              </a:rPr>
-              <a:t>cdecl</a:t>
-            </a:r>
-            <a:r>
+              <a:t> convention as an extension of the standard convention (unsupported by .NET)</a:t>
+            </a:r>
+            <a:br>
               <a:rPr lang="en-US" dirty="0"/>
-              <a:t>, </a:t>
-            </a:r>
-            <a:r>
-              <a:rPr lang="en-US" dirty="0">
-                <a:latin typeface="Consolas" panose="020B0609020204030204" pitchFamily="49" charset="0"/>
-              </a:rPr>
-              <a:t>__</a:t>
-            </a:r>
-            <a:r>
-              <a:rPr lang="en-US" dirty="0" err="1">
-                <a:latin typeface="Consolas" panose="020B0609020204030204" pitchFamily="49" charset="0"/>
-              </a:rPr>
-              <a:t>stdcall</a:t>
-            </a:r>
+            </a:br>
+            <a:r>
+              <a:rPr lang="en-US" sz="1200" dirty="0">
+                <a:hlinkClick r:id="rId3"/>
+              </a:rPr>
+              <a:t>https://learn.microsoft.com/en-us/cpp/cpp/vectorcall</a:t>
+            </a:r>
+            <a:endParaRPr lang="en-US" sz="1200" dirty="0"/>
+          </a:p>
+          <a:p>
             <a:r>
               <a:rPr lang="en-US" dirty="0"/>
-              <a:t>, </a:t>
-            </a:r>
-            <a:r>
-              <a:rPr lang="en-US" dirty="0">
-                <a:latin typeface="Consolas" panose="020B0609020204030204" pitchFamily="49" charset="0"/>
-              </a:rPr>
-              <a:t>__</a:t>
-            </a:r>
-            <a:r>
-              <a:rPr lang="en-US" dirty="0" err="1">
-                <a:latin typeface="Consolas" panose="020B0609020204030204" pitchFamily="49" charset="0"/>
-              </a:rPr>
-              <a:t>thiscall</a:t>
-            </a:r>
-            <a:endParaRPr lang="en-US" dirty="0">
-              <a:latin typeface="Consolas" panose="020B0609020204030204" pitchFamily="49" charset="0"/>
-            </a:endParaRPr>
+              <a:t>macOS, ARM64</a:t>
+            </a:r>
           </a:p>
           <a:p>
             <a:pPr lvl="1"/>
             <a:r>
               <a:rPr lang="en-US" dirty="0"/>
-              <a:t>Unsupported by .NET: </a:t>
-            </a:r>
-            <a:r>
-              <a:rPr lang="en-US" dirty="0">
-                <a:latin typeface="Consolas" panose="020B0609020204030204" pitchFamily="49" charset="0"/>
-              </a:rPr>
-              <a:t>__</a:t>
-            </a:r>
-            <a:r>
-              <a:rPr lang="en-US" dirty="0" err="1">
-                <a:latin typeface="Consolas" panose="020B0609020204030204" pitchFamily="49" charset="0"/>
-              </a:rPr>
-              <a:t>fastcall</a:t>
-            </a:r>
-            <a:r>
-              <a:rPr lang="en-US" dirty="0"/>
-              <a:t>, </a:t>
-            </a:r>
-            <a:r>
-              <a:rPr lang="en-US" dirty="0">
-                <a:latin typeface="Consolas" panose="020B0609020204030204" pitchFamily="49" charset="0"/>
-              </a:rPr>
-              <a:t>__</a:t>
-            </a:r>
-            <a:r>
-              <a:rPr lang="en-US" dirty="0" err="1">
-                <a:latin typeface="Consolas" panose="020B0609020204030204" pitchFamily="49" charset="0"/>
-              </a:rPr>
-              <a:t>vectorcall</a:t>
-            </a:r>
-            <a:endParaRPr lang="en-US" dirty="0">
-              <a:latin typeface="Consolas" panose="020B0609020204030204" pitchFamily="49" charset="0"/>
-            </a:endParaRPr>
-          </a:p>
-          <a:p>
-            <a:r>
-              <a:rPr lang="en-US" dirty="0"/>
-              <a:t>Windows, x64</a:t>
-            </a:r>
-          </a:p>
-          <a:p>
-            <a:pPr lvl="1"/>
-            <a:r>
-              <a:rPr lang="en-US" dirty="0"/>
-              <a:t>Standard calling convention</a:t>
+              <a:t>Single calling convention</a:t>
             </a:r>
             <a:br>
               <a:rPr lang="en-US" dirty="0"/>
             </a:br>
             <a:r>
               <a:rPr lang="en-US" sz="1200" dirty="0">
-                <a:hlinkClick r:id="rId3"/>
-              </a:rPr>
-              <a:t>https://learn.microsoft.com/en-us/cpp/build/x64-calling-convention</a:t>
+                <a:hlinkClick r:id="rId4"/>
+              </a:rPr>
+              <a:t>https://developer.apple.com/documentation/xcode/writing-arm64-code-for-apple-platforms</a:t>
             </a:r>
             <a:endParaRPr lang="en-US" sz="1200" dirty="0"/>
           </a:p>
           <a:p>
             <a:pPr lvl="1"/>
             <a:r>
-              <a:rPr lang="en-US" dirty="0">
-                <a:latin typeface="Consolas" panose="020B0609020204030204" pitchFamily="49" charset="0"/>
-              </a:rPr>
-              <a:t>__</a:t>
-            </a:r>
-            <a:r>
-              <a:rPr lang="en-US" dirty="0" err="1">
-                <a:latin typeface="Consolas" panose="020B0609020204030204" pitchFamily="49" charset="0"/>
-              </a:rPr>
-              <a:t>vectorcall</a:t>
-            </a:r>
-            <a:r>
               <a:rPr lang="en-US" dirty="0"/>
-              <a:t> convention as an extension of the standard convention (unsupported by .NET)</a:t>
+              <a:t>Modified version of the official AArch64 Procedure Call Standard (PCS)</a:t>
+            </a:r>
+            <a:br>
+              <a:rPr lang="en-US" sz="1200" dirty="0"/>
+            </a:br>
+            <a:r>
+              <a:rPr lang="en-US" sz="1200" dirty="0">
+                <a:hlinkClick r:id="rId5"/>
+              </a:rPr>
+              <a:t>https://developer.arm.com/documentation/102374/0100/Procedure-Call-Standard</a:t>
+            </a:r>
+            <a:endParaRPr lang="en-US" sz="1200" dirty="0"/>
+          </a:p>
+          <a:p>
+            <a:r>
+              <a:rPr lang="en-US" dirty="0"/>
+              <a:t>Linux, x64</a:t>
+            </a:r>
+          </a:p>
+          <a:p>
+            <a:pPr lvl="1"/>
+            <a:r>
+              <a:rPr lang="en-US" dirty="0"/>
+              <a:t>Single calling convention</a:t>
+            </a:r>
+          </a:p>
+          <a:p>
+            <a:pPr lvl="1"/>
+            <a:r>
+              <a:rPr lang="en-US" dirty="0"/>
+              <a:t>Implements the </a:t>
+            </a:r>
+            <a:r>
+              <a:rPr lang="en-US" i="1" dirty="0"/>
+              <a:t>AMD64 Architecture Processor Supplement</a:t>
+            </a:r>
+            <a:r>
+              <a:rPr lang="en-US" dirty="0"/>
+              <a:t> of the </a:t>
+            </a:r>
+            <a:r>
+              <a:rPr lang="en-US" i="1" dirty="0"/>
+              <a:t>System V Application Binary Interface</a:t>
+            </a:r>
+            <a:r>
+              <a:rPr lang="en-US" dirty="0"/>
+              <a:t> specification</a:t>
             </a:r>
             <a:br>
               <a:rPr lang="en-US" dirty="0"/>
             </a:br>
             <a:r>
               <a:rPr lang="en-US" sz="1200" dirty="0">
-                <a:hlinkClick r:id="rId4"/>
-              </a:rPr>
-              <a:t>https://learn.microsoft.com/en-us/cpp/cpp/vectorcall</a:t>
+                <a:hlinkClick r:id="rId6"/>
+              </a:rPr>
+              <a:t>https://refspecs.linuxbase.org/elf/x86_64-abi-0.99.pdf</a:t>
             </a:r>
             <a:endParaRPr lang="en-US" sz="1200" dirty="0"/>
           </a:p>
@@ -24386,6 +24372,623 @@
     <p:extLst>
       <p:ext uri="{BB962C8B-B14F-4D97-AF65-F5344CB8AC3E}">
         <p14:creationId xmlns:p14="http://schemas.microsoft.com/office/powerpoint/2010/main" val="3652254688"/>
+      </p:ext>
+    </p:extLst>
+  </p:cSld>
+  <p:clrMapOvr>
+    <a:masterClrMapping/>
+  </p:clrMapOvr>
+  <p:timing>
+    <p:tnLst>
+      <p:par>
+        <p:cTn id="1" dur="indefinite" restart="never" nodeType="tmRoot">
+          <p:childTnLst>
+            <p:seq concurrent="1" nextAc="seek">
+              <p:cTn id="2" dur="indefinite" nodeType="mainSeq">
+                <p:childTnLst>
+                  <p:par>
+                    <p:cTn id="3" fill="hold">
+                      <p:stCondLst>
+                        <p:cond delay="indefinite"/>
+                      </p:stCondLst>
+                      <p:childTnLst>
+                        <p:par>
+                          <p:cTn id="4" fill="hold">
+                            <p:stCondLst>
+                              <p:cond delay="0"/>
+                            </p:stCondLst>
+                            <p:childTnLst>
+                              <p:par>
+                                <p:cTn id="5" presetID="1" presetClass="entr" presetSubtype="0" fill="hold" grpId="0" nodeType="clickEffect">
+                                  <p:stCondLst>
+                                    <p:cond delay="0"/>
+                                  </p:stCondLst>
+                                  <p:childTnLst>
+                                    <p:set>
+                                      <p:cBhvr>
+                                        <p:cTn id="6" dur="1" fill="hold">
+                                          <p:stCondLst>
+                                            <p:cond delay="0"/>
+                                          </p:stCondLst>
+                                        </p:cTn>
+                                        <p:tgtEl>
+                                          <p:spTgt spid="3">
+                                            <p:txEl>
+                                              <p:pRg st="0" end="0"/>
+                                            </p:txEl>
+                                          </p:spTgt>
+                                        </p:tgtEl>
+                                        <p:attrNameLst>
+                                          <p:attrName>style.visibility</p:attrName>
+                                        </p:attrNameLst>
+                                      </p:cBhvr>
+                                      <p:to>
+                                        <p:strVal val="visible"/>
+                                      </p:to>
+                                    </p:set>
+                                  </p:childTnLst>
+                                </p:cTn>
+                              </p:par>
+                              <p:par>
+                                <p:cTn id="7" presetID="1" presetClass="entr" presetSubtype="0" fill="hold" grpId="0" nodeType="withEffect">
+                                  <p:stCondLst>
+                                    <p:cond delay="0"/>
+                                  </p:stCondLst>
+                                  <p:childTnLst>
+                                    <p:set>
+                                      <p:cBhvr>
+                                        <p:cTn id="8" dur="1" fill="hold">
+                                          <p:stCondLst>
+                                            <p:cond delay="0"/>
+                                          </p:stCondLst>
+                                        </p:cTn>
+                                        <p:tgtEl>
+                                          <p:spTgt spid="3">
+                                            <p:txEl>
+                                              <p:pRg st="1" end="1"/>
+                                            </p:txEl>
+                                          </p:spTgt>
+                                        </p:tgtEl>
+                                        <p:attrNameLst>
+                                          <p:attrName>style.visibility</p:attrName>
+                                        </p:attrNameLst>
+                                      </p:cBhvr>
+                                      <p:to>
+                                        <p:strVal val="visible"/>
+                                      </p:to>
+                                    </p:set>
+                                  </p:childTnLst>
+                                </p:cTn>
+                              </p:par>
+                              <p:par>
+                                <p:cTn id="9" presetID="1" presetClass="entr" presetSubtype="0" fill="hold" grpId="0" nodeType="withEffect">
+                                  <p:stCondLst>
+                                    <p:cond delay="0"/>
+                                  </p:stCondLst>
+                                  <p:childTnLst>
+                                    <p:set>
+                                      <p:cBhvr>
+                                        <p:cTn id="10" dur="1" fill="hold">
+                                          <p:stCondLst>
+                                            <p:cond delay="0"/>
+                                          </p:stCondLst>
+                                        </p:cTn>
+                                        <p:tgtEl>
+                                          <p:spTgt spid="3">
+                                            <p:txEl>
+                                              <p:pRg st="2" end="2"/>
+                                            </p:txEl>
+                                          </p:spTgt>
+                                        </p:tgtEl>
+                                        <p:attrNameLst>
+                                          <p:attrName>style.visibility</p:attrName>
+                                        </p:attrNameLst>
+                                      </p:cBhvr>
+                                      <p:to>
+                                        <p:strVal val="visible"/>
+                                      </p:to>
+                                    </p:set>
+                                  </p:childTnLst>
+                                </p:cTn>
+                              </p:par>
+                            </p:childTnLst>
+                          </p:cTn>
+                        </p:par>
+                      </p:childTnLst>
+                    </p:cTn>
+                  </p:par>
+                  <p:par>
+                    <p:cTn id="11" fill="hold">
+                      <p:stCondLst>
+                        <p:cond delay="indefinite"/>
+                      </p:stCondLst>
+                      <p:childTnLst>
+                        <p:par>
+                          <p:cTn id="12" fill="hold">
+                            <p:stCondLst>
+                              <p:cond delay="0"/>
+                            </p:stCondLst>
+                            <p:childTnLst>
+                              <p:par>
+                                <p:cTn id="13" presetID="1" presetClass="entr" presetSubtype="0" fill="hold" grpId="0" nodeType="clickEffect">
+                                  <p:stCondLst>
+                                    <p:cond delay="0"/>
+                                  </p:stCondLst>
+                                  <p:childTnLst>
+                                    <p:set>
+                                      <p:cBhvr>
+                                        <p:cTn id="14" dur="1" fill="hold">
+                                          <p:stCondLst>
+                                            <p:cond delay="0"/>
+                                          </p:stCondLst>
+                                        </p:cTn>
+                                        <p:tgtEl>
+                                          <p:spTgt spid="3">
+                                            <p:txEl>
+                                              <p:pRg st="3" end="3"/>
+                                            </p:txEl>
+                                          </p:spTgt>
+                                        </p:tgtEl>
+                                        <p:attrNameLst>
+                                          <p:attrName>style.visibility</p:attrName>
+                                        </p:attrNameLst>
+                                      </p:cBhvr>
+                                      <p:to>
+                                        <p:strVal val="visible"/>
+                                      </p:to>
+                                    </p:set>
+                                  </p:childTnLst>
+                                </p:cTn>
+                              </p:par>
+                              <p:par>
+                                <p:cTn id="15" presetID="1" presetClass="entr" presetSubtype="0" fill="hold" grpId="0" nodeType="withEffect">
+                                  <p:stCondLst>
+                                    <p:cond delay="0"/>
+                                  </p:stCondLst>
+                                  <p:childTnLst>
+                                    <p:set>
+                                      <p:cBhvr>
+                                        <p:cTn id="16" dur="1" fill="hold">
+                                          <p:stCondLst>
+                                            <p:cond delay="0"/>
+                                          </p:stCondLst>
+                                        </p:cTn>
+                                        <p:tgtEl>
+                                          <p:spTgt spid="3">
+                                            <p:txEl>
+                                              <p:pRg st="4" end="4"/>
+                                            </p:txEl>
+                                          </p:spTgt>
+                                        </p:tgtEl>
+                                        <p:attrNameLst>
+                                          <p:attrName>style.visibility</p:attrName>
+                                        </p:attrNameLst>
+                                      </p:cBhvr>
+                                      <p:to>
+                                        <p:strVal val="visible"/>
+                                      </p:to>
+                                    </p:set>
+                                  </p:childTnLst>
+                                </p:cTn>
+                              </p:par>
+                              <p:par>
+                                <p:cTn id="17" presetID="1" presetClass="entr" presetSubtype="0" fill="hold" grpId="0" nodeType="withEffect">
+                                  <p:stCondLst>
+                                    <p:cond delay="0"/>
+                                  </p:stCondLst>
+                                  <p:childTnLst>
+                                    <p:set>
+                                      <p:cBhvr>
+                                        <p:cTn id="18" dur="1" fill="hold">
+                                          <p:stCondLst>
+                                            <p:cond delay="0"/>
+                                          </p:stCondLst>
+                                        </p:cTn>
+                                        <p:tgtEl>
+                                          <p:spTgt spid="3">
+                                            <p:txEl>
+                                              <p:pRg st="5" end="5"/>
+                                            </p:txEl>
+                                          </p:spTgt>
+                                        </p:tgtEl>
+                                        <p:attrNameLst>
+                                          <p:attrName>style.visibility</p:attrName>
+                                        </p:attrNameLst>
+                                      </p:cBhvr>
+                                      <p:to>
+                                        <p:strVal val="visible"/>
+                                      </p:to>
+                                    </p:set>
+                                  </p:childTnLst>
+                                </p:cTn>
+                              </p:par>
+                            </p:childTnLst>
+                          </p:cTn>
+                        </p:par>
+                      </p:childTnLst>
+                    </p:cTn>
+                  </p:par>
+                  <p:par>
+                    <p:cTn id="19" fill="hold">
+                      <p:stCondLst>
+                        <p:cond delay="indefinite"/>
+                      </p:stCondLst>
+                      <p:childTnLst>
+                        <p:par>
+                          <p:cTn id="20" fill="hold">
+                            <p:stCondLst>
+                              <p:cond delay="0"/>
+                            </p:stCondLst>
+                            <p:childTnLst>
+                              <p:par>
+                                <p:cTn id="21" presetID="1" presetClass="entr" presetSubtype="0" fill="hold" grpId="0" nodeType="clickEffect">
+                                  <p:stCondLst>
+                                    <p:cond delay="0"/>
+                                  </p:stCondLst>
+                                  <p:childTnLst>
+                                    <p:set>
+                                      <p:cBhvr>
+                                        <p:cTn id="22" dur="1" fill="hold">
+                                          <p:stCondLst>
+                                            <p:cond delay="0"/>
+                                          </p:stCondLst>
+                                        </p:cTn>
+                                        <p:tgtEl>
+                                          <p:spTgt spid="3">
+                                            <p:txEl>
+                                              <p:pRg st="6" end="6"/>
+                                            </p:txEl>
+                                          </p:spTgt>
+                                        </p:tgtEl>
+                                        <p:attrNameLst>
+                                          <p:attrName>style.visibility</p:attrName>
+                                        </p:attrNameLst>
+                                      </p:cBhvr>
+                                      <p:to>
+                                        <p:strVal val="visible"/>
+                                      </p:to>
+                                    </p:set>
+                                  </p:childTnLst>
+                                </p:cTn>
+                              </p:par>
+                              <p:par>
+                                <p:cTn id="23" presetID="1" presetClass="entr" presetSubtype="0" fill="hold" grpId="0" nodeType="withEffect">
+                                  <p:stCondLst>
+                                    <p:cond delay="0"/>
+                                  </p:stCondLst>
+                                  <p:childTnLst>
+                                    <p:set>
+                                      <p:cBhvr>
+                                        <p:cTn id="24" dur="1" fill="hold">
+                                          <p:stCondLst>
+                                            <p:cond delay="0"/>
+                                          </p:stCondLst>
+                                        </p:cTn>
+                                        <p:tgtEl>
+                                          <p:spTgt spid="3">
+                                            <p:txEl>
+                                              <p:pRg st="7" end="7"/>
+                                            </p:txEl>
+                                          </p:spTgt>
+                                        </p:tgtEl>
+                                        <p:attrNameLst>
+                                          <p:attrName>style.visibility</p:attrName>
+                                        </p:attrNameLst>
+                                      </p:cBhvr>
+                                      <p:to>
+                                        <p:strVal val="visible"/>
+                                      </p:to>
+                                    </p:set>
+                                  </p:childTnLst>
+                                </p:cTn>
+                              </p:par>
+                              <p:par>
+                                <p:cTn id="25" presetID="1" presetClass="entr" presetSubtype="0" fill="hold" grpId="0" nodeType="withEffect">
+                                  <p:stCondLst>
+                                    <p:cond delay="0"/>
+                                  </p:stCondLst>
+                                  <p:childTnLst>
+                                    <p:set>
+                                      <p:cBhvr>
+                                        <p:cTn id="26" dur="1" fill="hold">
+                                          <p:stCondLst>
+                                            <p:cond delay="0"/>
+                                          </p:stCondLst>
+                                        </p:cTn>
+                                        <p:tgtEl>
+                                          <p:spTgt spid="3">
+                                            <p:txEl>
+                                              <p:pRg st="8" end="8"/>
+                                            </p:txEl>
+                                          </p:spTgt>
+                                        </p:tgtEl>
+                                        <p:attrNameLst>
+                                          <p:attrName>style.visibility</p:attrName>
+                                        </p:attrNameLst>
+                                      </p:cBhvr>
+                                      <p:to>
+                                        <p:strVal val="visible"/>
+                                      </p:to>
+                                    </p:set>
+                                  </p:childTnLst>
+                                </p:cTn>
+                              </p:par>
+                            </p:childTnLst>
+                          </p:cTn>
+                        </p:par>
+                      </p:childTnLst>
+                    </p:cTn>
+                  </p:par>
+                </p:childTnLst>
+              </p:cTn>
+              <p:prevCondLst>
+                <p:cond evt="onPrev" delay="0">
+                  <p:tgtEl>
+                    <p:sldTgt/>
+                  </p:tgtEl>
+                </p:cond>
+              </p:prevCondLst>
+              <p:nextCondLst>
+                <p:cond evt="onNext" delay="0">
+                  <p:tgtEl>
+                    <p:sldTgt/>
+                  </p:tgtEl>
+                </p:cond>
+              </p:nextCondLst>
+            </p:seq>
+          </p:childTnLst>
+        </p:cTn>
+      </p:par>
+    </p:tnLst>
+    <p:bldLst>
+      <p:bldP spid="3" grpId="0" build="p"/>
+    </p:bldLst>
+  </p:timing>
+</p:sld>
+</file>
+
+<file path=ppt/slides/slide32.xml><?xml version="1.0" encoding="utf-8"?>
+<p:sld xmlns:a="http://schemas.openxmlformats.org/drawingml/2006/main" xmlns:r="http://schemas.openxmlformats.org/officeDocument/2006/relationships" xmlns:p="http://schemas.openxmlformats.org/presentationml/2006/main" show="0">
+  <p:cSld>
+    <p:spTree>
+      <p:nvGrpSpPr>
+        <p:cNvPr id="1" name=""/>
+        <p:cNvGrpSpPr/>
+        <p:nvPr/>
+      </p:nvGrpSpPr>
+      <p:grpSpPr>
+        <a:xfrm>
+          <a:off x="0" y="0"/>
+          <a:ext cx="0" cy="0"/>
+          <a:chOff x="0" y="0"/>
+          <a:chExt cx="0" cy="0"/>
+        </a:xfrm>
+      </p:grpSpPr>
+      <p:sp>
+        <p:nvSpPr>
+          <p:cNvPr id="2" name="Title 1">
+            <a:extLst>
+              <a:ext uri="{FF2B5EF4-FFF2-40B4-BE49-F238E27FC236}">
+                <a16:creationId xmlns:a16="http://schemas.microsoft.com/office/drawing/2014/main" id="{A690C17B-431B-47C6-8EFF-E87685350308}"/>
+              </a:ext>
+            </a:extLst>
+          </p:cNvPr>
+          <p:cNvSpPr>
+            <a:spLocks noGrp="1"/>
+          </p:cNvSpPr>
+          <p:nvPr>
+            <p:ph type="title"/>
+          </p:nvPr>
+        </p:nvSpPr>
+        <p:spPr/>
+        <p:txBody>
+          <a:bodyPr/>
+          <a:lstStyle/>
+          <a:p>
+            <a:r>
+              <a:rPr lang="en-US" dirty="0"/>
+              <a:t>Platform Invoke (P/Invoke)</a:t>
+            </a:r>
+            <a:br>
+              <a:rPr lang="en-US" dirty="0"/>
+            </a:br>
+            <a:r>
+              <a:rPr lang="en-US" dirty="0"/>
+              <a:t>Calling conventions II</a:t>
+            </a:r>
+          </a:p>
+        </p:txBody>
+      </p:sp>
+      <p:sp>
+        <p:nvSpPr>
+          <p:cNvPr id="3" name="Content Placeholder 2">
+            <a:extLst>
+              <a:ext uri="{FF2B5EF4-FFF2-40B4-BE49-F238E27FC236}">
+                <a16:creationId xmlns:a16="http://schemas.microsoft.com/office/drawing/2014/main" id="{06F7C0BF-2621-7C50-FF99-08F9D86B9C28}"/>
+              </a:ext>
+            </a:extLst>
+          </p:cNvPr>
+          <p:cNvSpPr>
+            <a:spLocks noGrp="1"/>
+          </p:cNvSpPr>
+          <p:nvPr>
+            <p:ph idx="1"/>
+          </p:nvPr>
+        </p:nvSpPr>
+        <p:spPr/>
+        <p:txBody>
+          <a:bodyPr/>
+          <a:lstStyle/>
+          <a:p>
+            <a:r>
+              <a:rPr lang="en-US" dirty="0"/>
+              <a:t>Windows, x86</a:t>
+            </a:r>
+            <a:br>
+              <a:rPr lang="en-US" dirty="0"/>
+            </a:br>
+            <a:r>
+              <a:rPr lang="en-US" sz="1200" dirty="0">
+                <a:hlinkClick r:id="rId2"/>
+              </a:rPr>
+              <a:t>https://learn.microsoft.com/en-us/cpp/cpp/argument-passing-and-naming-conventions</a:t>
+            </a:r>
+            <a:endParaRPr lang="en-US" sz="1200" dirty="0"/>
+          </a:p>
+          <a:p>
+            <a:pPr lvl="1"/>
+            <a:r>
+              <a:rPr lang="en-US" dirty="0"/>
+              <a:t>Supported by .NET: </a:t>
+            </a:r>
+            <a:r>
+              <a:rPr lang="en-US" dirty="0">
+                <a:latin typeface="Consolas" panose="020B0609020204030204" pitchFamily="49" charset="0"/>
+              </a:rPr>
+              <a:t>__</a:t>
+            </a:r>
+            <a:r>
+              <a:rPr lang="en-US" dirty="0" err="1">
+                <a:latin typeface="Consolas" panose="020B0609020204030204" pitchFamily="49" charset="0"/>
+              </a:rPr>
+              <a:t>cdecl</a:t>
+            </a:r>
+            <a:r>
+              <a:rPr lang="en-US" dirty="0"/>
+              <a:t>, </a:t>
+            </a:r>
+            <a:r>
+              <a:rPr lang="en-US" dirty="0">
+                <a:latin typeface="Consolas" panose="020B0609020204030204" pitchFamily="49" charset="0"/>
+              </a:rPr>
+              <a:t>__</a:t>
+            </a:r>
+            <a:r>
+              <a:rPr lang="en-US" dirty="0" err="1">
+                <a:latin typeface="Consolas" panose="020B0609020204030204" pitchFamily="49" charset="0"/>
+              </a:rPr>
+              <a:t>stdcall</a:t>
+            </a:r>
+            <a:r>
+              <a:rPr lang="en-US" dirty="0"/>
+              <a:t>, </a:t>
+            </a:r>
+            <a:r>
+              <a:rPr lang="en-US" dirty="0">
+                <a:latin typeface="Consolas" panose="020B0609020204030204" pitchFamily="49" charset="0"/>
+              </a:rPr>
+              <a:t>__</a:t>
+            </a:r>
+            <a:r>
+              <a:rPr lang="en-US" dirty="0" err="1">
+                <a:latin typeface="Consolas" panose="020B0609020204030204" pitchFamily="49" charset="0"/>
+              </a:rPr>
+              <a:t>thiscall</a:t>
+            </a:r>
+            <a:endParaRPr lang="en-US" dirty="0">
+              <a:latin typeface="Consolas" panose="020B0609020204030204" pitchFamily="49" charset="0"/>
+            </a:endParaRPr>
+          </a:p>
+          <a:p>
+            <a:pPr lvl="1"/>
+            <a:r>
+              <a:rPr lang="en-US" dirty="0"/>
+              <a:t>Unsupported by .NET: </a:t>
+            </a:r>
+            <a:r>
+              <a:rPr lang="en-US" dirty="0">
+                <a:latin typeface="Consolas" panose="020B0609020204030204" pitchFamily="49" charset="0"/>
+              </a:rPr>
+              <a:t>__</a:t>
+            </a:r>
+            <a:r>
+              <a:rPr lang="en-US" dirty="0" err="1">
+                <a:latin typeface="Consolas" panose="020B0609020204030204" pitchFamily="49" charset="0"/>
+              </a:rPr>
+              <a:t>fastcall</a:t>
+            </a:r>
+            <a:r>
+              <a:rPr lang="en-US" dirty="0"/>
+              <a:t>, </a:t>
+            </a:r>
+            <a:r>
+              <a:rPr lang="en-US" dirty="0">
+                <a:latin typeface="Consolas" panose="020B0609020204030204" pitchFamily="49" charset="0"/>
+              </a:rPr>
+              <a:t>__</a:t>
+            </a:r>
+            <a:r>
+              <a:rPr lang="en-US" dirty="0" err="1">
+                <a:latin typeface="Consolas" panose="020B0609020204030204" pitchFamily="49" charset="0"/>
+              </a:rPr>
+              <a:t>vectorcall</a:t>
+            </a:r>
+            <a:endParaRPr lang="en-US" dirty="0">
+              <a:latin typeface="Consolas" panose="020B0609020204030204" pitchFamily="49" charset="0"/>
+            </a:endParaRPr>
+          </a:p>
+          <a:p>
+            <a:r>
+              <a:rPr lang="en-US" dirty="0"/>
+              <a:t>Windows, x64</a:t>
+            </a:r>
+          </a:p>
+          <a:p>
+            <a:pPr lvl="1"/>
+            <a:r>
+              <a:rPr lang="en-US" dirty="0"/>
+              <a:t>Standard calling convention</a:t>
+            </a:r>
+            <a:br>
+              <a:rPr lang="en-US" dirty="0"/>
+            </a:br>
+            <a:r>
+              <a:rPr lang="en-US" sz="1200" dirty="0">
+                <a:hlinkClick r:id="rId3"/>
+              </a:rPr>
+              <a:t>https://learn.microsoft.com/en-us/cpp/build/x64-calling-convention</a:t>
+            </a:r>
+            <a:endParaRPr lang="en-US" sz="1200" dirty="0"/>
+          </a:p>
+          <a:p>
+            <a:pPr lvl="1"/>
+            <a:r>
+              <a:rPr lang="en-US" dirty="0">
+                <a:latin typeface="Consolas" panose="020B0609020204030204" pitchFamily="49" charset="0"/>
+              </a:rPr>
+              <a:t>__</a:t>
+            </a:r>
+            <a:r>
+              <a:rPr lang="en-US" dirty="0" err="1">
+                <a:latin typeface="Consolas" panose="020B0609020204030204" pitchFamily="49" charset="0"/>
+              </a:rPr>
+              <a:t>vectorcall</a:t>
+            </a:r>
+            <a:r>
+              <a:rPr lang="en-US" dirty="0"/>
+              <a:t> convention as an extension of the standard convention (unsupported by .NET)</a:t>
+            </a:r>
+            <a:br>
+              <a:rPr lang="en-US" dirty="0"/>
+            </a:br>
+            <a:r>
+              <a:rPr lang="en-US" sz="1200" dirty="0">
+                <a:hlinkClick r:id="rId4"/>
+              </a:rPr>
+              <a:t>https://learn.microsoft.com/en-us/cpp/cpp/vectorcall</a:t>
+            </a:r>
+            <a:endParaRPr lang="en-US" sz="1200" dirty="0"/>
+          </a:p>
+          <a:p>
+            <a:pPr lvl="1"/>
+            <a:endParaRPr lang="en-US" dirty="0"/>
+          </a:p>
+        </p:txBody>
+      </p:sp>
+    </p:spTree>
+    <p:extLst>
+      <p:ext uri="{BB962C8B-B14F-4D97-AF65-F5344CB8AC3E}">
+        <p14:creationId xmlns:p14="http://schemas.microsoft.com/office/powerpoint/2010/main" val="2239621267"/>
       </p:ext>
     </p:extLst>
   </p:cSld>
@@ -24650,8 +25253,8 @@
 </p:sld>
 </file>
 
-<file path=ppt/slides/slide32.xml><?xml version="1.0" encoding="utf-8"?>
-<p:sld xmlns:a="http://schemas.openxmlformats.org/drawingml/2006/main" xmlns:r="http://schemas.openxmlformats.org/officeDocument/2006/relationships" xmlns:p="http://schemas.openxmlformats.org/presentationml/2006/main">
+<file path=ppt/slides/slide33.xml><?xml version="1.0" encoding="utf-8"?>
+<p:sld xmlns:a="http://schemas.openxmlformats.org/drawingml/2006/main" xmlns:r="http://schemas.openxmlformats.org/officeDocument/2006/relationships" xmlns:p="http://schemas.openxmlformats.org/presentationml/2006/main" show="0">
   <p:cSld>
     <p:spTree>
       <p:nvGrpSpPr>
@@ -25078,7 +25681,7 @@
 </p:sld>
 </file>
 
-<file path=ppt/slides/slide33.xml><?xml version="1.0" encoding="utf-8"?>
+<file path=ppt/slides/slide34.xml><?xml version="1.0" encoding="utf-8"?>
 <p:sld xmlns:a="http://schemas.openxmlformats.org/drawingml/2006/main" xmlns:r="http://schemas.openxmlformats.org/officeDocument/2006/relationships" xmlns:p="http://schemas.openxmlformats.org/presentationml/2006/main">
   <p:cSld>
     <p:spTree>
@@ -25185,7 +25788,7 @@
 </p:sld>
 </file>
 
-<file path=ppt/slides/slide34.xml><?xml version="1.0" encoding="utf-8"?>
+<file path=ppt/slides/slide35.xml><?xml version="1.0" encoding="utf-8"?>
 <p:sld xmlns:a="http://schemas.openxmlformats.org/drawingml/2006/main" xmlns:r="http://schemas.openxmlformats.org/officeDocument/2006/relationships" xmlns:p="http://schemas.openxmlformats.org/presentationml/2006/main">
   <p:cSld>
     <p:spTree>
@@ -26295,7 +26898,7 @@
 </p:sld>
 </file>
 
-<file path=ppt/slides/slide35.xml><?xml version="1.0" encoding="utf-8"?>
+<file path=ppt/slides/slide36.xml><?xml version="1.0" encoding="utf-8"?>
 <p:sld xmlns:a="http://schemas.openxmlformats.org/drawingml/2006/main" xmlns:r="http://schemas.openxmlformats.org/officeDocument/2006/relationships" xmlns:p="http://schemas.openxmlformats.org/presentationml/2006/main">
   <p:cSld>
     <p:spTree>
@@ -27948,7 +28551,7 @@
 </p:sld>
 </file>
 
-<file path=ppt/slides/slide36.xml><?xml version="1.0" encoding="utf-8"?>
+<file path=ppt/slides/slide37.xml><?xml version="1.0" encoding="utf-8"?>
 <p:sld xmlns:a="http://schemas.openxmlformats.org/drawingml/2006/main" xmlns:r="http://schemas.openxmlformats.org/officeDocument/2006/relationships" xmlns:p="http://schemas.openxmlformats.org/presentationml/2006/main">
   <p:cSld>
     <p:spTree>
@@ -28389,7 +28992,7 @@
 </p:sld>
 </file>
 
-<file path=ppt/slides/slide37.xml><?xml version="1.0" encoding="utf-8"?>
+<file path=ppt/slides/slide38.xml><?xml version="1.0" encoding="utf-8"?>
 <p:sld xmlns:a="http://schemas.openxmlformats.org/drawingml/2006/main" xmlns:r="http://schemas.openxmlformats.org/officeDocument/2006/relationships" xmlns:p="http://schemas.openxmlformats.org/presentationml/2006/main">
   <p:cSld>
     <p:spTree>
@@ -29236,7 +29839,7 @@
 </p:sld>
 </file>
 
-<file path=ppt/slides/slide38.xml><?xml version="1.0" encoding="utf-8"?>
+<file path=ppt/slides/slide39.xml><?xml version="1.0" encoding="utf-8"?>
 <p:sld xmlns:a="http://schemas.openxmlformats.org/drawingml/2006/main" xmlns:r="http://schemas.openxmlformats.org/officeDocument/2006/relationships" xmlns:p="http://schemas.openxmlformats.org/presentationml/2006/main">
   <p:cSld>
     <p:spTree>
@@ -30064,7 +30667,399 @@
 </p:sld>
 </file>
 
-<file path=ppt/slides/slide39.xml><?xml version="1.0" encoding="utf-8"?>
+<file path=ppt/slides/slide4.xml><?xml version="1.0" encoding="utf-8"?>
+<p:sld xmlns:a="http://schemas.openxmlformats.org/drawingml/2006/main" xmlns:r="http://schemas.openxmlformats.org/officeDocument/2006/relationships" xmlns:p="http://schemas.openxmlformats.org/presentationml/2006/main">
+  <p:cSld>
+    <p:spTree>
+      <p:nvGrpSpPr>
+        <p:cNvPr id="1" name=""/>
+        <p:cNvGrpSpPr/>
+        <p:nvPr/>
+      </p:nvGrpSpPr>
+      <p:grpSpPr>
+        <a:xfrm>
+          <a:off x="0" y="0"/>
+          <a:ext cx="0" cy="0"/>
+          <a:chOff x="0" y="0"/>
+          <a:chExt cx="0" cy="0"/>
+        </a:xfrm>
+      </p:grpSpPr>
+      <p:sp>
+        <p:nvSpPr>
+          <p:cNvPr id="2" name="Title 1">
+            <a:extLst>
+              <a:ext uri="{FF2B5EF4-FFF2-40B4-BE49-F238E27FC236}">
+                <a16:creationId xmlns:a16="http://schemas.microsoft.com/office/drawing/2014/main" id="{2E40FDBA-ADBB-239F-A158-F2CEC1806C5B}"/>
+              </a:ext>
+            </a:extLst>
+          </p:cNvPr>
+          <p:cNvSpPr>
+            <a:spLocks noGrp="1"/>
+          </p:cNvSpPr>
+          <p:nvPr>
+            <p:ph type="title"/>
+          </p:nvPr>
+        </p:nvSpPr>
+        <p:spPr/>
+        <p:txBody>
+          <a:bodyPr/>
+          <a:lstStyle/>
+          <a:p>
+            <a:r>
+              <a:rPr lang="en-US" dirty="0"/>
+              <a:t>What is unsafe code?</a:t>
+            </a:r>
+            <a:br>
+              <a:rPr lang="en-US" dirty="0"/>
+            </a:br>
+            <a:r>
+              <a:rPr lang="en-US" dirty="0"/>
+              <a:t>Mutating the immutable</a:t>
+            </a:r>
+          </a:p>
+        </p:txBody>
+      </p:sp>
+      <p:sp>
+        <p:nvSpPr>
+          <p:cNvPr id="6" name="Rectangle 3">
+            <a:extLst>
+              <a:ext uri="{FF2B5EF4-FFF2-40B4-BE49-F238E27FC236}">
+                <a16:creationId xmlns:a16="http://schemas.microsoft.com/office/drawing/2014/main" id="{18478F97-948F-AF46-3AB7-0D47D90B1085}"/>
+              </a:ext>
+            </a:extLst>
+          </p:cNvPr>
+          <p:cNvSpPr>
+            <a:spLocks noChangeArrowheads="1"/>
+          </p:cNvSpPr>
+          <p:nvPr/>
+        </p:nvSpPr>
+        <p:spPr bwMode="auto">
+          <a:xfrm>
+            <a:off x="1103313" y="2052919"/>
+            <a:ext cx="8946540" cy="4195480"/>
+          </a:xfrm>
+          <a:prstGeom prst="rect">
+            <a:avLst/>
+          </a:prstGeom>
+          <a:solidFill>
+            <a:srgbClr val="FFFFFF"/>
+          </a:solidFill>
+          <a:ln w="15875">
+            <a:solidFill>
+              <a:schemeClr val="accent1"/>
+            </a:solidFill>
+            <a:miter lim="800000"/>
+            <a:headEnd/>
+            <a:tailEnd/>
+          </a:ln>
+          <a:effectLst/>
+          <a:extLst>
+            <a:ext uri="{AF507438-7753-43E0-B8FC-AC1667EBCBE1}">
+              <a14:hiddenEffects xmlns:a14="http://schemas.microsoft.com/office/drawing/2010/main">
+                <a:effectLst>
+                  <a:outerShdw dist="35921" dir="2700000" algn="ctr" rotWithShape="0">
+                    <a:schemeClr val="bg2"/>
+                  </a:outerShdw>
+                </a:effectLst>
+              </a14:hiddenEffects>
+            </a:ext>
+          </a:extLst>
+        </p:spPr>
+        <p:txBody>
+          <a:bodyPr vert="horz" wrap="square" lIns="91440" tIns="45720" rIns="91440" bIns="45720" numCol="1" anchor="t" anchorCtr="0" compatLnSpc="1">
+            <a:prstTxWarp prst="textNoShape">
+              <a:avLst/>
+            </a:prstTxWarp>
+            <a:noAutofit/>
+          </a:bodyPr>
+          <a:lstStyle/>
+          <a:p>
+            <a:pPr marL="0" marR="0" lvl="0" indent="0" algn="l" defTabSz="914400" rtl="0" eaLnBrk="0" fontAlgn="base" latinLnBrk="0" hangingPunct="0">
+              <a:lnSpc>
+                <a:spcPct val="100000"/>
+              </a:lnSpc>
+              <a:spcBef>
+                <a:spcPct val="0"/>
+              </a:spcBef>
+              <a:spcAft>
+                <a:spcPct val="0"/>
+              </a:spcAft>
+              <a:buClrTx/>
+              <a:buSzTx/>
+              <a:buFontTx/>
+              <a:buNone/>
+              <a:tabLst/>
+            </a:pPr>
+            <a:r>
+              <a:rPr kumimoji="0" lang="en-US" altLang="en-US" b="0" i="0" u="none" strike="noStrike" cap="none" normalizeH="0" baseline="0" dirty="0">
+                <a:ln>
+                  <a:noFill/>
+                </a:ln>
+                <a:solidFill>
+                  <a:srgbClr val="0F54D6"/>
+                </a:solidFill>
+                <a:effectLst/>
+                <a:latin typeface="Consolas" panose="020B0609020204030204" pitchFamily="49" charset="0"/>
+              </a:rPr>
+              <a:t>using </a:t>
+            </a:r>
+            <a:r>
+              <a:rPr kumimoji="0" lang="en-US" altLang="en-US" b="0" i="0" u="none" strike="noStrike" cap="none" normalizeH="0" baseline="0" dirty="0" err="1">
+                <a:ln>
+                  <a:noFill/>
+                </a:ln>
+                <a:solidFill>
+                  <a:srgbClr val="6B2FBA"/>
+                </a:solidFill>
+                <a:effectLst/>
+                <a:latin typeface="Consolas" panose="020B0609020204030204" pitchFamily="49" charset="0"/>
+              </a:rPr>
+              <a:t>StringMutation</a:t>
+            </a:r>
+            <a:r>
+              <a:rPr kumimoji="0" lang="en-US" altLang="en-US" b="0" i="0" u="none" strike="noStrike" cap="none" normalizeH="0" baseline="0" dirty="0">
+                <a:ln>
+                  <a:noFill/>
+                </a:ln>
+                <a:solidFill>
+                  <a:srgbClr val="383838"/>
+                </a:solidFill>
+                <a:effectLst/>
+                <a:latin typeface="Consolas" panose="020B0609020204030204" pitchFamily="49" charset="0"/>
+              </a:rPr>
+              <a:t>;</a:t>
+            </a:r>
+            <a:br>
+              <a:rPr kumimoji="0" lang="en-US" altLang="en-US" b="0" i="0" u="none" strike="noStrike" cap="none" normalizeH="0" baseline="0" dirty="0">
+                <a:ln>
+                  <a:noFill/>
+                </a:ln>
+                <a:solidFill>
+                  <a:srgbClr val="383838"/>
+                </a:solidFill>
+                <a:effectLst/>
+                <a:latin typeface="Consolas" panose="020B0609020204030204" pitchFamily="49" charset="0"/>
+              </a:rPr>
+            </a:br>
+            <a:br>
+              <a:rPr kumimoji="0" lang="en-US" altLang="en-US" b="0" i="0" u="none" strike="noStrike" cap="none" normalizeH="0" baseline="0" dirty="0">
+                <a:ln>
+                  <a:noFill/>
+                </a:ln>
+                <a:solidFill>
+                  <a:srgbClr val="383838"/>
+                </a:solidFill>
+                <a:effectLst/>
+                <a:latin typeface="Consolas" panose="020B0609020204030204" pitchFamily="49" charset="0"/>
+              </a:rPr>
+            </a:br>
+            <a:r>
+              <a:rPr kumimoji="0" lang="en-US" altLang="en-US" b="0" i="0" u="none" strike="noStrike" cap="none" normalizeH="0" baseline="0" dirty="0">
+                <a:ln>
+                  <a:noFill/>
+                </a:ln>
+                <a:solidFill>
+                  <a:srgbClr val="0F54D6"/>
+                </a:solidFill>
+                <a:effectLst/>
+                <a:latin typeface="Consolas" panose="020B0609020204030204" pitchFamily="49" charset="0"/>
+              </a:rPr>
+              <a:t>string </a:t>
+            </a:r>
+            <a:r>
+              <a:rPr kumimoji="0" lang="en-US" altLang="en-US" b="0" i="0" u="none" strike="noStrike" cap="none" normalizeH="0" baseline="0" dirty="0">
+                <a:ln>
+                  <a:noFill/>
+                </a:ln>
+                <a:solidFill>
+                  <a:srgbClr val="383838"/>
+                </a:solidFill>
+                <a:effectLst/>
+                <a:latin typeface="Consolas" panose="020B0609020204030204" pitchFamily="49" charset="0"/>
+              </a:rPr>
+              <a:t>s = </a:t>
+            </a:r>
+            <a:r>
+              <a:rPr kumimoji="0" lang="en-US" altLang="en-US" b="0" i="0" u="none" strike="noStrike" cap="none" normalizeH="0" baseline="0" dirty="0">
+                <a:ln>
+                  <a:noFill/>
+                </a:ln>
+                <a:solidFill>
+                  <a:srgbClr val="8C6C41"/>
+                </a:solidFill>
+                <a:effectLst/>
+                <a:latin typeface="Consolas" panose="020B0609020204030204" pitchFamily="49" charset="0"/>
+              </a:rPr>
+              <a:t>"Hello, World!"</a:t>
+            </a:r>
+            <a:r>
+              <a:rPr kumimoji="0" lang="en-US" altLang="en-US" b="0" i="0" u="none" strike="noStrike" cap="none" normalizeH="0" baseline="0" dirty="0">
+                <a:ln>
+                  <a:noFill/>
+                </a:ln>
+                <a:solidFill>
+                  <a:srgbClr val="383838"/>
+                </a:solidFill>
+                <a:effectLst/>
+                <a:latin typeface="Consolas" panose="020B0609020204030204" pitchFamily="49" charset="0"/>
+              </a:rPr>
+              <a:t>;</a:t>
+            </a:r>
+            <a:br>
+              <a:rPr kumimoji="0" lang="en-US" altLang="en-US" b="0" i="0" u="none" strike="noStrike" cap="none" normalizeH="0" baseline="0" dirty="0">
+                <a:ln>
+                  <a:noFill/>
+                </a:ln>
+                <a:solidFill>
+                  <a:srgbClr val="383838"/>
+                </a:solidFill>
+                <a:effectLst/>
+                <a:latin typeface="Consolas" panose="020B0609020204030204" pitchFamily="49" charset="0"/>
+              </a:rPr>
+            </a:br>
+            <a:r>
+              <a:rPr kumimoji="0" lang="en-US" altLang="en-US" b="0" i="0" u="none" strike="noStrike" cap="none" normalizeH="0" baseline="0" dirty="0" err="1">
+                <a:ln>
+                  <a:noFill/>
+                </a:ln>
+                <a:solidFill>
+                  <a:srgbClr val="383838"/>
+                </a:solidFill>
+                <a:effectLst/>
+                <a:latin typeface="Consolas" panose="020B0609020204030204" pitchFamily="49" charset="0"/>
+              </a:rPr>
+              <a:t>s.</a:t>
+            </a:r>
+            <a:r>
+              <a:rPr kumimoji="0" lang="en-US" altLang="en-US" b="0" i="0" u="none" strike="noStrike" cap="none" normalizeH="0" baseline="0" dirty="0" err="1">
+                <a:ln>
+                  <a:noFill/>
+                </a:ln>
+                <a:solidFill>
+                  <a:srgbClr val="00855F"/>
+                </a:solidFill>
+                <a:effectLst/>
+                <a:latin typeface="Consolas" panose="020B0609020204030204" pitchFamily="49" charset="0"/>
+              </a:rPr>
+              <a:t>AsciiToUpper</a:t>
+            </a:r>
+            <a:r>
+              <a:rPr kumimoji="0" lang="en-US" altLang="en-US" b="0" i="0" u="none" strike="noStrike" cap="none" normalizeH="0" baseline="0" dirty="0">
+                <a:ln>
+                  <a:noFill/>
+                </a:ln>
+                <a:solidFill>
+                  <a:srgbClr val="383838"/>
+                </a:solidFill>
+                <a:effectLst/>
+                <a:latin typeface="Consolas" panose="020B0609020204030204" pitchFamily="49" charset="0"/>
+              </a:rPr>
+              <a:t>();</a:t>
+            </a:r>
+            <a:br>
+              <a:rPr kumimoji="0" lang="en-US" altLang="en-US" b="0" i="0" u="none" strike="noStrike" cap="none" normalizeH="0" baseline="0" dirty="0">
+                <a:ln>
+                  <a:noFill/>
+                </a:ln>
+                <a:solidFill>
+                  <a:srgbClr val="383838"/>
+                </a:solidFill>
+                <a:effectLst/>
+                <a:latin typeface="Consolas" panose="020B0609020204030204" pitchFamily="49" charset="0"/>
+              </a:rPr>
+            </a:br>
+            <a:r>
+              <a:rPr kumimoji="0" lang="en-US" altLang="en-US" b="0" i="0" u="none" strike="noStrike" cap="none" normalizeH="0" baseline="0" dirty="0" err="1">
+                <a:ln>
+                  <a:noFill/>
+                </a:ln>
+                <a:solidFill>
+                  <a:srgbClr val="6B2FBA"/>
+                </a:solidFill>
+                <a:effectLst/>
+                <a:latin typeface="Consolas" panose="020B0609020204030204" pitchFamily="49" charset="0"/>
+              </a:rPr>
+              <a:t>Console</a:t>
+            </a:r>
+            <a:r>
+              <a:rPr kumimoji="0" lang="en-US" altLang="en-US" b="0" i="0" u="none" strike="noStrike" cap="none" normalizeH="0" baseline="0" dirty="0" err="1">
+                <a:ln>
+                  <a:noFill/>
+                </a:ln>
+                <a:solidFill>
+                  <a:srgbClr val="383838"/>
+                </a:solidFill>
+                <a:effectLst/>
+                <a:latin typeface="Consolas" panose="020B0609020204030204" pitchFamily="49" charset="0"/>
+              </a:rPr>
+              <a:t>.</a:t>
+            </a:r>
+            <a:r>
+              <a:rPr kumimoji="0" lang="en-US" altLang="en-US" b="0" i="0" u="none" strike="noStrike" cap="none" normalizeH="0" baseline="0" dirty="0" err="1">
+                <a:ln>
+                  <a:noFill/>
+                </a:ln>
+                <a:solidFill>
+                  <a:srgbClr val="00855F"/>
+                </a:solidFill>
+                <a:effectLst/>
+                <a:latin typeface="Consolas" panose="020B0609020204030204" pitchFamily="49" charset="0"/>
+              </a:rPr>
+              <a:t>WriteLine</a:t>
+            </a:r>
+            <a:r>
+              <a:rPr kumimoji="0" lang="en-US" altLang="en-US" b="0" i="0" u="none" strike="noStrike" cap="none" normalizeH="0" baseline="0" dirty="0">
+                <a:ln>
+                  <a:noFill/>
+                </a:ln>
+                <a:solidFill>
+                  <a:srgbClr val="383838"/>
+                </a:solidFill>
+                <a:effectLst/>
+                <a:latin typeface="Consolas" panose="020B0609020204030204" pitchFamily="49" charset="0"/>
+              </a:rPr>
+              <a:t>(s); </a:t>
+            </a:r>
+            <a:r>
+              <a:rPr kumimoji="0" lang="en-US" altLang="en-US" b="0" i="1" u="none" strike="noStrike" cap="none" normalizeH="0" baseline="0" dirty="0">
+                <a:ln>
+                  <a:noFill/>
+                </a:ln>
+                <a:solidFill>
+                  <a:srgbClr val="248700"/>
+                </a:solidFill>
+                <a:effectLst/>
+                <a:latin typeface="Consolas" panose="020B0609020204030204" pitchFamily="49" charset="0"/>
+              </a:rPr>
+              <a:t>// prints "HELLO, WORLD!"</a:t>
+            </a:r>
+            <a:endParaRPr kumimoji="0" lang="en-US" altLang="en-US" b="0" i="0" u="none" strike="noStrike" cap="none" normalizeH="0" baseline="0" dirty="0">
+              <a:ln>
+                <a:noFill/>
+              </a:ln>
+              <a:solidFill>
+                <a:schemeClr val="tx1"/>
+              </a:solidFill>
+              <a:effectLst/>
+              <a:latin typeface="Consolas" panose="020B0609020204030204" pitchFamily="49" charset="0"/>
+            </a:endParaRPr>
+          </a:p>
+        </p:txBody>
+      </p:sp>
+    </p:spTree>
+    <p:extLst>
+      <p:ext uri="{BB962C8B-B14F-4D97-AF65-F5344CB8AC3E}">
+        <p14:creationId xmlns:p14="http://schemas.microsoft.com/office/powerpoint/2010/main" val="2813357318"/>
+      </p:ext>
+    </p:extLst>
+  </p:cSld>
+  <p:clrMapOvr>
+    <a:masterClrMapping/>
+  </p:clrMapOvr>
+</p:sld>
+</file>
+
+<file path=ppt/slides/slide40.xml><?xml version="1.0" encoding="utf-8"?>
 <p:sld xmlns:a="http://schemas.openxmlformats.org/drawingml/2006/main" xmlns:r="http://schemas.openxmlformats.org/officeDocument/2006/relationships" xmlns:p="http://schemas.openxmlformats.org/presentationml/2006/main">
   <p:cSld>
     <p:spTree>
@@ -31419,399 +32414,7 @@
 </p:sld>
 </file>
 
-<file path=ppt/slides/slide4.xml><?xml version="1.0" encoding="utf-8"?>
-<p:sld xmlns:a="http://schemas.openxmlformats.org/drawingml/2006/main" xmlns:r="http://schemas.openxmlformats.org/officeDocument/2006/relationships" xmlns:p="http://schemas.openxmlformats.org/presentationml/2006/main">
-  <p:cSld>
-    <p:spTree>
-      <p:nvGrpSpPr>
-        <p:cNvPr id="1" name=""/>
-        <p:cNvGrpSpPr/>
-        <p:nvPr/>
-      </p:nvGrpSpPr>
-      <p:grpSpPr>
-        <a:xfrm>
-          <a:off x="0" y="0"/>
-          <a:ext cx="0" cy="0"/>
-          <a:chOff x="0" y="0"/>
-          <a:chExt cx="0" cy="0"/>
-        </a:xfrm>
-      </p:grpSpPr>
-      <p:sp>
-        <p:nvSpPr>
-          <p:cNvPr id="2" name="Title 1">
-            <a:extLst>
-              <a:ext uri="{FF2B5EF4-FFF2-40B4-BE49-F238E27FC236}">
-                <a16:creationId xmlns:a16="http://schemas.microsoft.com/office/drawing/2014/main" id="{2E40FDBA-ADBB-239F-A158-F2CEC1806C5B}"/>
-              </a:ext>
-            </a:extLst>
-          </p:cNvPr>
-          <p:cNvSpPr>
-            <a:spLocks noGrp="1"/>
-          </p:cNvSpPr>
-          <p:nvPr>
-            <p:ph type="title"/>
-          </p:nvPr>
-        </p:nvSpPr>
-        <p:spPr/>
-        <p:txBody>
-          <a:bodyPr/>
-          <a:lstStyle/>
-          <a:p>
-            <a:r>
-              <a:rPr lang="en-US" dirty="0"/>
-              <a:t>What is unsafe code?</a:t>
-            </a:r>
-            <a:br>
-              <a:rPr lang="en-US" dirty="0"/>
-            </a:br>
-            <a:r>
-              <a:rPr lang="en-US" dirty="0"/>
-              <a:t>Mutating the immutable</a:t>
-            </a:r>
-          </a:p>
-        </p:txBody>
-      </p:sp>
-      <p:sp>
-        <p:nvSpPr>
-          <p:cNvPr id="6" name="Rectangle 3">
-            <a:extLst>
-              <a:ext uri="{FF2B5EF4-FFF2-40B4-BE49-F238E27FC236}">
-                <a16:creationId xmlns:a16="http://schemas.microsoft.com/office/drawing/2014/main" id="{18478F97-948F-AF46-3AB7-0D47D90B1085}"/>
-              </a:ext>
-            </a:extLst>
-          </p:cNvPr>
-          <p:cNvSpPr>
-            <a:spLocks noChangeArrowheads="1"/>
-          </p:cNvSpPr>
-          <p:nvPr/>
-        </p:nvSpPr>
-        <p:spPr bwMode="auto">
-          <a:xfrm>
-            <a:off x="1103313" y="2052919"/>
-            <a:ext cx="8946540" cy="4195480"/>
-          </a:xfrm>
-          <a:prstGeom prst="rect">
-            <a:avLst/>
-          </a:prstGeom>
-          <a:solidFill>
-            <a:srgbClr val="FFFFFF"/>
-          </a:solidFill>
-          <a:ln w="15875">
-            <a:solidFill>
-              <a:schemeClr val="accent1"/>
-            </a:solidFill>
-            <a:miter lim="800000"/>
-            <a:headEnd/>
-            <a:tailEnd/>
-          </a:ln>
-          <a:effectLst/>
-          <a:extLst>
-            <a:ext uri="{AF507438-7753-43E0-B8FC-AC1667EBCBE1}">
-              <a14:hiddenEffects xmlns:a14="http://schemas.microsoft.com/office/drawing/2010/main">
-                <a:effectLst>
-                  <a:outerShdw dist="35921" dir="2700000" algn="ctr" rotWithShape="0">
-                    <a:schemeClr val="bg2"/>
-                  </a:outerShdw>
-                </a:effectLst>
-              </a14:hiddenEffects>
-            </a:ext>
-          </a:extLst>
-        </p:spPr>
-        <p:txBody>
-          <a:bodyPr vert="horz" wrap="square" lIns="91440" tIns="45720" rIns="91440" bIns="45720" numCol="1" anchor="t" anchorCtr="0" compatLnSpc="1">
-            <a:prstTxWarp prst="textNoShape">
-              <a:avLst/>
-            </a:prstTxWarp>
-            <a:noAutofit/>
-          </a:bodyPr>
-          <a:lstStyle/>
-          <a:p>
-            <a:pPr marL="0" marR="0" lvl="0" indent="0" algn="l" defTabSz="914400" rtl="0" eaLnBrk="0" fontAlgn="base" latinLnBrk="0" hangingPunct="0">
-              <a:lnSpc>
-                <a:spcPct val="100000"/>
-              </a:lnSpc>
-              <a:spcBef>
-                <a:spcPct val="0"/>
-              </a:spcBef>
-              <a:spcAft>
-                <a:spcPct val="0"/>
-              </a:spcAft>
-              <a:buClrTx/>
-              <a:buSzTx/>
-              <a:buFontTx/>
-              <a:buNone/>
-              <a:tabLst/>
-            </a:pPr>
-            <a:r>
-              <a:rPr kumimoji="0" lang="en-US" altLang="en-US" b="0" i="0" u="none" strike="noStrike" cap="none" normalizeH="0" baseline="0" dirty="0">
-                <a:ln>
-                  <a:noFill/>
-                </a:ln>
-                <a:solidFill>
-                  <a:srgbClr val="0F54D6"/>
-                </a:solidFill>
-                <a:effectLst/>
-                <a:latin typeface="Consolas" panose="020B0609020204030204" pitchFamily="49" charset="0"/>
-              </a:rPr>
-              <a:t>using </a:t>
-            </a:r>
-            <a:r>
-              <a:rPr kumimoji="0" lang="en-US" altLang="en-US" b="0" i="0" u="none" strike="noStrike" cap="none" normalizeH="0" baseline="0" dirty="0" err="1">
-                <a:ln>
-                  <a:noFill/>
-                </a:ln>
-                <a:solidFill>
-                  <a:srgbClr val="6B2FBA"/>
-                </a:solidFill>
-                <a:effectLst/>
-                <a:latin typeface="Consolas" panose="020B0609020204030204" pitchFamily="49" charset="0"/>
-              </a:rPr>
-              <a:t>StringMutation</a:t>
-            </a:r>
-            <a:r>
-              <a:rPr kumimoji="0" lang="en-US" altLang="en-US" b="0" i="0" u="none" strike="noStrike" cap="none" normalizeH="0" baseline="0" dirty="0">
-                <a:ln>
-                  <a:noFill/>
-                </a:ln>
-                <a:solidFill>
-                  <a:srgbClr val="383838"/>
-                </a:solidFill>
-                <a:effectLst/>
-                <a:latin typeface="Consolas" panose="020B0609020204030204" pitchFamily="49" charset="0"/>
-              </a:rPr>
-              <a:t>;</a:t>
-            </a:r>
-            <a:br>
-              <a:rPr kumimoji="0" lang="en-US" altLang="en-US" b="0" i="0" u="none" strike="noStrike" cap="none" normalizeH="0" baseline="0" dirty="0">
-                <a:ln>
-                  <a:noFill/>
-                </a:ln>
-                <a:solidFill>
-                  <a:srgbClr val="383838"/>
-                </a:solidFill>
-                <a:effectLst/>
-                <a:latin typeface="Consolas" panose="020B0609020204030204" pitchFamily="49" charset="0"/>
-              </a:rPr>
-            </a:br>
-            <a:br>
-              <a:rPr kumimoji="0" lang="en-US" altLang="en-US" b="0" i="0" u="none" strike="noStrike" cap="none" normalizeH="0" baseline="0" dirty="0">
-                <a:ln>
-                  <a:noFill/>
-                </a:ln>
-                <a:solidFill>
-                  <a:srgbClr val="383838"/>
-                </a:solidFill>
-                <a:effectLst/>
-                <a:latin typeface="Consolas" panose="020B0609020204030204" pitchFamily="49" charset="0"/>
-              </a:rPr>
-            </a:br>
-            <a:r>
-              <a:rPr kumimoji="0" lang="en-US" altLang="en-US" b="0" i="0" u="none" strike="noStrike" cap="none" normalizeH="0" baseline="0" dirty="0">
-                <a:ln>
-                  <a:noFill/>
-                </a:ln>
-                <a:solidFill>
-                  <a:srgbClr val="0F54D6"/>
-                </a:solidFill>
-                <a:effectLst/>
-                <a:latin typeface="Consolas" panose="020B0609020204030204" pitchFamily="49" charset="0"/>
-              </a:rPr>
-              <a:t>string </a:t>
-            </a:r>
-            <a:r>
-              <a:rPr kumimoji="0" lang="en-US" altLang="en-US" b="0" i="0" u="none" strike="noStrike" cap="none" normalizeH="0" baseline="0" dirty="0">
-                <a:ln>
-                  <a:noFill/>
-                </a:ln>
-                <a:solidFill>
-                  <a:srgbClr val="383838"/>
-                </a:solidFill>
-                <a:effectLst/>
-                <a:latin typeface="Consolas" panose="020B0609020204030204" pitchFamily="49" charset="0"/>
-              </a:rPr>
-              <a:t>s = </a:t>
-            </a:r>
-            <a:r>
-              <a:rPr kumimoji="0" lang="en-US" altLang="en-US" b="0" i="0" u="none" strike="noStrike" cap="none" normalizeH="0" baseline="0" dirty="0">
-                <a:ln>
-                  <a:noFill/>
-                </a:ln>
-                <a:solidFill>
-                  <a:srgbClr val="8C6C41"/>
-                </a:solidFill>
-                <a:effectLst/>
-                <a:latin typeface="Consolas" panose="020B0609020204030204" pitchFamily="49" charset="0"/>
-              </a:rPr>
-              <a:t>"Hello, World!"</a:t>
-            </a:r>
-            <a:r>
-              <a:rPr kumimoji="0" lang="en-US" altLang="en-US" b="0" i="0" u="none" strike="noStrike" cap="none" normalizeH="0" baseline="0" dirty="0">
-                <a:ln>
-                  <a:noFill/>
-                </a:ln>
-                <a:solidFill>
-                  <a:srgbClr val="383838"/>
-                </a:solidFill>
-                <a:effectLst/>
-                <a:latin typeface="Consolas" panose="020B0609020204030204" pitchFamily="49" charset="0"/>
-              </a:rPr>
-              <a:t>;</a:t>
-            </a:r>
-            <a:br>
-              <a:rPr kumimoji="0" lang="en-US" altLang="en-US" b="0" i="0" u="none" strike="noStrike" cap="none" normalizeH="0" baseline="0" dirty="0">
-                <a:ln>
-                  <a:noFill/>
-                </a:ln>
-                <a:solidFill>
-                  <a:srgbClr val="383838"/>
-                </a:solidFill>
-                <a:effectLst/>
-                <a:latin typeface="Consolas" panose="020B0609020204030204" pitchFamily="49" charset="0"/>
-              </a:rPr>
-            </a:br>
-            <a:r>
-              <a:rPr kumimoji="0" lang="en-US" altLang="en-US" b="0" i="0" u="none" strike="noStrike" cap="none" normalizeH="0" baseline="0" dirty="0" err="1">
-                <a:ln>
-                  <a:noFill/>
-                </a:ln>
-                <a:solidFill>
-                  <a:srgbClr val="383838"/>
-                </a:solidFill>
-                <a:effectLst/>
-                <a:latin typeface="Consolas" panose="020B0609020204030204" pitchFamily="49" charset="0"/>
-              </a:rPr>
-              <a:t>s.</a:t>
-            </a:r>
-            <a:r>
-              <a:rPr kumimoji="0" lang="en-US" altLang="en-US" b="0" i="0" u="none" strike="noStrike" cap="none" normalizeH="0" baseline="0" dirty="0" err="1">
-                <a:ln>
-                  <a:noFill/>
-                </a:ln>
-                <a:solidFill>
-                  <a:srgbClr val="00855F"/>
-                </a:solidFill>
-                <a:effectLst/>
-                <a:latin typeface="Consolas" panose="020B0609020204030204" pitchFamily="49" charset="0"/>
-              </a:rPr>
-              <a:t>AsciiToUpper</a:t>
-            </a:r>
-            <a:r>
-              <a:rPr kumimoji="0" lang="en-US" altLang="en-US" b="0" i="0" u="none" strike="noStrike" cap="none" normalizeH="0" baseline="0" dirty="0">
-                <a:ln>
-                  <a:noFill/>
-                </a:ln>
-                <a:solidFill>
-                  <a:srgbClr val="383838"/>
-                </a:solidFill>
-                <a:effectLst/>
-                <a:latin typeface="Consolas" panose="020B0609020204030204" pitchFamily="49" charset="0"/>
-              </a:rPr>
-              <a:t>();</a:t>
-            </a:r>
-            <a:br>
-              <a:rPr kumimoji="0" lang="en-US" altLang="en-US" b="0" i="0" u="none" strike="noStrike" cap="none" normalizeH="0" baseline="0" dirty="0">
-                <a:ln>
-                  <a:noFill/>
-                </a:ln>
-                <a:solidFill>
-                  <a:srgbClr val="383838"/>
-                </a:solidFill>
-                <a:effectLst/>
-                <a:latin typeface="Consolas" panose="020B0609020204030204" pitchFamily="49" charset="0"/>
-              </a:rPr>
-            </a:br>
-            <a:r>
-              <a:rPr kumimoji="0" lang="en-US" altLang="en-US" b="0" i="0" u="none" strike="noStrike" cap="none" normalizeH="0" baseline="0" dirty="0" err="1">
-                <a:ln>
-                  <a:noFill/>
-                </a:ln>
-                <a:solidFill>
-                  <a:srgbClr val="6B2FBA"/>
-                </a:solidFill>
-                <a:effectLst/>
-                <a:latin typeface="Consolas" panose="020B0609020204030204" pitchFamily="49" charset="0"/>
-              </a:rPr>
-              <a:t>Console</a:t>
-            </a:r>
-            <a:r>
-              <a:rPr kumimoji="0" lang="en-US" altLang="en-US" b="0" i="0" u="none" strike="noStrike" cap="none" normalizeH="0" baseline="0" dirty="0" err="1">
-                <a:ln>
-                  <a:noFill/>
-                </a:ln>
-                <a:solidFill>
-                  <a:srgbClr val="383838"/>
-                </a:solidFill>
-                <a:effectLst/>
-                <a:latin typeface="Consolas" panose="020B0609020204030204" pitchFamily="49" charset="0"/>
-              </a:rPr>
-              <a:t>.</a:t>
-            </a:r>
-            <a:r>
-              <a:rPr kumimoji="0" lang="en-US" altLang="en-US" b="0" i="0" u="none" strike="noStrike" cap="none" normalizeH="0" baseline="0" dirty="0" err="1">
-                <a:ln>
-                  <a:noFill/>
-                </a:ln>
-                <a:solidFill>
-                  <a:srgbClr val="00855F"/>
-                </a:solidFill>
-                <a:effectLst/>
-                <a:latin typeface="Consolas" panose="020B0609020204030204" pitchFamily="49" charset="0"/>
-              </a:rPr>
-              <a:t>WriteLine</a:t>
-            </a:r>
-            <a:r>
-              <a:rPr kumimoji="0" lang="en-US" altLang="en-US" b="0" i="0" u="none" strike="noStrike" cap="none" normalizeH="0" baseline="0" dirty="0">
-                <a:ln>
-                  <a:noFill/>
-                </a:ln>
-                <a:solidFill>
-                  <a:srgbClr val="383838"/>
-                </a:solidFill>
-                <a:effectLst/>
-                <a:latin typeface="Consolas" panose="020B0609020204030204" pitchFamily="49" charset="0"/>
-              </a:rPr>
-              <a:t>(s); </a:t>
-            </a:r>
-            <a:r>
-              <a:rPr kumimoji="0" lang="en-US" altLang="en-US" b="0" i="1" u="none" strike="noStrike" cap="none" normalizeH="0" baseline="0" dirty="0">
-                <a:ln>
-                  <a:noFill/>
-                </a:ln>
-                <a:solidFill>
-                  <a:srgbClr val="248700"/>
-                </a:solidFill>
-                <a:effectLst/>
-                <a:latin typeface="Consolas" panose="020B0609020204030204" pitchFamily="49" charset="0"/>
-              </a:rPr>
-              <a:t>// prints "HELLO, WORLD!"</a:t>
-            </a:r>
-            <a:endParaRPr kumimoji="0" lang="en-US" altLang="en-US" b="0" i="0" u="none" strike="noStrike" cap="none" normalizeH="0" baseline="0" dirty="0">
-              <a:ln>
-                <a:noFill/>
-              </a:ln>
-              <a:solidFill>
-                <a:schemeClr val="tx1"/>
-              </a:solidFill>
-              <a:effectLst/>
-              <a:latin typeface="Consolas" panose="020B0609020204030204" pitchFamily="49" charset="0"/>
-            </a:endParaRPr>
-          </a:p>
-        </p:txBody>
-      </p:sp>
-    </p:spTree>
-    <p:extLst>
-      <p:ext uri="{BB962C8B-B14F-4D97-AF65-F5344CB8AC3E}">
-        <p14:creationId xmlns:p14="http://schemas.microsoft.com/office/powerpoint/2010/main" val="2813357318"/>
-      </p:ext>
-    </p:extLst>
-  </p:cSld>
-  <p:clrMapOvr>
-    <a:masterClrMapping/>
-  </p:clrMapOvr>
-</p:sld>
-</file>
-
-<file path=ppt/slides/slide40.xml><?xml version="1.0" encoding="utf-8"?>
+<file path=ppt/slides/slide41.xml><?xml version="1.0" encoding="utf-8"?>
 <p:sld xmlns:a="http://schemas.openxmlformats.org/drawingml/2006/main" xmlns:r="http://schemas.openxmlformats.org/officeDocument/2006/relationships" xmlns:p="http://schemas.openxmlformats.org/presentationml/2006/main">
   <p:cSld>
     <p:spTree>
@@ -31918,7 +32521,7 @@
 </p:sld>
 </file>
 
-<file path=ppt/slides/slide41.xml><?xml version="1.0" encoding="utf-8"?>
+<file path=ppt/slides/slide42.xml><?xml version="1.0" encoding="utf-8"?>
 <p:sld xmlns:a="http://schemas.openxmlformats.org/drawingml/2006/main" xmlns:r="http://schemas.openxmlformats.org/officeDocument/2006/relationships" xmlns:p="http://schemas.openxmlformats.org/presentationml/2006/main">
   <p:cSld>
     <p:spTree>
@@ -33792,7 +34395,7 @@
 </p:sld>
 </file>
 
-<file path=ppt/slides/slide42.xml><?xml version="1.0" encoding="utf-8"?>
+<file path=ppt/slides/slide43.xml><?xml version="1.0" encoding="utf-8"?>
 <p:sld xmlns:a="http://schemas.openxmlformats.org/drawingml/2006/main" xmlns:r="http://schemas.openxmlformats.org/officeDocument/2006/relationships" xmlns:p="http://schemas.openxmlformats.org/presentationml/2006/main">
   <p:cSld>
     <p:spTree>
@@ -34497,7 +35100,7 @@
 </p:sld>
 </file>
 
-<file path=ppt/slides/slide43.xml><?xml version="1.0" encoding="utf-8"?>
+<file path=ppt/slides/slide44.xml><?xml version="1.0" encoding="utf-8"?>
 <p:sld xmlns:a="http://schemas.openxmlformats.org/drawingml/2006/main" xmlns:r="http://schemas.openxmlformats.org/officeDocument/2006/relationships" xmlns:p="http://schemas.openxmlformats.org/presentationml/2006/main">
   <p:cSld>
     <p:spTree>
@@ -35950,7 +36553,7 @@
 </p:sld>
 </file>
 
-<file path=ppt/slides/slide44.xml><?xml version="1.0" encoding="utf-8"?>
+<file path=ppt/slides/slide45.xml><?xml version="1.0" encoding="utf-8"?>
 <p:sld xmlns:a="http://schemas.openxmlformats.org/drawingml/2006/main" xmlns:r="http://schemas.openxmlformats.org/officeDocument/2006/relationships" xmlns:p="http://schemas.openxmlformats.org/presentationml/2006/main">
   <p:cSld>
     <p:spTree>
@@ -36712,7 +37315,7 @@
 </p:sld>
 </file>
 
-<file path=ppt/slides/slide45.xml><?xml version="1.0" encoding="utf-8"?>
+<file path=ppt/slides/slide46.xml><?xml version="1.0" encoding="utf-8"?>
 <p:sld xmlns:a="http://schemas.openxmlformats.org/drawingml/2006/main" xmlns:r="http://schemas.openxmlformats.org/officeDocument/2006/relationships" xmlns:p="http://schemas.openxmlformats.org/presentationml/2006/main">
   <p:cSld>
     <p:spTree>
@@ -37389,7 +37992,7 @@
 </p:sld>
 </file>
 
-<file path=ppt/slides/slide46.xml><?xml version="1.0" encoding="utf-8"?>
+<file path=ppt/slides/slide47.xml><?xml version="1.0" encoding="utf-8"?>
 <p:sld xmlns:a="http://schemas.openxmlformats.org/drawingml/2006/main" xmlns:r="http://schemas.openxmlformats.org/officeDocument/2006/relationships" xmlns:p="http://schemas.openxmlformats.org/presentationml/2006/main">
   <p:cSld>
     <p:spTree>
@@ -38460,7 +39063,7 @@
 </p:sld>
 </file>
 
-<file path=ppt/slides/slide47.xml><?xml version="1.0" encoding="utf-8"?>
+<file path=ppt/slides/slide48.xml><?xml version="1.0" encoding="utf-8"?>
 <p:sld xmlns:a="http://schemas.openxmlformats.org/drawingml/2006/main" xmlns:r="http://schemas.openxmlformats.org/officeDocument/2006/relationships" xmlns:p="http://schemas.openxmlformats.org/presentationml/2006/main">
   <p:cSld>
     <p:spTree>
@@ -39435,7 +40038,7 @@
 </p:sld>
 </file>
 
-<file path=ppt/slides/slide48.xml><?xml version="1.0" encoding="utf-8"?>
+<file path=ppt/slides/slide49.xml><?xml version="1.0" encoding="utf-8"?>
 <p:sld xmlns:a="http://schemas.openxmlformats.org/drawingml/2006/main" xmlns:r="http://schemas.openxmlformats.org/officeDocument/2006/relationships" xmlns:p="http://schemas.openxmlformats.org/presentationml/2006/main">
   <p:cSld>
     <p:spTree>
@@ -40398,948 +41001,6 @@
     <p:extLst>
       <p:ext uri="{BB962C8B-B14F-4D97-AF65-F5344CB8AC3E}">
         <p14:creationId xmlns:p14="http://schemas.microsoft.com/office/powerpoint/2010/main" val="388947774"/>
-      </p:ext>
-    </p:extLst>
-  </p:cSld>
-  <p:clrMapOvr>
-    <a:masterClrMapping/>
-  </p:clrMapOvr>
-</p:sld>
-</file>
-
-<file path=ppt/slides/slide49.xml><?xml version="1.0" encoding="utf-8"?>
-<p:sld xmlns:a="http://schemas.openxmlformats.org/drawingml/2006/main" xmlns:r="http://schemas.openxmlformats.org/officeDocument/2006/relationships" xmlns:p="http://schemas.openxmlformats.org/presentationml/2006/main">
-  <p:cSld>
-    <p:spTree>
-      <p:nvGrpSpPr>
-        <p:cNvPr id="1" name=""/>
-        <p:cNvGrpSpPr/>
-        <p:nvPr/>
-      </p:nvGrpSpPr>
-      <p:grpSpPr>
-        <a:xfrm>
-          <a:off x="0" y="0"/>
-          <a:ext cx="0" cy="0"/>
-          <a:chOff x="0" y="0"/>
-          <a:chExt cx="0" cy="0"/>
-        </a:xfrm>
-      </p:grpSpPr>
-      <p:sp>
-        <p:nvSpPr>
-          <p:cNvPr id="2" name="Title 1">
-            <a:extLst>
-              <a:ext uri="{FF2B5EF4-FFF2-40B4-BE49-F238E27FC236}">
-                <a16:creationId xmlns:a16="http://schemas.microsoft.com/office/drawing/2014/main" id="{460E7349-3668-1694-59A3-82EAEF33A19D}"/>
-              </a:ext>
-            </a:extLst>
-          </p:cNvPr>
-          <p:cNvSpPr>
-            <a:spLocks noGrp="1"/>
-          </p:cNvSpPr>
-          <p:nvPr>
-            <p:ph type="title"/>
-          </p:nvPr>
-        </p:nvSpPr>
-        <p:spPr/>
-        <p:txBody>
-          <a:bodyPr/>
-          <a:lstStyle/>
-          <a:p>
-            <a:r>
-              <a:rPr lang="en-US" dirty="0"/>
-              <a:t>Callbacks</a:t>
-            </a:r>
-            <a:br>
-              <a:rPr lang="en-US" dirty="0"/>
-            </a:br>
-            <a:r>
-              <a:rPr lang="en-US" dirty="0"/>
-              <a:t>The .NET 5 way II</a:t>
-            </a:r>
-          </a:p>
-        </p:txBody>
-      </p:sp>
-      <p:sp>
-        <p:nvSpPr>
-          <p:cNvPr id="4" name="Rectangle 1">
-            <a:extLst>
-              <a:ext uri="{FF2B5EF4-FFF2-40B4-BE49-F238E27FC236}">
-                <a16:creationId xmlns:a16="http://schemas.microsoft.com/office/drawing/2014/main" id="{5A5DC751-9DE1-9238-0C17-DDD5298887B0}"/>
-              </a:ext>
-            </a:extLst>
-          </p:cNvPr>
-          <p:cNvSpPr>
-            <a:spLocks noChangeArrowheads="1"/>
-          </p:cNvSpPr>
-          <p:nvPr/>
-        </p:nvSpPr>
-        <p:spPr bwMode="auto">
-          <a:xfrm>
-            <a:off x="1103312" y="2052919"/>
-            <a:ext cx="8946541" cy="4195480"/>
-          </a:xfrm>
-          <a:prstGeom prst="rect">
-            <a:avLst/>
-          </a:prstGeom>
-          <a:solidFill>
-            <a:srgbClr val="FFFFFF"/>
-          </a:solidFill>
-          <a:ln w="15875">
-            <a:solidFill>
-              <a:schemeClr val="accent1"/>
-            </a:solidFill>
-            <a:miter lim="800000"/>
-            <a:headEnd/>
-            <a:tailEnd/>
-          </a:ln>
-          <a:effectLst/>
-          <a:extLst>
-            <a:ext uri="{AF507438-7753-43E0-B8FC-AC1667EBCBE1}">
-              <a14:hiddenEffects xmlns:a14="http://schemas.microsoft.com/office/drawing/2010/main">
-                <a:effectLst>
-                  <a:outerShdw dist="35921" dir="2700000" algn="ctr" rotWithShape="0">
-                    <a:schemeClr val="bg2"/>
-                  </a:outerShdw>
-                </a:effectLst>
-              </a14:hiddenEffects>
-            </a:ext>
-          </a:extLst>
-        </p:spPr>
-        <p:txBody>
-          <a:bodyPr vert="horz" wrap="none" lIns="91440" tIns="45720" rIns="91440" bIns="45720" numCol="1" anchor="t" anchorCtr="0" compatLnSpc="1">
-            <a:prstTxWarp prst="textNoShape">
-              <a:avLst/>
-            </a:prstTxWarp>
-            <a:noAutofit/>
-          </a:bodyPr>
-          <a:lstStyle/>
-          <a:p>
-            <a:pPr marL="0" marR="0" lvl="0" indent="0" algn="l" defTabSz="914400" rtl="0" eaLnBrk="0" fontAlgn="base" latinLnBrk="0" hangingPunct="0">
-              <a:lnSpc>
-                <a:spcPct val="100000"/>
-              </a:lnSpc>
-              <a:spcBef>
-                <a:spcPct val="0"/>
-              </a:spcBef>
-              <a:spcAft>
-                <a:spcPct val="0"/>
-              </a:spcAft>
-              <a:buClrTx/>
-              <a:buSzTx/>
-              <a:buFontTx/>
-              <a:buNone/>
-              <a:tabLst/>
-            </a:pPr>
-            <a:r>
-              <a:rPr kumimoji="0" lang="en-US" altLang="en-US" b="0" i="0" u="none" strike="noStrike" cap="none" normalizeH="0" baseline="0" dirty="0">
-                <a:ln>
-                  <a:noFill/>
-                </a:ln>
-                <a:solidFill>
-                  <a:srgbClr val="0F54D6"/>
-                </a:solidFill>
-                <a:effectLst/>
-                <a:latin typeface="Consolas" panose="020B0609020204030204" pitchFamily="49" charset="0"/>
-              </a:rPr>
-              <a:t>public unsafe void </a:t>
-            </a:r>
-            <a:r>
-              <a:rPr kumimoji="0" lang="en-US" altLang="en-US" b="0" i="0" u="none" strike="noStrike" cap="none" normalizeH="0" baseline="0" dirty="0">
-                <a:ln>
-                  <a:noFill/>
-                </a:ln>
-                <a:solidFill>
-                  <a:srgbClr val="00855F"/>
-                </a:solidFill>
-                <a:effectLst/>
-                <a:latin typeface="Consolas" panose="020B0609020204030204" pitchFamily="49" charset="0"/>
-              </a:rPr>
-              <a:t>Execute</a:t>
-            </a:r>
-            <a:r>
-              <a:rPr kumimoji="0" lang="en-US" altLang="en-US" b="0" i="0" u="none" strike="noStrike" cap="none" normalizeH="0" baseline="0" dirty="0">
-                <a:ln>
-                  <a:noFill/>
-                </a:ln>
-                <a:solidFill>
-                  <a:srgbClr val="383838"/>
-                </a:solidFill>
-                <a:effectLst/>
-                <a:latin typeface="Consolas" panose="020B0609020204030204" pitchFamily="49" charset="0"/>
-              </a:rPr>
-              <a:t>(</a:t>
-            </a:r>
-          </a:p>
-          <a:p>
-            <a:pPr marL="0" marR="0" lvl="0" indent="0" algn="l" defTabSz="914400" rtl="0" eaLnBrk="0" fontAlgn="base" latinLnBrk="0" hangingPunct="0">
-              <a:lnSpc>
-                <a:spcPct val="100000"/>
-              </a:lnSpc>
-              <a:spcBef>
-                <a:spcPct val="0"/>
-              </a:spcBef>
-              <a:spcAft>
-                <a:spcPct val="0"/>
-              </a:spcAft>
-              <a:buClrTx/>
-              <a:buSzTx/>
-              <a:buFontTx/>
-              <a:buNone/>
-              <a:tabLst/>
-            </a:pPr>
-            <a:r>
-              <a:rPr lang="en-US" altLang="en-US" dirty="0">
-                <a:solidFill>
-                  <a:srgbClr val="383838"/>
-                </a:solidFill>
-                <a:latin typeface="Consolas" panose="020B0609020204030204" pitchFamily="49" charset="0"/>
-              </a:rPr>
-              <a:t>    </a:t>
-            </a:r>
-            <a:r>
-              <a:rPr kumimoji="0" lang="en-US" altLang="en-US" b="0" i="0" u="none" strike="noStrike" cap="none" normalizeH="0" baseline="0" dirty="0">
-                <a:ln>
-                  <a:noFill/>
-                </a:ln>
-                <a:solidFill>
-                  <a:srgbClr val="0F54D6"/>
-                </a:solidFill>
-                <a:effectLst/>
-                <a:latin typeface="Consolas" panose="020B0609020204030204" pitchFamily="49" charset="0"/>
-              </a:rPr>
-              <a:t>string </a:t>
-            </a:r>
-            <a:r>
-              <a:rPr kumimoji="0" lang="en-US" altLang="en-US" b="0" i="0" u="none" strike="noStrike" cap="none" normalizeH="0" baseline="0" dirty="0" err="1">
-                <a:ln>
-                  <a:noFill/>
-                </a:ln>
-                <a:solidFill>
-                  <a:srgbClr val="383838"/>
-                </a:solidFill>
-                <a:effectLst/>
-                <a:latin typeface="Consolas" panose="020B0609020204030204" pitchFamily="49" charset="0"/>
-              </a:rPr>
-              <a:t>sql</a:t>
-            </a:r>
-            <a:r>
-              <a:rPr kumimoji="0" lang="en-US" altLang="en-US" b="0" i="0" u="none" strike="noStrike" cap="none" normalizeH="0" baseline="0" dirty="0">
-                <a:ln>
-                  <a:noFill/>
-                </a:ln>
-                <a:solidFill>
-                  <a:srgbClr val="383838"/>
-                </a:solidFill>
-                <a:effectLst/>
-                <a:latin typeface="Consolas" panose="020B0609020204030204" pitchFamily="49" charset="0"/>
-              </a:rPr>
-              <a:t>,</a:t>
-            </a:r>
-          </a:p>
-          <a:p>
-            <a:pPr marL="0" marR="0" lvl="0" indent="0" algn="l" defTabSz="914400" rtl="0" eaLnBrk="0" fontAlgn="base" latinLnBrk="0" hangingPunct="0">
-              <a:lnSpc>
-                <a:spcPct val="100000"/>
-              </a:lnSpc>
-              <a:spcBef>
-                <a:spcPct val="0"/>
-              </a:spcBef>
-              <a:spcAft>
-                <a:spcPct val="0"/>
-              </a:spcAft>
-              <a:buClrTx/>
-              <a:buSzTx/>
-              <a:buFontTx/>
-              <a:buNone/>
-              <a:tabLst/>
-            </a:pPr>
-            <a:r>
-              <a:rPr lang="en-US" altLang="en-US" dirty="0">
-                <a:solidFill>
-                  <a:srgbClr val="383838"/>
-                </a:solidFill>
-                <a:latin typeface="Consolas" panose="020B0609020204030204" pitchFamily="49" charset="0"/>
-              </a:rPr>
-              <a:t>    </a:t>
-            </a:r>
-            <a:r>
-              <a:rPr kumimoji="0" lang="en-US" altLang="en-US" b="0" i="0" u="none" strike="noStrike" cap="none" normalizeH="0" baseline="0" dirty="0">
-                <a:ln>
-                  <a:noFill/>
-                </a:ln>
-                <a:solidFill>
-                  <a:srgbClr val="0F54D6"/>
-                </a:solidFill>
-                <a:effectLst/>
-                <a:latin typeface="Consolas" panose="020B0609020204030204" pitchFamily="49" charset="0"/>
-              </a:rPr>
-              <a:t>delegate</a:t>
-            </a:r>
-            <a:r>
-              <a:rPr kumimoji="0" lang="en-US" altLang="en-US" b="0" i="0" u="none" strike="noStrike" cap="none" normalizeH="0" baseline="0" dirty="0">
-                <a:ln>
-                  <a:noFill/>
-                </a:ln>
-                <a:solidFill>
-                  <a:srgbClr val="383838"/>
-                </a:solidFill>
-                <a:effectLst/>
-                <a:latin typeface="Consolas" panose="020B0609020204030204" pitchFamily="49" charset="0"/>
-              </a:rPr>
-              <a:t>* </a:t>
-            </a:r>
-            <a:r>
-              <a:rPr kumimoji="0" lang="en-US" altLang="en-US" b="0" i="0" u="none" strike="noStrike" cap="none" normalizeH="0" baseline="0" dirty="0">
-                <a:ln>
-                  <a:noFill/>
-                </a:ln>
-                <a:solidFill>
-                  <a:srgbClr val="202020"/>
-                </a:solidFill>
-                <a:effectLst/>
-                <a:latin typeface="Consolas" panose="020B0609020204030204" pitchFamily="49" charset="0"/>
-              </a:rPr>
-              <a:t>unmanaged</a:t>
-            </a:r>
-            <a:r>
-              <a:rPr kumimoji="0" lang="en-US" altLang="en-US" b="0" i="0" u="none" strike="noStrike" cap="none" normalizeH="0" baseline="0" dirty="0">
-                <a:ln>
-                  <a:noFill/>
-                </a:ln>
-                <a:solidFill>
-                  <a:srgbClr val="383838"/>
-                </a:solidFill>
-                <a:effectLst/>
-                <a:latin typeface="Consolas" panose="020B0609020204030204" pitchFamily="49" charset="0"/>
-              </a:rPr>
-              <a:t>[</a:t>
-            </a:r>
-            <a:r>
-              <a:rPr kumimoji="0" lang="en-US" altLang="en-US" b="0" i="0" u="none" strike="noStrike" cap="none" normalizeH="0" baseline="0" dirty="0" err="1">
-                <a:ln>
-                  <a:noFill/>
-                </a:ln>
-                <a:solidFill>
-                  <a:srgbClr val="383838"/>
-                </a:solidFill>
-                <a:effectLst/>
-                <a:latin typeface="Consolas" panose="020B0609020204030204" pitchFamily="49" charset="0"/>
-              </a:rPr>
-              <a:t>Cdecl</a:t>
-            </a:r>
-            <a:r>
-              <a:rPr kumimoji="0" lang="en-US" altLang="en-US" b="0" i="0" u="none" strike="noStrike" cap="none" normalizeH="0" baseline="0" dirty="0">
-                <a:ln>
-                  <a:noFill/>
-                </a:ln>
-                <a:solidFill>
-                  <a:srgbClr val="383838"/>
-                </a:solidFill>
-                <a:effectLst/>
-                <a:latin typeface="Consolas" panose="020B0609020204030204" pitchFamily="49" charset="0"/>
-              </a:rPr>
-              <a:t>]</a:t>
-            </a:r>
-          </a:p>
-          <a:p>
-            <a:pPr marL="0" marR="0" lvl="0" indent="0" algn="l" defTabSz="914400" rtl="0" eaLnBrk="0" fontAlgn="base" latinLnBrk="0" hangingPunct="0">
-              <a:lnSpc>
-                <a:spcPct val="100000"/>
-              </a:lnSpc>
-              <a:spcBef>
-                <a:spcPct val="0"/>
-              </a:spcBef>
-              <a:spcAft>
-                <a:spcPct val="0"/>
-              </a:spcAft>
-              <a:buClrTx/>
-              <a:buSzTx/>
-              <a:buFontTx/>
-              <a:buNone/>
-              <a:tabLst/>
-            </a:pPr>
-            <a:r>
-              <a:rPr lang="en-US" altLang="en-US" dirty="0">
-                <a:solidFill>
-                  <a:srgbClr val="383838"/>
-                </a:solidFill>
-                <a:latin typeface="Consolas" panose="020B0609020204030204" pitchFamily="49" charset="0"/>
-              </a:rPr>
-              <a:t>        </a:t>
-            </a:r>
-            <a:r>
-              <a:rPr kumimoji="0" lang="en-US" altLang="en-US" b="0" i="0" u="none" strike="noStrike" cap="none" normalizeH="0" baseline="0" dirty="0">
-                <a:ln>
-                  <a:noFill/>
-                </a:ln>
-                <a:solidFill>
-                  <a:srgbClr val="383838"/>
-                </a:solidFill>
-                <a:effectLst/>
-                <a:latin typeface="Consolas" panose="020B0609020204030204" pitchFamily="49" charset="0"/>
-              </a:rPr>
-              <a:t>&lt;</a:t>
-            </a:r>
-            <a:r>
-              <a:rPr kumimoji="0" lang="en-US" altLang="en-US" b="0" i="0" u="none" strike="noStrike" cap="none" normalizeH="0" baseline="0" dirty="0">
-                <a:ln>
-                  <a:noFill/>
-                </a:ln>
-                <a:solidFill>
-                  <a:srgbClr val="0F54D6"/>
-                </a:solidFill>
-                <a:effectLst/>
-                <a:latin typeface="Consolas" panose="020B0609020204030204" pitchFamily="49" charset="0"/>
-              </a:rPr>
-              <a:t>void</a:t>
-            </a:r>
-            <a:r>
-              <a:rPr kumimoji="0" lang="en-US" altLang="en-US" b="0" i="0" u="none" strike="noStrike" cap="none" normalizeH="0" baseline="0" dirty="0">
-                <a:ln>
-                  <a:noFill/>
-                </a:ln>
-                <a:solidFill>
-                  <a:srgbClr val="383838"/>
-                </a:solidFill>
-                <a:effectLst/>
-                <a:latin typeface="Consolas" panose="020B0609020204030204" pitchFamily="49" charset="0"/>
-              </a:rPr>
-              <a:t>*, </a:t>
-            </a:r>
-            <a:r>
-              <a:rPr kumimoji="0" lang="en-US" altLang="en-US" b="0" i="0" u="none" strike="noStrike" cap="none" normalizeH="0" baseline="0" dirty="0">
-                <a:ln>
-                  <a:noFill/>
-                </a:ln>
-                <a:solidFill>
-                  <a:srgbClr val="0F54D6"/>
-                </a:solidFill>
-                <a:effectLst/>
-                <a:latin typeface="Consolas" panose="020B0609020204030204" pitchFamily="49" charset="0"/>
-              </a:rPr>
-              <a:t>int</a:t>
-            </a:r>
-            <a:r>
-              <a:rPr kumimoji="0" lang="en-US" altLang="en-US" b="0" i="0" u="none" strike="noStrike" cap="none" normalizeH="0" baseline="0" dirty="0">
-                <a:ln>
-                  <a:noFill/>
-                </a:ln>
-                <a:solidFill>
-                  <a:srgbClr val="383838"/>
-                </a:solidFill>
-                <a:effectLst/>
-                <a:latin typeface="Consolas" panose="020B0609020204030204" pitchFamily="49" charset="0"/>
-              </a:rPr>
-              <a:t>, </a:t>
-            </a:r>
-            <a:r>
-              <a:rPr kumimoji="0" lang="en-US" altLang="en-US" b="0" i="0" u="none" strike="noStrike" cap="none" normalizeH="0" baseline="0" dirty="0">
-                <a:ln>
-                  <a:noFill/>
-                </a:ln>
-                <a:solidFill>
-                  <a:srgbClr val="0F54D6"/>
-                </a:solidFill>
-                <a:effectLst/>
-                <a:latin typeface="Consolas" panose="020B0609020204030204" pitchFamily="49" charset="0"/>
-              </a:rPr>
-              <a:t>byte</a:t>
-            </a:r>
-            <a:r>
-              <a:rPr kumimoji="0" lang="en-US" altLang="en-US" b="0" i="0" u="none" strike="noStrike" cap="none" normalizeH="0" baseline="0" dirty="0">
-                <a:ln>
-                  <a:noFill/>
-                </a:ln>
-                <a:solidFill>
-                  <a:srgbClr val="383838"/>
-                </a:solidFill>
-                <a:effectLst/>
-                <a:latin typeface="Consolas" panose="020B0609020204030204" pitchFamily="49" charset="0"/>
-              </a:rPr>
-              <a:t>**, </a:t>
-            </a:r>
-            <a:r>
-              <a:rPr kumimoji="0" lang="en-US" altLang="en-US" b="0" i="0" u="none" strike="noStrike" cap="none" normalizeH="0" baseline="0" dirty="0">
-                <a:ln>
-                  <a:noFill/>
-                </a:ln>
-                <a:solidFill>
-                  <a:srgbClr val="0F54D6"/>
-                </a:solidFill>
-                <a:effectLst/>
-                <a:latin typeface="Consolas" panose="020B0609020204030204" pitchFamily="49" charset="0"/>
-              </a:rPr>
-              <a:t>byte</a:t>
-            </a:r>
-            <a:r>
-              <a:rPr kumimoji="0" lang="en-US" altLang="en-US" b="0" i="0" u="none" strike="noStrike" cap="none" normalizeH="0" baseline="0" dirty="0">
-                <a:ln>
-                  <a:noFill/>
-                </a:ln>
-                <a:solidFill>
-                  <a:srgbClr val="383838"/>
-                </a:solidFill>
-                <a:effectLst/>
-                <a:latin typeface="Consolas" panose="020B0609020204030204" pitchFamily="49" charset="0"/>
-              </a:rPr>
-              <a:t>**, </a:t>
-            </a:r>
-            <a:r>
-              <a:rPr kumimoji="0" lang="en-US" altLang="en-US" b="0" i="0" u="none" strike="noStrike" cap="none" normalizeH="0" baseline="0" dirty="0" err="1">
-                <a:ln>
-                  <a:noFill/>
-                </a:ln>
-                <a:solidFill>
-                  <a:srgbClr val="300073"/>
-                </a:solidFill>
-                <a:effectLst/>
-                <a:latin typeface="Consolas" panose="020B0609020204030204" pitchFamily="49" charset="0"/>
-              </a:rPr>
-              <a:t>ResultCode</a:t>
-            </a:r>
-            <a:r>
-              <a:rPr kumimoji="0" lang="en-US" altLang="en-US" b="0" i="0" u="none" strike="noStrike" cap="none" normalizeH="0" baseline="0" dirty="0">
-                <a:ln>
-                  <a:noFill/>
-                </a:ln>
-                <a:solidFill>
-                  <a:srgbClr val="383838"/>
-                </a:solidFill>
-                <a:effectLst/>
-                <a:latin typeface="Consolas" panose="020B0609020204030204" pitchFamily="49" charset="0"/>
-              </a:rPr>
-              <a:t>&gt; callback)</a:t>
-            </a:r>
-            <a:br>
-              <a:rPr kumimoji="0" lang="en-US" altLang="en-US" b="0" i="0" u="none" strike="noStrike" cap="none" normalizeH="0" baseline="0" dirty="0">
-                <a:ln>
-                  <a:noFill/>
-                </a:ln>
-                <a:solidFill>
-                  <a:srgbClr val="383838"/>
-                </a:solidFill>
-                <a:effectLst/>
-                <a:latin typeface="Consolas" panose="020B0609020204030204" pitchFamily="49" charset="0"/>
-              </a:rPr>
-            </a:br>
-            <a:r>
-              <a:rPr kumimoji="0" lang="en-US" altLang="en-US" b="0" i="0" u="none" strike="noStrike" cap="none" normalizeH="0" baseline="0" dirty="0">
-                <a:ln>
-                  <a:noFill/>
-                </a:ln>
-                <a:solidFill>
-                  <a:srgbClr val="383838"/>
-                </a:solidFill>
-                <a:effectLst/>
-                <a:latin typeface="Consolas" panose="020B0609020204030204" pitchFamily="49" charset="0"/>
-              </a:rPr>
-              <a:t>{</a:t>
-            </a:r>
-            <a:br>
-              <a:rPr kumimoji="0" lang="en-US" altLang="en-US" b="0" i="1" u="none" strike="noStrike" cap="none" normalizeH="0" baseline="0" dirty="0">
-                <a:ln>
-                  <a:noFill/>
-                </a:ln>
-                <a:solidFill>
-                  <a:srgbClr val="248700"/>
-                </a:solidFill>
-                <a:effectLst/>
-                <a:latin typeface="Consolas" panose="020B0609020204030204" pitchFamily="49" charset="0"/>
-              </a:rPr>
-            </a:br>
-            <a:r>
-              <a:rPr kumimoji="0" lang="en-US" altLang="en-US" b="0" i="1" u="none" strike="noStrike" cap="none" normalizeH="0" baseline="0" dirty="0">
-                <a:ln>
-                  <a:noFill/>
-                </a:ln>
-                <a:solidFill>
-                  <a:srgbClr val="248700"/>
-                </a:solidFill>
-                <a:effectLst/>
-                <a:latin typeface="Consolas" panose="020B0609020204030204" pitchFamily="49" charset="0"/>
-              </a:rPr>
-              <a:t>    </a:t>
-            </a:r>
-            <a:r>
-              <a:rPr kumimoji="0" lang="en-US" altLang="en-US" b="0" i="0" u="none" strike="noStrike" cap="none" normalizeH="0" baseline="0" dirty="0">
-                <a:ln>
-                  <a:noFill/>
-                </a:ln>
-                <a:solidFill>
-                  <a:srgbClr val="0F54D6"/>
-                </a:solidFill>
-                <a:effectLst/>
-                <a:latin typeface="Consolas" panose="020B0609020204030204" pitchFamily="49" charset="0"/>
-              </a:rPr>
-              <a:t>if </a:t>
-            </a:r>
-            <a:r>
-              <a:rPr kumimoji="0" lang="en-US" altLang="en-US" b="0" i="0" u="none" strike="noStrike" cap="none" normalizeH="0" baseline="0" dirty="0">
-                <a:ln>
-                  <a:noFill/>
-                </a:ln>
-                <a:solidFill>
-                  <a:srgbClr val="383838"/>
-                </a:solidFill>
-                <a:effectLst/>
-                <a:latin typeface="Consolas" panose="020B0609020204030204" pitchFamily="49" charset="0"/>
-              </a:rPr>
-              <a:t>(</a:t>
-            </a:r>
-            <a:r>
-              <a:rPr kumimoji="0" lang="en-US" altLang="en-US" b="0" i="0" u="none" strike="noStrike" cap="none" normalizeH="0" baseline="0" dirty="0" err="1">
-                <a:ln>
-                  <a:noFill/>
-                </a:ln>
-                <a:solidFill>
-                  <a:srgbClr val="6B2FBA"/>
-                </a:solidFill>
-                <a:effectLst/>
-                <a:latin typeface="Consolas" panose="020B0609020204030204" pitchFamily="49" charset="0"/>
-              </a:rPr>
-              <a:t>Sqlite</a:t>
-            </a:r>
-            <a:r>
-              <a:rPr kumimoji="0" lang="en-US" altLang="en-US" b="0" i="0" u="none" strike="noStrike" cap="none" normalizeH="0" baseline="0" dirty="0" err="1">
-                <a:ln>
-                  <a:noFill/>
-                </a:ln>
-                <a:solidFill>
-                  <a:srgbClr val="383838"/>
-                </a:solidFill>
-                <a:effectLst/>
-                <a:latin typeface="Consolas" panose="020B0609020204030204" pitchFamily="49" charset="0"/>
-              </a:rPr>
-              <a:t>.</a:t>
-            </a:r>
-            <a:r>
-              <a:rPr kumimoji="0" lang="en-US" altLang="en-US" b="0" i="0" u="none" strike="noStrike" cap="none" normalizeH="0" baseline="0" dirty="0" err="1">
-                <a:ln>
-                  <a:noFill/>
-                </a:ln>
-                <a:solidFill>
-                  <a:srgbClr val="00855F"/>
-                </a:solidFill>
-                <a:effectLst/>
-                <a:latin typeface="Consolas" panose="020B0609020204030204" pitchFamily="49" charset="0"/>
-              </a:rPr>
-              <a:t>Execute</a:t>
-            </a:r>
-            <a:r>
-              <a:rPr kumimoji="0" lang="en-US" altLang="en-US" b="0" i="0" u="none" strike="noStrike" cap="none" normalizeH="0" baseline="0" dirty="0">
-                <a:ln>
-                  <a:noFill/>
-                </a:ln>
-                <a:solidFill>
-                  <a:srgbClr val="383838"/>
-                </a:solidFill>
-                <a:effectLst/>
-                <a:latin typeface="Consolas" panose="020B0609020204030204" pitchFamily="49" charset="0"/>
-              </a:rPr>
-              <a:t>(</a:t>
-            </a:r>
-          </a:p>
-          <a:p>
-            <a:pPr marL="0" marR="0" lvl="0" indent="0" algn="l" defTabSz="914400" rtl="0" eaLnBrk="0" fontAlgn="base" latinLnBrk="0" hangingPunct="0">
-              <a:lnSpc>
-                <a:spcPct val="100000"/>
-              </a:lnSpc>
-              <a:spcBef>
-                <a:spcPct val="0"/>
-              </a:spcBef>
-              <a:spcAft>
-                <a:spcPct val="0"/>
-              </a:spcAft>
-              <a:buClrTx/>
-              <a:buSzTx/>
-              <a:buFontTx/>
-              <a:buNone/>
-              <a:tabLst/>
-            </a:pPr>
-            <a:r>
-              <a:rPr lang="en-US" altLang="en-US" dirty="0">
-                <a:solidFill>
-                  <a:srgbClr val="383838"/>
-                </a:solidFill>
-                <a:latin typeface="Consolas" panose="020B0609020204030204" pitchFamily="49" charset="0"/>
-              </a:rPr>
-              <a:t>        </a:t>
-            </a:r>
-            <a:r>
-              <a:rPr kumimoji="0" lang="en-US" altLang="en-US" b="0" i="0" u="none" strike="noStrike" cap="none" normalizeH="0" baseline="0" dirty="0">
-                <a:ln>
-                  <a:noFill/>
-                </a:ln>
-                <a:solidFill>
-                  <a:srgbClr val="0093A1"/>
-                </a:solidFill>
-                <a:effectLst/>
-                <a:latin typeface="Consolas" panose="020B0609020204030204" pitchFamily="49" charset="0"/>
-              </a:rPr>
-              <a:t>_</a:t>
-            </a:r>
-            <a:r>
-              <a:rPr kumimoji="0" lang="en-US" altLang="en-US" b="0" i="0" u="none" strike="noStrike" cap="none" normalizeH="0" baseline="0" dirty="0" err="1">
-                <a:ln>
-                  <a:noFill/>
-                </a:ln>
-                <a:solidFill>
-                  <a:srgbClr val="0093A1"/>
-                </a:solidFill>
-                <a:effectLst/>
-                <a:latin typeface="Consolas" panose="020B0609020204030204" pitchFamily="49" charset="0"/>
-              </a:rPr>
-              <a:t>databaseHandle</a:t>
-            </a:r>
-            <a:r>
-              <a:rPr kumimoji="0" lang="en-US" altLang="en-US" b="0" i="0" u="none" strike="noStrike" cap="none" normalizeH="0" baseline="0" dirty="0">
-                <a:ln>
-                  <a:noFill/>
-                </a:ln>
-                <a:solidFill>
-                  <a:srgbClr val="383838"/>
-                </a:solidFill>
-                <a:effectLst/>
-                <a:latin typeface="Consolas" panose="020B0609020204030204" pitchFamily="49" charset="0"/>
-              </a:rPr>
-              <a:t>, </a:t>
-            </a:r>
-            <a:r>
-              <a:rPr kumimoji="0" lang="en-US" altLang="en-US" b="0" i="0" u="none" strike="noStrike" cap="none" normalizeH="0" baseline="0" dirty="0" err="1">
-                <a:ln>
-                  <a:noFill/>
-                </a:ln>
-                <a:solidFill>
-                  <a:srgbClr val="383838"/>
-                </a:solidFill>
-                <a:effectLst/>
-                <a:latin typeface="Consolas" panose="020B0609020204030204" pitchFamily="49" charset="0"/>
-              </a:rPr>
-              <a:t>sql</a:t>
-            </a:r>
-            <a:r>
-              <a:rPr kumimoji="0" lang="en-US" altLang="en-US" b="0" i="0" u="none" strike="noStrike" cap="none" normalizeH="0" baseline="0" dirty="0">
-                <a:ln>
-                  <a:noFill/>
-                </a:ln>
-                <a:solidFill>
-                  <a:srgbClr val="383838"/>
-                </a:solidFill>
-                <a:effectLst/>
-                <a:latin typeface="Consolas" panose="020B0609020204030204" pitchFamily="49" charset="0"/>
-              </a:rPr>
-              <a:t>, callback, </a:t>
-            </a:r>
-            <a:r>
-              <a:rPr kumimoji="0" lang="en-US" altLang="en-US" b="0" i="0" u="none" strike="noStrike" cap="none" normalizeH="0" baseline="0" dirty="0">
-                <a:ln>
-                  <a:noFill/>
-                </a:ln>
-                <a:solidFill>
-                  <a:srgbClr val="0F54D6"/>
-                </a:solidFill>
-                <a:effectLst/>
-                <a:latin typeface="Consolas" panose="020B0609020204030204" pitchFamily="49" charset="0"/>
-              </a:rPr>
-              <a:t>null</a:t>
-            </a:r>
-            <a:r>
-              <a:rPr kumimoji="0" lang="en-US" altLang="en-US" b="0" i="0" u="none" strike="noStrike" cap="none" normalizeH="0" baseline="0" dirty="0">
-                <a:ln>
-                  <a:noFill/>
-                </a:ln>
-                <a:solidFill>
-                  <a:srgbClr val="383838"/>
-                </a:solidFill>
-                <a:effectLst/>
-                <a:latin typeface="Consolas" panose="020B0609020204030204" pitchFamily="49" charset="0"/>
-              </a:rPr>
-              <a:t>, </a:t>
-            </a:r>
-            <a:r>
-              <a:rPr kumimoji="0" lang="en-US" altLang="en-US" b="0" i="0" u="none" strike="noStrike" cap="none" normalizeH="0" baseline="0" dirty="0">
-                <a:ln>
-                  <a:noFill/>
-                </a:ln>
-                <a:solidFill>
-                  <a:srgbClr val="0F54D6"/>
-                </a:solidFill>
-                <a:effectLst/>
-                <a:latin typeface="Consolas" panose="020B0609020204030204" pitchFamily="49" charset="0"/>
-              </a:rPr>
-              <a:t>null</a:t>
-            </a:r>
-            <a:r>
-              <a:rPr kumimoji="0" lang="en-US" altLang="en-US" b="0" i="0" u="none" strike="noStrike" cap="none" normalizeH="0" baseline="0" dirty="0">
-                <a:ln>
-                  <a:noFill/>
-                </a:ln>
-                <a:solidFill>
-                  <a:srgbClr val="383838"/>
-                </a:solidFill>
-                <a:effectLst/>
-                <a:latin typeface="Consolas" panose="020B0609020204030204" pitchFamily="49" charset="0"/>
-              </a:rPr>
-              <a:t>) != </a:t>
-            </a:r>
-            <a:r>
-              <a:rPr kumimoji="0" lang="en-US" altLang="en-US" b="0" i="0" u="none" strike="noStrike" cap="none" normalizeH="0" baseline="0" dirty="0">
-                <a:ln>
-                  <a:noFill/>
-                </a:ln>
-                <a:solidFill>
-                  <a:srgbClr val="AB2F6B"/>
-                </a:solidFill>
-                <a:effectLst/>
-                <a:latin typeface="Consolas" panose="020B0609020204030204" pitchFamily="49" charset="0"/>
-              </a:rPr>
-              <a:t>0</a:t>
-            </a:r>
-            <a:r>
-              <a:rPr kumimoji="0" lang="en-US" altLang="en-US" b="0" i="0" u="none" strike="noStrike" cap="none" normalizeH="0" baseline="0" dirty="0">
-                <a:ln>
-                  <a:noFill/>
-                </a:ln>
-                <a:solidFill>
-                  <a:srgbClr val="383838"/>
-                </a:solidFill>
-                <a:effectLst/>
-                <a:latin typeface="Consolas" panose="020B0609020204030204" pitchFamily="49" charset="0"/>
-              </a:rPr>
-              <a:t>)</a:t>
-            </a:r>
-            <a:br>
-              <a:rPr kumimoji="0" lang="en-US" altLang="en-US" b="0" i="0" u="none" strike="noStrike" cap="none" normalizeH="0" baseline="0" dirty="0">
-                <a:ln>
-                  <a:noFill/>
-                </a:ln>
-                <a:solidFill>
-                  <a:srgbClr val="383838"/>
-                </a:solidFill>
-                <a:effectLst/>
-                <a:latin typeface="Consolas" panose="020B0609020204030204" pitchFamily="49" charset="0"/>
-              </a:rPr>
-            </a:br>
-            <a:r>
-              <a:rPr kumimoji="0" lang="en-US" altLang="en-US" b="0" i="0" u="none" strike="noStrike" cap="none" normalizeH="0" baseline="0" dirty="0">
-                <a:ln>
-                  <a:noFill/>
-                </a:ln>
-                <a:solidFill>
-                  <a:srgbClr val="383838"/>
-                </a:solidFill>
-                <a:effectLst/>
-                <a:latin typeface="Consolas" panose="020B0609020204030204" pitchFamily="49" charset="0"/>
-              </a:rPr>
-              <a:t>        </a:t>
-            </a:r>
-            <a:r>
-              <a:rPr kumimoji="0" lang="en-US" altLang="en-US" b="0" i="0" u="none" strike="noStrike" cap="none" normalizeH="0" baseline="0" dirty="0">
-                <a:ln>
-                  <a:noFill/>
-                </a:ln>
-                <a:solidFill>
-                  <a:srgbClr val="0F54D6"/>
-                </a:solidFill>
-                <a:effectLst/>
-                <a:latin typeface="Consolas" panose="020B0609020204030204" pitchFamily="49" charset="0"/>
-              </a:rPr>
-              <a:t>throw new </a:t>
-            </a:r>
-            <a:r>
-              <a:rPr kumimoji="0" lang="en-US" altLang="en-US" b="0" i="0" u="none" strike="noStrike" cap="none" normalizeH="0" baseline="0" dirty="0">
-                <a:ln>
-                  <a:noFill/>
-                </a:ln>
-                <a:solidFill>
-                  <a:srgbClr val="6B2FBA"/>
-                </a:solidFill>
-                <a:effectLst/>
-                <a:latin typeface="Consolas" panose="020B0609020204030204" pitchFamily="49" charset="0"/>
-              </a:rPr>
-              <a:t>Exception</a:t>
-            </a:r>
-            <a:r>
-              <a:rPr kumimoji="0" lang="en-US" altLang="en-US" b="0" i="0" u="none" strike="noStrike" cap="none" normalizeH="0" baseline="0" dirty="0">
-                <a:ln>
-                  <a:noFill/>
-                </a:ln>
-                <a:solidFill>
-                  <a:srgbClr val="383838"/>
-                </a:solidFill>
-                <a:effectLst/>
-                <a:latin typeface="Consolas" panose="020B0609020204030204" pitchFamily="49" charset="0"/>
-              </a:rPr>
-              <a:t>(</a:t>
-            </a:r>
-            <a:r>
-              <a:rPr kumimoji="0" lang="en-US" altLang="en-US" b="0" i="0" u="none" strike="noStrike" cap="none" normalizeH="0" baseline="0" dirty="0">
-                <a:ln>
-                  <a:noFill/>
-                </a:ln>
-                <a:solidFill>
-                  <a:srgbClr val="8C6C41"/>
-                </a:solidFill>
-                <a:effectLst/>
-                <a:latin typeface="Consolas" panose="020B0609020204030204" pitchFamily="49" charset="0"/>
-              </a:rPr>
-              <a:t>"Script execution failed."</a:t>
-            </a:r>
-            <a:r>
-              <a:rPr kumimoji="0" lang="en-US" altLang="en-US" b="0" i="0" u="none" strike="noStrike" cap="none" normalizeH="0" baseline="0" dirty="0">
-                <a:ln>
-                  <a:noFill/>
-                </a:ln>
-                <a:solidFill>
-                  <a:srgbClr val="383838"/>
-                </a:solidFill>
-                <a:effectLst/>
-                <a:latin typeface="Consolas" panose="020B0609020204030204" pitchFamily="49" charset="0"/>
-              </a:rPr>
-              <a:t>);</a:t>
-            </a:r>
-            <a:br>
-              <a:rPr kumimoji="0" lang="en-US" altLang="en-US" b="0" i="0" u="none" strike="noStrike" cap="none" normalizeH="0" baseline="0" dirty="0">
-                <a:ln>
-                  <a:noFill/>
-                </a:ln>
-                <a:solidFill>
-                  <a:srgbClr val="383838"/>
-                </a:solidFill>
-                <a:effectLst/>
-                <a:latin typeface="Consolas" panose="020B0609020204030204" pitchFamily="49" charset="0"/>
-              </a:rPr>
-            </a:br>
-            <a:r>
-              <a:rPr kumimoji="0" lang="en-US" altLang="en-US" b="0" i="0" u="none" strike="noStrike" cap="none" normalizeH="0" baseline="0" dirty="0">
-                <a:ln>
-                  <a:noFill/>
-                </a:ln>
-                <a:solidFill>
-                  <a:srgbClr val="383838"/>
-                </a:solidFill>
-                <a:effectLst/>
-                <a:latin typeface="Consolas" panose="020B0609020204030204" pitchFamily="49" charset="0"/>
-              </a:rPr>
-              <a:t>}</a:t>
-            </a:r>
-            <a:endParaRPr kumimoji="0" lang="en-US" altLang="en-US" b="0" i="0" u="none" strike="noStrike" cap="none" normalizeH="0" baseline="0" dirty="0">
-              <a:ln>
-                <a:noFill/>
-              </a:ln>
-              <a:solidFill>
-                <a:schemeClr val="tx1"/>
-              </a:solidFill>
-              <a:effectLst/>
-              <a:latin typeface="Consolas" panose="020B0609020204030204" pitchFamily="49" charset="0"/>
-            </a:endParaRPr>
-          </a:p>
-        </p:txBody>
-      </p:sp>
-    </p:spTree>
-    <p:extLst>
-      <p:ext uri="{BB962C8B-B14F-4D97-AF65-F5344CB8AC3E}">
-        <p14:creationId xmlns:p14="http://schemas.microsoft.com/office/powerpoint/2010/main" val="3707188046"/>
       </p:ext>
     </p:extLst>
   </p:cSld>
@@ -42341,6 +42002,948 @@
           <p:cNvPr id="2" name="Title 1">
             <a:extLst>
               <a:ext uri="{FF2B5EF4-FFF2-40B4-BE49-F238E27FC236}">
+                <a16:creationId xmlns:a16="http://schemas.microsoft.com/office/drawing/2014/main" id="{460E7349-3668-1694-59A3-82EAEF33A19D}"/>
+              </a:ext>
+            </a:extLst>
+          </p:cNvPr>
+          <p:cNvSpPr>
+            <a:spLocks noGrp="1"/>
+          </p:cNvSpPr>
+          <p:nvPr>
+            <p:ph type="title"/>
+          </p:nvPr>
+        </p:nvSpPr>
+        <p:spPr/>
+        <p:txBody>
+          <a:bodyPr/>
+          <a:lstStyle/>
+          <a:p>
+            <a:r>
+              <a:rPr lang="en-US" dirty="0"/>
+              <a:t>Callbacks</a:t>
+            </a:r>
+            <a:br>
+              <a:rPr lang="en-US" dirty="0"/>
+            </a:br>
+            <a:r>
+              <a:rPr lang="en-US" dirty="0"/>
+              <a:t>The .NET 5 way II</a:t>
+            </a:r>
+          </a:p>
+        </p:txBody>
+      </p:sp>
+      <p:sp>
+        <p:nvSpPr>
+          <p:cNvPr id="4" name="Rectangle 1">
+            <a:extLst>
+              <a:ext uri="{FF2B5EF4-FFF2-40B4-BE49-F238E27FC236}">
+                <a16:creationId xmlns:a16="http://schemas.microsoft.com/office/drawing/2014/main" id="{5A5DC751-9DE1-9238-0C17-DDD5298887B0}"/>
+              </a:ext>
+            </a:extLst>
+          </p:cNvPr>
+          <p:cNvSpPr>
+            <a:spLocks noChangeArrowheads="1"/>
+          </p:cNvSpPr>
+          <p:nvPr/>
+        </p:nvSpPr>
+        <p:spPr bwMode="auto">
+          <a:xfrm>
+            <a:off x="1103312" y="2052919"/>
+            <a:ext cx="8946541" cy="4195480"/>
+          </a:xfrm>
+          <a:prstGeom prst="rect">
+            <a:avLst/>
+          </a:prstGeom>
+          <a:solidFill>
+            <a:srgbClr val="FFFFFF"/>
+          </a:solidFill>
+          <a:ln w="15875">
+            <a:solidFill>
+              <a:schemeClr val="accent1"/>
+            </a:solidFill>
+            <a:miter lim="800000"/>
+            <a:headEnd/>
+            <a:tailEnd/>
+          </a:ln>
+          <a:effectLst/>
+          <a:extLst>
+            <a:ext uri="{AF507438-7753-43E0-B8FC-AC1667EBCBE1}">
+              <a14:hiddenEffects xmlns:a14="http://schemas.microsoft.com/office/drawing/2010/main">
+                <a:effectLst>
+                  <a:outerShdw dist="35921" dir="2700000" algn="ctr" rotWithShape="0">
+                    <a:schemeClr val="bg2"/>
+                  </a:outerShdw>
+                </a:effectLst>
+              </a14:hiddenEffects>
+            </a:ext>
+          </a:extLst>
+        </p:spPr>
+        <p:txBody>
+          <a:bodyPr vert="horz" wrap="none" lIns="91440" tIns="45720" rIns="91440" bIns="45720" numCol="1" anchor="t" anchorCtr="0" compatLnSpc="1">
+            <a:prstTxWarp prst="textNoShape">
+              <a:avLst/>
+            </a:prstTxWarp>
+            <a:noAutofit/>
+          </a:bodyPr>
+          <a:lstStyle/>
+          <a:p>
+            <a:pPr marL="0" marR="0" lvl="0" indent="0" algn="l" defTabSz="914400" rtl="0" eaLnBrk="0" fontAlgn="base" latinLnBrk="0" hangingPunct="0">
+              <a:lnSpc>
+                <a:spcPct val="100000"/>
+              </a:lnSpc>
+              <a:spcBef>
+                <a:spcPct val="0"/>
+              </a:spcBef>
+              <a:spcAft>
+                <a:spcPct val="0"/>
+              </a:spcAft>
+              <a:buClrTx/>
+              <a:buSzTx/>
+              <a:buFontTx/>
+              <a:buNone/>
+              <a:tabLst/>
+            </a:pPr>
+            <a:r>
+              <a:rPr kumimoji="0" lang="en-US" altLang="en-US" b="0" i="0" u="none" strike="noStrike" cap="none" normalizeH="0" baseline="0" dirty="0">
+                <a:ln>
+                  <a:noFill/>
+                </a:ln>
+                <a:solidFill>
+                  <a:srgbClr val="0F54D6"/>
+                </a:solidFill>
+                <a:effectLst/>
+                <a:latin typeface="Consolas" panose="020B0609020204030204" pitchFamily="49" charset="0"/>
+              </a:rPr>
+              <a:t>public unsafe void </a:t>
+            </a:r>
+            <a:r>
+              <a:rPr kumimoji="0" lang="en-US" altLang="en-US" b="0" i="0" u="none" strike="noStrike" cap="none" normalizeH="0" baseline="0" dirty="0">
+                <a:ln>
+                  <a:noFill/>
+                </a:ln>
+                <a:solidFill>
+                  <a:srgbClr val="00855F"/>
+                </a:solidFill>
+                <a:effectLst/>
+                <a:latin typeface="Consolas" panose="020B0609020204030204" pitchFamily="49" charset="0"/>
+              </a:rPr>
+              <a:t>Execute</a:t>
+            </a:r>
+            <a:r>
+              <a:rPr kumimoji="0" lang="en-US" altLang="en-US" b="0" i="0" u="none" strike="noStrike" cap="none" normalizeH="0" baseline="0" dirty="0">
+                <a:ln>
+                  <a:noFill/>
+                </a:ln>
+                <a:solidFill>
+                  <a:srgbClr val="383838"/>
+                </a:solidFill>
+                <a:effectLst/>
+                <a:latin typeface="Consolas" panose="020B0609020204030204" pitchFamily="49" charset="0"/>
+              </a:rPr>
+              <a:t>(</a:t>
+            </a:r>
+          </a:p>
+          <a:p>
+            <a:pPr marL="0" marR="0" lvl="0" indent="0" algn="l" defTabSz="914400" rtl="0" eaLnBrk="0" fontAlgn="base" latinLnBrk="0" hangingPunct="0">
+              <a:lnSpc>
+                <a:spcPct val="100000"/>
+              </a:lnSpc>
+              <a:spcBef>
+                <a:spcPct val="0"/>
+              </a:spcBef>
+              <a:spcAft>
+                <a:spcPct val="0"/>
+              </a:spcAft>
+              <a:buClrTx/>
+              <a:buSzTx/>
+              <a:buFontTx/>
+              <a:buNone/>
+              <a:tabLst/>
+            </a:pPr>
+            <a:r>
+              <a:rPr lang="en-US" altLang="en-US" dirty="0">
+                <a:solidFill>
+                  <a:srgbClr val="383838"/>
+                </a:solidFill>
+                <a:latin typeface="Consolas" panose="020B0609020204030204" pitchFamily="49" charset="0"/>
+              </a:rPr>
+              <a:t>    </a:t>
+            </a:r>
+            <a:r>
+              <a:rPr kumimoji="0" lang="en-US" altLang="en-US" b="0" i="0" u="none" strike="noStrike" cap="none" normalizeH="0" baseline="0" dirty="0">
+                <a:ln>
+                  <a:noFill/>
+                </a:ln>
+                <a:solidFill>
+                  <a:srgbClr val="0F54D6"/>
+                </a:solidFill>
+                <a:effectLst/>
+                <a:latin typeface="Consolas" panose="020B0609020204030204" pitchFamily="49" charset="0"/>
+              </a:rPr>
+              <a:t>string </a:t>
+            </a:r>
+            <a:r>
+              <a:rPr kumimoji="0" lang="en-US" altLang="en-US" b="0" i="0" u="none" strike="noStrike" cap="none" normalizeH="0" baseline="0" dirty="0" err="1">
+                <a:ln>
+                  <a:noFill/>
+                </a:ln>
+                <a:solidFill>
+                  <a:srgbClr val="383838"/>
+                </a:solidFill>
+                <a:effectLst/>
+                <a:latin typeface="Consolas" panose="020B0609020204030204" pitchFamily="49" charset="0"/>
+              </a:rPr>
+              <a:t>sql</a:t>
+            </a:r>
+            <a:r>
+              <a:rPr kumimoji="0" lang="en-US" altLang="en-US" b="0" i="0" u="none" strike="noStrike" cap="none" normalizeH="0" baseline="0" dirty="0">
+                <a:ln>
+                  <a:noFill/>
+                </a:ln>
+                <a:solidFill>
+                  <a:srgbClr val="383838"/>
+                </a:solidFill>
+                <a:effectLst/>
+                <a:latin typeface="Consolas" panose="020B0609020204030204" pitchFamily="49" charset="0"/>
+              </a:rPr>
+              <a:t>,</a:t>
+            </a:r>
+          </a:p>
+          <a:p>
+            <a:pPr marL="0" marR="0" lvl="0" indent="0" algn="l" defTabSz="914400" rtl="0" eaLnBrk="0" fontAlgn="base" latinLnBrk="0" hangingPunct="0">
+              <a:lnSpc>
+                <a:spcPct val="100000"/>
+              </a:lnSpc>
+              <a:spcBef>
+                <a:spcPct val="0"/>
+              </a:spcBef>
+              <a:spcAft>
+                <a:spcPct val="0"/>
+              </a:spcAft>
+              <a:buClrTx/>
+              <a:buSzTx/>
+              <a:buFontTx/>
+              <a:buNone/>
+              <a:tabLst/>
+            </a:pPr>
+            <a:r>
+              <a:rPr lang="en-US" altLang="en-US" dirty="0">
+                <a:solidFill>
+                  <a:srgbClr val="383838"/>
+                </a:solidFill>
+                <a:latin typeface="Consolas" panose="020B0609020204030204" pitchFamily="49" charset="0"/>
+              </a:rPr>
+              <a:t>    </a:t>
+            </a:r>
+            <a:r>
+              <a:rPr kumimoji="0" lang="en-US" altLang="en-US" b="0" i="0" u="none" strike="noStrike" cap="none" normalizeH="0" baseline="0" dirty="0">
+                <a:ln>
+                  <a:noFill/>
+                </a:ln>
+                <a:solidFill>
+                  <a:srgbClr val="0F54D6"/>
+                </a:solidFill>
+                <a:effectLst/>
+                <a:latin typeface="Consolas" panose="020B0609020204030204" pitchFamily="49" charset="0"/>
+              </a:rPr>
+              <a:t>delegate</a:t>
+            </a:r>
+            <a:r>
+              <a:rPr kumimoji="0" lang="en-US" altLang="en-US" b="0" i="0" u="none" strike="noStrike" cap="none" normalizeH="0" baseline="0" dirty="0">
+                <a:ln>
+                  <a:noFill/>
+                </a:ln>
+                <a:solidFill>
+                  <a:srgbClr val="383838"/>
+                </a:solidFill>
+                <a:effectLst/>
+                <a:latin typeface="Consolas" panose="020B0609020204030204" pitchFamily="49" charset="0"/>
+              </a:rPr>
+              <a:t>* </a:t>
+            </a:r>
+            <a:r>
+              <a:rPr kumimoji="0" lang="en-US" altLang="en-US" b="0" i="0" u="none" strike="noStrike" cap="none" normalizeH="0" baseline="0" dirty="0">
+                <a:ln>
+                  <a:noFill/>
+                </a:ln>
+                <a:solidFill>
+                  <a:srgbClr val="202020"/>
+                </a:solidFill>
+                <a:effectLst/>
+                <a:latin typeface="Consolas" panose="020B0609020204030204" pitchFamily="49" charset="0"/>
+              </a:rPr>
+              <a:t>unmanaged</a:t>
+            </a:r>
+            <a:r>
+              <a:rPr kumimoji="0" lang="en-US" altLang="en-US" b="0" i="0" u="none" strike="noStrike" cap="none" normalizeH="0" baseline="0" dirty="0">
+                <a:ln>
+                  <a:noFill/>
+                </a:ln>
+                <a:solidFill>
+                  <a:srgbClr val="383838"/>
+                </a:solidFill>
+                <a:effectLst/>
+                <a:latin typeface="Consolas" panose="020B0609020204030204" pitchFamily="49" charset="0"/>
+              </a:rPr>
+              <a:t>[</a:t>
+            </a:r>
+            <a:r>
+              <a:rPr kumimoji="0" lang="en-US" altLang="en-US" b="0" i="0" u="none" strike="noStrike" cap="none" normalizeH="0" baseline="0" dirty="0" err="1">
+                <a:ln>
+                  <a:noFill/>
+                </a:ln>
+                <a:solidFill>
+                  <a:srgbClr val="383838"/>
+                </a:solidFill>
+                <a:effectLst/>
+                <a:latin typeface="Consolas" panose="020B0609020204030204" pitchFamily="49" charset="0"/>
+              </a:rPr>
+              <a:t>Cdecl</a:t>
+            </a:r>
+            <a:r>
+              <a:rPr kumimoji="0" lang="en-US" altLang="en-US" b="0" i="0" u="none" strike="noStrike" cap="none" normalizeH="0" baseline="0" dirty="0">
+                <a:ln>
+                  <a:noFill/>
+                </a:ln>
+                <a:solidFill>
+                  <a:srgbClr val="383838"/>
+                </a:solidFill>
+                <a:effectLst/>
+                <a:latin typeface="Consolas" panose="020B0609020204030204" pitchFamily="49" charset="0"/>
+              </a:rPr>
+              <a:t>]</a:t>
+            </a:r>
+          </a:p>
+          <a:p>
+            <a:pPr marL="0" marR="0" lvl="0" indent="0" algn="l" defTabSz="914400" rtl="0" eaLnBrk="0" fontAlgn="base" latinLnBrk="0" hangingPunct="0">
+              <a:lnSpc>
+                <a:spcPct val="100000"/>
+              </a:lnSpc>
+              <a:spcBef>
+                <a:spcPct val="0"/>
+              </a:spcBef>
+              <a:spcAft>
+                <a:spcPct val="0"/>
+              </a:spcAft>
+              <a:buClrTx/>
+              <a:buSzTx/>
+              <a:buFontTx/>
+              <a:buNone/>
+              <a:tabLst/>
+            </a:pPr>
+            <a:r>
+              <a:rPr lang="en-US" altLang="en-US" dirty="0">
+                <a:solidFill>
+                  <a:srgbClr val="383838"/>
+                </a:solidFill>
+                <a:latin typeface="Consolas" panose="020B0609020204030204" pitchFamily="49" charset="0"/>
+              </a:rPr>
+              <a:t>        </a:t>
+            </a:r>
+            <a:r>
+              <a:rPr kumimoji="0" lang="en-US" altLang="en-US" b="0" i="0" u="none" strike="noStrike" cap="none" normalizeH="0" baseline="0" dirty="0">
+                <a:ln>
+                  <a:noFill/>
+                </a:ln>
+                <a:solidFill>
+                  <a:srgbClr val="383838"/>
+                </a:solidFill>
+                <a:effectLst/>
+                <a:latin typeface="Consolas" panose="020B0609020204030204" pitchFamily="49" charset="0"/>
+              </a:rPr>
+              <a:t>&lt;</a:t>
+            </a:r>
+            <a:r>
+              <a:rPr kumimoji="0" lang="en-US" altLang="en-US" b="0" i="0" u="none" strike="noStrike" cap="none" normalizeH="0" baseline="0" dirty="0">
+                <a:ln>
+                  <a:noFill/>
+                </a:ln>
+                <a:solidFill>
+                  <a:srgbClr val="0F54D6"/>
+                </a:solidFill>
+                <a:effectLst/>
+                <a:latin typeface="Consolas" panose="020B0609020204030204" pitchFamily="49" charset="0"/>
+              </a:rPr>
+              <a:t>void</a:t>
+            </a:r>
+            <a:r>
+              <a:rPr kumimoji="0" lang="en-US" altLang="en-US" b="0" i="0" u="none" strike="noStrike" cap="none" normalizeH="0" baseline="0" dirty="0">
+                <a:ln>
+                  <a:noFill/>
+                </a:ln>
+                <a:solidFill>
+                  <a:srgbClr val="383838"/>
+                </a:solidFill>
+                <a:effectLst/>
+                <a:latin typeface="Consolas" panose="020B0609020204030204" pitchFamily="49" charset="0"/>
+              </a:rPr>
+              <a:t>*, </a:t>
+            </a:r>
+            <a:r>
+              <a:rPr kumimoji="0" lang="en-US" altLang="en-US" b="0" i="0" u="none" strike="noStrike" cap="none" normalizeH="0" baseline="0" dirty="0">
+                <a:ln>
+                  <a:noFill/>
+                </a:ln>
+                <a:solidFill>
+                  <a:srgbClr val="0F54D6"/>
+                </a:solidFill>
+                <a:effectLst/>
+                <a:latin typeface="Consolas" panose="020B0609020204030204" pitchFamily="49" charset="0"/>
+              </a:rPr>
+              <a:t>int</a:t>
+            </a:r>
+            <a:r>
+              <a:rPr kumimoji="0" lang="en-US" altLang="en-US" b="0" i="0" u="none" strike="noStrike" cap="none" normalizeH="0" baseline="0" dirty="0">
+                <a:ln>
+                  <a:noFill/>
+                </a:ln>
+                <a:solidFill>
+                  <a:srgbClr val="383838"/>
+                </a:solidFill>
+                <a:effectLst/>
+                <a:latin typeface="Consolas" panose="020B0609020204030204" pitchFamily="49" charset="0"/>
+              </a:rPr>
+              <a:t>, </a:t>
+            </a:r>
+            <a:r>
+              <a:rPr kumimoji="0" lang="en-US" altLang="en-US" b="0" i="0" u="none" strike="noStrike" cap="none" normalizeH="0" baseline="0" dirty="0">
+                <a:ln>
+                  <a:noFill/>
+                </a:ln>
+                <a:solidFill>
+                  <a:srgbClr val="0F54D6"/>
+                </a:solidFill>
+                <a:effectLst/>
+                <a:latin typeface="Consolas" panose="020B0609020204030204" pitchFamily="49" charset="0"/>
+              </a:rPr>
+              <a:t>byte</a:t>
+            </a:r>
+            <a:r>
+              <a:rPr kumimoji="0" lang="en-US" altLang="en-US" b="0" i="0" u="none" strike="noStrike" cap="none" normalizeH="0" baseline="0" dirty="0">
+                <a:ln>
+                  <a:noFill/>
+                </a:ln>
+                <a:solidFill>
+                  <a:srgbClr val="383838"/>
+                </a:solidFill>
+                <a:effectLst/>
+                <a:latin typeface="Consolas" panose="020B0609020204030204" pitchFamily="49" charset="0"/>
+              </a:rPr>
+              <a:t>**, </a:t>
+            </a:r>
+            <a:r>
+              <a:rPr kumimoji="0" lang="en-US" altLang="en-US" b="0" i="0" u="none" strike="noStrike" cap="none" normalizeH="0" baseline="0" dirty="0">
+                <a:ln>
+                  <a:noFill/>
+                </a:ln>
+                <a:solidFill>
+                  <a:srgbClr val="0F54D6"/>
+                </a:solidFill>
+                <a:effectLst/>
+                <a:latin typeface="Consolas" panose="020B0609020204030204" pitchFamily="49" charset="0"/>
+              </a:rPr>
+              <a:t>byte</a:t>
+            </a:r>
+            <a:r>
+              <a:rPr kumimoji="0" lang="en-US" altLang="en-US" b="0" i="0" u="none" strike="noStrike" cap="none" normalizeH="0" baseline="0" dirty="0">
+                <a:ln>
+                  <a:noFill/>
+                </a:ln>
+                <a:solidFill>
+                  <a:srgbClr val="383838"/>
+                </a:solidFill>
+                <a:effectLst/>
+                <a:latin typeface="Consolas" panose="020B0609020204030204" pitchFamily="49" charset="0"/>
+              </a:rPr>
+              <a:t>**, </a:t>
+            </a:r>
+            <a:r>
+              <a:rPr kumimoji="0" lang="en-US" altLang="en-US" b="0" i="0" u="none" strike="noStrike" cap="none" normalizeH="0" baseline="0" dirty="0" err="1">
+                <a:ln>
+                  <a:noFill/>
+                </a:ln>
+                <a:solidFill>
+                  <a:srgbClr val="300073"/>
+                </a:solidFill>
+                <a:effectLst/>
+                <a:latin typeface="Consolas" panose="020B0609020204030204" pitchFamily="49" charset="0"/>
+              </a:rPr>
+              <a:t>ResultCode</a:t>
+            </a:r>
+            <a:r>
+              <a:rPr kumimoji="0" lang="en-US" altLang="en-US" b="0" i="0" u="none" strike="noStrike" cap="none" normalizeH="0" baseline="0" dirty="0">
+                <a:ln>
+                  <a:noFill/>
+                </a:ln>
+                <a:solidFill>
+                  <a:srgbClr val="383838"/>
+                </a:solidFill>
+                <a:effectLst/>
+                <a:latin typeface="Consolas" panose="020B0609020204030204" pitchFamily="49" charset="0"/>
+              </a:rPr>
+              <a:t>&gt; callback)</a:t>
+            </a:r>
+            <a:br>
+              <a:rPr kumimoji="0" lang="en-US" altLang="en-US" b="0" i="0" u="none" strike="noStrike" cap="none" normalizeH="0" baseline="0" dirty="0">
+                <a:ln>
+                  <a:noFill/>
+                </a:ln>
+                <a:solidFill>
+                  <a:srgbClr val="383838"/>
+                </a:solidFill>
+                <a:effectLst/>
+                <a:latin typeface="Consolas" panose="020B0609020204030204" pitchFamily="49" charset="0"/>
+              </a:rPr>
+            </a:br>
+            <a:r>
+              <a:rPr kumimoji="0" lang="en-US" altLang="en-US" b="0" i="0" u="none" strike="noStrike" cap="none" normalizeH="0" baseline="0" dirty="0">
+                <a:ln>
+                  <a:noFill/>
+                </a:ln>
+                <a:solidFill>
+                  <a:srgbClr val="383838"/>
+                </a:solidFill>
+                <a:effectLst/>
+                <a:latin typeface="Consolas" panose="020B0609020204030204" pitchFamily="49" charset="0"/>
+              </a:rPr>
+              <a:t>{</a:t>
+            </a:r>
+            <a:br>
+              <a:rPr kumimoji="0" lang="en-US" altLang="en-US" b="0" i="1" u="none" strike="noStrike" cap="none" normalizeH="0" baseline="0" dirty="0">
+                <a:ln>
+                  <a:noFill/>
+                </a:ln>
+                <a:solidFill>
+                  <a:srgbClr val="248700"/>
+                </a:solidFill>
+                <a:effectLst/>
+                <a:latin typeface="Consolas" panose="020B0609020204030204" pitchFamily="49" charset="0"/>
+              </a:rPr>
+            </a:br>
+            <a:r>
+              <a:rPr kumimoji="0" lang="en-US" altLang="en-US" b="0" i="1" u="none" strike="noStrike" cap="none" normalizeH="0" baseline="0" dirty="0">
+                <a:ln>
+                  <a:noFill/>
+                </a:ln>
+                <a:solidFill>
+                  <a:srgbClr val="248700"/>
+                </a:solidFill>
+                <a:effectLst/>
+                <a:latin typeface="Consolas" panose="020B0609020204030204" pitchFamily="49" charset="0"/>
+              </a:rPr>
+              <a:t>    </a:t>
+            </a:r>
+            <a:r>
+              <a:rPr kumimoji="0" lang="en-US" altLang="en-US" b="0" i="0" u="none" strike="noStrike" cap="none" normalizeH="0" baseline="0" dirty="0">
+                <a:ln>
+                  <a:noFill/>
+                </a:ln>
+                <a:solidFill>
+                  <a:srgbClr val="0F54D6"/>
+                </a:solidFill>
+                <a:effectLst/>
+                <a:latin typeface="Consolas" panose="020B0609020204030204" pitchFamily="49" charset="0"/>
+              </a:rPr>
+              <a:t>if </a:t>
+            </a:r>
+            <a:r>
+              <a:rPr kumimoji="0" lang="en-US" altLang="en-US" b="0" i="0" u="none" strike="noStrike" cap="none" normalizeH="0" baseline="0" dirty="0">
+                <a:ln>
+                  <a:noFill/>
+                </a:ln>
+                <a:solidFill>
+                  <a:srgbClr val="383838"/>
+                </a:solidFill>
+                <a:effectLst/>
+                <a:latin typeface="Consolas" panose="020B0609020204030204" pitchFamily="49" charset="0"/>
+              </a:rPr>
+              <a:t>(</a:t>
+            </a:r>
+            <a:r>
+              <a:rPr kumimoji="0" lang="en-US" altLang="en-US" b="0" i="0" u="none" strike="noStrike" cap="none" normalizeH="0" baseline="0" dirty="0" err="1">
+                <a:ln>
+                  <a:noFill/>
+                </a:ln>
+                <a:solidFill>
+                  <a:srgbClr val="6B2FBA"/>
+                </a:solidFill>
+                <a:effectLst/>
+                <a:latin typeface="Consolas" panose="020B0609020204030204" pitchFamily="49" charset="0"/>
+              </a:rPr>
+              <a:t>Sqlite</a:t>
+            </a:r>
+            <a:r>
+              <a:rPr kumimoji="0" lang="en-US" altLang="en-US" b="0" i="0" u="none" strike="noStrike" cap="none" normalizeH="0" baseline="0" dirty="0" err="1">
+                <a:ln>
+                  <a:noFill/>
+                </a:ln>
+                <a:solidFill>
+                  <a:srgbClr val="383838"/>
+                </a:solidFill>
+                <a:effectLst/>
+                <a:latin typeface="Consolas" panose="020B0609020204030204" pitchFamily="49" charset="0"/>
+              </a:rPr>
+              <a:t>.</a:t>
+            </a:r>
+            <a:r>
+              <a:rPr kumimoji="0" lang="en-US" altLang="en-US" b="0" i="0" u="none" strike="noStrike" cap="none" normalizeH="0" baseline="0" dirty="0" err="1">
+                <a:ln>
+                  <a:noFill/>
+                </a:ln>
+                <a:solidFill>
+                  <a:srgbClr val="00855F"/>
+                </a:solidFill>
+                <a:effectLst/>
+                <a:latin typeface="Consolas" panose="020B0609020204030204" pitchFamily="49" charset="0"/>
+              </a:rPr>
+              <a:t>Execute</a:t>
+            </a:r>
+            <a:r>
+              <a:rPr kumimoji="0" lang="en-US" altLang="en-US" b="0" i="0" u="none" strike="noStrike" cap="none" normalizeH="0" baseline="0" dirty="0">
+                <a:ln>
+                  <a:noFill/>
+                </a:ln>
+                <a:solidFill>
+                  <a:srgbClr val="383838"/>
+                </a:solidFill>
+                <a:effectLst/>
+                <a:latin typeface="Consolas" panose="020B0609020204030204" pitchFamily="49" charset="0"/>
+              </a:rPr>
+              <a:t>(</a:t>
+            </a:r>
+          </a:p>
+          <a:p>
+            <a:pPr marL="0" marR="0" lvl="0" indent="0" algn="l" defTabSz="914400" rtl="0" eaLnBrk="0" fontAlgn="base" latinLnBrk="0" hangingPunct="0">
+              <a:lnSpc>
+                <a:spcPct val="100000"/>
+              </a:lnSpc>
+              <a:spcBef>
+                <a:spcPct val="0"/>
+              </a:spcBef>
+              <a:spcAft>
+                <a:spcPct val="0"/>
+              </a:spcAft>
+              <a:buClrTx/>
+              <a:buSzTx/>
+              <a:buFontTx/>
+              <a:buNone/>
+              <a:tabLst/>
+            </a:pPr>
+            <a:r>
+              <a:rPr lang="en-US" altLang="en-US" dirty="0">
+                <a:solidFill>
+                  <a:srgbClr val="383838"/>
+                </a:solidFill>
+                <a:latin typeface="Consolas" panose="020B0609020204030204" pitchFamily="49" charset="0"/>
+              </a:rPr>
+              <a:t>        </a:t>
+            </a:r>
+            <a:r>
+              <a:rPr kumimoji="0" lang="en-US" altLang="en-US" b="0" i="0" u="none" strike="noStrike" cap="none" normalizeH="0" baseline="0" dirty="0">
+                <a:ln>
+                  <a:noFill/>
+                </a:ln>
+                <a:solidFill>
+                  <a:srgbClr val="0093A1"/>
+                </a:solidFill>
+                <a:effectLst/>
+                <a:latin typeface="Consolas" panose="020B0609020204030204" pitchFamily="49" charset="0"/>
+              </a:rPr>
+              <a:t>_</a:t>
+            </a:r>
+            <a:r>
+              <a:rPr kumimoji="0" lang="en-US" altLang="en-US" b="0" i="0" u="none" strike="noStrike" cap="none" normalizeH="0" baseline="0" dirty="0" err="1">
+                <a:ln>
+                  <a:noFill/>
+                </a:ln>
+                <a:solidFill>
+                  <a:srgbClr val="0093A1"/>
+                </a:solidFill>
+                <a:effectLst/>
+                <a:latin typeface="Consolas" panose="020B0609020204030204" pitchFamily="49" charset="0"/>
+              </a:rPr>
+              <a:t>databaseHandle</a:t>
+            </a:r>
+            <a:r>
+              <a:rPr kumimoji="0" lang="en-US" altLang="en-US" b="0" i="0" u="none" strike="noStrike" cap="none" normalizeH="0" baseline="0" dirty="0">
+                <a:ln>
+                  <a:noFill/>
+                </a:ln>
+                <a:solidFill>
+                  <a:srgbClr val="383838"/>
+                </a:solidFill>
+                <a:effectLst/>
+                <a:latin typeface="Consolas" panose="020B0609020204030204" pitchFamily="49" charset="0"/>
+              </a:rPr>
+              <a:t>, </a:t>
+            </a:r>
+            <a:r>
+              <a:rPr kumimoji="0" lang="en-US" altLang="en-US" b="0" i="0" u="none" strike="noStrike" cap="none" normalizeH="0" baseline="0" dirty="0" err="1">
+                <a:ln>
+                  <a:noFill/>
+                </a:ln>
+                <a:solidFill>
+                  <a:srgbClr val="383838"/>
+                </a:solidFill>
+                <a:effectLst/>
+                <a:latin typeface="Consolas" panose="020B0609020204030204" pitchFamily="49" charset="0"/>
+              </a:rPr>
+              <a:t>sql</a:t>
+            </a:r>
+            <a:r>
+              <a:rPr kumimoji="0" lang="en-US" altLang="en-US" b="0" i="0" u="none" strike="noStrike" cap="none" normalizeH="0" baseline="0" dirty="0">
+                <a:ln>
+                  <a:noFill/>
+                </a:ln>
+                <a:solidFill>
+                  <a:srgbClr val="383838"/>
+                </a:solidFill>
+                <a:effectLst/>
+                <a:latin typeface="Consolas" panose="020B0609020204030204" pitchFamily="49" charset="0"/>
+              </a:rPr>
+              <a:t>, callback, </a:t>
+            </a:r>
+            <a:r>
+              <a:rPr kumimoji="0" lang="en-US" altLang="en-US" b="0" i="0" u="none" strike="noStrike" cap="none" normalizeH="0" baseline="0" dirty="0">
+                <a:ln>
+                  <a:noFill/>
+                </a:ln>
+                <a:solidFill>
+                  <a:srgbClr val="0F54D6"/>
+                </a:solidFill>
+                <a:effectLst/>
+                <a:latin typeface="Consolas" panose="020B0609020204030204" pitchFamily="49" charset="0"/>
+              </a:rPr>
+              <a:t>null</a:t>
+            </a:r>
+            <a:r>
+              <a:rPr kumimoji="0" lang="en-US" altLang="en-US" b="0" i="0" u="none" strike="noStrike" cap="none" normalizeH="0" baseline="0" dirty="0">
+                <a:ln>
+                  <a:noFill/>
+                </a:ln>
+                <a:solidFill>
+                  <a:srgbClr val="383838"/>
+                </a:solidFill>
+                <a:effectLst/>
+                <a:latin typeface="Consolas" panose="020B0609020204030204" pitchFamily="49" charset="0"/>
+              </a:rPr>
+              <a:t>, </a:t>
+            </a:r>
+            <a:r>
+              <a:rPr kumimoji="0" lang="en-US" altLang="en-US" b="0" i="0" u="none" strike="noStrike" cap="none" normalizeH="0" baseline="0" dirty="0">
+                <a:ln>
+                  <a:noFill/>
+                </a:ln>
+                <a:solidFill>
+                  <a:srgbClr val="0F54D6"/>
+                </a:solidFill>
+                <a:effectLst/>
+                <a:latin typeface="Consolas" panose="020B0609020204030204" pitchFamily="49" charset="0"/>
+              </a:rPr>
+              <a:t>null</a:t>
+            </a:r>
+            <a:r>
+              <a:rPr kumimoji="0" lang="en-US" altLang="en-US" b="0" i="0" u="none" strike="noStrike" cap="none" normalizeH="0" baseline="0" dirty="0">
+                <a:ln>
+                  <a:noFill/>
+                </a:ln>
+                <a:solidFill>
+                  <a:srgbClr val="383838"/>
+                </a:solidFill>
+                <a:effectLst/>
+                <a:latin typeface="Consolas" panose="020B0609020204030204" pitchFamily="49" charset="0"/>
+              </a:rPr>
+              <a:t>) != </a:t>
+            </a:r>
+            <a:r>
+              <a:rPr kumimoji="0" lang="en-US" altLang="en-US" b="0" i="0" u="none" strike="noStrike" cap="none" normalizeH="0" baseline="0" dirty="0">
+                <a:ln>
+                  <a:noFill/>
+                </a:ln>
+                <a:solidFill>
+                  <a:srgbClr val="AB2F6B"/>
+                </a:solidFill>
+                <a:effectLst/>
+                <a:latin typeface="Consolas" panose="020B0609020204030204" pitchFamily="49" charset="0"/>
+              </a:rPr>
+              <a:t>0</a:t>
+            </a:r>
+            <a:r>
+              <a:rPr kumimoji="0" lang="en-US" altLang="en-US" b="0" i="0" u="none" strike="noStrike" cap="none" normalizeH="0" baseline="0" dirty="0">
+                <a:ln>
+                  <a:noFill/>
+                </a:ln>
+                <a:solidFill>
+                  <a:srgbClr val="383838"/>
+                </a:solidFill>
+                <a:effectLst/>
+                <a:latin typeface="Consolas" panose="020B0609020204030204" pitchFamily="49" charset="0"/>
+              </a:rPr>
+              <a:t>)</a:t>
+            </a:r>
+            <a:br>
+              <a:rPr kumimoji="0" lang="en-US" altLang="en-US" b="0" i="0" u="none" strike="noStrike" cap="none" normalizeH="0" baseline="0" dirty="0">
+                <a:ln>
+                  <a:noFill/>
+                </a:ln>
+                <a:solidFill>
+                  <a:srgbClr val="383838"/>
+                </a:solidFill>
+                <a:effectLst/>
+                <a:latin typeface="Consolas" panose="020B0609020204030204" pitchFamily="49" charset="0"/>
+              </a:rPr>
+            </a:br>
+            <a:r>
+              <a:rPr kumimoji="0" lang="en-US" altLang="en-US" b="0" i="0" u="none" strike="noStrike" cap="none" normalizeH="0" baseline="0" dirty="0">
+                <a:ln>
+                  <a:noFill/>
+                </a:ln>
+                <a:solidFill>
+                  <a:srgbClr val="383838"/>
+                </a:solidFill>
+                <a:effectLst/>
+                <a:latin typeface="Consolas" panose="020B0609020204030204" pitchFamily="49" charset="0"/>
+              </a:rPr>
+              <a:t>        </a:t>
+            </a:r>
+            <a:r>
+              <a:rPr kumimoji="0" lang="en-US" altLang="en-US" b="0" i="0" u="none" strike="noStrike" cap="none" normalizeH="0" baseline="0" dirty="0">
+                <a:ln>
+                  <a:noFill/>
+                </a:ln>
+                <a:solidFill>
+                  <a:srgbClr val="0F54D6"/>
+                </a:solidFill>
+                <a:effectLst/>
+                <a:latin typeface="Consolas" panose="020B0609020204030204" pitchFamily="49" charset="0"/>
+              </a:rPr>
+              <a:t>throw new </a:t>
+            </a:r>
+            <a:r>
+              <a:rPr kumimoji="0" lang="en-US" altLang="en-US" b="0" i="0" u="none" strike="noStrike" cap="none" normalizeH="0" baseline="0" dirty="0">
+                <a:ln>
+                  <a:noFill/>
+                </a:ln>
+                <a:solidFill>
+                  <a:srgbClr val="6B2FBA"/>
+                </a:solidFill>
+                <a:effectLst/>
+                <a:latin typeface="Consolas" panose="020B0609020204030204" pitchFamily="49" charset="0"/>
+              </a:rPr>
+              <a:t>Exception</a:t>
+            </a:r>
+            <a:r>
+              <a:rPr kumimoji="0" lang="en-US" altLang="en-US" b="0" i="0" u="none" strike="noStrike" cap="none" normalizeH="0" baseline="0" dirty="0">
+                <a:ln>
+                  <a:noFill/>
+                </a:ln>
+                <a:solidFill>
+                  <a:srgbClr val="383838"/>
+                </a:solidFill>
+                <a:effectLst/>
+                <a:latin typeface="Consolas" panose="020B0609020204030204" pitchFamily="49" charset="0"/>
+              </a:rPr>
+              <a:t>(</a:t>
+            </a:r>
+            <a:r>
+              <a:rPr kumimoji="0" lang="en-US" altLang="en-US" b="0" i="0" u="none" strike="noStrike" cap="none" normalizeH="0" baseline="0" dirty="0">
+                <a:ln>
+                  <a:noFill/>
+                </a:ln>
+                <a:solidFill>
+                  <a:srgbClr val="8C6C41"/>
+                </a:solidFill>
+                <a:effectLst/>
+                <a:latin typeface="Consolas" panose="020B0609020204030204" pitchFamily="49" charset="0"/>
+              </a:rPr>
+              <a:t>"Script execution failed."</a:t>
+            </a:r>
+            <a:r>
+              <a:rPr kumimoji="0" lang="en-US" altLang="en-US" b="0" i="0" u="none" strike="noStrike" cap="none" normalizeH="0" baseline="0" dirty="0">
+                <a:ln>
+                  <a:noFill/>
+                </a:ln>
+                <a:solidFill>
+                  <a:srgbClr val="383838"/>
+                </a:solidFill>
+                <a:effectLst/>
+                <a:latin typeface="Consolas" panose="020B0609020204030204" pitchFamily="49" charset="0"/>
+              </a:rPr>
+              <a:t>);</a:t>
+            </a:r>
+            <a:br>
+              <a:rPr kumimoji="0" lang="en-US" altLang="en-US" b="0" i="0" u="none" strike="noStrike" cap="none" normalizeH="0" baseline="0" dirty="0">
+                <a:ln>
+                  <a:noFill/>
+                </a:ln>
+                <a:solidFill>
+                  <a:srgbClr val="383838"/>
+                </a:solidFill>
+                <a:effectLst/>
+                <a:latin typeface="Consolas" panose="020B0609020204030204" pitchFamily="49" charset="0"/>
+              </a:rPr>
+            </a:br>
+            <a:r>
+              <a:rPr kumimoji="0" lang="en-US" altLang="en-US" b="0" i="0" u="none" strike="noStrike" cap="none" normalizeH="0" baseline="0" dirty="0">
+                <a:ln>
+                  <a:noFill/>
+                </a:ln>
+                <a:solidFill>
+                  <a:srgbClr val="383838"/>
+                </a:solidFill>
+                <a:effectLst/>
+                <a:latin typeface="Consolas" panose="020B0609020204030204" pitchFamily="49" charset="0"/>
+              </a:rPr>
+              <a:t>}</a:t>
+            </a:r>
+            <a:endParaRPr kumimoji="0" lang="en-US" altLang="en-US" b="0" i="0" u="none" strike="noStrike" cap="none" normalizeH="0" baseline="0" dirty="0">
+              <a:ln>
+                <a:noFill/>
+              </a:ln>
+              <a:solidFill>
+                <a:schemeClr val="tx1"/>
+              </a:solidFill>
+              <a:effectLst/>
+              <a:latin typeface="Consolas" panose="020B0609020204030204" pitchFamily="49" charset="0"/>
+            </a:endParaRPr>
+          </a:p>
+        </p:txBody>
+      </p:sp>
+    </p:spTree>
+    <p:extLst>
+      <p:ext uri="{BB962C8B-B14F-4D97-AF65-F5344CB8AC3E}">
+        <p14:creationId xmlns:p14="http://schemas.microsoft.com/office/powerpoint/2010/main" val="3707188046"/>
+      </p:ext>
+    </p:extLst>
+  </p:cSld>
+  <p:clrMapOvr>
+    <a:masterClrMapping/>
+  </p:clrMapOvr>
+</p:sld>
+</file>
+
+<file path=ppt/slides/slide51.xml><?xml version="1.0" encoding="utf-8"?>
+<p:sld xmlns:a="http://schemas.openxmlformats.org/drawingml/2006/main" xmlns:r="http://schemas.openxmlformats.org/officeDocument/2006/relationships" xmlns:p="http://schemas.openxmlformats.org/presentationml/2006/main">
+  <p:cSld>
+    <p:spTree>
+      <p:nvGrpSpPr>
+        <p:cNvPr id="1" name=""/>
+        <p:cNvGrpSpPr/>
+        <p:nvPr/>
+      </p:nvGrpSpPr>
+      <p:grpSpPr>
+        <a:xfrm>
+          <a:off x="0" y="0"/>
+          <a:ext cx="0" cy="0"/>
+          <a:chOff x="0" y="0"/>
+          <a:chExt cx="0" cy="0"/>
+        </a:xfrm>
+      </p:grpSpPr>
+      <p:sp>
+        <p:nvSpPr>
+          <p:cNvPr id="2" name="Title 1">
+            <a:extLst>
+              <a:ext uri="{FF2B5EF4-FFF2-40B4-BE49-F238E27FC236}">
                 <a16:creationId xmlns:a16="http://schemas.microsoft.com/office/drawing/2014/main" id="{4AD711BF-11D7-800F-34D5-0D212A801031}"/>
               </a:ext>
             </a:extLst>
@@ -44103,7 +44706,7 @@
 </p:sld>
 </file>
 
-<file path=ppt/slides/slide51.xml><?xml version="1.0" encoding="utf-8"?>
+<file path=ppt/slides/slide52.xml><?xml version="1.0" encoding="utf-8"?>
 <p:sld xmlns:a="http://schemas.openxmlformats.org/drawingml/2006/main" xmlns:r="http://schemas.openxmlformats.org/officeDocument/2006/relationships" xmlns:p="http://schemas.openxmlformats.org/presentationml/2006/main">
   <p:cSld>
     <p:spTree>
@@ -44210,7 +44813,7 @@
 </p:sld>
 </file>
 
-<file path=ppt/slides/slide52.xml><?xml version="1.0" encoding="utf-8"?>
+<file path=ppt/slides/slide53.xml><?xml version="1.0" encoding="utf-8"?>
 <p:sld xmlns:a="http://schemas.openxmlformats.org/drawingml/2006/main" xmlns:r="http://schemas.openxmlformats.org/officeDocument/2006/relationships" xmlns:p="http://schemas.openxmlformats.org/presentationml/2006/main">
   <p:cSld>
     <p:spTree>
@@ -44529,7 +45132,7 @@
 </p:sld>
 </file>
 
-<file path=ppt/slides/slide53.xml><?xml version="1.0" encoding="utf-8"?>
+<file path=ppt/slides/slide54.xml><?xml version="1.0" encoding="utf-8"?>
 <p:sld xmlns:a="http://schemas.openxmlformats.org/drawingml/2006/main" xmlns:r="http://schemas.openxmlformats.org/officeDocument/2006/relationships" xmlns:p="http://schemas.openxmlformats.org/presentationml/2006/main">
   <p:cSld>
     <p:spTree>
@@ -44854,7 +45457,7 @@
 </p:sld>
 </file>
 
-<file path=ppt/slides/slide54.xml><?xml version="1.0" encoding="utf-8"?>
+<file path=ppt/slides/slide55.xml><?xml version="1.0" encoding="utf-8"?>
 <p:sld xmlns:a="http://schemas.openxmlformats.org/drawingml/2006/main" xmlns:r="http://schemas.openxmlformats.org/officeDocument/2006/relationships" xmlns:p="http://schemas.openxmlformats.org/presentationml/2006/main">
   <p:cSld>
     <p:spTree>

</xml_diff>

<commit_message>
Improved callback intro slide
</commit_message>
<xml_diff>
--- a/doc/Introduction to unsafe C#.pptx
+++ b/doc/Introduction to unsafe C#.pptx
@@ -34103,50 +34103,123 @@
           </a:p>
         </p:txBody>
       </p:sp>
-      <p:pic>
-        <p:nvPicPr>
-          <p:cNvPr id="5" name="Picture 4" descr="SQLite One-Step Query Execution Interface">
+      <p:grpSp>
+        <p:nvGrpSpPr>
+          <p:cNvPr id="6" name="Group 5">
             <a:extLst>
               <a:ext uri="{FF2B5EF4-FFF2-40B4-BE49-F238E27FC236}">
-                <a16:creationId xmlns:a16="http://schemas.microsoft.com/office/drawing/2014/main" id="{B9F548EC-7BBF-FF3A-ECC0-2EB11B790355}"/>
+                <a16:creationId xmlns:a16="http://schemas.microsoft.com/office/drawing/2014/main" id="{F2AA9608-FBCF-91C5-3A36-412F5F3EC2D9}"/>
               </a:ext>
             </a:extLst>
           </p:cNvPr>
-          <p:cNvPicPr>
-            <a:picLocks noChangeAspect="1"/>
-          </p:cNvPicPr>
+          <p:cNvGrpSpPr/>
           <p:nvPr/>
-        </p:nvPicPr>
-        <p:blipFill>
-          <a:blip r:embed="rId2"/>
-          <a:stretch>
-            <a:fillRect/>
-          </a:stretch>
-        </p:blipFill>
-        <p:spPr>
+        </p:nvGrpSpPr>
+        <p:grpSpPr>
           <a:xfrm>
             <a:off x="1710395" y="2841271"/>
             <a:ext cx="7348000" cy="2027143"/>
+            <a:chOff x="1710395" y="2841271"/>
+            <a:chExt cx="7348000" cy="2027143"/>
           </a:xfrm>
-          <a:prstGeom prst="rect">
-            <a:avLst/>
-          </a:prstGeom>
-          <a:ln w="15875">
-            <a:solidFill>
+        </p:grpSpPr>
+        <p:pic>
+          <p:nvPicPr>
+            <p:cNvPr id="5" name="Picture 4" descr="SQLite One-Step Query Execution Interface">
+              <a:extLst>
+                <a:ext uri="{FF2B5EF4-FFF2-40B4-BE49-F238E27FC236}">
+                  <a16:creationId xmlns:a16="http://schemas.microsoft.com/office/drawing/2014/main" id="{B9F548EC-7BBF-FF3A-ECC0-2EB11B790355}"/>
+                </a:ext>
+              </a:extLst>
+            </p:cNvPr>
+            <p:cNvPicPr>
+              <a:picLocks noChangeAspect="1"/>
+            </p:cNvPicPr>
+            <p:nvPr/>
+          </p:nvPicPr>
+          <p:blipFill>
+            <a:blip r:embed="rId2"/>
+            <a:stretch>
+              <a:fillRect/>
+            </a:stretch>
+          </p:blipFill>
+          <p:spPr>
+            <a:xfrm>
+              <a:off x="1710395" y="2841271"/>
+              <a:ext cx="7348000" cy="2027143"/>
+            </a:xfrm>
+            <a:prstGeom prst="rect">
+              <a:avLst/>
+            </a:prstGeom>
+            <a:ln w="15875">
+              <a:solidFill>
+                <a:schemeClr val="accent1"/>
+              </a:solidFill>
+            </a:ln>
+            <a:effectLst>
+              <a:outerShdw blurRad="127000" dist="127000" dir="2700000" algn="tl" rotWithShape="0">
+                <a:schemeClr val="bg1">
+                  <a:lumMod val="95000"/>
+                  <a:lumOff val="5000"/>
+                  <a:alpha val="80000"/>
+                </a:schemeClr>
+              </a:outerShdw>
+            </a:effectLst>
+          </p:spPr>
+        </p:pic>
+        <p:sp>
+          <p:nvSpPr>
+            <p:cNvPr id="4" name="Rectangle 3">
+              <a:extLst>
+                <a:ext uri="{FF2B5EF4-FFF2-40B4-BE49-F238E27FC236}">
+                  <a16:creationId xmlns:a16="http://schemas.microsoft.com/office/drawing/2014/main" id="{3B03D61F-A87F-B791-EBD3-2CC417CEA2DE}"/>
+                </a:ext>
+              </a:extLst>
+            </p:cNvPr>
+            <p:cNvSpPr/>
+            <p:nvPr/>
+          </p:nvSpPr>
+          <p:spPr>
+            <a:xfrm>
+              <a:off x="2390503" y="4026626"/>
+              <a:ext cx="6018711" cy="231865"/>
+            </a:xfrm>
+            <a:prstGeom prst="rect">
+              <a:avLst/>
+            </a:prstGeom>
+            <a:noFill/>
+            <a:ln w="31750">
+              <a:solidFill>
+                <a:srgbClr val="FF0000"/>
+              </a:solidFill>
+            </a:ln>
+          </p:spPr>
+          <p:style>
+            <a:lnRef idx="2">
+              <a:schemeClr val="accent1">
+                <a:shade val="15000"/>
+              </a:schemeClr>
+            </a:lnRef>
+            <a:fillRef idx="1">
               <a:schemeClr val="accent1"/>
-            </a:solidFill>
-          </a:ln>
-          <a:effectLst>
-            <a:outerShdw blurRad="127000" dist="127000" dir="2700000" algn="tl" rotWithShape="0">
-              <a:schemeClr val="bg1">
-                <a:lumMod val="95000"/>
-                <a:lumOff val="5000"/>
-                <a:alpha val="80000"/>
-              </a:schemeClr>
-            </a:outerShdw>
-          </a:effectLst>
-        </p:spPr>
-      </p:pic>
+            </a:fillRef>
+            <a:effectRef idx="0">
+              <a:schemeClr val="accent1"/>
+            </a:effectRef>
+            <a:fontRef idx="minor">
+              <a:schemeClr val="lt1"/>
+            </a:fontRef>
+          </p:style>
+          <p:txBody>
+            <a:bodyPr rtlCol="0" anchor="ctr"/>
+            <a:lstStyle/>
+            <a:p>
+              <a:pPr algn="ctr"/>
+              <a:endParaRPr lang="en-US"/>
+            </a:p>
+          </p:txBody>
+        </p:sp>
+      </p:grpSp>
     </p:spTree>
     <p:extLst>
       <p:ext uri="{BB962C8B-B14F-4D97-AF65-F5344CB8AC3E}">
@@ -34191,7 +34264,7 @@
                                           </p:stCondLst>
                                         </p:cTn>
                                         <p:tgtEl>
-                                          <p:spTgt spid="5"/>
+                                          <p:spTgt spid="6"/>
                                         </p:tgtEl>
                                         <p:attrNameLst>
                                           <p:attrName>style.visibility</p:attrName>
@@ -46068,39 +46141,26 @@
                                   </p:childTnLst>
                                 </p:cTn>
                               </p:par>
+                            </p:childTnLst>
+                          </p:cTn>
+                        </p:par>
+                      </p:childTnLst>
+                    </p:cTn>
+                  </p:par>
+                  <p:par>
+                    <p:cTn id="19" fill="hold">
+                      <p:stCondLst>
+                        <p:cond delay="indefinite"/>
+                      </p:stCondLst>
+                      <p:childTnLst>
+                        <p:par>
+                          <p:cTn id="20" fill="hold">
+                            <p:stCondLst>
+                              <p:cond delay="0"/>
+                            </p:stCondLst>
+                            <p:childTnLst>
                               <p:par>
-                                <p:cTn id="19" presetID="1" presetClass="entr" presetSubtype="0" fill="hold" grpId="0" nodeType="withEffect">
-                                  <p:stCondLst>
-                                    <p:cond delay="0"/>
-                                  </p:stCondLst>
-                                  <p:childTnLst>
-                                    <p:set>
-                                      <p:cBhvr>
-                                        <p:cTn id="20" dur="1" fill="hold">
-                                          <p:stCondLst>
-                                            <p:cond delay="0"/>
-                                          </p:stCondLst>
-                                        </p:cTn>
-                                        <p:tgtEl>
-                                          <p:spTgt spid="3">
-                                            <p:txEl>
-                                              <p:pRg st="4" end="4"/>
-                                            </p:txEl>
-                                          </p:spTgt>
-                                        </p:tgtEl>
-                                        <p:attrNameLst>
-                                          <p:attrName>style.visibility</p:attrName>
-                                        </p:attrNameLst>
-                                      </p:cBhvr>
-                                      <p:to>
-                                        <p:strVal val="visible"/>
-                                      </p:to>
-                                    </p:set>
-                                  </p:childTnLst>
-                                </p:cTn>
-                              </p:par>
-                              <p:par>
-                                <p:cTn id="21" presetID="1" presetClass="entr" presetSubtype="0" fill="hold" grpId="0" nodeType="withEffect">
+                                <p:cTn id="21" presetID="1" presetClass="entr" presetSubtype="0" fill="hold" grpId="0" nodeType="clickEffect">
                                   <p:stCondLst>
                                     <p:cond delay="0"/>
                                   </p:stCondLst>
@@ -46115,7 +46175,7 @@
                                         <p:tgtEl>
                                           <p:spTgt spid="3">
                                             <p:txEl>
-                                              <p:pRg st="5" end="5"/>
+                                              <p:pRg st="4" end="4"/>
                                             </p:txEl>
                                           </p:spTgt>
                                         </p:tgtEl>
@@ -46157,6 +46217,55 @@
                                     <p:set>
                                       <p:cBhvr>
                                         <p:cTn id="26" dur="1" fill="hold">
+                                          <p:stCondLst>
+                                            <p:cond delay="0"/>
+                                          </p:stCondLst>
+                                        </p:cTn>
+                                        <p:tgtEl>
+                                          <p:spTgt spid="3">
+                                            <p:txEl>
+                                              <p:pRg st="5" end="5"/>
+                                            </p:txEl>
+                                          </p:spTgt>
+                                        </p:tgtEl>
+                                        <p:attrNameLst>
+                                          <p:attrName>style.visibility</p:attrName>
+                                        </p:attrNameLst>
+                                      </p:cBhvr>
+                                      <p:to>
+                                        <p:strVal val="visible"/>
+                                      </p:to>
+                                    </p:set>
+                                  </p:childTnLst>
+                                </p:cTn>
+                              </p:par>
+                            </p:childTnLst>
+                          </p:cTn>
+                        </p:par>
+                      </p:childTnLst>
+                    </p:cTn>
+                  </p:par>
+                  <p:par>
+                    <p:cTn id="27" fill="hold">
+                      <p:stCondLst>
+                        <p:cond delay="indefinite"/>
+                      </p:stCondLst>
+                      <p:childTnLst>
+                        <p:par>
+                          <p:cTn id="28" fill="hold">
+                            <p:stCondLst>
+                              <p:cond delay="0"/>
+                            </p:stCondLst>
+                            <p:childTnLst>
+                              <p:par>
+                                <p:cTn id="29" presetID="1" presetClass="entr" presetSubtype="0" fill="hold" grpId="0" nodeType="clickEffect">
+                                  <p:stCondLst>
+                                    <p:cond delay="0"/>
+                                  </p:stCondLst>
+                                  <p:childTnLst>
+                                    <p:set>
+                                      <p:cBhvr>
+                                        <p:cTn id="30" dur="1" fill="hold">
                                           <p:stCondLst>
                                             <p:cond delay="0"/>
                                           </p:stCondLst>
@@ -46207,7 +46316,7 @@
       </p:par>
     </p:tnLst>
     <p:bldLst>
-      <p:bldP spid="3" grpId="0" build="p"/>
+      <p:bldP spid="3" grpId="0" uiExpand="1" build="p"/>
     </p:bldLst>
   </p:timing>
 </p:sld>

</xml_diff>

<commit_message>
Removed 'Unknown hard error' screenshot
</commit_message>
<xml_diff>
--- a/doc/Introduction to unsafe C#.pptx
+++ b/doc/Introduction to unsafe C#.pptx
@@ -38793,56 +38793,6 @@
           </a:effectLst>
         </p:spPr>
       </p:pic>
-      <p:pic>
-        <p:nvPicPr>
-          <p:cNvPr id="4" name="Picture 3" descr="System warning: Unknown hard error">
-            <a:extLst>
-              <a:ext uri="{FF2B5EF4-FFF2-40B4-BE49-F238E27FC236}">
-                <a16:creationId xmlns:a16="http://schemas.microsoft.com/office/drawing/2014/main" id="{317956A1-90C7-906E-F13D-D73FA4CDC77E}"/>
-              </a:ext>
-            </a:extLst>
-          </p:cNvPr>
-          <p:cNvPicPr>
-            <a:picLocks noChangeAspect="1"/>
-          </p:cNvPicPr>
-          <p:nvPr/>
-        </p:nvPicPr>
-        <p:blipFill>
-          <a:blip r:embed="rId3">
-            <a:extLst>
-              <a:ext uri="{28A0092B-C50C-407E-A947-70E740481C1C}">
-                <a14:useLocalDpi xmlns:a14="http://schemas.microsoft.com/office/drawing/2010/main" val="0"/>
-              </a:ext>
-            </a:extLst>
-          </a:blip>
-          <a:stretch>
-            <a:fillRect/>
-          </a:stretch>
-        </p:blipFill>
-        <p:spPr>
-          <a:xfrm>
-            <a:off x="7628332" y="4242601"/>
-            <a:ext cx="2895621" cy="1443048"/>
-          </a:xfrm>
-          <a:prstGeom prst="rect">
-            <a:avLst/>
-          </a:prstGeom>
-          <a:ln w="15875">
-            <a:solidFill>
-              <a:schemeClr val="accent1"/>
-            </a:solidFill>
-          </a:ln>
-          <a:effectLst>
-            <a:outerShdw blurRad="127000" dist="127000" dir="2700000" algn="tl" rotWithShape="0">
-              <a:schemeClr val="bg1">
-                <a:lumMod val="95000"/>
-                <a:lumOff val="5000"/>
-                <a:alpha val="80000"/>
-              </a:schemeClr>
-            </a:outerShdw>
-          </a:effectLst>
-        </p:spPr>
-      </p:pic>
     </p:spTree>
     <p:extLst>
       <p:ext uri="{BB962C8B-B14F-4D97-AF65-F5344CB8AC3E}">
@@ -38888,51 +38838,6 @@
                                         </p:cTn>
                                         <p:tgtEl>
                                           <p:spTgt spid="7"/>
-                                        </p:tgtEl>
-                                        <p:attrNameLst>
-                                          <p:attrName>style.visibility</p:attrName>
-                                        </p:attrNameLst>
-                                      </p:cBhvr>
-                                      <p:to>
-                                        <p:strVal val="visible"/>
-                                      </p:to>
-                                    </p:set>
-                                  </p:childTnLst>
-                                </p:cTn>
-                              </p:par>
-                            </p:childTnLst>
-                          </p:cTn>
-                        </p:par>
-                      </p:childTnLst>
-                    </p:cTn>
-                  </p:par>
-                  <p:par>
-                    <p:cTn id="7" fill="hold">
-                      <p:stCondLst>
-                        <p:cond delay="indefinite"/>
-                      </p:stCondLst>
-                      <p:childTnLst>
-                        <p:par>
-                          <p:cTn id="8" fill="hold">
-                            <p:stCondLst>
-                              <p:cond delay="0"/>
-                            </p:stCondLst>
-                            <p:childTnLst>
-                              <p:par>
-                                <p:cTn id="9" presetID="1" presetClass="entr" presetSubtype="0" fill="hold" nodeType="clickEffect">
-                                  <p:stCondLst>
-                                    <p:cond delay="0"/>
-                                  </p:stCondLst>
-                                  <p:childTnLst>
-                                    <p:set>
-                                      <p:cBhvr>
-                                        <p:cTn id="10" dur="1" fill="hold">
-                                          <p:stCondLst>
-                                            <p:cond delay="0"/>
-                                          </p:stCondLst>
-                                        </p:cTn>
-                                        <p:tgtEl>
-                                          <p:spTgt spid="4"/>
                                         </p:tgtEl>
                                         <p:attrNameLst>
                                           <p:attrName>style.visibility</p:attrName>

</xml_diff>

<commit_message>
Minor callback slide improvements
</commit_message>
<xml_diff>
--- a/doc/Introduction to unsafe C#.pptx
+++ b/doc/Introduction to unsafe C#.pptx
@@ -869,6 +869,109 @@
     <p:extLst>
       <p:ext uri="{BB962C8B-B14F-4D97-AF65-F5344CB8AC3E}">
         <p14:creationId xmlns:p14="http://schemas.microsoft.com/office/powerpoint/2010/main" val="2569954282"/>
+      </p:ext>
+    </p:extLst>
+  </p:cSld>
+  <p:clrMapOvr>
+    <a:masterClrMapping/>
+  </p:clrMapOvr>
+</p:notes>
+</file>
+
+<file path=ppt/notesSlides/notesSlide5.xml><?xml version="1.0" encoding="utf-8"?>
+<p:notes xmlns:a="http://schemas.openxmlformats.org/drawingml/2006/main" xmlns:r="http://schemas.openxmlformats.org/officeDocument/2006/relationships" xmlns:p="http://schemas.openxmlformats.org/presentationml/2006/main">
+  <p:cSld>
+    <p:spTree>
+      <p:nvGrpSpPr>
+        <p:cNvPr id="1" name=""/>
+        <p:cNvGrpSpPr/>
+        <p:nvPr/>
+      </p:nvGrpSpPr>
+      <p:grpSpPr>
+        <a:xfrm>
+          <a:off x="0" y="0"/>
+          <a:ext cx="0" cy="0"/>
+          <a:chOff x="0" y="0"/>
+          <a:chExt cx="0" cy="0"/>
+        </a:xfrm>
+      </p:grpSpPr>
+      <p:sp>
+        <p:nvSpPr>
+          <p:cNvPr id="2" name="Slide Image Placeholder 1"/>
+          <p:cNvSpPr>
+            <a:spLocks noGrp="1" noRot="1" noChangeAspect="1"/>
+          </p:cNvSpPr>
+          <p:nvPr>
+            <p:ph type="sldImg"/>
+          </p:nvPr>
+        </p:nvSpPr>
+        <p:spPr/>
+      </p:sp>
+      <p:sp>
+        <p:nvSpPr>
+          <p:cNvPr id="3" name="Notes Placeholder 2"/>
+          <p:cNvSpPr>
+            <a:spLocks noGrp="1"/>
+          </p:cNvSpPr>
+          <p:nvPr>
+            <p:ph type="body" idx="1"/>
+          </p:nvPr>
+        </p:nvSpPr>
+        <p:spPr/>
+        <p:txBody>
+          <a:bodyPr/>
+          <a:lstStyle/>
+          <a:p>
+            <a:r>
+              <a:rPr lang="en-US" dirty="0"/>
+              <a:t>“The ECMA-335 definition of method pointers includes the calling convention as part of the type signature (section 7.1). The default calling convention will be </a:t>
+            </a:r>
+            <a:r>
+              <a:rPr lang="en-US" dirty="0">
+                <a:latin typeface="Consolas" panose="020B0609020204030204" pitchFamily="49" charset="0"/>
+              </a:rPr>
+              <a:t>managed</a:t>
+            </a:r>
+            <a:r>
+              <a:rPr lang="en-US" dirty="0"/>
+              <a:t>.”</a:t>
+            </a:r>
+          </a:p>
+          <a:p>
+            <a:r>
+              <a:rPr lang="en-US" dirty="0"/>
+              <a:t>https://learn.microsoft.com/en-us/dotnet/csharp/language-reference/proposals/csharp-9.0/function-pointers</a:t>
+            </a:r>
+          </a:p>
+        </p:txBody>
+      </p:sp>
+      <p:sp>
+        <p:nvSpPr>
+          <p:cNvPr id="4" name="Slide Number Placeholder 3"/>
+          <p:cNvSpPr>
+            <a:spLocks noGrp="1"/>
+          </p:cNvSpPr>
+          <p:nvPr>
+            <p:ph type="sldNum" sz="quarter" idx="5"/>
+          </p:nvPr>
+        </p:nvSpPr>
+        <p:spPr/>
+        <p:txBody>
+          <a:bodyPr/>
+          <a:lstStyle/>
+          <a:p>
+            <a:fld id="{2B4F40D4-862D-491C-85E3-1A34EFA2BD00}" type="slidenum">
+              <a:rPr lang="en-US" smtClean="0"/>
+              <a:t>49</a:t>
+            </a:fld>
+            <a:endParaRPr lang="en-US"/>
+          </a:p>
+        </p:txBody>
+      </p:sp>
+    </p:spTree>
+    <p:extLst>
+      <p:ext uri="{BB962C8B-B14F-4D97-AF65-F5344CB8AC3E}">
+        <p14:creationId xmlns:p14="http://schemas.microsoft.com/office/powerpoint/2010/main" val="235732087"/>
       </p:ext>
     </p:extLst>
   </p:cSld>
@@ -40432,6 +40535,9 @@
                   <a:srgbClr val="0F54D6"/>
                 </a:solidFill>
                 <a:effectLst/>
+                <a:highlight>
+                  <a:srgbClr val="FFFF00"/>
+                </a:highlight>
                 <a:latin typeface="Consolas" panose="020B0609020204030204" pitchFamily="49" charset="0"/>
               </a:rPr>
               <a:t>delegate</a:t>
@@ -40445,6 +40551,9 @@
                   <a:srgbClr val="383838"/>
                 </a:solidFill>
                 <a:effectLst/>
+                <a:highlight>
+                  <a:srgbClr val="FFFF00"/>
+                </a:highlight>
                 <a:latin typeface="Consolas" panose="020B0609020204030204" pitchFamily="49" charset="0"/>
               </a:rPr>
               <a:t>* </a:t>
@@ -40458,6 +40567,9 @@
                   <a:srgbClr val="202020"/>
                 </a:solidFill>
                 <a:effectLst/>
+                <a:highlight>
+                  <a:srgbClr val="FFFF00"/>
+                </a:highlight>
                 <a:latin typeface="Consolas" panose="020B0609020204030204" pitchFamily="49" charset="0"/>
               </a:rPr>
               <a:t>unmanaged</a:t>
@@ -40471,6 +40583,9 @@
                   <a:srgbClr val="383838"/>
                 </a:solidFill>
                 <a:effectLst/>
+                <a:highlight>
+                  <a:srgbClr val="FFFF00"/>
+                </a:highlight>
                 <a:latin typeface="Consolas" panose="020B0609020204030204" pitchFamily="49" charset="0"/>
               </a:rPr>
               <a:t>[</a:t>
@@ -40484,6 +40599,9 @@
                   <a:srgbClr val="383838"/>
                 </a:solidFill>
                 <a:effectLst/>
+                <a:highlight>
+                  <a:srgbClr val="FFFF00"/>
+                </a:highlight>
                 <a:latin typeface="Consolas" panose="020B0609020204030204" pitchFamily="49" charset="0"/>
               </a:rPr>
               <a:t>Cdecl</a:t>
@@ -40497,6 +40615,9 @@
                   <a:srgbClr val="383838"/>
                 </a:solidFill>
                 <a:effectLst/>
+                <a:highlight>
+                  <a:srgbClr val="FFFF00"/>
+                </a:highlight>
                 <a:latin typeface="Consolas" panose="020B0609020204030204" pitchFamily="49" charset="0"/>
               </a:rPr>
               <a:t>]</a:t>
@@ -40537,6 +40658,9 @@
                   <a:srgbClr val="383838"/>
                 </a:solidFill>
                 <a:effectLst/>
+                <a:highlight>
+                  <a:srgbClr val="FFFF00"/>
+                </a:highlight>
                 <a:latin typeface="Consolas" panose="020B0609020204030204" pitchFamily="49" charset="0"/>
               </a:rPr>
               <a:t>&lt;</a:t>
@@ -40550,6 +40674,9 @@
                   <a:srgbClr val="0F54D6"/>
                 </a:solidFill>
                 <a:effectLst/>
+                <a:highlight>
+                  <a:srgbClr val="FFFF00"/>
+                </a:highlight>
                 <a:latin typeface="Consolas" panose="020B0609020204030204" pitchFamily="49" charset="0"/>
               </a:rPr>
               <a:t>void</a:t>
@@ -40563,6 +40690,9 @@
                   <a:srgbClr val="383838"/>
                 </a:solidFill>
                 <a:effectLst/>
+                <a:highlight>
+                  <a:srgbClr val="FFFF00"/>
+                </a:highlight>
                 <a:latin typeface="Consolas" panose="020B0609020204030204" pitchFamily="49" charset="0"/>
               </a:rPr>
               <a:t>*, </a:t>
@@ -40576,6 +40706,9 @@
                   <a:srgbClr val="0F54D6"/>
                 </a:solidFill>
                 <a:effectLst/>
+                <a:highlight>
+                  <a:srgbClr val="FFFF00"/>
+                </a:highlight>
                 <a:latin typeface="Consolas" panose="020B0609020204030204" pitchFamily="49" charset="0"/>
               </a:rPr>
               <a:t>int</a:t>
@@ -40589,6 +40722,9 @@
                   <a:srgbClr val="383838"/>
                 </a:solidFill>
                 <a:effectLst/>
+                <a:highlight>
+                  <a:srgbClr val="FFFF00"/>
+                </a:highlight>
                 <a:latin typeface="Consolas" panose="020B0609020204030204" pitchFamily="49" charset="0"/>
               </a:rPr>
               <a:t>, </a:t>
@@ -40602,6 +40738,9 @@
                   <a:srgbClr val="0F54D6"/>
                 </a:solidFill>
                 <a:effectLst/>
+                <a:highlight>
+                  <a:srgbClr val="FFFF00"/>
+                </a:highlight>
                 <a:latin typeface="Consolas" panose="020B0609020204030204" pitchFamily="49" charset="0"/>
               </a:rPr>
               <a:t>byte</a:t>
@@ -40615,6 +40754,9 @@
                   <a:srgbClr val="383838"/>
                 </a:solidFill>
                 <a:effectLst/>
+                <a:highlight>
+                  <a:srgbClr val="FFFF00"/>
+                </a:highlight>
                 <a:latin typeface="Consolas" panose="020B0609020204030204" pitchFamily="49" charset="0"/>
               </a:rPr>
               <a:t>**, </a:t>
@@ -40628,6 +40770,9 @@
                   <a:srgbClr val="0F54D6"/>
                 </a:solidFill>
                 <a:effectLst/>
+                <a:highlight>
+                  <a:srgbClr val="FFFF00"/>
+                </a:highlight>
                 <a:latin typeface="Consolas" panose="020B0609020204030204" pitchFamily="49" charset="0"/>
               </a:rPr>
               <a:t>byte</a:t>
@@ -40641,6 +40786,9 @@
                   <a:srgbClr val="383838"/>
                 </a:solidFill>
                 <a:effectLst/>
+                <a:highlight>
+                  <a:srgbClr val="FFFF00"/>
+                </a:highlight>
                 <a:latin typeface="Consolas" panose="020B0609020204030204" pitchFamily="49" charset="0"/>
               </a:rPr>
               <a:t>**, </a:t>
@@ -40654,6 +40802,9 @@
                   <a:srgbClr val="300073"/>
                 </a:solidFill>
                 <a:effectLst/>
+                <a:highlight>
+                  <a:srgbClr val="FFFF00"/>
+                </a:highlight>
                 <a:latin typeface="Consolas" panose="020B0609020204030204" pitchFamily="49" charset="0"/>
               </a:rPr>
               <a:t>ResultCode</a:t>
@@ -40667,9 +40818,25 @@
                   <a:srgbClr val="383838"/>
                 </a:solidFill>
                 <a:effectLst/>
-                <a:latin typeface="Consolas" panose="020B0609020204030204" pitchFamily="49" charset="0"/>
-              </a:rPr>
-              <a:t>&gt; callback,</a:t>
+                <a:highlight>
+                  <a:srgbClr val="FFFF00"/>
+                </a:highlight>
+                <a:latin typeface="Consolas" panose="020B0609020204030204" pitchFamily="49" charset="0"/>
+              </a:rPr>
+              <a:t>&gt; callback</a:t>
+            </a:r>
+            <a:r>
+              <a:rPr kumimoji="0" lang="en-US" altLang="en-US" b="0" i="0" u="none" strike="noStrike" cap="none" normalizeH="0" baseline="0" dirty="0">
+                <a:ln>
+                  <a:noFill/>
+                </a:ln>
+                <a:solidFill>
+                  <a:srgbClr val="383838"/>
+                </a:solidFill>
+                <a:effectLst/>
+                <a:latin typeface="Consolas" panose="020B0609020204030204" pitchFamily="49" charset="0"/>
+              </a:rPr>
+              <a:t>,</a:t>
             </a:r>
           </a:p>
           <a:p>
@@ -42062,6 +42229,9 @@
                   <a:srgbClr val="0F54D6"/>
                 </a:solidFill>
                 <a:effectLst/>
+                <a:highlight>
+                  <a:srgbClr val="FFFF00"/>
+                </a:highlight>
                 <a:latin typeface="Consolas" panose="020B0609020204030204" pitchFamily="49" charset="0"/>
               </a:rPr>
               <a:t>delegate</a:t>
@@ -42075,6 +42245,9 @@
                   <a:srgbClr val="383838"/>
                 </a:solidFill>
                 <a:effectLst/>
+                <a:highlight>
+                  <a:srgbClr val="FFFF00"/>
+                </a:highlight>
                 <a:latin typeface="Consolas" panose="020B0609020204030204" pitchFamily="49" charset="0"/>
               </a:rPr>
               <a:t>* </a:t>
@@ -42088,6 +42261,9 @@
                   <a:srgbClr val="202020"/>
                 </a:solidFill>
                 <a:effectLst/>
+                <a:highlight>
+                  <a:srgbClr val="FFFF00"/>
+                </a:highlight>
                 <a:latin typeface="Consolas" panose="020B0609020204030204" pitchFamily="49" charset="0"/>
               </a:rPr>
               <a:t>unmanaged</a:t>
@@ -42101,6 +42277,9 @@
                   <a:srgbClr val="383838"/>
                 </a:solidFill>
                 <a:effectLst/>
+                <a:highlight>
+                  <a:srgbClr val="FFFF00"/>
+                </a:highlight>
                 <a:latin typeface="Consolas" panose="020B0609020204030204" pitchFamily="49" charset="0"/>
               </a:rPr>
               <a:t>[</a:t>
@@ -42114,6 +42293,9 @@
                   <a:srgbClr val="383838"/>
                 </a:solidFill>
                 <a:effectLst/>
+                <a:highlight>
+                  <a:srgbClr val="FFFF00"/>
+                </a:highlight>
                 <a:latin typeface="Consolas" panose="020B0609020204030204" pitchFamily="49" charset="0"/>
               </a:rPr>
               <a:t>Cdecl</a:t>
@@ -42127,6 +42309,9 @@
                   <a:srgbClr val="383838"/>
                 </a:solidFill>
                 <a:effectLst/>
+                <a:highlight>
+                  <a:srgbClr val="FFFF00"/>
+                </a:highlight>
                 <a:latin typeface="Consolas" panose="020B0609020204030204" pitchFamily="49" charset="0"/>
               </a:rPr>
               <a:t>]</a:t>
@@ -42167,6 +42352,9 @@
                   <a:srgbClr val="383838"/>
                 </a:solidFill>
                 <a:effectLst/>
+                <a:highlight>
+                  <a:srgbClr val="FFFF00"/>
+                </a:highlight>
                 <a:latin typeface="Consolas" panose="020B0609020204030204" pitchFamily="49" charset="0"/>
               </a:rPr>
               <a:t>&lt;</a:t>
@@ -42180,6 +42368,9 @@
                   <a:srgbClr val="0F54D6"/>
                 </a:solidFill>
                 <a:effectLst/>
+                <a:highlight>
+                  <a:srgbClr val="FFFF00"/>
+                </a:highlight>
                 <a:latin typeface="Consolas" panose="020B0609020204030204" pitchFamily="49" charset="0"/>
               </a:rPr>
               <a:t>void</a:t>
@@ -42193,6 +42384,9 @@
                   <a:srgbClr val="383838"/>
                 </a:solidFill>
                 <a:effectLst/>
+                <a:highlight>
+                  <a:srgbClr val="FFFF00"/>
+                </a:highlight>
                 <a:latin typeface="Consolas" panose="020B0609020204030204" pitchFamily="49" charset="0"/>
               </a:rPr>
               <a:t>*, </a:t>
@@ -42206,6 +42400,9 @@
                   <a:srgbClr val="0F54D6"/>
                 </a:solidFill>
                 <a:effectLst/>
+                <a:highlight>
+                  <a:srgbClr val="FFFF00"/>
+                </a:highlight>
                 <a:latin typeface="Consolas" panose="020B0609020204030204" pitchFamily="49" charset="0"/>
               </a:rPr>
               <a:t>int</a:t>
@@ -42219,6 +42416,9 @@
                   <a:srgbClr val="383838"/>
                 </a:solidFill>
                 <a:effectLst/>
+                <a:highlight>
+                  <a:srgbClr val="FFFF00"/>
+                </a:highlight>
                 <a:latin typeface="Consolas" panose="020B0609020204030204" pitchFamily="49" charset="0"/>
               </a:rPr>
               <a:t>, </a:t>
@@ -42232,6 +42432,9 @@
                   <a:srgbClr val="0F54D6"/>
                 </a:solidFill>
                 <a:effectLst/>
+                <a:highlight>
+                  <a:srgbClr val="FFFF00"/>
+                </a:highlight>
                 <a:latin typeface="Consolas" panose="020B0609020204030204" pitchFamily="49" charset="0"/>
               </a:rPr>
               <a:t>byte</a:t>
@@ -42245,6 +42448,9 @@
                   <a:srgbClr val="383838"/>
                 </a:solidFill>
                 <a:effectLst/>
+                <a:highlight>
+                  <a:srgbClr val="FFFF00"/>
+                </a:highlight>
                 <a:latin typeface="Consolas" panose="020B0609020204030204" pitchFamily="49" charset="0"/>
               </a:rPr>
               <a:t>**, </a:t>
@@ -42258,6 +42464,9 @@
                   <a:srgbClr val="0F54D6"/>
                 </a:solidFill>
                 <a:effectLst/>
+                <a:highlight>
+                  <a:srgbClr val="FFFF00"/>
+                </a:highlight>
                 <a:latin typeface="Consolas" panose="020B0609020204030204" pitchFamily="49" charset="0"/>
               </a:rPr>
               <a:t>byte</a:t>
@@ -42271,6 +42480,9 @@
                   <a:srgbClr val="383838"/>
                 </a:solidFill>
                 <a:effectLst/>
+                <a:highlight>
+                  <a:srgbClr val="FFFF00"/>
+                </a:highlight>
                 <a:latin typeface="Consolas" panose="020B0609020204030204" pitchFamily="49" charset="0"/>
               </a:rPr>
               <a:t>**, </a:t>
@@ -42284,6 +42496,9 @@
                   <a:srgbClr val="300073"/>
                 </a:solidFill>
                 <a:effectLst/>
+                <a:highlight>
+                  <a:srgbClr val="FFFF00"/>
+                </a:highlight>
                 <a:latin typeface="Consolas" panose="020B0609020204030204" pitchFamily="49" charset="0"/>
               </a:rPr>
               <a:t>ResultCode</a:t>
@@ -42297,9 +42512,25 @@
                   <a:srgbClr val="383838"/>
                 </a:solidFill>
                 <a:effectLst/>
-                <a:latin typeface="Consolas" panose="020B0609020204030204" pitchFamily="49" charset="0"/>
-              </a:rPr>
-              <a:t>&gt; callback)</a:t>
+                <a:highlight>
+                  <a:srgbClr val="FFFF00"/>
+                </a:highlight>
+                <a:latin typeface="Consolas" panose="020B0609020204030204" pitchFamily="49" charset="0"/>
+              </a:rPr>
+              <a:t>&gt; callback</a:t>
+            </a:r>
+            <a:r>
+              <a:rPr kumimoji="0" lang="en-US" altLang="en-US" b="0" i="0" u="none" strike="noStrike" cap="none" normalizeH="0" baseline="0" dirty="0">
+                <a:ln>
+                  <a:noFill/>
+                </a:ln>
+                <a:solidFill>
+                  <a:srgbClr val="383838"/>
+                </a:solidFill>
+                <a:effectLst/>
+                <a:latin typeface="Consolas" panose="020B0609020204030204" pitchFamily="49" charset="0"/>
+              </a:rPr>
+              <a:t>)</a:t>
             </a:r>
             <a:br>
               <a:rPr kumimoji="0" lang="en-US" altLang="en-US" b="0" i="0" u="none" strike="noStrike" cap="none" normalizeH="0" baseline="0" dirty="0">

</xml_diff>

<commit_message>
Joke removed (didn't really fit)
</commit_message>
<xml_diff>
--- a/doc/Introduction to unsafe C#.pptx
+++ b/doc/Introduction to unsafe C#.pptx
@@ -251,7 +251,7 @@
           <a:p>
             <a:fld id="{2B6DBF41-98D5-4B29-8B81-B31614D19ACC}" type="datetimeFigureOut">
               <a:rPr lang="en-US" smtClean="0"/>
-              <a:t>5/13/2023</a:t>
+              <a:t>5/14/2023</a:t>
             </a:fld>
             <a:endParaRPr lang="en-US"/>
           </a:p>
@@ -1167,7 +1167,7 @@
           <a:p>
             <a:fld id="{F9BC75CE-03FF-4667-898C-4C70B4392062}" type="datetimeFigureOut">
               <a:rPr lang="en-US" smtClean="0"/>
-              <a:t>5/13/2023</a:t>
+              <a:t>5/14/2023</a:t>
             </a:fld>
             <a:endParaRPr lang="en-US"/>
           </a:p>
@@ -1442,7 +1442,7 @@
           <a:p>
             <a:fld id="{F9BC75CE-03FF-4667-898C-4C70B4392062}" type="datetimeFigureOut">
               <a:rPr lang="en-US" smtClean="0"/>
-              <a:t>5/13/2023</a:t>
+              <a:t>5/14/2023</a:t>
             </a:fld>
             <a:endParaRPr lang="en-US"/>
           </a:p>
@@ -1636,7 +1636,7 @@
           <a:p>
             <a:fld id="{F9BC75CE-03FF-4667-898C-4C70B4392062}" type="datetimeFigureOut">
               <a:rPr lang="en-US" smtClean="0"/>
-              <a:t>5/13/2023</a:t>
+              <a:t>5/14/2023</a:t>
             </a:fld>
             <a:endParaRPr lang="en-US"/>
           </a:p>
@@ -1909,7 +1909,7 @@
           <a:p>
             <a:fld id="{F9BC75CE-03FF-4667-898C-4C70B4392062}" type="datetimeFigureOut">
               <a:rPr lang="en-US" smtClean="0"/>
-              <a:t>5/13/2023</a:t>
+              <a:t>5/14/2023</a:t>
             </a:fld>
             <a:endParaRPr lang="en-US"/>
           </a:p>
@@ -2250,7 +2250,7 @@
           <a:p>
             <a:fld id="{F9BC75CE-03FF-4667-898C-4C70B4392062}" type="datetimeFigureOut">
               <a:rPr lang="en-US" smtClean="0"/>
-              <a:t>5/13/2023</a:t>
+              <a:t>5/14/2023</a:t>
             </a:fld>
             <a:endParaRPr lang="en-US"/>
           </a:p>
@@ -2873,7 +2873,7 @@
           <a:p>
             <a:fld id="{F9BC75CE-03FF-4667-898C-4C70B4392062}" type="datetimeFigureOut">
               <a:rPr lang="en-US" smtClean="0"/>
-              <a:t>5/13/2023</a:t>
+              <a:t>5/14/2023</a:t>
             </a:fld>
             <a:endParaRPr lang="en-US"/>
           </a:p>
@@ -3733,7 +3733,7 @@
           <a:p>
             <a:fld id="{F9BC75CE-03FF-4667-898C-4C70B4392062}" type="datetimeFigureOut">
               <a:rPr lang="en-US" smtClean="0"/>
-              <a:t>5/13/2023</a:t>
+              <a:t>5/14/2023</a:t>
             </a:fld>
             <a:endParaRPr lang="en-US"/>
           </a:p>
@@ -3903,7 +3903,7 @@
           <a:p>
             <a:fld id="{F9BC75CE-03FF-4667-898C-4C70B4392062}" type="datetimeFigureOut">
               <a:rPr lang="en-US" smtClean="0"/>
-              <a:t>5/13/2023</a:t>
+              <a:t>5/14/2023</a:t>
             </a:fld>
             <a:endParaRPr lang="en-US"/>
           </a:p>
@@ -4083,7 +4083,7 @@
           <a:p>
             <a:fld id="{F9BC75CE-03FF-4667-898C-4C70B4392062}" type="datetimeFigureOut">
               <a:rPr lang="en-US" smtClean="0"/>
-              <a:t>5/13/2023</a:t>
+              <a:t>5/14/2023</a:t>
             </a:fld>
             <a:endParaRPr lang="en-US"/>
           </a:p>
@@ -4253,7 +4253,7 @@
           <a:p>
             <a:fld id="{F9BC75CE-03FF-4667-898C-4C70B4392062}" type="datetimeFigureOut">
               <a:rPr lang="en-US" smtClean="0"/>
-              <a:t>5/13/2023</a:t>
+              <a:t>5/14/2023</a:t>
             </a:fld>
             <a:endParaRPr lang="en-US"/>
           </a:p>
@@ -4500,7 +4500,7 @@
           <a:p>
             <a:fld id="{F9BC75CE-03FF-4667-898C-4C70B4392062}" type="datetimeFigureOut">
               <a:rPr lang="en-US" smtClean="0"/>
-              <a:t>5/13/2023</a:t>
+              <a:t>5/14/2023</a:t>
             </a:fld>
             <a:endParaRPr lang="en-US"/>
           </a:p>
@@ -4792,7 +4792,7 @@
           <a:p>
             <a:fld id="{F9BC75CE-03FF-4667-898C-4C70B4392062}" type="datetimeFigureOut">
               <a:rPr lang="en-US" smtClean="0"/>
-              <a:t>5/13/2023</a:t>
+              <a:t>5/14/2023</a:t>
             </a:fld>
             <a:endParaRPr lang="en-US"/>
           </a:p>
@@ -5236,7 +5236,7 @@
           <a:p>
             <a:fld id="{F9BC75CE-03FF-4667-898C-4C70B4392062}" type="datetimeFigureOut">
               <a:rPr lang="en-US" smtClean="0"/>
-              <a:t>5/13/2023</a:t>
+              <a:t>5/14/2023</a:t>
             </a:fld>
             <a:endParaRPr lang="en-US"/>
           </a:p>
@@ -5354,7 +5354,7 @@
           <a:p>
             <a:fld id="{F9BC75CE-03FF-4667-898C-4C70B4392062}" type="datetimeFigureOut">
               <a:rPr lang="en-US" smtClean="0"/>
-              <a:t>5/13/2023</a:t>
+              <a:t>5/14/2023</a:t>
             </a:fld>
             <a:endParaRPr lang="en-US"/>
           </a:p>
@@ -5449,7 +5449,7 @@
           <a:p>
             <a:fld id="{F9BC75CE-03FF-4667-898C-4C70B4392062}" type="datetimeFigureOut">
               <a:rPr lang="en-US" smtClean="0"/>
-              <a:t>5/13/2023</a:t>
+              <a:t>5/14/2023</a:t>
             </a:fld>
             <a:endParaRPr lang="en-US"/>
           </a:p>
@@ -5728,7 +5728,7 @@
           <a:p>
             <a:fld id="{F9BC75CE-03FF-4667-898C-4C70B4392062}" type="datetimeFigureOut">
               <a:rPr lang="en-US" smtClean="0"/>
-              <a:t>5/13/2023</a:t>
+              <a:t>5/14/2023</a:t>
             </a:fld>
             <a:endParaRPr lang="en-US"/>
           </a:p>
@@ -6003,7 +6003,7 @@
           <a:p>
             <a:fld id="{F9BC75CE-03FF-4667-898C-4C70B4392062}" type="datetimeFigureOut">
               <a:rPr lang="en-US" smtClean="0"/>
-              <a:t>5/13/2023</a:t>
+              <a:t>5/14/2023</a:t>
             </a:fld>
             <a:endParaRPr lang="en-US"/>
           </a:p>
@@ -6432,7 +6432,7 @@
           <a:p>
             <a:fld id="{F9BC75CE-03FF-4667-898C-4C70B4392062}" type="datetimeFigureOut">
               <a:rPr lang="en-US" smtClean="0"/>
-              <a:t>5/13/2023</a:t>
+              <a:t>5/14/2023</a:t>
             </a:fld>
             <a:endParaRPr lang="en-US"/>
           </a:p>
@@ -7585,7 +7585,7 @@
           <a:p>
             <a:r>
               <a:rPr lang="en-US" sz="1200" dirty="0"/>
-              <a:t>Rev. 6 (2023-05-??), </a:t>
+              <a:t>Rev. 6 (2023-05-14), </a:t>
             </a:r>
             <a:r>
               <a:rPr lang="en-US" sz="1200" dirty="0">
@@ -7597,56 +7597,6 @@
           </a:p>
         </p:txBody>
       </p:sp>
-      <p:pic>
-        <p:nvPicPr>
-          <p:cNvPr id="6" name="Picture 5" descr="Screenshot of Mastodon post:&#10;&quot;I'm honored to be presenting at Techorama Belgium this year! Be sure to attend my talk if you're curious how pointers can help you make your C# code more brittle, more unreliable, and more crashy!&quot;">
-            <a:extLst>
-              <a:ext uri="{FF2B5EF4-FFF2-40B4-BE49-F238E27FC236}">
-                <a16:creationId xmlns:a16="http://schemas.microsoft.com/office/drawing/2014/main" id="{28EACEB6-8666-432E-DC1D-1F05E86F4027}"/>
-              </a:ext>
-            </a:extLst>
-          </p:cNvPr>
-          <p:cNvPicPr>
-            <a:picLocks noChangeAspect="1"/>
-          </p:cNvPicPr>
-          <p:nvPr/>
-        </p:nvPicPr>
-        <p:blipFill>
-          <a:blip r:embed="rId4">
-            <a:extLst>
-              <a:ext uri="{28A0092B-C50C-407E-A947-70E740481C1C}">
-                <a14:useLocalDpi xmlns:a14="http://schemas.microsoft.com/office/drawing/2010/main" val="0"/>
-              </a:ext>
-            </a:extLst>
-          </a:blip>
-          <a:stretch>
-            <a:fillRect/>
-          </a:stretch>
-        </p:blipFill>
-        <p:spPr>
-          <a:xfrm rot="1320000">
-            <a:off x="7448748" y="971695"/>
-            <a:ext cx="4051508" cy="2433763"/>
-          </a:xfrm>
-          <a:prstGeom prst="rect">
-            <a:avLst/>
-          </a:prstGeom>
-          <a:ln w="15875">
-            <a:solidFill>
-              <a:schemeClr val="accent1"/>
-            </a:solidFill>
-          </a:ln>
-          <a:effectLst>
-            <a:outerShdw blurRad="127000" dist="127000" dir="2700000" algn="tl" rotWithShape="0">
-              <a:schemeClr val="bg1">
-                <a:lumMod val="95000"/>
-                <a:lumOff val="5000"/>
-                <a:alpha val="80000"/>
-              </a:schemeClr>
-            </a:outerShdw>
-          </a:effectLst>
-        </p:spPr>
-      </p:pic>
     </p:spTree>
     <p:extLst>
       <p:ext uri="{BB962C8B-B14F-4D97-AF65-F5344CB8AC3E}">
@@ -7657,81 +7607,6 @@
   <p:clrMapOvr>
     <a:masterClrMapping/>
   </p:clrMapOvr>
-  <p:timing>
-    <p:tnLst>
-      <p:par>
-        <p:cTn id="1" dur="indefinite" restart="never" nodeType="tmRoot">
-          <p:childTnLst>
-            <p:seq concurrent="1" nextAc="seek">
-              <p:cTn id="2" dur="indefinite" nodeType="mainSeq">
-                <p:childTnLst>
-                  <p:par>
-                    <p:cTn id="3" fill="hold">
-                      <p:stCondLst>
-                        <p:cond delay="indefinite"/>
-                      </p:stCondLst>
-                      <p:childTnLst>
-                        <p:par>
-                          <p:cTn id="4" fill="hold">
-                            <p:stCondLst>
-                              <p:cond delay="0"/>
-                            </p:stCondLst>
-                            <p:childTnLst>
-                              <p:par>
-                                <p:cTn id="5" presetID="1" presetClass="entr" presetSubtype="0" fill="hold" nodeType="clickEffect">
-                                  <p:stCondLst>
-                                    <p:cond delay="0"/>
-                                  </p:stCondLst>
-                                  <p:childTnLst>
-                                    <p:set>
-                                      <p:cBhvr>
-                                        <p:cTn id="6" dur="1" fill="hold">
-                                          <p:stCondLst>
-                                            <p:cond delay="0"/>
-                                          </p:stCondLst>
-                                        </p:cTn>
-                                        <p:tgtEl>
-                                          <p:spTgt spid="6"/>
-                                        </p:tgtEl>
-                                        <p:attrNameLst>
-                                          <p:attrName>style.visibility</p:attrName>
-                                        </p:attrNameLst>
-                                      </p:cBhvr>
-                                      <p:to>
-                                        <p:strVal val="visible"/>
-                                      </p:to>
-                                    </p:set>
-                                  </p:childTnLst>
-                                </p:cTn>
-                              </p:par>
-                            </p:childTnLst>
-                          </p:cTn>
-                        </p:par>
-                      </p:childTnLst>
-                    </p:cTn>
-                  </p:par>
-                </p:childTnLst>
-              </p:cTn>
-              <p:prevCondLst>
-                <p:cond evt="onPrev" delay="0">
-                  <p:tgtEl>
-                    <p:sldTgt/>
-                  </p:tgtEl>
-                </p:cond>
-              </p:prevCondLst>
-              <p:nextCondLst>
-                <p:cond evt="onNext" delay="0">
-                  <p:tgtEl>
-                    <p:sldTgt/>
-                  </p:tgtEl>
-                </p:cond>
-              </p:nextCondLst>
-            </p:seq>
-          </p:childTnLst>
-        </p:cTn>
-      </p:par>
-    </p:tnLst>
-  </p:timing>
 </p:sld>
 </file>
 

</xml_diff>

<commit_message>
Updated job title :)
</commit_message>
<xml_diff>
--- a/doc/Introduction to unsafe C#.pptx
+++ b/doc/Introduction to unsafe C#.pptx
@@ -251,7 +251,7 @@
           <a:p>
             <a:fld id="{2B6DBF41-98D5-4B29-8B81-B31614D19ACC}" type="datetimeFigureOut">
               <a:rPr lang="en-US" smtClean="0"/>
-              <a:t>5/14/2023</a:t>
+              <a:t>10/5/23</a:t>
             </a:fld>
             <a:endParaRPr lang="en-US"/>
           </a:p>
@@ -1167,7 +1167,7 @@
           <a:p>
             <a:fld id="{F9BC75CE-03FF-4667-898C-4C70B4392062}" type="datetimeFigureOut">
               <a:rPr lang="en-US" smtClean="0"/>
-              <a:t>5/14/2023</a:t>
+              <a:t>10/5/23</a:t>
             </a:fld>
             <a:endParaRPr lang="en-US"/>
           </a:p>
@@ -1442,7 +1442,7 @@
           <a:p>
             <a:fld id="{F9BC75CE-03FF-4667-898C-4C70B4392062}" type="datetimeFigureOut">
               <a:rPr lang="en-US" smtClean="0"/>
-              <a:t>5/14/2023</a:t>
+              <a:t>10/5/23</a:t>
             </a:fld>
             <a:endParaRPr lang="en-US"/>
           </a:p>
@@ -1636,7 +1636,7 @@
           <a:p>
             <a:fld id="{F9BC75CE-03FF-4667-898C-4C70B4392062}" type="datetimeFigureOut">
               <a:rPr lang="en-US" smtClean="0"/>
-              <a:t>5/14/2023</a:t>
+              <a:t>10/5/23</a:t>
             </a:fld>
             <a:endParaRPr lang="en-US"/>
           </a:p>
@@ -1909,7 +1909,7 @@
           <a:p>
             <a:fld id="{F9BC75CE-03FF-4667-898C-4C70B4392062}" type="datetimeFigureOut">
               <a:rPr lang="en-US" smtClean="0"/>
-              <a:t>5/14/2023</a:t>
+              <a:t>10/5/23</a:t>
             </a:fld>
             <a:endParaRPr lang="en-US"/>
           </a:p>
@@ -2250,7 +2250,7 @@
           <a:p>
             <a:fld id="{F9BC75CE-03FF-4667-898C-4C70B4392062}" type="datetimeFigureOut">
               <a:rPr lang="en-US" smtClean="0"/>
-              <a:t>5/14/2023</a:t>
+              <a:t>10/5/23</a:t>
             </a:fld>
             <a:endParaRPr lang="en-US"/>
           </a:p>
@@ -2873,7 +2873,7 @@
           <a:p>
             <a:fld id="{F9BC75CE-03FF-4667-898C-4C70B4392062}" type="datetimeFigureOut">
               <a:rPr lang="en-US" smtClean="0"/>
-              <a:t>5/14/2023</a:t>
+              <a:t>10/5/23</a:t>
             </a:fld>
             <a:endParaRPr lang="en-US"/>
           </a:p>
@@ -3733,7 +3733,7 @@
           <a:p>
             <a:fld id="{F9BC75CE-03FF-4667-898C-4C70B4392062}" type="datetimeFigureOut">
               <a:rPr lang="en-US" smtClean="0"/>
-              <a:t>5/14/2023</a:t>
+              <a:t>10/5/23</a:t>
             </a:fld>
             <a:endParaRPr lang="en-US"/>
           </a:p>
@@ -3903,7 +3903,7 @@
           <a:p>
             <a:fld id="{F9BC75CE-03FF-4667-898C-4C70B4392062}" type="datetimeFigureOut">
               <a:rPr lang="en-US" smtClean="0"/>
-              <a:t>5/14/2023</a:t>
+              <a:t>10/5/23</a:t>
             </a:fld>
             <a:endParaRPr lang="en-US"/>
           </a:p>
@@ -4083,7 +4083,7 @@
           <a:p>
             <a:fld id="{F9BC75CE-03FF-4667-898C-4C70B4392062}" type="datetimeFigureOut">
               <a:rPr lang="en-US" smtClean="0"/>
-              <a:t>5/14/2023</a:t>
+              <a:t>10/5/23</a:t>
             </a:fld>
             <a:endParaRPr lang="en-US"/>
           </a:p>
@@ -4253,7 +4253,7 @@
           <a:p>
             <a:fld id="{F9BC75CE-03FF-4667-898C-4C70B4392062}" type="datetimeFigureOut">
               <a:rPr lang="en-US" smtClean="0"/>
-              <a:t>5/14/2023</a:t>
+              <a:t>10/5/23</a:t>
             </a:fld>
             <a:endParaRPr lang="en-US"/>
           </a:p>
@@ -4500,7 +4500,7 @@
           <a:p>
             <a:fld id="{F9BC75CE-03FF-4667-898C-4C70B4392062}" type="datetimeFigureOut">
               <a:rPr lang="en-US" smtClean="0"/>
-              <a:t>5/14/2023</a:t>
+              <a:t>10/5/23</a:t>
             </a:fld>
             <a:endParaRPr lang="en-US"/>
           </a:p>
@@ -4792,7 +4792,7 @@
           <a:p>
             <a:fld id="{F9BC75CE-03FF-4667-898C-4C70B4392062}" type="datetimeFigureOut">
               <a:rPr lang="en-US" smtClean="0"/>
-              <a:t>5/14/2023</a:t>
+              <a:t>10/5/23</a:t>
             </a:fld>
             <a:endParaRPr lang="en-US"/>
           </a:p>
@@ -5236,7 +5236,7 @@
           <a:p>
             <a:fld id="{F9BC75CE-03FF-4667-898C-4C70B4392062}" type="datetimeFigureOut">
               <a:rPr lang="en-US" smtClean="0"/>
-              <a:t>5/14/2023</a:t>
+              <a:t>10/5/23</a:t>
             </a:fld>
             <a:endParaRPr lang="en-US"/>
           </a:p>
@@ -5354,7 +5354,7 @@
           <a:p>
             <a:fld id="{F9BC75CE-03FF-4667-898C-4C70B4392062}" type="datetimeFigureOut">
               <a:rPr lang="en-US" smtClean="0"/>
-              <a:t>5/14/2023</a:t>
+              <a:t>10/5/23</a:t>
             </a:fld>
             <a:endParaRPr lang="en-US"/>
           </a:p>
@@ -5449,7 +5449,7 @@
           <a:p>
             <a:fld id="{F9BC75CE-03FF-4667-898C-4C70B4392062}" type="datetimeFigureOut">
               <a:rPr lang="en-US" smtClean="0"/>
-              <a:t>5/14/2023</a:t>
+              <a:t>10/5/23</a:t>
             </a:fld>
             <a:endParaRPr lang="en-US"/>
           </a:p>
@@ -5728,7 +5728,7 @@
           <a:p>
             <a:fld id="{F9BC75CE-03FF-4667-898C-4C70B4392062}" type="datetimeFigureOut">
               <a:rPr lang="en-US" smtClean="0"/>
-              <a:t>5/14/2023</a:t>
+              <a:t>10/5/23</a:t>
             </a:fld>
             <a:endParaRPr lang="en-US"/>
           </a:p>
@@ -6003,7 +6003,7 @@
           <a:p>
             <a:fld id="{F9BC75CE-03FF-4667-898C-4C70B4392062}" type="datetimeFigureOut">
               <a:rPr lang="en-US" smtClean="0"/>
-              <a:t>5/14/2023</a:t>
+              <a:t>10/5/23</a:t>
             </a:fld>
             <a:endParaRPr lang="en-US"/>
           </a:p>
@@ -6432,7 +6432,7 @@
           <a:p>
             <a:fld id="{F9BC75CE-03FF-4667-898C-4C70B4392062}" type="datetimeFigureOut">
               <a:rPr lang="en-US" smtClean="0"/>
-              <a:t>5/14/2023</a:t>
+              <a:t>10/5/23</a:t>
             </a:fld>
             <a:endParaRPr lang="en-US"/>
           </a:p>
@@ -7296,15 +7296,15 @@
           </a:lstStyle>
           <a:p>
             <a:r>
-              <a:rPr lang="en-US"/>
+              <a:rPr lang="en-US" dirty="0"/>
               <a:t>Dennis Dietrich</a:t>
             </a:r>
             <a:br>
-              <a:rPr lang="en-US"/>
+              <a:rPr lang="en-US" dirty="0"/>
             </a:br>
             <a:r>
-              <a:rPr lang="en-US"/>
-              <a:t>Senior Software Engineer, Microsoft</a:t>
+              <a:rPr lang="en-US" dirty="0"/>
+              <a:t>Manager Software Development ICS, Phoenix Contact</a:t>
             </a:r>
           </a:p>
         </p:txBody>
@@ -7585,7 +7585,7 @@
           <a:p>
             <a:r>
               <a:rPr lang="en-US" sz="1200" dirty="0"/>
-              <a:t>Rev. 6 (2023-05-14), </a:t>
+              <a:t>Rev. 7 (2023-10-??), </a:t>
             </a:r>
             <a:r>
               <a:rPr lang="en-US" sz="1200" dirty="0">

</xml_diff>

<commit_message>
Removed section 'Managing unmanaged memory'
</commit_message>
<xml_diff>
--- a/doc/Introduction to unsafe C#.pptx
+++ b/doc/Introduction to unsafe C#.pptx
@@ -28,11 +28,11 @@
     <p:sldId id="300" r:id="rId19"/>
     <p:sldId id="301" r:id="rId20"/>
     <p:sldId id="329" r:id="rId21"/>
-    <p:sldId id="316" r:id="rId22"/>
-    <p:sldId id="302" r:id="rId23"/>
-    <p:sldId id="303" r:id="rId24"/>
-    <p:sldId id="270" r:id="rId25"/>
-    <p:sldId id="289" r:id="rId26"/>
+    <p:sldId id="289" r:id="rId22"/>
+    <p:sldId id="316" r:id="rId23"/>
+    <p:sldId id="302" r:id="rId24"/>
+    <p:sldId id="303" r:id="rId25"/>
+    <p:sldId id="270" r:id="rId26"/>
     <p:sldId id="304" r:id="rId27"/>
     <p:sldId id="305" r:id="rId28"/>
     <p:sldId id="273" r:id="rId29"/>
@@ -857,7 +857,7 @@
           <a:p>
             <a:fld id="{2B4F40D4-862D-491C-85E3-1A34EFA2BD00}" type="slidenum">
               <a:rPr lang="en-US" smtClean="0"/>
-              <a:t>25</a:t>
+              <a:t>21</a:t>
             </a:fld>
             <a:endParaRPr lang="en-US"/>
           </a:p>
@@ -877,6 +877,93 @@
 </file>
 
 <file path=ppt/notesSlides/notesSlide5.xml><?xml version="1.0" encoding="utf-8"?>
+<p:notes xmlns:a="http://schemas.openxmlformats.org/drawingml/2006/main" xmlns:r="http://schemas.openxmlformats.org/officeDocument/2006/relationships" xmlns:p="http://schemas.openxmlformats.org/presentationml/2006/main">
+  <p:cSld>
+    <p:spTree>
+      <p:nvGrpSpPr>
+        <p:cNvPr id="1" name=""/>
+        <p:cNvGrpSpPr/>
+        <p:nvPr/>
+      </p:nvGrpSpPr>
+      <p:grpSpPr>
+        <a:xfrm>
+          <a:off x="0" y="0"/>
+          <a:ext cx="0" cy="0"/>
+          <a:chOff x="0" y="0"/>
+          <a:chExt cx="0" cy="0"/>
+        </a:xfrm>
+      </p:grpSpPr>
+      <p:sp>
+        <p:nvSpPr>
+          <p:cNvPr id="2" name="Slide Image Placeholder 1"/>
+          <p:cNvSpPr>
+            <a:spLocks noGrp="1" noRot="1" noChangeAspect="1"/>
+          </p:cNvSpPr>
+          <p:nvPr>
+            <p:ph type="sldImg"/>
+          </p:nvPr>
+        </p:nvSpPr>
+        <p:spPr/>
+      </p:sp>
+      <p:sp>
+        <p:nvSpPr>
+          <p:cNvPr id="3" name="Notes Placeholder 2"/>
+          <p:cNvSpPr>
+            <a:spLocks noGrp="1"/>
+          </p:cNvSpPr>
+          <p:nvPr>
+            <p:ph type="body" idx="1"/>
+          </p:nvPr>
+        </p:nvSpPr>
+        <p:spPr/>
+        <p:txBody>
+          <a:bodyPr/>
+          <a:lstStyle/>
+          <a:p>
+            <a:r>
+              <a:rPr lang="en-US" dirty="0"/>
+              <a:t>Supported in .NET 6 and later</a:t>
+            </a:r>
+          </a:p>
+        </p:txBody>
+      </p:sp>
+      <p:sp>
+        <p:nvSpPr>
+          <p:cNvPr id="4" name="Slide Number Placeholder 3"/>
+          <p:cNvSpPr>
+            <a:spLocks noGrp="1"/>
+          </p:cNvSpPr>
+          <p:nvPr>
+            <p:ph type="sldNum" sz="quarter" idx="5"/>
+          </p:nvPr>
+        </p:nvSpPr>
+        <p:spPr/>
+        <p:txBody>
+          <a:bodyPr/>
+          <a:lstStyle/>
+          <a:p>
+            <a:fld id="{2B4F40D4-862D-491C-85E3-1A34EFA2BD00}" type="slidenum">
+              <a:rPr lang="en-US" smtClean="0"/>
+              <a:t>23</a:t>
+            </a:fld>
+            <a:endParaRPr lang="en-US"/>
+          </a:p>
+        </p:txBody>
+      </p:sp>
+    </p:spTree>
+    <p:extLst>
+      <p:ext uri="{BB962C8B-B14F-4D97-AF65-F5344CB8AC3E}">
+        <p14:creationId xmlns:p14="http://schemas.microsoft.com/office/powerpoint/2010/main" val="967013280"/>
+      </p:ext>
+    </p:extLst>
+  </p:cSld>
+  <p:clrMapOvr>
+    <a:masterClrMapping/>
+  </p:clrMapOvr>
+</p:notes>
+</file>
+
+<file path=ppt/notesSlides/notesSlide6.xml><?xml version="1.0" encoding="utf-8"?>
 <p:notes xmlns:a="http://schemas.openxmlformats.org/drawingml/2006/main" xmlns:r="http://schemas.openxmlformats.org/officeDocument/2006/relationships" xmlns:p="http://schemas.openxmlformats.org/presentationml/2006/main">
   <p:cSld>
     <p:spTree>
@@ -16713,12 +16800,6 @@
           <a:p>
             <a:r>
               <a:rPr lang="en-US" dirty="0"/>
-              <a:t>Managing unmanaged memory</a:t>
-            </a:r>
-          </a:p>
-          <a:p>
-            <a:r>
-              <a:rPr lang="en-US" dirty="0"/>
               <a:t>Platform Invoke (P/Invoke)</a:t>
             </a:r>
           </a:p>
@@ -17103,55 +17184,6 @@
                       </p:childTnLst>
                     </p:cTn>
                   </p:par>
-                  <p:par>
-                    <p:cTn id="31" fill="hold">
-                      <p:stCondLst>
-                        <p:cond delay="indefinite"/>
-                      </p:stCondLst>
-                      <p:childTnLst>
-                        <p:par>
-                          <p:cTn id="32" fill="hold">
-                            <p:stCondLst>
-                              <p:cond delay="0"/>
-                            </p:stCondLst>
-                            <p:childTnLst>
-                              <p:par>
-                                <p:cTn id="33" presetID="1" presetClass="entr" presetSubtype="0" fill="hold" grpId="0" nodeType="clickEffect">
-                                  <p:stCondLst>
-                                    <p:cond delay="0"/>
-                                  </p:stCondLst>
-                                  <p:childTnLst>
-                                    <p:set>
-                                      <p:cBhvr>
-                                        <p:cTn id="34" dur="1" fill="hold">
-                                          <p:stCondLst>
-                                            <p:cond delay="0"/>
-                                          </p:stCondLst>
-                                        </p:cTn>
-                                        <p:tgtEl>
-                                          <p:spTgt spid="3">
-                                            <p:txEl>
-                                              <p:pRg st="7" end="7"/>
-                                            </p:txEl>
-                                          </p:spTgt>
-                                        </p:tgtEl>
-                                        <p:attrNameLst>
-                                          <p:attrName>style.visibility</p:attrName>
-                                        </p:attrNameLst>
-                                      </p:cBhvr>
-                                      <p:to>
-                                        <p:strVal val="visible"/>
-                                      </p:to>
-                                    </p:set>
-                                  </p:childTnLst>
-                                </p:cTn>
-                              </p:par>
-                            </p:childTnLst>
-                          </p:cTn>
-                        </p:par>
-                      </p:childTnLst>
-                    </p:cTn>
-                  </p:par>
                 </p:childTnLst>
               </p:cTn>
               <p:prevCondLst>
@@ -18722,6 +18754,113 @@
                 <a:ea typeface="+mn-ea"/>
                 <a:cs typeface="+mn-cs"/>
               </a:rPr>
+              <a:t>Platform Invoke (P/Invoke)</a:t>
+            </a:r>
+          </a:p>
+        </p:txBody>
+      </p:sp>
+    </p:spTree>
+    <p:extLst>
+      <p:ext uri="{BB962C8B-B14F-4D97-AF65-F5344CB8AC3E}">
+        <p14:creationId xmlns:p14="http://schemas.microsoft.com/office/powerpoint/2010/main" val="837002852"/>
+      </p:ext>
+    </p:extLst>
+  </p:cSld>
+  <p:clrMapOvr>
+    <a:masterClrMapping/>
+  </p:clrMapOvr>
+</p:sld>
+</file>
+
+<file path=ppt/slides/slide22.xml><?xml version="1.0" encoding="utf-8"?>
+<p:sld xmlns:a="http://schemas.openxmlformats.org/drawingml/2006/main" xmlns:r="http://schemas.openxmlformats.org/officeDocument/2006/relationships" xmlns:p="http://schemas.openxmlformats.org/presentationml/2006/main" show="0">
+  <p:cSld>
+    <p:spTree>
+      <p:nvGrpSpPr>
+        <p:cNvPr id="1" name=""/>
+        <p:cNvGrpSpPr/>
+        <p:nvPr/>
+      </p:nvGrpSpPr>
+      <p:grpSpPr>
+        <a:xfrm>
+          <a:off x="0" y="0"/>
+          <a:ext cx="0" cy="0"/>
+          <a:chOff x="0" y="0"/>
+          <a:chExt cx="0" cy="0"/>
+        </a:xfrm>
+      </p:grpSpPr>
+      <p:sp>
+        <p:nvSpPr>
+          <p:cNvPr id="2" name="Title 1">
+            <a:extLst>
+              <a:ext uri="{FF2B5EF4-FFF2-40B4-BE49-F238E27FC236}">
+                <a16:creationId xmlns:a16="http://schemas.microsoft.com/office/drawing/2014/main" id="{7306C212-B3B4-8E92-B9B3-B626EF37EBA4}"/>
+              </a:ext>
+            </a:extLst>
+          </p:cNvPr>
+          <p:cNvSpPr txBox="1">
+            <a:spLocks noGrp="1"/>
+          </p:cNvSpPr>
+          <p:nvPr>
+            <p:ph type="title" idx="4294967295"/>
+          </p:nvPr>
+        </p:nvSpPr>
+        <p:spPr>
+          <a:xfrm>
+            <a:off x="1061794" y="2274838"/>
+            <a:ext cx="10068412" cy="2308324"/>
+          </a:xfrm>
+          <a:prstGeom prst="rect">
+            <a:avLst/>
+          </a:prstGeom>
+          <a:noFill/>
+          <a:ln>
+            <a:noFill/>
+            <a:prstDash/>
+          </a:ln>
+          <a:effectLst/>
+        </p:spPr>
+        <p:txBody>
+          <a:bodyPr rot="0" spcFirstLastPara="0" vertOverflow="overflow" horzOverflow="overflow" vert="horz" wrap="square" lIns="91440" tIns="45720" rIns="91440" bIns="45720" numCol="1" spcCol="0" rtlCol="0" fromWordArt="0" anchor="t" anchorCtr="0" forceAA="0" compatLnSpc="1">
+            <a:prstTxWarp prst="textNoShape">
+              <a:avLst/>
+            </a:prstTxWarp>
+            <a:spAutoFit/>
+          </a:bodyPr>
+          <a:lstStyle/>
+          <a:p>
+            <a:pPr marL="0" marR="0" lvl="0" indent="0" algn="ctr" defTabSz="457200" rtl="0" eaLnBrk="1" fontAlgn="auto" latinLnBrk="0" hangingPunct="1">
+              <a:lnSpc>
+                <a:spcPct val="100000"/>
+              </a:lnSpc>
+              <a:spcBef>
+                <a:spcPts val="0"/>
+              </a:spcBef>
+              <a:spcAft>
+                <a:spcPts val="0"/>
+              </a:spcAft>
+              <a:buClrTx/>
+              <a:buSzTx/>
+              <a:buFontTx/>
+              <a:buNone/>
+              <a:tabLst/>
+              <a:defRPr/>
+            </a:pPr>
+            <a:r>
+              <a:rPr kumimoji="0" lang="en-US" sz="7200" b="0" i="0" u="none" strike="noStrike" kern="1200" cap="none" spc="0" normalizeH="0" baseline="0" noProof="0" dirty="0">
+                <a:ln>
+                  <a:noFill/>
+                </a:ln>
+                <a:solidFill>
+                  <a:schemeClr val="tx1"/>
+                </a:solidFill>
+                <a:effectLst/>
+                <a:uLnTx/>
+                <a:uFillTx/>
+                <a:latin typeface="+mn-lt"/>
+                <a:ea typeface="+mn-ea"/>
+                <a:cs typeface="+mn-cs"/>
+              </a:rPr>
               <a:t>Managing unmanaged memory</a:t>
             </a:r>
           </a:p>
@@ -18740,7 +18879,7 @@
 </p:sld>
 </file>
 
-<file path=ppt/slides/slide22.xml><?xml version="1.0" encoding="utf-8"?>
+<file path=ppt/slides/slide23.xml><?xml version="1.0" encoding="utf-8"?>
 <p:sld xmlns:a="http://schemas.openxmlformats.org/drawingml/2006/main" xmlns:r="http://schemas.openxmlformats.org/officeDocument/2006/relationships" xmlns:p="http://schemas.openxmlformats.org/presentationml/2006/main">
   <p:cSld>
     <p:spTree>
@@ -18779,33 +18918,16 @@
           <a:lstStyle/>
           <a:p>
             <a:r>
-              <a:rPr lang="de-DE" dirty="0"/>
-              <a:t>Managing </a:t>
-            </a:r>
-            <a:r>
-              <a:rPr lang="de-DE"/>
-              <a:t>unmanaged memory</a:t>
+              <a:rPr lang="en-US" dirty="0"/>
+              <a:t>Platform Invoke (P/Invoke)</a:t>
             </a:r>
             <a:br>
-              <a:rPr lang="de-DE" dirty="0"/>
+              <a:rPr lang="en-US" dirty="0"/>
             </a:br>
             <a:r>
-              <a:rPr lang="de-DE" dirty="0"/>
-              <a:t>The .</a:t>
-            </a:r>
-            <a:r>
-              <a:rPr lang="de-DE"/>
-              <a:t>NET </a:t>
-            </a:r>
-            <a:r>
-              <a:rPr lang="de-DE" dirty="0"/>
-              <a:t>6 </a:t>
-            </a:r>
-            <a:r>
-              <a:rPr lang="de-DE"/>
-              <a:t>way</a:t>
-            </a:r>
-            <a:endParaRPr lang="en-US" dirty="0"/>
+              <a:rPr lang="en-US" dirty="0"/>
+              <a:t>Unmanaged heap allocations I</a:t>
+            </a:r>
           </a:p>
         </p:txBody>
       </p:sp>
@@ -18881,7 +19003,7 @@
               <a:tabLst/>
             </a:pPr>
             <a:r>
-              <a:rPr kumimoji="0" lang="en-US" altLang="en-US" b="0" i="1" u="none" strike="noStrike" cap="none" normalizeH="0" baseline="0" dirty="0">
+              <a:rPr kumimoji="0" lang="en-US" altLang="en-US" b="0" i="1" u="none" strike="noStrike" cap="none" normalizeH="0" baseline="0">
                 <a:ln>
                   <a:noFill/>
                 </a:ln>
@@ -18912,7 +19034,7 @@
               <a:tabLst/>
             </a:pPr>
             <a:r>
-              <a:rPr kumimoji="0" lang="en-US" altLang="en-US" b="0" i="1" u="none" strike="noStrike" cap="none" normalizeH="0" baseline="0" dirty="0">
+              <a:rPr kumimoji="0" lang="en-US" altLang="en-US" b="0" i="1" u="none" strike="noStrike" cap="none" normalizeH="0" baseline="0">
                 <a:ln>
                   <a:noFill/>
                 </a:ln>
@@ -18925,7 +19047,7 @@
               <a:t>// C standard library function malloc()</a:t>
             </a:r>
             <a:br>
-              <a:rPr kumimoji="0" lang="en-US" altLang="en-US" b="0" i="1" u="none" strike="noStrike" cap="none" normalizeH="0" baseline="0" dirty="0">
+              <a:rPr kumimoji="0" lang="en-US" altLang="en-US" b="0" i="1" u="none" strike="noStrike" cap="none" normalizeH="0" baseline="0">
                 <a:ln>
                   <a:noFill/>
                 </a:ln>
@@ -18937,7 +19059,7 @@
               </a:rPr>
             </a:br>
             <a:r>
-              <a:rPr kumimoji="0" lang="en-US" altLang="en-US" b="0" i="0" u="none" strike="noStrike" cap="none" normalizeH="0" baseline="0" dirty="0">
+              <a:rPr kumimoji="0" lang="en-US" altLang="en-US" b="0" i="0" u="none" strike="noStrike" cap="none" normalizeH="0" baseline="0">
                 <a:ln>
                   <a:noFill/>
                 </a:ln>
@@ -18950,46 +19072,20 @@
               <a:t>void</a:t>
             </a:r>
             <a:r>
-              <a:rPr kumimoji="0" lang="en-US" altLang="en-US" b="0" i="0" u="none" strike="noStrike" cap="none" normalizeH="0" baseline="0" dirty="0">
-                <a:ln>
-                  <a:noFill/>
-                </a:ln>
-                <a:solidFill>
-                  <a:srgbClr val="383838"/>
-                </a:solidFill>
-                <a:effectLst/>
-                <a:latin typeface="Consolas" panose="020B0609020204030204" pitchFamily="49" charset="0"/>
-              </a:rPr>
-              <a:t>* </a:t>
-            </a:r>
-            <a:r>
-              <a:rPr kumimoji="0" lang="en-US" altLang="en-US" b="0" i="0" u="none" strike="noStrike" cap="none" normalizeH="0" baseline="0" dirty="0" err="1">
-                <a:ln>
-                  <a:noFill/>
-                </a:ln>
-                <a:solidFill>
-                  <a:srgbClr val="383838"/>
-                </a:solidFill>
-                <a:effectLst/>
-                <a:latin typeface="Consolas" panose="020B0609020204030204" pitchFamily="49" charset="0"/>
-              </a:rPr>
-              <a:t>ptr</a:t>
-            </a:r>
-            <a:r>
-              <a:rPr kumimoji="0" lang="en-US" altLang="en-US" b="0" i="0" u="none" strike="noStrike" cap="none" normalizeH="0" baseline="0" dirty="0">
-                <a:ln>
-                  <a:noFill/>
-                </a:ln>
-                <a:solidFill>
-                  <a:srgbClr val="383838"/>
-                </a:solidFill>
-                <a:effectLst/>
-                <a:latin typeface="Consolas" panose="020B0609020204030204" pitchFamily="49" charset="0"/>
-              </a:rPr>
-              <a:t> = </a:t>
-            </a:r>
-            <a:r>
-              <a:rPr kumimoji="0" lang="en-US" altLang="en-US" b="0" i="0" u="none" strike="noStrike" cap="none" normalizeH="0" baseline="0" dirty="0" err="1">
+              <a:rPr kumimoji="0" lang="en-US" altLang="en-US" b="0" i="0" u="none" strike="noStrike" cap="none" normalizeH="0" baseline="0">
+                <a:ln>
+                  <a:noFill/>
+                </a:ln>
+                <a:solidFill>
+                  <a:srgbClr val="383838"/>
+                </a:solidFill>
+                <a:effectLst/>
+                <a:latin typeface="Consolas" panose="020B0609020204030204" pitchFamily="49" charset="0"/>
+              </a:rPr>
+              <a:t>* ptr = </a:t>
+            </a:r>
+            <a:r>
+              <a:rPr kumimoji="0" lang="en-US" altLang="en-US" b="0" i="0" u="none" strike="noStrike" cap="none" normalizeH="0" baseline="0">
                 <a:ln>
                   <a:noFill/>
                 </a:ln>
@@ -19002,7 +19098,7 @@
               <a:t>NativeMemory</a:t>
             </a:r>
             <a:r>
-              <a:rPr kumimoji="0" lang="en-US" altLang="en-US" b="0" i="0" u="none" strike="noStrike" cap="none" normalizeH="0" baseline="0" dirty="0" err="1">
+              <a:rPr kumimoji="0" lang="en-US" altLang="en-US" b="0" i="0" u="none" strike="noStrike" cap="none" normalizeH="0" baseline="0">
                 <a:ln>
                   <a:noFill/>
                 </a:ln>
@@ -19015,7 +19111,7 @@
               <a:t>.</a:t>
             </a:r>
             <a:r>
-              <a:rPr kumimoji="0" lang="en-US" altLang="en-US" b="0" i="0" u="none" strike="noStrike" cap="none" normalizeH="0" baseline="0" dirty="0" err="1">
+              <a:rPr kumimoji="0" lang="en-US" altLang="en-US" b="0" i="0" u="none" strike="noStrike" cap="none" normalizeH="0" baseline="0">
                 <a:ln>
                   <a:noFill/>
                 </a:ln>
@@ -19028,7 +19124,7 @@
               <a:t>Alloc</a:t>
             </a:r>
             <a:r>
-              <a:rPr kumimoji="0" lang="en-US" altLang="en-US" b="0" i="0" u="none" strike="noStrike" cap="none" normalizeH="0" baseline="0" dirty="0">
+              <a:rPr kumimoji="0" lang="en-US" altLang="en-US" b="0" i="0" u="none" strike="noStrike" cap="none" normalizeH="0" baseline="0">
                 <a:ln>
                   <a:noFill/>
                 </a:ln>
@@ -19041,7 +19137,7 @@
               <a:t>(</a:t>
             </a:r>
             <a:r>
-              <a:rPr kumimoji="0" lang="en-US" altLang="en-US" b="0" i="0" u="none" strike="noStrike" cap="none" normalizeH="0" baseline="0" dirty="0">
+              <a:rPr kumimoji="0" lang="en-US" altLang="en-US" b="0" i="0" u="none" strike="noStrike" cap="none" normalizeH="0" baseline="0">
                 <a:ln>
                   <a:noFill/>
                 </a:ln>
@@ -19054,7 +19150,7 @@
               <a:t>1024</a:t>
             </a:r>
             <a:r>
-              <a:rPr kumimoji="0" lang="en-US" altLang="en-US" b="0" i="0" u="none" strike="noStrike" cap="none" normalizeH="0" baseline="0" dirty="0">
+              <a:rPr kumimoji="0" lang="en-US" altLang="en-US" b="0" i="0" u="none" strike="noStrike" cap="none" normalizeH="0" baseline="0">
                 <a:ln>
                   <a:noFill/>
                 </a:ln>
@@ -19067,7 +19163,7 @@
               <a:t>);</a:t>
             </a:r>
             <a:br>
-              <a:rPr kumimoji="0" lang="en-US" altLang="en-US" b="0" i="0" u="none" strike="noStrike" cap="none" normalizeH="0" baseline="0" dirty="0">
+              <a:rPr kumimoji="0" lang="en-US" altLang="en-US" b="0" i="0" u="none" strike="noStrike" cap="none" normalizeH="0" baseline="0">
                 <a:ln>
                   <a:noFill/>
                 </a:ln>
@@ -19079,7 +19175,7 @@
               </a:rPr>
             </a:br>
             <a:r>
-              <a:rPr kumimoji="0" lang="en-US" altLang="en-US" b="0" i="1" u="none" strike="noStrike" cap="none" normalizeH="0" baseline="0" dirty="0">
+              <a:rPr kumimoji="0" lang="en-US" altLang="en-US" b="0" i="1" u="none" strike="noStrike" cap="none" normalizeH="0" baseline="0">
                 <a:ln>
                   <a:noFill/>
                 </a:ln>
@@ -19092,7 +19188,7 @@
               <a:t>// Free heap memory using C standard library function free()</a:t>
             </a:r>
             <a:br>
-              <a:rPr kumimoji="0" lang="en-US" altLang="en-US" b="0" i="1" u="none" strike="noStrike" cap="none" normalizeH="0" baseline="0" dirty="0">
+              <a:rPr kumimoji="0" lang="en-US" altLang="en-US" b="0" i="1" u="none" strike="noStrike" cap="none" normalizeH="0" baseline="0">
                 <a:ln>
                   <a:noFill/>
                 </a:ln>
@@ -19104,7 +19200,7 @@
               </a:rPr>
             </a:br>
             <a:r>
-              <a:rPr kumimoji="0" lang="en-US" altLang="en-US" b="0" i="0" u="none" strike="noStrike" cap="none" normalizeH="0" baseline="0" dirty="0" err="1">
+              <a:rPr kumimoji="0" lang="en-US" altLang="en-US" b="0" i="0" u="none" strike="noStrike" cap="none" normalizeH="0" baseline="0">
                 <a:ln>
                   <a:noFill/>
                 </a:ln>
@@ -19117,7 +19213,7 @@
               <a:t>NativeMemory</a:t>
             </a:r>
             <a:r>
-              <a:rPr kumimoji="0" lang="en-US" altLang="en-US" b="0" i="0" u="none" strike="noStrike" cap="none" normalizeH="0" baseline="0" dirty="0" err="1">
+              <a:rPr kumimoji="0" lang="en-US" altLang="en-US" b="0" i="0" u="none" strike="noStrike" cap="none" normalizeH="0" baseline="0">
                 <a:ln>
                   <a:noFill/>
                 </a:ln>
@@ -19130,7 +19226,7 @@
               <a:t>.</a:t>
             </a:r>
             <a:r>
-              <a:rPr kumimoji="0" lang="en-US" altLang="en-US" b="0" i="0" u="none" strike="noStrike" cap="none" normalizeH="0" baseline="0" dirty="0" err="1">
+              <a:rPr kumimoji="0" lang="en-US" altLang="en-US" b="0" i="0" u="none" strike="noStrike" cap="none" normalizeH="0" baseline="0">
                 <a:ln>
                   <a:noFill/>
                 </a:ln>
@@ -19143,45 +19239,19 @@
               <a:t>Free</a:t>
             </a:r>
             <a:r>
-              <a:rPr kumimoji="0" lang="en-US" altLang="en-US" b="0" i="0" u="none" strike="noStrike" cap="none" normalizeH="0" baseline="0" dirty="0">
-                <a:ln>
-                  <a:noFill/>
-                </a:ln>
-                <a:solidFill>
-                  <a:srgbClr val="383838"/>
-                </a:solidFill>
-                <a:effectLst/>
-                <a:latin typeface="Consolas" panose="020B0609020204030204" pitchFamily="49" charset="0"/>
-              </a:rPr>
-              <a:t>(</a:t>
-            </a:r>
-            <a:r>
-              <a:rPr kumimoji="0" lang="en-US" altLang="en-US" b="0" i="0" u="none" strike="noStrike" cap="none" normalizeH="0" baseline="0" dirty="0" err="1">
-                <a:ln>
-                  <a:noFill/>
-                </a:ln>
-                <a:solidFill>
-                  <a:srgbClr val="383838"/>
-                </a:solidFill>
-                <a:effectLst/>
-                <a:latin typeface="Consolas" panose="020B0609020204030204" pitchFamily="49" charset="0"/>
-              </a:rPr>
-              <a:t>ptr</a:t>
-            </a:r>
-            <a:r>
-              <a:rPr kumimoji="0" lang="en-US" altLang="en-US" b="0" i="0" u="none" strike="noStrike" cap="none" normalizeH="0" baseline="0" dirty="0">
-                <a:ln>
-                  <a:noFill/>
-                </a:ln>
-                <a:solidFill>
-                  <a:srgbClr val="383838"/>
-                </a:solidFill>
-                <a:effectLst/>
-                <a:latin typeface="Consolas" panose="020B0609020204030204" pitchFamily="49" charset="0"/>
-              </a:rPr>
-              <a:t>);</a:t>
-            </a:r>
-            <a:endParaRPr kumimoji="0" lang="en-US" altLang="en-US" b="0" i="0" u="none" strike="noStrike" cap="none" normalizeH="0" baseline="0" dirty="0">
+              <a:rPr kumimoji="0" lang="en-US" altLang="en-US" b="0" i="0" u="none" strike="noStrike" cap="none" normalizeH="0" baseline="0">
+                <a:ln>
+                  <a:noFill/>
+                </a:ln>
+                <a:solidFill>
+                  <a:srgbClr val="383838"/>
+                </a:solidFill>
+                <a:effectLst/>
+                <a:latin typeface="Consolas" panose="020B0609020204030204" pitchFamily="49" charset="0"/>
+              </a:rPr>
+              <a:t>(ptr);</a:t>
+            </a:r>
+            <a:endParaRPr kumimoji="0" lang="en-US" altLang="en-US" b="0" i="0" u="none" strike="noStrike" cap="none" normalizeH="0" baseline="0">
               <a:ln>
                 <a:noFill/>
               </a:ln>
@@ -19207,8 +19277,8 @@
 </p:sld>
 </file>
 
-<file path=ppt/slides/slide23.xml><?xml version="1.0" encoding="utf-8"?>
-<p:sld xmlns:a="http://schemas.openxmlformats.org/drawingml/2006/main" xmlns:r="http://schemas.openxmlformats.org/officeDocument/2006/relationships" xmlns:p="http://schemas.openxmlformats.org/presentationml/2006/main">
+<file path=ppt/slides/slide24.xml><?xml version="1.0" encoding="utf-8"?>
+<p:sld xmlns:a="http://schemas.openxmlformats.org/drawingml/2006/main" xmlns:r="http://schemas.openxmlformats.org/officeDocument/2006/relationships" xmlns:p="http://schemas.openxmlformats.org/presentationml/2006/main" show="0">
   <p:cSld>
     <p:spTree>
       <p:nvGrpSpPr>
@@ -19859,7 +19929,7 @@
 </p:sld>
 </file>
 
-<file path=ppt/slides/slide24.xml><?xml version="1.0" encoding="utf-8"?>
+<file path=ppt/slides/slide25.xml><?xml version="1.0" encoding="utf-8"?>
 <p:sld xmlns:a="http://schemas.openxmlformats.org/drawingml/2006/main" xmlns:r="http://schemas.openxmlformats.org/officeDocument/2006/relationships" xmlns:p="http://schemas.openxmlformats.org/presentationml/2006/main">
   <p:cSld>
     <p:spTree>
@@ -19898,15 +19968,15 @@
           <a:lstStyle/>
           <a:p>
             <a:r>
-              <a:rPr lang="en-US"/>
-              <a:t>Managing unmanaged memory</a:t>
+              <a:rPr lang="en-US" dirty="0"/>
+              <a:t>Platform Invoke (P/Invoke)</a:t>
             </a:r>
             <a:br>
-              <a:rPr lang="en-US"/>
+              <a:rPr lang="en-US" dirty="0"/>
             </a:br>
             <a:r>
-              <a:rPr lang="en-US"/>
-              <a:t>The Win32 way</a:t>
+              <a:rPr lang="en-US" dirty="0"/>
+              <a:t>Unmanaged heap allocations II</a:t>
             </a:r>
           </a:p>
         </p:txBody>
@@ -20656,113 +20726,6 @@
     <p:extLst>
       <p:ext uri="{BB962C8B-B14F-4D97-AF65-F5344CB8AC3E}">
         <p14:creationId xmlns:p14="http://schemas.microsoft.com/office/powerpoint/2010/main" val="1893604159"/>
-      </p:ext>
-    </p:extLst>
-  </p:cSld>
-  <p:clrMapOvr>
-    <a:masterClrMapping/>
-  </p:clrMapOvr>
-</p:sld>
-</file>
-
-<file path=ppt/slides/slide25.xml><?xml version="1.0" encoding="utf-8"?>
-<p:sld xmlns:a="http://schemas.openxmlformats.org/drawingml/2006/main" xmlns:r="http://schemas.openxmlformats.org/officeDocument/2006/relationships" xmlns:p="http://schemas.openxmlformats.org/presentationml/2006/main">
-  <p:cSld>
-    <p:spTree>
-      <p:nvGrpSpPr>
-        <p:cNvPr id="1" name=""/>
-        <p:cNvGrpSpPr/>
-        <p:nvPr/>
-      </p:nvGrpSpPr>
-      <p:grpSpPr>
-        <a:xfrm>
-          <a:off x="0" y="0"/>
-          <a:ext cx="0" cy="0"/>
-          <a:chOff x="0" y="0"/>
-          <a:chExt cx="0" cy="0"/>
-        </a:xfrm>
-      </p:grpSpPr>
-      <p:sp>
-        <p:nvSpPr>
-          <p:cNvPr id="2" name="Title 1">
-            <a:extLst>
-              <a:ext uri="{FF2B5EF4-FFF2-40B4-BE49-F238E27FC236}">
-                <a16:creationId xmlns:a16="http://schemas.microsoft.com/office/drawing/2014/main" id="{7306C212-B3B4-8E92-B9B3-B626EF37EBA4}"/>
-              </a:ext>
-            </a:extLst>
-          </p:cNvPr>
-          <p:cNvSpPr txBox="1">
-            <a:spLocks noGrp="1"/>
-          </p:cNvSpPr>
-          <p:nvPr>
-            <p:ph type="title" idx="4294967295"/>
-          </p:nvPr>
-        </p:nvSpPr>
-        <p:spPr>
-          <a:xfrm>
-            <a:off x="1061794" y="2274838"/>
-            <a:ext cx="10068412" cy="2308324"/>
-          </a:xfrm>
-          <a:prstGeom prst="rect">
-            <a:avLst/>
-          </a:prstGeom>
-          <a:noFill/>
-          <a:ln>
-            <a:noFill/>
-            <a:prstDash/>
-          </a:ln>
-          <a:effectLst/>
-        </p:spPr>
-        <p:txBody>
-          <a:bodyPr rot="0" spcFirstLastPara="0" vertOverflow="overflow" horzOverflow="overflow" vert="horz" wrap="square" lIns="91440" tIns="45720" rIns="91440" bIns="45720" numCol="1" spcCol="0" rtlCol="0" fromWordArt="0" anchor="t" anchorCtr="0" forceAA="0" compatLnSpc="1">
-            <a:prstTxWarp prst="textNoShape">
-              <a:avLst/>
-            </a:prstTxWarp>
-            <a:spAutoFit/>
-          </a:bodyPr>
-          <a:lstStyle/>
-          <a:p>
-            <a:pPr marL="0" marR="0" lvl="0" indent="0" algn="ctr" defTabSz="457200" rtl="0" eaLnBrk="1" fontAlgn="auto" latinLnBrk="0" hangingPunct="1">
-              <a:lnSpc>
-                <a:spcPct val="100000"/>
-              </a:lnSpc>
-              <a:spcBef>
-                <a:spcPts val="0"/>
-              </a:spcBef>
-              <a:spcAft>
-                <a:spcPts val="0"/>
-              </a:spcAft>
-              <a:buClrTx/>
-              <a:buSzTx/>
-              <a:buFontTx/>
-              <a:buNone/>
-              <a:tabLst/>
-              <a:defRPr/>
-            </a:pPr>
-            <a:r>
-              <a:rPr kumimoji="0" lang="en-US" sz="7200" b="0" i="0" u="none" strike="noStrike" kern="1200" cap="none" spc="0" normalizeH="0" baseline="0" noProof="0" dirty="0">
-                <a:ln>
-                  <a:noFill/>
-                </a:ln>
-                <a:solidFill>
-                  <a:schemeClr val="tx1"/>
-                </a:solidFill>
-                <a:effectLst/>
-                <a:uLnTx/>
-                <a:uFillTx/>
-                <a:latin typeface="+mn-lt"/>
-                <a:ea typeface="+mn-ea"/>
-                <a:cs typeface="+mn-cs"/>
-              </a:rPr>
-              <a:t>Platform Invoke (P/Invoke)</a:t>
-            </a:r>
-          </a:p>
-        </p:txBody>
-      </p:sp>
-    </p:spTree>
-    <p:extLst>
-      <p:ext uri="{BB962C8B-B14F-4D97-AF65-F5344CB8AC3E}">
-        <p14:creationId xmlns:p14="http://schemas.microsoft.com/office/powerpoint/2010/main" val="837002852"/>
       </p:ext>
     </p:extLst>
   </p:cSld>
@@ -20811,14 +20774,14 @@
           <a:lstStyle/>
           <a:p>
             <a:r>
-              <a:rPr lang="en-US"/>
+              <a:rPr lang="en-US" dirty="0"/>
               <a:t>Platform Invoke (P/Invoke)</a:t>
             </a:r>
             <a:br>
-              <a:rPr lang="en-US"/>
+              <a:rPr lang="en-US" dirty="0"/>
             </a:br>
             <a:r>
-              <a:rPr lang="en-US"/>
+              <a:rPr lang="en-US" dirty="0"/>
               <a:t>DLL imports</a:t>
             </a:r>
           </a:p>

</xml_diff>

<commit_message>
New slide for .NET Framework hints
</commit_message>
<xml_diff>
--- a/doc/Introduction to unsafe C#.pptx
+++ b/doc/Introduction to unsafe C#.pptx
@@ -5,7 +5,7 @@
     <p:sldMasterId id="2147483660" r:id="rId1"/>
   </p:sldMasterIdLst>
   <p:notesMasterIdLst>
-    <p:notesMasterId r:id="rId55"/>
+    <p:notesMasterId r:id="rId56"/>
   </p:notesMasterIdLst>
   <p:sldIdLst>
     <p:sldId id="256" r:id="rId2"/>
@@ -59,8 +59,9 @@
     <p:sldId id="327" r:id="rId50"/>
     <p:sldId id="292" r:id="rId51"/>
     <p:sldId id="283" r:id="rId52"/>
-    <p:sldId id="284" r:id="rId53"/>
-    <p:sldId id="285" r:id="rId54"/>
+    <p:sldId id="330" r:id="rId53"/>
+    <p:sldId id="284" r:id="rId54"/>
+    <p:sldId id="285" r:id="rId55"/>
   </p:sldIdLst>
   <p:sldSz cx="12192000" cy="6858000"/>
   <p:notesSz cx="6858000" cy="9144000"/>
@@ -27667,43 +27668,6 @@
               <a:rPr lang="en-US" dirty="0"/>
               <a:t>…but works just as well with pointers! :)</a:t>
             </a:r>
-          </a:p>
-          <a:p>
-            <a:r>
-              <a:rPr lang="en-US" dirty="0"/>
-              <a:t>Is a </a:t>
-            </a:r>
-            <a:r>
-              <a:rPr lang="en-US" dirty="0" err="1">
-                <a:latin typeface="Consolas" panose="020B0609020204030204" pitchFamily="49" charset="0"/>
-              </a:rPr>
-              <a:t>CriticalFinalizerObject</a:t>
-            </a:r>
-            <a:br>
-              <a:rPr lang="en-US" dirty="0"/>
-            </a:br>
-            <a:r>
-              <a:rPr lang="en-US" sz="1200" dirty="0">
-                <a:hlinkClick r:id="rId3"/>
-              </a:rPr>
-              <a:t>https://learn.microsoft.com/en-us/dotnet/api/system.runtime.constrainedexecution.criticalfinalizerobject</a:t>
-            </a:r>
-            <a:endParaRPr lang="en-US" sz="1200" dirty="0"/>
-          </a:p>
-          <a:p>
-            <a:r>
-              <a:rPr lang="en-US" dirty="0"/>
-              <a:t>Runs finalization in a Constrained Execution Regions (.NET Framework only)</a:t>
-            </a:r>
-            <a:br>
-              <a:rPr lang="en-US" dirty="0"/>
-            </a:br>
-            <a:r>
-              <a:rPr lang="en-US" sz="1200" dirty="0">
-                <a:hlinkClick r:id="rId4"/>
-              </a:rPr>
-              <a:t>https://learn.microsoft.com/en-us/dotnet/framework/performance/constrained-execution-regions</a:t>
-            </a:r>
             <a:endParaRPr lang="en-US" sz="1200" dirty="0"/>
           </a:p>
           <a:p>
@@ -27859,104 +27823,6 @@
                                           <p:spTgt spid="3">
                                             <p:txEl>
                                               <p:pRg st="2" end="2"/>
-                                            </p:txEl>
-                                          </p:spTgt>
-                                        </p:tgtEl>
-                                        <p:attrNameLst>
-                                          <p:attrName>style.visibility</p:attrName>
-                                        </p:attrNameLst>
-                                      </p:cBhvr>
-                                      <p:to>
-                                        <p:strVal val="visible"/>
-                                      </p:to>
-                                    </p:set>
-                                  </p:childTnLst>
-                                </p:cTn>
-                              </p:par>
-                            </p:childTnLst>
-                          </p:cTn>
-                        </p:par>
-                      </p:childTnLst>
-                    </p:cTn>
-                  </p:par>
-                  <p:par>
-                    <p:cTn id="15" fill="hold">
-                      <p:stCondLst>
-                        <p:cond delay="indefinite"/>
-                      </p:stCondLst>
-                      <p:childTnLst>
-                        <p:par>
-                          <p:cTn id="16" fill="hold">
-                            <p:stCondLst>
-                              <p:cond delay="0"/>
-                            </p:stCondLst>
-                            <p:childTnLst>
-                              <p:par>
-                                <p:cTn id="17" presetID="1" presetClass="entr" presetSubtype="0" fill="hold" grpId="0" nodeType="clickEffect">
-                                  <p:stCondLst>
-                                    <p:cond delay="0"/>
-                                  </p:stCondLst>
-                                  <p:childTnLst>
-                                    <p:set>
-                                      <p:cBhvr>
-                                        <p:cTn id="18" dur="1" fill="hold">
-                                          <p:stCondLst>
-                                            <p:cond delay="0"/>
-                                          </p:stCondLst>
-                                        </p:cTn>
-                                        <p:tgtEl>
-                                          <p:spTgt spid="3">
-                                            <p:txEl>
-                                              <p:pRg st="3" end="3"/>
-                                            </p:txEl>
-                                          </p:spTgt>
-                                        </p:tgtEl>
-                                        <p:attrNameLst>
-                                          <p:attrName>style.visibility</p:attrName>
-                                        </p:attrNameLst>
-                                      </p:cBhvr>
-                                      <p:to>
-                                        <p:strVal val="visible"/>
-                                      </p:to>
-                                    </p:set>
-                                  </p:childTnLst>
-                                </p:cTn>
-                              </p:par>
-                            </p:childTnLst>
-                          </p:cTn>
-                        </p:par>
-                      </p:childTnLst>
-                    </p:cTn>
-                  </p:par>
-                  <p:par>
-                    <p:cTn id="19" fill="hold">
-                      <p:stCondLst>
-                        <p:cond delay="indefinite"/>
-                      </p:stCondLst>
-                      <p:childTnLst>
-                        <p:par>
-                          <p:cTn id="20" fill="hold">
-                            <p:stCondLst>
-                              <p:cond delay="0"/>
-                            </p:stCondLst>
-                            <p:childTnLst>
-                              <p:par>
-                                <p:cTn id="21" presetID="1" presetClass="entr" presetSubtype="0" fill="hold" grpId="0" nodeType="clickEffect">
-                                  <p:stCondLst>
-                                    <p:cond delay="0"/>
-                                  </p:stCondLst>
-                                  <p:childTnLst>
-                                    <p:set>
-                                      <p:cBhvr>
-                                        <p:cTn id="22" dur="1" fill="hold">
-                                          <p:stCondLst>
-                                            <p:cond delay="0"/>
-                                          </p:stCondLst>
-                                        </p:cTn>
-                                        <p:tgtEl>
-                                          <p:spTgt spid="3">
-                                            <p:txEl>
-                                              <p:pRg st="4" end="4"/>
                                             </p:txEl>
                                           </p:spTgt>
                                         </p:tgtEl>
@@ -44113,6 +43979,410 @@
           <p:cNvPr id="2" name="Title 1">
             <a:extLst>
               <a:ext uri="{FF2B5EF4-FFF2-40B4-BE49-F238E27FC236}">
+                <a16:creationId xmlns:a16="http://schemas.microsoft.com/office/drawing/2014/main" id="{2E477C04-B877-5454-55C6-CEF10470DECB}"/>
+              </a:ext>
+            </a:extLst>
+          </p:cNvPr>
+          <p:cNvSpPr>
+            <a:spLocks noGrp="1"/>
+          </p:cNvSpPr>
+          <p:nvPr>
+            <p:ph type="title"/>
+          </p:nvPr>
+        </p:nvSpPr>
+        <p:spPr/>
+        <p:txBody>
+          <a:bodyPr/>
+          <a:lstStyle/>
+          <a:p>
+            <a:r>
+              <a:rPr lang="en-US" dirty="0"/>
+              <a:t>Further resources</a:t>
+            </a:r>
+            <a:br>
+              <a:rPr lang="en-US" dirty="0"/>
+            </a:br>
+            <a:r>
+              <a:rPr lang="en-US" dirty="0"/>
+              <a:t>.NET Framework</a:t>
+            </a:r>
+          </a:p>
+        </p:txBody>
+      </p:sp>
+      <p:sp>
+        <p:nvSpPr>
+          <p:cNvPr id="3" name="Content Placeholder 2">
+            <a:extLst>
+              <a:ext uri="{FF2B5EF4-FFF2-40B4-BE49-F238E27FC236}">
+                <a16:creationId xmlns:a16="http://schemas.microsoft.com/office/drawing/2014/main" id="{E7ADA9F2-B834-0701-956E-35638093CA9B}"/>
+              </a:ext>
+            </a:extLst>
+          </p:cNvPr>
+          <p:cNvSpPr>
+            <a:spLocks noGrp="1"/>
+          </p:cNvSpPr>
+          <p:nvPr>
+            <p:ph idx="1"/>
+          </p:nvPr>
+        </p:nvSpPr>
+        <p:spPr/>
+        <p:txBody>
+          <a:bodyPr/>
+          <a:lstStyle/>
+          <a:p>
+            <a:r>
+              <a:rPr lang="en-US" dirty="0"/>
+              <a:t>Do use </a:t>
+            </a:r>
+            <a:r>
+              <a:rPr lang="en-US" dirty="0" err="1">
+                <a:latin typeface="Consolas" panose="020B0609020204030204" pitchFamily="49" charset="0"/>
+                <a:cs typeface="Consolas" panose="020B0609020204030204" pitchFamily="49" charset="0"/>
+              </a:rPr>
+              <a:t>HeapAlloc</a:t>
+            </a:r>
+            <a:r>
+              <a:rPr lang="en-US" dirty="0">
+                <a:latin typeface="Consolas" panose="020B0609020204030204" pitchFamily="49" charset="0"/>
+                <a:cs typeface="Consolas" panose="020B0609020204030204" pitchFamily="49" charset="0"/>
+              </a:rPr>
+              <a:t>()</a:t>
+            </a:r>
+            <a:r>
+              <a:rPr lang="en-US" dirty="0"/>
+              <a:t> and </a:t>
+            </a:r>
+            <a:r>
+              <a:rPr lang="en-US" dirty="0" err="1">
+                <a:latin typeface="Consolas" panose="020B0609020204030204" pitchFamily="49" charset="0"/>
+                <a:cs typeface="Consolas" panose="020B0609020204030204" pitchFamily="49" charset="0"/>
+              </a:rPr>
+              <a:t>HeapFree</a:t>
+            </a:r>
+            <a:r>
+              <a:rPr lang="en-US" dirty="0">
+                <a:latin typeface="Consolas" panose="020B0609020204030204" pitchFamily="49" charset="0"/>
+                <a:cs typeface="Consolas" panose="020B0609020204030204" pitchFamily="49" charset="0"/>
+              </a:rPr>
+              <a:t>()</a:t>
+            </a:r>
+            <a:r>
+              <a:rPr lang="en-US" dirty="0"/>
+              <a:t> for unmanaged heap allocations</a:t>
+            </a:r>
+            <a:br>
+              <a:rPr lang="en-US" dirty="0"/>
+            </a:br>
+            <a:r>
+              <a:rPr lang="en-US" sz="1200" dirty="0">
+                <a:hlinkClick r:id="rId2"/>
+              </a:rPr>
+              <a:t>https://learn.microsoft.com/en-us/windows/win32/api/heapapi/nf-heapapi-heapalloc</a:t>
+            </a:r>
+            <a:br>
+              <a:rPr lang="en-US" dirty="0"/>
+            </a:br>
+            <a:r>
+              <a:rPr lang="en-US" sz="1200" dirty="0">
+                <a:hlinkClick r:id="rId3"/>
+              </a:rPr>
+              <a:t>https://learn.microsoft.com/en-us/windows/win32/api/heapapi/nf-heapapi-heapfree</a:t>
+            </a:r>
+            <a:endParaRPr lang="en-US" sz="1200" dirty="0"/>
+          </a:p>
+          <a:p>
+            <a:r>
+              <a:rPr lang="en-US" dirty="0"/>
+              <a:t>Do not use </a:t>
+            </a:r>
+            <a:r>
+              <a:rPr lang="en-US" dirty="0" err="1">
+                <a:latin typeface="Consolas" panose="020B0609020204030204" pitchFamily="49" charset="0"/>
+                <a:cs typeface="Consolas" panose="020B0609020204030204" pitchFamily="49" charset="0"/>
+              </a:rPr>
+              <a:t>Marshal.AllocHGlobal</a:t>
+            </a:r>
+            <a:r>
+              <a:rPr lang="en-US" dirty="0">
+                <a:latin typeface="Consolas" panose="020B0609020204030204" pitchFamily="49" charset="0"/>
+                <a:cs typeface="Consolas" panose="020B0609020204030204" pitchFamily="49" charset="0"/>
+              </a:rPr>
+              <a:t>()</a:t>
+            </a:r>
+            <a:r>
+              <a:rPr lang="en-US" dirty="0"/>
+              <a:t> and </a:t>
+            </a:r>
+            <a:r>
+              <a:rPr lang="en-US" dirty="0" err="1">
+                <a:latin typeface="Consolas" panose="020B0609020204030204" pitchFamily="49" charset="0"/>
+                <a:cs typeface="Consolas" panose="020B0609020204030204" pitchFamily="49" charset="0"/>
+              </a:rPr>
+              <a:t>Marshal.FreeHGlobal</a:t>
+            </a:r>
+            <a:r>
+              <a:rPr lang="en-US" dirty="0">
+                <a:latin typeface="Consolas" panose="020B0609020204030204" pitchFamily="49" charset="0"/>
+                <a:cs typeface="Consolas" panose="020B0609020204030204" pitchFamily="49" charset="0"/>
+              </a:rPr>
+              <a:t>()</a:t>
+            </a:r>
+            <a:br>
+              <a:rPr lang="en-US" dirty="0"/>
+            </a:br>
+            <a:r>
+              <a:rPr lang="en-US" sz="1200" dirty="0">
+                <a:hlinkClick r:id="rId4"/>
+              </a:rPr>
+              <a:t>https://learn.microsoft.com/en-us/dotnet/api/system.runtime.interopservices.marshal.allochglobal</a:t>
+            </a:r>
+            <a:br>
+              <a:rPr lang="en-US" dirty="0"/>
+            </a:br>
+            <a:r>
+              <a:rPr lang="en-US" sz="1200" dirty="0">
+                <a:hlinkClick r:id="rId5"/>
+              </a:rPr>
+              <a:t>https://learn.microsoft.com/en-us/dotnet/api/system.runtime.interopservices.marshal.freehglobal</a:t>
+            </a:r>
+            <a:endParaRPr lang="en-US" sz="1200" dirty="0"/>
+          </a:p>
+          <a:p>
+            <a:r>
+              <a:rPr lang="en-US" dirty="0"/>
+              <a:t>Safe handles run finalization in a constrained execution region (CER)</a:t>
+            </a:r>
+            <a:br>
+              <a:rPr lang="en-US" dirty="0"/>
+            </a:br>
+            <a:r>
+              <a:rPr lang="en-US" sz="1200" dirty="0">
+                <a:hlinkClick r:id="rId6"/>
+              </a:rPr>
+              <a:t>https://learn.microsoft.com/en-us/dotnet/framework/performance/constrained-execution-regions</a:t>
+            </a:r>
+            <a:br>
+              <a:rPr lang="en-US" dirty="0"/>
+            </a:br>
+            <a:endParaRPr lang="en-US" dirty="0"/>
+          </a:p>
+        </p:txBody>
+      </p:sp>
+    </p:spTree>
+    <p:extLst>
+      <p:ext uri="{BB962C8B-B14F-4D97-AF65-F5344CB8AC3E}">
+        <p14:creationId xmlns:p14="http://schemas.microsoft.com/office/powerpoint/2010/main" val="3738145373"/>
+      </p:ext>
+    </p:extLst>
+  </p:cSld>
+  <p:clrMapOvr>
+    <a:masterClrMapping/>
+  </p:clrMapOvr>
+  <p:timing>
+    <p:tnLst>
+      <p:par>
+        <p:cTn id="1" dur="indefinite" restart="never" nodeType="tmRoot">
+          <p:childTnLst>
+            <p:seq concurrent="1" nextAc="seek">
+              <p:cTn id="2" dur="indefinite" nodeType="mainSeq">
+                <p:childTnLst>
+                  <p:par>
+                    <p:cTn id="3" fill="hold">
+                      <p:stCondLst>
+                        <p:cond delay="indefinite"/>
+                      </p:stCondLst>
+                      <p:childTnLst>
+                        <p:par>
+                          <p:cTn id="4" fill="hold">
+                            <p:stCondLst>
+                              <p:cond delay="0"/>
+                            </p:stCondLst>
+                            <p:childTnLst>
+                              <p:par>
+                                <p:cTn id="5" presetID="1" presetClass="entr" presetSubtype="0" fill="hold" grpId="0" nodeType="clickEffect">
+                                  <p:stCondLst>
+                                    <p:cond delay="0"/>
+                                  </p:stCondLst>
+                                  <p:childTnLst>
+                                    <p:set>
+                                      <p:cBhvr>
+                                        <p:cTn id="6" dur="1" fill="hold">
+                                          <p:stCondLst>
+                                            <p:cond delay="0"/>
+                                          </p:stCondLst>
+                                        </p:cTn>
+                                        <p:tgtEl>
+                                          <p:spTgt spid="3">
+                                            <p:txEl>
+                                              <p:pRg st="0" end="0"/>
+                                            </p:txEl>
+                                          </p:spTgt>
+                                        </p:tgtEl>
+                                        <p:attrNameLst>
+                                          <p:attrName>style.visibility</p:attrName>
+                                        </p:attrNameLst>
+                                      </p:cBhvr>
+                                      <p:to>
+                                        <p:strVal val="visible"/>
+                                      </p:to>
+                                    </p:set>
+                                  </p:childTnLst>
+                                </p:cTn>
+                              </p:par>
+                            </p:childTnLst>
+                          </p:cTn>
+                        </p:par>
+                      </p:childTnLst>
+                    </p:cTn>
+                  </p:par>
+                  <p:par>
+                    <p:cTn id="7" fill="hold">
+                      <p:stCondLst>
+                        <p:cond delay="indefinite"/>
+                      </p:stCondLst>
+                      <p:childTnLst>
+                        <p:par>
+                          <p:cTn id="8" fill="hold">
+                            <p:stCondLst>
+                              <p:cond delay="0"/>
+                            </p:stCondLst>
+                            <p:childTnLst>
+                              <p:par>
+                                <p:cTn id="9" presetID="1" presetClass="entr" presetSubtype="0" fill="hold" grpId="0" nodeType="clickEffect">
+                                  <p:stCondLst>
+                                    <p:cond delay="0"/>
+                                  </p:stCondLst>
+                                  <p:childTnLst>
+                                    <p:set>
+                                      <p:cBhvr>
+                                        <p:cTn id="10" dur="1" fill="hold">
+                                          <p:stCondLst>
+                                            <p:cond delay="0"/>
+                                          </p:stCondLst>
+                                        </p:cTn>
+                                        <p:tgtEl>
+                                          <p:spTgt spid="3">
+                                            <p:txEl>
+                                              <p:pRg st="1" end="1"/>
+                                            </p:txEl>
+                                          </p:spTgt>
+                                        </p:tgtEl>
+                                        <p:attrNameLst>
+                                          <p:attrName>style.visibility</p:attrName>
+                                        </p:attrNameLst>
+                                      </p:cBhvr>
+                                      <p:to>
+                                        <p:strVal val="visible"/>
+                                      </p:to>
+                                    </p:set>
+                                  </p:childTnLst>
+                                </p:cTn>
+                              </p:par>
+                            </p:childTnLst>
+                          </p:cTn>
+                        </p:par>
+                      </p:childTnLst>
+                    </p:cTn>
+                  </p:par>
+                  <p:par>
+                    <p:cTn id="11" fill="hold">
+                      <p:stCondLst>
+                        <p:cond delay="indefinite"/>
+                      </p:stCondLst>
+                      <p:childTnLst>
+                        <p:par>
+                          <p:cTn id="12" fill="hold">
+                            <p:stCondLst>
+                              <p:cond delay="0"/>
+                            </p:stCondLst>
+                            <p:childTnLst>
+                              <p:par>
+                                <p:cTn id="13" presetID="1" presetClass="entr" presetSubtype="0" fill="hold" grpId="0" nodeType="clickEffect">
+                                  <p:stCondLst>
+                                    <p:cond delay="0"/>
+                                  </p:stCondLst>
+                                  <p:childTnLst>
+                                    <p:set>
+                                      <p:cBhvr>
+                                        <p:cTn id="14" dur="1" fill="hold">
+                                          <p:stCondLst>
+                                            <p:cond delay="0"/>
+                                          </p:stCondLst>
+                                        </p:cTn>
+                                        <p:tgtEl>
+                                          <p:spTgt spid="3">
+                                            <p:txEl>
+                                              <p:pRg st="2" end="2"/>
+                                            </p:txEl>
+                                          </p:spTgt>
+                                        </p:tgtEl>
+                                        <p:attrNameLst>
+                                          <p:attrName>style.visibility</p:attrName>
+                                        </p:attrNameLst>
+                                      </p:cBhvr>
+                                      <p:to>
+                                        <p:strVal val="visible"/>
+                                      </p:to>
+                                    </p:set>
+                                  </p:childTnLst>
+                                </p:cTn>
+                              </p:par>
+                            </p:childTnLst>
+                          </p:cTn>
+                        </p:par>
+                      </p:childTnLst>
+                    </p:cTn>
+                  </p:par>
+                </p:childTnLst>
+              </p:cTn>
+              <p:prevCondLst>
+                <p:cond evt="onPrev" delay="0">
+                  <p:tgtEl>
+                    <p:sldTgt/>
+                  </p:tgtEl>
+                </p:cond>
+              </p:prevCondLst>
+              <p:nextCondLst>
+                <p:cond evt="onNext" delay="0">
+                  <p:tgtEl>
+                    <p:sldTgt/>
+                  </p:tgtEl>
+                </p:cond>
+              </p:nextCondLst>
+            </p:seq>
+          </p:childTnLst>
+        </p:cTn>
+      </p:par>
+    </p:tnLst>
+    <p:bldLst>
+      <p:bldP spid="3" grpId="0" build="p"/>
+    </p:bldLst>
+  </p:timing>
+</p:sld>
+</file>
+
+<file path=ppt/slides/slide53.xml><?xml version="1.0" encoding="utf-8"?>
+<p:sld xmlns:a="http://schemas.openxmlformats.org/drawingml/2006/main" xmlns:r="http://schemas.openxmlformats.org/officeDocument/2006/relationships" xmlns:p="http://schemas.openxmlformats.org/presentationml/2006/main">
+  <p:cSld>
+    <p:spTree>
+      <p:nvGrpSpPr>
+        <p:cNvPr id="1" name=""/>
+        <p:cNvGrpSpPr/>
+        <p:nvPr/>
+      </p:nvGrpSpPr>
+      <p:grpSpPr>
+        <a:xfrm>
+          <a:off x="0" y="0"/>
+          <a:ext cx="0" cy="0"/>
+          <a:chOff x="0" y="0"/>
+          <a:chExt cx="0" cy="0"/>
+        </a:xfrm>
+      </p:grpSpPr>
+      <p:sp>
+        <p:nvSpPr>
+          <p:cNvPr id="2" name="Title 1">
+            <a:extLst>
+              <a:ext uri="{FF2B5EF4-FFF2-40B4-BE49-F238E27FC236}">
                 <a16:creationId xmlns:a16="http://schemas.microsoft.com/office/drawing/2014/main" id="{7306C212-B3B4-8E92-B9B3-B626EF37EBA4}"/>
               </a:ext>
             </a:extLst>
@@ -44416,7 +44686,7 @@
 </p:sld>
 </file>
 
-<file path=ppt/slides/slide53.xml><?xml version="1.0" encoding="utf-8"?>
+<file path=ppt/slides/slide54.xml><?xml version="1.0" encoding="utf-8"?>
 <p:sld xmlns:a="http://schemas.openxmlformats.org/drawingml/2006/main" xmlns:r="http://schemas.openxmlformats.org/officeDocument/2006/relationships" xmlns:p="http://schemas.openxmlformats.org/presentationml/2006/main">
   <p:cSld>
     <p:spTree>

</xml_diff>

<commit_message>
Added screenshot with explicit struct layout sizes and offsets
</commit_message>
<xml_diff>
--- a/doc/Introduction to unsafe C#.pptx
+++ b/doc/Introduction to unsafe C#.pptx
@@ -7669,7 +7669,7 @@
           <a:p>
             <a:r>
               <a:rPr lang="en-US" sz="1200" dirty="0"/>
-              <a:t>Rev. 7 (2023-10-??), </a:t>
+              <a:t>Rev. 7 (2023-10-15), </a:t>
             </a:r>
             <a:r>
               <a:rPr lang="en-US" sz="1200" dirty="0">
@@ -17463,84 +17463,6 @@
               </a:rPr>
               <a:t>ExplicitWithoutPack</a:t>
             </a:r>
-            <a:r>
-              <a:rPr kumimoji="0" lang="en-US" altLang="en-US" b="0" i="0" u="none" strike="noStrike" cap="none" normalizeH="0" baseline="0" dirty="0">
-                <a:ln>
-                  <a:noFill/>
-                </a:ln>
-                <a:solidFill>
-                  <a:srgbClr val="300073"/>
-                </a:solidFill>
-                <a:effectLst/>
-                <a:latin typeface="Consolas" panose="020B0609020204030204" pitchFamily="49" charset="0"/>
-              </a:rPr>
-              <a:t> </a:t>
-            </a:r>
-            <a:r>
-              <a:rPr kumimoji="0" lang="en-US" altLang="en-US" b="0" i="1" u="none" strike="noStrike" cap="none" normalizeH="0" baseline="0" dirty="0">
-                <a:ln>
-                  <a:noFill/>
-                </a:ln>
-                <a:solidFill>
-                  <a:srgbClr val="248700"/>
-                </a:solidFill>
-                <a:effectLst/>
-                <a:latin typeface="Consolas" panose="020B0609020204030204" pitchFamily="49" charset="0"/>
-              </a:rPr>
-              <a:t>// </a:t>
-            </a:r>
-            <a:r>
-              <a:rPr kumimoji="0" lang="en-US" altLang="en-US" b="0" i="1" u="none" strike="noStrike" cap="none" normalizeH="0" baseline="0" dirty="0" err="1">
-                <a:ln>
-                  <a:noFill/>
-                </a:ln>
-                <a:solidFill>
-                  <a:srgbClr val="248700"/>
-                </a:solidFill>
-                <a:effectLst/>
-                <a:latin typeface="Consolas" panose="020B0609020204030204" pitchFamily="49" charset="0"/>
-              </a:rPr>
-              <a:t>sizeof</a:t>
-            </a:r>
-            <a:r>
-              <a:rPr kumimoji="0" lang="en-US" altLang="en-US" b="0" i="1" u="none" strike="noStrike" cap="none" normalizeH="0" baseline="0" dirty="0">
-                <a:ln>
-                  <a:noFill/>
-                </a:ln>
-                <a:solidFill>
-                  <a:srgbClr val="248700"/>
-                </a:solidFill>
-                <a:effectLst/>
-                <a:latin typeface="Consolas" panose="020B0609020204030204" pitchFamily="49" charset="0"/>
-              </a:rPr>
-              <a:t>(</a:t>
-            </a:r>
-            <a:r>
-              <a:rPr kumimoji="0" lang="en-US" altLang="en-US" b="0" i="1" u="none" strike="noStrike" cap="none" normalizeH="0" baseline="0" dirty="0" err="1">
-                <a:ln>
-                  <a:noFill/>
-                </a:ln>
-                <a:solidFill>
-                  <a:srgbClr val="248700"/>
-                </a:solidFill>
-                <a:effectLst/>
-                <a:latin typeface="Consolas" panose="020B0609020204030204" pitchFamily="49" charset="0"/>
-              </a:rPr>
-              <a:t>ExplicitWithoutPack</a:t>
-            </a:r>
-            <a:r>
-              <a:rPr kumimoji="0" lang="en-US" altLang="en-US" b="0" i="1" u="none" strike="noStrike" cap="none" normalizeH="0" baseline="0" dirty="0">
-                <a:ln>
-                  <a:noFill/>
-                </a:ln>
-                <a:solidFill>
-                  <a:srgbClr val="248700"/>
-                </a:solidFill>
-                <a:effectLst/>
-                <a:latin typeface="Consolas" panose="020B0609020204030204" pitchFamily="49" charset="0"/>
-              </a:rPr>
-              <a:t>) = 16</a:t>
-            </a:r>
             <a:br>
               <a:rPr kumimoji="0" lang="en-US" altLang="en-US" b="0" i="0" u="none" strike="noStrike" cap="none" normalizeH="0" baseline="0" dirty="0">
                 <a:ln>
@@ -18152,84 +18074,6 @@
                 <a:latin typeface="Consolas" panose="020B0609020204030204" pitchFamily="49" charset="0"/>
               </a:rPr>
               <a:t>ExplicitWithPack</a:t>
-            </a:r>
-            <a:r>
-              <a:rPr kumimoji="0" lang="en-US" altLang="en-US" b="0" i="0" u="none" strike="noStrike" cap="none" normalizeH="0" baseline="0" dirty="0">
-                <a:ln>
-                  <a:noFill/>
-                </a:ln>
-                <a:solidFill>
-                  <a:srgbClr val="300073"/>
-                </a:solidFill>
-                <a:effectLst/>
-                <a:latin typeface="Consolas" panose="020B0609020204030204" pitchFamily="49" charset="0"/>
-              </a:rPr>
-              <a:t>    </a:t>
-            </a:r>
-            <a:r>
-              <a:rPr kumimoji="0" lang="en-US" altLang="en-US" b="0" i="1" u="none" strike="noStrike" cap="none" normalizeH="0" baseline="0" dirty="0">
-                <a:ln>
-                  <a:noFill/>
-                </a:ln>
-                <a:solidFill>
-                  <a:srgbClr val="248700"/>
-                </a:solidFill>
-                <a:effectLst/>
-                <a:latin typeface="Consolas" panose="020B0609020204030204" pitchFamily="49" charset="0"/>
-              </a:rPr>
-              <a:t>// </a:t>
-            </a:r>
-            <a:r>
-              <a:rPr kumimoji="0" lang="en-US" altLang="en-US" b="0" i="1" u="none" strike="noStrike" cap="none" normalizeH="0" baseline="0" dirty="0" err="1">
-                <a:ln>
-                  <a:noFill/>
-                </a:ln>
-                <a:solidFill>
-                  <a:srgbClr val="248700"/>
-                </a:solidFill>
-                <a:effectLst/>
-                <a:latin typeface="Consolas" panose="020B0609020204030204" pitchFamily="49" charset="0"/>
-              </a:rPr>
-              <a:t>sizeof</a:t>
-            </a:r>
-            <a:r>
-              <a:rPr kumimoji="0" lang="en-US" altLang="en-US" b="0" i="1" u="none" strike="noStrike" cap="none" normalizeH="0" baseline="0" dirty="0">
-                <a:ln>
-                  <a:noFill/>
-                </a:ln>
-                <a:solidFill>
-                  <a:srgbClr val="248700"/>
-                </a:solidFill>
-                <a:effectLst/>
-                <a:latin typeface="Consolas" panose="020B0609020204030204" pitchFamily="49" charset="0"/>
-              </a:rPr>
-              <a:t>(</a:t>
-            </a:r>
-            <a:r>
-              <a:rPr kumimoji="0" lang="en-US" altLang="en-US" b="0" i="1" u="none" strike="noStrike" cap="none" normalizeH="0" baseline="0" dirty="0" err="1">
-                <a:ln>
-                  <a:noFill/>
-                </a:ln>
-                <a:solidFill>
-                  <a:srgbClr val="248700"/>
-                </a:solidFill>
-                <a:effectLst/>
-                <a:latin typeface="Consolas" panose="020B0609020204030204" pitchFamily="49" charset="0"/>
-              </a:rPr>
-              <a:t>ExplicitWithPack</a:t>
-            </a:r>
-            <a:r>
-              <a:rPr kumimoji="0" lang="en-US" altLang="en-US" b="0" i="1" u="none" strike="noStrike" cap="none" normalizeH="0" baseline="0" dirty="0">
-                <a:ln>
-                  <a:noFill/>
-                </a:ln>
-                <a:solidFill>
-                  <a:srgbClr val="248700"/>
-                </a:solidFill>
-                <a:effectLst/>
-                <a:latin typeface="Consolas" panose="020B0609020204030204" pitchFamily="49" charset="0"/>
-              </a:rPr>
-              <a:t>)    = 13</a:t>
             </a:r>
             <a:br>
               <a:rPr kumimoji="0" lang="en-US" altLang="en-US" b="0" i="0" u="none" strike="noStrike" cap="none" normalizeH="0" baseline="0" dirty="0">
@@ -18651,6 +18495,106 @@
           </a:p>
         </p:txBody>
       </p:sp>
+      <p:pic>
+        <p:nvPicPr>
+          <p:cNvPr id="7" name="Picture 6" descr="Screenshot of a console application showing the offsets of the fields of struct ExplicitWithoutPack and a total size of 16">
+            <a:extLst>
+              <a:ext uri="{FF2B5EF4-FFF2-40B4-BE49-F238E27FC236}">
+                <a16:creationId xmlns:a16="http://schemas.microsoft.com/office/drawing/2014/main" id="{344DD43C-336E-7C6A-7961-EB4C8062FBB7}"/>
+              </a:ext>
+            </a:extLst>
+          </p:cNvPr>
+          <p:cNvPicPr>
+            <a:picLocks noChangeAspect="1"/>
+          </p:cNvPicPr>
+          <p:nvPr/>
+        </p:nvPicPr>
+        <p:blipFill>
+          <a:blip r:embed="rId2">
+            <a:extLst>
+              <a:ext uri="{28A0092B-C50C-407E-A947-70E740481C1C}">
+                <a14:useLocalDpi xmlns:a14="http://schemas.microsoft.com/office/drawing/2010/main" val="0"/>
+              </a:ext>
+            </a:extLst>
+          </a:blip>
+          <a:stretch>
+            <a:fillRect/>
+          </a:stretch>
+        </p:blipFill>
+        <p:spPr>
+          <a:xfrm>
+            <a:off x="7202489" y="2119828"/>
+            <a:ext cx="3877285" cy="1609200"/>
+          </a:xfrm>
+          <a:prstGeom prst="rect">
+            <a:avLst/>
+          </a:prstGeom>
+          <a:ln w="15875">
+            <a:solidFill>
+              <a:schemeClr val="accent1"/>
+            </a:solidFill>
+          </a:ln>
+          <a:effectLst>
+            <a:outerShdw blurRad="127000" dist="127000" dir="2700000" algn="tl" rotWithShape="0">
+              <a:schemeClr val="bg1">
+                <a:lumMod val="95000"/>
+                <a:lumOff val="5000"/>
+                <a:alpha val="80000"/>
+              </a:schemeClr>
+            </a:outerShdw>
+          </a:effectLst>
+        </p:spPr>
+      </p:pic>
+      <p:pic>
+        <p:nvPicPr>
+          <p:cNvPr id="9" name="Picture 8" descr="Screenshot of a console application showing the offsets of the fields of struct ExplicitWithoutPack and a total size of 13">
+            <a:extLst>
+              <a:ext uri="{FF2B5EF4-FFF2-40B4-BE49-F238E27FC236}">
+                <a16:creationId xmlns:a16="http://schemas.microsoft.com/office/drawing/2014/main" id="{5E301034-33F2-FCE3-831C-CC33551F080E}"/>
+              </a:ext>
+            </a:extLst>
+          </p:cNvPr>
+          <p:cNvPicPr>
+            <a:picLocks noChangeAspect="1"/>
+          </p:cNvPicPr>
+          <p:nvPr/>
+        </p:nvPicPr>
+        <p:blipFill>
+          <a:blip r:embed="rId3">
+            <a:extLst>
+              <a:ext uri="{28A0092B-C50C-407E-A947-70E740481C1C}">
+                <a14:useLocalDpi xmlns:a14="http://schemas.microsoft.com/office/drawing/2010/main" val="0"/>
+              </a:ext>
+            </a:extLst>
+          </a:blip>
+          <a:stretch>
+            <a:fillRect/>
+          </a:stretch>
+        </p:blipFill>
+        <p:spPr>
+          <a:xfrm>
+            <a:off x="7202489" y="4296971"/>
+            <a:ext cx="3885959" cy="1612800"/>
+          </a:xfrm>
+          <a:prstGeom prst="rect">
+            <a:avLst/>
+          </a:prstGeom>
+          <a:ln w="15875">
+            <a:solidFill>
+              <a:schemeClr val="accent1"/>
+            </a:solidFill>
+          </a:ln>
+          <a:effectLst>
+            <a:outerShdw blurRad="127000" dist="127000" dir="2700000" algn="tl" rotWithShape="0">
+              <a:schemeClr val="bg1">
+                <a:lumMod val="95000"/>
+                <a:lumOff val="5000"/>
+                <a:alpha val="80000"/>
+              </a:schemeClr>
+            </a:outerShdw>
+          </a:effectLst>
+        </p:spPr>
+      </p:pic>
     </p:spTree>
     <p:extLst>
       <p:ext uri="{BB962C8B-B14F-4D97-AF65-F5344CB8AC3E}">
@@ -18661,6 +18605,174 @@
   <p:clrMapOvr>
     <a:masterClrMapping/>
   </p:clrMapOvr>
+  <p:timing>
+    <p:tnLst>
+      <p:par>
+        <p:cTn id="1" dur="indefinite" restart="never" nodeType="tmRoot">
+          <p:childTnLst>
+            <p:seq concurrent="1" nextAc="seek">
+              <p:cTn id="2" dur="indefinite" nodeType="mainSeq">
+                <p:childTnLst>
+                  <p:par>
+                    <p:cTn id="3" fill="hold">
+                      <p:stCondLst>
+                        <p:cond delay="indefinite"/>
+                      </p:stCondLst>
+                      <p:childTnLst>
+                        <p:par>
+                          <p:cTn id="4" fill="hold">
+                            <p:stCondLst>
+                              <p:cond delay="0"/>
+                            </p:stCondLst>
+                            <p:childTnLst>
+                              <p:par>
+                                <p:cTn id="5" presetID="1" presetClass="entr" presetSubtype="0" fill="hold" grpId="0" nodeType="clickEffect">
+                                  <p:stCondLst>
+                                    <p:cond delay="0"/>
+                                  </p:stCondLst>
+                                  <p:childTnLst>
+                                    <p:set>
+                                      <p:cBhvr>
+                                        <p:cTn id="6" dur="1" fill="hold">
+                                          <p:stCondLst>
+                                            <p:cond delay="0"/>
+                                          </p:stCondLst>
+                                        </p:cTn>
+                                        <p:tgtEl>
+                                          <p:spTgt spid="5"/>
+                                        </p:tgtEl>
+                                        <p:attrNameLst>
+                                          <p:attrName>style.visibility</p:attrName>
+                                        </p:attrNameLst>
+                                      </p:cBhvr>
+                                      <p:to>
+                                        <p:strVal val="visible"/>
+                                      </p:to>
+                                    </p:set>
+                                  </p:childTnLst>
+                                </p:cTn>
+                              </p:par>
+                            </p:childTnLst>
+                          </p:cTn>
+                        </p:par>
+                      </p:childTnLst>
+                    </p:cTn>
+                  </p:par>
+                  <p:par>
+                    <p:cTn id="7" fill="hold">
+                      <p:stCondLst>
+                        <p:cond delay="indefinite"/>
+                      </p:stCondLst>
+                      <p:childTnLst>
+                        <p:par>
+                          <p:cTn id="8" fill="hold">
+                            <p:stCondLst>
+                              <p:cond delay="0"/>
+                            </p:stCondLst>
+                            <p:childTnLst>
+                              <p:par>
+                                <p:cTn id="9" presetID="1" presetClass="entr" presetSubtype="0" fill="hold" nodeType="clickEffect">
+                                  <p:stCondLst>
+                                    <p:cond delay="0"/>
+                                  </p:stCondLst>
+                                  <p:childTnLst>
+                                    <p:set>
+                                      <p:cBhvr>
+                                        <p:cTn id="10" dur="1" fill="hold">
+                                          <p:stCondLst>
+                                            <p:cond delay="0"/>
+                                          </p:stCondLst>
+                                        </p:cTn>
+                                        <p:tgtEl>
+                                          <p:spTgt spid="7"/>
+                                        </p:tgtEl>
+                                        <p:attrNameLst>
+                                          <p:attrName>style.visibility</p:attrName>
+                                        </p:attrNameLst>
+                                      </p:cBhvr>
+                                      <p:to>
+                                        <p:strVal val="visible"/>
+                                      </p:to>
+                                    </p:set>
+                                  </p:childTnLst>
+                                </p:cTn>
+                              </p:par>
+                            </p:childTnLst>
+                          </p:cTn>
+                        </p:par>
+                      </p:childTnLst>
+                    </p:cTn>
+                  </p:par>
+                  <p:par>
+                    <p:cTn id="11" fill="hold">
+                      <p:stCondLst>
+                        <p:cond delay="indefinite"/>
+                      </p:stCondLst>
+                      <p:childTnLst>
+                        <p:par>
+                          <p:cTn id="12" fill="hold">
+                            <p:stCondLst>
+                              <p:cond delay="0"/>
+                            </p:stCondLst>
+                            <p:childTnLst>
+                              <p:par>
+                                <p:cTn id="13" presetID="1" presetClass="entr" presetSubtype="0" fill="hold" nodeType="clickEffect">
+                                  <p:stCondLst>
+                                    <p:cond delay="0"/>
+                                  </p:stCondLst>
+                                  <p:childTnLst>
+                                    <p:set>
+                                      <p:cBhvr>
+                                        <p:cTn id="14" dur="1" fill="hold">
+                                          <p:stCondLst>
+                                            <p:cond delay="0"/>
+                                          </p:stCondLst>
+                                        </p:cTn>
+                                        <p:tgtEl>
+                                          <p:spTgt spid="9"/>
+                                        </p:tgtEl>
+                                        <p:attrNameLst>
+                                          <p:attrName>style.visibility</p:attrName>
+                                        </p:attrNameLst>
+                                      </p:cBhvr>
+                                      <p:to>
+                                        <p:strVal val="visible"/>
+                                      </p:to>
+                                    </p:set>
+                                  </p:childTnLst>
+                                </p:cTn>
+                              </p:par>
+                            </p:childTnLst>
+                          </p:cTn>
+                        </p:par>
+                      </p:childTnLst>
+                    </p:cTn>
+                  </p:par>
+                </p:childTnLst>
+              </p:cTn>
+              <p:prevCondLst>
+                <p:cond evt="onPrev" delay="0">
+                  <p:tgtEl>
+                    <p:sldTgt/>
+                  </p:tgtEl>
+                </p:cond>
+              </p:prevCondLst>
+              <p:nextCondLst>
+                <p:cond evt="onNext" delay="0">
+                  <p:tgtEl>
+                    <p:sldTgt/>
+                  </p:tgtEl>
+                </p:cond>
+              </p:nextCondLst>
+            </p:seq>
+          </p:childTnLst>
+        </p:cTn>
+      </p:par>
+    </p:tnLst>
+    <p:bldLst>
+      <p:bldP spid="5" grpId="0" animBg="1"/>
+    </p:bldLst>
+  </p:timing>
 </p:sld>
 </file>
 

</xml_diff>